<commit_message>
Portato a convergenza controllore Adaptive Computed Torque, ma continua a non funzionare l'algoritmo di adattamento dei parametri
</commit_message>
<xml_diff>
--- a/Relazione/Presentazione.pptx
+++ b/Relazione/Presentazione.pptx
@@ -12,6 +12,13 @@
     <p:sldId id="259" r:id="rId6"/>
     <p:sldId id="261" r:id="rId7"/>
     <p:sldId id="262" r:id="rId8"/>
+    <p:sldId id="263" r:id="rId9"/>
+    <p:sldId id="265" r:id="rId10"/>
+    <p:sldId id="264" r:id="rId11"/>
+    <p:sldId id="266" r:id="rId12"/>
+    <p:sldId id="267" r:id="rId13"/>
+    <p:sldId id="268" r:id="rId14"/>
+    <p:sldId id="269" r:id="rId15"/>
   </p:sldIdLst>
   <p:sldSz cx="12192000" cy="6858000"/>
   <p:notesSz cx="6858000" cy="9144000"/>
@@ -110,6 +117,11 @@
       </a:defRPr>
     </a:lvl9pPr>
   </p:defaultTextStyle>
+  <p:extLst>
+    <p:ext uri="{EFAFB233-063F-42B5-8137-9DF3F51BA10A}">
+      <p15:sldGuideLst xmlns:p15="http://schemas.microsoft.com/office/powerpoint/2012/main"/>
+    </p:ext>
+  </p:extLst>
 </p:presentation>
 </file>
 
@@ -260,7 +272,7 @@
           <a:p>
             <a:fld id="{27153579-3A4D-BB42-BD49-BB0F80A81A61}" type="datetimeFigureOut">
               <a:rPr lang="it-IT" smtClean="0"/>
-              <a:t>18/04/21</a:t>
+              <a:t>07/05/21</a:t>
             </a:fld>
             <a:endParaRPr lang="it-IT"/>
           </a:p>
@@ -433,7 +445,7 @@
           <a:p>
             <a:fld id="{27153579-3A4D-BB42-BD49-BB0F80A81A61}" type="datetimeFigureOut">
               <a:rPr lang="it-IT" smtClean="0"/>
-              <a:t>18/04/21</a:t>
+              <a:t>07/05/21</a:t>
             </a:fld>
             <a:endParaRPr lang="it-IT"/>
           </a:p>
@@ -616,7 +628,7 @@
           <a:p>
             <a:fld id="{27153579-3A4D-BB42-BD49-BB0F80A81A61}" type="datetimeFigureOut">
               <a:rPr lang="it-IT" smtClean="0"/>
-              <a:t>18/04/21</a:t>
+              <a:t>07/05/21</a:t>
             </a:fld>
             <a:endParaRPr lang="it-IT"/>
           </a:p>
@@ -789,7 +801,7 @@
           <a:p>
             <a:fld id="{27153579-3A4D-BB42-BD49-BB0F80A81A61}" type="datetimeFigureOut">
               <a:rPr lang="it-IT" smtClean="0"/>
-              <a:t>18/04/21</a:t>
+              <a:t>07/05/21</a:t>
             </a:fld>
             <a:endParaRPr lang="it-IT"/>
           </a:p>
@@ -1067,7 +1079,7 @@
           <a:p>
             <a:fld id="{27153579-3A4D-BB42-BD49-BB0F80A81A61}" type="datetimeFigureOut">
               <a:rPr lang="it-IT" smtClean="0"/>
-              <a:t>18/04/21</a:t>
+              <a:t>07/05/21</a:t>
             </a:fld>
             <a:endParaRPr lang="it-IT"/>
           </a:p>
@@ -1282,7 +1294,7 @@
           <a:p>
             <a:fld id="{27153579-3A4D-BB42-BD49-BB0F80A81A61}" type="datetimeFigureOut">
               <a:rPr lang="it-IT" smtClean="0"/>
-              <a:t>18/04/21</a:t>
+              <a:t>07/05/21</a:t>
             </a:fld>
             <a:endParaRPr lang="it-IT"/>
           </a:p>
@@ -1650,7 +1662,7 @@
           <a:p>
             <a:fld id="{27153579-3A4D-BB42-BD49-BB0F80A81A61}" type="datetimeFigureOut">
               <a:rPr lang="it-IT" smtClean="0"/>
-              <a:t>18/04/21</a:t>
+              <a:t>07/05/21</a:t>
             </a:fld>
             <a:endParaRPr lang="it-IT"/>
           </a:p>
@@ -1791,7 +1803,7 @@
           <a:p>
             <a:fld id="{27153579-3A4D-BB42-BD49-BB0F80A81A61}" type="datetimeFigureOut">
               <a:rPr lang="it-IT" smtClean="0"/>
-              <a:t>18/04/21</a:t>
+              <a:t>07/05/21</a:t>
             </a:fld>
             <a:endParaRPr lang="it-IT"/>
           </a:p>
@@ -1904,7 +1916,7 @@
           <a:p>
             <a:fld id="{27153579-3A4D-BB42-BD49-BB0F80A81A61}" type="datetimeFigureOut">
               <a:rPr lang="it-IT" smtClean="0"/>
-              <a:t>18/04/21</a:t>
+              <a:t>07/05/21</a:t>
             </a:fld>
             <a:endParaRPr lang="it-IT"/>
           </a:p>
@@ -2193,7 +2205,7 @@
           <a:p>
             <a:fld id="{27153579-3A4D-BB42-BD49-BB0F80A81A61}" type="datetimeFigureOut">
               <a:rPr lang="it-IT" smtClean="0"/>
-              <a:t>18/04/21</a:t>
+              <a:t>07/05/21</a:t>
             </a:fld>
             <a:endParaRPr lang="it-IT"/>
           </a:p>
@@ -2484,7 +2496,7 @@
           <a:p>
             <a:fld id="{27153579-3A4D-BB42-BD49-BB0F80A81A61}" type="datetimeFigureOut">
               <a:rPr lang="it-IT" smtClean="0"/>
-              <a:t>18/04/21</a:t>
+              <a:t>07/05/21</a:t>
             </a:fld>
             <a:endParaRPr lang="it-IT"/>
           </a:p>
@@ -2700,7 +2712,7 @@
           <a:p>
             <a:fld id="{27153579-3A4D-BB42-BD49-BB0F80A81A61}" type="datetimeFigureOut">
               <a:rPr lang="it-IT" smtClean="0"/>
-              <a:t>18/04/21</a:t>
+              <a:t>07/05/21</a:t>
             </a:fld>
             <a:endParaRPr lang="it-IT"/>
           </a:p>
@@ -3244,7 +3256,7 @@
         <p:spPr>
           <a:xfrm>
             <a:off x="2127370" y="5390249"/>
-            <a:ext cx="8540627" cy="646331"/>
+            <a:ext cx="8540627" cy="923330"/>
           </a:xfrm>
           <a:prstGeom prst="rect">
             <a:avLst/>
@@ -3268,12 +3280,1324 @@
               <a:t>Prof. Antonio BICCHI					Arianna GASPARRI </a:t>
             </a:r>
           </a:p>
+          <a:p>
+            <a:r>
+              <a:rPr lang="it-IT" dirty="0"/>
+              <a:t>Prof. Giorgio GRIOLI</a:t>
+            </a:r>
+          </a:p>
         </p:txBody>
       </p:sp>
     </p:spTree>
     <p:extLst>
       <p:ext uri="{BB962C8B-B14F-4D97-AF65-F5344CB8AC3E}">
         <p14:creationId xmlns:p14="http://schemas.microsoft.com/office/powerpoint/2010/main" val="965648203"/>
+      </p:ext>
+    </p:extLst>
+  </p:cSld>
+  <p:clrMapOvr>
+    <a:masterClrMapping/>
+  </p:clrMapOvr>
+</p:sld>
+</file>
+
+<file path=ppt/slides/slide10.xml><?xml version="1.0" encoding="utf-8"?>
+<p:sld xmlns:a="http://schemas.openxmlformats.org/drawingml/2006/main" xmlns:r="http://schemas.openxmlformats.org/officeDocument/2006/relationships" xmlns:p="http://schemas.openxmlformats.org/presentationml/2006/main">
+  <p:cSld>
+    <p:spTree>
+      <p:nvGrpSpPr>
+        <p:cNvPr id="1" name=""/>
+        <p:cNvGrpSpPr/>
+        <p:nvPr/>
+      </p:nvGrpSpPr>
+      <p:grpSpPr>
+        <a:xfrm>
+          <a:off x="0" y="0"/>
+          <a:ext cx="0" cy="0"/>
+          <a:chOff x="0" y="0"/>
+          <a:chExt cx="0" cy="0"/>
+        </a:xfrm>
+      </p:grpSpPr>
+      <p:sp>
+        <p:nvSpPr>
+          <p:cNvPr id="5" name="Titolo 1">
+            <a:extLst>
+              <a:ext uri="{FF2B5EF4-FFF2-40B4-BE49-F238E27FC236}">
+                <a16:creationId xmlns:a16="http://schemas.microsoft.com/office/drawing/2014/main" id="{719936BE-0F9D-C74E-9E55-A7F2CE751F93}"/>
+              </a:ext>
+            </a:extLst>
+          </p:cNvPr>
+          <p:cNvSpPr txBox="1">
+            <a:spLocks/>
+          </p:cNvSpPr>
+          <p:nvPr/>
+        </p:nvSpPr>
+        <p:spPr>
+          <a:xfrm>
+            <a:off x="1524000" y="454393"/>
+            <a:ext cx="9144000" cy="1021230"/>
+          </a:xfrm>
+          <a:prstGeom prst="rect">
+            <a:avLst/>
+          </a:prstGeom>
+        </p:spPr>
+        <p:txBody>
+          <a:bodyPr vert="horz" lIns="91440" tIns="45720" rIns="91440" bIns="45720" rtlCol="0" anchor="ctr">
+            <a:normAutofit fontScale="85000" lnSpcReduction="20000"/>
+          </a:bodyPr>
+          <a:lstStyle>
+            <a:lvl1pPr algn="l" defTabSz="914400" rtl="0" eaLnBrk="1" latinLnBrk="0" hangingPunct="1">
+              <a:lnSpc>
+                <a:spcPct val="90000"/>
+              </a:lnSpc>
+              <a:spcBef>
+                <a:spcPct val="0"/>
+              </a:spcBef>
+              <a:buNone/>
+              <a:defRPr sz="4400" kern="1200">
+                <a:solidFill>
+                  <a:schemeClr val="tx1"/>
+                </a:solidFill>
+                <a:latin typeface="+mj-lt"/>
+                <a:ea typeface="+mj-ea"/>
+                <a:cs typeface="+mj-cs"/>
+              </a:defRPr>
+            </a:lvl1pPr>
+          </a:lstStyle>
+          <a:p>
+            <a:pPr algn="ctr"/>
+            <a:r>
+              <a:rPr lang="it-IT" sz="5200" dirty="0"/>
+              <a:t>Manipolatore di Stanford</a:t>
+            </a:r>
+          </a:p>
+          <a:p>
+            <a:pPr algn="ctr"/>
+            <a:r>
+              <a:rPr lang="it-IT" sz="3800" dirty="0"/>
+              <a:t>Controllore </a:t>
+            </a:r>
+            <a:r>
+              <a:rPr lang="it-IT" sz="3800" dirty="0" err="1"/>
+              <a:t>Computed</a:t>
+            </a:r>
+            <a:r>
+              <a:rPr lang="it-IT" sz="3800" dirty="0"/>
+              <a:t> Torque</a:t>
+            </a:r>
+          </a:p>
+        </p:txBody>
+      </p:sp>
+      <p:pic>
+        <p:nvPicPr>
+          <p:cNvPr id="9" name="Immagine 8">
+            <a:extLst>
+              <a:ext uri="{FF2B5EF4-FFF2-40B4-BE49-F238E27FC236}">
+                <a16:creationId xmlns:a16="http://schemas.microsoft.com/office/drawing/2014/main" id="{F7A71DD2-F7BC-284D-90F5-865CBE457982}"/>
+              </a:ext>
+            </a:extLst>
+          </p:cNvPr>
+          <p:cNvPicPr>
+            <a:picLocks noChangeAspect="1"/>
+          </p:cNvPicPr>
+          <p:nvPr/>
+        </p:nvPicPr>
+        <p:blipFill>
+          <a:blip r:embed="rId2"/>
+          <a:stretch>
+            <a:fillRect/>
+          </a:stretch>
+        </p:blipFill>
+        <p:spPr>
+          <a:xfrm>
+            <a:off x="1900641" y="1475623"/>
+            <a:ext cx="7810137" cy="861177"/>
+          </a:xfrm>
+          <a:prstGeom prst="rect">
+            <a:avLst/>
+          </a:prstGeom>
+        </p:spPr>
+      </p:pic>
+      <p:pic>
+        <p:nvPicPr>
+          <p:cNvPr id="6" name="Immagine 5">
+            <a:extLst>
+              <a:ext uri="{FF2B5EF4-FFF2-40B4-BE49-F238E27FC236}">
+                <a16:creationId xmlns:a16="http://schemas.microsoft.com/office/drawing/2014/main" id="{3ADB51CA-0300-7442-8021-7E423033578D}"/>
+              </a:ext>
+            </a:extLst>
+          </p:cNvPr>
+          <p:cNvPicPr>
+            <a:picLocks noChangeAspect="1"/>
+          </p:cNvPicPr>
+          <p:nvPr/>
+        </p:nvPicPr>
+        <p:blipFill>
+          <a:blip r:embed="rId3"/>
+          <a:stretch>
+            <a:fillRect/>
+          </a:stretch>
+        </p:blipFill>
+        <p:spPr>
+          <a:xfrm>
+            <a:off x="2686529" y="2496853"/>
+            <a:ext cx="6238364" cy="1592774"/>
+          </a:xfrm>
+          <a:prstGeom prst="rect">
+            <a:avLst/>
+          </a:prstGeom>
+        </p:spPr>
+      </p:pic>
+      <p:pic>
+        <p:nvPicPr>
+          <p:cNvPr id="8" name="Immagine 7">
+            <a:extLst>
+              <a:ext uri="{FF2B5EF4-FFF2-40B4-BE49-F238E27FC236}">
+                <a16:creationId xmlns:a16="http://schemas.microsoft.com/office/drawing/2014/main" id="{43E691A7-EB72-354B-B079-B48A28130907}"/>
+              </a:ext>
+            </a:extLst>
+          </p:cNvPr>
+          <p:cNvPicPr>
+            <a:picLocks noChangeAspect="1"/>
+          </p:cNvPicPr>
+          <p:nvPr/>
+        </p:nvPicPr>
+        <p:blipFill>
+          <a:blip r:embed="rId4"/>
+          <a:stretch>
+            <a:fillRect/>
+          </a:stretch>
+        </p:blipFill>
+        <p:spPr>
+          <a:xfrm>
+            <a:off x="2747642" y="4249680"/>
+            <a:ext cx="6116137" cy="1640295"/>
+          </a:xfrm>
+          <a:prstGeom prst="rect">
+            <a:avLst/>
+          </a:prstGeom>
+        </p:spPr>
+      </p:pic>
+    </p:spTree>
+    <p:extLst>
+      <p:ext uri="{BB962C8B-B14F-4D97-AF65-F5344CB8AC3E}">
+        <p14:creationId xmlns:p14="http://schemas.microsoft.com/office/powerpoint/2010/main" val="3049155881"/>
+      </p:ext>
+    </p:extLst>
+  </p:cSld>
+  <p:clrMapOvr>
+    <a:masterClrMapping/>
+  </p:clrMapOvr>
+</p:sld>
+</file>
+
+<file path=ppt/slides/slide11.xml><?xml version="1.0" encoding="utf-8"?>
+<p:sld xmlns:a="http://schemas.openxmlformats.org/drawingml/2006/main" xmlns:r="http://schemas.openxmlformats.org/officeDocument/2006/relationships" xmlns:p="http://schemas.openxmlformats.org/presentationml/2006/main">
+  <p:cSld>
+    <p:spTree>
+      <p:nvGrpSpPr>
+        <p:cNvPr id="1" name=""/>
+        <p:cNvGrpSpPr/>
+        <p:nvPr/>
+      </p:nvGrpSpPr>
+      <p:grpSpPr>
+        <a:xfrm>
+          <a:off x="0" y="0"/>
+          <a:ext cx="0" cy="0"/>
+          <a:chOff x="0" y="0"/>
+          <a:chExt cx="0" cy="0"/>
+        </a:xfrm>
+      </p:grpSpPr>
+      <p:sp>
+        <p:nvSpPr>
+          <p:cNvPr id="5" name="Titolo 1">
+            <a:extLst>
+              <a:ext uri="{FF2B5EF4-FFF2-40B4-BE49-F238E27FC236}">
+                <a16:creationId xmlns:a16="http://schemas.microsoft.com/office/drawing/2014/main" id="{719936BE-0F9D-C74E-9E55-A7F2CE751F93}"/>
+              </a:ext>
+            </a:extLst>
+          </p:cNvPr>
+          <p:cNvSpPr txBox="1">
+            <a:spLocks/>
+          </p:cNvSpPr>
+          <p:nvPr/>
+        </p:nvSpPr>
+        <p:spPr>
+          <a:xfrm>
+            <a:off x="1524000" y="454393"/>
+            <a:ext cx="9144000" cy="1021230"/>
+          </a:xfrm>
+          <a:prstGeom prst="rect">
+            <a:avLst/>
+          </a:prstGeom>
+        </p:spPr>
+        <p:txBody>
+          <a:bodyPr vert="horz" lIns="91440" tIns="45720" rIns="91440" bIns="45720" rtlCol="0" anchor="ctr">
+            <a:normAutofit fontScale="85000" lnSpcReduction="20000"/>
+          </a:bodyPr>
+          <a:lstStyle>
+            <a:lvl1pPr algn="l" defTabSz="914400" rtl="0" eaLnBrk="1" latinLnBrk="0" hangingPunct="1">
+              <a:lnSpc>
+                <a:spcPct val="90000"/>
+              </a:lnSpc>
+              <a:spcBef>
+                <a:spcPct val="0"/>
+              </a:spcBef>
+              <a:buNone/>
+              <a:defRPr sz="4400" kern="1200">
+                <a:solidFill>
+                  <a:schemeClr val="tx1"/>
+                </a:solidFill>
+                <a:latin typeface="+mj-lt"/>
+                <a:ea typeface="+mj-ea"/>
+                <a:cs typeface="+mj-cs"/>
+              </a:defRPr>
+            </a:lvl1pPr>
+          </a:lstStyle>
+          <a:p>
+            <a:pPr algn="ctr"/>
+            <a:r>
+              <a:rPr lang="it-IT" sz="5200" dirty="0"/>
+              <a:t>Manipolatore di Stanford</a:t>
+            </a:r>
+          </a:p>
+          <a:p>
+            <a:pPr algn="ctr"/>
+            <a:r>
+              <a:rPr lang="it-IT" sz="3800" dirty="0"/>
+              <a:t>Controllore </a:t>
+            </a:r>
+            <a:r>
+              <a:rPr lang="it-IT" sz="3800" dirty="0" err="1"/>
+              <a:t>Computed</a:t>
+            </a:r>
+            <a:r>
+              <a:rPr lang="it-IT" sz="3800" dirty="0"/>
+              <a:t> Torque</a:t>
+            </a:r>
+          </a:p>
+        </p:txBody>
+      </p:sp>
+      <p:pic>
+        <p:nvPicPr>
+          <p:cNvPr id="16" name="Immagine 15">
+            <a:extLst>
+              <a:ext uri="{FF2B5EF4-FFF2-40B4-BE49-F238E27FC236}">
+                <a16:creationId xmlns:a16="http://schemas.microsoft.com/office/drawing/2014/main" id="{51A10DA4-5C82-3B4C-B6EB-35D753E3E114}"/>
+              </a:ext>
+            </a:extLst>
+          </p:cNvPr>
+          <p:cNvPicPr>
+            <a:picLocks noChangeAspect="1"/>
+          </p:cNvPicPr>
+          <p:nvPr/>
+        </p:nvPicPr>
+        <p:blipFill>
+          <a:blip r:embed="rId2"/>
+          <a:stretch>
+            <a:fillRect/>
+          </a:stretch>
+        </p:blipFill>
+        <p:spPr>
+          <a:xfrm>
+            <a:off x="377372" y="1475623"/>
+            <a:ext cx="5689600" cy="4267200"/>
+          </a:xfrm>
+          <a:prstGeom prst="rect">
+            <a:avLst/>
+          </a:prstGeom>
+        </p:spPr>
+      </p:pic>
+      <p:pic>
+        <p:nvPicPr>
+          <p:cNvPr id="3" name="Immagine 2">
+            <a:extLst>
+              <a:ext uri="{FF2B5EF4-FFF2-40B4-BE49-F238E27FC236}">
+                <a16:creationId xmlns:a16="http://schemas.microsoft.com/office/drawing/2014/main" id="{0612570B-82B2-5D49-9D7E-7DD274862FA4}"/>
+              </a:ext>
+            </a:extLst>
+          </p:cNvPr>
+          <p:cNvPicPr>
+            <a:picLocks noChangeAspect="1"/>
+          </p:cNvPicPr>
+          <p:nvPr/>
+        </p:nvPicPr>
+        <p:blipFill>
+          <a:blip r:embed="rId3"/>
+          <a:stretch>
+            <a:fillRect/>
+          </a:stretch>
+        </p:blipFill>
+        <p:spPr>
+          <a:xfrm>
+            <a:off x="6066972" y="1475623"/>
+            <a:ext cx="5689600" cy="4267200"/>
+          </a:xfrm>
+          <a:prstGeom prst="rect">
+            <a:avLst/>
+          </a:prstGeom>
+        </p:spPr>
+      </p:pic>
+    </p:spTree>
+    <p:extLst>
+      <p:ext uri="{BB962C8B-B14F-4D97-AF65-F5344CB8AC3E}">
+        <p14:creationId xmlns:p14="http://schemas.microsoft.com/office/powerpoint/2010/main" val="1393452628"/>
+      </p:ext>
+    </p:extLst>
+  </p:cSld>
+  <p:clrMapOvr>
+    <a:masterClrMapping/>
+  </p:clrMapOvr>
+</p:sld>
+</file>
+
+<file path=ppt/slides/slide12.xml><?xml version="1.0" encoding="utf-8"?>
+<p:sld xmlns:a="http://schemas.openxmlformats.org/drawingml/2006/main" xmlns:r="http://schemas.openxmlformats.org/officeDocument/2006/relationships" xmlns:p="http://schemas.openxmlformats.org/presentationml/2006/main">
+  <p:cSld>
+    <p:spTree>
+      <p:nvGrpSpPr>
+        <p:cNvPr id="1" name=""/>
+        <p:cNvGrpSpPr/>
+        <p:nvPr/>
+      </p:nvGrpSpPr>
+      <p:grpSpPr>
+        <a:xfrm>
+          <a:off x="0" y="0"/>
+          <a:ext cx="0" cy="0"/>
+          <a:chOff x="0" y="0"/>
+          <a:chExt cx="0" cy="0"/>
+        </a:xfrm>
+      </p:grpSpPr>
+      <p:sp>
+        <p:nvSpPr>
+          <p:cNvPr id="5" name="Titolo 1">
+            <a:extLst>
+              <a:ext uri="{FF2B5EF4-FFF2-40B4-BE49-F238E27FC236}">
+                <a16:creationId xmlns:a16="http://schemas.microsoft.com/office/drawing/2014/main" id="{719936BE-0F9D-C74E-9E55-A7F2CE751F93}"/>
+              </a:ext>
+            </a:extLst>
+          </p:cNvPr>
+          <p:cNvSpPr txBox="1">
+            <a:spLocks/>
+          </p:cNvSpPr>
+          <p:nvPr/>
+        </p:nvSpPr>
+        <p:spPr>
+          <a:xfrm>
+            <a:off x="1524000" y="454393"/>
+            <a:ext cx="9144000" cy="1021230"/>
+          </a:xfrm>
+          <a:prstGeom prst="rect">
+            <a:avLst/>
+          </a:prstGeom>
+        </p:spPr>
+        <p:txBody>
+          <a:bodyPr vert="horz" lIns="91440" tIns="45720" rIns="91440" bIns="45720" rtlCol="0" anchor="ctr">
+            <a:normAutofit fontScale="85000" lnSpcReduction="20000"/>
+          </a:bodyPr>
+          <a:lstStyle>
+            <a:lvl1pPr algn="l" defTabSz="914400" rtl="0" eaLnBrk="1" latinLnBrk="0" hangingPunct="1">
+              <a:lnSpc>
+                <a:spcPct val="90000"/>
+              </a:lnSpc>
+              <a:spcBef>
+                <a:spcPct val="0"/>
+              </a:spcBef>
+              <a:buNone/>
+              <a:defRPr sz="4400" kern="1200">
+                <a:solidFill>
+                  <a:schemeClr val="tx1"/>
+                </a:solidFill>
+                <a:latin typeface="+mj-lt"/>
+                <a:ea typeface="+mj-ea"/>
+                <a:cs typeface="+mj-cs"/>
+              </a:defRPr>
+            </a:lvl1pPr>
+          </a:lstStyle>
+          <a:p>
+            <a:pPr algn="ctr"/>
+            <a:r>
+              <a:rPr lang="it-IT" sz="5200" dirty="0"/>
+              <a:t>Manipolatore di Stanford</a:t>
+            </a:r>
+          </a:p>
+          <a:p>
+            <a:pPr algn="ctr"/>
+            <a:r>
+              <a:rPr lang="it-IT" sz="3800" dirty="0"/>
+              <a:t>Controllore </a:t>
+            </a:r>
+            <a:r>
+              <a:rPr lang="it-IT" sz="3800" dirty="0" err="1"/>
+              <a:t>Adaptive</a:t>
+            </a:r>
+            <a:r>
+              <a:rPr lang="it-IT" sz="3800" dirty="0"/>
+              <a:t> </a:t>
+            </a:r>
+            <a:r>
+              <a:rPr lang="it-IT" sz="3800" dirty="0" err="1"/>
+              <a:t>Computed</a:t>
+            </a:r>
+            <a:r>
+              <a:rPr lang="it-IT" sz="3800" dirty="0"/>
+              <a:t> Torque</a:t>
+            </a:r>
+          </a:p>
+        </p:txBody>
+      </p:sp>
+      <p:pic>
+        <p:nvPicPr>
+          <p:cNvPr id="13" name="Immagine 12">
+            <a:extLst>
+              <a:ext uri="{FF2B5EF4-FFF2-40B4-BE49-F238E27FC236}">
+                <a16:creationId xmlns:a16="http://schemas.microsoft.com/office/drawing/2014/main" id="{60A9E923-5377-204D-A79A-4E3EC60EC036}"/>
+              </a:ext>
+            </a:extLst>
+          </p:cNvPr>
+          <p:cNvPicPr>
+            <a:picLocks noChangeAspect="1"/>
+          </p:cNvPicPr>
+          <p:nvPr/>
+        </p:nvPicPr>
+        <p:blipFill>
+          <a:blip r:embed="rId2"/>
+          <a:stretch>
+            <a:fillRect/>
+          </a:stretch>
+        </p:blipFill>
+        <p:spPr>
+          <a:xfrm>
+            <a:off x="8864312" y="4182110"/>
+            <a:ext cx="1460500" cy="304800"/>
+          </a:xfrm>
+          <a:prstGeom prst="rect">
+            <a:avLst/>
+          </a:prstGeom>
+        </p:spPr>
+      </p:pic>
+      <p:pic>
+        <p:nvPicPr>
+          <p:cNvPr id="15" name="Immagine 14">
+            <a:extLst>
+              <a:ext uri="{FF2B5EF4-FFF2-40B4-BE49-F238E27FC236}">
+                <a16:creationId xmlns:a16="http://schemas.microsoft.com/office/drawing/2014/main" id="{071058FC-0B93-E147-A0EA-71411EBAC8D3}"/>
+              </a:ext>
+            </a:extLst>
+          </p:cNvPr>
+          <p:cNvPicPr>
+            <a:picLocks noChangeAspect="1"/>
+          </p:cNvPicPr>
+          <p:nvPr/>
+        </p:nvPicPr>
+        <p:blipFill>
+          <a:blip r:embed="rId3"/>
+          <a:stretch>
+            <a:fillRect/>
+          </a:stretch>
+        </p:blipFill>
+        <p:spPr>
+          <a:xfrm>
+            <a:off x="7829262" y="3146430"/>
+            <a:ext cx="1765300" cy="647700"/>
+          </a:xfrm>
+          <a:prstGeom prst="rect">
+            <a:avLst/>
+          </a:prstGeom>
+        </p:spPr>
+      </p:pic>
+      <p:pic>
+        <p:nvPicPr>
+          <p:cNvPr id="17" name="Immagine 16">
+            <a:extLst>
+              <a:ext uri="{FF2B5EF4-FFF2-40B4-BE49-F238E27FC236}">
+                <a16:creationId xmlns:a16="http://schemas.microsoft.com/office/drawing/2014/main" id="{7E59E54C-4FB5-5E49-9D4A-B67F723DF438}"/>
+              </a:ext>
+            </a:extLst>
+          </p:cNvPr>
+          <p:cNvPicPr>
+            <a:picLocks noChangeAspect="1"/>
+          </p:cNvPicPr>
+          <p:nvPr/>
+        </p:nvPicPr>
+        <p:blipFill>
+          <a:blip r:embed="rId4"/>
+          <a:stretch>
+            <a:fillRect/>
+          </a:stretch>
+        </p:blipFill>
+        <p:spPr>
+          <a:xfrm>
+            <a:off x="10004186" y="3146430"/>
+            <a:ext cx="952500" cy="635000"/>
+          </a:xfrm>
+          <a:prstGeom prst="rect">
+            <a:avLst/>
+          </a:prstGeom>
+        </p:spPr>
+      </p:pic>
+      <p:pic>
+        <p:nvPicPr>
+          <p:cNvPr id="19" name="Immagine 18">
+            <a:extLst>
+              <a:ext uri="{FF2B5EF4-FFF2-40B4-BE49-F238E27FC236}">
+                <a16:creationId xmlns:a16="http://schemas.microsoft.com/office/drawing/2014/main" id="{909B45EB-77AF-1845-8667-F637DFBD7C45}"/>
+              </a:ext>
+            </a:extLst>
+          </p:cNvPr>
+          <p:cNvPicPr>
+            <a:picLocks noChangeAspect="1"/>
+          </p:cNvPicPr>
+          <p:nvPr/>
+        </p:nvPicPr>
+        <p:blipFill>
+          <a:blip r:embed="rId5"/>
+          <a:stretch>
+            <a:fillRect/>
+          </a:stretch>
+        </p:blipFill>
+        <p:spPr>
+          <a:xfrm>
+            <a:off x="8851612" y="4688278"/>
+            <a:ext cx="1485900" cy="330200"/>
+          </a:xfrm>
+          <a:prstGeom prst="rect">
+            <a:avLst/>
+          </a:prstGeom>
+        </p:spPr>
+      </p:pic>
+      <p:pic>
+        <p:nvPicPr>
+          <p:cNvPr id="21" name="Immagine 20">
+            <a:extLst>
+              <a:ext uri="{FF2B5EF4-FFF2-40B4-BE49-F238E27FC236}">
+                <a16:creationId xmlns:a16="http://schemas.microsoft.com/office/drawing/2014/main" id="{628AF90A-A29E-6445-9513-C1B6ABAFF429}"/>
+              </a:ext>
+            </a:extLst>
+          </p:cNvPr>
+          <p:cNvPicPr>
+            <a:picLocks noChangeAspect="1"/>
+          </p:cNvPicPr>
+          <p:nvPr/>
+        </p:nvPicPr>
+        <p:blipFill>
+          <a:blip r:embed="rId6"/>
+          <a:stretch>
+            <a:fillRect/>
+          </a:stretch>
+        </p:blipFill>
+        <p:spPr>
+          <a:xfrm>
+            <a:off x="8718262" y="5219846"/>
+            <a:ext cx="1752600" cy="368300"/>
+          </a:xfrm>
+          <a:prstGeom prst="rect">
+            <a:avLst/>
+          </a:prstGeom>
+        </p:spPr>
+      </p:pic>
+      <p:pic>
+        <p:nvPicPr>
+          <p:cNvPr id="23" name="Immagine 22">
+            <a:extLst>
+              <a:ext uri="{FF2B5EF4-FFF2-40B4-BE49-F238E27FC236}">
+                <a16:creationId xmlns:a16="http://schemas.microsoft.com/office/drawing/2014/main" id="{23446BB1-0E7F-814F-9D19-AD5F0370A687}"/>
+              </a:ext>
+            </a:extLst>
+          </p:cNvPr>
+          <p:cNvPicPr>
+            <a:picLocks noChangeAspect="1"/>
+          </p:cNvPicPr>
+          <p:nvPr/>
+        </p:nvPicPr>
+        <p:blipFill>
+          <a:blip r:embed="rId7"/>
+          <a:stretch>
+            <a:fillRect/>
+          </a:stretch>
+        </p:blipFill>
+        <p:spPr>
+          <a:xfrm>
+            <a:off x="4362737" y="1460379"/>
+            <a:ext cx="3466525" cy="1017350"/>
+          </a:xfrm>
+          <a:prstGeom prst="rect">
+            <a:avLst/>
+          </a:prstGeom>
+        </p:spPr>
+      </p:pic>
+      <p:pic>
+        <p:nvPicPr>
+          <p:cNvPr id="25" name="Immagine 24">
+            <a:extLst>
+              <a:ext uri="{FF2B5EF4-FFF2-40B4-BE49-F238E27FC236}">
+                <a16:creationId xmlns:a16="http://schemas.microsoft.com/office/drawing/2014/main" id="{C0D593BF-8506-BC48-B81C-820693CDC4EB}"/>
+              </a:ext>
+            </a:extLst>
+          </p:cNvPr>
+          <p:cNvPicPr>
+            <a:picLocks noChangeAspect="1"/>
+          </p:cNvPicPr>
+          <p:nvPr/>
+        </p:nvPicPr>
+        <p:blipFill>
+          <a:blip r:embed="rId8"/>
+          <a:stretch>
+            <a:fillRect/>
+          </a:stretch>
+        </p:blipFill>
+        <p:spPr>
+          <a:xfrm>
+            <a:off x="800002" y="2623916"/>
+            <a:ext cx="6553200" cy="1625600"/>
+          </a:xfrm>
+          <a:prstGeom prst="rect">
+            <a:avLst/>
+          </a:prstGeom>
+        </p:spPr>
+      </p:pic>
+      <p:pic>
+        <p:nvPicPr>
+          <p:cNvPr id="27" name="Immagine 26">
+            <a:extLst>
+              <a:ext uri="{FF2B5EF4-FFF2-40B4-BE49-F238E27FC236}">
+                <a16:creationId xmlns:a16="http://schemas.microsoft.com/office/drawing/2014/main" id="{2BDB62C0-4D44-BF4C-B26B-2ED4661C33F9}"/>
+              </a:ext>
+            </a:extLst>
+          </p:cNvPr>
+          <p:cNvPicPr>
+            <a:picLocks noChangeAspect="1"/>
+          </p:cNvPicPr>
+          <p:nvPr/>
+        </p:nvPicPr>
+        <p:blipFill>
+          <a:blip r:embed="rId9"/>
+          <a:stretch>
+            <a:fillRect/>
+          </a:stretch>
+        </p:blipFill>
+        <p:spPr>
+          <a:xfrm>
+            <a:off x="800002" y="4395703"/>
+            <a:ext cx="5181600" cy="1638300"/>
+          </a:xfrm>
+          <a:prstGeom prst="rect">
+            <a:avLst/>
+          </a:prstGeom>
+        </p:spPr>
+      </p:pic>
+    </p:spTree>
+    <p:extLst>
+      <p:ext uri="{BB962C8B-B14F-4D97-AF65-F5344CB8AC3E}">
+        <p14:creationId xmlns:p14="http://schemas.microsoft.com/office/powerpoint/2010/main" val="3511369780"/>
+      </p:ext>
+    </p:extLst>
+  </p:cSld>
+  <p:clrMapOvr>
+    <a:masterClrMapping/>
+  </p:clrMapOvr>
+</p:sld>
+</file>
+
+<file path=ppt/slides/slide13.xml><?xml version="1.0" encoding="utf-8"?>
+<p:sld xmlns:a="http://schemas.openxmlformats.org/drawingml/2006/main" xmlns:r="http://schemas.openxmlformats.org/officeDocument/2006/relationships" xmlns:p="http://schemas.openxmlformats.org/presentationml/2006/main">
+  <p:cSld>
+    <p:spTree>
+      <p:nvGrpSpPr>
+        <p:cNvPr id="1" name=""/>
+        <p:cNvGrpSpPr/>
+        <p:nvPr/>
+      </p:nvGrpSpPr>
+      <p:grpSpPr>
+        <a:xfrm>
+          <a:off x="0" y="0"/>
+          <a:ext cx="0" cy="0"/>
+          <a:chOff x="0" y="0"/>
+          <a:chExt cx="0" cy="0"/>
+        </a:xfrm>
+      </p:grpSpPr>
+      <p:sp>
+        <p:nvSpPr>
+          <p:cNvPr id="5" name="Titolo 1">
+            <a:extLst>
+              <a:ext uri="{FF2B5EF4-FFF2-40B4-BE49-F238E27FC236}">
+                <a16:creationId xmlns:a16="http://schemas.microsoft.com/office/drawing/2014/main" id="{719936BE-0F9D-C74E-9E55-A7F2CE751F93}"/>
+              </a:ext>
+            </a:extLst>
+          </p:cNvPr>
+          <p:cNvSpPr txBox="1">
+            <a:spLocks/>
+          </p:cNvSpPr>
+          <p:nvPr/>
+        </p:nvSpPr>
+        <p:spPr>
+          <a:xfrm>
+            <a:off x="1524000" y="454393"/>
+            <a:ext cx="9144000" cy="1021230"/>
+          </a:xfrm>
+          <a:prstGeom prst="rect">
+            <a:avLst/>
+          </a:prstGeom>
+        </p:spPr>
+        <p:txBody>
+          <a:bodyPr vert="horz" lIns="91440" tIns="45720" rIns="91440" bIns="45720" rtlCol="0" anchor="ctr">
+            <a:normAutofit fontScale="85000" lnSpcReduction="20000"/>
+          </a:bodyPr>
+          <a:lstStyle>
+            <a:lvl1pPr algn="l" defTabSz="914400" rtl="0" eaLnBrk="1" latinLnBrk="0" hangingPunct="1">
+              <a:lnSpc>
+                <a:spcPct val="90000"/>
+              </a:lnSpc>
+              <a:spcBef>
+                <a:spcPct val="0"/>
+              </a:spcBef>
+              <a:buNone/>
+              <a:defRPr sz="4400" kern="1200">
+                <a:solidFill>
+                  <a:schemeClr val="tx1"/>
+                </a:solidFill>
+                <a:latin typeface="+mj-lt"/>
+                <a:ea typeface="+mj-ea"/>
+                <a:cs typeface="+mj-cs"/>
+              </a:defRPr>
+            </a:lvl1pPr>
+          </a:lstStyle>
+          <a:p>
+            <a:pPr algn="ctr"/>
+            <a:r>
+              <a:rPr lang="it-IT" sz="5200" dirty="0"/>
+              <a:t>Manipolatore di Stanford</a:t>
+            </a:r>
+          </a:p>
+          <a:p>
+            <a:pPr algn="ctr"/>
+            <a:r>
+              <a:rPr lang="it-IT" sz="3800" dirty="0"/>
+              <a:t>Controllore </a:t>
+            </a:r>
+            <a:r>
+              <a:rPr lang="it-IT" sz="3800" dirty="0" err="1"/>
+              <a:t>Adaptive</a:t>
+            </a:r>
+            <a:r>
+              <a:rPr lang="it-IT" sz="3800" dirty="0"/>
+              <a:t> </a:t>
+            </a:r>
+            <a:r>
+              <a:rPr lang="it-IT" sz="3800" dirty="0" err="1"/>
+              <a:t>Computed</a:t>
+            </a:r>
+            <a:r>
+              <a:rPr lang="it-IT" sz="3800" dirty="0"/>
+              <a:t> Torque</a:t>
+            </a:r>
+          </a:p>
+        </p:txBody>
+      </p:sp>
+      <p:pic>
+        <p:nvPicPr>
+          <p:cNvPr id="11" name="Immagine 10">
+            <a:extLst>
+              <a:ext uri="{FF2B5EF4-FFF2-40B4-BE49-F238E27FC236}">
+                <a16:creationId xmlns:a16="http://schemas.microsoft.com/office/drawing/2014/main" id="{24474708-2AD1-E242-B19A-0598DECCEB08}"/>
+              </a:ext>
+            </a:extLst>
+          </p:cNvPr>
+          <p:cNvPicPr>
+            <a:picLocks noChangeAspect="1"/>
+          </p:cNvPicPr>
+          <p:nvPr/>
+        </p:nvPicPr>
+        <p:blipFill>
+          <a:blip r:embed="rId2"/>
+          <a:stretch>
+            <a:fillRect/>
+          </a:stretch>
+        </p:blipFill>
+        <p:spPr>
+          <a:xfrm>
+            <a:off x="449942" y="1475623"/>
+            <a:ext cx="5689600" cy="4267200"/>
+          </a:xfrm>
+          <a:prstGeom prst="rect">
+            <a:avLst/>
+          </a:prstGeom>
+        </p:spPr>
+      </p:pic>
+      <p:pic>
+        <p:nvPicPr>
+          <p:cNvPr id="13" name="Immagine 12">
+            <a:extLst>
+              <a:ext uri="{FF2B5EF4-FFF2-40B4-BE49-F238E27FC236}">
+                <a16:creationId xmlns:a16="http://schemas.microsoft.com/office/drawing/2014/main" id="{466A2D65-C0B0-0C42-93AC-8B75F09EF259}"/>
+              </a:ext>
+            </a:extLst>
+          </p:cNvPr>
+          <p:cNvPicPr>
+            <a:picLocks noChangeAspect="1"/>
+          </p:cNvPicPr>
+          <p:nvPr/>
+        </p:nvPicPr>
+        <p:blipFill>
+          <a:blip r:embed="rId3"/>
+          <a:stretch>
+            <a:fillRect/>
+          </a:stretch>
+        </p:blipFill>
+        <p:spPr>
+          <a:xfrm>
+            <a:off x="6139542" y="1490137"/>
+            <a:ext cx="5689600" cy="4267200"/>
+          </a:xfrm>
+          <a:prstGeom prst="rect">
+            <a:avLst/>
+          </a:prstGeom>
+        </p:spPr>
+      </p:pic>
+    </p:spTree>
+    <p:extLst>
+      <p:ext uri="{BB962C8B-B14F-4D97-AF65-F5344CB8AC3E}">
+        <p14:creationId xmlns:p14="http://schemas.microsoft.com/office/powerpoint/2010/main" val="2471295502"/>
+      </p:ext>
+    </p:extLst>
+  </p:cSld>
+  <p:clrMapOvr>
+    <a:masterClrMapping/>
+  </p:clrMapOvr>
+</p:sld>
+</file>
+
+<file path=ppt/slides/slide14.xml><?xml version="1.0" encoding="utf-8"?>
+<p:sld xmlns:a="http://schemas.openxmlformats.org/drawingml/2006/main" xmlns:r="http://schemas.openxmlformats.org/officeDocument/2006/relationships" xmlns:p="http://schemas.openxmlformats.org/presentationml/2006/main">
+  <p:cSld>
+    <p:spTree>
+      <p:nvGrpSpPr>
+        <p:cNvPr id="1" name=""/>
+        <p:cNvGrpSpPr/>
+        <p:nvPr/>
+      </p:nvGrpSpPr>
+      <p:grpSpPr>
+        <a:xfrm>
+          <a:off x="0" y="0"/>
+          <a:ext cx="0" cy="0"/>
+          <a:chOff x="0" y="0"/>
+          <a:chExt cx="0" cy="0"/>
+        </a:xfrm>
+      </p:grpSpPr>
+      <p:sp>
+        <p:nvSpPr>
+          <p:cNvPr id="5" name="Titolo 1">
+            <a:extLst>
+              <a:ext uri="{FF2B5EF4-FFF2-40B4-BE49-F238E27FC236}">
+                <a16:creationId xmlns:a16="http://schemas.microsoft.com/office/drawing/2014/main" id="{719936BE-0F9D-C74E-9E55-A7F2CE751F93}"/>
+              </a:ext>
+            </a:extLst>
+          </p:cNvPr>
+          <p:cNvSpPr txBox="1">
+            <a:spLocks/>
+          </p:cNvSpPr>
+          <p:nvPr/>
+        </p:nvSpPr>
+        <p:spPr>
+          <a:xfrm>
+            <a:off x="1524000" y="454393"/>
+            <a:ext cx="9144000" cy="1021230"/>
+          </a:xfrm>
+          <a:prstGeom prst="rect">
+            <a:avLst/>
+          </a:prstGeom>
+        </p:spPr>
+        <p:txBody>
+          <a:bodyPr vert="horz" lIns="91440" tIns="45720" rIns="91440" bIns="45720" rtlCol="0" anchor="ctr">
+            <a:normAutofit fontScale="85000" lnSpcReduction="20000"/>
+          </a:bodyPr>
+          <a:lstStyle>
+            <a:lvl1pPr algn="l" defTabSz="914400" rtl="0" eaLnBrk="1" latinLnBrk="0" hangingPunct="1">
+              <a:lnSpc>
+                <a:spcPct val="90000"/>
+              </a:lnSpc>
+              <a:spcBef>
+                <a:spcPct val="0"/>
+              </a:spcBef>
+              <a:buNone/>
+              <a:defRPr sz="4400" kern="1200">
+                <a:solidFill>
+                  <a:schemeClr val="tx1"/>
+                </a:solidFill>
+                <a:latin typeface="+mj-lt"/>
+                <a:ea typeface="+mj-ea"/>
+                <a:cs typeface="+mj-cs"/>
+              </a:defRPr>
+            </a:lvl1pPr>
+          </a:lstStyle>
+          <a:p>
+            <a:pPr algn="ctr"/>
+            <a:r>
+              <a:rPr lang="it-IT" sz="5200" dirty="0"/>
+              <a:t>Manipolatore di Stanford</a:t>
+            </a:r>
+          </a:p>
+          <a:p>
+            <a:pPr algn="ctr"/>
+            <a:r>
+              <a:rPr lang="it-IT" sz="3800" dirty="0"/>
+              <a:t>Controllore </a:t>
+            </a:r>
+            <a:r>
+              <a:rPr lang="it-IT" sz="3800" dirty="0" err="1"/>
+              <a:t>Adaptive</a:t>
+            </a:r>
+            <a:r>
+              <a:rPr lang="it-IT" sz="3800" dirty="0"/>
+              <a:t> </a:t>
+            </a:r>
+            <a:r>
+              <a:rPr lang="it-IT" sz="3800" dirty="0" err="1"/>
+              <a:t>Computed</a:t>
+            </a:r>
+            <a:r>
+              <a:rPr lang="it-IT" sz="3800" dirty="0"/>
+              <a:t> Torque</a:t>
+            </a:r>
+          </a:p>
+        </p:txBody>
+      </p:sp>
+      <p:pic>
+        <p:nvPicPr>
+          <p:cNvPr id="3" name="Immagine 2">
+            <a:extLst>
+              <a:ext uri="{FF2B5EF4-FFF2-40B4-BE49-F238E27FC236}">
+                <a16:creationId xmlns:a16="http://schemas.microsoft.com/office/drawing/2014/main" id="{74E89475-B59D-504D-90BC-910774DF4D8D}"/>
+              </a:ext>
+            </a:extLst>
+          </p:cNvPr>
+          <p:cNvPicPr>
+            <a:picLocks noChangeAspect="1"/>
+          </p:cNvPicPr>
+          <p:nvPr/>
+        </p:nvPicPr>
+        <p:blipFill>
+          <a:blip r:embed="rId2"/>
+          <a:stretch>
+            <a:fillRect/>
+          </a:stretch>
+        </p:blipFill>
+        <p:spPr>
+          <a:xfrm>
+            <a:off x="6019800" y="1661318"/>
+            <a:ext cx="5689600" cy="4165600"/>
+          </a:xfrm>
+          <a:prstGeom prst="rect">
+            <a:avLst/>
+          </a:prstGeom>
+        </p:spPr>
+      </p:pic>
+      <mc:AlternateContent xmlns:mc="http://schemas.openxmlformats.org/markup-compatibility/2006">
+        <mc:Choice xmlns:a14="http://schemas.microsoft.com/office/drawing/2010/main" Requires="a14">
+          <p:sp>
+            <p:nvSpPr>
+              <p:cNvPr id="16" name="Segnaposto contenuto 15">
+                <a:extLst>
+                  <a:ext uri="{FF2B5EF4-FFF2-40B4-BE49-F238E27FC236}">
+                    <a16:creationId xmlns:a16="http://schemas.microsoft.com/office/drawing/2014/main" id="{59F08C5F-D064-2A46-AA68-087EEE840A08}"/>
+                  </a:ext>
+                </a:extLst>
+              </p:cNvPr>
+              <p:cNvSpPr>
+                <a:spLocks noGrp="1"/>
+              </p:cNvSpPr>
+              <p:nvPr>
+                <p:ph sz="half" idx="1"/>
+              </p:nvPr>
+            </p:nvSpPr>
+            <p:spPr>
+              <a:xfrm>
+                <a:off x="838200" y="1825625"/>
+                <a:ext cx="5181600" cy="4001293"/>
+              </a:xfrm>
+            </p:spPr>
+            <p:txBody>
+              <a:bodyPr/>
+              <a:lstStyle/>
+              <a:p>
+                <a:pPr marL="0" indent="0">
+                  <a:buNone/>
+                </a:pPr>
+                <a:r>
+                  <a:rPr lang="it-IT" sz="1800" dirty="0"/>
+                  <a:t>Il </a:t>
+                </a:r>
+                <a:r>
+                  <a:rPr lang="it-IT" sz="1800" dirty="0" err="1"/>
+                  <a:t>regressore</a:t>
+                </a:r>
+                <a:r>
+                  <a:rPr lang="it-IT" sz="1800" dirty="0"/>
+                  <a:t> dinamico è stato calcolato estrapolando il parametro m</a:t>
+                </a:r>
+                <a:r>
+                  <a:rPr lang="it-IT" sz="1800" baseline="-25000" dirty="0"/>
+                  <a:t>6</a:t>
+                </a:r>
+                <a:r>
+                  <a:rPr lang="it-IT" sz="1800" dirty="0"/>
+                  <a:t> dalle equazioni della dinamica, utilizzando come vettore dei parametri</a:t>
+                </a:r>
+              </a:p>
+              <a:p>
+                <a:pPr marL="0" indent="0">
+                  <a:buNone/>
+                </a:pPr>
+                <a14:m>
+                  <m:oMathPara xmlns:m="http://schemas.openxmlformats.org/officeDocument/2006/math">
+                    <m:oMathParaPr>
+                      <m:jc m:val="centerGroup"/>
+                    </m:oMathParaPr>
+                    <m:oMath xmlns:m="http://schemas.openxmlformats.org/officeDocument/2006/math">
+                      <m:r>
+                        <a:rPr lang="el-GR" sz="1800" i="1" smtClean="0">
+                          <a:latin typeface="Cambria Math" panose="02040503050406030204" pitchFamily="18" charset="0"/>
+                        </a:rPr>
+                        <m:t>𝜋</m:t>
+                      </m:r>
+                      <m:r>
+                        <a:rPr lang="it-IT" sz="1800" b="0" i="1" smtClean="0">
+                          <a:latin typeface="Cambria Math" panose="02040503050406030204" pitchFamily="18" charset="0"/>
+                        </a:rPr>
+                        <m:t>= </m:t>
+                      </m:r>
+                      <m:d>
+                        <m:dPr>
+                          <m:begChr m:val="["/>
+                          <m:endChr m:val="]"/>
+                          <m:ctrlPr>
+                            <a:rPr lang="it-IT" sz="1800" b="0" i="1" smtClean="0">
+                              <a:latin typeface="Cambria Math" panose="02040503050406030204" pitchFamily="18" charset="0"/>
+                            </a:rPr>
+                          </m:ctrlPr>
+                        </m:dPr>
+                        <m:e>
+                          <m:m>
+                            <m:mPr>
+                              <m:mcs>
+                                <m:mc>
+                                  <m:mcPr>
+                                    <m:count m:val="1"/>
+                                    <m:mcJc m:val="center"/>
+                                  </m:mcPr>
+                                </m:mc>
+                              </m:mcs>
+                              <m:ctrlPr>
+                                <a:rPr lang="it-IT" sz="1800" i="1">
+                                  <a:latin typeface="Cambria Math" panose="02040503050406030204" pitchFamily="18" charset="0"/>
+                                </a:rPr>
+                              </m:ctrlPr>
+                            </m:mPr>
+                            <m:mr>
+                              <m:e>
+                                <m:r>
+                                  <m:rPr>
+                                    <m:brk m:alnAt="7"/>
+                                  </m:rPr>
+                                  <a:rPr lang="it-IT" sz="1800" i="1">
+                                    <a:latin typeface="Cambria Math" panose="02040503050406030204" pitchFamily="18" charset="0"/>
+                                  </a:rPr>
+                                  <m:t>𝑚</m:t>
+                                </m:r>
+                                <m:r>
+                                  <a:rPr lang="it-IT" sz="1800" i="1" baseline="-25000">
+                                    <a:latin typeface="Cambria Math" panose="02040503050406030204" pitchFamily="18" charset="0"/>
+                                  </a:rPr>
+                                  <m:t>6</m:t>
+                                </m:r>
+                              </m:e>
+                            </m:mr>
+                            <m:mr>
+                              <m:e>
+                                <m:r>
+                                  <a:rPr lang="it-IT" sz="1800" i="1">
+                                    <a:latin typeface="Cambria Math" panose="02040503050406030204" pitchFamily="18" charset="0"/>
+                                  </a:rPr>
+                                  <m:t>1</m:t>
+                                </m:r>
+                              </m:e>
+                            </m:mr>
+                          </m:m>
+                        </m:e>
+                      </m:d>
+                    </m:oMath>
+                  </m:oMathPara>
+                </a14:m>
+                <a:endParaRPr lang="it-IT" sz="1800" dirty="0"/>
+              </a:p>
+              <a:p>
+                <a:pPr marL="0" indent="0">
+                  <a:buNone/>
+                </a:pPr>
+                <a:r>
+                  <a:rPr lang="it-IT" sz="1800" dirty="0"/>
+                  <a:t>Inizializzando il vettore di parametri dinamici stimati come </a:t>
+                </a:r>
+                <a14:m>
+                  <m:oMath xmlns:m="http://schemas.openxmlformats.org/officeDocument/2006/math">
+                    <m:acc>
+                      <m:accPr>
+                        <m:chr m:val="̂"/>
+                        <m:ctrlPr>
+                          <a:rPr lang="it-IT" sz="1800" i="1" smtClean="0">
+                            <a:latin typeface="Cambria Math" panose="02040503050406030204" pitchFamily="18" charset="0"/>
+                          </a:rPr>
+                        </m:ctrlPr>
+                      </m:accPr>
+                      <m:e>
+                        <m:r>
+                          <a:rPr lang="el-GR" sz="1800" i="1">
+                            <a:latin typeface="Cambria Math" panose="02040503050406030204" pitchFamily="18" charset="0"/>
+                          </a:rPr>
+                          <m:t>𝜋</m:t>
+                        </m:r>
+                      </m:e>
+                    </m:acc>
+                    <m:r>
+                      <a:rPr lang="it-IT" sz="1800" b="0" i="1" smtClean="0">
+                        <a:latin typeface="Cambria Math" panose="02040503050406030204" pitchFamily="18" charset="0"/>
+                      </a:rPr>
+                      <m:t>=</m:t>
+                    </m:r>
+                    <m:d>
+                      <m:dPr>
+                        <m:begChr m:val="["/>
+                        <m:endChr m:val="]"/>
+                        <m:ctrlPr>
+                          <a:rPr lang="it-IT" sz="1800" i="1">
+                            <a:latin typeface="Cambria Math" panose="02040503050406030204" pitchFamily="18" charset="0"/>
+                          </a:rPr>
+                        </m:ctrlPr>
+                      </m:dPr>
+                      <m:e>
+                        <m:m>
+                          <m:mPr>
+                            <m:mcs>
+                              <m:mc>
+                                <m:mcPr>
+                                  <m:count m:val="1"/>
+                                  <m:mcJc m:val="center"/>
+                                </m:mcPr>
+                              </m:mc>
+                            </m:mcs>
+                            <m:ctrlPr>
+                              <a:rPr lang="it-IT" sz="1800" i="1" smtClean="0">
+                                <a:latin typeface="Cambria Math" panose="02040503050406030204" pitchFamily="18" charset="0"/>
+                              </a:rPr>
+                            </m:ctrlPr>
+                          </m:mPr>
+                          <m:mr>
+                            <m:e>
+                              <m:r>
+                                <m:rPr>
+                                  <m:brk m:alnAt="7"/>
+                                </m:rPr>
+                                <a:rPr lang="it-IT" sz="1800" b="0" i="1" smtClean="0">
+                                  <a:latin typeface="Cambria Math" panose="02040503050406030204" pitchFamily="18" charset="0"/>
+                                </a:rPr>
+                                <m:t>3</m:t>
+                              </m:r>
+                            </m:e>
+                          </m:mr>
+                          <m:mr>
+                            <m:e>
+                              <m:r>
+                                <a:rPr lang="it-IT" sz="1800" i="1">
+                                  <a:latin typeface="Cambria Math" panose="02040503050406030204" pitchFamily="18" charset="0"/>
+                                </a:rPr>
+                                <m:t>1</m:t>
+                              </m:r>
+                            </m:e>
+                          </m:mr>
+                        </m:m>
+                      </m:e>
+                    </m:d>
+                  </m:oMath>
+                </a14:m>
+                <a:r>
+                  <a:rPr lang="it-IT" sz="1800" dirty="0"/>
+                  <a:t> il risultato atteso era che il segnale giallo riportato nella figura accanto assumesse valore finale pari a m</a:t>
+                </a:r>
+                <a:r>
+                  <a:rPr lang="it-IT" sz="1800" baseline="-25000" dirty="0"/>
+                  <a:t>6</a:t>
+                </a:r>
+                <a:r>
+                  <a:rPr lang="it-IT" sz="1800" dirty="0"/>
+                  <a:t> per effetto della componente adattiva del controllore stesso. Nonostante il </a:t>
+                </a:r>
+                <a:r>
+                  <a:rPr lang="it-IT" sz="1800" dirty="0" err="1"/>
+                  <a:t>tuning</a:t>
+                </a:r>
+                <a:r>
+                  <a:rPr lang="it-IT" sz="1800" dirty="0"/>
+                  <a:t> delle matrici utilizzate per l’adattamento questo comportamento atteso non si è verificato.</a:t>
+                </a:r>
+                <a:endParaRPr lang="it-IT" sz="1800" baseline="-25000" dirty="0"/>
+              </a:p>
+              <a:p>
+                <a:pPr marL="0" indent="0">
+                  <a:buNone/>
+                </a:pPr>
+                <a:endParaRPr lang="it-IT" dirty="0"/>
+              </a:p>
+            </p:txBody>
+          </p:sp>
+        </mc:Choice>
+        <mc:Fallback>
+          <p:sp>
+            <p:nvSpPr>
+              <p:cNvPr id="16" name="Segnaposto contenuto 15">
+                <a:extLst>
+                  <a:ext uri="{FF2B5EF4-FFF2-40B4-BE49-F238E27FC236}">
+                    <a16:creationId xmlns:a16="http://schemas.microsoft.com/office/drawing/2014/main" id="{59F08C5F-D064-2A46-AA68-087EEE840A08}"/>
+                  </a:ext>
+                </a:extLst>
+              </p:cNvPr>
+              <p:cNvSpPr>
+                <a:spLocks noGrp="1" noRot="1" noChangeAspect="1" noMove="1" noResize="1" noEditPoints="1" noAdjustHandles="1" noChangeArrowheads="1" noChangeShapeType="1" noTextEdit="1"/>
+              </p:cNvSpPr>
+              <p:nvPr>
+                <p:ph sz="half" idx="1"/>
+              </p:nvPr>
+            </p:nvSpPr>
+            <p:spPr>
+              <a:xfrm>
+                <a:off x="838200" y="1825625"/>
+                <a:ext cx="5181600" cy="4001293"/>
+              </a:xfrm>
+              <a:blipFill>
+                <a:blip r:embed="rId3"/>
+                <a:stretch>
+                  <a:fillRect l="-978" t="-1587" r="-1467"/>
+                </a:stretch>
+              </a:blipFill>
+            </p:spPr>
+            <p:txBody>
+              <a:bodyPr/>
+              <a:lstStyle/>
+              <a:p>
+                <a:r>
+                  <a:rPr lang="it-IT">
+                    <a:noFill/>
+                  </a:rPr>
+                  <a:t> </a:t>
+                </a:r>
+              </a:p>
+            </p:txBody>
+          </p:sp>
+        </mc:Fallback>
+      </mc:AlternateContent>
+    </p:spTree>
+    <p:extLst>
+      <p:ext uri="{BB962C8B-B14F-4D97-AF65-F5344CB8AC3E}">
+        <p14:creationId xmlns:p14="http://schemas.microsoft.com/office/powerpoint/2010/main" val="3008735334"/>
       </p:ext>
     </p:extLst>
   </p:cSld>
@@ -3479,7 +4803,7 @@
           <a:p>
             <a:fld id="{4EF59023-6175-3944-979D-CFE35E3A8267}" type="datetime1">
               <a:rPr lang="it-IT" smtClean="0"/>
-              <a:t>18/04/21</a:t>
+              <a:t>07/05/21</a:t>
             </a:fld>
             <a:endParaRPr lang="en-US" dirty="0"/>
           </a:p>
@@ -3967,8 +5291,8 @@
           </a:p>
         </p:txBody>
       </p:sp>
-      <mc:AlternateContent xmlns:mc="http://schemas.openxmlformats.org/markup-compatibility/2006">
-        <mc:Choice xmlns:a14="http://schemas.microsoft.com/office/drawing/2010/main" Requires="a14">
+      <mc:AlternateContent xmlns:mc="http://schemas.openxmlformats.org/markup-compatibility/2006" xmlns:a14="http://schemas.microsoft.com/office/drawing/2010/main">
+        <mc:Choice Requires="a14">
           <p:graphicFrame>
             <p:nvGraphicFramePr>
               <p:cNvPr id="9" name="Tabella 8">
@@ -4892,7 +6216,7 @@
             </a:graphic>
           </p:graphicFrame>
         </mc:Choice>
-        <mc:Fallback>
+        <mc:Fallback xmlns="">
           <p:graphicFrame>
             <p:nvGraphicFramePr>
               <p:cNvPr id="9" name="Tabella 8">
@@ -5841,8 +7165,8 @@
         </p:nvSpPr>
         <p:spPr>
           <a:xfrm>
-            <a:off x="1071564" y="1475623"/>
-            <a:ext cx="3287830" cy="4247317"/>
+            <a:off x="1071563" y="1475624"/>
+            <a:ext cx="7739271" cy="2031325"/>
           </a:xfrm>
           <a:prstGeom prst="rect">
             <a:avLst/>
@@ -5912,6 +7236,66 @@
           <a:xfrm>
             <a:off x="8810836" y="1303867"/>
             <a:ext cx="1857163" cy="1396471"/>
+          </a:xfrm>
+          <a:prstGeom prst="rect">
+            <a:avLst/>
+          </a:prstGeom>
+        </p:spPr>
+      </p:pic>
+      <p:pic>
+        <p:nvPicPr>
+          <p:cNvPr id="14" name="Immagine 13">
+            <a:extLst>
+              <a:ext uri="{FF2B5EF4-FFF2-40B4-BE49-F238E27FC236}">
+                <a16:creationId xmlns:a16="http://schemas.microsoft.com/office/drawing/2014/main" id="{B0DE0442-2B8A-8A4B-B1D7-C8E63CDAEB45}"/>
+              </a:ext>
+            </a:extLst>
+          </p:cNvPr>
+          <p:cNvPicPr>
+            <a:picLocks noChangeAspect="1"/>
+          </p:cNvPicPr>
+          <p:nvPr/>
+        </p:nvPicPr>
+        <p:blipFill>
+          <a:blip r:embed="rId3"/>
+          <a:stretch>
+            <a:fillRect/>
+          </a:stretch>
+        </p:blipFill>
+        <p:spPr>
+          <a:xfrm>
+            <a:off x="6155473" y="3506948"/>
+            <a:ext cx="4512526" cy="3030801"/>
+          </a:xfrm>
+          <a:prstGeom prst="rect">
+            <a:avLst/>
+          </a:prstGeom>
+        </p:spPr>
+      </p:pic>
+      <p:pic>
+        <p:nvPicPr>
+          <p:cNvPr id="16" name="Immagine 15">
+            <a:extLst>
+              <a:ext uri="{FF2B5EF4-FFF2-40B4-BE49-F238E27FC236}">
+                <a16:creationId xmlns:a16="http://schemas.microsoft.com/office/drawing/2014/main" id="{0BFFE1AB-6856-AF4E-9BAF-FDD9EB13B090}"/>
+              </a:ext>
+            </a:extLst>
+          </p:cNvPr>
+          <p:cNvPicPr>
+            <a:picLocks noChangeAspect="1"/>
+          </p:cNvPicPr>
+          <p:nvPr/>
+        </p:nvPicPr>
+        <p:blipFill>
+          <a:blip r:embed="rId4"/>
+          <a:stretch>
+            <a:fillRect/>
+          </a:stretch>
+        </p:blipFill>
+        <p:spPr>
+          <a:xfrm>
+            <a:off x="1784718" y="4412748"/>
+            <a:ext cx="3657600" cy="1219200"/>
           </a:xfrm>
           <a:prstGeom prst="rect">
             <a:avLst/>
@@ -5948,8 +7332,8 @@
           <a:chExt cx="0" cy="0"/>
         </a:xfrm>
       </p:grpSpPr>
-      <mc:AlternateContent xmlns:mc="http://schemas.openxmlformats.org/markup-compatibility/2006">
-        <mc:Choice xmlns:a14="http://schemas.microsoft.com/office/drawing/2010/main" Requires="a14">
+      <mc:AlternateContent xmlns:mc="http://schemas.openxmlformats.org/markup-compatibility/2006" xmlns:a14="http://schemas.microsoft.com/office/drawing/2010/main">
+        <mc:Choice Requires="a14">
           <p:sp>
             <p:nvSpPr>
               <p:cNvPr id="5" name="CasellaDiTesto 4">
@@ -6413,7 +7797,7 @@
             </p:txBody>
           </p:sp>
         </mc:Choice>
-        <mc:Fallback>
+        <mc:Fallback xmlns="">
           <p:sp>
             <p:nvSpPr>
               <p:cNvPr id="5" name="CasellaDiTesto 4">
@@ -6603,36 +7987,6 @@
           <a:chExt cx="0" cy="0"/>
         </a:xfrm>
       </p:grpSpPr>
-      <p:pic>
-        <p:nvPicPr>
-          <p:cNvPr id="7" name="Immagine 6">
-            <a:extLst>
-              <a:ext uri="{FF2B5EF4-FFF2-40B4-BE49-F238E27FC236}">
-                <a16:creationId xmlns:a16="http://schemas.microsoft.com/office/drawing/2014/main" id="{FCD1C28A-055B-1E4F-B551-82B60DEFB9D1}"/>
-              </a:ext>
-            </a:extLst>
-          </p:cNvPr>
-          <p:cNvPicPr>
-            <a:picLocks noChangeAspect="1"/>
-          </p:cNvPicPr>
-          <p:nvPr/>
-        </p:nvPicPr>
-        <p:blipFill>
-          <a:blip r:embed="rId2"/>
-          <a:stretch>
-            <a:fillRect/>
-          </a:stretch>
-        </p:blipFill>
-        <p:spPr>
-          <a:xfrm>
-            <a:off x="8322678" y="2839170"/>
-            <a:ext cx="2833477" cy="544263"/>
-          </a:xfrm>
-          <a:prstGeom prst="rect">
-            <a:avLst/>
-          </a:prstGeom>
-        </p:spPr>
-      </p:pic>
       <p:sp>
         <p:nvSpPr>
           <p:cNvPr id="8" name="Titolo 1">
@@ -6703,14 +8057,14 @@
           <p:nvPr/>
         </p:nvPicPr>
         <p:blipFill>
-          <a:blip r:embed="rId3"/>
+          <a:blip r:embed="rId2"/>
           <a:stretch>
             <a:fillRect/>
           </a:stretch>
         </p:blipFill>
         <p:spPr>
           <a:xfrm>
-            <a:off x="8810836" y="1303867"/>
+            <a:off x="8810837" y="1475623"/>
             <a:ext cx="1857163" cy="1396471"/>
           </a:xfrm>
           <a:prstGeom prst="rect">
@@ -6766,8 +8120,8 @@
         </p:nvSpPr>
         <p:spPr>
           <a:xfrm>
-            <a:off x="1141412" y="2826904"/>
-            <a:ext cx="6670416" cy="461665"/>
+            <a:off x="1141412" y="3897964"/>
+            <a:ext cx="6636176" cy="738664"/>
           </a:xfrm>
           <a:prstGeom prst="rect">
             <a:avLst/>
@@ -6784,6 +8138,17 @@
               <a:t>MATRICE DELLE FORZE CENTRIFUGHE E DI CORIOLIS</a:t>
             </a:r>
           </a:p>
+          <a:p>
+            <a:r>
+              <a:rPr lang="it-IT" dirty="0"/>
+              <a:t>Calcolata mediante i simboli di </a:t>
+            </a:r>
+            <a:r>
+              <a:rPr lang="it-IT" dirty="0" err="1"/>
+              <a:t>Christoffel</a:t>
+            </a:r>
+            <a:endParaRPr lang="it-IT" dirty="0"/>
+          </a:p>
         </p:txBody>
       </p:sp>
       <p:sp>
@@ -6800,7 +8165,7 @@
         </p:nvSpPr>
         <p:spPr>
           <a:xfrm>
-            <a:off x="1141412" y="4342669"/>
+            <a:off x="1141412" y="5041892"/>
             <a:ext cx="3577005" cy="461665"/>
           </a:xfrm>
           <a:prstGeom prst="rect">
@@ -6820,10 +8185,565 @@
           </a:p>
         </p:txBody>
       </p:sp>
+      <p:sp>
+        <p:nvSpPr>
+          <p:cNvPr id="2" name="CasellaDiTesto 1">
+            <a:extLst>
+              <a:ext uri="{FF2B5EF4-FFF2-40B4-BE49-F238E27FC236}">
+                <a16:creationId xmlns:a16="http://schemas.microsoft.com/office/drawing/2014/main" id="{7C1FF8A7-B5F5-0E47-B33D-B3C64C0495E6}"/>
+              </a:ext>
+            </a:extLst>
+          </p:cNvPr>
+          <p:cNvSpPr txBox="1"/>
+          <p:nvPr/>
+        </p:nvSpPr>
+        <p:spPr>
+          <a:xfrm>
+            <a:off x="1141413" y="1738374"/>
+            <a:ext cx="6670416" cy="1754326"/>
+          </a:xfrm>
+          <a:prstGeom prst="rect">
+            <a:avLst/>
+          </a:prstGeom>
+          <a:noFill/>
+        </p:spPr>
+        <p:txBody>
+          <a:bodyPr wrap="square" rtlCol="0">
+            <a:spAutoFit/>
+          </a:bodyPr>
+          <a:lstStyle/>
+          <a:p>
+            <a:r>
+              <a:rPr lang="it-IT" dirty="0"/>
+              <a:t>B = (m(1)*(JpG1')*JpG1 + (JgG1')*rG1*</a:t>
+            </a:r>
+            <a:r>
+              <a:rPr lang="it-IT" dirty="0" err="1"/>
+              <a:t>I_f</a:t>
+            </a:r>
+            <a:r>
+              <a:rPr lang="it-IT" dirty="0"/>
+              <a:t>(m(1),d(1))*(rG1')*JgG1+...</a:t>
+            </a:r>
+          </a:p>
+          <a:p>
+            <a:r>
+              <a:rPr lang="it-IT" dirty="0"/>
+              <a:t>        m(2)*(JpG2')*JpG2 + (JgG2')*rG2*</a:t>
+            </a:r>
+            <a:r>
+              <a:rPr lang="it-IT" dirty="0" err="1"/>
+              <a:t>I_f</a:t>
+            </a:r>
+            <a:r>
+              <a:rPr lang="it-IT" dirty="0"/>
+              <a:t>(m(2),d(2))*(rG2')*JgG2+...</a:t>
+            </a:r>
+          </a:p>
+          <a:p>
+            <a:r>
+              <a:rPr lang="it-IT" dirty="0"/>
+              <a:t>        m(3)*(JpG3')*JpG3 + (JgG3')*rG3*</a:t>
+            </a:r>
+            <a:r>
+              <a:rPr lang="it-IT" dirty="0" err="1"/>
+              <a:t>I_f</a:t>
+            </a:r>
+            <a:r>
+              <a:rPr lang="it-IT" dirty="0"/>
+              <a:t>(m(3),</a:t>
+            </a:r>
+            <a:r>
+              <a:rPr lang="it-IT" dirty="0" err="1"/>
+              <a:t>q</a:t>
+            </a:r>
+            <a:r>
+              <a:rPr lang="it-IT" dirty="0"/>
+              <a:t>(3))*(rG3')*JgG3+...</a:t>
+            </a:r>
+          </a:p>
+          <a:p>
+            <a:r>
+              <a:rPr lang="it-IT" dirty="0"/>
+              <a:t>        m(4)*(JpG4')*JpG4 + (JgG4')*rG4*</a:t>
+            </a:r>
+            <a:r>
+              <a:rPr lang="it-IT" dirty="0" err="1"/>
+              <a:t>I_f</a:t>
+            </a:r>
+            <a:r>
+              <a:rPr lang="it-IT" dirty="0"/>
+              <a:t>(m(4),d(4))*(rG4')*JgG4+...</a:t>
+            </a:r>
+          </a:p>
+          <a:p>
+            <a:r>
+              <a:rPr lang="it-IT" dirty="0"/>
+              <a:t>        m(5)*(JpG5')*JpG5 + (JgG5')*rG5*</a:t>
+            </a:r>
+            <a:r>
+              <a:rPr lang="it-IT" dirty="0" err="1"/>
+              <a:t>I_f</a:t>
+            </a:r>
+            <a:r>
+              <a:rPr lang="it-IT" dirty="0"/>
+              <a:t>(m(5),d(5))*(rG5')*JgG5+...</a:t>
+            </a:r>
+          </a:p>
+          <a:p>
+            <a:r>
+              <a:rPr lang="it-IT" dirty="0"/>
+              <a:t>        m(6)*(JpG6')*JpG6 + (JgG6')*rG6*</a:t>
+            </a:r>
+            <a:r>
+              <a:rPr lang="it-IT" dirty="0" err="1"/>
+              <a:t>I_f</a:t>
+            </a:r>
+            <a:r>
+              <a:rPr lang="it-IT" dirty="0"/>
+              <a:t>(m(6),d(6))*(rG6')*JgG6);</a:t>
+            </a:r>
+          </a:p>
+        </p:txBody>
+      </p:sp>
+      <p:pic>
+        <p:nvPicPr>
+          <p:cNvPr id="4" name="Immagine 3">
+            <a:extLst>
+              <a:ext uri="{FF2B5EF4-FFF2-40B4-BE49-F238E27FC236}">
+                <a16:creationId xmlns:a16="http://schemas.microsoft.com/office/drawing/2014/main" id="{A28CE846-ED14-5A40-8560-BF636CF84E8A}"/>
+              </a:ext>
+            </a:extLst>
+          </p:cNvPr>
+          <p:cNvPicPr>
+            <a:picLocks noChangeAspect="1"/>
+          </p:cNvPicPr>
+          <p:nvPr/>
+        </p:nvPicPr>
+        <p:blipFill>
+          <a:blip r:embed="rId3"/>
+          <a:stretch>
+            <a:fillRect/>
+          </a:stretch>
+        </p:blipFill>
+        <p:spPr>
+          <a:xfrm>
+            <a:off x="7777588" y="3541615"/>
+            <a:ext cx="1714500" cy="825500"/>
+          </a:xfrm>
+          <a:prstGeom prst="rect">
+            <a:avLst/>
+          </a:prstGeom>
+        </p:spPr>
+      </p:pic>
+      <p:pic>
+        <p:nvPicPr>
+          <p:cNvPr id="12" name="Immagine 11">
+            <a:extLst>
+              <a:ext uri="{FF2B5EF4-FFF2-40B4-BE49-F238E27FC236}">
+                <a16:creationId xmlns:a16="http://schemas.microsoft.com/office/drawing/2014/main" id="{6BBF06A4-E6BF-8E46-A95C-164376A4832C}"/>
+              </a:ext>
+            </a:extLst>
+          </p:cNvPr>
+          <p:cNvPicPr>
+            <a:picLocks noChangeAspect="1"/>
+          </p:cNvPicPr>
+          <p:nvPr/>
+        </p:nvPicPr>
+        <p:blipFill>
+          <a:blip r:embed="rId4"/>
+          <a:stretch>
+            <a:fillRect/>
+          </a:stretch>
+        </p:blipFill>
+        <p:spPr>
+          <a:xfrm>
+            <a:off x="7803355" y="4359629"/>
+            <a:ext cx="3352800" cy="825500"/>
+          </a:xfrm>
+          <a:prstGeom prst="rect">
+            <a:avLst/>
+          </a:prstGeom>
+        </p:spPr>
+      </p:pic>
+      <p:sp>
+        <p:nvSpPr>
+          <p:cNvPr id="13" name="Rettangolo 12">
+            <a:extLst>
+              <a:ext uri="{FF2B5EF4-FFF2-40B4-BE49-F238E27FC236}">
+                <a16:creationId xmlns:a16="http://schemas.microsoft.com/office/drawing/2014/main" id="{E2AE1785-B718-D643-8D8E-2B6528DBC955}"/>
+              </a:ext>
+            </a:extLst>
+          </p:cNvPr>
+          <p:cNvSpPr/>
+          <p:nvPr/>
+        </p:nvSpPr>
+        <p:spPr>
+          <a:xfrm>
+            <a:off x="1141412" y="5503557"/>
+            <a:ext cx="7712302" cy="646331"/>
+          </a:xfrm>
+          <a:prstGeom prst="rect">
+            <a:avLst/>
+          </a:prstGeom>
+        </p:spPr>
+        <p:txBody>
+          <a:bodyPr wrap="square">
+            <a:spAutoFit/>
+          </a:bodyPr>
+          <a:lstStyle/>
+          <a:p>
+            <a:r>
+              <a:rPr lang="it-IT" dirty="0"/>
+              <a:t>G = -(m(1)*(JpG1')*g0 + m(2)*(JpG2')*g0 + m(3)*(JpG3')*g0 +... </a:t>
+            </a:r>
+          </a:p>
+          <a:p>
+            <a:r>
+              <a:rPr lang="it-IT" dirty="0"/>
+              <a:t>          m(4)*(JpG4')*g0 + m(5)*(JpG5')*g0 + m(6)*(JpG6')*g0);</a:t>
+            </a:r>
+          </a:p>
+        </p:txBody>
+      </p:sp>
     </p:spTree>
     <p:extLst>
       <p:ext uri="{BB962C8B-B14F-4D97-AF65-F5344CB8AC3E}">
         <p14:creationId xmlns:p14="http://schemas.microsoft.com/office/powerpoint/2010/main" val="1942568303"/>
+      </p:ext>
+    </p:extLst>
+  </p:cSld>
+  <p:clrMapOvr>
+    <a:masterClrMapping/>
+  </p:clrMapOvr>
+</p:sld>
+</file>
+
+<file path=ppt/slides/slide8.xml><?xml version="1.0" encoding="utf-8"?>
+<p:sld xmlns:a="http://schemas.openxmlformats.org/drawingml/2006/main" xmlns:r="http://schemas.openxmlformats.org/officeDocument/2006/relationships" xmlns:p="http://schemas.openxmlformats.org/presentationml/2006/main">
+  <p:cSld>
+    <p:spTree>
+      <p:nvGrpSpPr>
+        <p:cNvPr id="1" name=""/>
+        <p:cNvGrpSpPr/>
+        <p:nvPr/>
+      </p:nvGrpSpPr>
+      <p:grpSpPr>
+        <a:xfrm>
+          <a:off x="0" y="0"/>
+          <a:ext cx="0" cy="0"/>
+          <a:chOff x="0" y="0"/>
+          <a:chExt cx="0" cy="0"/>
+        </a:xfrm>
+      </p:grpSpPr>
+      <p:sp>
+        <p:nvSpPr>
+          <p:cNvPr id="5" name="Titolo 1">
+            <a:extLst>
+              <a:ext uri="{FF2B5EF4-FFF2-40B4-BE49-F238E27FC236}">
+                <a16:creationId xmlns:a16="http://schemas.microsoft.com/office/drawing/2014/main" id="{719936BE-0F9D-C74E-9E55-A7F2CE751F93}"/>
+              </a:ext>
+            </a:extLst>
+          </p:cNvPr>
+          <p:cNvSpPr txBox="1">
+            <a:spLocks/>
+          </p:cNvSpPr>
+          <p:nvPr/>
+        </p:nvSpPr>
+        <p:spPr>
+          <a:xfrm>
+            <a:off x="1524000" y="454393"/>
+            <a:ext cx="9144000" cy="1021230"/>
+          </a:xfrm>
+          <a:prstGeom prst="rect">
+            <a:avLst/>
+          </a:prstGeom>
+        </p:spPr>
+        <p:txBody>
+          <a:bodyPr vert="horz" lIns="91440" tIns="45720" rIns="91440" bIns="45720" rtlCol="0" anchor="ctr">
+            <a:normAutofit fontScale="85000" lnSpcReduction="20000"/>
+          </a:bodyPr>
+          <a:lstStyle>
+            <a:lvl1pPr algn="l" defTabSz="914400" rtl="0" eaLnBrk="1" latinLnBrk="0" hangingPunct="1">
+              <a:lnSpc>
+                <a:spcPct val="90000"/>
+              </a:lnSpc>
+              <a:spcBef>
+                <a:spcPct val="0"/>
+              </a:spcBef>
+              <a:buNone/>
+              <a:defRPr sz="4400" kern="1200">
+                <a:solidFill>
+                  <a:schemeClr val="tx1"/>
+                </a:solidFill>
+                <a:latin typeface="+mj-lt"/>
+                <a:ea typeface="+mj-ea"/>
+                <a:cs typeface="+mj-cs"/>
+              </a:defRPr>
+            </a:lvl1pPr>
+          </a:lstStyle>
+          <a:p>
+            <a:pPr algn="ctr"/>
+            <a:r>
+              <a:rPr lang="it-IT" sz="5200" dirty="0"/>
+              <a:t>Manipolatore di Stanford</a:t>
+            </a:r>
+          </a:p>
+          <a:p>
+            <a:pPr algn="ctr"/>
+            <a:r>
+              <a:rPr lang="it-IT" sz="3800" dirty="0"/>
+              <a:t>Controllore PD con compensazione di Gravità</a:t>
+            </a:r>
+          </a:p>
+        </p:txBody>
+      </p:sp>
+      <p:pic>
+        <p:nvPicPr>
+          <p:cNvPr id="13" name="Immagine 12">
+            <a:extLst>
+              <a:ext uri="{FF2B5EF4-FFF2-40B4-BE49-F238E27FC236}">
+                <a16:creationId xmlns:a16="http://schemas.microsoft.com/office/drawing/2014/main" id="{BD5E09ED-0160-4F47-9FC0-A9802CBFCD7E}"/>
+              </a:ext>
+            </a:extLst>
+          </p:cNvPr>
+          <p:cNvPicPr>
+            <a:picLocks noChangeAspect="1"/>
+          </p:cNvPicPr>
+          <p:nvPr/>
+        </p:nvPicPr>
+        <p:blipFill>
+          <a:blip r:embed="rId2"/>
+          <a:stretch>
+            <a:fillRect/>
+          </a:stretch>
+        </p:blipFill>
+        <p:spPr>
+          <a:xfrm>
+            <a:off x="3644900" y="2590956"/>
+            <a:ext cx="4902200" cy="1625600"/>
+          </a:xfrm>
+          <a:prstGeom prst="rect">
+            <a:avLst/>
+          </a:prstGeom>
+        </p:spPr>
+      </p:pic>
+      <p:pic>
+        <p:nvPicPr>
+          <p:cNvPr id="15" name="Immagine 14">
+            <a:extLst>
+              <a:ext uri="{FF2B5EF4-FFF2-40B4-BE49-F238E27FC236}">
+                <a16:creationId xmlns:a16="http://schemas.microsoft.com/office/drawing/2014/main" id="{B8514C22-0A0C-9242-ADDB-3BD1FFA1A715}"/>
+              </a:ext>
+            </a:extLst>
+          </p:cNvPr>
+          <p:cNvPicPr>
+            <a:picLocks noChangeAspect="1"/>
+          </p:cNvPicPr>
+          <p:nvPr/>
+        </p:nvPicPr>
+        <p:blipFill>
+          <a:blip r:embed="rId3"/>
+          <a:stretch>
+            <a:fillRect/>
+          </a:stretch>
+        </p:blipFill>
+        <p:spPr>
+          <a:xfrm>
+            <a:off x="4013200" y="4445118"/>
+            <a:ext cx="4165600" cy="1638300"/>
+          </a:xfrm>
+          <a:prstGeom prst="rect">
+            <a:avLst/>
+          </a:prstGeom>
+        </p:spPr>
+      </p:pic>
+      <p:pic>
+        <p:nvPicPr>
+          <p:cNvPr id="22" name="Immagine 21">
+            <a:extLst>
+              <a:ext uri="{FF2B5EF4-FFF2-40B4-BE49-F238E27FC236}">
+                <a16:creationId xmlns:a16="http://schemas.microsoft.com/office/drawing/2014/main" id="{92C4A989-E900-0A41-8AF0-3A74BCA2264C}"/>
+              </a:ext>
+            </a:extLst>
+          </p:cNvPr>
+          <p:cNvPicPr>
+            <a:picLocks noChangeAspect="1"/>
+          </p:cNvPicPr>
+          <p:nvPr/>
+        </p:nvPicPr>
+        <p:blipFill>
+          <a:blip r:embed="rId4"/>
+          <a:stretch>
+            <a:fillRect/>
+          </a:stretch>
+        </p:blipFill>
+        <p:spPr>
+          <a:xfrm>
+            <a:off x="4096657" y="1624541"/>
+            <a:ext cx="3998686" cy="737853"/>
+          </a:xfrm>
+          <a:prstGeom prst="rect">
+            <a:avLst/>
+          </a:prstGeom>
+        </p:spPr>
+      </p:pic>
+    </p:spTree>
+    <p:extLst>
+      <p:ext uri="{BB962C8B-B14F-4D97-AF65-F5344CB8AC3E}">
+        <p14:creationId xmlns:p14="http://schemas.microsoft.com/office/powerpoint/2010/main" val="2858614199"/>
+      </p:ext>
+    </p:extLst>
+  </p:cSld>
+  <p:clrMapOvr>
+    <a:masterClrMapping/>
+  </p:clrMapOvr>
+</p:sld>
+</file>
+
+<file path=ppt/slides/slide9.xml><?xml version="1.0" encoding="utf-8"?>
+<p:sld xmlns:a="http://schemas.openxmlformats.org/drawingml/2006/main" xmlns:r="http://schemas.openxmlformats.org/officeDocument/2006/relationships" xmlns:p="http://schemas.openxmlformats.org/presentationml/2006/main">
+  <p:cSld>
+    <p:spTree>
+      <p:nvGrpSpPr>
+        <p:cNvPr id="1" name=""/>
+        <p:cNvGrpSpPr/>
+        <p:nvPr/>
+      </p:nvGrpSpPr>
+      <p:grpSpPr>
+        <a:xfrm>
+          <a:off x="0" y="0"/>
+          <a:ext cx="0" cy="0"/>
+          <a:chOff x="0" y="0"/>
+          <a:chExt cx="0" cy="0"/>
+        </a:xfrm>
+      </p:grpSpPr>
+      <p:sp>
+        <p:nvSpPr>
+          <p:cNvPr id="5" name="Titolo 1">
+            <a:extLst>
+              <a:ext uri="{FF2B5EF4-FFF2-40B4-BE49-F238E27FC236}">
+                <a16:creationId xmlns:a16="http://schemas.microsoft.com/office/drawing/2014/main" id="{719936BE-0F9D-C74E-9E55-A7F2CE751F93}"/>
+              </a:ext>
+            </a:extLst>
+          </p:cNvPr>
+          <p:cNvSpPr txBox="1">
+            <a:spLocks/>
+          </p:cNvSpPr>
+          <p:nvPr/>
+        </p:nvSpPr>
+        <p:spPr>
+          <a:xfrm>
+            <a:off x="1524000" y="454393"/>
+            <a:ext cx="9144000" cy="1021230"/>
+          </a:xfrm>
+          <a:prstGeom prst="rect">
+            <a:avLst/>
+          </a:prstGeom>
+        </p:spPr>
+        <p:txBody>
+          <a:bodyPr vert="horz" lIns="91440" tIns="45720" rIns="91440" bIns="45720" rtlCol="0" anchor="ctr">
+            <a:normAutofit fontScale="85000" lnSpcReduction="20000"/>
+          </a:bodyPr>
+          <a:lstStyle>
+            <a:lvl1pPr algn="l" defTabSz="914400" rtl="0" eaLnBrk="1" latinLnBrk="0" hangingPunct="1">
+              <a:lnSpc>
+                <a:spcPct val="90000"/>
+              </a:lnSpc>
+              <a:spcBef>
+                <a:spcPct val="0"/>
+              </a:spcBef>
+              <a:buNone/>
+              <a:defRPr sz="4400" kern="1200">
+                <a:solidFill>
+                  <a:schemeClr val="tx1"/>
+                </a:solidFill>
+                <a:latin typeface="+mj-lt"/>
+                <a:ea typeface="+mj-ea"/>
+                <a:cs typeface="+mj-cs"/>
+              </a:defRPr>
+            </a:lvl1pPr>
+          </a:lstStyle>
+          <a:p>
+            <a:pPr algn="ctr"/>
+            <a:r>
+              <a:rPr lang="it-IT" sz="5200" dirty="0"/>
+              <a:t>Manipolatore di Stanford</a:t>
+            </a:r>
+          </a:p>
+          <a:p>
+            <a:pPr algn="ctr"/>
+            <a:r>
+              <a:rPr lang="it-IT" sz="3800" dirty="0"/>
+              <a:t>Controllore PD con compensazione di Gravità</a:t>
+            </a:r>
+          </a:p>
+        </p:txBody>
+      </p:sp>
+      <p:pic>
+        <p:nvPicPr>
+          <p:cNvPr id="20" name="Immagine 19">
+            <a:extLst>
+              <a:ext uri="{FF2B5EF4-FFF2-40B4-BE49-F238E27FC236}">
+                <a16:creationId xmlns:a16="http://schemas.microsoft.com/office/drawing/2014/main" id="{17F55AAC-EBA3-0242-A102-B9C145469364}"/>
+              </a:ext>
+            </a:extLst>
+          </p:cNvPr>
+          <p:cNvPicPr>
+            <a:picLocks noChangeAspect="1"/>
+          </p:cNvPicPr>
+          <p:nvPr/>
+        </p:nvPicPr>
+        <p:blipFill>
+          <a:blip r:embed="rId2"/>
+          <a:stretch>
+            <a:fillRect/>
+          </a:stretch>
+        </p:blipFill>
+        <p:spPr>
+          <a:xfrm>
+            <a:off x="377372" y="1475623"/>
+            <a:ext cx="5689600" cy="4267200"/>
+          </a:xfrm>
+          <a:prstGeom prst="rect">
+            <a:avLst/>
+          </a:prstGeom>
+        </p:spPr>
+      </p:pic>
+      <p:pic>
+        <p:nvPicPr>
+          <p:cNvPr id="6" name="Immagine 5">
+            <a:extLst>
+              <a:ext uri="{FF2B5EF4-FFF2-40B4-BE49-F238E27FC236}">
+                <a16:creationId xmlns:a16="http://schemas.microsoft.com/office/drawing/2014/main" id="{811AE29F-5FA5-2D4A-83F6-7DC2ABA11527}"/>
+              </a:ext>
+            </a:extLst>
+          </p:cNvPr>
+          <p:cNvPicPr>
+            <a:picLocks noChangeAspect="1"/>
+          </p:cNvPicPr>
+          <p:nvPr/>
+        </p:nvPicPr>
+        <p:blipFill>
+          <a:blip r:embed="rId3"/>
+          <a:stretch>
+            <a:fillRect/>
+          </a:stretch>
+        </p:blipFill>
+        <p:spPr>
+          <a:xfrm>
+            <a:off x="6066972" y="1475623"/>
+            <a:ext cx="5689600" cy="4267200"/>
+          </a:xfrm>
+          <a:prstGeom prst="rect">
+            <a:avLst/>
+          </a:prstGeom>
+        </p:spPr>
+      </p:pic>
+    </p:spTree>
+    <p:extLst>
+      <p:ext uri="{BB962C8B-B14F-4D97-AF65-F5344CB8AC3E}">
+        <p14:creationId xmlns:p14="http://schemas.microsoft.com/office/powerpoint/2010/main" val="3750274392"/>
       </p:ext>
     </p:extLst>
   </p:cSld>

</xml_diff>

<commit_message>
Aggiornate le slide con risultati per controllore Adaptive Computed Torque
</commit_message>
<xml_diff>
--- a/Relazione/Presentazione.pptx
+++ b/Relazione/Presentazione.pptx
@@ -275,7 +275,7 @@
           <a:p>
             <a:fld id="{27153579-3A4D-BB42-BD49-BB0F80A81A61}" type="datetimeFigureOut">
               <a:rPr lang="it-IT" smtClean="0"/>
-              <a:t>12/06/21</a:t>
+              <a:t>28/07/21</a:t>
             </a:fld>
             <a:endParaRPr lang="it-IT"/>
           </a:p>
@@ -448,7 +448,7 @@
           <a:p>
             <a:fld id="{27153579-3A4D-BB42-BD49-BB0F80A81A61}" type="datetimeFigureOut">
               <a:rPr lang="it-IT" smtClean="0"/>
-              <a:t>12/06/21</a:t>
+              <a:t>28/07/21</a:t>
             </a:fld>
             <a:endParaRPr lang="it-IT"/>
           </a:p>
@@ -631,7 +631,7 @@
           <a:p>
             <a:fld id="{27153579-3A4D-BB42-BD49-BB0F80A81A61}" type="datetimeFigureOut">
               <a:rPr lang="it-IT" smtClean="0"/>
-              <a:t>12/06/21</a:t>
+              <a:t>28/07/21</a:t>
             </a:fld>
             <a:endParaRPr lang="it-IT"/>
           </a:p>
@@ -804,7 +804,7 @@
           <a:p>
             <a:fld id="{27153579-3A4D-BB42-BD49-BB0F80A81A61}" type="datetimeFigureOut">
               <a:rPr lang="it-IT" smtClean="0"/>
-              <a:t>12/06/21</a:t>
+              <a:t>28/07/21</a:t>
             </a:fld>
             <a:endParaRPr lang="it-IT"/>
           </a:p>
@@ -1082,7 +1082,7 @@
           <a:p>
             <a:fld id="{27153579-3A4D-BB42-BD49-BB0F80A81A61}" type="datetimeFigureOut">
               <a:rPr lang="it-IT" smtClean="0"/>
-              <a:t>12/06/21</a:t>
+              <a:t>28/07/21</a:t>
             </a:fld>
             <a:endParaRPr lang="it-IT"/>
           </a:p>
@@ -1297,7 +1297,7 @@
           <a:p>
             <a:fld id="{27153579-3A4D-BB42-BD49-BB0F80A81A61}" type="datetimeFigureOut">
               <a:rPr lang="it-IT" smtClean="0"/>
-              <a:t>12/06/21</a:t>
+              <a:t>28/07/21</a:t>
             </a:fld>
             <a:endParaRPr lang="it-IT"/>
           </a:p>
@@ -1665,7 +1665,7 @@
           <a:p>
             <a:fld id="{27153579-3A4D-BB42-BD49-BB0F80A81A61}" type="datetimeFigureOut">
               <a:rPr lang="it-IT" smtClean="0"/>
-              <a:t>12/06/21</a:t>
+              <a:t>28/07/21</a:t>
             </a:fld>
             <a:endParaRPr lang="it-IT"/>
           </a:p>
@@ -1806,7 +1806,7 @@
           <a:p>
             <a:fld id="{27153579-3A4D-BB42-BD49-BB0F80A81A61}" type="datetimeFigureOut">
               <a:rPr lang="it-IT" smtClean="0"/>
-              <a:t>12/06/21</a:t>
+              <a:t>28/07/21</a:t>
             </a:fld>
             <a:endParaRPr lang="it-IT"/>
           </a:p>
@@ -1919,7 +1919,7 @@
           <a:p>
             <a:fld id="{27153579-3A4D-BB42-BD49-BB0F80A81A61}" type="datetimeFigureOut">
               <a:rPr lang="it-IT" smtClean="0"/>
-              <a:t>12/06/21</a:t>
+              <a:t>28/07/21</a:t>
             </a:fld>
             <a:endParaRPr lang="it-IT"/>
           </a:p>
@@ -2208,7 +2208,7 @@
           <a:p>
             <a:fld id="{27153579-3A4D-BB42-BD49-BB0F80A81A61}" type="datetimeFigureOut">
               <a:rPr lang="it-IT" smtClean="0"/>
-              <a:t>12/06/21</a:t>
+              <a:t>28/07/21</a:t>
             </a:fld>
             <a:endParaRPr lang="it-IT"/>
           </a:p>
@@ -2499,7 +2499,7 @@
           <a:p>
             <a:fld id="{27153579-3A4D-BB42-BD49-BB0F80A81A61}" type="datetimeFigureOut">
               <a:rPr lang="it-IT" smtClean="0"/>
-              <a:t>12/06/21</a:t>
+              <a:t>28/07/21</a:t>
             </a:fld>
             <a:endParaRPr lang="it-IT"/>
           </a:p>
@@ -2715,7 +2715,7 @@
           <a:p>
             <a:fld id="{27153579-3A4D-BB42-BD49-BB0F80A81A61}" type="datetimeFigureOut">
               <a:rPr lang="it-IT" smtClean="0"/>
-              <a:t>12/06/21</a:t>
+              <a:t>28/07/21</a:t>
             </a:fld>
             <a:endParaRPr lang="it-IT"/>
           </a:p>
@@ -3543,8 +3543,8 @@
           </a:p>
         </p:txBody>
       </p:sp>
-      <mc:AlternateContent xmlns:mc="http://schemas.openxmlformats.org/markup-compatibility/2006">
-        <mc:Choice xmlns:a14="http://schemas.microsoft.com/office/drawing/2010/main" Requires="a14">
+      <mc:AlternateContent xmlns:mc="http://schemas.openxmlformats.org/markup-compatibility/2006" xmlns:a14="http://schemas.microsoft.com/office/drawing/2010/main">
+        <mc:Choice Requires="a14">
           <p:sp>
             <p:nvSpPr>
               <p:cNvPr id="7" name="CasellaDiTesto 6">
@@ -4009,7 +4009,7 @@
             </p:txBody>
           </p:sp>
         </mc:Choice>
-        <mc:Fallback>
+        <mc:Fallback xmlns="">
           <p:sp>
             <p:nvSpPr>
               <p:cNvPr id="7" name="CasellaDiTesto 6">
@@ -4698,7 +4698,19 @@
                           <a:rPr lang="it-IT" b="0" i="1" smtClean="0">
                             <a:latin typeface="Cambria Math" panose="02040503050406030204" pitchFamily="18" charset="0"/>
                           </a:rPr>
-                          <m:t>0,0,0,0,0,0</m:t>
+                          <m:t>0,0,</m:t>
+                        </m:r>
+                        <m:r>
+                          <a:rPr lang="it-IT" b="0" i="1" smtClean="0">
+                            <a:latin typeface="Cambria Math" panose="02040503050406030204" pitchFamily="18" charset="0"/>
+                          </a:rPr>
+                          <m:t>3</m:t>
+                        </m:r>
+                        <m:r>
+                          <a:rPr lang="it-IT" b="0" i="1" smtClean="0">
+                            <a:latin typeface="Cambria Math" panose="02040503050406030204" pitchFamily="18" charset="0"/>
+                          </a:rPr>
+                          <m:t>,0,0,0</m:t>
                         </m:r>
                       </m:e>
                     </m:d>
@@ -5400,10 +5412,10 @@
       </p:pic>
       <p:pic>
         <p:nvPicPr>
-          <p:cNvPr id="3" name="Immagine 2">
-            <a:extLst>
-              <a:ext uri="{FF2B5EF4-FFF2-40B4-BE49-F238E27FC236}">
-                <a16:creationId xmlns:a16="http://schemas.microsoft.com/office/drawing/2014/main" id="{757BC09A-1A69-8946-AE3E-9D92A4C98765}"/>
+          <p:cNvPr id="6" name="Immagine 5">
+            <a:extLst>
+              <a:ext uri="{FF2B5EF4-FFF2-40B4-BE49-F238E27FC236}">
+                <a16:creationId xmlns:a16="http://schemas.microsoft.com/office/drawing/2014/main" id="{21579160-C955-CD49-A648-49B431236C92}"/>
               </a:ext>
             </a:extLst>
           </p:cNvPr>
@@ -5420,98 +5432,8 @@
         </p:blipFill>
         <p:spPr>
           <a:xfrm>
-            <a:off x="5362581" y="5019198"/>
-            <a:ext cx="2563200" cy="720000"/>
-          </a:xfrm>
-          <a:prstGeom prst="rect">
-            <a:avLst/>
-          </a:prstGeom>
-        </p:spPr>
-      </p:pic>
-      <p:pic>
-        <p:nvPicPr>
-          <p:cNvPr id="6" name="Immagine 5">
-            <a:extLst>
-              <a:ext uri="{FF2B5EF4-FFF2-40B4-BE49-F238E27FC236}">
-                <a16:creationId xmlns:a16="http://schemas.microsoft.com/office/drawing/2014/main" id="{21579160-C955-CD49-A648-49B431236C92}"/>
-              </a:ext>
-            </a:extLst>
-          </p:cNvPr>
-          <p:cNvPicPr>
-            <a:picLocks noChangeAspect="1"/>
-          </p:cNvPicPr>
-          <p:nvPr/>
-        </p:nvPicPr>
-        <p:blipFill>
-          <a:blip r:embed="rId7"/>
-          <a:stretch>
-            <a:fillRect/>
-          </a:stretch>
-        </p:blipFill>
-        <p:spPr>
-          <a:xfrm>
             <a:off x="8024815" y="5019198"/>
             <a:ext cx="1900800" cy="720000"/>
-          </a:xfrm>
-          <a:prstGeom prst="rect">
-            <a:avLst/>
-          </a:prstGeom>
-        </p:spPr>
-      </p:pic>
-      <p:pic>
-        <p:nvPicPr>
-          <p:cNvPr id="8" name="Immagine 7">
-            <a:extLst>
-              <a:ext uri="{FF2B5EF4-FFF2-40B4-BE49-F238E27FC236}">
-                <a16:creationId xmlns:a16="http://schemas.microsoft.com/office/drawing/2014/main" id="{D80B9369-2FE2-0547-8A3D-49A3831860BE}"/>
-              </a:ext>
-            </a:extLst>
-          </p:cNvPr>
-          <p:cNvPicPr>
-            <a:picLocks noChangeAspect="1"/>
-          </p:cNvPicPr>
-          <p:nvPr/>
-        </p:nvPicPr>
-        <p:blipFill>
-          <a:blip r:embed="rId8"/>
-          <a:stretch>
-            <a:fillRect/>
-          </a:stretch>
-        </p:blipFill>
-        <p:spPr>
-          <a:xfrm>
-            <a:off x="6176241" y="3250941"/>
-            <a:ext cx="4127500" cy="1612900"/>
-          </a:xfrm>
-          <a:prstGeom prst="rect">
-            <a:avLst/>
-          </a:prstGeom>
-        </p:spPr>
-      </p:pic>
-      <p:pic>
-        <p:nvPicPr>
-          <p:cNvPr id="10" name="Immagine 9">
-            <a:extLst>
-              <a:ext uri="{FF2B5EF4-FFF2-40B4-BE49-F238E27FC236}">
-                <a16:creationId xmlns:a16="http://schemas.microsoft.com/office/drawing/2014/main" id="{54BDCA2C-37A9-4B47-AE86-1EBA933AA55E}"/>
-              </a:ext>
-            </a:extLst>
-          </p:cNvPr>
-          <p:cNvPicPr>
-            <a:picLocks noChangeAspect="1"/>
-          </p:cNvPicPr>
-          <p:nvPr/>
-        </p:nvPicPr>
-        <p:blipFill>
-          <a:blip r:embed="rId9"/>
-          <a:stretch>
-            <a:fillRect/>
-          </a:stretch>
-        </p:blipFill>
-        <p:spPr>
-          <a:xfrm>
-            <a:off x="1172441" y="3257291"/>
-            <a:ext cx="5003800" cy="1600200"/>
           </a:xfrm>
           <a:prstGeom prst="rect">
             <a:avLst/>
@@ -5567,6 +5489,96 @@
           </a:p>
         </p:txBody>
       </p:sp>
+      <p:pic>
+        <p:nvPicPr>
+          <p:cNvPr id="4" name="Immagine 3">
+            <a:extLst>
+              <a:ext uri="{FF2B5EF4-FFF2-40B4-BE49-F238E27FC236}">
+                <a16:creationId xmlns:a16="http://schemas.microsoft.com/office/drawing/2014/main" id="{7809A052-2DF1-F148-86A1-C354226A8A0A}"/>
+              </a:ext>
+            </a:extLst>
+          </p:cNvPr>
+          <p:cNvPicPr>
+            <a:picLocks noChangeAspect="1"/>
+          </p:cNvPicPr>
+          <p:nvPr/>
+        </p:nvPicPr>
+        <p:blipFill>
+          <a:blip r:embed="rId7"/>
+          <a:stretch>
+            <a:fillRect/>
+          </a:stretch>
+        </p:blipFill>
+        <p:spPr>
+          <a:xfrm>
+            <a:off x="1799303" y="3279831"/>
+            <a:ext cx="4376938" cy="1745486"/>
+          </a:xfrm>
+          <a:prstGeom prst="rect">
+            <a:avLst/>
+          </a:prstGeom>
+        </p:spPr>
+      </p:pic>
+      <p:pic>
+        <p:nvPicPr>
+          <p:cNvPr id="9" name="Immagine 8">
+            <a:extLst>
+              <a:ext uri="{FF2B5EF4-FFF2-40B4-BE49-F238E27FC236}">
+                <a16:creationId xmlns:a16="http://schemas.microsoft.com/office/drawing/2014/main" id="{BB034230-AB7E-6240-B1B2-7FF34F4A8733}"/>
+              </a:ext>
+            </a:extLst>
+          </p:cNvPr>
+          <p:cNvPicPr>
+            <a:picLocks noChangeAspect="1"/>
+          </p:cNvPicPr>
+          <p:nvPr/>
+        </p:nvPicPr>
+        <p:blipFill>
+          <a:blip r:embed="rId8"/>
+          <a:stretch>
+            <a:fillRect/>
+          </a:stretch>
+        </p:blipFill>
+        <p:spPr>
+          <a:xfrm>
+            <a:off x="6176241" y="3248323"/>
+            <a:ext cx="4127500" cy="1770875"/>
+          </a:xfrm>
+          <a:prstGeom prst="rect">
+            <a:avLst/>
+          </a:prstGeom>
+        </p:spPr>
+      </p:pic>
+      <p:pic>
+        <p:nvPicPr>
+          <p:cNvPr id="12" name="Immagine 11">
+            <a:extLst>
+              <a:ext uri="{FF2B5EF4-FFF2-40B4-BE49-F238E27FC236}">
+                <a16:creationId xmlns:a16="http://schemas.microsoft.com/office/drawing/2014/main" id="{85D07929-5B03-EC4A-9028-514CBDCDC2DE}"/>
+              </a:ext>
+            </a:extLst>
+          </p:cNvPr>
+          <p:cNvPicPr>
+            <a:picLocks noChangeAspect="1"/>
+          </p:cNvPicPr>
+          <p:nvPr/>
+        </p:nvPicPr>
+        <p:blipFill>
+          <a:blip r:embed="rId9"/>
+          <a:stretch>
+            <a:fillRect/>
+          </a:stretch>
+        </p:blipFill>
+        <p:spPr>
+          <a:xfrm>
+            <a:off x="5899792" y="4925537"/>
+            <a:ext cx="1587811" cy="907321"/>
+          </a:xfrm>
+          <a:prstGeom prst="rect">
+            <a:avLst/>
+          </a:prstGeom>
+        </p:spPr>
+      </p:pic>
     </p:spTree>
     <p:extLst>
       <p:ext uri="{BB962C8B-B14F-4D97-AF65-F5344CB8AC3E}">
@@ -5677,10 +5689,10 @@
       </p:sp>
       <p:pic>
         <p:nvPicPr>
-          <p:cNvPr id="11" name="Immagine 10">
-            <a:extLst>
-              <a:ext uri="{FF2B5EF4-FFF2-40B4-BE49-F238E27FC236}">
-                <a16:creationId xmlns:a16="http://schemas.microsoft.com/office/drawing/2014/main" id="{24474708-2AD1-E242-B19A-0598DECCEB08}"/>
+          <p:cNvPr id="3" name="Immagine 2">
+            <a:extLst>
+              <a:ext uri="{FF2B5EF4-FFF2-40B4-BE49-F238E27FC236}">
+                <a16:creationId xmlns:a16="http://schemas.microsoft.com/office/drawing/2014/main" id="{798C0263-E1FA-E94D-959F-8F0BE9F264A9}"/>
               </a:ext>
             </a:extLst>
           </p:cNvPr>
@@ -5697,7 +5709,7 @@
         </p:blipFill>
         <p:spPr>
           <a:xfrm>
-            <a:off x="449942" y="1475623"/>
+            <a:off x="449942" y="1490137"/>
             <a:ext cx="5689600" cy="4267200"/>
           </a:xfrm>
           <a:prstGeom prst="rect">
@@ -5707,10 +5719,10 @@
       </p:pic>
       <p:pic>
         <p:nvPicPr>
-          <p:cNvPr id="13" name="Immagine 12">
-            <a:extLst>
-              <a:ext uri="{FF2B5EF4-FFF2-40B4-BE49-F238E27FC236}">
-                <a16:creationId xmlns:a16="http://schemas.microsoft.com/office/drawing/2014/main" id="{466A2D65-C0B0-0C42-93AC-8B75F09EF259}"/>
+          <p:cNvPr id="6" name="Immagine 5">
+            <a:extLst>
+              <a:ext uri="{FF2B5EF4-FFF2-40B4-BE49-F238E27FC236}">
+                <a16:creationId xmlns:a16="http://schemas.microsoft.com/office/drawing/2014/main" id="{9497A573-DD39-0D4C-9287-F7E80CAD2A86}"/>
               </a:ext>
             </a:extLst>
           </p:cNvPr>
@@ -5727,7 +5739,7 @@
         </p:blipFill>
         <p:spPr>
           <a:xfrm>
-            <a:off x="6139542" y="1490137"/>
+            <a:off x="6139542" y="1475623"/>
             <a:ext cx="5689600" cy="4267200"/>
           </a:xfrm>
           <a:prstGeom prst="rect">
@@ -5869,7 +5881,7 @@
             </p:spPr>
             <p:txBody>
               <a:bodyPr>
-                <a:normAutofit fontScale="92500" lnSpcReduction="10000"/>
+                <a:normAutofit fontScale="92500"/>
               </a:bodyPr>
               <a:lstStyle/>
               <a:p>
@@ -5889,7 +5901,7 @@
                 </a:r>
                 <a:r>
                   <a:rPr lang="it-IT" sz="1800" dirty="0"/>
-                  <a:t> è stato calcolato estrapolando i parametri dinamici relativi alle masse e alle inerzie di ciascun link dalle equazioni della dinamica, utilizzando come vettore dei parametri:</a:t>
+                  <a:t> è stato calcolato estrapolando i parametri dinamici relativi alle masse di ciascun link dalle equazioni della dinamica, utilizzando come vettore dei parametri:</a:t>
                 </a:r>
               </a:p>
               <a:p>
@@ -5944,24 +5956,6 @@
                             <a:rPr lang="it-IT" sz="1800" b="0" i="1" smtClean="0">
                               <a:latin typeface="Cambria Math" panose="02040503050406030204" pitchFamily="18" charset="0"/>
                             </a:rPr>
-                            <m:t>, </m:t>
-                          </m:r>
-                          <m:r>
-                            <a:rPr lang="it-IT" sz="1800" b="0" i="1" smtClean="0">
-                              <a:latin typeface="Cambria Math" panose="02040503050406030204" pitchFamily="18" charset="0"/>
-                            </a:rPr>
-                            <m:t>𝐼</m:t>
-                          </m:r>
-                          <m:r>
-                            <a:rPr lang="it-IT" sz="1800" b="0" i="1" baseline="-25000" smtClean="0">
-                              <a:latin typeface="Cambria Math" panose="02040503050406030204" pitchFamily="18" charset="0"/>
-                            </a:rPr>
-                            <m:t>1</m:t>
-                          </m:r>
-                          <m:r>
-                            <a:rPr lang="it-IT" sz="1800" b="0" i="1" smtClean="0">
-                              <a:latin typeface="Cambria Math" panose="02040503050406030204" pitchFamily="18" charset="0"/>
-                            </a:rPr>
                             <m:t>,</m:t>
                           </m:r>
                           <m:r>
@@ -5986,19 +5980,7 @@
                             <a:rPr lang="it-IT" sz="1800" b="0" i="1" smtClean="0">
                               <a:latin typeface="Cambria Math" panose="02040503050406030204" pitchFamily="18" charset="0"/>
                             </a:rPr>
-                            <m:t>𝐼</m:t>
-                          </m:r>
-                          <m:r>
-                            <a:rPr lang="it-IT" sz="1800" b="0" i="1" baseline="-25000" smtClean="0">
-                              <a:latin typeface="Cambria Math" panose="02040503050406030204" pitchFamily="18" charset="0"/>
-                            </a:rPr>
-                            <m:t>2</m:t>
-                          </m:r>
-                          <m:r>
-                            <a:rPr lang="it-IT" sz="1800" b="0" i="1" smtClean="0">
-                              <a:latin typeface="Cambria Math" panose="02040503050406030204" pitchFamily="18" charset="0"/>
-                            </a:rPr>
-                            <m:t>,</m:t>
+                            <m:t> </m:t>
                           </m:r>
                           <m:r>
                             <a:rPr lang="it-IT" sz="1800" b="0" i="1" smtClean="0">
@@ -6022,19 +6004,7 @@
                             <a:rPr lang="it-IT" sz="1800" b="0" i="1" smtClean="0">
                               <a:latin typeface="Cambria Math" panose="02040503050406030204" pitchFamily="18" charset="0"/>
                             </a:rPr>
-                            <m:t>𝐼</m:t>
-                          </m:r>
-                          <m:r>
-                            <a:rPr lang="it-IT" sz="1800" b="0" i="1" baseline="-25000" smtClean="0">
-                              <a:latin typeface="Cambria Math" panose="02040503050406030204" pitchFamily="18" charset="0"/>
-                            </a:rPr>
-                            <m:t>3</m:t>
-                          </m:r>
-                          <m:r>
-                            <a:rPr lang="it-IT" sz="1800" b="0" i="1" smtClean="0">
-                              <a:latin typeface="Cambria Math" panose="02040503050406030204" pitchFamily="18" charset="0"/>
-                            </a:rPr>
-                            <m:t>,</m:t>
+                            <m:t> </m:t>
                           </m:r>
                           <m:r>
                             <a:rPr lang="it-IT" sz="1800" b="0" i="1" smtClean="0">
@@ -6058,19 +6028,7 @@
                             <a:rPr lang="it-IT" sz="1800" b="0" i="1" smtClean="0">
                               <a:latin typeface="Cambria Math" panose="02040503050406030204" pitchFamily="18" charset="0"/>
                             </a:rPr>
-                            <m:t>𝐼</m:t>
-                          </m:r>
-                          <m:r>
-                            <a:rPr lang="it-IT" sz="1800" b="0" i="1" baseline="-25000" smtClean="0">
-                              <a:latin typeface="Cambria Math" panose="02040503050406030204" pitchFamily="18" charset="0"/>
-                            </a:rPr>
-                            <m:t>4</m:t>
-                          </m:r>
-                          <m:r>
-                            <a:rPr lang="it-IT" sz="1800" b="0" i="1" smtClean="0">
-                              <a:latin typeface="Cambria Math" panose="02040503050406030204" pitchFamily="18" charset="0"/>
-                            </a:rPr>
-                            <m:t>,</m:t>
+                            <m:t> </m:t>
                           </m:r>
                           <m:r>
                             <a:rPr lang="it-IT" sz="1800" b="0" i="1" smtClean="0">
@@ -6094,43 +6052,13 @@
                             <a:rPr lang="it-IT" sz="1800" b="0" i="1" smtClean="0">
                               <a:latin typeface="Cambria Math" panose="02040503050406030204" pitchFamily="18" charset="0"/>
                             </a:rPr>
-                            <m:t>𝐼</m:t>
-                          </m:r>
-                          <m:r>
-                            <a:rPr lang="it-IT" sz="1800" b="0" i="1" baseline="-25000" smtClean="0">
-                              <a:latin typeface="Cambria Math" panose="02040503050406030204" pitchFamily="18" charset="0"/>
-                            </a:rPr>
-                            <m:t>5</m:t>
-                          </m:r>
-                          <m:r>
-                            <a:rPr lang="it-IT" sz="1800" b="0" i="1" smtClean="0">
-                              <a:latin typeface="Cambria Math" panose="02040503050406030204" pitchFamily="18" charset="0"/>
-                            </a:rPr>
-                            <m:t>,</m:t>
+                            <m:t> </m:t>
                           </m:r>
                           <m:r>
                             <a:rPr lang="it-IT" sz="1800" b="0" i="1" smtClean="0">
                               <a:latin typeface="Cambria Math" panose="02040503050406030204" pitchFamily="18" charset="0"/>
                             </a:rPr>
                             <m:t>𝑚</m:t>
-                          </m:r>
-                          <m:r>
-                            <a:rPr lang="it-IT" sz="1800" b="0" i="1" baseline="-25000" smtClean="0">
-                              <a:latin typeface="Cambria Math" panose="02040503050406030204" pitchFamily="18" charset="0"/>
-                            </a:rPr>
-                            <m:t>6</m:t>
-                          </m:r>
-                          <m:r>
-                            <a:rPr lang="it-IT" sz="1800" b="0" i="1" smtClean="0">
-                              <a:latin typeface="Cambria Math" panose="02040503050406030204" pitchFamily="18" charset="0"/>
-                            </a:rPr>
-                            <m:t>,</m:t>
-                          </m:r>
-                          <m:r>
-                            <a:rPr lang="it-IT" sz="1800" b="0" i="1" smtClean="0">
-                              <a:latin typeface="Cambria Math" panose="02040503050406030204" pitchFamily="18" charset="0"/>
-                            </a:rPr>
-                            <m:t>𝐼</m:t>
                           </m:r>
                           <m:r>
                             <a:rPr lang="it-IT" sz="1800" b="0" i="1" baseline="-25000" smtClean="0">
@@ -6182,42 +6110,11 @@
                         </m:r>
                       </m:e>
                     </m:acc>
-                    <m:r>
-                      <a:rPr lang="it-IT" sz="1800" b="0" i="1" smtClean="0">
-                        <a:latin typeface="Cambria Math" panose="02040503050406030204" pitchFamily="18" charset="0"/>
-                      </a:rPr>
-                      <m:t>=</m:t>
-                    </m:r>
-                    <m:d>
-                      <m:dPr>
-                        <m:begChr m:val="["/>
-                        <m:endChr m:val="]"/>
-                        <m:ctrlPr>
-                          <a:rPr lang="it-IT" sz="1800" b="0" i="1" smtClean="0">
-                            <a:latin typeface="Cambria Math" panose="02040503050406030204" pitchFamily="18" charset="0"/>
-                          </a:rPr>
-                        </m:ctrlPr>
-                      </m:dPr>
-                      <m:e>
-                        <m:r>
-                          <a:rPr lang="it-IT" sz="1800" b="0" i="1" smtClean="0">
-                            <a:latin typeface="Cambria Math" panose="02040503050406030204" pitchFamily="18" charset="0"/>
-                          </a:rPr>
-                          <m:t>1,1,1,1,1,1,1,1,1,1,1,1</m:t>
-                        </m:r>
-                      </m:e>
-                    </m:d>
-                    <m:r>
-                      <a:rPr lang="it-IT" sz="1800" b="0" i="1" baseline="30000" smtClean="0">
-                        <a:latin typeface="Cambria Math" panose="02040503050406030204" pitchFamily="18" charset="0"/>
-                      </a:rPr>
-                      <m:t>𝑇</m:t>
-                    </m:r>
                   </m:oMath>
                 </a14:m>
                 <a:r>
                   <a:rPr lang="it-IT" sz="1800" dirty="0"/>
-                  <a:t> e per la scelta fatta della matrici </a:t>
+                  <a:t> in modo che le masse avessero uno scostamento di +0.5 kg rispetto a quelle reali e per la scelta fatta della matrici </a:t>
                 </a:r>
                 <a:r>
                   <a:rPr lang="it-IT" sz="1800" dirty="0" err="1"/>
@@ -6233,7 +6130,7 @@
                 </a:r>
                 <a:r>
                   <a:rPr lang="it-IT" sz="1800" dirty="0"/>
-                  <a:t> si ottiene il seguente andamento, nel quale i parametri dinamici stimati vanno a convergere verso quelli desiderati.</a:t>
+                  <a:t> si ottiene il seguente andamento dell’errore di stima.</a:t>
                 </a:r>
                 <a:endParaRPr lang="it-IT" sz="1800" baseline="-25000" dirty="0"/>
               </a:p>
@@ -6271,7 +6168,7 @@
               <a:blipFill>
                 <a:blip r:embed="rId2"/>
                 <a:stretch>
-                  <a:fillRect l="-733"/>
+                  <a:fillRect l="-733" r="-1467"/>
                 </a:stretch>
               </a:blipFill>
             </p:spPr>
@@ -6292,10 +6189,10 @@
       </mc:AlternateContent>
       <p:pic>
         <p:nvPicPr>
-          <p:cNvPr id="7" name="Immagine 6">
-            <a:extLst>
-              <a:ext uri="{FF2B5EF4-FFF2-40B4-BE49-F238E27FC236}">
-                <a16:creationId xmlns:a16="http://schemas.microsoft.com/office/drawing/2014/main" id="{D50B4C85-32A4-BB45-ADC9-C78099D3EE7F}"/>
+          <p:cNvPr id="3" name="Immagine 2">
+            <a:extLst>
+              <a:ext uri="{FF2B5EF4-FFF2-40B4-BE49-F238E27FC236}">
+                <a16:creationId xmlns:a16="http://schemas.microsoft.com/office/drawing/2014/main" id="{82F967B9-B55B-B24C-A951-31BFEE2D159A}"/>
               </a:ext>
             </a:extLst>
           </p:cNvPr>
@@ -6312,8 +6209,8 @@
         </p:blipFill>
         <p:spPr>
           <a:xfrm>
-            <a:off x="6019800" y="1743471"/>
-            <a:ext cx="5831840" cy="4165600"/>
+            <a:off x="6019800" y="1692671"/>
+            <a:ext cx="5689600" cy="4267200"/>
           </a:xfrm>
           <a:prstGeom prst="rect">
             <a:avLst/>
@@ -6529,7 +6426,7 @@
           <a:p>
             <a:fld id="{4EF59023-6175-3944-979D-CFE35E3A8267}" type="datetime1">
               <a:rPr lang="it-IT" smtClean="0"/>
-              <a:t>12/06/21</a:t>
+              <a:t>28/07/21</a:t>
             </a:fld>
             <a:endParaRPr lang="en-US" dirty="0"/>
           </a:p>
@@ -10224,8 +10121,8 @@
           </a:p>
         </p:txBody>
       </p:sp>
-      <mc:AlternateContent xmlns:mc="http://schemas.openxmlformats.org/markup-compatibility/2006">
-        <mc:Choice xmlns:a14="http://schemas.microsoft.com/office/drawing/2010/main" Requires="a14">
+      <mc:AlternateContent xmlns:mc="http://schemas.openxmlformats.org/markup-compatibility/2006" xmlns:a14="http://schemas.microsoft.com/office/drawing/2010/main">
+        <mc:Choice Requires="a14">
           <p:sp>
             <p:nvSpPr>
               <p:cNvPr id="2" name="CasellaDiTesto 1">
@@ -10690,7 +10587,7 @@
             </p:txBody>
           </p:sp>
         </mc:Choice>
-        <mc:Fallback>
+        <mc:Fallback xmlns="">
           <p:sp>
             <p:nvSpPr>
               <p:cNvPr id="2" name="CasellaDiTesto 1">

</xml_diff>

<commit_message>
Aggiornamento relazione con risultati tavola 2 e inizio tavola 3
</commit_message>
<xml_diff>
--- a/Relazione/Presentazione.pptx
+++ b/Relazione/Presentazione.pptx
@@ -22,6 +22,15 @@
     <p:sldId id="267" r:id="rId16"/>
     <p:sldId id="268" r:id="rId17"/>
     <p:sldId id="269" r:id="rId18"/>
+    <p:sldId id="274" r:id="rId19"/>
+    <p:sldId id="273" r:id="rId20"/>
+    <p:sldId id="275" r:id="rId21"/>
+    <p:sldId id="276" r:id="rId22"/>
+    <p:sldId id="277" r:id="rId23"/>
+    <p:sldId id="278" r:id="rId24"/>
+    <p:sldId id="279" r:id="rId25"/>
+    <p:sldId id="280" r:id="rId26"/>
+    <p:sldId id="281" r:id="rId27"/>
   </p:sldIdLst>
   <p:sldSz cx="12192000" cy="6858000"/>
   <p:notesSz cx="6858000" cy="9144000"/>
@@ -275,7 +284,7 @@
           <a:p>
             <a:fld id="{27153579-3A4D-BB42-BD49-BB0F80A81A61}" type="datetimeFigureOut">
               <a:rPr lang="it-IT" smtClean="0"/>
-              <a:t>28/07/21</a:t>
+              <a:t>11/10/21</a:t>
             </a:fld>
             <a:endParaRPr lang="it-IT"/>
           </a:p>
@@ -448,7 +457,7 @@
           <a:p>
             <a:fld id="{27153579-3A4D-BB42-BD49-BB0F80A81A61}" type="datetimeFigureOut">
               <a:rPr lang="it-IT" smtClean="0"/>
-              <a:t>28/07/21</a:t>
+              <a:t>11/10/21</a:t>
             </a:fld>
             <a:endParaRPr lang="it-IT"/>
           </a:p>
@@ -631,7 +640,7 @@
           <a:p>
             <a:fld id="{27153579-3A4D-BB42-BD49-BB0F80A81A61}" type="datetimeFigureOut">
               <a:rPr lang="it-IT" smtClean="0"/>
-              <a:t>28/07/21</a:t>
+              <a:t>11/10/21</a:t>
             </a:fld>
             <a:endParaRPr lang="it-IT"/>
           </a:p>
@@ -804,7 +813,7 @@
           <a:p>
             <a:fld id="{27153579-3A4D-BB42-BD49-BB0F80A81A61}" type="datetimeFigureOut">
               <a:rPr lang="it-IT" smtClean="0"/>
-              <a:t>28/07/21</a:t>
+              <a:t>11/10/21</a:t>
             </a:fld>
             <a:endParaRPr lang="it-IT"/>
           </a:p>
@@ -1082,7 +1091,7 @@
           <a:p>
             <a:fld id="{27153579-3A4D-BB42-BD49-BB0F80A81A61}" type="datetimeFigureOut">
               <a:rPr lang="it-IT" smtClean="0"/>
-              <a:t>28/07/21</a:t>
+              <a:t>11/10/21</a:t>
             </a:fld>
             <a:endParaRPr lang="it-IT"/>
           </a:p>
@@ -1297,7 +1306,7 @@
           <a:p>
             <a:fld id="{27153579-3A4D-BB42-BD49-BB0F80A81A61}" type="datetimeFigureOut">
               <a:rPr lang="it-IT" smtClean="0"/>
-              <a:t>28/07/21</a:t>
+              <a:t>11/10/21</a:t>
             </a:fld>
             <a:endParaRPr lang="it-IT"/>
           </a:p>
@@ -1665,7 +1674,7 @@
           <a:p>
             <a:fld id="{27153579-3A4D-BB42-BD49-BB0F80A81A61}" type="datetimeFigureOut">
               <a:rPr lang="it-IT" smtClean="0"/>
-              <a:t>28/07/21</a:t>
+              <a:t>11/10/21</a:t>
             </a:fld>
             <a:endParaRPr lang="it-IT"/>
           </a:p>
@@ -1806,7 +1815,7 @@
           <a:p>
             <a:fld id="{27153579-3A4D-BB42-BD49-BB0F80A81A61}" type="datetimeFigureOut">
               <a:rPr lang="it-IT" smtClean="0"/>
-              <a:t>28/07/21</a:t>
+              <a:t>11/10/21</a:t>
             </a:fld>
             <a:endParaRPr lang="it-IT"/>
           </a:p>
@@ -1919,7 +1928,7 @@
           <a:p>
             <a:fld id="{27153579-3A4D-BB42-BD49-BB0F80A81A61}" type="datetimeFigureOut">
               <a:rPr lang="it-IT" smtClean="0"/>
-              <a:t>28/07/21</a:t>
+              <a:t>11/10/21</a:t>
             </a:fld>
             <a:endParaRPr lang="it-IT"/>
           </a:p>
@@ -2208,7 +2217,7 @@
           <a:p>
             <a:fld id="{27153579-3A4D-BB42-BD49-BB0F80A81A61}" type="datetimeFigureOut">
               <a:rPr lang="it-IT" smtClean="0"/>
-              <a:t>28/07/21</a:t>
+              <a:t>11/10/21</a:t>
             </a:fld>
             <a:endParaRPr lang="it-IT"/>
           </a:p>
@@ -2499,7 +2508,7 @@
           <a:p>
             <a:fld id="{27153579-3A4D-BB42-BD49-BB0F80A81A61}" type="datetimeFigureOut">
               <a:rPr lang="it-IT" smtClean="0"/>
-              <a:t>28/07/21</a:t>
+              <a:t>11/10/21</a:t>
             </a:fld>
             <a:endParaRPr lang="it-IT"/>
           </a:p>
@@ -2715,7 +2724,7 @@
           <a:p>
             <a:fld id="{27153579-3A4D-BB42-BD49-BB0F80A81A61}" type="datetimeFigureOut">
               <a:rPr lang="it-IT" smtClean="0"/>
-              <a:t>28/07/21</a:t>
+              <a:t>11/10/21</a:t>
             </a:fld>
             <a:endParaRPr lang="it-IT"/>
           </a:p>
@@ -3274,7 +3283,7 @@
           <a:p>
             <a:r>
               <a:rPr lang="it-IT" dirty="0"/>
-              <a:t>Docente: 							Studente:</a:t>
+              <a:t>Docenti: 							Studente:</a:t>
             </a:r>
           </a:p>
           <a:p>
@@ -4361,12 +4370,102 @@
           <a:chExt cx="0" cy="0"/>
         </a:xfrm>
       </p:grpSpPr>
+      <p:pic>
+        <p:nvPicPr>
+          <p:cNvPr id="2" name="Immagine 1">
+            <a:extLst>
+              <a:ext uri="{FF2B5EF4-FFF2-40B4-BE49-F238E27FC236}">
+                <a16:creationId xmlns:a16="http://schemas.microsoft.com/office/drawing/2014/main" id="{B54CE8FA-0446-B64F-8FC6-35D6EA0C880D}"/>
+              </a:ext>
+            </a:extLst>
+          </p:cNvPr>
+          <p:cNvPicPr>
+            <a:picLocks noChangeAspect="1"/>
+          </p:cNvPicPr>
+          <p:nvPr/>
+        </p:nvPicPr>
+        <p:blipFill>
+          <a:blip r:embed="rId2"/>
+          <a:stretch>
+            <a:fillRect/>
+          </a:stretch>
+        </p:blipFill>
+        <p:spPr>
+          <a:xfrm>
+            <a:off x="0" y="3282461"/>
+            <a:ext cx="12192000" cy="3755761"/>
+          </a:xfrm>
+          <a:prstGeom prst="rect">
+            <a:avLst/>
+          </a:prstGeom>
+        </p:spPr>
+      </p:pic>
+      <p:pic>
+        <p:nvPicPr>
+          <p:cNvPr id="6" name="Immagine 5">
+            <a:extLst>
+              <a:ext uri="{FF2B5EF4-FFF2-40B4-BE49-F238E27FC236}">
+                <a16:creationId xmlns:a16="http://schemas.microsoft.com/office/drawing/2014/main" id="{BC392C76-04EA-B74D-93E7-53223B265B1A}"/>
+              </a:ext>
+            </a:extLst>
+          </p:cNvPr>
+          <p:cNvPicPr>
+            <a:picLocks noChangeAspect="1"/>
+          </p:cNvPicPr>
+          <p:nvPr/>
+        </p:nvPicPr>
+        <p:blipFill>
+          <a:blip r:embed="rId3"/>
+          <a:stretch>
+            <a:fillRect/>
+          </a:stretch>
+        </p:blipFill>
+        <p:spPr>
+          <a:xfrm>
+            <a:off x="406400" y="1475623"/>
+            <a:ext cx="5689600" cy="4267200"/>
+          </a:xfrm>
+          <a:prstGeom prst="rect">
+            <a:avLst/>
+          </a:prstGeom>
+        </p:spPr>
+      </p:pic>
+      <p:pic>
+        <p:nvPicPr>
+          <p:cNvPr id="8" name="Immagine 7">
+            <a:extLst>
+              <a:ext uri="{FF2B5EF4-FFF2-40B4-BE49-F238E27FC236}">
+                <a16:creationId xmlns:a16="http://schemas.microsoft.com/office/drawing/2014/main" id="{18A45E0B-D139-DF46-8575-785298637F72}"/>
+              </a:ext>
+            </a:extLst>
+          </p:cNvPr>
+          <p:cNvPicPr>
+            <a:picLocks noChangeAspect="1"/>
+          </p:cNvPicPr>
+          <p:nvPr/>
+        </p:nvPicPr>
+        <p:blipFill>
+          <a:blip r:embed="rId4"/>
+          <a:stretch>
+            <a:fillRect/>
+          </a:stretch>
+        </p:blipFill>
+        <p:spPr>
+          <a:xfrm>
+            <a:off x="6096000" y="1475623"/>
+            <a:ext cx="5689600" cy="4267200"/>
+          </a:xfrm>
+          <a:prstGeom prst="rect">
+            <a:avLst/>
+          </a:prstGeom>
+        </p:spPr>
+      </p:pic>
       <p:sp>
         <p:nvSpPr>
-          <p:cNvPr id="5" name="Titolo 1">
-            <a:extLst>
-              <a:ext uri="{FF2B5EF4-FFF2-40B4-BE49-F238E27FC236}">
-                <a16:creationId xmlns:a16="http://schemas.microsoft.com/office/drawing/2014/main" id="{719936BE-0F9D-C74E-9E55-A7F2CE751F93}"/>
+          <p:cNvPr id="7" name="Titolo 1">
+            <a:extLst>
+              <a:ext uri="{FF2B5EF4-FFF2-40B4-BE49-F238E27FC236}">
+                <a16:creationId xmlns:a16="http://schemas.microsoft.com/office/drawing/2014/main" id="{63D9663B-71F0-B445-8B19-981E9062F22A}"/>
               </a:ext>
             </a:extLst>
           </p:cNvPr>
@@ -4431,96 +4530,6 @@
           </a:p>
         </p:txBody>
       </p:sp>
-      <p:pic>
-        <p:nvPicPr>
-          <p:cNvPr id="2" name="Immagine 1">
-            <a:extLst>
-              <a:ext uri="{FF2B5EF4-FFF2-40B4-BE49-F238E27FC236}">
-                <a16:creationId xmlns:a16="http://schemas.microsoft.com/office/drawing/2014/main" id="{B54CE8FA-0446-B64F-8FC6-35D6EA0C880D}"/>
-              </a:ext>
-            </a:extLst>
-          </p:cNvPr>
-          <p:cNvPicPr>
-            <a:picLocks noChangeAspect="1"/>
-          </p:cNvPicPr>
-          <p:nvPr/>
-        </p:nvPicPr>
-        <p:blipFill>
-          <a:blip r:embed="rId2"/>
-          <a:stretch>
-            <a:fillRect/>
-          </a:stretch>
-        </p:blipFill>
-        <p:spPr>
-          <a:xfrm>
-            <a:off x="0" y="180223"/>
-            <a:ext cx="12192000" cy="6858000"/>
-          </a:xfrm>
-          <a:prstGeom prst="rect">
-            <a:avLst/>
-          </a:prstGeom>
-        </p:spPr>
-      </p:pic>
-      <p:pic>
-        <p:nvPicPr>
-          <p:cNvPr id="6" name="Immagine 5">
-            <a:extLst>
-              <a:ext uri="{FF2B5EF4-FFF2-40B4-BE49-F238E27FC236}">
-                <a16:creationId xmlns:a16="http://schemas.microsoft.com/office/drawing/2014/main" id="{BC392C76-04EA-B74D-93E7-53223B265B1A}"/>
-              </a:ext>
-            </a:extLst>
-          </p:cNvPr>
-          <p:cNvPicPr>
-            <a:picLocks noChangeAspect="1"/>
-          </p:cNvPicPr>
-          <p:nvPr/>
-        </p:nvPicPr>
-        <p:blipFill>
-          <a:blip r:embed="rId3"/>
-          <a:stretch>
-            <a:fillRect/>
-          </a:stretch>
-        </p:blipFill>
-        <p:spPr>
-          <a:xfrm>
-            <a:off x="406400" y="1475623"/>
-            <a:ext cx="5689600" cy="4267200"/>
-          </a:xfrm>
-          <a:prstGeom prst="rect">
-            <a:avLst/>
-          </a:prstGeom>
-        </p:spPr>
-      </p:pic>
-      <p:pic>
-        <p:nvPicPr>
-          <p:cNvPr id="8" name="Immagine 7">
-            <a:extLst>
-              <a:ext uri="{FF2B5EF4-FFF2-40B4-BE49-F238E27FC236}">
-                <a16:creationId xmlns:a16="http://schemas.microsoft.com/office/drawing/2014/main" id="{18A45E0B-D139-DF46-8575-785298637F72}"/>
-              </a:ext>
-            </a:extLst>
-          </p:cNvPr>
-          <p:cNvPicPr>
-            <a:picLocks noChangeAspect="1"/>
-          </p:cNvPicPr>
-          <p:nvPr/>
-        </p:nvPicPr>
-        <p:blipFill>
-          <a:blip r:embed="rId4"/>
-          <a:stretch>
-            <a:fillRect/>
-          </a:stretch>
-        </p:blipFill>
-        <p:spPr>
-          <a:xfrm>
-            <a:off x="6096000" y="1475623"/>
-            <a:ext cx="5689600" cy="4267200"/>
-          </a:xfrm>
-          <a:prstGeom prst="rect">
-            <a:avLst/>
-          </a:prstGeom>
-        </p:spPr>
-      </p:pic>
     </p:spTree>
     <p:extLst>
       <p:ext uri="{BB962C8B-B14F-4D97-AF65-F5344CB8AC3E}">
@@ -4629,8 +4638,8 @@
           </a:p>
         </p:txBody>
       </p:sp>
-      <mc:AlternateContent xmlns:mc="http://schemas.openxmlformats.org/markup-compatibility/2006">
-        <mc:Choice xmlns:a14="http://schemas.microsoft.com/office/drawing/2010/main" Requires="a14">
+      <mc:AlternateContent xmlns:mc="http://schemas.openxmlformats.org/markup-compatibility/2006" xmlns:a14="http://schemas.microsoft.com/office/drawing/2010/main">
+        <mc:Choice Requires="a14">
           <p:sp>
             <p:nvSpPr>
               <p:cNvPr id="7" name="CasellaDiTesto 6">
@@ -4698,19 +4707,7 @@
                           <a:rPr lang="it-IT" b="0" i="1" smtClean="0">
                             <a:latin typeface="Cambria Math" panose="02040503050406030204" pitchFamily="18" charset="0"/>
                           </a:rPr>
-                          <m:t>0,0,</m:t>
-                        </m:r>
-                        <m:r>
-                          <a:rPr lang="it-IT" b="0" i="1" smtClean="0">
-                            <a:latin typeface="Cambria Math" panose="02040503050406030204" pitchFamily="18" charset="0"/>
-                          </a:rPr>
-                          <m:t>3</m:t>
-                        </m:r>
-                        <m:r>
-                          <a:rPr lang="it-IT" b="0" i="1" smtClean="0">
-                            <a:latin typeface="Cambria Math" panose="02040503050406030204" pitchFamily="18" charset="0"/>
-                          </a:rPr>
-                          <m:t>,0,0,0</m:t>
+                          <m:t>0,0,3,0,0,0</m:t>
                         </m:r>
                       </m:e>
                     </m:d>
@@ -5107,7 +5104,7 @@
             </p:txBody>
           </p:sp>
         </mc:Choice>
-        <mc:Fallback>
+        <mc:Fallback xmlns="">
           <p:sp>
             <p:nvSpPr>
               <p:cNvPr id="7" name="CasellaDiTesto 6">
@@ -5855,8 +5852,8 @@
           </a:p>
         </p:txBody>
       </p:sp>
-      <mc:AlternateContent xmlns:mc="http://schemas.openxmlformats.org/markup-compatibility/2006">
-        <mc:Choice xmlns:a14="http://schemas.microsoft.com/office/drawing/2010/main" Requires="a14">
+      <mc:AlternateContent xmlns:mc="http://schemas.openxmlformats.org/markup-compatibility/2006" xmlns:a14="http://schemas.microsoft.com/office/drawing/2010/main">
+        <mc:Choice Requires="a14">
           <p:sp>
             <p:nvSpPr>
               <p:cNvPr id="16" name="Segnaposto contenuto 15">
@@ -5974,13 +5971,7 @@
                             <a:rPr lang="it-IT" sz="1800" b="0" i="1" smtClean="0">
                               <a:latin typeface="Cambria Math" panose="02040503050406030204" pitchFamily="18" charset="0"/>
                             </a:rPr>
-                            <m:t>,</m:t>
-                          </m:r>
-                          <m:r>
-                            <a:rPr lang="it-IT" sz="1800" b="0" i="1" smtClean="0">
-                              <a:latin typeface="Cambria Math" panose="02040503050406030204" pitchFamily="18" charset="0"/>
-                            </a:rPr>
-                            <m:t> </m:t>
+                            <m:t>, </m:t>
                           </m:r>
                           <m:r>
                             <a:rPr lang="it-IT" sz="1800" b="0" i="1" smtClean="0">
@@ -5998,13 +5989,7 @@
                             <a:rPr lang="it-IT" sz="1800" b="0" i="1" smtClean="0">
                               <a:latin typeface="Cambria Math" panose="02040503050406030204" pitchFamily="18" charset="0"/>
                             </a:rPr>
-                            <m:t>,</m:t>
-                          </m:r>
-                          <m:r>
-                            <a:rPr lang="it-IT" sz="1800" b="0" i="1" smtClean="0">
-                              <a:latin typeface="Cambria Math" panose="02040503050406030204" pitchFamily="18" charset="0"/>
-                            </a:rPr>
-                            <m:t> </m:t>
+                            <m:t>, </m:t>
                           </m:r>
                           <m:r>
                             <a:rPr lang="it-IT" sz="1800" b="0" i="1" smtClean="0">
@@ -6022,13 +6007,7 @@
                             <a:rPr lang="it-IT" sz="1800" b="0" i="1" smtClean="0">
                               <a:latin typeface="Cambria Math" panose="02040503050406030204" pitchFamily="18" charset="0"/>
                             </a:rPr>
-                            <m:t>,</m:t>
-                          </m:r>
-                          <m:r>
-                            <a:rPr lang="it-IT" sz="1800" b="0" i="1" smtClean="0">
-                              <a:latin typeface="Cambria Math" panose="02040503050406030204" pitchFamily="18" charset="0"/>
-                            </a:rPr>
-                            <m:t> </m:t>
+                            <m:t>, </m:t>
                           </m:r>
                           <m:r>
                             <a:rPr lang="it-IT" sz="1800" b="0" i="1" smtClean="0">
@@ -6046,13 +6025,7 @@
                             <a:rPr lang="it-IT" sz="1800" b="0" i="1" smtClean="0">
                               <a:latin typeface="Cambria Math" panose="02040503050406030204" pitchFamily="18" charset="0"/>
                             </a:rPr>
-                            <m:t>,</m:t>
-                          </m:r>
-                          <m:r>
-                            <a:rPr lang="it-IT" sz="1800" b="0" i="1" smtClean="0">
-                              <a:latin typeface="Cambria Math" panose="02040503050406030204" pitchFamily="18" charset="0"/>
-                            </a:rPr>
-                            <m:t> </m:t>
+                            <m:t>, </m:t>
                           </m:r>
                           <m:r>
                             <a:rPr lang="it-IT" sz="1800" b="0" i="1" smtClean="0">
@@ -6143,7 +6116,7 @@
             </p:txBody>
           </p:sp>
         </mc:Choice>
-        <mc:Fallback>
+        <mc:Fallback xmlns="">
           <p:sp>
             <p:nvSpPr>
               <p:cNvPr id="16" name="Segnaposto contenuto 15">
@@ -6230,6 +6203,477 @@
 </p:sld>
 </file>
 
+<file path=ppt/slides/slide18.xml><?xml version="1.0" encoding="utf-8"?>
+<p:sld xmlns:a="http://schemas.openxmlformats.org/drawingml/2006/main" xmlns:r="http://schemas.openxmlformats.org/officeDocument/2006/relationships" xmlns:p="http://schemas.openxmlformats.org/presentationml/2006/main">
+  <p:cSld>
+    <p:spTree>
+      <p:nvGrpSpPr>
+        <p:cNvPr id="1" name=""/>
+        <p:cNvGrpSpPr/>
+        <p:nvPr/>
+      </p:nvGrpSpPr>
+      <p:grpSpPr>
+        <a:xfrm>
+          <a:off x="0" y="0"/>
+          <a:ext cx="0" cy="0"/>
+          <a:chOff x="0" y="0"/>
+          <a:chExt cx="0" cy="0"/>
+        </a:xfrm>
+      </p:grpSpPr>
+      <p:sp>
+        <p:nvSpPr>
+          <p:cNvPr id="2" name="Titolo 1">
+            <a:extLst>
+              <a:ext uri="{FF2B5EF4-FFF2-40B4-BE49-F238E27FC236}">
+                <a16:creationId xmlns:a16="http://schemas.microsoft.com/office/drawing/2014/main" id="{EC4DE27F-9EE0-A747-BF3B-EE0B89D62F48}"/>
+              </a:ext>
+            </a:extLst>
+          </p:cNvPr>
+          <p:cNvSpPr>
+            <a:spLocks noGrp="1"/>
+          </p:cNvSpPr>
+          <p:nvPr>
+            <p:ph type="ctrTitle"/>
+          </p:nvPr>
+        </p:nvSpPr>
+        <p:spPr>
+          <a:xfrm>
+            <a:off x="1524000" y="454393"/>
+            <a:ext cx="9144000" cy="1021230"/>
+          </a:xfrm>
+        </p:spPr>
+        <p:txBody>
+          <a:bodyPr/>
+          <a:lstStyle/>
+          <a:p>
+            <a:r>
+              <a:rPr lang="it-IT" dirty="0" err="1"/>
+              <a:t>Granty</a:t>
+            </a:r>
+            <a:r>
+              <a:rPr lang="it-IT" dirty="0"/>
+              <a:t> </a:t>
+            </a:r>
+            <a:r>
+              <a:rPr lang="it-IT" dirty="0" err="1"/>
+              <a:t>crane</a:t>
+            </a:r>
+            <a:endParaRPr lang="it-IT" dirty="0"/>
+          </a:p>
+        </p:txBody>
+      </p:sp>
+      <p:pic>
+        <p:nvPicPr>
+          <p:cNvPr id="4" name="Immagine 3">
+            <a:extLst>
+              <a:ext uri="{FF2B5EF4-FFF2-40B4-BE49-F238E27FC236}">
+                <a16:creationId xmlns:a16="http://schemas.microsoft.com/office/drawing/2014/main" id="{96D82E7F-6103-A546-BCE8-2F5085DF3467}"/>
+              </a:ext>
+            </a:extLst>
+          </p:cNvPr>
+          <p:cNvPicPr>
+            <a:picLocks noChangeAspect="1"/>
+          </p:cNvPicPr>
+          <p:nvPr/>
+        </p:nvPicPr>
+        <p:blipFill>
+          <a:blip r:embed="rId2"/>
+          <a:stretch>
+            <a:fillRect/>
+          </a:stretch>
+        </p:blipFill>
+        <p:spPr>
+          <a:xfrm>
+            <a:off x="1524000" y="1475623"/>
+            <a:ext cx="3683000" cy="4089400"/>
+          </a:xfrm>
+          <a:prstGeom prst="rect">
+            <a:avLst/>
+          </a:prstGeom>
+        </p:spPr>
+      </p:pic>
+      <p:sp>
+        <p:nvSpPr>
+          <p:cNvPr id="10" name="CasellaDiTesto 9">
+            <a:extLst>
+              <a:ext uri="{FF2B5EF4-FFF2-40B4-BE49-F238E27FC236}">
+                <a16:creationId xmlns:a16="http://schemas.microsoft.com/office/drawing/2014/main" id="{F46E9E04-607C-DB49-8EC7-C6CC7AC882D2}"/>
+              </a:ext>
+            </a:extLst>
+          </p:cNvPr>
+          <p:cNvSpPr txBox="1"/>
+          <p:nvPr/>
+        </p:nvSpPr>
+        <p:spPr>
+          <a:xfrm>
+            <a:off x="5410714" y="2227661"/>
+            <a:ext cx="5257286" cy="2585323"/>
+          </a:xfrm>
+          <a:prstGeom prst="rect">
+            <a:avLst/>
+          </a:prstGeom>
+          <a:noFill/>
+        </p:spPr>
+        <p:txBody>
+          <a:bodyPr wrap="square" rtlCol="0">
+            <a:spAutoFit/>
+          </a:bodyPr>
+          <a:lstStyle/>
+          <a:p>
+            <a:r>
+              <a:rPr lang="it-IT" dirty="0"/>
+              <a:t>Un modello di carro-ponte è rappresentato nella figura a fianco, assumendo che il carrello possa muoversi soltanto lungo la direzione del binario sul quale è posto, è ragionevole assumere che lo spostamento nella direzione perpendicolare al binario sia nullo e così anche l’angolo </a:t>
+            </a:r>
+            <a:r>
+              <a:rPr lang="it-IT" dirty="0" err="1"/>
+              <a:t>ɸ</a:t>
+            </a:r>
+            <a:r>
+              <a:rPr lang="it-IT" dirty="0"/>
+              <a:t>.</a:t>
+            </a:r>
+          </a:p>
+          <a:p>
+            <a:r>
+              <a:rPr lang="it-IT" dirty="0"/>
+              <a:t>Si assume che anche la forza sia diretta lungo la direzione del binario, riportando così il modello ad una sua semplificazione in 2D.</a:t>
+            </a:r>
+          </a:p>
+        </p:txBody>
+      </p:sp>
+    </p:spTree>
+    <p:extLst>
+      <p:ext uri="{BB962C8B-B14F-4D97-AF65-F5344CB8AC3E}">
+        <p14:creationId xmlns:p14="http://schemas.microsoft.com/office/powerpoint/2010/main" val="2508728585"/>
+      </p:ext>
+    </p:extLst>
+  </p:cSld>
+  <p:clrMapOvr>
+    <a:masterClrMapping/>
+  </p:clrMapOvr>
+</p:sld>
+</file>
+
+<file path=ppt/slides/slide19.xml><?xml version="1.0" encoding="utf-8"?>
+<p:sld xmlns:a="http://schemas.openxmlformats.org/drawingml/2006/main" xmlns:r="http://schemas.openxmlformats.org/officeDocument/2006/relationships" xmlns:p="http://schemas.openxmlformats.org/presentationml/2006/main">
+  <p:cSld>
+    <p:spTree>
+      <p:nvGrpSpPr>
+        <p:cNvPr id="1" name=""/>
+        <p:cNvGrpSpPr/>
+        <p:nvPr/>
+      </p:nvGrpSpPr>
+      <p:grpSpPr>
+        <a:xfrm>
+          <a:off x="0" y="0"/>
+          <a:ext cx="0" cy="0"/>
+          <a:chOff x="0" y="0"/>
+          <a:chExt cx="0" cy="0"/>
+        </a:xfrm>
+      </p:grpSpPr>
+      <p:pic>
+        <p:nvPicPr>
+          <p:cNvPr id="5" name="Immagine 4">
+            <a:extLst>
+              <a:ext uri="{FF2B5EF4-FFF2-40B4-BE49-F238E27FC236}">
+                <a16:creationId xmlns:a16="http://schemas.microsoft.com/office/drawing/2014/main" id="{6B271FC1-9853-8B46-B074-A5E6D5A515AD}"/>
+              </a:ext>
+            </a:extLst>
+          </p:cNvPr>
+          <p:cNvPicPr>
+            <a:picLocks noChangeAspect="1"/>
+          </p:cNvPicPr>
+          <p:nvPr/>
+        </p:nvPicPr>
+        <p:blipFill>
+          <a:blip r:embed="rId2"/>
+          <a:stretch>
+            <a:fillRect/>
+          </a:stretch>
+        </p:blipFill>
+        <p:spPr>
+          <a:xfrm>
+            <a:off x="1714029" y="1475623"/>
+            <a:ext cx="4191943" cy="2667600"/>
+          </a:xfrm>
+          <a:prstGeom prst="rect">
+            <a:avLst/>
+          </a:prstGeom>
+        </p:spPr>
+      </p:pic>
+      <p:sp>
+        <p:nvSpPr>
+          <p:cNvPr id="6" name="CasellaDiTesto 5">
+            <a:extLst>
+              <a:ext uri="{FF2B5EF4-FFF2-40B4-BE49-F238E27FC236}">
+                <a16:creationId xmlns:a16="http://schemas.microsoft.com/office/drawing/2014/main" id="{11F4C9D8-CB26-E74E-B18E-7614421A6E93}"/>
+              </a:ext>
+            </a:extLst>
+          </p:cNvPr>
+          <p:cNvSpPr txBox="1"/>
+          <p:nvPr/>
+        </p:nvSpPr>
+        <p:spPr>
+          <a:xfrm>
+            <a:off x="1524000" y="4143223"/>
+            <a:ext cx="5531730" cy="1938992"/>
+          </a:xfrm>
+          <a:prstGeom prst="rect">
+            <a:avLst/>
+          </a:prstGeom>
+          <a:noFill/>
+        </p:spPr>
+        <p:txBody>
+          <a:bodyPr wrap="square" rtlCol="0">
+            <a:spAutoFit/>
+          </a:bodyPr>
+          <a:lstStyle/>
+          <a:p>
+            <a:r>
+              <a:rPr lang="it-IT" sz="2000" dirty="0"/>
+              <a:t>Parametri del modello:	l = 0.2 m</a:t>
+            </a:r>
+          </a:p>
+          <a:p>
+            <a:r>
+              <a:rPr lang="it-IT" sz="2000" dirty="0"/>
+              <a:t>			g = 9.81 m/s</a:t>
+            </a:r>
+            <a:r>
+              <a:rPr lang="it-IT" sz="2000" baseline="30000" dirty="0"/>
+              <a:t>2</a:t>
+            </a:r>
+          </a:p>
+          <a:p>
+            <a:r>
+              <a:rPr lang="it-IT" sz="2000" dirty="0"/>
+              <a:t>			M = 0.548069759 kg</a:t>
+            </a:r>
+          </a:p>
+          <a:p>
+            <a:r>
+              <a:rPr lang="it-IT" sz="2000" dirty="0"/>
+              <a:t>			m</a:t>
+            </a:r>
+            <a:r>
+              <a:rPr lang="it-IT" sz="2000" baseline="-25000" dirty="0"/>
+              <a:t>1</a:t>
+            </a:r>
+            <a:r>
+              <a:rPr lang="it-IT" sz="2000" dirty="0"/>
+              <a:t> = 0.088338025 kg</a:t>
+            </a:r>
+          </a:p>
+          <a:p>
+            <a:r>
+              <a:rPr lang="it-IT" sz="2000" dirty="0"/>
+              <a:t>			m</a:t>
+            </a:r>
+            <a:r>
+              <a:rPr lang="it-IT" sz="2000" baseline="-25000" dirty="0"/>
+              <a:t>2</a:t>
+            </a:r>
+            <a:r>
+              <a:rPr lang="it-IT" sz="2000" dirty="0"/>
+              <a:t> = 0.022245336 kg</a:t>
+            </a:r>
+          </a:p>
+          <a:p>
+            <a:r>
+              <a:rPr lang="it-IT" sz="2000" dirty="0"/>
+              <a:t>			b</a:t>
+            </a:r>
+            <a:r>
+              <a:rPr lang="it-IT" sz="2000" baseline="-25000" dirty="0"/>
+              <a:t>1</a:t>
+            </a:r>
+            <a:r>
+              <a:rPr lang="it-IT" sz="2000" dirty="0"/>
+              <a:t> = 0.1	b</a:t>
+            </a:r>
+            <a:r>
+              <a:rPr lang="it-IT" sz="2000" baseline="-25000" dirty="0"/>
+              <a:t>2</a:t>
+            </a:r>
+            <a:r>
+              <a:rPr lang="it-IT" sz="2000" dirty="0"/>
+              <a:t> = 0.5</a:t>
+            </a:r>
+          </a:p>
+        </p:txBody>
+      </p:sp>
+      <p:sp>
+        <p:nvSpPr>
+          <p:cNvPr id="8" name="Titolo 1">
+            <a:extLst>
+              <a:ext uri="{FF2B5EF4-FFF2-40B4-BE49-F238E27FC236}">
+                <a16:creationId xmlns:a16="http://schemas.microsoft.com/office/drawing/2014/main" id="{E8EDF0BB-0558-644B-BB96-58C4BD179ABC}"/>
+              </a:ext>
+            </a:extLst>
+          </p:cNvPr>
+          <p:cNvSpPr txBox="1">
+            <a:spLocks/>
+          </p:cNvSpPr>
+          <p:nvPr/>
+        </p:nvSpPr>
+        <p:spPr>
+          <a:xfrm>
+            <a:off x="1524000" y="454393"/>
+            <a:ext cx="9144000" cy="1021230"/>
+          </a:xfrm>
+          <a:prstGeom prst="rect">
+            <a:avLst/>
+          </a:prstGeom>
+        </p:spPr>
+        <p:txBody>
+          <a:bodyPr vert="horz" lIns="91440" tIns="45720" rIns="91440" bIns="45720" rtlCol="0" anchor="ctr">
+            <a:normAutofit/>
+          </a:bodyPr>
+          <a:lstStyle>
+            <a:lvl1pPr algn="l" defTabSz="914400" rtl="0" eaLnBrk="1" latinLnBrk="0" hangingPunct="1">
+              <a:lnSpc>
+                <a:spcPct val="90000"/>
+              </a:lnSpc>
+              <a:spcBef>
+                <a:spcPct val="0"/>
+              </a:spcBef>
+              <a:buNone/>
+              <a:defRPr sz="4400" kern="1200">
+                <a:solidFill>
+                  <a:schemeClr val="tx1"/>
+                </a:solidFill>
+                <a:latin typeface="+mj-lt"/>
+                <a:ea typeface="+mj-ea"/>
+                <a:cs typeface="+mj-cs"/>
+              </a:defRPr>
+            </a:lvl1pPr>
+          </a:lstStyle>
+          <a:p>
+            <a:pPr algn="ctr"/>
+            <a:r>
+              <a:rPr lang="it-IT" dirty="0" err="1"/>
+              <a:t>Granty</a:t>
+            </a:r>
+            <a:r>
+              <a:rPr lang="it-IT" dirty="0"/>
+              <a:t> </a:t>
+            </a:r>
+            <a:r>
+              <a:rPr lang="it-IT" dirty="0" err="1"/>
+              <a:t>crane</a:t>
+            </a:r>
+            <a:endParaRPr lang="it-IT" dirty="0"/>
+          </a:p>
+        </p:txBody>
+      </p:sp>
+      <p:sp>
+        <p:nvSpPr>
+          <p:cNvPr id="9" name="CasellaDiTesto 8">
+            <a:extLst>
+              <a:ext uri="{FF2B5EF4-FFF2-40B4-BE49-F238E27FC236}">
+                <a16:creationId xmlns:a16="http://schemas.microsoft.com/office/drawing/2014/main" id="{86F89E2B-2067-3C4F-A4E7-D7C1F99F332E}"/>
+              </a:ext>
+            </a:extLst>
+          </p:cNvPr>
+          <p:cNvSpPr txBox="1"/>
+          <p:nvPr/>
+        </p:nvSpPr>
+        <p:spPr>
+          <a:xfrm>
+            <a:off x="6978917" y="1475623"/>
+            <a:ext cx="2959510" cy="461665"/>
+          </a:xfrm>
+          <a:prstGeom prst="rect">
+            <a:avLst/>
+          </a:prstGeom>
+          <a:noFill/>
+        </p:spPr>
+        <p:txBody>
+          <a:bodyPr wrap="square" rtlCol="0">
+            <a:spAutoFit/>
+          </a:bodyPr>
+          <a:lstStyle/>
+          <a:p>
+            <a:r>
+              <a:rPr lang="it-IT" sz="2400" dirty="0"/>
+              <a:t>MODELLO DINAMICO:</a:t>
+            </a:r>
+          </a:p>
+        </p:txBody>
+      </p:sp>
+      <p:pic>
+        <p:nvPicPr>
+          <p:cNvPr id="11" name="Immagine 10">
+            <a:extLst>
+              <a:ext uri="{FF2B5EF4-FFF2-40B4-BE49-F238E27FC236}">
+                <a16:creationId xmlns:a16="http://schemas.microsoft.com/office/drawing/2014/main" id="{F0486A9B-6256-E942-9507-095F0D92416D}"/>
+              </a:ext>
+            </a:extLst>
+          </p:cNvPr>
+          <p:cNvPicPr>
+            <a:picLocks noChangeAspect="1"/>
+          </p:cNvPicPr>
+          <p:nvPr/>
+        </p:nvPicPr>
+        <p:blipFill>
+          <a:blip r:embed="rId3"/>
+          <a:stretch>
+            <a:fillRect/>
+          </a:stretch>
+        </p:blipFill>
+        <p:spPr>
+          <a:xfrm>
+            <a:off x="5905972" y="1937288"/>
+            <a:ext cx="5105400" cy="1085850"/>
+          </a:xfrm>
+          <a:prstGeom prst="rect">
+            <a:avLst/>
+          </a:prstGeom>
+        </p:spPr>
+      </p:pic>
+      <p:pic>
+        <p:nvPicPr>
+          <p:cNvPr id="13" name="Immagine 12">
+            <a:extLst>
+              <a:ext uri="{FF2B5EF4-FFF2-40B4-BE49-F238E27FC236}">
+                <a16:creationId xmlns:a16="http://schemas.microsoft.com/office/drawing/2014/main" id="{E4C3C8CA-AA19-7547-AFE9-5AAE043E0B99}"/>
+              </a:ext>
+            </a:extLst>
+          </p:cNvPr>
+          <p:cNvPicPr>
+            <a:picLocks noChangeAspect="1"/>
+          </p:cNvPicPr>
+          <p:nvPr/>
+        </p:nvPicPr>
+        <p:blipFill>
+          <a:blip r:embed="rId4"/>
+          <a:stretch>
+            <a:fillRect/>
+          </a:stretch>
+        </p:blipFill>
+        <p:spPr>
+          <a:xfrm>
+            <a:off x="7245759" y="3023138"/>
+            <a:ext cx="2095500" cy="1485900"/>
+          </a:xfrm>
+          <a:prstGeom prst="rect">
+            <a:avLst/>
+          </a:prstGeom>
+        </p:spPr>
+      </p:pic>
+    </p:spTree>
+    <p:extLst>
+      <p:ext uri="{BB962C8B-B14F-4D97-AF65-F5344CB8AC3E}">
+        <p14:creationId xmlns:p14="http://schemas.microsoft.com/office/powerpoint/2010/main" val="46173228"/>
+      </p:ext>
+    </p:extLst>
+  </p:cSld>
+  <p:clrMapOvr>
+    <a:masterClrMapping/>
+  </p:clrMapOvr>
+</p:sld>
+</file>
+
 <file path=ppt/slides/slide2.xml><?xml version="1.0" encoding="utf-8"?>
 <p:sld xmlns:a="http://schemas.openxmlformats.org/drawingml/2006/main" xmlns:r="http://schemas.openxmlformats.org/officeDocument/2006/relationships" xmlns:p="http://schemas.openxmlformats.org/presentationml/2006/main">
   <p:cSld>
@@ -6388,6 +6832,41 @@
             </a:r>
           </a:p>
           <a:p>
+            <a:pPr marL="0" indent="0">
+              <a:buClr>
+                <a:schemeClr val="tx2">
+                  <a:lumMod val="20000"/>
+                  <a:lumOff val="80000"/>
+                </a:schemeClr>
+              </a:buClr>
+              <a:buNone/>
+            </a:pPr>
+            <a:endParaRPr lang="it-IT" dirty="0"/>
+          </a:p>
+          <a:p>
+            <a:pPr>
+              <a:buClr>
+                <a:schemeClr val="tx2">
+                  <a:lumMod val="20000"/>
+                  <a:lumOff val="80000"/>
+                </a:schemeClr>
+              </a:buClr>
+            </a:pPr>
+            <a:r>
+              <a:rPr lang="it-IT" dirty="0" err="1"/>
+              <a:t>Granty</a:t>
+            </a:r>
+            <a:r>
+              <a:rPr lang="it-IT" dirty="0"/>
+              <a:t> </a:t>
+            </a:r>
+            <a:r>
+              <a:rPr lang="it-IT" dirty="0" err="1"/>
+              <a:t>crane</a:t>
+            </a:r>
+            <a:endParaRPr lang="it-IT" dirty="0"/>
+          </a:p>
+          <a:p>
             <a:pPr lvl="1">
               <a:buClr>
                 <a:schemeClr val="tx2">
@@ -6398,8 +6877,27 @@
             </a:pPr>
             <a:r>
               <a:rPr lang="it-IT" dirty="0"/>
-              <a:t>Confronti tra controllori</a:t>
-            </a:r>
+              <a:t>Controllabilità e Osservabilità</a:t>
+            </a:r>
+          </a:p>
+          <a:p>
+            <a:pPr lvl="1">
+              <a:buClr>
+                <a:schemeClr val="tx2">
+                  <a:lumMod val="20000"/>
+                  <a:lumOff val="80000"/>
+                </a:schemeClr>
+              </a:buClr>
+            </a:pPr>
+            <a:r>
+              <a:rPr lang="it-IT" dirty="0"/>
+              <a:t>Feedback </a:t>
+            </a:r>
+            <a:r>
+              <a:rPr lang="it-IT" dirty="0" err="1"/>
+              <a:t>Linearization</a:t>
+            </a:r>
+            <a:endParaRPr lang="it-IT" dirty="0"/>
           </a:p>
         </p:txBody>
       </p:sp>
@@ -6426,7 +6924,7 @@
           <a:p>
             <a:fld id="{4EF59023-6175-3944-979D-CFE35E3A8267}" type="datetime1">
               <a:rPr lang="it-IT" smtClean="0"/>
-              <a:t>28/07/21</a:t>
+              <a:t>11/10/21</a:t>
             </a:fld>
             <a:endParaRPr lang="en-US" dirty="0"/>
           </a:p>
@@ -6494,6 +6992,3324 @@
     <p:extLst>
       <p:ext uri="{BB962C8B-B14F-4D97-AF65-F5344CB8AC3E}">
         <p14:creationId xmlns:p14="http://schemas.microsoft.com/office/powerpoint/2010/main" val="1287215491"/>
+      </p:ext>
+    </p:extLst>
+  </p:cSld>
+  <p:clrMapOvr>
+    <a:masterClrMapping/>
+  </p:clrMapOvr>
+</p:sld>
+</file>
+
+<file path=ppt/slides/slide20.xml><?xml version="1.0" encoding="utf-8"?>
+<p:sld xmlns:a="http://schemas.openxmlformats.org/drawingml/2006/main" xmlns:r="http://schemas.openxmlformats.org/officeDocument/2006/relationships" xmlns:p="http://schemas.openxmlformats.org/presentationml/2006/main">
+  <p:cSld>
+    <p:spTree>
+      <p:nvGrpSpPr>
+        <p:cNvPr id="1" name=""/>
+        <p:cNvGrpSpPr/>
+        <p:nvPr/>
+      </p:nvGrpSpPr>
+      <p:grpSpPr>
+        <a:xfrm>
+          <a:off x="0" y="0"/>
+          <a:ext cx="0" cy="0"/>
+          <a:chOff x="0" y="0"/>
+          <a:chExt cx="0" cy="0"/>
+        </a:xfrm>
+      </p:grpSpPr>
+      <p:pic>
+        <p:nvPicPr>
+          <p:cNvPr id="5" name="Immagine 4">
+            <a:extLst>
+              <a:ext uri="{FF2B5EF4-FFF2-40B4-BE49-F238E27FC236}">
+                <a16:creationId xmlns:a16="http://schemas.microsoft.com/office/drawing/2014/main" id="{6B271FC1-9853-8B46-B074-A5E6D5A515AD}"/>
+              </a:ext>
+            </a:extLst>
+          </p:cNvPr>
+          <p:cNvPicPr>
+            <a:picLocks noChangeAspect="1"/>
+          </p:cNvPicPr>
+          <p:nvPr/>
+        </p:nvPicPr>
+        <p:blipFill>
+          <a:blip r:embed="rId2"/>
+          <a:stretch>
+            <a:fillRect/>
+          </a:stretch>
+        </p:blipFill>
+        <p:spPr>
+          <a:xfrm>
+            <a:off x="1714030" y="1475623"/>
+            <a:ext cx="2093143" cy="1332000"/>
+          </a:xfrm>
+          <a:prstGeom prst="rect">
+            <a:avLst/>
+          </a:prstGeom>
+        </p:spPr>
+      </p:pic>
+      <p:sp>
+        <p:nvSpPr>
+          <p:cNvPr id="8" name="Titolo 1">
+            <a:extLst>
+              <a:ext uri="{FF2B5EF4-FFF2-40B4-BE49-F238E27FC236}">
+                <a16:creationId xmlns:a16="http://schemas.microsoft.com/office/drawing/2014/main" id="{E8EDF0BB-0558-644B-BB96-58C4BD179ABC}"/>
+              </a:ext>
+            </a:extLst>
+          </p:cNvPr>
+          <p:cNvSpPr txBox="1">
+            <a:spLocks/>
+          </p:cNvSpPr>
+          <p:nvPr/>
+        </p:nvSpPr>
+        <p:spPr>
+          <a:xfrm>
+            <a:off x="1524000" y="454393"/>
+            <a:ext cx="9144000" cy="1021230"/>
+          </a:xfrm>
+          <a:prstGeom prst="rect">
+            <a:avLst/>
+          </a:prstGeom>
+        </p:spPr>
+        <p:txBody>
+          <a:bodyPr vert="horz" lIns="91440" tIns="45720" rIns="91440" bIns="45720" rtlCol="0" anchor="ctr">
+            <a:normAutofit/>
+          </a:bodyPr>
+          <a:lstStyle>
+            <a:lvl1pPr algn="l" defTabSz="914400" rtl="0" eaLnBrk="1" latinLnBrk="0" hangingPunct="1">
+              <a:lnSpc>
+                <a:spcPct val="90000"/>
+              </a:lnSpc>
+              <a:spcBef>
+                <a:spcPct val="0"/>
+              </a:spcBef>
+              <a:buNone/>
+              <a:defRPr sz="4400" kern="1200">
+                <a:solidFill>
+                  <a:schemeClr val="tx1"/>
+                </a:solidFill>
+                <a:latin typeface="+mj-lt"/>
+                <a:ea typeface="+mj-ea"/>
+                <a:cs typeface="+mj-cs"/>
+              </a:defRPr>
+            </a:lvl1pPr>
+          </a:lstStyle>
+          <a:p>
+            <a:pPr algn="ctr"/>
+            <a:r>
+              <a:rPr lang="it-IT" dirty="0" err="1"/>
+              <a:t>Granty</a:t>
+            </a:r>
+            <a:r>
+              <a:rPr lang="it-IT" dirty="0"/>
+              <a:t> </a:t>
+            </a:r>
+            <a:r>
+              <a:rPr lang="it-IT" dirty="0" err="1"/>
+              <a:t>crane</a:t>
+            </a:r>
+            <a:endParaRPr lang="it-IT" dirty="0"/>
+          </a:p>
+        </p:txBody>
+      </p:sp>
+      <p:sp>
+        <p:nvSpPr>
+          <p:cNvPr id="9" name="CasellaDiTesto 8">
+            <a:extLst>
+              <a:ext uri="{FF2B5EF4-FFF2-40B4-BE49-F238E27FC236}">
+                <a16:creationId xmlns:a16="http://schemas.microsoft.com/office/drawing/2014/main" id="{86F89E2B-2067-3C4F-A4E7-D7C1F99F332E}"/>
+              </a:ext>
+            </a:extLst>
+          </p:cNvPr>
+          <p:cNvSpPr txBox="1"/>
+          <p:nvPr/>
+        </p:nvSpPr>
+        <p:spPr>
+          <a:xfrm>
+            <a:off x="3997202" y="1475623"/>
+            <a:ext cx="6670797" cy="1384995"/>
+          </a:xfrm>
+          <a:prstGeom prst="rect">
+            <a:avLst/>
+          </a:prstGeom>
+          <a:noFill/>
+        </p:spPr>
+        <p:txBody>
+          <a:bodyPr wrap="square" rtlCol="0">
+            <a:spAutoFit/>
+          </a:bodyPr>
+          <a:lstStyle/>
+          <a:p>
+            <a:r>
+              <a:rPr lang="it-IT" sz="2400" dirty="0"/>
+              <a:t>MODELLO DINAMICO:</a:t>
+            </a:r>
+          </a:p>
+          <a:p>
+            <a:r>
+              <a:rPr lang="it-IT" sz="2000" dirty="0"/>
+              <a:t>A partire dalle equazioni della slide precedente, con semplici calcoli si ottengono le equazioni della dinamica del modello, scritte in forma standard che seguono, con vettore di stato:</a:t>
+            </a:r>
+          </a:p>
+        </p:txBody>
+      </p:sp>
+      <p:pic>
+        <p:nvPicPr>
+          <p:cNvPr id="3" name="Immagine 2">
+            <a:extLst>
+              <a:ext uri="{FF2B5EF4-FFF2-40B4-BE49-F238E27FC236}">
+                <a16:creationId xmlns:a16="http://schemas.microsoft.com/office/drawing/2014/main" id="{F55D6311-1534-8A48-A8EE-1261BFF4A2AC}"/>
+              </a:ext>
+            </a:extLst>
+          </p:cNvPr>
+          <p:cNvPicPr>
+            <a:picLocks noChangeAspect="1"/>
+          </p:cNvPicPr>
+          <p:nvPr/>
+        </p:nvPicPr>
+        <p:blipFill>
+          <a:blip r:embed="rId3"/>
+          <a:stretch>
+            <a:fillRect/>
+          </a:stretch>
+        </p:blipFill>
+        <p:spPr>
+          <a:xfrm>
+            <a:off x="6748400" y="2860618"/>
+            <a:ext cx="1168400" cy="1181100"/>
+          </a:xfrm>
+          <a:prstGeom prst="rect">
+            <a:avLst/>
+          </a:prstGeom>
+        </p:spPr>
+      </p:pic>
+      <p:pic>
+        <p:nvPicPr>
+          <p:cNvPr id="7" name="Immagine 6">
+            <a:extLst>
+              <a:ext uri="{FF2B5EF4-FFF2-40B4-BE49-F238E27FC236}">
+                <a16:creationId xmlns:a16="http://schemas.microsoft.com/office/drawing/2014/main" id="{A539952D-DE65-B548-BF2B-F3A0D95C318E}"/>
+              </a:ext>
+            </a:extLst>
+          </p:cNvPr>
+          <p:cNvPicPr>
+            <a:picLocks noChangeAspect="1"/>
+          </p:cNvPicPr>
+          <p:nvPr/>
+        </p:nvPicPr>
+        <p:blipFill>
+          <a:blip r:embed="rId4"/>
+          <a:stretch>
+            <a:fillRect/>
+          </a:stretch>
+        </p:blipFill>
+        <p:spPr>
+          <a:xfrm>
+            <a:off x="1362075" y="4041718"/>
+            <a:ext cx="9467850" cy="2266950"/>
+          </a:xfrm>
+          <a:prstGeom prst="rect">
+            <a:avLst/>
+          </a:prstGeom>
+        </p:spPr>
+      </p:pic>
+    </p:spTree>
+    <p:extLst>
+      <p:ext uri="{BB962C8B-B14F-4D97-AF65-F5344CB8AC3E}">
+        <p14:creationId xmlns:p14="http://schemas.microsoft.com/office/powerpoint/2010/main" val="445715538"/>
+      </p:ext>
+    </p:extLst>
+  </p:cSld>
+  <p:clrMapOvr>
+    <a:masterClrMapping/>
+  </p:clrMapOvr>
+</p:sld>
+</file>
+
+<file path=ppt/slides/slide21.xml><?xml version="1.0" encoding="utf-8"?>
+<p:sld xmlns:a="http://schemas.openxmlformats.org/drawingml/2006/main" xmlns:r="http://schemas.openxmlformats.org/officeDocument/2006/relationships" xmlns:p="http://schemas.openxmlformats.org/presentationml/2006/main">
+  <p:cSld>
+    <p:spTree>
+      <p:nvGrpSpPr>
+        <p:cNvPr id="1" name=""/>
+        <p:cNvGrpSpPr/>
+        <p:nvPr/>
+      </p:nvGrpSpPr>
+      <p:grpSpPr>
+        <a:xfrm>
+          <a:off x="0" y="0"/>
+          <a:ext cx="0" cy="0"/>
+          <a:chOff x="0" y="0"/>
+          <a:chExt cx="0" cy="0"/>
+        </a:xfrm>
+      </p:grpSpPr>
+      <p:pic>
+        <p:nvPicPr>
+          <p:cNvPr id="5" name="Immagine 4">
+            <a:extLst>
+              <a:ext uri="{FF2B5EF4-FFF2-40B4-BE49-F238E27FC236}">
+                <a16:creationId xmlns:a16="http://schemas.microsoft.com/office/drawing/2014/main" id="{6B271FC1-9853-8B46-B074-A5E6D5A515AD}"/>
+              </a:ext>
+            </a:extLst>
+          </p:cNvPr>
+          <p:cNvPicPr>
+            <a:picLocks noChangeAspect="1"/>
+          </p:cNvPicPr>
+          <p:nvPr/>
+        </p:nvPicPr>
+        <p:blipFill>
+          <a:blip r:embed="rId2"/>
+          <a:stretch>
+            <a:fillRect/>
+          </a:stretch>
+        </p:blipFill>
+        <p:spPr>
+          <a:xfrm>
+            <a:off x="1714030" y="1475623"/>
+            <a:ext cx="2093143" cy="1332000"/>
+          </a:xfrm>
+          <a:prstGeom prst="rect">
+            <a:avLst/>
+          </a:prstGeom>
+        </p:spPr>
+      </p:pic>
+      <p:sp>
+        <p:nvSpPr>
+          <p:cNvPr id="8" name="Titolo 1">
+            <a:extLst>
+              <a:ext uri="{FF2B5EF4-FFF2-40B4-BE49-F238E27FC236}">
+                <a16:creationId xmlns:a16="http://schemas.microsoft.com/office/drawing/2014/main" id="{E8EDF0BB-0558-644B-BB96-58C4BD179ABC}"/>
+              </a:ext>
+            </a:extLst>
+          </p:cNvPr>
+          <p:cNvSpPr txBox="1">
+            <a:spLocks/>
+          </p:cNvSpPr>
+          <p:nvPr/>
+        </p:nvSpPr>
+        <p:spPr>
+          <a:xfrm>
+            <a:off x="1524000" y="454393"/>
+            <a:ext cx="9144000" cy="1021230"/>
+          </a:xfrm>
+          <a:prstGeom prst="rect">
+            <a:avLst/>
+          </a:prstGeom>
+        </p:spPr>
+        <p:txBody>
+          <a:bodyPr vert="horz" lIns="91440" tIns="45720" rIns="91440" bIns="45720" rtlCol="0" anchor="ctr">
+            <a:normAutofit/>
+          </a:bodyPr>
+          <a:lstStyle>
+            <a:lvl1pPr algn="l" defTabSz="914400" rtl="0" eaLnBrk="1" latinLnBrk="0" hangingPunct="1">
+              <a:lnSpc>
+                <a:spcPct val="90000"/>
+              </a:lnSpc>
+              <a:spcBef>
+                <a:spcPct val="0"/>
+              </a:spcBef>
+              <a:buNone/>
+              <a:defRPr sz="4400" kern="1200">
+                <a:solidFill>
+                  <a:schemeClr val="tx1"/>
+                </a:solidFill>
+                <a:latin typeface="+mj-lt"/>
+                <a:ea typeface="+mj-ea"/>
+                <a:cs typeface="+mj-cs"/>
+              </a:defRPr>
+            </a:lvl1pPr>
+          </a:lstStyle>
+          <a:p>
+            <a:pPr algn="ctr"/>
+            <a:r>
+              <a:rPr lang="it-IT" dirty="0" err="1"/>
+              <a:t>Granty</a:t>
+            </a:r>
+            <a:r>
+              <a:rPr lang="it-IT" dirty="0"/>
+              <a:t> </a:t>
+            </a:r>
+            <a:r>
+              <a:rPr lang="it-IT" dirty="0" err="1"/>
+              <a:t>crane</a:t>
+            </a:r>
+            <a:endParaRPr lang="it-IT" dirty="0"/>
+          </a:p>
+        </p:txBody>
+      </p:sp>
+      <p:sp>
+        <p:nvSpPr>
+          <p:cNvPr id="9" name="CasellaDiTesto 8">
+            <a:extLst>
+              <a:ext uri="{FF2B5EF4-FFF2-40B4-BE49-F238E27FC236}">
+                <a16:creationId xmlns:a16="http://schemas.microsoft.com/office/drawing/2014/main" id="{86F89E2B-2067-3C4F-A4E7-D7C1F99F332E}"/>
+              </a:ext>
+            </a:extLst>
+          </p:cNvPr>
+          <p:cNvSpPr txBox="1"/>
+          <p:nvPr/>
+        </p:nvSpPr>
+        <p:spPr>
+          <a:xfrm>
+            <a:off x="3997202" y="1475623"/>
+            <a:ext cx="6670797" cy="1384995"/>
+          </a:xfrm>
+          <a:prstGeom prst="rect">
+            <a:avLst/>
+          </a:prstGeom>
+          <a:noFill/>
+        </p:spPr>
+        <p:txBody>
+          <a:bodyPr wrap="square" rtlCol="0">
+            <a:spAutoFit/>
+          </a:bodyPr>
+          <a:lstStyle/>
+          <a:p>
+            <a:r>
+              <a:rPr lang="it-IT" sz="2400" dirty="0"/>
+              <a:t>MODELLO DINAMICO:</a:t>
+            </a:r>
+          </a:p>
+          <a:p>
+            <a:r>
+              <a:rPr lang="it-IT" sz="2000" dirty="0"/>
+              <a:t>È quindi possibile individuare il vettore delle funzioni di stato, delle funzioni di ingresso e delle uscite e scrivere il sistema nella forma </a:t>
+            </a:r>
+          </a:p>
+        </p:txBody>
+      </p:sp>
+      <p:pic>
+        <p:nvPicPr>
+          <p:cNvPr id="4" name="Immagine 3">
+            <a:extLst>
+              <a:ext uri="{FF2B5EF4-FFF2-40B4-BE49-F238E27FC236}">
+                <a16:creationId xmlns:a16="http://schemas.microsoft.com/office/drawing/2014/main" id="{0BEAAF86-3F48-8847-8D11-8CCFF5FC089D}"/>
+              </a:ext>
+            </a:extLst>
+          </p:cNvPr>
+          <p:cNvPicPr>
+            <a:picLocks noChangeAspect="1"/>
+          </p:cNvPicPr>
+          <p:nvPr/>
+        </p:nvPicPr>
+        <p:blipFill>
+          <a:blip r:embed="rId3"/>
+          <a:stretch>
+            <a:fillRect/>
+          </a:stretch>
+        </p:blipFill>
+        <p:spPr>
+          <a:xfrm>
+            <a:off x="6507100" y="2807623"/>
+            <a:ext cx="1651000" cy="660400"/>
+          </a:xfrm>
+          <a:prstGeom prst="rect">
+            <a:avLst/>
+          </a:prstGeom>
+        </p:spPr>
+      </p:pic>
+      <p:pic>
+        <p:nvPicPr>
+          <p:cNvPr id="7" name="Immagine 6">
+            <a:extLst>
+              <a:ext uri="{FF2B5EF4-FFF2-40B4-BE49-F238E27FC236}">
+                <a16:creationId xmlns:a16="http://schemas.microsoft.com/office/drawing/2014/main" id="{F9F8DC63-EB5D-374B-9F4A-A1EF5FF89A21}"/>
+              </a:ext>
+            </a:extLst>
+          </p:cNvPr>
+          <p:cNvPicPr>
+            <a:picLocks noChangeAspect="1"/>
+          </p:cNvPicPr>
+          <p:nvPr/>
+        </p:nvPicPr>
+        <p:blipFill>
+          <a:blip r:embed="rId4"/>
+          <a:stretch>
+            <a:fillRect/>
+          </a:stretch>
+        </p:blipFill>
+        <p:spPr>
+          <a:xfrm>
+            <a:off x="1524000" y="3468023"/>
+            <a:ext cx="6477000" cy="1603375"/>
+          </a:xfrm>
+          <a:prstGeom prst="rect">
+            <a:avLst/>
+          </a:prstGeom>
+        </p:spPr>
+      </p:pic>
+      <p:pic>
+        <p:nvPicPr>
+          <p:cNvPr id="11" name="Immagine 10">
+            <a:extLst>
+              <a:ext uri="{FF2B5EF4-FFF2-40B4-BE49-F238E27FC236}">
+                <a16:creationId xmlns:a16="http://schemas.microsoft.com/office/drawing/2014/main" id="{1A63D091-8FD0-D943-8BE5-2D5DFF337684}"/>
+              </a:ext>
+            </a:extLst>
+          </p:cNvPr>
+          <p:cNvPicPr>
+            <a:picLocks noChangeAspect="1"/>
+          </p:cNvPicPr>
+          <p:nvPr/>
+        </p:nvPicPr>
+        <p:blipFill>
+          <a:blip r:embed="rId5"/>
+          <a:stretch>
+            <a:fillRect/>
+          </a:stretch>
+        </p:blipFill>
+        <p:spPr>
+          <a:xfrm>
+            <a:off x="8001000" y="3468023"/>
+            <a:ext cx="3302000" cy="1619250"/>
+          </a:xfrm>
+          <a:prstGeom prst="rect">
+            <a:avLst/>
+          </a:prstGeom>
+        </p:spPr>
+      </p:pic>
+      <p:pic>
+        <p:nvPicPr>
+          <p:cNvPr id="13" name="Immagine 12">
+            <a:extLst>
+              <a:ext uri="{FF2B5EF4-FFF2-40B4-BE49-F238E27FC236}">
+                <a16:creationId xmlns:a16="http://schemas.microsoft.com/office/drawing/2014/main" id="{C530E6AB-1756-1D43-AEB4-01AD4ABF131F}"/>
+              </a:ext>
+            </a:extLst>
+          </p:cNvPr>
+          <p:cNvPicPr>
+            <a:picLocks noChangeAspect="1"/>
+          </p:cNvPicPr>
+          <p:nvPr/>
+        </p:nvPicPr>
+        <p:blipFill>
+          <a:blip r:embed="rId6"/>
+          <a:stretch>
+            <a:fillRect/>
+          </a:stretch>
+        </p:blipFill>
+        <p:spPr>
+          <a:xfrm>
+            <a:off x="5207000" y="5087273"/>
+            <a:ext cx="1778000" cy="889000"/>
+          </a:xfrm>
+          <a:prstGeom prst="rect">
+            <a:avLst/>
+          </a:prstGeom>
+        </p:spPr>
+      </p:pic>
+    </p:spTree>
+    <p:extLst>
+      <p:ext uri="{BB962C8B-B14F-4D97-AF65-F5344CB8AC3E}">
+        <p14:creationId xmlns:p14="http://schemas.microsoft.com/office/powerpoint/2010/main" val="432094374"/>
+      </p:ext>
+    </p:extLst>
+  </p:cSld>
+  <p:clrMapOvr>
+    <a:masterClrMapping/>
+  </p:clrMapOvr>
+</p:sld>
+</file>
+
+<file path=ppt/slides/slide22.xml><?xml version="1.0" encoding="utf-8"?>
+<p:sld xmlns:a="http://schemas.openxmlformats.org/drawingml/2006/main" xmlns:r="http://schemas.openxmlformats.org/officeDocument/2006/relationships" xmlns:p="http://schemas.openxmlformats.org/presentationml/2006/main">
+  <p:cSld>
+    <p:spTree>
+      <p:nvGrpSpPr>
+        <p:cNvPr id="1" name=""/>
+        <p:cNvGrpSpPr/>
+        <p:nvPr/>
+      </p:nvGrpSpPr>
+      <p:grpSpPr>
+        <a:xfrm>
+          <a:off x="0" y="0"/>
+          <a:ext cx="0" cy="0"/>
+          <a:chOff x="0" y="0"/>
+          <a:chExt cx="0" cy="0"/>
+        </a:xfrm>
+      </p:grpSpPr>
+      <p:pic>
+        <p:nvPicPr>
+          <p:cNvPr id="5" name="Immagine 4">
+            <a:extLst>
+              <a:ext uri="{FF2B5EF4-FFF2-40B4-BE49-F238E27FC236}">
+                <a16:creationId xmlns:a16="http://schemas.microsoft.com/office/drawing/2014/main" id="{6B271FC1-9853-8B46-B074-A5E6D5A515AD}"/>
+              </a:ext>
+            </a:extLst>
+          </p:cNvPr>
+          <p:cNvPicPr>
+            <a:picLocks noChangeAspect="1"/>
+          </p:cNvPicPr>
+          <p:nvPr/>
+        </p:nvPicPr>
+        <p:blipFill>
+          <a:blip r:embed="rId2"/>
+          <a:stretch>
+            <a:fillRect/>
+          </a:stretch>
+        </p:blipFill>
+        <p:spPr>
+          <a:xfrm>
+            <a:off x="1714030" y="1475623"/>
+            <a:ext cx="2093143" cy="1332000"/>
+          </a:xfrm>
+          <a:prstGeom prst="rect">
+            <a:avLst/>
+          </a:prstGeom>
+        </p:spPr>
+      </p:pic>
+      <p:sp>
+        <p:nvSpPr>
+          <p:cNvPr id="8" name="Titolo 1">
+            <a:extLst>
+              <a:ext uri="{FF2B5EF4-FFF2-40B4-BE49-F238E27FC236}">
+                <a16:creationId xmlns:a16="http://schemas.microsoft.com/office/drawing/2014/main" id="{E8EDF0BB-0558-644B-BB96-58C4BD179ABC}"/>
+              </a:ext>
+            </a:extLst>
+          </p:cNvPr>
+          <p:cNvSpPr txBox="1">
+            <a:spLocks/>
+          </p:cNvSpPr>
+          <p:nvPr/>
+        </p:nvSpPr>
+        <p:spPr>
+          <a:xfrm>
+            <a:off x="1524000" y="454393"/>
+            <a:ext cx="9144000" cy="1021230"/>
+          </a:xfrm>
+          <a:prstGeom prst="rect">
+            <a:avLst/>
+          </a:prstGeom>
+        </p:spPr>
+        <p:txBody>
+          <a:bodyPr vert="horz" lIns="91440" tIns="45720" rIns="91440" bIns="45720" rtlCol="0" anchor="ctr">
+            <a:normAutofit/>
+          </a:bodyPr>
+          <a:lstStyle>
+            <a:lvl1pPr algn="l" defTabSz="914400" rtl="0" eaLnBrk="1" latinLnBrk="0" hangingPunct="1">
+              <a:lnSpc>
+                <a:spcPct val="90000"/>
+              </a:lnSpc>
+              <a:spcBef>
+                <a:spcPct val="0"/>
+              </a:spcBef>
+              <a:buNone/>
+              <a:defRPr sz="4400" kern="1200">
+                <a:solidFill>
+                  <a:schemeClr val="tx1"/>
+                </a:solidFill>
+                <a:latin typeface="+mj-lt"/>
+                <a:ea typeface="+mj-ea"/>
+                <a:cs typeface="+mj-cs"/>
+              </a:defRPr>
+            </a:lvl1pPr>
+          </a:lstStyle>
+          <a:p>
+            <a:pPr algn="ctr"/>
+            <a:r>
+              <a:rPr lang="it-IT" dirty="0" err="1"/>
+              <a:t>Granty</a:t>
+            </a:r>
+            <a:r>
+              <a:rPr lang="it-IT" dirty="0"/>
+              <a:t> </a:t>
+            </a:r>
+            <a:r>
+              <a:rPr lang="it-IT" dirty="0" err="1"/>
+              <a:t>crane</a:t>
+            </a:r>
+            <a:endParaRPr lang="it-IT" dirty="0"/>
+          </a:p>
+        </p:txBody>
+      </p:sp>
+      <mc:AlternateContent xmlns:mc="http://schemas.openxmlformats.org/markup-compatibility/2006">
+        <mc:Choice xmlns:a14="http://schemas.microsoft.com/office/drawing/2010/main" Requires="a14">
+          <p:sp>
+            <p:nvSpPr>
+              <p:cNvPr id="9" name="CasellaDiTesto 8">
+                <a:extLst>
+                  <a:ext uri="{FF2B5EF4-FFF2-40B4-BE49-F238E27FC236}">
+                    <a16:creationId xmlns:a16="http://schemas.microsoft.com/office/drawing/2014/main" id="{86F89E2B-2067-3C4F-A4E7-D7C1F99F332E}"/>
+                  </a:ext>
+                </a:extLst>
+              </p:cNvPr>
+              <p:cNvSpPr txBox="1"/>
+              <p:nvPr/>
+            </p:nvSpPr>
+            <p:spPr>
+              <a:xfrm>
+                <a:off x="3997202" y="1475623"/>
+                <a:ext cx="6670797" cy="2123658"/>
+              </a:xfrm>
+              <a:prstGeom prst="rect">
+                <a:avLst/>
+              </a:prstGeom>
+              <a:noFill/>
+            </p:spPr>
+            <p:txBody>
+              <a:bodyPr wrap="square" rtlCol="0">
+                <a:spAutoFit/>
+              </a:bodyPr>
+              <a:lstStyle/>
+              <a:p>
+                <a:r>
+                  <a:rPr lang="it-IT" sz="2400" dirty="0"/>
+                  <a:t>CONTROLLABILITA’</a:t>
+                </a:r>
+                <a:endParaRPr lang="it-IT" sz="2000" dirty="0"/>
+              </a:p>
+              <a:p>
+                <a:r>
+                  <a:rPr lang="it-IT" dirty="0"/>
+                  <a:t>A partire dal </a:t>
+                </a:r>
+                <a:r>
+                  <a:rPr lang="it-IT" i="1" dirty="0"/>
+                  <a:t>Teorema di Chow</a:t>
+                </a:r>
+                <a:r>
+                  <a:rPr lang="it-IT" dirty="0"/>
+                  <a:t>, è stato verificato che il sistema fosse localmente accessibile, costruendo la </a:t>
+                </a:r>
+                <a:r>
+                  <a:rPr lang="it-IT" i="1" dirty="0"/>
+                  <a:t>distribuzione di accessibilità</a:t>
+                </a:r>
+                <a:r>
+                  <a:rPr lang="it-IT" dirty="0"/>
+                  <a:t> e verificando la condizione </a:t>
+                </a:r>
+                <a14:m>
+                  <m:oMath xmlns:m="http://schemas.openxmlformats.org/officeDocument/2006/math">
+                    <m:d>
+                      <m:dPr>
+                        <m:begChr m:val="⟨"/>
+                        <m:endChr m:val="⟩"/>
+                        <m:ctrlPr>
+                          <a:rPr lang="it-IT" i="1" smtClean="0">
+                            <a:latin typeface="Cambria Math" panose="02040503050406030204" pitchFamily="18" charset="0"/>
+                          </a:rPr>
+                        </m:ctrlPr>
+                      </m:dPr>
+                      <m:e>
+                        <m:r>
+                          <a:rPr lang="it-IT" i="1" smtClean="0">
+                            <a:latin typeface="Cambria Math" panose="02040503050406030204" pitchFamily="18" charset="0"/>
+                            <a:ea typeface="Cambria Math" panose="02040503050406030204" pitchFamily="18" charset="0"/>
+                          </a:rPr>
+                          <m:t>∆</m:t>
+                        </m:r>
+                        <m:r>
+                          <a:rPr lang="it-IT" b="0" i="1" smtClean="0">
+                            <a:latin typeface="Cambria Math" panose="02040503050406030204" pitchFamily="18" charset="0"/>
+                            <a:ea typeface="Cambria Math" panose="02040503050406030204" pitchFamily="18" charset="0"/>
+                          </a:rPr>
+                          <m:t> | ∆</m:t>
+                        </m:r>
+                        <m:r>
+                          <a:rPr lang="it-IT" b="0" i="1" baseline="-25000" smtClean="0">
+                            <a:latin typeface="Cambria Math" panose="02040503050406030204" pitchFamily="18" charset="0"/>
+                            <a:ea typeface="Cambria Math" panose="02040503050406030204" pitchFamily="18" charset="0"/>
+                          </a:rPr>
+                          <m:t>0</m:t>
+                        </m:r>
+                      </m:e>
+                    </m:d>
+                    <m:r>
+                      <a:rPr lang="it-IT" b="0" i="1" smtClean="0">
+                        <a:latin typeface="Cambria Math" panose="02040503050406030204" pitchFamily="18" charset="0"/>
+                      </a:rPr>
+                      <m:t>=</m:t>
+                    </m:r>
+                    <m:r>
+                      <a:rPr lang="it-IT" b="0" i="1" smtClean="0">
+                        <a:latin typeface="Cambria Math" panose="02040503050406030204" pitchFamily="18" charset="0"/>
+                      </a:rPr>
+                      <m:t>𝑛</m:t>
+                    </m:r>
+                  </m:oMath>
+                </a14:m>
+                <a:endParaRPr lang="it-IT" dirty="0"/>
+              </a:p>
+              <a:p>
+                <a:r>
+                  <a:rPr lang="it-IT" dirty="0"/>
+                  <a:t>nella quale</a:t>
+                </a:r>
+              </a:p>
+              <a:p>
+                <a14:m>
+                  <m:oMathPara xmlns:m="http://schemas.openxmlformats.org/officeDocument/2006/math">
+                    <m:oMathParaPr>
+                      <m:jc m:val="centerGroup"/>
+                    </m:oMathParaPr>
+                    <m:oMath xmlns:m="http://schemas.openxmlformats.org/officeDocument/2006/math">
+                      <m:r>
+                        <a:rPr lang="it-IT" i="1" smtClean="0">
+                          <a:latin typeface="Cambria Math" panose="02040503050406030204" pitchFamily="18" charset="0"/>
+                          <a:ea typeface="Cambria Math" panose="02040503050406030204" pitchFamily="18" charset="0"/>
+                        </a:rPr>
+                        <m:t>∆</m:t>
+                      </m:r>
+                      <m:r>
+                        <a:rPr lang="it-IT" b="0" i="1" baseline="-25000" smtClean="0">
+                          <a:latin typeface="Cambria Math" panose="02040503050406030204" pitchFamily="18" charset="0"/>
+                          <a:ea typeface="Cambria Math" panose="02040503050406030204" pitchFamily="18" charset="0"/>
+                        </a:rPr>
+                        <m:t>0</m:t>
+                      </m:r>
+                      <m:r>
+                        <a:rPr lang="it-IT" b="0" i="1" smtClean="0">
+                          <a:latin typeface="Cambria Math" panose="02040503050406030204" pitchFamily="18" charset="0"/>
+                          <a:ea typeface="Cambria Math" panose="02040503050406030204" pitchFamily="18" charset="0"/>
+                        </a:rPr>
+                        <m:t> =</m:t>
+                      </m:r>
+                      <m:r>
+                        <a:rPr lang="it-IT" b="0" i="1" smtClean="0">
+                          <a:latin typeface="Cambria Math" panose="02040503050406030204" pitchFamily="18" charset="0"/>
+                          <a:ea typeface="Cambria Math" panose="02040503050406030204" pitchFamily="18" charset="0"/>
+                        </a:rPr>
+                        <m:t>𝑠𝑝𝑎𝑛</m:t>
+                      </m:r>
+                      <m:d>
+                        <m:dPr>
+                          <m:ctrlPr>
+                            <a:rPr lang="it-IT" b="0" i="1" smtClean="0">
+                              <a:latin typeface="Cambria Math" panose="02040503050406030204" pitchFamily="18" charset="0"/>
+                              <a:ea typeface="Cambria Math" panose="02040503050406030204" pitchFamily="18" charset="0"/>
+                            </a:rPr>
+                          </m:ctrlPr>
+                        </m:dPr>
+                        <m:e>
+                          <m:r>
+                            <a:rPr lang="it-IT" b="0" i="1" smtClean="0">
+                              <a:latin typeface="Cambria Math" panose="02040503050406030204" pitchFamily="18" charset="0"/>
+                              <a:ea typeface="Cambria Math" panose="02040503050406030204" pitchFamily="18" charset="0"/>
+                            </a:rPr>
+                            <m:t>𝑔</m:t>
+                          </m:r>
+                        </m:e>
+                      </m:d>
+                    </m:oMath>
+                  </m:oMathPara>
+                </a14:m>
+                <a:endParaRPr lang="it-IT" b="0" dirty="0">
+                  <a:ea typeface="Cambria Math" panose="02040503050406030204" pitchFamily="18" charset="0"/>
+                </a:endParaRPr>
+              </a:p>
+              <a:p>
+                <a14:m>
+                  <m:oMathPara xmlns:m="http://schemas.openxmlformats.org/officeDocument/2006/math">
+                    <m:oMathParaPr>
+                      <m:jc m:val="centerGroup"/>
+                    </m:oMathParaPr>
+                    <m:oMath xmlns:m="http://schemas.openxmlformats.org/officeDocument/2006/math">
+                      <m:r>
+                        <a:rPr lang="it-IT" i="1" smtClean="0">
+                          <a:latin typeface="Cambria Math" panose="02040503050406030204" pitchFamily="18" charset="0"/>
+                          <a:ea typeface="Cambria Math" panose="02040503050406030204" pitchFamily="18" charset="0"/>
+                        </a:rPr>
+                        <m:t>∆</m:t>
+                      </m:r>
+                      <m:r>
+                        <a:rPr lang="it-IT" b="0" i="1" smtClean="0">
+                          <a:latin typeface="Cambria Math" panose="02040503050406030204" pitchFamily="18" charset="0"/>
+                          <a:ea typeface="Cambria Math" panose="02040503050406030204" pitchFamily="18" charset="0"/>
+                        </a:rPr>
+                        <m:t> =</m:t>
+                      </m:r>
+                      <m:r>
+                        <a:rPr lang="it-IT" b="0" i="1" smtClean="0">
+                          <a:latin typeface="Cambria Math" panose="02040503050406030204" pitchFamily="18" charset="0"/>
+                          <a:ea typeface="Cambria Math" panose="02040503050406030204" pitchFamily="18" charset="0"/>
+                        </a:rPr>
+                        <m:t>𝑠𝑝𝑎𝑛</m:t>
+                      </m:r>
+                      <m:r>
+                        <a:rPr lang="it-IT" b="0" i="1" smtClean="0">
+                          <a:latin typeface="Cambria Math" panose="02040503050406030204" pitchFamily="18" charset="0"/>
+                          <a:ea typeface="Cambria Math" panose="02040503050406030204" pitchFamily="18" charset="0"/>
+                        </a:rPr>
+                        <m:t>(</m:t>
+                      </m:r>
+                      <m:r>
+                        <a:rPr lang="it-IT" b="0" i="1" smtClean="0">
+                          <a:latin typeface="Cambria Math" panose="02040503050406030204" pitchFamily="18" charset="0"/>
+                          <a:ea typeface="Cambria Math" panose="02040503050406030204" pitchFamily="18" charset="0"/>
+                        </a:rPr>
+                        <m:t>𝑓</m:t>
+                      </m:r>
+                      <m:r>
+                        <a:rPr lang="it-IT" b="0" i="1" smtClean="0">
+                          <a:latin typeface="Cambria Math" panose="02040503050406030204" pitchFamily="18" charset="0"/>
+                          <a:ea typeface="Cambria Math" panose="02040503050406030204" pitchFamily="18" charset="0"/>
+                        </a:rPr>
+                        <m:t>, </m:t>
+                      </m:r>
+                      <m:r>
+                        <a:rPr lang="it-IT" b="0" i="1" smtClean="0">
+                          <a:latin typeface="Cambria Math" panose="02040503050406030204" pitchFamily="18" charset="0"/>
+                          <a:ea typeface="Cambria Math" panose="02040503050406030204" pitchFamily="18" charset="0"/>
+                        </a:rPr>
+                        <m:t>𝑔</m:t>
+                      </m:r>
+                      <m:r>
+                        <a:rPr lang="it-IT" b="0" i="1" smtClean="0">
+                          <a:latin typeface="Cambria Math" panose="02040503050406030204" pitchFamily="18" charset="0"/>
+                          <a:ea typeface="Cambria Math" panose="02040503050406030204" pitchFamily="18" charset="0"/>
+                        </a:rPr>
+                        <m:t>)</m:t>
+                      </m:r>
+                    </m:oMath>
+                  </m:oMathPara>
+                </a14:m>
+                <a:endParaRPr lang="it-IT" dirty="0"/>
+              </a:p>
+            </p:txBody>
+          </p:sp>
+        </mc:Choice>
+        <mc:Fallback>
+          <p:sp>
+            <p:nvSpPr>
+              <p:cNvPr id="9" name="CasellaDiTesto 8">
+                <a:extLst>
+                  <a:ext uri="{FF2B5EF4-FFF2-40B4-BE49-F238E27FC236}">
+                    <a16:creationId xmlns:a16="http://schemas.microsoft.com/office/drawing/2014/main" id="{86F89E2B-2067-3C4F-A4E7-D7C1F99F332E}"/>
+                  </a:ext>
+                </a:extLst>
+              </p:cNvPr>
+              <p:cNvSpPr txBox="1">
+                <a:spLocks noRot="1" noChangeAspect="1" noMove="1" noResize="1" noEditPoints="1" noAdjustHandles="1" noChangeArrowheads="1" noChangeShapeType="1" noTextEdit="1"/>
+              </p:cNvSpPr>
+              <p:nvPr/>
+            </p:nvSpPr>
+            <p:spPr>
+              <a:xfrm>
+                <a:off x="3997202" y="1475623"/>
+                <a:ext cx="6670797" cy="2123658"/>
+              </a:xfrm>
+              <a:prstGeom prst="rect">
+                <a:avLst/>
+              </a:prstGeom>
+              <a:blipFill>
+                <a:blip r:embed="rId3"/>
+                <a:stretch>
+                  <a:fillRect l="-1331" t="-1786" b="-2381"/>
+                </a:stretch>
+              </a:blipFill>
+            </p:spPr>
+            <p:txBody>
+              <a:bodyPr/>
+              <a:lstStyle/>
+              <a:p>
+                <a:r>
+                  <a:rPr lang="it-IT">
+                    <a:noFill/>
+                  </a:rPr>
+                  <a:t> </a:t>
+                </a:r>
+              </a:p>
+            </p:txBody>
+          </p:sp>
+        </mc:Fallback>
+      </mc:AlternateContent>
+      <mc:AlternateContent xmlns:mc="http://schemas.openxmlformats.org/markup-compatibility/2006">
+        <mc:Choice xmlns:a14="http://schemas.microsoft.com/office/drawing/2010/main" Requires="a14">
+          <p:sp>
+            <p:nvSpPr>
+              <p:cNvPr id="2" name="CasellaDiTesto 1">
+                <a:extLst>
+                  <a:ext uri="{FF2B5EF4-FFF2-40B4-BE49-F238E27FC236}">
+                    <a16:creationId xmlns:a16="http://schemas.microsoft.com/office/drawing/2014/main" id="{9278A8CE-5C45-E341-95D0-FC8B837E9441}"/>
+                  </a:ext>
+                </a:extLst>
+              </p:cNvPr>
+              <p:cNvSpPr txBox="1"/>
+              <p:nvPr/>
+            </p:nvSpPr>
+            <p:spPr>
+              <a:xfrm>
+                <a:off x="223495" y="3599281"/>
+                <a:ext cx="11745010" cy="2094356"/>
+              </a:xfrm>
+              <a:prstGeom prst="rect">
+                <a:avLst/>
+              </a:prstGeom>
+              <a:noFill/>
+            </p:spPr>
+            <p:txBody>
+              <a:bodyPr wrap="none" rtlCol="0">
+                <a:spAutoFit/>
+              </a:bodyPr>
+              <a:lstStyle/>
+              <a:p>
+                <a:pPr algn="ctr"/>
+                <a:r>
+                  <a:rPr lang="it-IT" dirty="0"/>
+                  <a:t>La matrice </a:t>
+                </a:r>
+                <a14:m>
+                  <m:oMath xmlns:m="http://schemas.openxmlformats.org/officeDocument/2006/math">
+                    <m:r>
+                      <a:rPr lang="it-IT" i="1">
+                        <a:latin typeface="Cambria Math" panose="02040503050406030204" pitchFamily="18" charset="0"/>
+                        <a:ea typeface="Cambria Math" panose="02040503050406030204" pitchFamily="18" charset="0"/>
+                      </a:rPr>
+                      <m:t>∆ =</m:t>
+                    </m:r>
+                    <m:r>
+                      <a:rPr lang="it-IT" i="1">
+                        <a:latin typeface="Cambria Math" panose="02040503050406030204" pitchFamily="18" charset="0"/>
+                        <a:ea typeface="Cambria Math" panose="02040503050406030204" pitchFamily="18" charset="0"/>
+                      </a:rPr>
+                      <m:t>[ </m:t>
+                    </m:r>
+                    <m:r>
+                      <a:rPr lang="it-IT" i="1">
+                        <a:latin typeface="Cambria Math" panose="02040503050406030204" pitchFamily="18" charset="0"/>
+                        <a:ea typeface="Cambria Math" panose="02040503050406030204" pitchFamily="18" charset="0"/>
+                      </a:rPr>
+                      <m:t>𝑔</m:t>
+                    </m:r>
+                    <m:r>
+                      <a:rPr lang="it-IT" i="1">
+                        <a:latin typeface="Cambria Math" panose="02040503050406030204" pitchFamily="18" charset="0"/>
+                        <a:ea typeface="Cambria Math" panose="02040503050406030204" pitchFamily="18" charset="0"/>
+                      </a:rPr>
+                      <m:t> </m:t>
+                    </m:r>
+                    <m:d>
+                      <m:dPr>
+                        <m:begChr m:val="["/>
+                        <m:endChr m:val="]"/>
+                        <m:ctrlPr>
+                          <a:rPr lang="it-IT" i="1">
+                            <a:latin typeface="Cambria Math" panose="02040503050406030204" pitchFamily="18" charset="0"/>
+                            <a:ea typeface="Cambria Math" panose="02040503050406030204" pitchFamily="18" charset="0"/>
+                          </a:rPr>
+                        </m:ctrlPr>
+                      </m:dPr>
+                      <m:e>
+                        <m:r>
+                          <a:rPr lang="it-IT" i="1">
+                            <a:latin typeface="Cambria Math" panose="02040503050406030204" pitchFamily="18" charset="0"/>
+                            <a:ea typeface="Cambria Math" panose="02040503050406030204" pitchFamily="18" charset="0"/>
+                          </a:rPr>
+                          <m:t>𝑓</m:t>
+                        </m:r>
+                        <m:r>
+                          <a:rPr lang="it-IT" i="1">
+                            <a:latin typeface="Cambria Math" panose="02040503050406030204" pitchFamily="18" charset="0"/>
+                            <a:ea typeface="Cambria Math" panose="02040503050406030204" pitchFamily="18" charset="0"/>
+                          </a:rPr>
+                          <m:t>,</m:t>
+                        </m:r>
+                        <m:r>
+                          <a:rPr lang="it-IT" i="1">
+                            <a:latin typeface="Cambria Math" panose="02040503050406030204" pitchFamily="18" charset="0"/>
+                            <a:ea typeface="Cambria Math" panose="02040503050406030204" pitchFamily="18" charset="0"/>
+                          </a:rPr>
+                          <m:t>𝑔</m:t>
+                        </m:r>
+                      </m:e>
+                    </m:d>
+                    <m:r>
+                      <a:rPr lang="it-IT" i="1">
+                        <a:latin typeface="Cambria Math" panose="02040503050406030204" pitchFamily="18" charset="0"/>
+                        <a:ea typeface="Cambria Math" panose="02040503050406030204" pitchFamily="18" charset="0"/>
+                      </a:rPr>
+                      <m:t> [</m:t>
+                    </m:r>
+                    <m:r>
+                      <a:rPr lang="it-IT" i="1">
+                        <a:latin typeface="Cambria Math" panose="02040503050406030204" pitchFamily="18" charset="0"/>
+                        <a:ea typeface="Cambria Math" panose="02040503050406030204" pitchFamily="18" charset="0"/>
+                      </a:rPr>
+                      <m:t>𝑓</m:t>
+                    </m:r>
+                    <m:r>
+                      <a:rPr lang="it-IT" i="1">
+                        <a:latin typeface="Cambria Math" panose="02040503050406030204" pitchFamily="18" charset="0"/>
+                        <a:ea typeface="Cambria Math" panose="02040503050406030204" pitchFamily="18" charset="0"/>
+                      </a:rPr>
+                      <m:t>,[</m:t>
+                    </m:r>
+                    <m:r>
+                      <a:rPr lang="it-IT" i="1">
+                        <a:latin typeface="Cambria Math" panose="02040503050406030204" pitchFamily="18" charset="0"/>
+                        <a:ea typeface="Cambria Math" panose="02040503050406030204" pitchFamily="18" charset="0"/>
+                      </a:rPr>
+                      <m:t>𝑓</m:t>
+                    </m:r>
+                    <m:r>
+                      <a:rPr lang="it-IT" i="1">
+                        <a:latin typeface="Cambria Math" panose="02040503050406030204" pitchFamily="18" charset="0"/>
+                        <a:ea typeface="Cambria Math" panose="02040503050406030204" pitchFamily="18" charset="0"/>
+                      </a:rPr>
+                      <m:t>,</m:t>
+                    </m:r>
+                    <m:r>
+                      <a:rPr lang="it-IT" i="1">
+                        <a:latin typeface="Cambria Math" panose="02040503050406030204" pitchFamily="18" charset="0"/>
+                        <a:ea typeface="Cambria Math" panose="02040503050406030204" pitchFamily="18" charset="0"/>
+                      </a:rPr>
+                      <m:t>𝑔</m:t>
+                    </m:r>
+                    <m:r>
+                      <a:rPr lang="it-IT" i="1">
+                        <a:latin typeface="Cambria Math" panose="02040503050406030204" pitchFamily="18" charset="0"/>
+                        <a:ea typeface="Cambria Math" panose="02040503050406030204" pitchFamily="18" charset="0"/>
+                      </a:rPr>
+                      <m:t>]] [</m:t>
+                    </m:r>
+                    <m:r>
+                      <a:rPr lang="it-IT" i="1">
+                        <a:latin typeface="Cambria Math" panose="02040503050406030204" pitchFamily="18" charset="0"/>
+                        <a:ea typeface="Cambria Math" panose="02040503050406030204" pitchFamily="18" charset="0"/>
+                      </a:rPr>
+                      <m:t>𝑓</m:t>
+                    </m:r>
+                    <m:r>
+                      <a:rPr lang="it-IT" i="1">
+                        <a:latin typeface="Cambria Math" panose="02040503050406030204" pitchFamily="18" charset="0"/>
+                        <a:ea typeface="Cambria Math" panose="02040503050406030204" pitchFamily="18" charset="0"/>
+                      </a:rPr>
+                      <m:t>,[</m:t>
+                    </m:r>
+                    <m:r>
+                      <a:rPr lang="it-IT" i="1">
+                        <a:latin typeface="Cambria Math" panose="02040503050406030204" pitchFamily="18" charset="0"/>
+                        <a:ea typeface="Cambria Math" panose="02040503050406030204" pitchFamily="18" charset="0"/>
+                      </a:rPr>
+                      <m:t>𝑓</m:t>
+                    </m:r>
+                    <m:r>
+                      <a:rPr lang="it-IT" i="1">
+                        <a:latin typeface="Cambria Math" panose="02040503050406030204" pitchFamily="18" charset="0"/>
+                        <a:ea typeface="Cambria Math" panose="02040503050406030204" pitchFamily="18" charset="0"/>
+                      </a:rPr>
+                      <m:t>,[</m:t>
+                    </m:r>
+                    <m:r>
+                      <a:rPr lang="it-IT" i="1">
+                        <a:latin typeface="Cambria Math" panose="02040503050406030204" pitchFamily="18" charset="0"/>
+                        <a:ea typeface="Cambria Math" panose="02040503050406030204" pitchFamily="18" charset="0"/>
+                      </a:rPr>
+                      <m:t>𝑓</m:t>
+                    </m:r>
+                    <m:r>
+                      <a:rPr lang="it-IT" i="1">
+                        <a:latin typeface="Cambria Math" panose="02040503050406030204" pitchFamily="18" charset="0"/>
+                        <a:ea typeface="Cambria Math" panose="02040503050406030204" pitchFamily="18" charset="0"/>
+                      </a:rPr>
+                      <m:t>,</m:t>
+                    </m:r>
+                    <m:r>
+                      <a:rPr lang="it-IT" i="1">
+                        <a:latin typeface="Cambria Math" panose="02040503050406030204" pitchFamily="18" charset="0"/>
+                        <a:ea typeface="Cambria Math" panose="02040503050406030204" pitchFamily="18" charset="0"/>
+                      </a:rPr>
+                      <m:t>𝑔</m:t>
+                    </m:r>
+                    <m:r>
+                      <a:rPr lang="it-IT" i="1">
+                        <a:latin typeface="Cambria Math" panose="02040503050406030204" pitchFamily="18" charset="0"/>
+                        <a:ea typeface="Cambria Math" panose="02040503050406030204" pitchFamily="18" charset="0"/>
+                      </a:rPr>
+                      <m:t>]]] [</m:t>
+                    </m:r>
+                    <m:r>
+                      <a:rPr lang="it-IT" i="1">
+                        <a:latin typeface="Cambria Math" panose="02040503050406030204" pitchFamily="18" charset="0"/>
+                        <a:ea typeface="Cambria Math" panose="02040503050406030204" pitchFamily="18" charset="0"/>
+                      </a:rPr>
+                      <m:t>𝑓</m:t>
+                    </m:r>
+                    <m:r>
+                      <a:rPr lang="it-IT" i="1">
+                        <a:latin typeface="Cambria Math" panose="02040503050406030204" pitchFamily="18" charset="0"/>
+                        <a:ea typeface="Cambria Math" panose="02040503050406030204" pitchFamily="18" charset="0"/>
+                      </a:rPr>
+                      <m:t>,[</m:t>
+                    </m:r>
+                    <m:r>
+                      <a:rPr lang="it-IT" i="1">
+                        <a:latin typeface="Cambria Math" panose="02040503050406030204" pitchFamily="18" charset="0"/>
+                        <a:ea typeface="Cambria Math" panose="02040503050406030204" pitchFamily="18" charset="0"/>
+                      </a:rPr>
+                      <m:t>𝑓</m:t>
+                    </m:r>
+                    <m:r>
+                      <a:rPr lang="it-IT" i="1">
+                        <a:latin typeface="Cambria Math" panose="02040503050406030204" pitchFamily="18" charset="0"/>
+                        <a:ea typeface="Cambria Math" panose="02040503050406030204" pitchFamily="18" charset="0"/>
+                      </a:rPr>
+                      <m:t>,[</m:t>
+                    </m:r>
+                    <m:r>
+                      <a:rPr lang="it-IT" i="1">
+                        <a:latin typeface="Cambria Math" panose="02040503050406030204" pitchFamily="18" charset="0"/>
+                        <a:ea typeface="Cambria Math" panose="02040503050406030204" pitchFamily="18" charset="0"/>
+                      </a:rPr>
+                      <m:t>𝑓</m:t>
+                    </m:r>
+                    <m:r>
+                      <a:rPr lang="it-IT" i="1">
+                        <a:latin typeface="Cambria Math" panose="02040503050406030204" pitchFamily="18" charset="0"/>
+                        <a:ea typeface="Cambria Math" panose="02040503050406030204" pitchFamily="18" charset="0"/>
+                      </a:rPr>
+                      <m:t>,[</m:t>
+                    </m:r>
+                    <m:r>
+                      <a:rPr lang="it-IT" i="1">
+                        <a:latin typeface="Cambria Math" panose="02040503050406030204" pitchFamily="18" charset="0"/>
+                        <a:ea typeface="Cambria Math" panose="02040503050406030204" pitchFamily="18" charset="0"/>
+                      </a:rPr>
+                      <m:t>𝑓</m:t>
+                    </m:r>
+                    <m:r>
+                      <a:rPr lang="it-IT" i="1">
+                        <a:latin typeface="Cambria Math" panose="02040503050406030204" pitchFamily="18" charset="0"/>
+                        <a:ea typeface="Cambria Math" panose="02040503050406030204" pitchFamily="18" charset="0"/>
+                      </a:rPr>
+                      <m:t>,</m:t>
+                    </m:r>
+                    <m:r>
+                      <a:rPr lang="it-IT" i="1">
+                        <a:latin typeface="Cambria Math" panose="02040503050406030204" pitchFamily="18" charset="0"/>
+                        <a:ea typeface="Cambria Math" panose="02040503050406030204" pitchFamily="18" charset="0"/>
+                      </a:rPr>
+                      <m:t>𝑔</m:t>
+                    </m:r>
+                    <m:r>
+                      <a:rPr lang="it-IT" i="1">
+                        <a:latin typeface="Cambria Math" panose="02040503050406030204" pitchFamily="18" charset="0"/>
+                        <a:ea typeface="Cambria Math" panose="02040503050406030204" pitchFamily="18" charset="0"/>
+                      </a:rPr>
+                      <m:t>]]]]]</m:t>
+                    </m:r>
+                  </m:oMath>
+                </a14:m>
+                <a:r>
+                  <a:rPr lang="it-IT" i="1" dirty="0"/>
+                  <a:t> </a:t>
+                </a:r>
+                <a:r>
+                  <a:rPr lang="it-IT" dirty="0"/>
+                  <a:t>ha rango 4 e quindi il sistema è localmente accessibile.</a:t>
+                </a:r>
+              </a:p>
+              <a:p>
+                <a:pPr algn="ctr"/>
+                <a:endParaRPr lang="it-IT" dirty="0"/>
+              </a:p>
+              <a:p>
+                <a:pPr algn="ctr"/>
+                <a:r>
+                  <a:rPr lang="it-IT" dirty="0"/>
+                  <a:t>Il teorema di Chow è condizione necessaria e sufficiente per l’accessibilità, ma solo necessaria per la controllabilità, </a:t>
+                </a:r>
+              </a:p>
+              <a:p>
+                <a:pPr algn="ctr"/>
+                <a:r>
+                  <a:rPr lang="it-IT" dirty="0"/>
+                  <a:t>perché il sistema sia anche controllabile è necessario verificare che sia soddisfatta a condizione:</a:t>
+                </a:r>
+              </a:p>
+              <a:p>
+                <a:pPr algn="ctr"/>
+                <a14:m>
+                  <m:oMathPara xmlns:m="http://schemas.openxmlformats.org/officeDocument/2006/math">
+                    <m:oMathParaPr>
+                      <m:jc m:val="centerGroup"/>
+                    </m:oMathParaPr>
+                    <m:oMath xmlns:m="http://schemas.openxmlformats.org/officeDocument/2006/math">
+                      <m:r>
+                        <a:rPr lang="it-IT" b="0" i="1" smtClean="0">
+                          <a:latin typeface="Cambria Math" panose="02040503050406030204" pitchFamily="18" charset="0"/>
+                        </a:rPr>
+                        <m:t>𝑓</m:t>
+                      </m:r>
+                      <m:d>
+                        <m:dPr>
+                          <m:ctrlPr>
+                            <a:rPr lang="it-IT" b="0" i="1" smtClean="0">
+                              <a:latin typeface="Cambria Math" panose="02040503050406030204" pitchFamily="18" charset="0"/>
+                            </a:rPr>
+                          </m:ctrlPr>
+                        </m:dPr>
+                        <m:e>
+                          <m:r>
+                            <a:rPr lang="it-IT" b="0" i="1" smtClean="0">
+                              <a:latin typeface="Cambria Math" panose="02040503050406030204" pitchFamily="18" charset="0"/>
+                            </a:rPr>
+                            <m:t>𝑞</m:t>
+                          </m:r>
+                          <m:r>
+                            <a:rPr lang="it-IT" b="0" i="1" baseline="-25000" smtClean="0">
+                              <a:latin typeface="Cambria Math" panose="02040503050406030204" pitchFamily="18" charset="0"/>
+                            </a:rPr>
+                            <m:t>0</m:t>
+                          </m:r>
+                        </m:e>
+                      </m:d>
+                      <m:r>
+                        <a:rPr lang="it-IT" b="0" i="1" smtClean="0">
+                          <a:latin typeface="Cambria Math" panose="02040503050406030204" pitchFamily="18" charset="0"/>
+                        </a:rPr>
+                        <m:t>=0 </m:t>
+                      </m:r>
+                      <m:r>
+                        <a:rPr lang="it-IT" b="0" i="1" smtClean="0">
+                          <a:latin typeface="Cambria Math" panose="02040503050406030204" pitchFamily="18" charset="0"/>
+                        </a:rPr>
+                        <m:t>𝑒</m:t>
+                      </m:r>
+                      <m:func>
+                        <m:funcPr>
+                          <m:ctrlPr>
+                            <a:rPr lang="it-IT" b="0" i="1" smtClean="0">
+                              <a:latin typeface="Cambria Math" panose="02040503050406030204" pitchFamily="18" charset="0"/>
+                            </a:rPr>
+                          </m:ctrlPr>
+                        </m:funcPr>
+                        <m:fName>
+                          <m:r>
+                            <m:rPr>
+                              <m:sty m:val="p"/>
+                            </m:rPr>
+                            <a:rPr lang="it-IT" b="0" i="0" smtClean="0">
+                              <a:latin typeface="Cambria Math" panose="02040503050406030204" pitchFamily="18" charset="0"/>
+                            </a:rPr>
+                            <m:t>dim</m:t>
+                          </m:r>
+                        </m:fName>
+                        <m:e>
+                          <m:r>
+                            <a:rPr lang="it-IT" b="0" i="1" smtClean="0">
+                              <a:latin typeface="Cambria Math" panose="02040503050406030204" pitchFamily="18" charset="0"/>
+                              <a:ea typeface="Cambria Math" panose="02040503050406030204" pitchFamily="18" charset="0"/>
+                            </a:rPr>
+                            <m:t>∆</m:t>
+                          </m:r>
+                          <m:r>
+                            <a:rPr lang="it-IT" b="0" i="1" baseline="-25000" smtClean="0">
+                              <a:latin typeface="Cambria Math" panose="02040503050406030204" pitchFamily="18" charset="0"/>
+                              <a:ea typeface="Cambria Math" panose="02040503050406030204" pitchFamily="18" charset="0"/>
+                            </a:rPr>
+                            <m:t>𝐿</m:t>
+                          </m:r>
+                          <m:d>
+                            <m:dPr>
+                              <m:ctrlPr>
+                                <a:rPr lang="it-IT" b="0" i="1" smtClean="0">
+                                  <a:latin typeface="Cambria Math" panose="02040503050406030204" pitchFamily="18" charset="0"/>
+                                  <a:ea typeface="Cambria Math" panose="02040503050406030204" pitchFamily="18" charset="0"/>
+                                </a:rPr>
+                              </m:ctrlPr>
+                            </m:dPr>
+                            <m:e>
+                              <m:r>
+                                <a:rPr lang="it-IT" b="0" i="1" smtClean="0">
+                                  <a:latin typeface="Cambria Math" panose="02040503050406030204" pitchFamily="18" charset="0"/>
+                                  <a:ea typeface="Cambria Math" panose="02040503050406030204" pitchFamily="18" charset="0"/>
+                                </a:rPr>
+                                <m:t>𝑞</m:t>
+                              </m:r>
+                              <m:r>
+                                <a:rPr lang="it-IT" b="0" i="1" baseline="-25000" smtClean="0">
+                                  <a:latin typeface="Cambria Math" panose="02040503050406030204" pitchFamily="18" charset="0"/>
+                                  <a:ea typeface="Cambria Math" panose="02040503050406030204" pitchFamily="18" charset="0"/>
+                                </a:rPr>
+                                <m:t>0</m:t>
+                              </m:r>
+                            </m:e>
+                          </m:d>
+                        </m:e>
+                      </m:func>
+                      <m:r>
+                        <a:rPr lang="it-IT" b="0" i="1" smtClean="0">
+                          <a:latin typeface="Cambria Math" panose="02040503050406030204" pitchFamily="18" charset="0"/>
+                          <a:ea typeface="Cambria Math" panose="02040503050406030204" pitchFamily="18" charset="0"/>
+                        </a:rPr>
+                        <m:t>=</m:t>
+                      </m:r>
+                      <m:r>
+                        <a:rPr lang="it-IT" b="0" i="1" smtClean="0">
+                          <a:latin typeface="Cambria Math" panose="02040503050406030204" pitchFamily="18" charset="0"/>
+                          <a:ea typeface="Cambria Math" panose="02040503050406030204" pitchFamily="18" charset="0"/>
+                        </a:rPr>
+                        <m:t>𝑛</m:t>
+                      </m:r>
+                      <m:r>
+                        <a:rPr lang="it-IT" b="0" i="1" smtClean="0">
+                          <a:latin typeface="Cambria Math" panose="02040503050406030204" pitchFamily="18" charset="0"/>
+                          <a:ea typeface="Cambria Math" panose="02040503050406030204" pitchFamily="18" charset="0"/>
+                        </a:rPr>
+                        <m:t> </m:t>
+                      </m:r>
+                      <m:r>
+                        <a:rPr lang="it-IT" b="0" i="1" smtClean="0">
+                          <a:latin typeface="Cambria Math" panose="02040503050406030204" pitchFamily="18" charset="0"/>
+                          <a:ea typeface="Cambria Math" panose="02040503050406030204" pitchFamily="18" charset="0"/>
+                        </a:rPr>
+                        <m:t>𝑐𝑜𝑛</m:t>
+                      </m:r>
+                      <m:r>
+                        <a:rPr lang="it-IT" b="0" i="1" smtClean="0">
+                          <a:latin typeface="Cambria Math" panose="02040503050406030204" pitchFamily="18" charset="0"/>
+                          <a:ea typeface="Cambria Math" panose="02040503050406030204" pitchFamily="18" charset="0"/>
+                        </a:rPr>
+                        <m:t> ∆</m:t>
+                      </m:r>
+                      <m:r>
+                        <a:rPr lang="it-IT" b="0" i="1" baseline="-25000" smtClean="0">
+                          <a:latin typeface="Cambria Math" panose="02040503050406030204" pitchFamily="18" charset="0"/>
+                          <a:ea typeface="Cambria Math" panose="02040503050406030204" pitchFamily="18" charset="0"/>
+                        </a:rPr>
+                        <m:t>𝐿</m:t>
+                      </m:r>
+                      <m:r>
+                        <a:rPr lang="it-IT" b="0" i="1" smtClean="0">
+                          <a:latin typeface="Cambria Math" panose="02040503050406030204" pitchFamily="18" charset="0"/>
+                          <a:ea typeface="Cambria Math" panose="02040503050406030204" pitchFamily="18" charset="0"/>
+                        </a:rPr>
+                        <m:t>=</m:t>
+                      </m:r>
+                      <m:r>
+                        <a:rPr lang="it-IT" b="0" i="1" smtClean="0">
+                          <a:latin typeface="Cambria Math" panose="02040503050406030204" pitchFamily="18" charset="0"/>
+                          <a:ea typeface="Cambria Math" panose="02040503050406030204" pitchFamily="18" charset="0"/>
+                        </a:rPr>
+                        <m:t>𝑠𝑝𝑎𝑛</m:t>
+                      </m:r>
+                      <m:r>
+                        <a:rPr lang="it-IT" b="0" i="1" smtClean="0">
+                          <a:latin typeface="Cambria Math" panose="02040503050406030204" pitchFamily="18" charset="0"/>
+                          <a:ea typeface="Cambria Math" panose="02040503050406030204" pitchFamily="18" charset="0"/>
+                        </a:rPr>
+                        <m:t>(</m:t>
+                      </m:r>
+                      <m:r>
+                        <a:rPr lang="it-IT" b="0" i="1" smtClean="0">
+                          <a:latin typeface="Cambria Math" panose="02040503050406030204" pitchFamily="18" charset="0"/>
+                          <a:ea typeface="Cambria Math" panose="02040503050406030204" pitchFamily="18" charset="0"/>
+                        </a:rPr>
+                        <m:t>𝑔</m:t>
+                      </m:r>
+                      <m:r>
+                        <a:rPr lang="it-IT" b="0" i="1" smtClean="0">
+                          <a:latin typeface="Cambria Math" panose="02040503050406030204" pitchFamily="18" charset="0"/>
+                          <a:ea typeface="Cambria Math" panose="02040503050406030204" pitchFamily="18" charset="0"/>
+                        </a:rPr>
+                        <m:t>, </m:t>
+                      </m:r>
+                      <m:d>
+                        <m:dPr>
+                          <m:begChr m:val="["/>
+                          <m:endChr m:val="]"/>
+                          <m:ctrlPr>
+                            <a:rPr lang="it-IT" b="0" i="1" smtClean="0">
+                              <a:latin typeface="Cambria Math" panose="02040503050406030204" pitchFamily="18" charset="0"/>
+                              <a:ea typeface="Cambria Math" panose="02040503050406030204" pitchFamily="18" charset="0"/>
+                            </a:rPr>
+                          </m:ctrlPr>
+                        </m:dPr>
+                        <m:e>
+                          <m:r>
+                            <a:rPr lang="it-IT" b="0" i="1" smtClean="0">
+                              <a:latin typeface="Cambria Math" panose="02040503050406030204" pitchFamily="18" charset="0"/>
+                              <a:ea typeface="Cambria Math" panose="02040503050406030204" pitchFamily="18" charset="0"/>
+                            </a:rPr>
+                            <m:t>𝑓</m:t>
+                          </m:r>
+                          <m:r>
+                            <a:rPr lang="it-IT" b="0" i="1" smtClean="0">
+                              <a:latin typeface="Cambria Math" panose="02040503050406030204" pitchFamily="18" charset="0"/>
+                              <a:ea typeface="Cambria Math" panose="02040503050406030204" pitchFamily="18" charset="0"/>
+                            </a:rPr>
+                            <m:t>,</m:t>
+                          </m:r>
+                          <m:r>
+                            <a:rPr lang="it-IT" b="0" i="1" smtClean="0">
+                              <a:latin typeface="Cambria Math" panose="02040503050406030204" pitchFamily="18" charset="0"/>
+                              <a:ea typeface="Cambria Math" panose="02040503050406030204" pitchFamily="18" charset="0"/>
+                            </a:rPr>
+                            <m:t>𝑔</m:t>
+                          </m:r>
+                        </m:e>
+                      </m:d>
+                      <m:r>
+                        <a:rPr lang="it-IT" b="0" i="1" smtClean="0">
+                          <a:latin typeface="Cambria Math" panose="02040503050406030204" pitchFamily="18" charset="0"/>
+                          <a:ea typeface="Cambria Math" panose="02040503050406030204" pitchFamily="18" charset="0"/>
+                        </a:rPr>
+                        <m:t>, …</m:t>
+                      </m:r>
+                      <m:sSubSup>
+                        <m:sSubSupPr>
+                          <m:ctrlPr>
+                            <a:rPr lang="it-IT" b="0" i="1" smtClean="0">
+                              <a:latin typeface="Cambria Math" panose="02040503050406030204" pitchFamily="18" charset="0"/>
+                              <a:ea typeface="Cambria Math" panose="02040503050406030204" pitchFamily="18" charset="0"/>
+                            </a:rPr>
+                          </m:ctrlPr>
+                        </m:sSubSupPr>
+                        <m:e>
+                          <m:r>
+                            <a:rPr lang="it-IT" b="0" i="1" smtClean="0">
+                              <a:latin typeface="Cambria Math" panose="02040503050406030204" pitchFamily="18" charset="0"/>
+                              <a:ea typeface="Cambria Math" panose="02040503050406030204" pitchFamily="18" charset="0"/>
+                            </a:rPr>
+                            <m:t>𝑎𝑑</m:t>
+                          </m:r>
+                        </m:e>
+                        <m:sub>
+                          <m:r>
+                            <a:rPr lang="it-IT" b="0" i="1" smtClean="0">
+                              <a:latin typeface="Cambria Math" panose="02040503050406030204" pitchFamily="18" charset="0"/>
+                              <a:ea typeface="Cambria Math" panose="02040503050406030204" pitchFamily="18" charset="0"/>
+                            </a:rPr>
+                            <m:t>𝑓</m:t>
+                          </m:r>
+                        </m:sub>
+                        <m:sup>
+                          <m:r>
+                            <a:rPr lang="it-IT" b="0" i="1" smtClean="0">
+                              <a:latin typeface="Cambria Math" panose="02040503050406030204" pitchFamily="18" charset="0"/>
+                              <a:ea typeface="Cambria Math" panose="02040503050406030204" pitchFamily="18" charset="0"/>
+                            </a:rPr>
+                            <m:t>𝜇</m:t>
+                          </m:r>
+                          <m:r>
+                            <a:rPr lang="it-IT" b="0" i="1" baseline="-25000" smtClean="0">
+                              <a:latin typeface="Cambria Math" panose="02040503050406030204" pitchFamily="18" charset="0"/>
+                              <a:ea typeface="Cambria Math" panose="02040503050406030204" pitchFamily="18" charset="0"/>
+                            </a:rPr>
+                            <m:t>𝑖</m:t>
+                          </m:r>
+                        </m:sup>
+                      </m:sSubSup>
+                      <m:r>
+                        <a:rPr lang="it-IT" b="0" i="1" smtClean="0">
+                          <a:latin typeface="Cambria Math" panose="02040503050406030204" pitchFamily="18" charset="0"/>
+                          <a:ea typeface="Cambria Math" panose="02040503050406030204" pitchFamily="18" charset="0"/>
+                        </a:rPr>
+                        <m:t>𝑔</m:t>
+                      </m:r>
+                      <m:r>
+                        <a:rPr lang="it-IT" b="0" i="1" smtClean="0">
+                          <a:latin typeface="Cambria Math" panose="02040503050406030204" pitchFamily="18" charset="0"/>
+                          <a:ea typeface="Cambria Math" panose="02040503050406030204" pitchFamily="18" charset="0"/>
+                        </a:rPr>
+                        <m:t>)</m:t>
+                      </m:r>
+                    </m:oMath>
+                  </m:oMathPara>
+                </a14:m>
+                <a:endParaRPr lang="it-IT" dirty="0"/>
+              </a:p>
+              <a:p>
+                <a:pPr algn="ctr"/>
+                <a:r>
+                  <a:rPr lang="it-IT" dirty="0"/>
+                  <a:t>Questa condizione risulta verificata dal sistema in esame e pertanto è possibile concludere che sia anche </a:t>
+                </a:r>
+              </a:p>
+              <a:p>
+                <a:pPr algn="ctr"/>
+                <a:r>
+                  <a:rPr lang="it-IT" dirty="0"/>
+                  <a:t>localmente controllabile.</a:t>
+                </a:r>
+              </a:p>
+            </p:txBody>
+          </p:sp>
+        </mc:Choice>
+        <mc:Fallback>
+          <p:sp>
+            <p:nvSpPr>
+              <p:cNvPr id="2" name="CasellaDiTesto 1">
+                <a:extLst>
+                  <a:ext uri="{FF2B5EF4-FFF2-40B4-BE49-F238E27FC236}">
+                    <a16:creationId xmlns:a16="http://schemas.microsoft.com/office/drawing/2014/main" id="{9278A8CE-5C45-E341-95D0-FC8B837E9441}"/>
+                  </a:ext>
+                </a:extLst>
+              </p:cNvPr>
+              <p:cNvSpPr txBox="1">
+                <a:spLocks noRot="1" noChangeAspect="1" noMove="1" noResize="1" noEditPoints="1" noAdjustHandles="1" noChangeArrowheads="1" noChangeShapeType="1" noTextEdit="1"/>
+              </p:cNvSpPr>
+              <p:nvPr/>
+            </p:nvSpPr>
+            <p:spPr>
+              <a:xfrm>
+                <a:off x="223495" y="3599281"/>
+                <a:ext cx="11745010" cy="2094356"/>
+              </a:xfrm>
+              <a:prstGeom prst="rect">
+                <a:avLst/>
+              </a:prstGeom>
+              <a:blipFill>
+                <a:blip r:embed="rId4"/>
+                <a:stretch>
+                  <a:fillRect t="-602" b="-3614"/>
+                </a:stretch>
+              </a:blipFill>
+            </p:spPr>
+            <p:txBody>
+              <a:bodyPr/>
+              <a:lstStyle/>
+              <a:p>
+                <a:r>
+                  <a:rPr lang="it-IT">
+                    <a:noFill/>
+                  </a:rPr>
+                  <a:t> </a:t>
+                </a:r>
+              </a:p>
+            </p:txBody>
+          </p:sp>
+        </mc:Fallback>
+      </mc:AlternateContent>
+    </p:spTree>
+    <p:extLst>
+      <p:ext uri="{BB962C8B-B14F-4D97-AF65-F5344CB8AC3E}">
+        <p14:creationId xmlns:p14="http://schemas.microsoft.com/office/powerpoint/2010/main" val="609915009"/>
+      </p:ext>
+    </p:extLst>
+  </p:cSld>
+  <p:clrMapOvr>
+    <a:masterClrMapping/>
+  </p:clrMapOvr>
+</p:sld>
+</file>
+
+<file path=ppt/slides/slide23.xml><?xml version="1.0" encoding="utf-8"?>
+<p:sld xmlns:a="http://schemas.openxmlformats.org/drawingml/2006/main" xmlns:r="http://schemas.openxmlformats.org/officeDocument/2006/relationships" xmlns:p="http://schemas.openxmlformats.org/presentationml/2006/main">
+  <p:cSld>
+    <p:spTree>
+      <p:nvGrpSpPr>
+        <p:cNvPr id="1" name=""/>
+        <p:cNvGrpSpPr/>
+        <p:nvPr/>
+      </p:nvGrpSpPr>
+      <p:grpSpPr>
+        <a:xfrm>
+          <a:off x="0" y="0"/>
+          <a:ext cx="0" cy="0"/>
+          <a:chOff x="0" y="0"/>
+          <a:chExt cx="0" cy="0"/>
+        </a:xfrm>
+      </p:grpSpPr>
+      <p:sp>
+        <p:nvSpPr>
+          <p:cNvPr id="8" name="Titolo 1">
+            <a:extLst>
+              <a:ext uri="{FF2B5EF4-FFF2-40B4-BE49-F238E27FC236}">
+                <a16:creationId xmlns:a16="http://schemas.microsoft.com/office/drawing/2014/main" id="{E8EDF0BB-0558-644B-BB96-58C4BD179ABC}"/>
+              </a:ext>
+            </a:extLst>
+          </p:cNvPr>
+          <p:cNvSpPr txBox="1">
+            <a:spLocks/>
+          </p:cNvSpPr>
+          <p:nvPr/>
+        </p:nvSpPr>
+        <p:spPr>
+          <a:xfrm>
+            <a:off x="1524000" y="454393"/>
+            <a:ext cx="9144000" cy="1021230"/>
+          </a:xfrm>
+          <a:prstGeom prst="rect">
+            <a:avLst/>
+          </a:prstGeom>
+        </p:spPr>
+        <p:txBody>
+          <a:bodyPr vert="horz" lIns="91440" tIns="45720" rIns="91440" bIns="45720" rtlCol="0" anchor="ctr">
+            <a:normAutofit/>
+          </a:bodyPr>
+          <a:lstStyle>
+            <a:lvl1pPr algn="l" defTabSz="914400" rtl="0" eaLnBrk="1" latinLnBrk="0" hangingPunct="1">
+              <a:lnSpc>
+                <a:spcPct val="90000"/>
+              </a:lnSpc>
+              <a:spcBef>
+                <a:spcPct val="0"/>
+              </a:spcBef>
+              <a:buNone/>
+              <a:defRPr sz="4400" kern="1200">
+                <a:solidFill>
+                  <a:schemeClr val="tx1"/>
+                </a:solidFill>
+                <a:latin typeface="+mj-lt"/>
+                <a:ea typeface="+mj-ea"/>
+                <a:cs typeface="+mj-cs"/>
+              </a:defRPr>
+            </a:lvl1pPr>
+          </a:lstStyle>
+          <a:p>
+            <a:pPr algn="ctr"/>
+            <a:r>
+              <a:rPr lang="it-IT" dirty="0" err="1"/>
+              <a:t>Granty</a:t>
+            </a:r>
+            <a:r>
+              <a:rPr lang="it-IT" dirty="0"/>
+              <a:t> </a:t>
+            </a:r>
+            <a:r>
+              <a:rPr lang="it-IT" dirty="0" err="1"/>
+              <a:t>crane</a:t>
+            </a:r>
+            <a:endParaRPr lang="it-IT" dirty="0"/>
+          </a:p>
+        </p:txBody>
+      </p:sp>
+      <mc:AlternateContent xmlns:mc="http://schemas.openxmlformats.org/markup-compatibility/2006">
+        <mc:Choice xmlns:a14="http://schemas.microsoft.com/office/drawing/2010/main" Requires="a14">
+          <p:sp>
+            <p:nvSpPr>
+              <p:cNvPr id="9" name="CasellaDiTesto 8">
+                <a:extLst>
+                  <a:ext uri="{FF2B5EF4-FFF2-40B4-BE49-F238E27FC236}">
+                    <a16:creationId xmlns:a16="http://schemas.microsoft.com/office/drawing/2014/main" id="{86F89E2B-2067-3C4F-A4E7-D7C1F99F332E}"/>
+                  </a:ext>
+                </a:extLst>
+              </p:cNvPr>
+              <p:cNvSpPr txBox="1"/>
+              <p:nvPr/>
+            </p:nvSpPr>
+            <p:spPr>
+              <a:xfrm>
+                <a:off x="1766548" y="2807623"/>
+                <a:ext cx="8658903" cy="2830518"/>
+              </a:xfrm>
+              <a:prstGeom prst="rect">
+                <a:avLst/>
+              </a:prstGeom>
+              <a:noFill/>
+            </p:spPr>
+            <p:txBody>
+              <a:bodyPr wrap="square" rtlCol="0">
+                <a:spAutoFit/>
+              </a:bodyPr>
+              <a:lstStyle/>
+              <a:p>
+                <a:r>
+                  <a:rPr lang="it-IT" sz="2400" dirty="0"/>
+                  <a:t>OSSERVABILITA’</a:t>
+                </a:r>
+                <a:endParaRPr lang="it-IT" sz="2000" dirty="0"/>
+              </a:p>
+              <a:p>
+                <a:pPr algn="ctr"/>
+                <a:r>
+                  <a:rPr lang="it-IT" sz="2000" dirty="0"/>
+                  <a:t>Per valutare l’osservabilità del sistema è stata costruita la </a:t>
+                </a:r>
+                <a:r>
+                  <a:rPr lang="it-IT" sz="2000" dirty="0" err="1"/>
+                  <a:t>co</a:t>
+                </a:r>
+                <a:r>
+                  <a:rPr lang="it-IT" sz="2000" i="1" dirty="0" err="1"/>
+                  <a:t>distribuzione</a:t>
+                </a:r>
+                <a:r>
+                  <a:rPr lang="it-IT" sz="2000" i="1" dirty="0"/>
+                  <a:t> di osservabilità</a:t>
+                </a:r>
+                <a:r>
+                  <a:rPr lang="it-IT" sz="2000" dirty="0"/>
+                  <a:t> e verificata la condizione</a:t>
+                </a:r>
+                <a:r>
+                  <a:rPr lang="it-IT" sz="2400" dirty="0"/>
+                  <a:t> </a:t>
+                </a:r>
+              </a:p>
+              <a:p>
+                <a:pPr algn="ctr"/>
+                <a14:m>
+                  <m:oMathPara xmlns:m="http://schemas.openxmlformats.org/officeDocument/2006/math">
+                    <m:oMathParaPr>
+                      <m:jc m:val="centerGroup"/>
+                    </m:oMathParaPr>
+                    <m:oMath xmlns:m="http://schemas.openxmlformats.org/officeDocument/2006/math">
+                      <m:r>
+                        <a:rPr lang="it-IT" sz="2000" b="0" i="1" smtClean="0">
+                          <a:latin typeface="Cambria Math" panose="02040503050406030204" pitchFamily="18" charset="0"/>
+                        </a:rPr>
+                        <m:t>𝑑𝑂</m:t>
+                      </m:r>
+                      <m:r>
+                        <a:rPr lang="it-IT" sz="2000" b="0" i="1" smtClean="0">
+                          <a:latin typeface="Cambria Math" panose="02040503050406030204" pitchFamily="18" charset="0"/>
+                        </a:rPr>
+                        <m:t>=</m:t>
+                      </m:r>
+                      <m:r>
+                        <a:rPr lang="it-IT" sz="2000" b="0" i="1" smtClean="0">
+                          <a:latin typeface="Cambria Math" panose="02040503050406030204" pitchFamily="18" charset="0"/>
+                        </a:rPr>
+                        <m:t>𝑠𝑝𝑎𝑛</m:t>
+                      </m:r>
+                      <m:d>
+                        <m:dPr>
+                          <m:ctrlPr>
+                            <a:rPr lang="it-IT" sz="2000" b="0" i="1" smtClean="0">
+                              <a:latin typeface="Cambria Math" panose="02040503050406030204" pitchFamily="18" charset="0"/>
+                            </a:rPr>
+                          </m:ctrlPr>
+                        </m:dPr>
+                        <m:e>
+                          <m:r>
+                            <a:rPr lang="it-IT" sz="2000" b="0" i="1" smtClean="0">
+                              <a:latin typeface="Cambria Math" panose="02040503050406030204" pitchFamily="18" charset="0"/>
+                            </a:rPr>
+                            <m:t>𝑑h</m:t>
+                          </m:r>
+                          <m:d>
+                            <m:dPr>
+                              <m:ctrlPr>
+                                <a:rPr lang="it-IT" sz="2000" b="0" i="1" smtClean="0">
+                                  <a:latin typeface="Cambria Math" panose="02040503050406030204" pitchFamily="18" charset="0"/>
+                                </a:rPr>
+                              </m:ctrlPr>
+                            </m:dPr>
+                            <m:e>
+                              <m:r>
+                                <a:rPr lang="it-IT" sz="2000" b="0" i="1" smtClean="0">
+                                  <a:latin typeface="Cambria Math" panose="02040503050406030204" pitchFamily="18" charset="0"/>
+                                </a:rPr>
+                                <m:t>𝑞</m:t>
+                              </m:r>
+                            </m:e>
+                          </m:d>
+                          <m:r>
+                            <a:rPr lang="it-IT" sz="2000" b="0" i="1" smtClean="0">
+                              <a:latin typeface="Cambria Math" panose="02040503050406030204" pitchFamily="18" charset="0"/>
+                            </a:rPr>
+                            <m:t>, </m:t>
+                          </m:r>
+                          <m:r>
+                            <a:rPr lang="it-IT" sz="2000" b="0" i="1" smtClean="0">
+                              <a:latin typeface="Cambria Math" panose="02040503050406030204" pitchFamily="18" charset="0"/>
+                            </a:rPr>
+                            <m:t>𝑑𝐿𝑓h</m:t>
+                          </m:r>
+                          <m:d>
+                            <m:dPr>
+                              <m:ctrlPr>
+                                <a:rPr lang="it-IT" sz="2000" b="0" i="1" smtClean="0">
+                                  <a:latin typeface="Cambria Math" panose="02040503050406030204" pitchFamily="18" charset="0"/>
+                                </a:rPr>
+                              </m:ctrlPr>
+                            </m:dPr>
+                            <m:e>
+                              <m:r>
+                                <a:rPr lang="it-IT" sz="2000" b="0" i="1" smtClean="0">
+                                  <a:latin typeface="Cambria Math" panose="02040503050406030204" pitchFamily="18" charset="0"/>
+                                </a:rPr>
+                                <m:t>𝑞</m:t>
+                              </m:r>
+                            </m:e>
+                          </m:d>
+                          <m:r>
+                            <a:rPr lang="it-IT" sz="2000" b="0" i="1" smtClean="0">
+                              <a:latin typeface="Cambria Math" panose="02040503050406030204" pitchFamily="18" charset="0"/>
+                            </a:rPr>
+                            <m:t>, </m:t>
+                          </m:r>
+                          <m:r>
+                            <a:rPr lang="it-IT" sz="2000" b="0" i="1" smtClean="0">
+                              <a:latin typeface="Cambria Math" panose="02040503050406030204" pitchFamily="18" charset="0"/>
+                            </a:rPr>
+                            <m:t>𝑑𝐿𝑔h</m:t>
+                          </m:r>
+                          <m:d>
+                            <m:dPr>
+                              <m:ctrlPr>
+                                <a:rPr lang="it-IT" sz="2000" b="0" i="1" smtClean="0">
+                                  <a:latin typeface="Cambria Math" panose="02040503050406030204" pitchFamily="18" charset="0"/>
+                                </a:rPr>
+                              </m:ctrlPr>
+                            </m:dPr>
+                            <m:e>
+                              <m:r>
+                                <a:rPr lang="it-IT" sz="2000" b="0" i="1" smtClean="0">
+                                  <a:latin typeface="Cambria Math" panose="02040503050406030204" pitchFamily="18" charset="0"/>
+                                </a:rPr>
+                                <m:t>𝑞</m:t>
+                              </m:r>
+                            </m:e>
+                          </m:d>
+                          <m:r>
+                            <a:rPr lang="it-IT" sz="2000" b="0" i="1" smtClean="0">
+                              <a:latin typeface="Cambria Math" panose="02040503050406030204" pitchFamily="18" charset="0"/>
+                            </a:rPr>
+                            <m:t>,</m:t>
+                          </m:r>
+                          <m:r>
+                            <a:rPr lang="it-IT" sz="2000" b="0" i="1" smtClean="0">
+                              <a:latin typeface="Cambria Math" panose="02040503050406030204" pitchFamily="18" charset="0"/>
+                            </a:rPr>
+                            <m:t>𝑑</m:t>
+                          </m:r>
+                          <m:sSub>
+                            <m:sSubPr>
+                              <m:ctrlPr>
+                                <a:rPr lang="it-IT" sz="2000" b="0" i="1" smtClean="0">
+                                  <a:latin typeface="Cambria Math" panose="02040503050406030204" pitchFamily="18" charset="0"/>
+                                </a:rPr>
+                              </m:ctrlPr>
+                            </m:sSubPr>
+                            <m:e>
+                              <m:r>
+                                <a:rPr lang="it-IT" sz="2000" b="0" i="1" smtClean="0">
+                                  <a:latin typeface="Cambria Math" panose="02040503050406030204" pitchFamily="18" charset="0"/>
+                                </a:rPr>
+                                <m:t>𝐿</m:t>
+                              </m:r>
+                            </m:e>
+                            <m:sub>
+                              <m:sSup>
+                                <m:sSupPr>
+                                  <m:ctrlPr>
+                                    <a:rPr lang="it-IT" sz="2000" b="0" i="1" smtClean="0">
+                                      <a:latin typeface="Cambria Math" panose="02040503050406030204" pitchFamily="18" charset="0"/>
+                                    </a:rPr>
+                                  </m:ctrlPr>
+                                </m:sSupPr>
+                                <m:e>
+                                  <m:r>
+                                    <a:rPr lang="it-IT" sz="2000" b="0" i="1" smtClean="0">
+                                      <a:latin typeface="Cambria Math" panose="02040503050406030204" pitchFamily="18" charset="0"/>
+                                    </a:rPr>
+                                    <m:t>𝑓</m:t>
+                                  </m:r>
+                                </m:e>
+                                <m:sup>
+                                  <m:r>
+                                    <a:rPr lang="it-IT" sz="2000" b="0" i="1" smtClean="0">
+                                      <a:latin typeface="Cambria Math" panose="02040503050406030204" pitchFamily="18" charset="0"/>
+                                    </a:rPr>
+                                    <m:t>2</m:t>
+                                  </m:r>
+                                </m:sup>
+                              </m:sSup>
+                            </m:sub>
+                          </m:sSub>
+                          <m:r>
+                            <a:rPr lang="it-IT" sz="2000" b="0" i="1" smtClean="0">
+                              <a:latin typeface="Cambria Math" panose="02040503050406030204" pitchFamily="18" charset="0"/>
+                            </a:rPr>
+                            <m:t>h</m:t>
+                          </m:r>
+                          <m:d>
+                            <m:dPr>
+                              <m:ctrlPr>
+                                <a:rPr lang="it-IT" sz="2000" b="0" i="1" smtClean="0">
+                                  <a:latin typeface="Cambria Math" panose="02040503050406030204" pitchFamily="18" charset="0"/>
+                                </a:rPr>
+                              </m:ctrlPr>
+                            </m:dPr>
+                            <m:e>
+                              <m:r>
+                                <a:rPr lang="it-IT" sz="2000" b="0" i="1" smtClean="0">
+                                  <a:latin typeface="Cambria Math" panose="02040503050406030204" pitchFamily="18" charset="0"/>
+                                </a:rPr>
+                                <m:t>𝑞</m:t>
+                              </m:r>
+                            </m:e>
+                          </m:d>
+                          <m:r>
+                            <a:rPr lang="it-IT" sz="2000" b="0" i="1" smtClean="0">
+                              <a:latin typeface="Cambria Math" panose="02040503050406030204" pitchFamily="18" charset="0"/>
+                            </a:rPr>
+                            <m:t>,</m:t>
+                          </m:r>
+                          <m:r>
+                            <a:rPr lang="it-IT" sz="2000" b="0" i="1" smtClean="0">
+                              <a:latin typeface="Cambria Math" panose="02040503050406030204" pitchFamily="18" charset="0"/>
+                            </a:rPr>
+                            <m:t>𝑑𝐿𝑔</m:t>
+                          </m:r>
+                          <m:r>
+                            <a:rPr lang="it-IT" sz="2000" b="0" i="1" smtClean="0">
+                              <a:latin typeface="Cambria Math" panose="02040503050406030204" pitchFamily="18" charset="0"/>
+                            </a:rPr>
+                            <m:t>𝐿</m:t>
+                          </m:r>
+                          <m:r>
+                            <a:rPr lang="it-IT" sz="2000" b="0" i="1" baseline="-25000" smtClean="0">
+                              <a:latin typeface="Cambria Math" panose="02040503050406030204" pitchFamily="18" charset="0"/>
+                            </a:rPr>
+                            <m:t>𝑓</m:t>
+                          </m:r>
+                          <m:r>
+                            <a:rPr lang="it-IT" sz="2000" b="0" i="1" smtClean="0">
+                              <a:latin typeface="Cambria Math" panose="02040503050406030204" pitchFamily="18" charset="0"/>
+                            </a:rPr>
+                            <m:t>h</m:t>
+                          </m:r>
+                          <m:d>
+                            <m:dPr>
+                              <m:ctrlPr>
+                                <a:rPr lang="it-IT" sz="2000" b="0" i="1" smtClean="0">
+                                  <a:latin typeface="Cambria Math" panose="02040503050406030204" pitchFamily="18" charset="0"/>
+                                </a:rPr>
+                              </m:ctrlPr>
+                            </m:dPr>
+                            <m:e>
+                              <m:r>
+                                <a:rPr lang="it-IT" sz="2000" b="0" i="1" smtClean="0">
+                                  <a:latin typeface="Cambria Math" panose="02040503050406030204" pitchFamily="18" charset="0"/>
+                                </a:rPr>
+                                <m:t>𝑞</m:t>
+                              </m:r>
+                            </m:e>
+                          </m:d>
+                          <m:r>
+                            <a:rPr lang="it-IT" sz="2000" b="0" i="1" smtClean="0">
+                              <a:latin typeface="Cambria Math" panose="02040503050406030204" pitchFamily="18" charset="0"/>
+                            </a:rPr>
+                            <m:t>,</m:t>
+                          </m:r>
+                          <m:r>
+                            <a:rPr lang="it-IT" sz="2000" b="0" i="1" smtClean="0">
+                              <a:latin typeface="Cambria Math" panose="02040503050406030204" pitchFamily="18" charset="0"/>
+                            </a:rPr>
+                            <m:t>𝑑𝐿𝑓</m:t>
+                          </m:r>
+                          <m:r>
+                            <a:rPr lang="it-IT" sz="2000" b="0" i="1" smtClean="0">
+                              <a:latin typeface="Cambria Math" panose="02040503050406030204" pitchFamily="18" charset="0"/>
+                            </a:rPr>
+                            <m:t>𝐿</m:t>
+                          </m:r>
+                          <m:r>
+                            <a:rPr lang="it-IT" sz="2000" b="0" i="1" baseline="-25000" smtClean="0">
+                              <a:latin typeface="Cambria Math" panose="02040503050406030204" pitchFamily="18" charset="0"/>
+                            </a:rPr>
+                            <m:t>𝑔</m:t>
+                          </m:r>
+                          <m:r>
+                            <a:rPr lang="it-IT" sz="2000" b="0" i="1" smtClean="0">
+                              <a:latin typeface="Cambria Math" panose="02040503050406030204" pitchFamily="18" charset="0"/>
+                            </a:rPr>
+                            <m:t>h</m:t>
+                          </m:r>
+                          <m:d>
+                            <m:dPr>
+                              <m:ctrlPr>
+                                <a:rPr lang="it-IT" sz="2000" b="0" i="1" smtClean="0">
+                                  <a:latin typeface="Cambria Math" panose="02040503050406030204" pitchFamily="18" charset="0"/>
+                                </a:rPr>
+                              </m:ctrlPr>
+                            </m:dPr>
+                            <m:e>
+                              <m:r>
+                                <a:rPr lang="it-IT" sz="2000" b="0" i="1" smtClean="0">
+                                  <a:latin typeface="Cambria Math" panose="02040503050406030204" pitchFamily="18" charset="0"/>
+                                </a:rPr>
+                                <m:t>𝑞</m:t>
+                              </m:r>
+                            </m:e>
+                          </m:d>
+                        </m:e>
+                      </m:d>
+                      <m:r>
+                        <a:rPr lang="it-IT" sz="2000" b="0" i="1" smtClean="0">
+                          <a:latin typeface="Cambria Math" panose="02040503050406030204" pitchFamily="18" charset="0"/>
+                        </a:rPr>
+                        <m:t>=</m:t>
+                      </m:r>
+                      <m:r>
+                        <a:rPr lang="it-IT" sz="2000" b="0" i="1" smtClean="0">
+                          <a:latin typeface="Cambria Math" panose="02040503050406030204" pitchFamily="18" charset="0"/>
+                        </a:rPr>
+                        <m:t>𝑛</m:t>
+                      </m:r>
+                    </m:oMath>
+                  </m:oMathPara>
+                </a14:m>
+                <a:endParaRPr lang="it-IT" sz="2000" dirty="0"/>
+              </a:p>
+              <a:p>
+                <a:pPr algn="ctr"/>
+                <a:r>
+                  <a:rPr lang="it-IT" sz="2000" dirty="0"/>
+                  <a:t>per cui il sistema risulta localmente osservabile.</a:t>
+                </a:r>
+              </a:p>
+              <a:p>
+                <a:pPr algn="ctr"/>
+                <a:r>
+                  <a:rPr lang="it-IT" sz="2000" dirty="0"/>
+                  <a:t>Per la scelta effettuata delle funzioni di uscita il rango della matrice </a:t>
+                </a:r>
+                <a14:m>
+                  <m:oMath xmlns:m="http://schemas.openxmlformats.org/officeDocument/2006/math">
+                    <m:r>
+                      <a:rPr lang="it-IT" sz="2000" i="1">
+                        <a:latin typeface="Cambria Math" panose="02040503050406030204" pitchFamily="18" charset="0"/>
+                      </a:rPr>
+                      <m:t>𝑑𝑂</m:t>
+                    </m:r>
+                  </m:oMath>
+                </a14:m>
+                <a:r>
+                  <a:rPr lang="it-IT" sz="2000" dirty="0"/>
+                  <a:t> risulta essere pari a 4 , è quindi possibile concludere che il sistema sia localmente osservabile.</a:t>
+                </a:r>
+              </a:p>
+            </p:txBody>
+          </p:sp>
+        </mc:Choice>
+        <mc:Fallback>
+          <p:sp>
+            <p:nvSpPr>
+              <p:cNvPr id="9" name="CasellaDiTesto 8">
+                <a:extLst>
+                  <a:ext uri="{FF2B5EF4-FFF2-40B4-BE49-F238E27FC236}">
+                    <a16:creationId xmlns:a16="http://schemas.microsoft.com/office/drawing/2014/main" id="{86F89E2B-2067-3C4F-A4E7-D7C1F99F332E}"/>
+                  </a:ext>
+                </a:extLst>
+              </p:cNvPr>
+              <p:cNvSpPr txBox="1">
+                <a:spLocks noRot="1" noChangeAspect="1" noMove="1" noResize="1" noEditPoints="1" noAdjustHandles="1" noChangeArrowheads="1" noChangeShapeType="1" noTextEdit="1"/>
+              </p:cNvSpPr>
+              <p:nvPr/>
+            </p:nvSpPr>
+            <p:spPr>
+              <a:xfrm>
+                <a:off x="1766548" y="2807623"/>
+                <a:ext cx="8658903" cy="2830518"/>
+              </a:xfrm>
+              <a:prstGeom prst="rect">
+                <a:avLst/>
+              </a:prstGeom>
+              <a:blipFill>
+                <a:blip r:embed="rId2"/>
+                <a:stretch>
+                  <a:fillRect l="-1025" t="-1786" b="-2232"/>
+                </a:stretch>
+              </a:blipFill>
+            </p:spPr>
+            <p:txBody>
+              <a:bodyPr/>
+              <a:lstStyle/>
+              <a:p>
+                <a:r>
+                  <a:rPr lang="it-IT">
+                    <a:noFill/>
+                  </a:rPr>
+                  <a:t> </a:t>
+                </a:r>
+              </a:p>
+            </p:txBody>
+          </p:sp>
+        </mc:Fallback>
+      </mc:AlternateContent>
+      <p:pic>
+        <p:nvPicPr>
+          <p:cNvPr id="6" name="Immagine 5">
+            <a:extLst>
+              <a:ext uri="{FF2B5EF4-FFF2-40B4-BE49-F238E27FC236}">
+                <a16:creationId xmlns:a16="http://schemas.microsoft.com/office/drawing/2014/main" id="{E6250F99-85E5-234E-8497-D887077950D0}"/>
+              </a:ext>
+            </a:extLst>
+          </p:cNvPr>
+          <p:cNvPicPr>
+            <a:picLocks noChangeAspect="1"/>
+          </p:cNvPicPr>
+          <p:nvPr/>
+        </p:nvPicPr>
+        <p:blipFill>
+          <a:blip r:embed="rId3"/>
+          <a:stretch>
+            <a:fillRect/>
+          </a:stretch>
+        </p:blipFill>
+        <p:spPr>
+          <a:xfrm>
+            <a:off x="1714030" y="1475623"/>
+            <a:ext cx="2093143" cy="1332000"/>
+          </a:xfrm>
+          <a:prstGeom prst="rect">
+            <a:avLst/>
+          </a:prstGeom>
+        </p:spPr>
+      </p:pic>
+    </p:spTree>
+    <p:extLst>
+      <p:ext uri="{BB962C8B-B14F-4D97-AF65-F5344CB8AC3E}">
+        <p14:creationId xmlns:p14="http://schemas.microsoft.com/office/powerpoint/2010/main" val="132746671"/>
+      </p:ext>
+    </p:extLst>
+  </p:cSld>
+  <p:clrMapOvr>
+    <a:masterClrMapping/>
+  </p:clrMapOvr>
+</p:sld>
+</file>
+
+<file path=ppt/slides/slide24.xml><?xml version="1.0" encoding="utf-8"?>
+<p:sld xmlns:a="http://schemas.openxmlformats.org/drawingml/2006/main" xmlns:r="http://schemas.openxmlformats.org/officeDocument/2006/relationships" xmlns:p="http://schemas.openxmlformats.org/presentationml/2006/main">
+  <p:cSld>
+    <p:spTree>
+      <p:nvGrpSpPr>
+        <p:cNvPr id="1" name=""/>
+        <p:cNvGrpSpPr/>
+        <p:nvPr/>
+      </p:nvGrpSpPr>
+      <p:grpSpPr>
+        <a:xfrm>
+          <a:off x="0" y="0"/>
+          <a:ext cx="0" cy="0"/>
+          <a:chOff x="0" y="0"/>
+          <a:chExt cx="0" cy="0"/>
+        </a:xfrm>
+      </p:grpSpPr>
+      <p:sp>
+        <p:nvSpPr>
+          <p:cNvPr id="8" name="Titolo 1">
+            <a:extLst>
+              <a:ext uri="{FF2B5EF4-FFF2-40B4-BE49-F238E27FC236}">
+                <a16:creationId xmlns:a16="http://schemas.microsoft.com/office/drawing/2014/main" id="{E8EDF0BB-0558-644B-BB96-58C4BD179ABC}"/>
+              </a:ext>
+            </a:extLst>
+          </p:cNvPr>
+          <p:cNvSpPr txBox="1">
+            <a:spLocks/>
+          </p:cNvSpPr>
+          <p:nvPr/>
+        </p:nvSpPr>
+        <p:spPr>
+          <a:xfrm>
+            <a:off x="1524000" y="454393"/>
+            <a:ext cx="9144000" cy="1021230"/>
+          </a:xfrm>
+          <a:prstGeom prst="rect">
+            <a:avLst/>
+          </a:prstGeom>
+        </p:spPr>
+        <p:txBody>
+          <a:bodyPr vert="horz" lIns="91440" tIns="45720" rIns="91440" bIns="45720" rtlCol="0" anchor="ctr">
+            <a:normAutofit/>
+          </a:bodyPr>
+          <a:lstStyle>
+            <a:lvl1pPr algn="l" defTabSz="914400" rtl="0" eaLnBrk="1" latinLnBrk="0" hangingPunct="1">
+              <a:lnSpc>
+                <a:spcPct val="90000"/>
+              </a:lnSpc>
+              <a:spcBef>
+                <a:spcPct val="0"/>
+              </a:spcBef>
+              <a:buNone/>
+              <a:defRPr sz="4400" kern="1200">
+                <a:solidFill>
+                  <a:schemeClr val="tx1"/>
+                </a:solidFill>
+                <a:latin typeface="+mj-lt"/>
+                <a:ea typeface="+mj-ea"/>
+                <a:cs typeface="+mj-cs"/>
+              </a:defRPr>
+            </a:lvl1pPr>
+          </a:lstStyle>
+          <a:p>
+            <a:pPr algn="ctr"/>
+            <a:r>
+              <a:rPr lang="it-IT" dirty="0" err="1"/>
+              <a:t>Granty</a:t>
+            </a:r>
+            <a:r>
+              <a:rPr lang="it-IT" dirty="0"/>
+              <a:t> </a:t>
+            </a:r>
+            <a:r>
+              <a:rPr lang="it-IT" dirty="0" err="1"/>
+              <a:t>crane</a:t>
+            </a:r>
+            <a:endParaRPr lang="it-IT" dirty="0"/>
+          </a:p>
+        </p:txBody>
+      </p:sp>
+      <mc:AlternateContent xmlns:mc="http://schemas.openxmlformats.org/markup-compatibility/2006">
+        <mc:Choice xmlns:a14="http://schemas.microsoft.com/office/drawing/2010/main" Requires="a14">
+          <p:sp>
+            <p:nvSpPr>
+              <p:cNvPr id="9" name="CasellaDiTesto 8">
+                <a:extLst>
+                  <a:ext uri="{FF2B5EF4-FFF2-40B4-BE49-F238E27FC236}">
+                    <a16:creationId xmlns:a16="http://schemas.microsoft.com/office/drawing/2014/main" id="{86F89E2B-2067-3C4F-A4E7-D7C1F99F332E}"/>
+                  </a:ext>
+                </a:extLst>
+              </p:cNvPr>
+              <p:cNvSpPr txBox="1"/>
+              <p:nvPr/>
+            </p:nvSpPr>
+            <p:spPr>
+              <a:xfrm>
+                <a:off x="3807173" y="1475623"/>
+                <a:ext cx="8015859" cy="2919582"/>
+              </a:xfrm>
+              <a:prstGeom prst="rect">
+                <a:avLst/>
+              </a:prstGeom>
+              <a:noFill/>
+            </p:spPr>
+            <p:txBody>
+              <a:bodyPr wrap="square" rtlCol="0">
+                <a:spAutoFit/>
+              </a:bodyPr>
+              <a:lstStyle/>
+              <a:p>
+                <a:r>
+                  <a:rPr lang="it-IT" sz="2400" dirty="0"/>
+                  <a:t>FEEDBACK LINEARIZATION</a:t>
+                </a:r>
+                <a:endParaRPr lang="it-IT" sz="2000" dirty="0"/>
+              </a:p>
+              <a:p>
+                <a:pPr algn="ctr"/>
+                <a:r>
+                  <a:rPr lang="it-IT" sz="2000" dirty="0"/>
+                  <a:t>Per la scelta fatta delle funzioni di uscita, il sistema ha grado relativo pari a 4, dimensione dello spazio di stato.</a:t>
+                </a:r>
+              </a:p>
+              <a:p>
+                <a:pPr algn="ctr"/>
+                <a:r>
+                  <a:rPr lang="it-IT" sz="2000" dirty="0"/>
+                  <a:t>Inoltre il sistema verifica le condizioni:</a:t>
+                </a:r>
+              </a:p>
+              <a:p>
+                <a:pPr marL="457200" indent="-457200" algn="ctr">
+                  <a:buAutoNum type="alphaLcParenBoth"/>
+                </a:pPr>
+                <a14:m>
+                  <m:oMath xmlns:m="http://schemas.openxmlformats.org/officeDocument/2006/math">
+                    <m:r>
+                      <a:rPr lang="it-IT" sz="2000" b="0" i="1" smtClean="0">
+                        <a:latin typeface="Cambria Math" panose="02040503050406030204" pitchFamily="18" charset="0"/>
+                      </a:rPr>
+                      <m:t>𝑟𝑎𝑛𝑘</m:t>
+                    </m:r>
+                    <m:d>
+                      <m:dPr>
+                        <m:begChr m:val="["/>
+                        <m:endChr m:val="]"/>
+                        <m:ctrlPr>
+                          <a:rPr lang="it-IT" sz="2000" b="0" i="1" smtClean="0">
+                            <a:latin typeface="Cambria Math" panose="02040503050406030204" pitchFamily="18" charset="0"/>
+                          </a:rPr>
+                        </m:ctrlPr>
+                      </m:dPr>
+                      <m:e>
+                        <m:r>
+                          <a:rPr lang="it-IT" sz="2000" b="0" i="1" smtClean="0">
+                            <a:latin typeface="Cambria Math" panose="02040503050406030204" pitchFamily="18" charset="0"/>
+                          </a:rPr>
+                          <m:t>𝑔</m:t>
+                        </m:r>
+                        <m:d>
+                          <m:dPr>
+                            <m:ctrlPr>
+                              <a:rPr lang="it-IT" sz="2000" b="0" i="1" smtClean="0">
+                                <a:latin typeface="Cambria Math" panose="02040503050406030204" pitchFamily="18" charset="0"/>
+                              </a:rPr>
+                            </m:ctrlPr>
+                          </m:dPr>
+                          <m:e>
+                            <m:r>
+                              <a:rPr lang="it-IT" sz="2000" b="0" i="1" smtClean="0">
+                                <a:latin typeface="Cambria Math" panose="02040503050406030204" pitchFamily="18" charset="0"/>
+                              </a:rPr>
+                              <m:t>𝑞</m:t>
+                            </m:r>
+                            <m:r>
+                              <a:rPr lang="it-IT" sz="2000" b="0" i="1" baseline="-25000" smtClean="0">
+                                <a:latin typeface="Cambria Math" panose="02040503050406030204" pitchFamily="18" charset="0"/>
+                              </a:rPr>
+                              <m:t>0</m:t>
+                            </m:r>
+                          </m:e>
+                        </m:d>
+                        <m:r>
+                          <a:rPr lang="it-IT" sz="2000" b="0" i="1" smtClean="0">
+                            <a:latin typeface="Cambria Math" panose="02040503050406030204" pitchFamily="18" charset="0"/>
+                          </a:rPr>
+                          <m:t> </m:t>
+                        </m:r>
+                        <m:r>
+                          <a:rPr lang="it-IT" sz="2000" b="0" i="1" smtClean="0">
+                            <a:latin typeface="Cambria Math" panose="02040503050406030204" pitchFamily="18" charset="0"/>
+                          </a:rPr>
+                          <m:t>𝑎𝑑𝑓</m:t>
+                        </m:r>
+                        <m:r>
+                          <a:rPr lang="it-IT" sz="2000" b="0" i="1" smtClean="0">
+                            <a:latin typeface="Cambria Math" panose="02040503050406030204" pitchFamily="18" charset="0"/>
+                          </a:rPr>
+                          <m:t>𝑔</m:t>
+                        </m:r>
+                        <m:d>
+                          <m:dPr>
+                            <m:ctrlPr>
+                              <a:rPr lang="it-IT" sz="2000" b="0" i="1" smtClean="0">
+                                <a:latin typeface="Cambria Math" panose="02040503050406030204" pitchFamily="18" charset="0"/>
+                              </a:rPr>
+                            </m:ctrlPr>
+                          </m:dPr>
+                          <m:e>
+                            <m:r>
+                              <a:rPr lang="it-IT" sz="2000" b="0" i="1" smtClean="0">
+                                <a:latin typeface="Cambria Math" panose="02040503050406030204" pitchFamily="18" charset="0"/>
+                              </a:rPr>
+                              <m:t>𝑞</m:t>
+                            </m:r>
+                            <m:r>
+                              <a:rPr lang="it-IT" sz="2000" b="0" i="1" baseline="-25000" smtClean="0">
+                                <a:latin typeface="Cambria Math" panose="02040503050406030204" pitchFamily="18" charset="0"/>
+                              </a:rPr>
+                              <m:t>0</m:t>
+                            </m:r>
+                          </m:e>
+                        </m:d>
+                        <m:r>
+                          <a:rPr lang="it-IT" sz="2000" b="0" i="1" smtClean="0">
+                            <a:latin typeface="Cambria Math" panose="02040503050406030204" pitchFamily="18" charset="0"/>
+                          </a:rPr>
+                          <m:t> …</m:t>
+                        </m:r>
+                        <m:sSubSup>
+                          <m:sSubSupPr>
+                            <m:ctrlPr>
+                              <a:rPr lang="it-IT" sz="2000" b="0" i="1" smtClean="0">
+                                <a:latin typeface="Cambria Math" panose="02040503050406030204" pitchFamily="18" charset="0"/>
+                              </a:rPr>
+                            </m:ctrlPr>
+                          </m:sSubSupPr>
+                          <m:e>
+                            <m:r>
+                              <a:rPr lang="it-IT" sz="2000" b="0" i="1" smtClean="0">
+                                <a:latin typeface="Cambria Math" panose="02040503050406030204" pitchFamily="18" charset="0"/>
+                              </a:rPr>
+                              <m:t>𝑎𝑑</m:t>
+                            </m:r>
+                          </m:e>
+                          <m:sub>
+                            <m:r>
+                              <a:rPr lang="it-IT" sz="2000" b="0" i="1" smtClean="0">
+                                <a:latin typeface="Cambria Math" panose="02040503050406030204" pitchFamily="18" charset="0"/>
+                              </a:rPr>
+                              <m:t>𝑓</m:t>
+                            </m:r>
+                          </m:sub>
+                          <m:sup>
+                            <m:d>
+                              <m:dPr>
+                                <m:ctrlPr>
+                                  <a:rPr lang="it-IT" sz="2000" i="1">
+                                    <a:latin typeface="Cambria Math" panose="02040503050406030204" pitchFamily="18" charset="0"/>
+                                  </a:rPr>
+                                </m:ctrlPr>
+                              </m:dPr>
+                              <m:e>
+                                <m:r>
+                                  <a:rPr lang="it-IT" sz="2000" i="1">
+                                    <a:latin typeface="Cambria Math" panose="02040503050406030204" pitchFamily="18" charset="0"/>
+                                  </a:rPr>
+                                  <m:t>𝑛</m:t>
+                                </m:r>
+                                <m:r>
+                                  <a:rPr lang="it-IT" sz="2000" i="1">
+                                    <a:latin typeface="Cambria Math" panose="02040503050406030204" pitchFamily="18" charset="0"/>
+                                  </a:rPr>
+                                  <m:t>−1</m:t>
+                                </m:r>
+                              </m:e>
+                            </m:d>
+                          </m:sup>
+                        </m:sSubSup>
+                        <m:r>
+                          <a:rPr lang="it-IT" sz="2000" b="0" i="1" smtClean="0">
+                            <a:latin typeface="Cambria Math" panose="02040503050406030204" pitchFamily="18" charset="0"/>
+                          </a:rPr>
+                          <m:t>𝑔</m:t>
+                        </m:r>
+                        <m:d>
+                          <m:dPr>
+                            <m:ctrlPr>
+                              <a:rPr lang="it-IT" sz="2000" b="0" i="1" smtClean="0">
+                                <a:latin typeface="Cambria Math" panose="02040503050406030204" pitchFamily="18" charset="0"/>
+                              </a:rPr>
+                            </m:ctrlPr>
+                          </m:dPr>
+                          <m:e>
+                            <m:r>
+                              <a:rPr lang="it-IT" sz="2000" b="0" i="1" smtClean="0">
+                                <a:latin typeface="Cambria Math" panose="02040503050406030204" pitchFamily="18" charset="0"/>
+                              </a:rPr>
+                              <m:t>𝑞</m:t>
+                            </m:r>
+                            <m:r>
+                              <a:rPr lang="it-IT" sz="2000" b="0" i="1" baseline="-25000" smtClean="0">
+                                <a:latin typeface="Cambria Math" panose="02040503050406030204" pitchFamily="18" charset="0"/>
+                              </a:rPr>
+                              <m:t>0</m:t>
+                            </m:r>
+                          </m:e>
+                        </m:d>
+                      </m:e>
+                    </m:d>
+                    <m:r>
+                      <a:rPr lang="it-IT" sz="2000" b="0" i="1" smtClean="0">
+                        <a:latin typeface="Cambria Math" panose="02040503050406030204" pitchFamily="18" charset="0"/>
+                      </a:rPr>
+                      <m:t>=</m:t>
+                    </m:r>
+                    <m:r>
+                      <a:rPr lang="it-IT" sz="2000" b="0" i="1" smtClean="0">
+                        <a:latin typeface="Cambria Math" panose="02040503050406030204" pitchFamily="18" charset="0"/>
+                      </a:rPr>
+                      <m:t>𝑛</m:t>
+                    </m:r>
+                  </m:oMath>
+                </a14:m>
+                <a:endParaRPr lang="it-IT" sz="2000" b="0" dirty="0"/>
+              </a:p>
+              <a:p>
+                <a:pPr marL="457200" indent="-457200" algn="ctr">
+                  <a:buAutoNum type="alphaLcParenBoth"/>
+                </a:pPr>
+                <a14:m>
+                  <m:oMath xmlns:m="http://schemas.openxmlformats.org/officeDocument/2006/math">
+                    <m:r>
+                      <a:rPr lang="it-IT" sz="2000" b="0" i="1" smtClean="0">
+                        <a:latin typeface="Cambria Math" panose="02040503050406030204" pitchFamily="18" charset="0"/>
+                      </a:rPr>
+                      <m:t>𝑠𝑝𝑎𝑛</m:t>
+                    </m:r>
+                    <m:d>
+                      <m:dPr>
+                        <m:ctrlPr>
+                          <a:rPr lang="it-IT" sz="2000" b="0" i="1" smtClean="0">
+                            <a:latin typeface="Cambria Math" panose="02040503050406030204" pitchFamily="18" charset="0"/>
+                          </a:rPr>
+                        </m:ctrlPr>
+                      </m:dPr>
+                      <m:e>
+                        <m:r>
+                          <a:rPr lang="it-IT" sz="2000" b="0" i="1" smtClean="0">
+                            <a:latin typeface="Cambria Math" panose="02040503050406030204" pitchFamily="18" charset="0"/>
+                          </a:rPr>
+                          <m:t>𝑔</m:t>
+                        </m:r>
+                        <m:r>
+                          <a:rPr lang="it-IT" sz="2000" b="0" i="1" smtClean="0">
+                            <a:latin typeface="Cambria Math" panose="02040503050406030204" pitchFamily="18" charset="0"/>
+                          </a:rPr>
+                          <m:t>, </m:t>
+                        </m:r>
+                        <m:r>
+                          <a:rPr lang="it-IT" sz="2000" b="0" i="1" smtClean="0">
+                            <a:latin typeface="Cambria Math" panose="02040503050406030204" pitchFamily="18" charset="0"/>
+                          </a:rPr>
+                          <m:t>𝑎𝑑𝑓𝑔</m:t>
+                        </m:r>
+                        <m:r>
+                          <a:rPr lang="it-IT" sz="2000" b="0" i="1" smtClean="0">
+                            <a:latin typeface="Cambria Math" panose="02040503050406030204" pitchFamily="18" charset="0"/>
+                          </a:rPr>
+                          <m:t>,  …, </m:t>
+                        </m:r>
+                        <m:sSubSup>
+                          <m:sSubSupPr>
+                            <m:ctrlPr>
+                              <a:rPr lang="it-IT" sz="2000" b="0" i="1" smtClean="0">
+                                <a:latin typeface="Cambria Math" panose="02040503050406030204" pitchFamily="18" charset="0"/>
+                              </a:rPr>
+                            </m:ctrlPr>
+                          </m:sSubSupPr>
+                          <m:e>
+                            <m:r>
+                              <a:rPr lang="it-IT" sz="2000" b="0" i="1" smtClean="0">
+                                <a:latin typeface="Cambria Math" panose="02040503050406030204" pitchFamily="18" charset="0"/>
+                              </a:rPr>
+                              <m:t>𝑎𝑑</m:t>
+                            </m:r>
+                          </m:e>
+                          <m:sub>
+                            <m:r>
+                              <a:rPr lang="it-IT" sz="2000" b="0" i="1" smtClean="0">
+                                <a:latin typeface="Cambria Math" panose="02040503050406030204" pitchFamily="18" charset="0"/>
+                              </a:rPr>
+                              <m:t>𝑓</m:t>
+                            </m:r>
+                          </m:sub>
+                          <m:sup>
+                            <m:r>
+                              <a:rPr lang="it-IT" sz="2000" b="0" i="1" smtClean="0">
+                                <a:latin typeface="Cambria Math" panose="02040503050406030204" pitchFamily="18" charset="0"/>
+                              </a:rPr>
+                              <m:t>(</m:t>
+                            </m:r>
+                            <m:r>
+                              <a:rPr lang="it-IT" sz="2000" b="0" i="1" smtClean="0">
+                                <a:latin typeface="Cambria Math" panose="02040503050406030204" pitchFamily="18" charset="0"/>
+                              </a:rPr>
+                              <m:t>𝑛</m:t>
+                            </m:r>
+                            <m:r>
+                              <a:rPr lang="it-IT" sz="2000" b="0" i="1" smtClean="0">
+                                <a:latin typeface="Cambria Math" panose="02040503050406030204" pitchFamily="18" charset="0"/>
+                              </a:rPr>
+                              <m:t>−2)</m:t>
+                            </m:r>
+                          </m:sup>
+                        </m:sSubSup>
+                        <m:r>
+                          <a:rPr lang="it-IT" sz="2000" b="0" i="1" smtClean="0">
+                            <a:latin typeface="Cambria Math" panose="02040503050406030204" pitchFamily="18" charset="0"/>
+                          </a:rPr>
+                          <m:t>𝑔</m:t>
+                        </m:r>
+                      </m:e>
+                    </m:d>
+                    <m:r>
+                      <a:rPr lang="it-IT" sz="2000" b="0" i="1" smtClean="0">
+                        <a:latin typeface="Cambria Math" panose="02040503050406030204" pitchFamily="18" charset="0"/>
+                      </a:rPr>
+                      <m:t> </m:t>
+                    </m:r>
+                    <m:r>
+                      <a:rPr lang="it-IT" sz="2000" b="0" i="1" smtClean="0">
+                        <a:latin typeface="Cambria Math" panose="02040503050406030204" pitchFamily="18" charset="0"/>
+                      </a:rPr>
+                      <m:t>𝑠𝑖𝑎</m:t>
+                    </m:r>
+                    <m:r>
+                      <a:rPr lang="it-IT" sz="2000" b="0" i="1" smtClean="0">
+                        <a:latin typeface="Cambria Math" panose="02040503050406030204" pitchFamily="18" charset="0"/>
+                      </a:rPr>
+                      <m:t> </m:t>
+                    </m:r>
+                    <m:r>
+                      <a:rPr lang="it-IT" sz="2000" b="0" i="1" smtClean="0">
+                        <a:latin typeface="Cambria Math" panose="02040503050406030204" pitchFamily="18" charset="0"/>
+                      </a:rPr>
+                      <m:t>𝑖𝑛𝑣𝑜𝑙𝑢𝑡𝑖𝑣𝑜</m:t>
+                    </m:r>
+                  </m:oMath>
+                </a14:m>
+                <a:endParaRPr lang="it-IT" sz="2000" dirty="0"/>
+              </a:p>
+              <a:p>
+                <a:pPr algn="ctr"/>
+                <a:r>
+                  <a:rPr lang="it-IT" sz="2000" dirty="0"/>
+                  <a:t>per cui esistono un cambiamento di variabili </a:t>
+                </a:r>
+                <a14:m>
+                  <m:oMath xmlns:m="http://schemas.openxmlformats.org/officeDocument/2006/math">
+                    <m:r>
+                      <m:rPr>
+                        <m:sty m:val="p"/>
+                      </m:rPr>
+                      <a:rPr lang="el-GR" sz="2000" i="1" smtClean="0">
+                        <a:latin typeface="Cambria Math" panose="02040503050406030204" pitchFamily="18" charset="0"/>
+                        <a:ea typeface="Cambria Math" panose="02040503050406030204" pitchFamily="18" charset="0"/>
+                      </a:rPr>
+                      <m:t>Φ</m:t>
+                    </m:r>
+                    <m:r>
+                      <a:rPr lang="it-IT" sz="2000" b="0" i="1" smtClean="0">
+                        <a:latin typeface="Cambria Math" panose="02040503050406030204" pitchFamily="18" charset="0"/>
+                        <a:ea typeface="Cambria Math" panose="02040503050406030204" pitchFamily="18" charset="0"/>
+                      </a:rPr>
+                      <m:t>(</m:t>
+                    </m:r>
+                    <m:r>
+                      <a:rPr lang="it-IT" sz="2000" b="0" i="1" smtClean="0">
+                        <a:latin typeface="Cambria Math" panose="02040503050406030204" pitchFamily="18" charset="0"/>
+                        <a:ea typeface="Cambria Math" panose="02040503050406030204" pitchFamily="18" charset="0"/>
+                      </a:rPr>
+                      <m:t>𝑞</m:t>
+                    </m:r>
+                    <m:r>
+                      <a:rPr lang="it-IT" sz="2000" b="0" i="1" smtClean="0">
+                        <a:latin typeface="Cambria Math" panose="02040503050406030204" pitchFamily="18" charset="0"/>
+                        <a:ea typeface="Cambria Math" panose="02040503050406030204" pitchFamily="18" charset="0"/>
+                      </a:rPr>
+                      <m:t>)</m:t>
+                    </m:r>
+                  </m:oMath>
+                </a14:m>
+                <a:r>
+                  <a:rPr lang="it-IT" sz="2000" dirty="0"/>
+                  <a:t> e le funzioni di retroazione statica </a:t>
+                </a:r>
+                <a14:m>
+                  <m:oMath xmlns:m="http://schemas.openxmlformats.org/officeDocument/2006/math">
+                    <m:r>
+                      <a:rPr lang="el-GR" sz="2000" i="1" smtClean="0">
+                        <a:latin typeface="Cambria Math" panose="02040503050406030204" pitchFamily="18" charset="0"/>
+                        <a:ea typeface="Cambria Math" panose="02040503050406030204" pitchFamily="18" charset="0"/>
+                      </a:rPr>
+                      <m:t>𝛼</m:t>
+                    </m:r>
+                    <m:r>
+                      <a:rPr lang="it-IT" sz="2000" i="1">
+                        <a:latin typeface="Cambria Math" panose="02040503050406030204" pitchFamily="18" charset="0"/>
+                        <a:ea typeface="Cambria Math" panose="02040503050406030204" pitchFamily="18" charset="0"/>
+                      </a:rPr>
+                      <m:t>(</m:t>
+                    </m:r>
+                    <m:r>
+                      <a:rPr lang="it-IT" sz="2000" b="0" i="1" smtClean="0">
+                        <a:latin typeface="Cambria Math" panose="02040503050406030204" pitchFamily="18" charset="0"/>
+                        <a:ea typeface="Cambria Math" panose="02040503050406030204" pitchFamily="18" charset="0"/>
+                      </a:rPr>
+                      <m:t>𝑞</m:t>
+                    </m:r>
+                    <m:r>
+                      <a:rPr lang="it-IT" sz="2000" i="1">
+                        <a:latin typeface="Cambria Math" panose="02040503050406030204" pitchFamily="18" charset="0"/>
+                        <a:ea typeface="Cambria Math" panose="02040503050406030204" pitchFamily="18" charset="0"/>
+                      </a:rPr>
+                      <m:t>)</m:t>
+                    </m:r>
+                  </m:oMath>
+                </a14:m>
+                <a:r>
+                  <a:rPr lang="it-IT" sz="2000" dirty="0"/>
+                  <a:t> e </a:t>
+                </a:r>
+                <a14:m>
+                  <m:oMath xmlns:m="http://schemas.openxmlformats.org/officeDocument/2006/math">
+                    <m:r>
+                      <a:rPr lang="el-GR" sz="2000" i="1" smtClean="0">
+                        <a:latin typeface="Cambria Math" panose="02040503050406030204" pitchFamily="18" charset="0"/>
+                        <a:ea typeface="Cambria Math" panose="02040503050406030204" pitchFamily="18" charset="0"/>
+                      </a:rPr>
+                      <m:t>𝛽</m:t>
+                    </m:r>
+                    <m:d>
+                      <m:dPr>
+                        <m:ctrlPr>
+                          <a:rPr lang="it-IT" sz="2000" i="1" smtClean="0">
+                            <a:latin typeface="Cambria Math" panose="02040503050406030204" pitchFamily="18" charset="0"/>
+                            <a:ea typeface="Cambria Math" panose="02040503050406030204" pitchFamily="18" charset="0"/>
+                          </a:rPr>
+                        </m:ctrlPr>
+                      </m:dPr>
+                      <m:e>
+                        <m:r>
+                          <a:rPr lang="it-IT" sz="2000" b="0" i="1" smtClean="0">
+                            <a:latin typeface="Cambria Math" panose="02040503050406030204" pitchFamily="18" charset="0"/>
+                            <a:ea typeface="Cambria Math" panose="02040503050406030204" pitchFamily="18" charset="0"/>
+                          </a:rPr>
+                          <m:t>𝑞</m:t>
+                        </m:r>
+                      </m:e>
+                    </m:d>
+                  </m:oMath>
+                </a14:m>
+                <a:r>
+                  <a:rPr lang="it-IT" sz="2000" dirty="0"/>
+                  <a:t> tali da linearizzare il sistema.</a:t>
+                </a:r>
+              </a:p>
+            </p:txBody>
+          </p:sp>
+        </mc:Choice>
+        <mc:Fallback>
+          <p:sp>
+            <p:nvSpPr>
+              <p:cNvPr id="9" name="CasellaDiTesto 8">
+                <a:extLst>
+                  <a:ext uri="{FF2B5EF4-FFF2-40B4-BE49-F238E27FC236}">
+                    <a16:creationId xmlns:a16="http://schemas.microsoft.com/office/drawing/2014/main" id="{86F89E2B-2067-3C4F-A4E7-D7C1F99F332E}"/>
+                  </a:ext>
+                </a:extLst>
+              </p:cNvPr>
+              <p:cNvSpPr txBox="1">
+                <a:spLocks noRot="1" noChangeAspect="1" noMove="1" noResize="1" noEditPoints="1" noAdjustHandles="1" noChangeArrowheads="1" noChangeShapeType="1" noTextEdit="1"/>
+              </p:cNvSpPr>
+              <p:nvPr/>
+            </p:nvSpPr>
+            <p:spPr>
+              <a:xfrm>
+                <a:off x="3807173" y="1475623"/>
+                <a:ext cx="8015859" cy="2919582"/>
+              </a:xfrm>
+              <a:prstGeom prst="rect">
+                <a:avLst/>
+              </a:prstGeom>
+              <a:blipFill>
+                <a:blip r:embed="rId2"/>
+                <a:stretch>
+                  <a:fillRect l="-1268" t="-1299" r="-317" b="-2165"/>
+                </a:stretch>
+              </a:blipFill>
+            </p:spPr>
+            <p:txBody>
+              <a:bodyPr/>
+              <a:lstStyle/>
+              <a:p>
+                <a:r>
+                  <a:rPr lang="it-IT">
+                    <a:noFill/>
+                  </a:rPr>
+                  <a:t> </a:t>
+                </a:r>
+              </a:p>
+            </p:txBody>
+          </p:sp>
+        </mc:Fallback>
+      </mc:AlternateContent>
+      <p:pic>
+        <p:nvPicPr>
+          <p:cNvPr id="6" name="Immagine 5">
+            <a:extLst>
+              <a:ext uri="{FF2B5EF4-FFF2-40B4-BE49-F238E27FC236}">
+                <a16:creationId xmlns:a16="http://schemas.microsoft.com/office/drawing/2014/main" id="{E6250F99-85E5-234E-8497-D887077950D0}"/>
+              </a:ext>
+            </a:extLst>
+          </p:cNvPr>
+          <p:cNvPicPr>
+            <a:picLocks noChangeAspect="1"/>
+          </p:cNvPicPr>
+          <p:nvPr/>
+        </p:nvPicPr>
+        <p:blipFill>
+          <a:blip r:embed="rId3"/>
+          <a:stretch>
+            <a:fillRect/>
+          </a:stretch>
+        </p:blipFill>
+        <p:spPr>
+          <a:xfrm>
+            <a:off x="1714030" y="1475623"/>
+            <a:ext cx="2093143" cy="1332000"/>
+          </a:xfrm>
+          <a:prstGeom prst="rect">
+            <a:avLst/>
+          </a:prstGeom>
+        </p:spPr>
+      </p:pic>
+      <p:sp>
+        <p:nvSpPr>
+          <p:cNvPr id="2" name="CasellaDiTesto 1">
+            <a:extLst>
+              <a:ext uri="{FF2B5EF4-FFF2-40B4-BE49-F238E27FC236}">
+                <a16:creationId xmlns:a16="http://schemas.microsoft.com/office/drawing/2014/main" id="{E264DEEC-A4F3-4B42-865F-34C843C86AC4}"/>
+              </a:ext>
+            </a:extLst>
+          </p:cNvPr>
+          <p:cNvSpPr txBox="1"/>
+          <p:nvPr/>
+        </p:nvSpPr>
+        <p:spPr>
+          <a:xfrm>
+            <a:off x="1529298" y="4395205"/>
+            <a:ext cx="9138702" cy="400110"/>
+          </a:xfrm>
+          <a:prstGeom prst="rect">
+            <a:avLst/>
+          </a:prstGeom>
+          <a:noFill/>
+        </p:spPr>
+        <p:txBody>
+          <a:bodyPr wrap="square" rtlCol="0">
+            <a:spAutoFit/>
+          </a:bodyPr>
+          <a:lstStyle/>
+          <a:p>
+            <a:pPr algn="ctr"/>
+            <a:r>
+              <a:rPr lang="it-IT" sz="2000" dirty="0"/>
+              <a:t>Si ottiene quindi una nuova espressione per il sistema in forma linearizzata:</a:t>
+            </a:r>
+          </a:p>
+        </p:txBody>
+      </p:sp>
+      <p:pic>
+        <p:nvPicPr>
+          <p:cNvPr id="4" name="Immagine 3">
+            <a:extLst>
+              <a:ext uri="{FF2B5EF4-FFF2-40B4-BE49-F238E27FC236}">
+                <a16:creationId xmlns:a16="http://schemas.microsoft.com/office/drawing/2014/main" id="{2C6A0E1B-C092-A948-8BDC-A80A86EA34BB}"/>
+              </a:ext>
+            </a:extLst>
+          </p:cNvPr>
+          <p:cNvPicPr>
+            <a:picLocks noChangeAspect="1"/>
+          </p:cNvPicPr>
+          <p:nvPr/>
+        </p:nvPicPr>
+        <p:blipFill>
+          <a:blip r:embed="rId4"/>
+          <a:stretch>
+            <a:fillRect/>
+          </a:stretch>
+        </p:blipFill>
+        <p:spPr>
+          <a:xfrm>
+            <a:off x="2760601" y="4910859"/>
+            <a:ext cx="1422400" cy="1130300"/>
+          </a:xfrm>
+          <a:prstGeom prst="rect">
+            <a:avLst/>
+          </a:prstGeom>
+        </p:spPr>
+      </p:pic>
+      <p:pic>
+        <p:nvPicPr>
+          <p:cNvPr id="11" name="Immagine 10">
+            <a:extLst>
+              <a:ext uri="{FF2B5EF4-FFF2-40B4-BE49-F238E27FC236}">
+                <a16:creationId xmlns:a16="http://schemas.microsoft.com/office/drawing/2014/main" id="{4FBCAE45-0528-CF45-9332-70F418EC2E48}"/>
+              </a:ext>
+            </a:extLst>
+          </p:cNvPr>
+          <p:cNvPicPr>
+            <a:picLocks noChangeAspect="1"/>
+          </p:cNvPicPr>
+          <p:nvPr/>
+        </p:nvPicPr>
+        <p:blipFill>
+          <a:blip r:embed="rId5"/>
+          <a:stretch>
+            <a:fillRect/>
+          </a:stretch>
+        </p:blipFill>
+        <p:spPr>
+          <a:xfrm>
+            <a:off x="4595249" y="4864067"/>
+            <a:ext cx="2514600" cy="1143000"/>
+          </a:xfrm>
+          <a:prstGeom prst="rect">
+            <a:avLst/>
+          </a:prstGeom>
+        </p:spPr>
+      </p:pic>
+      <p:pic>
+        <p:nvPicPr>
+          <p:cNvPr id="13" name="Immagine 12">
+            <a:extLst>
+              <a:ext uri="{FF2B5EF4-FFF2-40B4-BE49-F238E27FC236}">
+                <a16:creationId xmlns:a16="http://schemas.microsoft.com/office/drawing/2014/main" id="{19B6F227-AD86-D04D-92DE-160C5367F494}"/>
+              </a:ext>
+            </a:extLst>
+          </p:cNvPr>
+          <p:cNvPicPr>
+            <a:picLocks noChangeAspect="1"/>
+          </p:cNvPicPr>
+          <p:nvPr/>
+        </p:nvPicPr>
+        <p:blipFill>
+          <a:blip r:embed="rId6"/>
+          <a:stretch>
+            <a:fillRect/>
+          </a:stretch>
+        </p:blipFill>
+        <p:spPr>
+          <a:xfrm>
+            <a:off x="7618349" y="5012459"/>
+            <a:ext cx="1714500" cy="927100"/>
+          </a:xfrm>
+          <a:prstGeom prst="rect">
+            <a:avLst/>
+          </a:prstGeom>
+        </p:spPr>
+      </p:pic>
+    </p:spTree>
+    <p:extLst>
+      <p:ext uri="{BB962C8B-B14F-4D97-AF65-F5344CB8AC3E}">
+        <p14:creationId xmlns:p14="http://schemas.microsoft.com/office/powerpoint/2010/main" val="3145499344"/>
+      </p:ext>
+    </p:extLst>
+  </p:cSld>
+  <p:clrMapOvr>
+    <a:masterClrMapping/>
+  </p:clrMapOvr>
+</p:sld>
+</file>
+
+<file path=ppt/slides/slide25.xml><?xml version="1.0" encoding="utf-8"?>
+<p:sld xmlns:a="http://schemas.openxmlformats.org/drawingml/2006/main" xmlns:r="http://schemas.openxmlformats.org/officeDocument/2006/relationships" xmlns:p="http://schemas.openxmlformats.org/presentationml/2006/main">
+  <p:cSld>
+    <p:spTree>
+      <p:nvGrpSpPr>
+        <p:cNvPr id="1" name=""/>
+        <p:cNvGrpSpPr/>
+        <p:nvPr/>
+      </p:nvGrpSpPr>
+      <p:grpSpPr>
+        <a:xfrm>
+          <a:off x="0" y="0"/>
+          <a:ext cx="0" cy="0"/>
+          <a:chOff x="0" y="0"/>
+          <a:chExt cx="0" cy="0"/>
+        </a:xfrm>
+      </p:grpSpPr>
+      <p:sp>
+        <p:nvSpPr>
+          <p:cNvPr id="8" name="Titolo 1">
+            <a:extLst>
+              <a:ext uri="{FF2B5EF4-FFF2-40B4-BE49-F238E27FC236}">
+                <a16:creationId xmlns:a16="http://schemas.microsoft.com/office/drawing/2014/main" id="{E8EDF0BB-0558-644B-BB96-58C4BD179ABC}"/>
+              </a:ext>
+            </a:extLst>
+          </p:cNvPr>
+          <p:cNvSpPr txBox="1">
+            <a:spLocks/>
+          </p:cNvSpPr>
+          <p:nvPr/>
+        </p:nvSpPr>
+        <p:spPr>
+          <a:xfrm>
+            <a:off x="1524000" y="454393"/>
+            <a:ext cx="9144000" cy="1021230"/>
+          </a:xfrm>
+          <a:prstGeom prst="rect">
+            <a:avLst/>
+          </a:prstGeom>
+        </p:spPr>
+        <p:txBody>
+          <a:bodyPr vert="horz" lIns="91440" tIns="45720" rIns="91440" bIns="45720" rtlCol="0" anchor="ctr">
+            <a:normAutofit/>
+          </a:bodyPr>
+          <a:lstStyle>
+            <a:lvl1pPr algn="l" defTabSz="914400" rtl="0" eaLnBrk="1" latinLnBrk="0" hangingPunct="1">
+              <a:lnSpc>
+                <a:spcPct val="90000"/>
+              </a:lnSpc>
+              <a:spcBef>
+                <a:spcPct val="0"/>
+              </a:spcBef>
+              <a:buNone/>
+              <a:defRPr sz="4400" kern="1200">
+                <a:solidFill>
+                  <a:schemeClr val="tx1"/>
+                </a:solidFill>
+                <a:latin typeface="+mj-lt"/>
+                <a:ea typeface="+mj-ea"/>
+                <a:cs typeface="+mj-cs"/>
+              </a:defRPr>
+            </a:lvl1pPr>
+          </a:lstStyle>
+          <a:p>
+            <a:pPr algn="ctr"/>
+            <a:r>
+              <a:rPr lang="it-IT" dirty="0" err="1"/>
+              <a:t>Granty</a:t>
+            </a:r>
+            <a:r>
+              <a:rPr lang="it-IT" dirty="0"/>
+              <a:t> </a:t>
+            </a:r>
+            <a:r>
+              <a:rPr lang="it-IT" dirty="0" err="1"/>
+              <a:t>crane</a:t>
+            </a:r>
+            <a:endParaRPr lang="it-IT" dirty="0"/>
+          </a:p>
+        </p:txBody>
+      </p:sp>
+      <p:sp>
+        <p:nvSpPr>
+          <p:cNvPr id="9" name="CasellaDiTesto 8">
+            <a:extLst>
+              <a:ext uri="{FF2B5EF4-FFF2-40B4-BE49-F238E27FC236}">
+                <a16:creationId xmlns:a16="http://schemas.microsoft.com/office/drawing/2014/main" id="{86F89E2B-2067-3C4F-A4E7-D7C1F99F332E}"/>
+              </a:ext>
+            </a:extLst>
+          </p:cNvPr>
+          <p:cNvSpPr txBox="1"/>
+          <p:nvPr/>
+        </p:nvSpPr>
+        <p:spPr>
+          <a:xfrm>
+            <a:off x="3807173" y="1475623"/>
+            <a:ext cx="8015859" cy="2000548"/>
+          </a:xfrm>
+          <a:prstGeom prst="rect">
+            <a:avLst/>
+          </a:prstGeom>
+          <a:noFill/>
+        </p:spPr>
+        <p:txBody>
+          <a:bodyPr wrap="square" rtlCol="0">
+            <a:spAutoFit/>
+          </a:bodyPr>
+          <a:lstStyle/>
+          <a:p>
+            <a:r>
+              <a:rPr lang="it-IT" sz="2400" dirty="0"/>
+              <a:t>FEEDBACK LINEARIZATION - CONTROLLER</a:t>
+            </a:r>
+            <a:endParaRPr lang="it-IT" sz="2000" dirty="0"/>
+          </a:p>
+          <a:p>
+            <a:r>
+              <a:rPr lang="it-IT" sz="2000" dirty="0"/>
+              <a:t>Per il sistema linearizzato è stato progettato un controllore di tipo PD, imponendo come riferimento il vettore </a:t>
+            </a:r>
+            <a:r>
+              <a:rPr lang="it-IT" sz="2000" dirty="0" err="1"/>
+              <a:t>q</a:t>
+            </a:r>
+            <a:r>
+              <a:rPr lang="it-IT" sz="2000" baseline="-25000" dirty="0" err="1"/>
+              <a:t>ref</a:t>
+            </a:r>
+            <a:r>
+              <a:rPr lang="it-IT" sz="2000" dirty="0"/>
+              <a:t> = [0,0,3,0]</a:t>
+            </a:r>
+            <a:r>
+              <a:rPr lang="it-IT" sz="2000" baseline="30000" dirty="0"/>
+              <a:t>T</a:t>
+            </a:r>
+            <a:r>
+              <a:rPr lang="it-IT" sz="2000" dirty="0"/>
+              <a:t>, cioè richiedendo che all’istante finale il sistema abbia velocità lineare e angolare nulle e la posizione del carrello sia spostata di 3m a destra rispetto alla posizione iniziale, pur mantenendo l’angolo del carico nullo.</a:t>
+            </a:r>
+          </a:p>
+        </p:txBody>
+      </p:sp>
+      <p:pic>
+        <p:nvPicPr>
+          <p:cNvPr id="6" name="Immagine 5">
+            <a:extLst>
+              <a:ext uri="{FF2B5EF4-FFF2-40B4-BE49-F238E27FC236}">
+                <a16:creationId xmlns:a16="http://schemas.microsoft.com/office/drawing/2014/main" id="{E6250F99-85E5-234E-8497-D887077950D0}"/>
+              </a:ext>
+            </a:extLst>
+          </p:cNvPr>
+          <p:cNvPicPr>
+            <a:picLocks noChangeAspect="1"/>
+          </p:cNvPicPr>
+          <p:nvPr/>
+        </p:nvPicPr>
+        <p:blipFill>
+          <a:blip r:embed="rId2"/>
+          <a:stretch>
+            <a:fillRect/>
+          </a:stretch>
+        </p:blipFill>
+        <p:spPr>
+          <a:xfrm>
+            <a:off x="1714030" y="1475623"/>
+            <a:ext cx="2093143" cy="1332000"/>
+          </a:xfrm>
+          <a:prstGeom prst="rect">
+            <a:avLst/>
+          </a:prstGeom>
+        </p:spPr>
+      </p:pic>
+      <p:pic>
+        <p:nvPicPr>
+          <p:cNvPr id="5" name="Immagine 4">
+            <a:extLst>
+              <a:ext uri="{FF2B5EF4-FFF2-40B4-BE49-F238E27FC236}">
+                <a16:creationId xmlns:a16="http://schemas.microsoft.com/office/drawing/2014/main" id="{5FF6D8C6-6243-6645-A0B5-1D9142946D8C}"/>
+              </a:ext>
+            </a:extLst>
+          </p:cNvPr>
+          <p:cNvPicPr>
+            <a:picLocks noChangeAspect="1"/>
+          </p:cNvPicPr>
+          <p:nvPr/>
+        </p:nvPicPr>
+        <p:blipFill>
+          <a:blip r:embed="rId3"/>
+          <a:stretch>
+            <a:fillRect/>
+          </a:stretch>
+        </p:blipFill>
+        <p:spPr>
+          <a:xfrm>
+            <a:off x="2628900" y="3476171"/>
+            <a:ext cx="6934200" cy="2796540"/>
+          </a:xfrm>
+          <a:prstGeom prst="rect">
+            <a:avLst/>
+          </a:prstGeom>
+        </p:spPr>
+      </p:pic>
+    </p:spTree>
+    <p:extLst>
+      <p:ext uri="{BB962C8B-B14F-4D97-AF65-F5344CB8AC3E}">
+        <p14:creationId xmlns:p14="http://schemas.microsoft.com/office/powerpoint/2010/main" val="3282804330"/>
+      </p:ext>
+    </p:extLst>
+  </p:cSld>
+  <p:clrMapOvr>
+    <a:masterClrMapping/>
+  </p:clrMapOvr>
+</p:sld>
+</file>
+
+<file path=ppt/slides/slide26.xml><?xml version="1.0" encoding="utf-8"?>
+<p:sld xmlns:a="http://schemas.openxmlformats.org/drawingml/2006/main" xmlns:r="http://schemas.openxmlformats.org/officeDocument/2006/relationships" xmlns:p="http://schemas.openxmlformats.org/presentationml/2006/main">
+  <p:cSld>
+    <p:spTree>
+      <p:nvGrpSpPr>
+        <p:cNvPr id="1" name=""/>
+        <p:cNvGrpSpPr/>
+        <p:nvPr/>
+      </p:nvGrpSpPr>
+      <p:grpSpPr>
+        <a:xfrm>
+          <a:off x="0" y="0"/>
+          <a:ext cx="0" cy="0"/>
+          <a:chOff x="0" y="0"/>
+          <a:chExt cx="0" cy="0"/>
+        </a:xfrm>
+      </p:grpSpPr>
+      <p:sp>
+        <p:nvSpPr>
+          <p:cNvPr id="8" name="Titolo 1">
+            <a:extLst>
+              <a:ext uri="{FF2B5EF4-FFF2-40B4-BE49-F238E27FC236}">
+                <a16:creationId xmlns:a16="http://schemas.microsoft.com/office/drawing/2014/main" id="{E8EDF0BB-0558-644B-BB96-58C4BD179ABC}"/>
+              </a:ext>
+            </a:extLst>
+          </p:cNvPr>
+          <p:cNvSpPr txBox="1">
+            <a:spLocks/>
+          </p:cNvSpPr>
+          <p:nvPr/>
+        </p:nvSpPr>
+        <p:spPr>
+          <a:xfrm>
+            <a:off x="1524000" y="454393"/>
+            <a:ext cx="9144000" cy="1021230"/>
+          </a:xfrm>
+          <a:prstGeom prst="rect">
+            <a:avLst/>
+          </a:prstGeom>
+        </p:spPr>
+        <p:txBody>
+          <a:bodyPr vert="horz" lIns="91440" tIns="45720" rIns="91440" bIns="45720" rtlCol="0" anchor="ctr">
+            <a:normAutofit/>
+          </a:bodyPr>
+          <a:lstStyle>
+            <a:lvl1pPr algn="l" defTabSz="914400" rtl="0" eaLnBrk="1" latinLnBrk="0" hangingPunct="1">
+              <a:lnSpc>
+                <a:spcPct val="90000"/>
+              </a:lnSpc>
+              <a:spcBef>
+                <a:spcPct val="0"/>
+              </a:spcBef>
+              <a:buNone/>
+              <a:defRPr sz="4400" kern="1200">
+                <a:solidFill>
+                  <a:schemeClr val="tx1"/>
+                </a:solidFill>
+                <a:latin typeface="+mj-lt"/>
+                <a:ea typeface="+mj-ea"/>
+                <a:cs typeface="+mj-cs"/>
+              </a:defRPr>
+            </a:lvl1pPr>
+          </a:lstStyle>
+          <a:p>
+            <a:pPr algn="ctr"/>
+            <a:r>
+              <a:rPr lang="it-IT" dirty="0" err="1"/>
+              <a:t>Granty</a:t>
+            </a:r>
+            <a:r>
+              <a:rPr lang="it-IT" dirty="0"/>
+              <a:t> </a:t>
+            </a:r>
+            <a:r>
+              <a:rPr lang="it-IT" dirty="0" err="1"/>
+              <a:t>crane</a:t>
+            </a:r>
+            <a:endParaRPr lang="it-IT" dirty="0"/>
+          </a:p>
+        </p:txBody>
+      </p:sp>
+      <p:sp>
+        <p:nvSpPr>
+          <p:cNvPr id="9" name="CasellaDiTesto 8">
+            <a:extLst>
+              <a:ext uri="{FF2B5EF4-FFF2-40B4-BE49-F238E27FC236}">
+                <a16:creationId xmlns:a16="http://schemas.microsoft.com/office/drawing/2014/main" id="{86F89E2B-2067-3C4F-A4E7-D7C1F99F332E}"/>
+              </a:ext>
+            </a:extLst>
+          </p:cNvPr>
+          <p:cNvSpPr txBox="1"/>
+          <p:nvPr/>
+        </p:nvSpPr>
+        <p:spPr>
+          <a:xfrm>
+            <a:off x="3807173" y="1475623"/>
+            <a:ext cx="8015859" cy="461665"/>
+          </a:xfrm>
+          <a:prstGeom prst="rect">
+            <a:avLst/>
+          </a:prstGeom>
+          <a:noFill/>
+        </p:spPr>
+        <p:txBody>
+          <a:bodyPr wrap="square" rtlCol="0">
+            <a:spAutoFit/>
+          </a:bodyPr>
+          <a:lstStyle/>
+          <a:p>
+            <a:r>
+              <a:rPr lang="it-IT" sz="2400" dirty="0"/>
+              <a:t>FEEDBACK LINEARIZATION - CONTROLLER</a:t>
+            </a:r>
+            <a:endParaRPr lang="it-IT" sz="2000" dirty="0"/>
+          </a:p>
+        </p:txBody>
+      </p:sp>
+      <p:pic>
+        <p:nvPicPr>
+          <p:cNvPr id="6" name="Immagine 5">
+            <a:extLst>
+              <a:ext uri="{FF2B5EF4-FFF2-40B4-BE49-F238E27FC236}">
+                <a16:creationId xmlns:a16="http://schemas.microsoft.com/office/drawing/2014/main" id="{E6250F99-85E5-234E-8497-D887077950D0}"/>
+              </a:ext>
+            </a:extLst>
+          </p:cNvPr>
+          <p:cNvPicPr>
+            <a:picLocks noChangeAspect="1"/>
+          </p:cNvPicPr>
+          <p:nvPr/>
+        </p:nvPicPr>
+        <p:blipFill>
+          <a:blip r:embed="rId2"/>
+          <a:stretch>
+            <a:fillRect/>
+          </a:stretch>
+        </p:blipFill>
+        <p:spPr>
+          <a:xfrm>
+            <a:off x="1714030" y="1475623"/>
+            <a:ext cx="2093143" cy="1332000"/>
+          </a:xfrm>
+          <a:prstGeom prst="rect">
+            <a:avLst/>
+          </a:prstGeom>
+        </p:spPr>
+      </p:pic>
+    </p:spTree>
+    <p:extLst>
+      <p:ext uri="{BB962C8B-B14F-4D97-AF65-F5344CB8AC3E}">
+        <p14:creationId xmlns:p14="http://schemas.microsoft.com/office/powerpoint/2010/main" val="2378044821"/>
       </p:ext>
     </p:extLst>
   </p:cSld>

</xml_diff>

<commit_message>
Prove di controllore PID per Feedback Linearization
</commit_message>
<xml_diff>
--- a/Relazione/Presentazione.pptx
+++ b/Relazione/Presentazione.pptx
@@ -10118,10 +10118,10 @@
       </p:pic>
       <p:pic>
         <p:nvPicPr>
-          <p:cNvPr id="5" name="Immagine 4">
-            <a:extLst>
-              <a:ext uri="{FF2B5EF4-FFF2-40B4-BE49-F238E27FC236}">
-                <a16:creationId xmlns:a16="http://schemas.microsoft.com/office/drawing/2014/main" id="{5FF6D8C6-6243-6645-A0B5-1D9142946D8C}"/>
+          <p:cNvPr id="10" name="Immagine 9">
+            <a:extLst>
+              <a:ext uri="{FF2B5EF4-FFF2-40B4-BE49-F238E27FC236}">
+                <a16:creationId xmlns:a16="http://schemas.microsoft.com/office/drawing/2014/main" id="{071D20F1-F8A4-704A-AE94-00682FBAC34E}"/>
               </a:ext>
             </a:extLst>
           </p:cNvPr>
@@ -10138,8 +10138,8 @@
         </p:blipFill>
         <p:spPr>
           <a:xfrm>
-            <a:off x="2628900" y="3476171"/>
-            <a:ext cx="6934200" cy="2796540"/>
+            <a:off x="1981200" y="3476171"/>
+            <a:ext cx="8229600" cy="3038475"/>
           </a:xfrm>
           <a:prstGeom prst="rect">
             <a:avLst/>
@@ -10298,8 +10298,68 @@
         </p:blipFill>
         <p:spPr>
           <a:xfrm>
-            <a:off x="1714030" y="1475623"/>
+            <a:off x="1714030" y="809623"/>
             <a:ext cx="2093143" cy="1332000"/>
+          </a:xfrm>
+          <a:prstGeom prst="rect">
+            <a:avLst/>
+          </a:prstGeom>
+        </p:spPr>
+      </p:pic>
+      <p:pic>
+        <p:nvPicPr>
+          <p:cNvPr id="21" name="Immagine 20">
+            <a:extLst>
+              <a:ext uri="{FF2B5EF4-FFF2-40B4-BE49-F238E27FC236}">
+                <a16:creationId xmlns:a16="http://schemas.microsoft.com/office/drawing/2014/main" id="{92D93CE7-720B-124D-A377-72D7E22EB25C}"/>
+              </a:ext>
+            </a:extLst>
+          </p:cNvPr>
+          <p:cNvPicPr>
+            <a:picLocks noChangeAspect="1"/>
+          </p:cNvPicPr>
+          <p:nvPr/>
+        </p:nvPicPr>
+        <p:blipFill>
+          <a:blip r:embed="rId3"/>
+          <a:stretch>
+            <a:fillRect/>
+          </a:stretch>
+        </p:blipFill>
+        <p:spPr>
+          <a:xfrm>
+            <a:off x="326189" y="2141623"/>
+            <a:ext cx="5689600" cy="4267200"/>
+          </a:xfrm>
+          <a:prstGeom prst="rect">
+            <a:avLst/>
+          </a:prstGeom>
+        </p:spPr>
+      </p:pic>
+      <p:pic>
+        <p:nvPicPr>
+          <p:cNvPr id="23" name="Immagine 22">
+            <a:extLst>
+              <a:ext uri="{FF2B5EF4-FFF2-40B4-BE49-F238E27FC236}">
+                <a16:creationId xmlns:a16="http://schemas.microsoft.com/office/drawing/2014/main" id="{B3415B36-ACEF-EF4E-B307-C04D8D3CFE42}"/>
+              </a:ext>
+            </a:extLst>
+          </p:cNvPr>
+          <p:cNvPicPr>
+            <a:picLocks noChangeAspect="1"/>
+          </p:cNvPicPr>
+          <p:nvPr/>
+        </p:nvPicPr>
+        <p:blipFill>
+          <a:blip r:embed="rId4"/>
+          <a:stretch>
+            <a:fillRect/>
+          </a:stretch>
+        </p:blipFill>
+        <p:spPr>
+          <a:xfrm>
+            <a:off x="6015789" y="2141623"/>
+            <a:ext cx="5689600" cy="4267200"/>
           </a:xfrm>
           <a:prstGeom prst="rect">
             <a:avLst/>

</xml_diff>

<commit_message>
Aggiunti logo unipi e pie di pagina alla presentazione
</commit_message>
<xml_diff>
--- a/Relazione/Presentazione.pptx
+++ b/Relazione/Presentazione.pptx
@@ -284,7 +284,7 @@
           <a:p>
             <a:fld id="{27153579-3A4D-BB42-BD49-BB0F80A81A61}" type="datetimeFigureOut">
               <a:rPr lang="it-IT" smtClean="0"/>
-              <a:t>11/10/21</a:t>
+              <a:t>27/10/21</a:t>
             </a:fld>
             <a:endParaRPr lang="it-IT"/>
           </a:p>
@@ -457,7 +457,7 @@
           <a:p>
             <a:fld id="{27153579-3A4D-BB42-BD49-BB0F80A81A61}" type="datetimeFigureOut">
               <a:rPr lang="it-IT" smtClean="0"/>
-              <a:t>11/10/21</a:t>
+              <a:t>27/10/21</a:t>
             </a:fld>
             <a:endParaRPr lang="it-IT"/>
           </a:p>
@@ -640,7 +640,7 @@
           <a:p>
             <a:fld id="{27153579-3A4D-BB42-BD49-BB0F80A81A61}" type="datetimeFigureOut">
               <a:rPr lang="it-IT" smtClean="0"/>
-              <a:t>11/10/21</a:t>
+              <a:t>27/10/21</a:t>
             </a:fld>
             <a:endParaRPr lang="it-IT"/>
           </a:p>
@@ -813,7 +813,7 @@
           <a:p>
             <a:fld id="{27153579-3A4D-BB42-BD49-BB0F80A81A61}" type="datetimeFigureOut">
               <a:rPr lang="it-IT" smtClean="0"/>
-              <a:t>11/10/21</a:t>
+              <a:t>27/10/21</a:t>
             </a:fld>
             <a:endParaRPr lang="it-IT"/>
           </a:p>
@@ -1091,7 +1091,7 @@
           <a:p>
             <a:fld id="{27153579-3A4D-BB42-BD49-BB0F80A81A61}" type="datetimeFigureOut">
               <a:rPr lang="it-IT" smtClean="0"/>
-              <a:t>11/10/21</a:t>
+              <a:t>27/10/21</a:t>
             </a:fld>
             <a:endParaRPr lang="it-IT"/>
           </a:p>
@@ -1306,7 +1306,7 @@
           <a:p>
             <a:fld id="{27153579-3A4D-BB42-BD49-BB0F80A81A61}" type="datetimeFigureOut">
               <a:rPr lang="it-IT" smtClean="0"/>
-              <a:t>11/10/21</a:t>
+              <a:t>27/10/21</a:t>
             </a:fld>
             <a:endParaRPr lang="it-IT"/>
           </a:p>
@@ -1674,7 +1674,7 @@
           <a:p>
             <a:fld id="{27153579-3A4D-BB42-BD49-BB0F80A81A61}" type="datetimeFigureOut">
               <a:rPr lang="it-IT" smtClean="0"/>
-              <a:t>11/10/21</a:t>
+              <a:t>27/10/21</a:t>
             </a:fld>
             <a:endParaRPr lang="it-IT"/>
           </a:p>
@@ -1815,7 +1815,7 @@
           <a:p>
             <a:fld id="{27153579-3A4D-BB42-BD49-BB0F80A81A61}" type="datetimeFigureOut">
               <a:rPr lang="it-IT" smtClean="0"/>
-              <a:t>11/10/21</a:t>
+              <a:t>27/10/21</a:t>
             </a:fld>
             <a:endParaRPr lang="it-IT"/>
           </a:p>
@@ -1928,7 +1928,7 @@
           <a:p>
             <a:fld id="{27153579-3A4D-BB42-BD49-BB0F80A81A61}" type="datetimeFigureOut">
               <a:rPr lang="it-IT" smtClean="0"/>
-              <a:t>11/10/21</a:t>
+              <a:t>27/10/21</a:t>
             </a:fld>
             <a:endParaRPr lang="it-IT"/>
           </a:p>
@@ -2217,7 +2217,7 @@
           <a:p>
             <a:fld id="{27153579-3A4D-BB42-BD49-BB0F80A81A61}" type="datetimeFigureOut">
               <a:rPr lang="it-IT" smtClean="0"/>
-              <a:t>11/10/21</a:t>
+              <a:t>27/10/21</a:t>
             </a:fld>
             <a:endParaRPr lang="it-IT"/>
           </a:p>
@@ -2508,7 +2508,7 @@
           <a:p>
             <a:fld id="{27153579-3A4D-BB42-BD49-BB0F80A81A61}" type="datetimeFigureOut">
               <a:rPr lang="it-IT" smtClean="0"/>
-              <a:t>11/10/21</a:t>
+              <a:t>27/10/21</a:t>
             </a:fld>
             <a:endParaRPr lang="it-IT"/>
           </a:p>
@@ -2724,7 +2724,7 @@
           <a:p>
             <a:fld id="{27153579-3A4D-BB42-BD49-BB0F80A81A61}" type="datetimeFigureOut">
               <a:rPr lang="it-IT" smtClean="0"/>
-              <a:t>11/10/21</a:t>
+              <a:t>27/10/21</a:t>
             </a:fld>
             <a:endParaRPr lang="it-IT"/>
           </a:p>
@@ -3150,7 +3150,9 @@
               </a:ext>
             </a:extLst>
           </p:cNvPr>
-          <p:cNvPicPr/>
+          <p:cNvPicPr>
+            <a:picLocks noChangeAspect="1"/>
+          </p:cNvPicPr>
           <p:nvPr/>
         </p:nvPicPr>
         <p:blipFill>
@@ -3168,7 +3170,7 @@
         <p:spPr>
           <a:xfrm>
             <a:off x="241420" y="265431"/>
-            <a:ext cx="1306026" cy="1305462"/>
+            <a:ext cx="1428750" cy="1295400"/>
           </a:xfrm>
           <a:prstGeom prst="rect">
             <a:avLst/>
@@ -3446,6 +3448,144 @@
           <a:xfrm>
             <a:off x="5892800" y="1741714"/>
             <a:ext cx="5689600" cy="4267200"/>
+          </a:xfrm>
+          <a:prstGeom prst="rect">
+            <a:avLst/>
+          </a:prstGeom>
+        </p:spPr>
+      </p:pic>
+      <p:sp>
+        <p:nvSpPr>
+          <p:cNvPr id="6" name="Segnaposto data 3">
+            <a:extLst>
+              <a:ext uri="{FF2B5EF4-FFF2-40B4-BE49-F238E27FC236}">
+                <a16:creationId xmlns:a16="http://schemas.microsoft.com/office/drawing/2014/main" id="{C3BDAB99-7C55-E548-82F5-482F54CB8900}"/>
+              </a:ext>
+            </a:extLst>
+          </p:cNvPr>
+          <p:cNvSpPr>
+            <a:spLocks noGrp="1"/>
+          </p:cNvSpPr>
+          <p:nvPr>
+            <p:ph type="dt" sz="half" idx="10"/>
+          </p:nvPr>
+        </p:nvSpPr>
+        <p:spPr>
+          <a:xfrm>
+            <a:off x="838200" y="6356350"/>
+            <a:ext cx="2743200" cy="365125"/>
+          </a:xfrm>
+        </p:spPr>
+        <p:txBody>
+          <a:bodyPr/>
+          <a:lstStyle/>
+          <a:p>
+            <a:fld id="{4EF59023-6175-3944-979D-CFE35E3A8267}" type="datetime1">
+              <a:rPr lang="it-IT" smtClean="0"/>
+              <a:t>27/10/21</a:t>
+            </a:fld>
+            <a:endParaRPr lang="en-US" dirty="0"/>
+          </a:p>
+        </p:txBody>
+      </p:sp>
+      <p:sp>
+        <p:nvSpPr>
+          <p:cNvPr id="8" name="Segnaposto piè di pagina 4">
+            <a:extLst>
+              <a:ext uri="{FF2B5EF4-FFF2-40B4-BE49-F238E27FC236}">
+                <a16:creationId xmlns:a16="http://schemas.microsoft.com/office/drawing/2014/main" id="{4143A46B-9A4B-3B4A-92F8-F669C53BF16B}"/>
+              </a:ext>
+            </a:extLst>
+          </p:cNvPr>
+          <p:cNvSpPr>
+            <a:spLocks noGrp="1"/>
+          </p:cNvSpPr>
+          <p:nvPr>
+            <p:ph type="ftr" sz="quarter" idx="11"/>
+          </p:nvPr>
+        </p:nvSpPr>
+        <p:spPr>
+          <a:xfrm>
+            <a:off x="4038600" y="6356350"/>
+            <a:ext cx="4114800" cy="365125"/>
+          </a:xfrm>
+        </p:spPr>
+        <p:txBody>
+          <a:bodyPr/>
+          <a:lstStyle/>
+          <a:p>
+            <a:r>
+              <a:rPr lang="en-US"/>
+              <a:t>Arianna Gasparri</a:t>
+            </a:r>
+            <a:endParaRPr lang="en-US" dirty="0"/>
+          </a:p>
+        </p:txBody>
+      </p:sp>
+      <p:sp>
+        <p:nvSpPr>
+          <p:cNvPr id="9" name="Segnaposto numero diapositiva 5">
+            <a:extLst>
+              <a:ext uri="{FF2B5EF4-FFF2-40B4-BE49-F238E27FC236}">
+                <a16:creationId xmlns:a16="http://schemas.microsoft.com/office/drawing/2014/main" id="{8DC50362-4952-3D41-97A5-FCA4B0555286}"/>
+              </a:ext>
+            </a:extLst>
+          </p:cNvPr>
+          <p:cNvSpPr>
+            <a:spLocks noGrp="1"/>
+          </p:cNvSpPr>
+          <p:nvPr>
+            <p:ph type="sldNum" sz="quarter" idx="12"/>
+          </p:nvPr>
+        </p:nvSpPr>
+        <p:spPr>
+          <a:xfrm>
+            <a:off x="8610600" y="6356350"/>
+            <a:ext cx="2743200" cy="365125"/>
+          </a:xfrm>
+        </p:spPr>
+        <p:txBody>
+          <a:bodyPr/>
+          <a:lstStyle/>
+          <a:p>
+            <a:fld id="{6D22F896-40B5-4ADD-8801-0D06FADFA095}" type="slidenum">
+              <a:rPr lang="en-US" smtClean="0"/>
+              <a:t>10</a:t>
+            </a:fld>
+            <a:endParaRPr lang="en-US" dirty="0"/>
+          </a:p>
+        </p:txBody>
+      </p:sp>
+      <p:pic>
+        <p:nvPicPr>
+          <p:cNvPr id="10" name="Immagine 9">
+            <a:extLst>
+              <a:ext uri="{FF2B5EF4-FFF2-40B4-BE49-F238E27FC236}">
+                <a16:creationId xmlns:a16="http://schemas.microsoft.com/office/drawing/2014/main" id="{7CD29E99-6F18-A44D-BA56-FA830E7E0F9A}"/>
+              </a:ext>
+            </a:extLst>
+          </p:cNvPr>
+          <p:cNvPicPr>
+            <a:picLocks noChangeAspect="1"/>
+          </p:cNvPicPr>
+          <p:nvPr/>
+        </p:nvPicPr>
+        <p:blipFill>
+          <a:blip r:embed="rId4" cstate="print">
+            <a:extLst>
+              <a:ext uri="{28A0092B-C50C-407E-A947-70E740481C1C}">
+                <a14:useLocalDpi xmlns:a14="http://schemas.microsoft.com/office/drawing/2010/main" val="0"/>
+              </a:ext>
+            </a:extLst>
+          </a:blip>
+          <a:stretch>
+            <a:fillRect/>
+          </a:stretch>
+        </p:blipFill>
+        <p:spPr>
+          <a:xfrm>
+            <a:off x="241420" y="265431"/>
+            <a:ext cx="571500" cy="518160"/>
           </a:xfrm>
           <a:prstGeom prst="rect">
             <a:avLst/>
@@ -4093,6 +4233,144 @@
           </a:prstGeom>
         </p:spPr>
       </p:pic>
+      <p:sp>
+        <p:nvSpPr>
+          <p:cNvPr id="6" name="Segnaposto data 3">
+            <a:extLst>
+              <a:ext uri="{FF2B5EF4-FFF2-40B4-BE49-F238E27FC236}">
+                <a16:creationId xmlns:a16="http://schemas.microsoft.com/office/drawing/2014/main" id="{8ED66DBA-1765-F84A-A3B3-811C7DC8BE96}"/>
+              </a:ext>
+            </a:extLst>
+          </p:cNvPr>
+          <p:cNvSpPr>
+            <a:spLocks noGrp="1"/>
+          </p:cNvSpPr>
+          <p:nvPr>
+            <p:ph type="dt" sz="half" idx="10"/>
+          </p:nvPr>
+        </p:nvSpPr>
+        <p:spPr>
+          <a:xfrm>
+            <a:off x="838200" y="6356350"/>
+            <a:ext cx="2743200" cy="365125"/>
+          </a:xfrm>
+        </p:spPr>
+        <p:txBody>
+          <a:bodyPr/>
+          <a:lstStyle/>
+          <a:p>
+            <a:fld id="{4EF59023-6175-3944-979D-CFE35E3A8267}" type="datetime1">
+              <a:rPr lang="it-IT" smtClean="0"/>
+              <a:t>27/10/21</a:t>
+            </a:fld>
+            <a:endParaRPr lang="en-US" dirty="0"/>
+          </a:p>
+        </p:txBody>
+      </p:sp>
+      <p:sp>
+        <p:nvSpPr>
+          <p:cNvPr id="8" name="Segnaposto piè di pagina 4">
+            <a:extLst>
+              <a:ext uri="{FF2B5EF4-FFF2-40B4-BE49-F238E27FC236}">
+                <a16:creationId xmlns:a16="http://schemas.microsoft.com/office/drawing/2014/main" id="{45210977-E70C-B642-B610-C9AC23A21306}"/>
+              </a:ext>
+            </a:extLst>
+          </p:cNvPr>
+          <p:cNvSpPr>
+            <a:spLocks noGrp="1"/>
+          </p:cNvSpPr>
+          <p:nvPr>
+            <p:ph type="ftr" sz="quarter" idx="11"/>
+          </p:nvPr>
+        </p:nvSpPr>
+        <p:spPr>
+          <a:xfrm>
+            <a:off x="4038600" y="6356350"/>
+            <a:ext cx="4114800" cy="365125"/>
+          </a:xfrm>
+        </p:spPr>
+        <p:txBody>
+          <a:bodyPr/>
+          <a:lstStyle/>
+          <a:p>
+            <a:r>
+              <a:rPr lang="en-US"/>
+              <a:t>Arianna Gasparri</a:t>
+            </a:r>
+            <a:endParaRPr lang="en-US" dirty="0"/>
+          </a:p>
+        </p:txBody>
+      </p:sp>
+      <p:sp>
+        <p:nvSpPr>
+          <p:cNvPr id="9" name="Segnaposto numero diapositiva 5">
+            <a:extLst>
+              <a:ext uri="{FF2B5EF4-FFF2-40B4-BE49-F238E27FC236}">
+                <a16:creationId xmlns:a16="http://schemas.microsoft.com/office/drawing/2014/main" id="{6B2329E3-C28C-384F-9BC5-340BEE7303CC}"/>
+              </a:ext>
+            </a:extLst>
+          </p:cNvPr>
+          <p:cNvSpPr>
+            <a:spLocks noGrp="1"/>
+          </p:cNvSpPr>
+          <p:nvPr>
+            <p:ph type="sldNum" sz="quarter" idx="12"/>
+          </p:nvPr>
+        </p:nvSpPr>
+        <p:spPr>
+          <a:xfrm>
+            <a:off x="8610600" y="6356350"/>
+            <a:ext cx="2743200" cy="365125"/>
+          </a:xfrm>
+        </p:spPr>
+        <p:txBody>
+          <a:bodyPr/>
+          <a:lstStyle/>
+          <a:p>
+            <a:fld id="{6D22F896-40B5-4ADD-8801-0D06FADFA095}" type="slidenum">
+              <a:rPr lang="en-US" smtClean="0"/>
+              <a:t>11</a:t>
+            </a:fld>
+            <a:endParaRPr lang="en-US" dirty="0"/>
+          </a:p>
+        </p:txBody>
+      </p:sp>
+      <p:pic>
+        <p:nvPicPr>
+          <p:cNvPr id="10" name="Immagine 9">
+            <a:extLst>
+              <a:ext uri="{FF2B5EF4-FFF2-40B4-BE49-F238E27FC236}">
+                <a16:creationId xmlns:a16="http://schemas.microsoft.com/office/drawing/2014/main" id="{09F6753C-1272-0441-901C-E8F603EBB50B}"/>
+              </a:ext>
+            </a:extLst>
+          </p:cNvPr>
+          <p:cNvPicPr>
+            <a:picLocks noChangeAspect="1"/>
+          </p:cNvPicPr>
+          <p:nvPr/>
+        </p:nvPicPr>
+        <p:blipFill>
+          <a:blip r:embed="rId4" cstate="print">
+            <a:extLst>
+              <a:ext uri="{28A0092B-C50C-407E-A947-70E740481C1C}">
+                <a14:useLocalDpi xmlns:a14="http://schemas.microsoft.com/office/drawing/2010/main" val="0"/>
+              </a:ext>
+            </a:extLst>
+          </a:blip>
+          <a:stretch>
+            <a:fillRect/>
+          </a:stretch>
+        </p:blipFill>
+        <p:spPr>
+          <a:xfrm>
+            <a:off x="241420" y="265431"/>
+            <a:ext cx="571500" cy="518160"/>
+          </a:xfrm>
+          <a:prstGeom prst="rect">
+            <a:avLst/>
+          </a:prstGeom>
+        </p:spPr>
+      </p:pic>
     </p:spTree>
     <p:extLst>
       <p:ext uri="{BB962C8B-B14F-4D97-AF65-F5344CB8AC3E}">
@@ -4340,6 +4618,144 @@
           </a:p>
         </p:txBody>
       </p:sp>
+      <p:sp>
+        <p:nvSpPr>
+          <p:cNvPr id="8" name="Segnaposto data 3">
+            <a:extLst>
+              <a:ext uri="{FF2B5EF4-FFF2-40B4-BE49-F238E27FC236}">
+                <a16:creationId xmlns:a16="http://schemas.microsoft.com/office/drawing/2014/main" id="{7B0028A1-BF42-1D40-A8DF-D57C7E6BEF7E}"/>
+              </a:ext>
+            </a:extLst>
+          </p:cNvPr>
+          <p:cNvSpPr>
+            <a:spLocks noGrp="1"/>
+          </p:cNvSpPr>
+          <p:nvPr>
+            <p:ph type="dt" sz="half" idx="10"/>
+          </p:nvPr>
+        </p:nvSpPr>
+        <p:spPr>
+          <a:xfrm>
+            <a:off x="838200" y="6356350"/>
+            <a:ext cx="2743200" cy="365125"/>
+          </a:xfrm>
+        </p:spPr>
+        <p:txBody>
+          <a:bodyPr/>
+          <a:lstStyle/>
+          <a:p>
+            <a:fld id="{4EF59023-6175-3944-979D-CFE35E3A8267}" type="datetime1">
+              <a:rPr lang="it-IT" smtClean="0"/>
+              <a:t>27/10/21</a:t>
+            </a:fld>
+            <a:endParaRPr lang="en-US" dirty="0"/>
+          </a:p>
+        </p:txBody>
+      </p:sp>
+      <p:sp>
+        <p:nvSpPr>
+          <p:cNvPr id="9" name="Segnaposto piè di pagina 4">
+            <a:extLst>
+              <a:ext uri="{FF2B5EF4-FFF2-40B4-BE49-F238E27FC236}">
+                <a16:creationId xmlns:a16="http://schemas.microsoft.com/office/drawing/2014/main" id="{D85F9A65-2C4E-EB4F-8F79-D6EC3F0478C8}"/>
+              </a:ext>
+            </a:extLst>
+          </p:cNvPr>
+          <p:cNvSpPr>
+            <a:spLocks noGrp="1"/>
+          </p:cNvSpPr>
+          <p:nvPr>
+            <p:ph type="ftr" sz="quarter" idx="11"/>
+          </p:nvPr>
+        </p:nvSpPr>
+        <p:spPr>
+          <a:xfrm>
+            <a:off x="4038600" y="6356350"/>
+            <a:ext cx="4114800" cy="365125"/>
+          </a:xfrm>
+        </p:spPr>
+        <p:txBody>
+          <a:bodyPr/>
+          <a:lstStyle/>
+          <a:p>
+            <a:r>
+              <a:rPr lang="en-US"/>
+              <a:t>Arianna Gasparri</a:t>
+            </a:r>
+            <a:endParaRPr lang="en-US" dirty="0"/>
+          </a:p>
+        </p:txBody>
+      </p:sp>
+      <p:sp>
+        <p:nvSpPr>
+          <p:cNvPr id="10" name="Segnaposto numero diapositiva 5">
+            <a:extLst>
+              <a:ext uri="{FF2B5EF4-FFF2-40B4-BE49-F238E27FC236}">
+                <a16:creationId xmlns:a16="http://schemas.microsoft.com/office/drawing/2014/main" id="{9248474E-7CA0-304D-91EB-D2557E852922}"/>
+              </a:ext>
+            </a:extLst>
+          </p:cNvPr>
+          <p:cNvSpPr>
+            <a:spLocks noGrp="1"/>
+          </p:cNvSpPr>
+          <p:nvPr>
+            <p:ph type="sldNum" sz="quarter" idx="12"/>
+          </p:nvPr>
+        </p:nvSpPr>
+        <p:spPr>
+          <a:xfrm>
+            <a:off x="8610600" y="6356350"/>
+            <a:ext cx="2743200" cy="365125"/>
+          </a:xfrm>
+        </p:spPr>
+        <p:txBody>
+          <a:bodyPr/>
+          <a:lstStyle/>
+          <a:p>
+            <a:fld id="{6D22F896-40B5-4ADD-8801-0D06FADFA095}" type="slidenum">
+              <a:rPr lang="en-US" smtClean="0"/>
+              <a:t>12</a:t>
+            </a:fld>
+            <a:endParaRPr lang="en-US" dirty="0"/>
+          </a:p>
+        </p:txBody>
+      </p:sp>
+      <p:pic>
+        <p:nvPicPr>
+          <p:cNvPr id="13" name="Immagine 12">
+            <a:extLst>
+              <a:ext uri="{FF2B5EF4-FFF2-40B4-BE49-F238E27FC236}">
+                <a16:creationId xmlns:a16="http://schemas.microsoft.com/office/drawing/2014/main" id="{566ADAF7-B3F1-5640-BAC8-9A57F638F2F1}"/>
+              </a:ext>
+            </a:extLst>
+          </p:cNvPr>
+          <p:cNvPicPr>
+            <a:picLocks noChangeAspect="1"/>
+          </p:cNvPicPr>
+          <p:nvPr/>
+        </p:nvPicPr>
+        <p:blipFill>
+          <a:blip r:embed="rId5" cstate="print">
+            <a:extLst>
+              <a:ext uri="{28A0092B-C50C-407E-A947-70E740481C1C}">
+                <a14:useLocalDpi xmlns:a14="http://schemas.microsoft.com/office/drawing/2010/main" val="0"/>
+              </a:ext>
+            </a:extLst>
+          </a:blip>
+          <a:stretch>
+            <a:fillRect/>
+          </a:stretch>
+        </p:blipFill>
+        <p:spPr>
+          <a:xfrm>
+            <a:off x="241420" y="265431"/>
+            <a:ext cx="571500" cy="518160"/>
+          </a:xfrm>
+          <a:prstGeom prst="rect">
+            <a:avLst/>
+          </a:prstGeom>
+        </p:spPr>
+      </p:pic>
     </p:spTree>
     <p:extLst>
       <p:ext uri="{BB962C8B-B14F-4D97-AF65-F5344CB8AC3E}">
@@ -4530,6 +4946,144 @@
           </a:p>
         </p:txBody>
       </p:sp>
+      <p:sp>
+        <p:nvSpPr>
+          <p:cNvPr id="9" name="Segnaposto data 3">
+            <a:extLst>
+              <a:ext uri="{FF2B5EF4-FFF2-40B4-BE49-F238E27FC236}">
+                <a16:creationId xmlns:a16="http://schemas.microsoft.com/office/drawing/2014/main" id="{F6FF7FBC-F998-6141-8DC8-5EC81C3FDA75}"/>
+              </a:ext>
+            </a:extLst>
+          </p:cNvPr>
+          <p:cNvSpPr>
+            <a:spLocks noGrp="1"/>
+          </p:cNvSpPr>
+          <p:nvPr>
+            <p:ph type="dt" sz="half" idx="10"/>
+          </p:nvPr>
+        </p:nvSpPr>
+        <p:spPr>
+          <a:xfrm>
+            <a:off x="838200" y="6356350"/>
+            <a:ext cx="2743200" cy="365125"/>
+          </a:xfrm>
+        </p:spPr>
+        <p:txBody>
+          <a:bodyPr/>
+          <a:lstStyle/>
+          <a:p>
+            <a:fld id="{4EF59023-6175-3944-979D-CFE35E3A8267}" type="datetime1">
+              <a:rPr lang="it-IT" smtClean="0"/>
+              <a:t>27/10/21</a:t>
+            </a:fld>
+            <a:endParaRPr lang="en-US" dirty="0"/>
+          </a:p>
+        </p:txBody>
+      </p:sp>
+      <p:sp>
+        <p:nvSpPr>
+          <p:cNvPr id="10" name="Segnaposto piè di pagina 4">
+            <a:extLst>
+              <a:ext uri="{FF2B5EF4-FFF2-40B4-BE49-F238E27FC236}">
+                <a16:creationId xmlns:a16="http://schemas.microsoft.com/office/drawing/2014/main" id="{964090CD-B39A-A044-B089-BE2CCA736FE3}"/>
+              </a:ext>
+            </a:extLst>
+          </p:cNvPr>
+          <p:cNvSpPr>
+            <a:spLocks noGrp="1"/>
+          </p:cNvSpPr>
+          <p:nvPr>
+            <p:ph type="ftr" sz="quarter" idx="11"/>
+          </p:nvPr>
+        </p:nvSpPr>
+        <p:spPr>
+          <a:xfrm>
+            <a:off x="4038600" y="6356350"/>
+            <a:ext cx="4114800" cy="365125"/>
+          </a:xfrm>
+        </p:spPr>
+        <p:txBody>
+          <a:bodyPr/>
+          <a:lstStyle/>
+          <a:p>
+            <a:r>
+              <a:rPr lang="en-US"/>
+              <a:t>Arianna Gasparri</a:t>
+            </a:r>
+            <a:endParaRPr lang="en-US" dirty="0"/>
+          </a:p>
+        </p:txBody>
+      </p:sp>
+      <p:sp>
+        <p:nvSpPr>
+          <p:cNvPr id="11" name="Segnaposto numero diapositiva 5">
+            <a:extLst>
+              <a:ext uri="{FF2B5EF4-FFF2-40B4-BE49-F238E27FC236}">
+                <a16:creationId xmlns:a16="http://schemas.microsoft.com/office/drawing/2014/main" id="{218D4881-57AD-5B4A-B4E2-2BF41EDDAA7C}"/>
+              </a:ext>
+            </a:extLst>
+          </p:cNvPr>
+          <p:cNvSpPr>
+            <a:spLocks noGrp="1"/>
+          </p:cNvSpPr>
+          <p:nvPr>
+            <p:ph type="sldNum" sz="quarter" idx="12"/>
+          </p:nvPr>
+        </p:nvSpPr>
+        <p:spPr>
+          <a:xfrm>
+            <a:off x="8610600" y="6356350"/>
+            <a:ext cx="2743200" cy="365125"/>
+          </a:xfrm>
+        </p:spPr>
+        <p:txBody>
+          <a:bodyPr/>
+          <a:lstStyle/>
+          <a:p>
+            <a:fld id="{6D22F896-40B5-4ADD-8801-0D06FADFA095}" type="slidenum">
+              <a:rPr lang="en-US" smtClean="0"/>
+              <a:t>13</a:t>
+            </a:fld>
+            <a:endParaRPr lang="en-US" dirty="0"/>
+          </a:p>
+        </p:txBody>
+      </p:sp>
+      <p:pic>
+        <p:nvPicPr>
+          <p:cNvPr id="12" name="Immagine 11">
+            <a:extLst>
+              <a:ext uri="{FF2B5EF4-FFF2-40B4-BE49-F238E27FC236}">
+                <a16:creationId xmlns:a16="http://schemas.microsoft.com/office/drawing/2014/main" id="{FBF3D642-8EF7-7C41-B9AF-52550567E848}"/>
+              </a:ext>
+            </a:extLst>
+          </p:cNvPr>
+          <p:cNvPicPr>
+            <a:picLocks noChangeAspect="1"/>
+          </p:cNvPicPr>
+          <p:nvPr/>
+        </p:nvPicPr>
+        <p:blipFill>
+          <a:blip r:embed="rId5" cstate="print">
+            <a:extLst>
+              <a:ext uri="{28A0092B-C50C-407E-A947-70E740481C1C}">
+                <a14:useLocalDpi xmlns:a14="http://schemas.microsoft.com/office/drawing/2010/main" val="0"/>
+              </a:ext>
+            </a:extLst>
+          </a:blip>
+          <a:stretch>
+            <a:fillRect/>
+          </a:stretch>
+        </p:blipFill>
+        <p:spPr>
+          <a:xfrm>
+            <a:off x="241420" y="265431"/>
+            <a:ext cx="571500" cy="518160"/>
+          </a:xfrm>
+          <a:prstGeom prst="rect">
+            <a:avLst/>
+          </a:prstGeom>
+        </p:spPr>
+      </p:pic>
     </p:spTree>
     <p:extLst>
       <p:ext uri="{BB962C8B-B14F-4D97-AF65-F5344CB8AC3E}">
@@ -5179,6 +5733,144 @@
           </a:prstGeom>
         </p:spPr>
       </p:pic>
+      <p:sp>
+        <p:nvSpPr>
+          <p:cNvPr id="6" name="Segnaposto data 3">
+            <a:extLst>
+              <a:ext uri="{FF2B5EF4-FFF2-40B4-BE49-F238E27FC236}">
+                <a16:creationId xmlns:a16="http://schemas.microsoft.com/office/drawing/2014/main" id="{9389CDEA-B0FD-A944-AD22-B36A4AEE0F53}"/>
+              </a:ext>
+            </a:extLst>
+          </p:cNvPr>
+          <p:cNvSpPr>
+            <a:spLocks noGrp="1"/>
+          </p:cNvSpPr>
+          <p:nvPr>
+            <p:ph type="dt" sz="half" idx="10"/>
+          </p:nvPr>
+        </p:nvSpPr>
+        <p:spPr>
+          <a:xfrm>
+            <a:off x="838200" y="6356350"/>
+            <a:ext cx="2743200" cy="365125"/>
+          </a:xfrm>
+        </p:spPr>
+        <p:txBody>
+          <a:bodyPr/>
+          <a:lstStyle/>
+          <a:p>
+            <a:fld id="{4EF59023-6175-3944-979D-CFE35E3A8267}" type="datetime1">
+              <a:rPr lang="it-IT" smtClean="0"/>
+              <a:t>27/10/21</a:t>
+            </a:fld>
+            <a:endParaRPr lang="en-US" dirty="0"/>
+          </a:p>
+        </p:txBody>
+      </p:sp>
+      <p:sp>
+        <p:nvSpPr>
+          <p:cNvPr id="8" name="Segnaposto piè di pagina 4">
+            <a:extLst>
+              <a:ext uri="{FF2B5EF4-FFF2-40B4-BE49-F238E27FC236}">
+                <a16:creationId xmlns:a16="http://schemas.microsoft.com/office/drawing/2014/main" id="{66C9879D-E1B4-1E4C-BFE3-CF2F93888B1D}"/>
+              </a:ext>
+            </a:extLst>
+          </p:cNvPr>
+          <p:cNvSpPr>
+            <a:spLocks noGrp="1"/>
+          </p:cNvSpPr>
+          <p:nvPr>
+            <p:ph type="ftr" sz="quarter" idx="11"/>
+          </p:nvPr>
+        </p:nvSpPr>
+        <p:spPr>
+          <a:xfrm>
+            <a:off x="4038600" y="6356350"/>
+            <a:ext cx="4114800" cy="365125"/>
+          </a:xfrm>
+        </p:spPr>
+        <p:txBody>
+          <a:bodyPr/>
+          <a:lstStyle/>
+          <a:p>
+            <a:r>
+              <a:rPr lang="en-US"/>
+              <a:t>Arianna Gasparri</a:t>
+            </a:r>
+            <a:endParaRPr lang="en-US" dirty="0"/>
+          </a:p>
+        </p:txBody>
+      </p:sp>
+      <p:sp>
+        <p:nvSpPr>
+          <p:cNvPr id="9" name="Segnaposto numero diapositiva 5">
+            <a:extLst>
+              <a:ext uri="{FF2B5EF4-FFF2-40B4-BE49-F238E27FC236}">
+                <a16:creationId xmlns:a16="http://schemas.microsoft.com/office/drawing/2014/main" id="{0D33E861-F727-474B-A00F-43E7B31879D2}"/>
+              </a:ext>
+            </a:extLst>
+          </p:cNvPr>
+          <p:cNvSpPr>
+            <a:spLocks noGrp="1"/>
+          </p:cNvSpPr>
+          <p:nvPr>
+            <p:ph type="sldNum" sz="quarter" idx="12"/>
+          </p:nvPr>
+        </p:nvSpPr>
+        <p:spPr>
+          <a:xfrm>
+            <a:off x="8610600" y="6356350"/>
+            <a:ext cx="2743200" cy="365125"/>
+          </a:xfrm>
+        </p:spPr>
+        <p:txBody>
+          <a:bodyPr/>
+          <a:lstStyle/>
+          <a:p>
+            <a:fld id="{6D22F896-40B5-4ADD-8801-0D06FADFA095}" type="slidenum">
+              <a:rPr lang="en-US" smtClean="0"/>
+              <a:t>14</a:t>
+            </a:fld>
+            <a:endParaRPr lang="en-US" dirty="0"/>
+          </a:p>
+        </p:txBody>
+      </p:sp>
+      <p:pic>
+        <p:nvPicPr>
+          <p:cNvPr id="10" name="Immagine 9">
+            <a:extLst>
+              <a:ext uri="{FF2B5EF4-FFF2-40B4-BE49-F238E27FC236}">
+                <a16:creationId xmlns:a16="http://schemas.microsoft.com/office/drawing/2014/main" id="{BA6052B7-8E63-8C4E-9F38-8C6DED9D7E57}"/>
+              </a:ext>
+            </a:extLst>
+          </p:cNvPr>
+          <p:cNvPicPr>
+            <a:picLocks noChangeAspect="1"/>
+          </p:cNvPicPr>
+          <p:nvPr/>
+        </p:nvPicPr>
+        <p:blipFill>
+          <a:blip r:embed="rId4" cstate="print">
+            <a:extLst>
+              <a:ext uri="{28A0092B-C50C-407E-A947-70E740481C1C}">
+                <a14:useLocalDpi xmlns:a14="http://schemas.microsoft.com/office/drawing/2010/main" val="0"/>
+              </a:ext>
+            </a:extLst>
+          </a:blip>
+          <a:stretch>
+            <a:fillRect/>
+          </a:stretch>
+        </p:blipFill>
+        <p:spPr>
+          <a:xfrm>
+            <a:off x="241420" y="265431"/>
+            <a:ext cx="571500" cy="518160"/>
+          </a:xfrm>
+          <a:prstGeom prst="rect">
+            <a:avLst/>
+          </a:prstGeom>
+        </p:spPr>
+      </p:pic>
     </p:spTree>
     <p:extLst>
       <p:ext uri="{BB962C8B-B14F-4D97-AF65-F5344CB8AC3E}">
@@ -5570,6 +6262,144 @@
           <a:xfrm>
             <a:off x="5899792" y="4925537"/>
             <a:ext cx="1587811" cy="907321"/>
+          </a:xfrm>
+          <a:prstGeom prst="rect">
+            <a:avLst/>
+          </a:prstGeom>
+        </p:spPr>
+      </p:pic>
+      <p:sp>
+        <p:nvSpPr>
+          <p:cNvPr id="13" name="Segnaposto data 3">
+            <a:extLst>
+              <a:ext uri="{FF2B5EF4-FFF2-40B4-BE49-F238E27FC236}">
+                <a16:creationId xmlns:a16="http://schemas.microsoft.com/office/drawing/2014/main" id="{1288FA98-6F83-5446-A155-11A560C65BEF}"/>
+              </a:ext>
+            </a:extLst>
+          </p:cNvPr>
+          <p:cNvSpPr>
+            <a:spLocks noGrp="1"/>
+          </p:cNvSpPr>
+          <p:nvPr>
+            <p:ph type="dt" sz="half" idx="10"/>
+          </p:nvPr>
+        </p:nvSpPr>
+        <p:spPr>
+          <a:xfrm>
+            <a:off x="838200" y="6356350"/>
+            <a:ext cx="2743200" cy="365125"/>
+          </a:xfrm>
+        </p:spPr>
+        <p:txBody>
+          <a:bodyPr/>
+          <a:lstStyle/>
+          <a:p>
+            <a:fld id="{4EF59023-6175-3944-979D-CFE35E3A8267}" type="datetime1">
+              <a:rPr lang="it-IT" smtClean="0"/>
+              <a:t>27/10/21</a:t>
+            </a:fld>
+            <a:endParaRPr lang="en-US" dirty="0"/>
+          </a:p>
+        </p:txBody>
+      </p:sp>
+      <p:sp>
+        <p:nvSpPr>
+          <p:cNvPr id="14" name="Segnaposto piè di pagina 4">
+            <a:extLst>
+              <a:ext uri="{FF2B5EF4-FFF2-40B4-BE49-F238E27FC236}">
+                <a16:creationId xmlns:a16="http://schemas.microsoft.com/office/drawing/2014/main" id="{4B9E0F37-9F56-9346-84D5-B5288B48BB3C}"/>
+              </a:ext>
+            </a:extLst>
+          </p:cNvPr>
+          <p:cNvSpPr>
+            <a:spLocks noGrp="1"/>
+          </p:cNvSpPr>
+          <p:nvPr>
+            <p:ph type="ftr" sz="quarter" idx="11"/>
+          </p:nvPr>
+        </p:nvSpPr>
+        <p:spPr>
+          <a:xfrm>
+            <a:off x="4038600" y="6356350"/>
+            <a:ext cx="4114800" cy="365125"/>
+          </a:xfrm>
+        </p:spPr>
+        <p:txBody>
+          <a:bodyPr/>
+          <a:lstStyle/>
+          <a:p>
+            <a:r>
+              <a:rPr lang="en-US"/>
+              <a:t>Arianna Gasparri</a:t>
+            </a:r>
+            <a:endParaRPr lang="en-US" dirty="0"/>
+          </a:p>
+        </p:txBody>
+      </p:sp>
+      <p:sp>
+        <p:nvSpPr>
+          <p:cNvPr id="16" name="Segnaposto numero diapositiva 5">
+            <a:extLst>
+              <a:ext uri="{FF2B5EF4-FFF2-40B4-BE49-F238E27FC236}">
+                <a16:creationId xmlns:a16="http://schemas.microsoft.com/office/drawing/2014/main" id="{4C841B63-D05E-5D4C-8EAE-231F63ED41DE}"/>
+              </a:ext>
+            </a:extLst>
+          </p:cNvPr>
+          <p:cNvSpPr>
+            <a:spLocks noGrp="1"/>
+          </p:cNvSpPr>
+          <p:nvPr>
+            <p:ph type="sldNum" sz="quarter" idx="12"/>
+          </p:nvPr>
+        </p:nvSpPr>
+        <p:spPr>
+          <a:xfrm>
+            <a:off x="8610600" y="6356350"/>
+            <a:ext cx="2743200" cy="365125"/>
+          </a:xfrm>
+        </p:spPr>
+        <p:txBody>
+          <a:bodyPr/>
+          <a:lstStyle/>
+          <a:p>
+            <a:fld id="{6D22F896-40B5-4ADD-8801-0D06FADFA095}" type="slidenum">
+              <a:rPr lang="en-US" smtClean="0"/>
+              <a:t>15</a:t>
+            </a:fld>
+            <a:endParaRPr lang="en-US" dirty="0"/>
+          </a:p>
+        </p:txBody>
+      </p:sp>
+      <p:pic>
+        <p:nvPicPr>
+          <p:cNvPr id="18" name="Immagine 17">
+            <a:extLst>
+              <a:ext uri="{FF2B5EF4-FFF2-40B4-BE49-F238E27FC236}">
+                <a16:creationId xmlns:a16="http://schemas.microsoft.com/office/drawing/2014/main" id="{F0D2B1AA-C966-3941-91DA-794B16FA9F9E}"/>
+              </a:ext>
+            </a:extLst>
+          </p:cNvPr>
+          <p:cNvPicPr>
+            <a:picLocks noChangeAspect="1"/>
+          </p:cNvPicPr>
+          <p:nvPr/>
+        </p:nvPicPr>
+        <p:blipFill>
+          <a:blip r:embed="rId10" cstate="print">
+            <a:extLst>
+              <a:ext uri="{28A0092B-C50C-407E-A947-70E740481C1C}">
+                <a14:useLocalDpi xmlns:a14="http://schemas.microsoft.com/office/drawing/2010/main" val="0"/>
+              </a:ext>
+            </a:extLst>
+          </a:blip>
+          <a:stretch>
+            <a:fillRect/>
+          </a:stretch>
+        </p:blipFill>
+        <p:spPr>
+          <a:xfrm>
+            <a:off x="241420" y="265431"/>
+            <a:ext cx="571500" cy="518160"/>
           </a:xfrm>
           <a:prstGeom prst="rect">
             <a:avLst/>
@@ -5738,6 +6568,144 @@
           <a:xfrm>
             <a:off x="6139542" y="1475623"/>
             <a:ext cx="5689600" cy="4267200"/>
+          </a:xfrm>
+          <a:prstGeom prst="rect">
+            <a:avLst/>
+          </a:prstGeom>
+        </p:spPr>
+      </p:pic>
+      <p:sp>
+        <p:nvSpPr>
+          <p:cNvPr id="7" name="Segnaposto data 3">
+            <a:extLst>
+              <a:ext uri="{FF2B5EF4-FFF2-40B4-BE49-F238E27FC236}">
+                <a16:creationId xmlns:a16="http://schemas.microsoft.com/office/drawing/2014/main" id="{D6359A70-006A-6B4F-BC05-F8F7B673093D}"/>
+              </a:ext>
+            </a:extLst>
+          </p:cNvPr>
+          <p:cNvSpPr>
+            <a:spLocks noGrp="1"/>
+          </p:cNvSpPr>
+          <p:nvPr>
+            <p:ph type="dt" sz="half" idx="10"/>
+          </p:nvPr>
+        </p:nvSpPr>
+        <p:spPr>
+          <a:xfrm>
+            <a:off x="838200" y="6356350"/>
+            <a:ext cx="2743200" cy="365125"/>
+          </a:xfrm>
+        </p:spPr>
+        <p:txBody>
+          <a:bodyPr/>
+          <a:lstStyle/>
+          <a:p>
+            <a:fld id="{4EF59023-6175-3944-979D-CFE35E3A8267}" type="datetime1">
+              <a:rPr lang="it-IT" smtClean="0"/>
+              <a:t>27/10/21</a:t>
+            </a:fld>
+            <a:endParaRPr lang="en-US" dirty="0"/>
+          </a:p>
+        </p:txBody>
+      </p:sp>
+      <p:sp>
+        <p:nvSpPr>
+          <p:cNvPr id="8" name="Segnaposto piè di pagina 4">
+            <a:extLst>
+              <a:ext uri="{FF2B5EF4-FFF2-40B4-BE49-F238E27FC236}">
+                <a16:creationId xmlns:a16="http://schemas.microsoft.com/office/drawing/2014/main" id="{CD955663-191A-934F-97C2-20334E15E58A}"/>
+              </a:ext>
+            </a:extLst>
+          </p:cNvPr>
+          <p:cNvSpPr>
+            <a:spLocks noGrp="1"/>
+          </p:cNvSpPr>
+          <p:nvPr>
+            <p:ph type="ftr" sz="quarter" idx="11"/>
+          </p:nvPr>
+        </p:nvSpPr>
+        <p:spPr>
+          <a:xfrm>
+            <a:off x="4038600" y="6356350"/>
+            <a:ext cx="4114800" cy="365125"/>
+          </a:xfrm>
+        </p:spPr>
+        <p:txBody>
+          <a:bodyPr/>
+          <a:lstStyle/>
+          <a:p>
+            <a:r>
+              <a:rPr lang="en-US"/>
+              <a:t>Arianna Gasparri</a:t>
+            </a:r>
+            <a:endParaRPr lang="en-US" dirty="0"/>
+          </a:p>
+        </p:txBody>
+      </p:sp>
+      <p:sp>
+        <p:nvSpPr>
+          <p:cNvPr id="9" name="Segnaposto numero diapositiva 5">
+            <a:extLst>
+              <a:ext uri="{FF2B5EF4-FFF2-40B4-BE49-F238E27FC236}">
+                <a16:creationId xmlns:a16="http://schemas.microsoft.com/office/drawing/2014/main" id="{8CAD91CA-12AC-7D4C-B369-4CB8FF073B27}"/>
+              </a:ext>
+            </a:extLst>
+          </p:cNvPr>
+          <p:cNvSpPr>
+            <a:spLocks noGrp="1"/>
+          </p:cNvSpPr>
+          <p:nvPr>
+            <p:ph type="sldNum" sz="quarter" idx="12"/>
+          </p:nvPr>
+        </p:nvSpPr>
+        <p:spPr>
+          <a:xfrm>
+            <a:off x="8610600" y="6356350"/>
+            <a:ext cx="2743200" cy="365125"/>
+          </a:xfrm>
+        </p:spPr>
+        <p:txBody>
+          <a:bodyPr/>
+          <a:lstStyle/>
+          <a:p>
+            <a:fld id="{6D22F896-40B5-4ADD-8801-0D06FADFA095}" type="slidenum">
+              <a:rPr lang="en-US" smtClean="0"/>
+              <a:t>16</a:t>
+            </a:fld>
+            <a:endParaRPr lang="en-US" dirty="0"/>
+          </a:p>
+        </p:txBody>
+      </p:sp>
+      <p:pic>
+        <p:nvPicPr>
+          <p:cNvPr id="10" name="Immagine 9">
+            <a:extLst>
+              <a:ext uri="{FF2B5EF4-FFF2-40B4-BE49-F238E27FC236}">
+                <a16:creationId xmlns:a16="http://schemas.microsoft.com/office/drawing/2014/main" id="{E3E0FDBD-E860-0542-A2A8-DC2D514505E9}"/>
+              </a:ext>
+            </a:extLst>
+          </p:cNvPr>
+          <p:cNvPicPr>
+            <a:picLocks noChangeAspect="1"/>
+          </p:cNvPicPr>
+          <p:nvPr/>
+        </p:nvPicPr>
+        <p:blipFill>
+          <a:blip r:embed="rId4" cstate="print">
+            <a:extLst>
+              <a:ext uri="{28A0092B-C50C-407E-A947-70E740481C1C}">
+                <a14:useLocalDpi xmlns:a14="http://schemas.microsoft.com/office/drawing/2010/main" val="0"/>
+              </a:ext>
+            </a:extLst>
+          </a:blip>
+          <a:stretch>
+            <a:fillRect/>
+          </a:stretch>
+        </p:blipFill>
+        <p:spPr>
+          <a:xfrm>
+            <a:off x="241420" y="265431"/>
+            <a:ext cx="571500" cy="518160"/>
           </a:xfrm>
           <a:prstGeom prst="rect">
             <a:avLst/>
@@ -6190,6 +7158,144 @@
           </a:prstGeom>
         </p:spPr>
       </p:pic>
+      <p:sp>
+        <p:nvSpPr>
+          <p:cNvPr id="6" name="Segnaposto data 3">
+            <a:extLst>
+              <a:ext uri="{FF2B5EF4-FFF2-40B4-BE49-F238E27FC236}">
+                <a16:creationId xmlns:a16="http://schemas.microsoft.com/office/drawing/2014/main" id="{E31BE159-E7C8-C24F-9CBB-A7F601D7B4BC}"/>
+              </a:ext>
+            </a:extLst>
+          </p:cNvPr>
+          <p:cNvSpPr>
+            <a:spLocks noGrp="1"/>
+          </p:cNvSpPr>
+          <p:nvPr>
+            <p:ph type="dt" sz="half" idx="10"/>
+          </p:nvPr>
+        </p:nvSpPr>
+        <p:spPr>
+          <a:xfrm>
+            <a:off x="838200" y="6356350"/>
+            <a:ext cx="2743200" cy="365125"/>
+          </a:xfrm>
+        </p:spPr>
+        <p:txBody>
+          <a:bodyPr/>
+          <a:lstStyle/>
+          <a:p>
+            <a:fld id="{4EF59023-6175-3944-979D-CFE35E3A8267}" type="datetime1">
+              <a:rPr lang="it-IT" smtClean="0"/>
+              <a:t>27/10/21</a:t>
+            </a:fld>
+            <a:endParaRPr lang="en-US" dirty="0"/>
+          </a:p>
+        </p:txBody>
+      </p:sp>
+      <p:sp>
+        <p:nvSpPr>
+          <p:cNvPr id="7" name="Segnaposto piè di pagina 4">
+            <a:extLst>
+              <a:ext uri="{FF2B5EF4-FFF2-40B4-BE49-F238E27FC236}">
+                <a16:creationId xmlns:a16="http://schemas.microsoft.com/office/drawing/2014/main" id="{FB85E8B1-FEDB-9D4D-BEDC-B47C1654AEA9}"/>
+              </a:ext>
+            </a:extLst>
+          </p:cNvPr>
+          <p:cNvSpPr>
+            <a:spLocks noGrp="1"/>
+          </p:cNvSpPr>
+          <p:nvPr>
+            <p:ph type="ftr" sz="quarter" idx="11"/>
+          </p:nvPr>
+        </p:nvSpPr>
+        <p:spPr>
+          <a:xfrm>
+            <a:off x="4038600" y="6356350"/>
+            <a:ext cx="4114800" cy="365125"/>
+          </a:xfrm>
+        </p:spPr>
+        <p:txBody>
+          <a:bodyPr/>
+          <a:lstStyle/>
+          <a:p>
+            <a:r>
+              <a:rPr lang="en-US"/>
+              <a:t>Arianna Gasparri</a:t>
+            </a:r>
+            <a:endParaRPr lang="en-US" dirty="0"/>
+          </a:p>
+        </p:txBody>
+      </p:sp>
+      <p:sp>
+        <p:nvSpPr>
+          <p:cNvPr id="8" name="Segnaposto numero diapositiva 5">
+            <a:extLst>
+              <a:ext uri="{FF2B5EF4-FFF2-40B4-BE49-F238E27FC236}">
+                <a16:creationId xmlns:a16="http://schemas.microsoft.com/office/drawing/2014/main" id="{39627B88-FC50-354B-82EE-0494B9651314}"/>
+              </a:ext>
+            </a:extLst>
+          </p:cNvPr>
+          <p:cNvSpPr>
+            <a:spLocks noGrp="1"/>
+          </p:cNvSpPr>
+          <p:nvPr>
+            <p:ph type="sldNum" sz="quarter" idx="12"/>
+          </p:nvPr>
+        </p:nvSpPr>
+        <p:spPr>
+          <a:xfrm>
+            <a:off x="8610600" y="6356350"/>
+            <a:ext cx="2743200" cy="365125"/>
+          </a:xfrm>
+        </p:spPr>
+        <p:txBody>
+          <a:bodyPr/>
+          <a:lstStyle/>
+          <a:p>
+            <a:fld id="{6D22F896-40B5-4ADD-8801-0D06FADFA095}" type="slidenum">
+              <a:rPr lang="en-US" smtClean="0"/>
+              <a:t>17</a:t>
+            </a:fld>
+            <a:endParaRPr lang="en-US" dirty="0"/>
+          </a:p>
+        </p:txBody>
+      </p:sp>
+      <p:pic>
+        <p:nvPicPr>
+          <p:cNvPr id="9" name="Immagine 8">
+            <a:extLst>
+              <a:ext uri="{FF2B5EF4-FFF2-40B4-BE49-F238E27FC236}">
+                <a16:creationId xmlns:a16="http://schemas.microsoft.com/office/drawing/2014/main" id="{53B4ECF9-C7E1-9548-8C2B-0D320A06911B}"/>
+              </a:ext>
+            </a:extLst>
+          </p:cNvPr>
+          <p:cNvPicPr>
+            <a:picLocks noChangeAspect="1"/>
+          </p:cNvPicPr>
+          <p:nvPr/>
+        </p:nvPicPr>
+        <p:blipFill>
+          <a:blip r:embed="rId4" cstate="print">
+            <a:extLst>
+              <a:ext uri="{28A0092B-C50C-407E-A947-70E740481C1C}">
+                <a14:useLocalDpi xmlns:a14="http://schemas.microsoft.com/office/drawing/2010/main" val="0"/>
+              </a:ext>
+            </a:extLst>
+          </a:blip>
+          <a:stretch>
+            <a:fillRect/>
+          </a:stretch>
+        </p:blipFill>
+        <p:spPr>
+          <a:xfrm>
+            <a:off x="241420" y="265431"/>
+            <a:ext cx="571500" cy="518160"/>
+          </a:xfrm>
+          <a:prstGeom prst="rect">
+            <a:avLst/>
+          </a:prstGeom>
+        </p:spPr>
+      </p:pic>
     </p:spTree>
     <p:extLst>
       <p:ext uri="{BB962C8B-B14F-4D97-AF65-F5344CB8AC3E}">
@@ -6341,6 +7447,144 @@
           </a:p>
         </p:txBody>
       </p:sp>
+      <p:sp>
+        <p:nvSpPr>
+          <p:cNvPr id="5" name="Segnaposto data 3">
+            <a:extLst>
+              <a:ext uri="{FF2B5EF4-FFF2-40B4-BE49-F238E27FC236}">
+                <a16:creationId xmlns:a16="http://schemas.microsoft.com/office/drawing/2014/main" id="{E482AEE9-99FE-5941-933D-546A9D875D94}"/>
+              </a:ext>
+            </a:extLst>
+          </p:cNvPr>
+          <p:cNvSpPr>
+            <a:spLocks noGrp="1"/>
+          </p:cNvSpPr>
+          <p:nvPr>
+            <p:ph type="dt" sz="half" idx="10"/>
+          </p:nvPr>
+        </p:nvSpPr>
+        <p:spPr>
+          <a:xfrm>
+            <a:off x="838200" y="6356350"/>
+            <a:ext cx="2743200" cy="365125"/>
+          </a:xfrm>
+        </p:spPr>
+        <p:txBody>
+          <a:bodyPr/>
+          <a:lstStyle/>
+          <a:p>
+            <a:fld id="{4EF59023-6175-3944-979D-CFE35E3A8267}" type="datetime1">
+              <a:rPr lang="it-IT" smtClean="0"/>
+              <a:t>27/10/21</a:t>
+            </a:fld>
+            <a:endParaRPr lang="en-US" dirty="0"/>
+          </a:p>
+        </p:txBody>
+      </p:sp>
+      <p:sp>
+        <p:nvSpPr>
+          <p:cNvPr id="6" name="Segnaposto piè di pagina 4">
+            <a:extLst>
+              <a:ext uri="{FF2B5EF4-FFF2-40B4-BE49-F238E27FC236}">
+                <a16:creationId xmlns:a16="http://schemas.microsoft.com/office/drawing/2014/main" id="{764284B5-3467-AE48-80D4-203ED67BF382}"/>
+              </a:ext>
+            </a:extLst>
+          </p:cNvPr>
+          <p:cNvSpPr>
+            <a:spLocks noGrp="1"/>
+          </p:cNvSpPr>
+          <p:nvPr>
+            <p:ph type="ftr" sz="quarter" idx="11"/>
+          </p:nvPr>
+        </p:nvSpPr>
+        <p:spPr>
+          <a:xfrm>
+            <a:off x="4038600" y="6356350"/>
+            <a:ext cx="4114800" cy="365125"/>
+          </a:xfrm>
+        </p:spPr>
+        <p:txBody>
+          <a:bodyPr/>
+          <a:lstStyle/>
+          <a:p>
+            <a:r>
+              <a:rPr lang="en-US"/>
+              <a:t>Arianna Gasparri</a:t>
+            </a:r>
+            <a:endParaRPr lang="en-US" dirty="0"/>
+          </a:p>
+        </p:txBody>
+      </p:sp>
+      <p:sp>
+        <p:nvSpPr>
+          <p:cNvPr id="7" name="Segnaposto numero diapositiva 5">
+            <a:extLst>
+              <a:ext uri="{FF2B5EF4-FFF2-40B4-BE49-F238E27FC236}">
+                <a16:creationId xmlns:a16="http://schemas.microsoft.com/office/drawing/2014/main" id="{19E6B972-3060-C34D-B468-73BD169952F1}"/>
+              </a:ext>
+            </a:extLst>
+          </p:cNvPr>
+          <p:cNvSpPr>
+            <a:spLocks noGrp="1"/>
+          </p:cNvSpPr>
+          <p:nvPr>
+            <p:ph type="sldNum" sz="quarter" idx="12"/>
+          </p:nvPr>
+        </p:nvSpPr>
+        <p:spPr>
+          <a:xfrm>
+            <a:off x="8610600" y="6356350"/>
+            <a:ext cx="2743200" cy="365125"/>
+          </a:xfrm>
+        </p:spPr>
+        <p:txBody>
+          <a:bodyPr/>
+          <a:lstStyle/>
+          <a:p>
+            <a:fld id="{6D22F896-40B5-4ADD-8801-0D06FADFA095}" type="slidenum">
+              <a:rPr lang="en-US" smtClean="0"/>
+              <a:t>18</a:t>
+            </a:fld>
+            <a:endParaRPr lang="en-US" dirty="0"/>
+          </a:p>
+        </p:txBody>
+      </p:sp>
+      <p:pic>
+        <p:nvPicPr>
+          <p:cNvPr id="8" name="Immagine 7">
+            <a:extLst>
+              <a:ext uri="{FF2B5EF4-FFF2-40B4-BE49-F238E27FC236}">
+                <a16:creationId xmlns:a16="http://schemas.microsoft.com/office/drawing/2014/main" id="{6C031ED0-BD61-034F-8985-0C2000CE0D92}"/>
+              </a:ext>
+            </a:extLst>
+          </p:cNvPr>
+          <p:cNvPicPr>
+            <a:picLocks noChangeAspect="1"/>
+          </p:cNvPicPr>
+          <p:nvPr/>
+        </p:nvPicPr>
+        <p:blipFill>
+          <a:blip r:embed="rId3" cstate="print">
+            <a:extLst>
+              <a:ext uri="{28A0092B-C50C-407E-A947-70E740481C1C}">
+                <a14:useLocalDpi xmlns:a14="http://schemas.microsoft.com/office/drawing/2010/main" val="0"/>
+              </a:ext>
+            </a:extLst>
+          </a:blip>
+          <a:stretch>
+            <a:fillRect/>
+          </a:stretch>
+        </p:blipFill>
+        <p:spPr>
+          <a:xfrm>
+            <a:off x="241420" y="265431"/>
+            <a:ext cx="571500" cy="518160"/>
+          </a:xfrm>
+          <a:prstGeom prst="rect">
+            <a:avLst/>
+          </a:prstGeom>
+        </p:spPr>
+      </p:pic>
     </p:spTree>
     <p:extLst>
       <p:ext uri="{BB962C8B-B14F-4D97-AF65-F5344CB8AC3E}">
@@ -6661,6 +7905,144 @@
           </a:prstGeom>
         </p:spPr>
       </p:pic>
+      <p:sp>
+        <p:nvSpPr>
+          <p:cNvPr id="10" name="Segnaposto data 3">
+            <a:extLst>
+              <a:ext uri="{FF2B5EF4-FFF2-40B4-BE49-F238E27FC236}">
+                <a16:creationId xmlns:a16="http://schemas.microsoft.com/office/drawing/2014/main" id="{AE9DE227-D43C-9C44-B244-06A48DAF973E}"/>
+              </a:ext>
+            </a:extLst>
+          </p:cNvPr>
+          <p:cNvSpPr>
+            <a:spLocks noGrp="1"/>
+          </p:cNvSpPr>
+          <p:nvPr>
+            <p:ph type="dt" sz="half" idx="10"/>
+          </p:nvPr>
+        </p:nvSpPr>
+        <p:spPr>
+          <a:xfrm>
+            <a:off x="838200" y="6356350"/>
+            <a:ext cx="2743200" cy="365125"/>
+          </a:xfrm>
+        </p:spPr>
+        <p:txBody>
+          <a:bodyPr/>
+          <a:lstStyle/>
+          <a:p>
+            <a:fld id="{4EF59023-6175-3944-979D-CFE35E3A8267}" type="datetime1">
+              <a:rPr lang="it-IT" smtClean="0"/>
+              <a:t>27/10/21</a:t>
+            </a:fld>
+            <a:endParaRPr lang="en-US" dirty="0"/>
+          </a:p>
+        </p:txBody>
+      </p:sp>
+      <p:sp>
+        <p:nvSpPr>
+          <p:cNvPr id="12" name="Segnaposto piè di pagina 4">
+            <a:extLst>
+              <a:ext uri="{FF2B5EF4-FFF2-40B4-BE49-F238E27FC236}">
+                <a16:creationId xmlns:a16="http://schemas.microsoft.com/office/drawing/2014/main" id="{C8041FC7-4B67-C24D-A0EB-D22E155B7B73}"/>
+              </a:ext>
+            </a:extLst>
+          </p:cNvPr>
+          <p:cNvSpPr>
+            <a:spLocks noGrp="1"/>
+          </p:cNvSpPr>
+          <p:nvPr>
+            <p:ph type="ftr" sz="quarter" idx="11"/>
+          </p:nvPr>
+        </p:nvSpPr>
+        <p:spPr>
+          <a:xfrm>
+            <a:off x="4038600" y="6356350"/>
+            <a:ext cx="4114800" cy="365125"/>
+          </a:xfrm>
+        </p:spPr>
+        <p:txBody>
+          <a:bodyPr/>
+          <a:lstStyle/>
+          <a:p>
+            <a:r>
+              <a:rPr lang="en-US"/>
+              <a:t>Arianna Gasparri</a:t>
+            </a:r>
+            <a:endParaRPr lang="en-US" dirty="0"/>
+          </a:p>
+        </p:txBody>
+      </p:sp>
+      <p:sp>
+        <p:nvSpPr>
+          <p:cNvPr id="14" name="Segnaposto numero diapositiva 5">
+            <a:extLst>
+              <a:ext uri="{FF2B5EF4-FFF2-40B4-BE49-F238E27FC236}">
+                <a16:creationId xmlns:a16="http://schemas.microsoft.com/office/drawing/2014/main" id="{8F0BA2E5-108C-2E43-8954-A62D7E19AE52}"/>
+              </a:ext>
+            </a:extLst>
+          </p:cNvPr>
+          <p:cNvSpPr>
+            <a:spLocks noGrp="1"/>
+          </p:cNvSpPr>
+          <p:nvPr>
+            <p:ph type="sldNum" sz="quarter" idx="12"/>
+          </p:nvPr>
+        </p:nvSpPr>
+        <p:spPr>
+          <a:xfrm>
+            <a:off x="8610600" y="6356350"/>
+            <a:ext cx="2743200" cy="365125"/>
+          </a:xfrm>
+        </p:spPr>
+        <p:txBody>
+          <a:bodyPr/>
+          <a:lstStyle/>
+          <a:p>
+            <a:fld id="{6D22F896-40B5-4ADD-8801-0D06FADFA095}" type="slidenum">
+              <a:rPr lang="en-US" smtClean="0"/>
+              <a:t>19</a:t>
+            </a:fld>
+            <a:endParaRPr lang="en-US" dirty="0"/>
+          </a:p>
+        </p:txBody>
+      </p:sp>
+      <p:pic>
+        <p:nvPicPr>
+          <p:cNvPr id="15" name="Immagine 14">
+            <a:extLst>
+              <a:ext uri="{FF2B5EF4-FFF2-40B4-BE49-F238E27FC236}">
+                <a16:creationId xmlns:a16="http://schemas.microsoft.com/office/drawing/2014/main" id="{0C65000D-18E6-5B46-A632-C7057EBDDC71}"/>
+              </a:ext>
+            </a:extLst>
+          </p:cNvPr>
+          <p:cNvPicPr>
+            <a:picLocks noChangeAspect="1"/>
+          </p:cNvPicPr>
+          <p:nvPr/>
+        </p:nvPicPr>
+        <p:blipFill>
+          <a:blip r:embed="rId5" cstate="print">
+            <a:extLst>
+              <a:ext uri="{28A0092B-C50C-407E-A947-70E740481C1C}">
+                <a14:useLocalDpi xmlns:a14="http://schemas.microsoft.com/office/drawing/2010/main" val="0"/>
+              </a:ext>
+            </a:extLst>
+          </a:blip>
+          <a:stretch>
+            <a:fillRect/>
+          </a:stretch>
+        </p:blipFill>
+        <p:spPr>
+          <a:xfrm>
+            <a:off x="241420" y="265431"/>
+            <a:ext cx="571500" cy="518160"/>
+          </a:xfrm>
+          <a:prstGeom prst="rect">
+            <a:avLst/>
+          </a:prstGeom>
+        </p:spPr>
+      </p:pic>
     </p:spTree>
     <p:extLst>
       <p:ext uri="{BB962C8B-B14F-4D97-AF65-F5344CB8AC3E}">
@@ -6917,14 +8299,19 @@
             <p:ph type="dt" sz="half" idx="10"/>
           </p:nvPr>
         </p:nvSpPr>
-        <p:spPr/>
+        <p:spPr>
+          <a:xfrm>
+            <a:off x="838200" y="6356350"/>
+            <a:ext cx="2743200" cy="365125"/>
+          </a:xfrm>
+        </p:spPr>
         <p:txBody>
           <a:bodyPr/>
           <a:lstStyle/>
           <a:p>
             <a:fld id="{4EF59023-6175-3944-979D-CFE35E3A8267}" type="datetime1">
               <a:rPr lang="it-IT" smtClean="0"/>
-              <a:t>11/10/21</a:t>
+              <a:t>27/10/21</a:t>
             </a:fld>
             <a:endParaRPr lang="en-US" dirty="0"/>
           </a:p>
@@ -6988,6 +8375,42 @@
           </a:p>
         </p:txBody>
       </p:sp>
+      <p:pic>
+        <p:nvPicPr>
+          <p:cNvPr id="7" name="Immagine 6">
+            <a:extLst>
+              <a:ext uri="{FF2B5EF4-FFF2-40B4-BE49-F238E27FC236}">
+                <a16:creationId xmlns:a16="http://schemas.microsoft.com/office/drawing/2014/main" id="{E86DC6E7-73E5-B045-B761-B306134FAD25}"/>
+              </a:ext>
+            </a:extLst>
+          </p:cNvPr>
+          <p:cNvPicPr>
+            <a:picLocks noChangeAspect="1"/>
+          </p:cNvPicPr>
+          <p:nvPr/>
+        </p:nvPicPr>
+        <p:blipFill>
+          <a:blip r:embed="rId2" cstate="print">
+            <a:extLst>
+              <a:ext uri="{28A0092B-C50C-407E-A947-70E740481C1C}">
+                <a14:useLocalDpi xmlns:a14="http://schemas.microsoft.com/office/drawing/2010/main" val="0"/>
+              </a:ext>
+            </a:extLst>
+          </a:blip>
+          <a:stretch>
+            <a:fillRect/>
+          </a:stretch>
+        </p:blipFill>
+        <p:spPr>
+          <a:xfrm>
+            <a:off x="241420" y="265431"/>
+            <a:ext cx="571500" cy="518160"/>
+          </a:xfrm>
+          <a:prstGeom prst="rect">
+            <a:avLst/>
+          </a:prstGeom>
+        </p:spPr>
+      </p:pic>
     </p:spTree>
     <p:extLst>
       <p:ext uri="{BB962C8B-B14F-4D97-AF65-F5344CB8AC3E}">
@@ -7207,6 +8630,144 @@
           <a:xfrm>
             <a:off x="1362075" y="4041718"/>
             <a:ext cx="9467850" cy="2266950"/>
+          </a:xfrm>
+          <a:prstGeom prst="rect">
+            <a:avLst/>
+          </a:prstGeom>
+        </p:spPr>
+      </p:pic>
+      <p:sp>
+        <p:nvSpPr>
+          <p:cNvPr id="10" name="Segnaposto data 3">
+            <a:extLst>
+              <a:ext uri="{FF2B5EF4-FFF2-40B4-BE49-F238E27FC236}">
+                <a16:creationId xmlns:a16="http://schemas.microsoft.com/office/drawing/2014/main" id="{3531B279-D577-5248-90AF-F64E19A5EBC5}"/>
+              </a:ext>
+            </a:extLst>
+          </p:cNvPr>
+          <p:cNvSpPr>
+            <a:spLocks noGrp="1"/>
+          </p:cNvSpPr>
+          <p:nvPr>
+            <p:ph type="dt" sz="half" idx="10"/>
+          </p:nvPr>
+        </p:nvSpPr>
+        <p:spPr>
+          <a:xfrm>
+            <a:off x="838200" y="6356350"/>
+            <a:ext cx="2743200" cy="365125"/>
+          </a:xfrm>
+        </p:spPr>
+        <p:txBody>
+          <a:bodyPr/>
+          <a:lstStyle/>
+          <a:p>
+            <a:fld id="{4EF59023-6175-3944-979D-CFE35E3A8267}" type="datetime1">
+              <a:rPr lang="it-IT" smtClean="0"/>
+              <a:t>27/10/21</a:t>
+            </a:fld>
+            <a:endParaRPr lang="en-US" dirty="0"/>
+          </a:p>
+        </p:txBody>
+      </p:sp>
+      <p:sp>
+        <p:nvSpPr>
+          <p:cNvPr id="11" name="Segnaposto piè di pagina 4">
+            <a:extLst>
+              <a:ext uri="{FF2B5EF4-FFF2-40B4-BE49-F238E27FC236}">
+                <a16:creationId xmlns:a16="http://schemas.microsoft.com/office/drawing/2014/main" id="{100EDC2C-9436-5043-BE62-64D2D4DC14C5}"/>
+              </a:ext>
+            </a:extLst>
+          </p:cNvPr>
+          <p:cNvSpPr>
+            <a:spLocks noGrp="1"/>
+          </p:cNvSpPr>
+          <p:nvPr>
+            <p:ph type="ftr" sz="quarter" idx="11"/>
+          </p:nvPr>
+        </p:nvSpPr>
+        <p:spPr>
+          <a:xfrm>
+            <a:off x="4038600" y="6356350"/>
+            <a:ext cx="4114800" cy="365125"/>
+          </a:xfrm>
+        </p:spPr>
+        <p:txBody>
+          <a:bodyPr/>
+          <a:lstStyle/>
+          <a:p>
+            <a:r>
+              <a:rPr lang="en-US"/>
+              <a:t>Arianna Gasparri</a:t>
+            </a:r>
+            <a:endParaRPr lang="en-US" dirty="0"/>
+          </a:p>
+        </p:txBody>
+      </p:sp>
+      <p:sp>
+        <p:nvSpPr>
+          <p:cNvPr id="12" name="Segnaposto numero diapositiva 5">
+            <a:extLst>
+              <a:ext uri="{FF2B5EF4-FFF2-40B4-BE49-F238E27FC236}">
+                <a16:creationId xmlns:a16="http://schemas.microsoft.com/office/drawing/2014/main" id="{6ED4B9F5-DFA8-DC4A-B941-8259C37F3D57}"/>
+              </a:ext>
+            </a:extLst>
+          </p:cNvPr>
+          <p:cNvSpPr>
+            <a:spLocks noGrp="1"/>
+          </p:cNvSpPr>
+          <p:nvPr>
+            <p:ph type="sldNum" sz="quarter" idx="12"/>
+          </p:nvPr>
+        </p:nvSpPr>
+        <p:spPr>
+          <a:xfrm>
+            <a:off x="8610600" y="6356350"/>
+            <a:ext cx="2743200" cy="365125"/>
+          </a:xfrm>
+        </p:spPr>
+        <p:txBody>
+          <a:bodyPr/>
+          <a:lstStyle/>
+          <a:p>
+            <a:fld id="{6D22F896-40B5-4ADD-8801-0D06FADFA095}" type="slidenum">
+              <a:rPr lang="en-US" smtClean="0"/>
+              <a:t>20</a:t>
+            </a:fld>
+            <a:endParaRPr lang="en-US" dirty="0"/>
+          </a:p>
+        </p:txBody>
+      </p:sp>
+      <p:pic>
+        <p:nvPicPr>
+          <p:cNvPr id="13" name="Immagine 12">
+            <a:extLst>
+              <a:ext uri="{FF2B5EF4-FFF2-40B4-BE49-F238E27FC236}">
+                <a16:creationId xmlns:a16="http://schemas.microsoft.com/office/drawing/2014/main" id="{D4502927-51E7-A144-A796-FAD147598A31}"/>
+              </a:ext>
+            </a:extLst>
+          </p:cNvPr>
+          <p:cNvPicPr>
+            <a:picLocks noChangeAspect="1"/>
+          </p:cNvPicPr>
+          <p:nvPr/>
+        </p:nvPicPr>
+        <p:blipFill>
+          <a:blip r:embed="rId5" cstate="print">
+            <a:extLst>
+              <a:ext uri="{28A0092B-C50C-407E-A947-70E740481C1C}">
+                <a14:useLocalDpi xmlns:a14="http://schemas.microsoft.com/office/drawing/2010/main" val="0"/>
+              </a:ext>
+            </a:extLst>
+          </a:blip>
+          <a:stretch>
+            <a:fillRect/>
+          </a:stretch>
+        </p:blipFill>
+        <p:spPr>
+          <a:xfrm>
+            <a:off x="241420" y="265431"/>
+            <a:ext cx="571500" cy="518160"/>
           </a:xfrm>
           <a:prstGeom prst="rect">
             <a:avLst/>
@@ -7498,6 +9059,144 @@
           </a:prstGeom>
         </p:spPr>
       </p:pic>
+      <p:sp>
+        <p:nvSpPr>
+          <p:cNvPr id="10" name="Segnaposto data 3">
+            <a:extLst>
+              <a:ext uri="{FF2B5EF4-FFF2-40B4-BE49-F238E27FC236}">
+                <a16:creationId xmlns:a16="http://schemas.microsoft.com/office/drawing/2014/main" id="{05C89D9B-6C9B-4E48-9D4F-6AFF98E923D7}"/>
+              </a:ext>
+            </a:extLst>
+          </p:cNvPr>
+          <p:cNvSpPr>
+            <a:spLocks noGrp="1"/>
+          </p:cNvSpPr>
+          <p:nvPr>
+            <p:ph type="dt" sz="half" idx="10"/>
+          </p:nvPr>
+        </p:nvSpPr>
+        <p:spPr>
+          <a:xfrm>
+            <a:off x="838200" y="6356350"/>
+            <a:ext cx="2743200" cy="365125"/>
+          </a:xfrm>
+        </p:spPr>
+        <p:txBody>
+          <a:bodyPr/>
+          <a:lstStyle/>
+          <a:p>
+            <a:fld id="{4EF59023-6175-3944-979D-CFE35E3A8267}" type="datetime1">
+              <a:rPr lang="it-IT" smtClean="0"/>
+              <a:t>27/10/21</a:t>
+            </a:fld>
+            <a:endParaRPr lang="en-US" dirty="0"/>
+          </a:p>
+        </p:txBody>
+      </p:sp>
+      <p:sp>
+        <p:nvSpPr>
+          <p:cNvPr id="12" name="Segnaposto piè di pagina 4">
+            <a:extLst>
+              <a:ext uri="{FF2B5EF4-FFF2-40B4-BE49-F238E27FC236}">
+                <a16:creationId xmlns:a16="http://schemas.microsoft.com/office/drawing/2014/main" id="{B10A4DC1-2B85-F745-82E6-0410F049FAD0}"/>
+              </a:ext>
+            </a:extLst>
+          </p:cNvPr>
+          <p:cNvSpPr>
+            <a:spLocks noGrp="1"/>
+          </p:cNvSpPr>
+          <p:nvPr>
+            <p:ph type="ftr" sz="quarter" idx="11"/>
+          </p:nvPr>
+        </p:nvSpPr>
+        <p:spPr>
+          <a:xfrm>
+            <a:off x="4038600" y="6356350"/>
+            <a:ext cx="4114800" cy="365125"/>
+          </a:xfrm>
+        </p:spPr>
+        <p:txBody>
+          <a:bodyPr/>
+          <a:lstStyle/>
+          <a:p>
+            <a:r>
+              <a:rPr lang="en-US"/>
+              <a:t>Arianna Gasparri</a:t>
+            </a:r>
+            <a:endParaRPr lang="en-US" dirty="0"/>
+          </a:p>
+        </p:txBody>
+      </p:sp>
+      <p:sp>
+        <p:nvSpPr>
+          <p:cNvPr id="14" name="Segnaposto numero diapositiva 5">
+            <a:extLst>
+              <a:ext uri="{FF2B5EF4-FFF2-40B4-BE49-F238E27FC236}">
+                <a16:creationId xmlns:a16="http://schemas.microsoft.com/office/drawing/2014/main" id="{64915A39-08C4-D34D-A369-F65F3351495A}"/>
+              </a:ext>
+            </a:extLst>
+          </p:cNvPr>
+          <p:cNvSpPr>
+            <a:spLocks noGrp="1"/>
+          </p:cNvSpPr>
+          <p:nvPr>
+            <p:ph type="sldNum" sz="quarter" idx="12"/>
+          </p:nvPr>
+        </p:nvSpPr>
+        <p:spPr>
+          <a:xfrm>
+            <a:off x="8610600" y="6356350"/>
+            <a:ext cx="2743200" cy="365125"/>
+          </a:xfrm>
+        </p:spPr>
+        <p:txBody>
+          <a:bodyPr/>
+          <a:lstStyle/>
+          <a:p>
+            <a:fld id="{6D22F896-40B5-4ADD-8801-0D06FADFA095}" type="slidenum">
+              <a:rPr lang="en-US" smtClean="0"/>
+              <a:t>21</a:t>
+            </a:fld>
+            <a:endParaRPr lang="en-US" dirty="0"/>
+          </a:p>
+        </p:txBody>
+      </p:sp>
+      <p:pic>
+        <p:nvPicPr>
+          <p:cNvPr id="15" name="Immagine 14">
+            <a:extLst>
+              <a:ext uri="{FF2B5EF4-FFF2-40B4-BE49-F238E27FC236}">
+                <a16:creationId xmlns:a16="http://schemas.microsoft.com/office/drawing/2014/main" id="{2F70A25C-5291-AE45-918C-B8931863406E}"/>
+              </a:ext>
+            </a:extLst>
+          </p:cNvPr>
+          <p:cNvPicPr>
+            <a:picLocks noChangeAspect="1"/>
+          </p:cNvPicPr>
+          <p:nvPr/>
+        </p:nvPicPr>
+        <p:blipFill>
+          <a:blip r:embed="rId7" cstate="print">
+            <a:extLst>
+              <a:ext uri="{28A0092B-C50C-407E-A947-70E740481C1C}">
+                <a14:useLocalDpi xmlns:a14="http://schemas.microsoft.com/office/drawing/2010/main" val="0"/>
+              </a:ext>
+            </a:extLst>
+          </a:blip>
+          <a:stretch>
+            <a:fillRect/>
+          </a:stretch>
+        </p:blipFill>
+        <p:spPr>
+          <a:xfrm>
+            <a:off x="241420" y="265431"/>
+            <a:ext cx="571500" cy="518160"/>
+          </a:xfrm>
+          <a:prstGeom prst="rect">
+            <a:avLst/>
+          </a:prstGeom>
+        </p:spPr>
+      </p:pic>
     </p:spTree>
     <p:extLst>
       <p:ext uri="{BB962C8B-B14F-4D97-AF65-F5344CB8AC3E}">
@@ -7622,8 +9321,8 @@
           </a:p>
         </p:txBody>
       </p:sp>
-      <mc:AlternateContent xmlns:mc="http://schemas.openxmlformats.org/markup-compatibility/2006">
-        <mc:Choice xmlns:a14="http://schemas.microsoft.com/office/drawing/2010/main" Requires="a14">
+      <mc:AlternateContent xmlns:mc="http://schemas.openxmlformats.org/markup-compatibility/2006" xmlns:a14="http://schemas.microsoft.com/office/drawing/2010/main">
+        <mc:Choice Requires="a14">
           <p:sp>
             <p:nvSpPr>
               <p:cNvPr id="9" name="CasellaDiTesto 8">
@@ -7738,6 +9437,7 @@
                 </a:r>
               </a:p>
               <a:p>
+                <a:pPr/>
                 <a14:m>
                   <m:oMathPara xmlns:m="http://schemas.openxmlformats.org/officeDocument/2006/math">
                     <m:oMathParaPr>
@@ -7799,6 +9499,7 @@
                 </a:endParaRPr>
               </a:p>
               <a:p>
+                <a:pPr/>
                 <a14:m>
                   <m:oMathPara xmlns:m="http://schemas.openxmlformats.org/officeDocument/2006/math">
                     <m:oMathParaPr>
@@ -7869,7 +9570,7 @@
             </p:txBody>
           </p:sp>
         </mc:Choice>
-        <mc:Fallback>
+        <mc:Fallback xmlns="">
           <p:sp>
             <p:nvSpPr>
               <p:cNvPr id="9" name="CasellaDiTesto 8">
@@ -7914,8 +9615,8 @@
           </p:sp>
         </mc:Fallback>
       </mc:AlternateContent>
-      <mc:AlternateContent xmlns:mc="http://schemas.openxmlformats.org/markup-compatibility/2006">
-        <mc:Choice xmlns:a14="http://schemas.microsoft.com/office/drawing/2010/main" Requires="a14">
+      <mc:AlternateContent xmlns:mc="http://schemas.openxmlformats.org/markup-compatibility/2006" xmlns:a14="http://schemas.microsoft.com/office/drawing/2010/main">
+        <mc:Choice Requires="a14">
           <p:sp>
             <p:nvSpPr>
               <p:cNvPr id="2" name="CasellaDiTesto 1">
@@ -7956,14 +9657,7 @@
                         <a:latin typeface="Cambria Math" panose="02040503050406030204" pitchFamily="18" charset="0"/>
                         <a:ea typeface="Cambria Math" panose="02040503050406030204" pitchFamily="18" charset="0"/>
                       </a:rPr>
-                      <m:t>∆ =</m:t>
-                    </m:r>
-                    <m:r>
-                      <a:rPr lang="it-IT" i="1">
-                        <a:latin typeface="Cambria Math" panose="02040503050406030204" pitchFamily="18" charset="0"/>
-                        <a:ea typeface="Cambria Math" panose="02040503050406030204" pitchFamily="18" charset="0"/>
-                      </a:rPr>
-                      <m:t>[ </m:t>
+                      <m:t>∆ =[ </m:t>
                     </m:r>
                     <m:r>
                       <a:rPr lang="it-IT" i="1">
@@ -8528,7 +10222,7 @@
             </p:txBody>
           </p:sp>
         </mc:Choice>
-        <mc:Fallback>
+        <mc:Fallback xmlns="">
           <p:sp>
             <p:nvSpPr>
               <p:cNvPr id="2" name="CasellaDiTesto 1">
@@ -8573,6 +10267,144 @@
           </p:sp>
         </mc:Fallback>
       </mc:AlternateContent>
+      <p:sp>
+        <p:nvSpPr>
+          <p:cNvPr id="6" name="Segnaposto data 3">
+            <a:extLst>
+              <a:ext uri="{FF2B5EF4-FFF2-40B4-BE49-F238E27FC236}">
+                <a16:creationId xmlns:a16="http://schemas.microsoft.com/office/drawing/2014/main" id="{219A264E-098F-4149-BE8F-EDA2A5581D98}"/>
+              </a:ext>
+            </a:extLst>
+          </p:cNvPr>
+          <p:cNvSpPr>
+            <a:spLocks noGrp="1"/>
+          </p:cNvSpPr>
+          <p:nvPr>
+            <p:ph type="dt" sz="half" idx="10"/>
+          </p:nvPr>
+        </p:nvSpPr>
+        <p:spPr>
+          <a:xfrm>
+            <a:off x="838200" y="6356350"/>
+            <a:ext cx="2743200" cy="365125"/>
+          </a:xfrm>
+        </p:spPr>
+        <p:txBody>
+          <a:bodyPr/>
+          <a:lstStyle/>
+          <a:p>
+            <a:fld id="{4EF59023-6175-3944-979D-CFE35E3A8267}" type="datetime1">
+              <a:rPr lang="it-IT" smtClean="0"/>
+              <a:t>27/10/21</a:t>
+            </a:fld>
+            <a:endParaRPr lang="en-US" dirty="0"/>
+          </a:p>
+        </p:txBody>
+      </p:sp>
+      <p:sp>
+        <p:nvSpPr>
+          <p:cNvPr id="7" name="Segnaposto piè di pagina 4">
+            <a:extLst>
+              <a:ext uri="{FF2B5EF4-FFF2-40B4-BE49-F238E27FC236}">
+                <a16:creationId xmlns:a16="http://schemas.microsoft.com/office/drawing/2014/main" id="{03F9EED6-163E-E04B-B109-81B39E06D11B}"/>
+              </a:ext>
+            </a:extLst>
+          </p:cNvPr>
+          <p:cNvSpPr>
+            <a:spLocks noGrp="1"/>
+          </p:cNvSpPr>
+          <p:nvPr>
+            <p:ph type="ftr" sz="quarter" idx="11"/>
+          </p:nvPr>
+        </p:nvSpPr>
+        <p:spPr>
+          <a:xfrm>
+            <a:off x="4038600" y="6356350"/>
+            <a:ext cx="4114800" cy="365125"/>
+          </a:xfrm>
+        </p:spPr>
+        <p:txBody>
+          <a:bodyPr/>
+          <a:lstStyle/>
+          <a:p>
+            <a:r>
+              <a:rPr lang="en-US"/>
+              <a:t>Arianna Gasparri</a:t>
+            </a:r>
+            <a:endParaRPr lang="en-US" dirty="0"/>
+          </a:p>
+        </p:txBody>
+      </p:sp>
+      <p:sp>
+        <p:nvSpPr>
+          <p:cNvPr id="10" name="Segnaposto numero diapositiva 5">
+            <a:extLst>
+              <a:ext uri="{FF2B5EF4-FFF2-40B4-BE49-F238E27FC236}">
+                <a16:creationId xmlns:a16="http://schemas.microsoft.com/office/drawing/2014/main" id="{EB062610-E99D-C943-8B19-438C0ED214A7}"/>
+              </a:ext>
+            </a:extLst>
+          </p:cNvPr>
+          <p:cNvSpPr>
+            <a:spLocks noGrp="1"/>
+          </p:cNvSpPr>
+          <p:nvPr>
+            <p:ph type="sldNum" sz="quarter" idx="12"/>
+          </p:nvPr>
+        </p:nvSpPr>
+        <p:spPr>
+          <a:xfrm>
+            <a:off x="8610600" y="6356350"/>
+            <a:ext cx="2743200" cy="365125"/>
+          </a:xfrm>
+        </p:spPr>
+        <p:txBody>
+          <a:bodyPr/>
+          <a:lstStyle/>
+          <a:p>
+            <a:fld id="{6D22F896-40B5-4ADD-8801-0D06FADFA095}" type="slidenum">
+              <a:rPr lang="en-US" smtClean="0"/>
+              <a:t>22</a:t>
+            </a:fld>
+            <a:endParaRPr lang="en-US" dirty="0"/>
+          </a:p>
+        </p:txBody>
+      </p:sp>
+      <p:pic>
+        <p:nvPicPr>
+          <p:cNvPr id="11" name="Immagine 10">
+            <a:extLst>
+              <a:ext uri="{FF2B5EF4-FFF2-40B4-BE49-F238E27FC236}">
+                <a16:creationId xmlns:a16="http://schemas.microsoft.com/office/drawing/2014/main" id="{F7339FC9-972B-244B-A659-BF7218C34C8E}"/>
+              </a:ext>
+            </a:extLst>
+          </p:cNvPr>
+          <p:cNvPicPr>
+            <a:picLocks noChangeAspect="1"/>
+          </p:cNvPicPr>
+          <p:nvPr/>
+        </p:nvPicPr>
+        <p:blipFill>
+          <a:blip r:embed="rId5" cstate="print">
+            <a:extLst>
+              <a:ext uri="{28A0092B-C50C-407E-A947-70E740481C1C}">
+                <a14:useLocalDpi xmlns:a14="http://schemas.microsoft.com/office/drawing/2010/main" val="0"/>
+              </a:ext>
+            </a:extLst>
+          </a:blip>
+          <a:stretch>
+            <a:fillRect/>
+          </a:stretch>
+        </p:blipFill>
+        <p:spPr>
+          <a:xfrm>
+            <a:off x="241420" y="265431"/>
+            <a:ext cx="571500" cy="518160"/>
+          </a:xfrm>
+          <a:prstGeom prst="rect">
+            <a:avLst/>
+          </a:prstGeom>
+        </p:spPr>
+      </p:pic>
     </p:spTree>
     <p:extLst>
       <p:ext uri="{BB962C8B-B14F-4D97-AF65-F5344CB8AC3E}">
@@ -8667,8 +10499,8 @@
           </a:p>
         </p:txBody>
       </p:sp>
-      <mc:AlternateContent xmlns:mc="http://schemas.openxmlformats.org/markup-compatibility/2006">
-        <mc:Choice xmlns:a14="http://schemas.microsoft.com/office/drawing/2010/main" Requires="a14">
+      <mc:AlternateContent xmlns:mc="http://schemas.openxmlformats.org/markup-compatibility/2006" xmlns:a14="http://schemas.microsoft.com/office/drawing/2010/main">
+        <mc:Choice Requires="a14">
           <p:sp>
             <p:nvSpPr>
               <p:cNvPr id="9" name="CasellaDiTesto 8">
@@ -8935,19 +10767,7 @@
                             <a:rPr lang="it-IT" sz="2000" b="0" i="1" smtClean="0">
                               <a:latin typeface="Cambria Math" panose="02040503050406030204" pitchFamily="18" charset="0"/>
                             </a:rPr>
-                            <m:t>𝑑𝐿𝑔</m:t>
-                          </m:r>
-                          <m:r>
-                            <a:rPr lang="it-IT" sz="2000" b="0" i="1" smtClean="0">
-                              <a:latin typeface="Cambria Math" panose="02040503050406030204" pitchFamily="18" charset="0"/>
-                            </a:rPr>
-                            <m:t>𝐿</m:t>
-                          </m:r>
-                          <m:r>
-                            <a:rPr lang="it-IT" sz="2000" b="0" i="1" baseline="-25000" smtClean="0">
-                              <a:latin typeface="Cambria Math" panose="02040503050406030204" pitchFamily="18" charset="0"/>
-                            </a:rPr>
-                            <m:t>𝑓</m:t>
+                            <m:t>𝑑𝐿𝑔𝐿𝑓</m:t>
                           </m:r>
                           <m:r>
                             <a:rPr lang="it-IT" sz="2000" b="0" i="1" smtClean="0">
@@ -8982,19 +10802,7 @@
                             <a:rPr lang="it-IT" sz="2000" b="0" i="1" smtClean="0">
                               <a:latin typeface="Cambria Math" panose="02040503050406030204" pitchFamily="18" charset="0"/>
                             </a:rPr>
-                            <m:t>𝑑𝐿𝑓</m:t>
-                          </m:r>
-                          <m:r>
-                            <a:rPr lang="it-IT" sz="2000" b="0" i="1" smtClean="0">
-                              <a:latin typeface="Cambria Math" panose="02040503050406030204" pitchFamily="18" charset="0"/>
-                            </a:rPr>
-                            <m:t>𝐿</m:t>
-                          </m:r>
-                          <m:r>
-                            <a:rPr lang="it-IT" sz="2000" b="0" i="1" baseline="-25000" smtClean="0">
-                              <a:latin typeface="Cambria Math" panose="02040503050406030204" pitchFamily="18" charset="0"/>
-                            </a:rPr>
-                            <m:t>𝑔</m:t>
+                            <m:t>𝑑𝐿𝑓𝐿𝑔</m:t>
                           </m:r>
                           <m:r>
                             <a:rPr lang="it-IT" sz="2000" b="0" i="1" smtClean="0">
@@ -9069,7 +10877,7 @@
             </p:txBody>
           </p:sp>
         </mc:Choice>
-        <mc:Fallback>
+        <mc:Fallback xmlns="">
           <p:sp>
             <p:nvSpPr>
               <p:cNvPr id="9" name="CasellaDiTesto 8">
@@ -9144,6 +10952,144 @@
           </a:prstGeom>
         </p:spPr>
       </p:pic>
+      <p:sp>
+        <p:nvSpPr>
+          <p:cNvPr id="5" name="Segnaposto data 3">
+            <a:extLst>
+              <a:ext uri="{FF2B5EF4-FFF2-40B4-BE49-F238E27FC236}">
+                <a16:creationId xmlns:a16="http://schemas.microsoft.com/office/drawing/2014/main" id="{10832284-2AF9-D442-A2BC-3A4C6C544DF0}"/>
+              </a:ext>
+            </a:extLst>
+          </p:cNvPr>
+          <p:cNvSpPr>
+            <a:spLocks noGrp="1"/>
+          </p:cNvSpPr>
+          <p:nvPr>
+            <p:ph type="dt" sz="half" idx="10"/>
+          </p:nvPr>
+        </p:nvSpPr>
+        <p:spPr>
+          <a:xfrm>
+            <a:off x="838200" y="6356350"/>
+            <a:ext cx="2743200" cy="365125"/>
+          </a:xfrm>
+        </p:spPr>
+        <p:txBody>
+          <a:bodyPr/>
+          <a:lstStyle/>
+          <a:p>
+            <a:fld id="{4EF59023-6175-3944-979D-CFE35E3A8267}" type="datetime1">
+              <a:rPr lang="it-IT" smtClean="0"/>
+              <a:t>27/10/21</a:t>
+            </a:fld>
+            <a:endParaRPr lang="en-US" dirty="0"/>
+          </a:p>
+        </p:txBody>
+      </p:sp>
+      <p:sp>
+        <p:nvSpPr>
+          <p:cNvPr id="7" name="Segnaposto piè di pagina 4">
+            <a:extLst>
+              <a:ext uri="{FF2B5EF4-FFF2-40B4-BE49-F238E27FC236}">
+                <a16:creationId xmlns:a16="http://schemas.microsoft.com/office/drawing/2014/main" id="{5C3B2BD7-91A2-CA4F-9DA6-4CE984B6F87C}"/>
+              </a:ext>
+            </a:extLst>
+          </p:cNvPr>
+          <p:cNvSpPr>
+            <a:spLocks noGrp="1"/>
+          </p:cNvSpPr>
+          <p:nvPr>
+            <p:ph type="ftr" sz="quarter" idx="11"/>
+          </p:nvPr>
+        </p:nvSpPr>
+        <p:spPr>
+          <a:xfrm>
+            <a:off x="4038600" y="6356350"/>
+            <a:ext cx="4114800" cy="365125"/>
+          </a:xfrm>
+        </p:spPr>
+        <p:txBody>
+          <a:bodyPr/>
+          <a:lstStyle/>
+          <a:p>
+            <a:r>
+              <a:rPr lang="en-US"/>
+              <a:t>Arianna Gasparri</a:t>
+            </a:r>
+            <a:endParaRPr lang="en-US" dirty="0"/>
+          </a:p>
+        </p:txBody>
+      </p:sp>
+      <p:sp>
+        <p:nvSpPr>
+          <p:cNvPr id="10" name="Segnaposto numero diapositiva 5">
+            <a:extLst>
+              <a:ext uri="{FF2B5EF4-FFF2-40B4-BE49-F238E27FC236}">
+                <a16:creationId xmlns:a16="http://schemas.microsoft.com/office/drawing/2014/main" id="{5568013C-6B52-9D43-B6C2-2654FF7BD98A}"/>
+              </a:ext>
+            </a:extLst>
+          </p:cNvPr>
+          <p:cNvSpPr>
+            <a:spLocks noGrp="1"/>
+          </p:cNvSpPr>
+          <p:nvPr>
+            <p:ph type="sldNum" sz="quarter" idx="12"/>
+          </p:nvPr>
+        </p:nvSpPr>
+        <p:spPr>
+          <a:xfrm>
+            <a:off x="8610600" y="6356350"/>
+            <a:ext cx="2743200" cy="365125"/>
+          </a:xfrm>
+        </p:spPr>
+        <p:txBody>
+          <a:bodyPr/>
+          <a:lstStyle/>
+          <a:p>
+            <a:fld id="{6D22F896-40B5-4ADD-8801-0D06FADFA095}" type="slidenum">
+              <a:rPr lang="en-US" smtClean="0"/>
+              <a:t>23</a:t>
+            </a:fld>
+            <a:endParaRPr lang="en-US" dirty="0"/>
+          </a:p>
+        </p:txBody>
+      </p:sp>
+      <p:pic>
+        <p:nvPicPr>
+          <p:cNvPr id="11" name="Immagine 10">
+            <a:extLst>
+              <a:ext uri="{FF2B5EF4-FFF2-40B4-BE49-F238E27FC236}">
+                <a16:creationId xmlns:a16="http://schemas.microsoft.com/office/drawing/2014/main" id="{E9214F11-0DDC-E448-AFA0-4E2BD04563C4}"/>
+              </a:ext>
+            </a:extLst>
+          </p:cNvPr>
+          <p:cNvPicPr>
+            <a:picLocks noChangeAspect="1"/>
+          </p:cNvPicPr>
+          <p:nvPr/>
+        </p:nvPicPr>
+        <p:blipFill>
+          <a:blip r:embed="rId4" cstate="print">
+            <a:extLst>
+              <a:ext uri="{28A0092B-C50C-407E-A947-70E740481C1C}">
+                <a14:useLocalDpi xmlns:a14="http://schemas.microsoft.com/office/drawing/2010/main" val="0"/>
+              </a:ext>
+            </a:extLst>
+          </a:blip>
+          <a:stretch>
+            <a:fillRect/>
+          </a:stretch>
+        </p:blipFill>
+        <p:spPr>
+          <a:xfrm>
+            <a:off x="241420" y="265431"/>
+            <a:ext cx="571500" cy="518160"/>
+          </a:xfrm>
+          <a:prstGeom prst="rect">
+            <a:avLst/>
+          </a:prstGeom>
+        </p:spPr>
+      </p:pic>
     </p:spTree>
     <p:extLst>
       <p:ext uri="{BB962C8B-B14F-4D97-AF65-F5344CB8AC3E}">
@@ -9238,8 +11184,8 @@
           </a:p>
         </p:txBody>
       </p:sp>
-      <mc:AlternateContent xmlns:mc="http://schemas.openxmlformats.org/markup-compatibility/2006">
-        <mc:Choice xmlns:a14="http://schemas.microsoft.com/office/drawing/2010/main" Requires="a14">
+      <mc:AlternateContent xmlns:mc="http://schemas.openxmlformats.org/markup-compatibility/2006" xmlns:a14="http://schemas.microsoft.com/office/drawing/2010/main">
+        <mc:Choice Requires="a14">
           <p:sp>
             <p:nvSpPr>
               <p:cNvPr id="9" name="CasellaDiTesto 8">
@@ -9350,13 +11296,7 @@
                           <a:rPr lang="it-IT" sz="2000" b="0" i="1" smtClean="0">
                             <a:latin typeface="Cambria Math" panose="02040503050406030204" pitchFamily="18" charset="0"/>
                           </a:rPr>
-                          <m:t>𝑎𝑑𝑓</m:t>
-                        </m:r>
-                        <m:r>
-                          <a:rPr lang="it-IT" sz="2000" b="0" i="1" smtClean="0">
-                            <a:latin typeface="Cambria Math" panose="02040503050406030204" pitchFamily="18" charset="0"/>
-                          </a:rPr>
-                          <m:t>𝑔</m:t>
+                          <m:t>𝑎𝑑𝑓𝑔</m:t>
                         </m:r>
                         <m:d>
                           <m:dPr>
@@ -9729,7 +11669,7 @@
             </p:txBody>
           </p:sp>
         </mc:Choice>
-        <mc:Fallback>
+        <mc:Fallback xmlns="">
           <p:sp>
             <p:nvSpPr>
               <p:cNvPr id="9" name="CasellaDiTesto 8">
@@ -9930,6 +11870,144 @@
           </a:prstGeom>
         </p:spPr>
       </p:pic>
+      <p:sp>
+        <p:nvSpPr>
+          <p:cNvPr id="10" name="Segnaposto data 3">
+            <a:extLst>
+              <a:ext uri="{FF2B5EF4-FFF2-40B4-BE49-F238E27FC236}">
+                <a16:creationId xmlns:a16="http://schemas.microsoft.com/office/drawing/2014/main" id="{EA0D57D5-9B88-AE46-9537-16989AFDF7B1}"/>
+              </a:ext>
+            </a:extLst>
+          </p:cNvPr>
+          <p:cNvSpPr>
+            <a:spLocks noGrp="1"/>
+          </p:cNvSpPr>
+          <p:nvPr>
+            <p:ph type="dt" sz="half" idx="10"/>
+          </p:nvPr>
+        </p:nvSpPr>
+        <p:spPr>
+          <a:xfrm>
+            <a:off x="838200" y="6356350"/>
+            <a:ext cx="2743200" cy="365125"/>
+          </a:xfrm>
+        </p:spPr>
+        <p:txBody>
+          <a:bodyPr/>
+          <a:lstStyle/>
+          <a:p>
+            <a:fld id="{4EF59023-6175-3944-979D-CFE35E3A8267}" type="datetime1">
+              <a:rPr lang="it-IT" smtClean="0"/>
+              <a:t>27/10/21</a:t>
+            </a:fld>
+            <a:endParaRPr lang="en-US" dirty="0"/>
+          </a:p>
+        </p:txBody>
+      </p:sp>
+      <p:sp>
+        <p:nvSpPr>
+          <p:cNvPr id="12" name="Segnaposto piè di pagina 4">
+            <a:extLst>
+              <a:ext uri="{FF2B5EF4-FFF2-40B4-BE49-F238E27FC236}">
+                <a16:creationId xmlns:a16="http://schemas.microsoft.com/office/drawing/2014/main" id="{DD896EB6-027F-2040-B941-F6E2A70D04CE}"/>
+              </a:ext>
+            </a:extLst>
+          </p:cNvPr>
+          <p:cNvSpPr>
+            <a:spLocks noGrp="1"/>
+          </p:cNvSpPr>
+          <p:nvPr>
+            <p:ph type="ftr" sz="quarter" idx="11"/>
+          </p:nvPr>
+        </p:nvSpPr>
+        <p:spPr>
+          <a:xfrm>
+            <a:off x="4038600" y="6356350"/>
+            <a:ext cx="4114800" cy="365125"/>
+          </a:xfrm>
+        </p:spPr>
+        <p:txBody>
+          <a:bodyPr/>
+          <a:lstStyle/>
+          <a:p>
+            <a:r>
+              <a:rPr lang="en-US"/>
+              <a:t>Arianna Gasparri</a:t>
+            </a:r>
+            <a:endParaRPr lang="en-US" dirty="0"/>
+          </a:p>
+        </p:txBody>
+      </p:sp>
+      <p:sp>
+        <p:nvSpPr>
+          <p:cNvPr id="14" name="Segnaposto numero diapositiva 5">
+            <a:extLst>
+              <a:ext uri="{FF2B5EF4-FFF2-40B4-BE49-F238E27FC236}">
+                <a16:creationId xmlns:a16="http://schemas.microsoft.com/office/drawing/2014/main" id="{2BB93AAA-AE2C-A74F-B5B8-5BA05A821B01}"/>
+              </a:ext>
+            </a:extLst>
+          </p:cNvPr>
+          <p:cNvSpPr>
+            <a:spLocks noGrp="1"/>
+          </p:cNvSpPr>
+          <p:nvPr>
+            <p:ph type="sldNum" sz="quarter" idx="12"/>
+          </p:nvPr>
+        </p:nvSpPr>
+        <p:spPr>
+          <a:xfrm>
+            <a:off x="8610600" y="6356350"/>
+            <a:ext cx="2743200" cy="365125"/>
+          </a:xfrm>
+        </p:spPr>
+        <p:txBody>
+          <a:bodyPr/>
+          <a:lstStyle/>
+          <a:p>
+            <a:fld id="{6D22F896-40B5-4ADD-8801-0D06FADFA095}" type="slidenum">
+              <a:rPr lang="en-US" smtClean="0"/>
+              <a:t>24</a:t>
+            </a:fld>
+            <a:endParaRPr lang="en-US" dirty="0"/>
+          </a:p>
+        </p:txBody>
+      </p:sp>
+      <p:pic>
+        <p:nvPicPr>
+          <p:cNvPr id="15" name="Immagine 14">
+            <a:extLst>
+              <a:ext uri="{FF2B5EF4-FFF2-40B4-BE49-F238E27FC236}">
+                <a16:creationId xmlns:a16="http://schemas.microsoft.com/office/drawing/2014/main" id="{6D331639-9E5A-0D44-BA8D-D1A37BE79805}"/>
+              </a:ext>
+            </a:extLst>
+          </p:cNvPr>
+          <p:cNvPicPr>
+            <a:picLocks noChangeAspect="1"/>
+          </p:cNvPicPr>
+          <p:nvPr/>
+        </p:nvPicPr>
+        <p:blipFill>
+          <a:blip r:embed="rId7" cstate="print">
+            <a:extLst>
+              <a:ext uri="{28A0092B-C50C-407E-A947-70E740481C1C}">
+                <a14:useLocalDpi xmlns:a14="http://schemas.microsoft.com/office/drawing/2010/main" val="0"/>
+              </a:ext>
+            </a:extLst>
+          </a:blip>
+          <a:stretch>
+            <a:fillRect/>
+          </a:stretch>
+        </p:blipFill>
+        <p:spPr>
+          <a:xfrm>
+            <a:off x="241420" y="265431"/>
+            <a:ext cx="571500" cy="518160"/>
+          </a:xfrm>
+          <a:prstGeom prst="rect">
+            <a:avLst/>
+          </a:prstGeom>
+        </p:spPr>
+      </p:pic>
     </p:spTree>
     <p:extLst>
       <p:ext uri="{BB962C8B-B14F-4D97-AF65-F5344CB8AC3E}">
@@ -10140,6 +12218,144 @@
           <a:xfrm>
             <a:off x="1981200" y="3476171"/>
             <a:ext cx="8229600" cy="3038475"/>
+          </a:xfrm>
+          <a:prstGeom prst="rect">
+            <a:avLst/>
+          </a:prstGeom>
+        </p:spPr>
+      </p:pic>
+      <p:sp>
+        <p:nvSpPr>
+          <p:cNvPr id="7" name="Segnaposto data 3">
+            <a:extLst>
+              <a:ext uri="{FF2B5EF4-FFF2-40B4-BE49-F238E27FC236}">
+                <a16:creationId xmlns:a16="http://schemas.microsoft.com/office/drawing/2014/main" id="{35E100FE-194D-2B46-B256-44E938A611F9}"/>
+              </a:ext>
+            </a:extLst>
+          </p:cNvPr>
+          <p:cNvSpPr>
+            <a:spLocks noGrp="1"/>
+          </p:cNvSpPr>
+          <p:nvPr>
+            <p:ph type="dt" sz="half" idx="10"/>
+          </p:nvPr>
+        </p:nvSpPr>
+        <p:spPr>
+          <a:xfrm>
+            <a:off x="838200" y="6356350"/>
+            <a:ext cx="2743200" cy="365125"/>
+          </a:xfrm>
+        </p:spPr>
+        <p:txBody>
+          <a:bodyPr/>
+          <a:lstStyle/>
+          <a:p>
+            <a:fld id="{4EF59023-6175-3944-979D-CFE35E3A8267}" type="datetime1">
+              <a:rPr lang="it-IT" smtClean="0"/>
+              <a:t>27/10/21</a:t>
+            </a:fld>
+            <a:endParaRPr lang="en-US" dirty="0"/>
+          </a:p>
+        </p:txBody>
+      </p:sp>
+      <p:sp>
+        <p:nvSpPr>
+          <p:cNvPr id="11" name="Segnaposto piè di pagina 4">
+            <a:extLst>
+              <a:ext uri="{FF2B5EF4-FFF2-40B4-BE49-F238E27FC236}">
+                <a16:creationId xmlns:a16="http://schemas.microsoft.com/office/drawing/2014/main" id="{A9841E37-1C5D-F642-8423-20D7BE916AE2}"/>
+              </a:ext>
+            </a:extLst>
+          </p:cNvPr>
+          <p:cNvSpPr>
+            <a:spLocks noGrp="1"/>
+          </p:cNvSpPr>
+          <p:nvPr>
+            <p:ph type="ftr" sz="quarter" idx="11"/>
+          </p:nvPr>
+        </p:nvSpPr>
+        <p:spPr>
+          <a:xfrm>
+            <a:off x="4038600" y="6356350"/>
+            <a:ext cx="4114800" cy="365125"/>
+          </a:xfrm>
+        </p:spPr>
+        <p:txBody>
+          <a:bodyPr/>
+          <a:lstStyle/>
+          <a:p>
+            <a:r>
+              <a:rPr lang="en-US"/>
+              <a:t>Arianna Gasparri</a:t>
+            </a:r>
+            <a:endParaRPr lang="en-US" dirty="0"/>
+          </a:p>
+        </p:txBody>
+      </p:sp>
+      <p:sp>
+        <p:nvSpPr>
+          <p:cNvPr id="12" name="Segnaposto numero diapositiva 5">
+            <a:extLst>
+              <a:ext uri="{FF2B5EF4-FFF2-40B4-BE49-F238E27FC236}">
+                <a16:creationId xmlns:a16="http://schemas.microsoft.com/office/drawing/2014/main" id="{14DDBC56-62C7-E94C-A46F-CF3766D3EE2F}"/>
+              </a:ext>
+            </a:extLst>
+          </p:cNvPr>
+          <p:cNvSpPr>
+            <a:spLocks noGrp="1"/>
+          </p:cNvSpPr>
+          <p:nvPr>
+            <p:ph type="sldNum" sz="quarter" idx="12"/>
+          </p:nvPr>
+        </p:nvSpPr>
+        <p:spPr>
+          <a:xfrm>
+            <a:off x="8610600" y="6356350"/>
+            <a:ext cx="2743200" cy="365125"/>
+          </a:xfrm>
+        </p:spPr>
+        <p:txBody>
+          <a:bodyPr/>
+          <a:lstStyle/>
+          <a:p>
+            <a:fld id="{6D22F896-40B5-4ADD-8801-0D06FADFA095}" type="slidenum">
+              <a:rPr lang="en-US" smtClean="0"/>
+              <a:t>25</a:t>
+            </a:fld>
+            <a:endParaRPr lang="en-US" dirty="0"/>
+          </a:p>
+        </p:txBody>
+      </p:sp>
+      <p:pic>
+        <p:nvPicPr>
+          <p:cNvPr id="13" name="Immagine 12">
+            <a:extLst>
+              <a:ext uri="{FF2B5EF4-FFF2-40B4-BE49-F238E27FC236}">
+                <a16:creationId xmlns:a16="http://schemas.microsoft.com/office/drawing/2014/main" id="{8667F2DC-B326-FA4F-BF1C-D5A87EFE2C53}"/>
+              </a:ext>
+            </a:extLst>
+          </p:cNvPr>
+          <p:cNvPicPr>
+            <a:picLocks noChangeAspect="1"/>
+          </p:cNvPicPr>
+          <p:nvPr/>
+        </p:nvPicPr>
+        <p:blipFill>
+          <a:blip r:embed="rId4" cstate="print">
+            <a:extLst>
+              <a:ext uri="{28A0092B-C50C-407E-A947-70E740481C1C}">
+                <a14:useLocalDpi xmlns:a14="http://schemas.microsoft.com/office/drawing/2010/main" val="0"/>
+              </a:ext>
+            </a:extLst>
+          </a:blip>
+          <a:stretch>
+            <a:fillRect/>
+          </a:stretch>
+        </p:blipFill>
+        <p:spPr>
+          <a:xfrm>
+            <a:off x="241420" y="265431"/>
+            <a:ext cx="571500" cy="518160"/>
           </a:xfrm>
           <a:prstGeom prst="rect">
             <a:avLst/>
@@ -10366,6 +12582,144 @@
           </a:prstGeom>
         </p:spPr>
       </p:pic>
+      <p:sp>
+        <p:nvSpPr>
+          <p:cNvPr id="7" name="Segnaposto data 3">
+            <a:extLst>
+              <a:ext uri="{FF2B5EF4-FFF2-40B4-BE49-F238E27FC236}">
+                <a16:creationId xmlns:a16="http://schemas.microsoft.com/office/drawing/2014/main" id="{6B3D6E58-06BF-1341-B405-6074E5570CBE}"/>
+              </a:ext>
+            </a:extLst>
+          </p:cNvPr>
+          <p:cNvSpPr>
+            <a:spLocks noGrp="1"/>
+          </p:cNvSpPr>
+          <p:nvPr>
+            <p:ph type="dt" sz="half" idx="10"/>
+          </p:nvPr>
+        </p:nvSpPr>
+        <p:spPr>
+          <a:xfrm>
+            <a:off x="838200" y="6356350"/>
+            <a:ext cx="2743200" cy="365125"/>
+          </a:xfrm>
+        </p:spPr>
+        <p:txBody>
+          <a:bodyPr/>
+          <a:lstStyle/>
+          <a:p>
+            <a:fld id="{4EF59023-6175-3944-979D-CFE35E3A8267}" type="datetime1">
+              <a:rPr lang="it-IT" smtClean="0"/>
+              <a:t>27/10/21</a:t>
+            </a:fld>
+            <a:endParaRPr lang="en-US" dirty="0"/>
+          </a:p>
+        </p:txBody>
+      </p:sp>
+      <p:sp>
+        <p:nvSpPr>
+          <p:cNvPr id="10" name="Segnaposto piè di pagina 4">
+            <a:extLst>
+              <a:ext uri="{FF2B5EF4-FFF2-40B4-BE49-F238E27FC236}">
+                <a16:creationId xmlns:a16="http://schemas.microsoft.com/office/drawing/2014/main" id="{D5B28A30-8656-2745-A574-AC8117BE6070}"/>
+              </a:ext>
+            </a:extLst>
+          </p:cNvPr>
+          <p:cNvSpPr>
+            <a:spLocks noGrp="1"/>
+          </p:cNvSpPr>
+          <p:nvPr>
+            <p:ph type="ftr" sz="quarter" idx="11"/>
+          </p:nvPr>
+        </p:nvSpPr>
+        <p:spPr>
+          <a:xfrm>
+            <a:off x="4038600" y="6356350"/>
+            <a:ext cx="4114800" cy="365125"/>
+          </a:xfrm>
+        </p:spPr>
+        <p:txBody>
+          <a:bodyPr/>
+          <a:lstStyle/>
+          <a:p>
+            <a:r>
+              <a:rPr lang="en-US"/>
+              <a:t>Arianna Gasparri</a:t>
+            </a:r>
+            <a:endParaRPr lang="en-US" dirty="0"/>
+          </a:p>
+        </p:txBody>
+      </p:sp>
+      <p:sp>
+        <p:nvSpPr>
+          <p:cNvPr id="11" name="Segnaposto numero diapositiva 5">
+            <a:extLst>
+              <a:ext uri="{FF2B5EF4-FFF2-40B4-BE49-F238E27FC236}">
+                <a16:creationId xmlns:a16="http://schemas.microsoft.com/office/drawing/2014/main" id="{06FA9C7D-77F5-8F44-99B9-244BA8DF5120}"/>
+              </a:ext>
+            </a:extLst>
+          </p:cNvPr>
+          <p:cNvSpPr>
+            <a:spLocks noGrp="1"/>
+          </p:cNvSpPr>
+          <p:nvPr>
+            <p:ph type="sldNum" sz="quarter" idx="12"/>
+          </p:nvPr>
+        </p:nvSpPr>
+        <p:spPr>
+          <a:xfrm>
+            <a:off x="8610600" y="6356350"/>
+            <a:ext cx="2743200" cy="365125"/>
+          </a:xfrm>
+        </p:spPr>
+        <p:txBody>
+          <a:bodyPr/>
+          <a:lstStyle/>
+          <a:p>
+            <a:fld id="{6D22F896-40B5-4ADD-8801-0D06FADFA095}" type="slidenum">
+              <a:rPr lang="en-US" smtClean="0"/>
+              <a:t>26</a:t>
+            </a:fld>
+            <a:endParaRPr lang="en-US" dirty="0"/>
+          </a:p>
+        </p:txBody>
+      </p:sp>
+      <p:pic>
+        <p:nvPicPr>
+          <p:cNvPr id="12" name="Immagine 11">
+            <a:extLst>
+              <a:ext uri="{FF2B5EF4-FFF2-40B4-BE49-F238E27FC236}">
+                <a16:creationId xmlns:a16="http://schemas.microsoft.com/office/drawing/2014/main" id="{C69BD7AD-13DF-B64A-AA40-5E86A6150330}"/>
+              </a:ext>
+            </a:extLst>
+          </p:cNvPr>
+          <p:cNvPicPr>
+            <a:picLocks noChangeAspect="1"/>
+          </p:cNvPicPr>
+          <p:nvPr/>
+        </p:nvPicPr>
+        <p:blipFill>
+          <a:blip r:embed="rId5" cstate="print">
+            <a:extLst>
+              <a:ext uri="{28A0092B-C50C-407E-A947-70E740481C1C}">
+                <a14:useLocalDpi xmlns:a14="http://schemas.microsoft.com/office/drawing/2010/main" val="0"/>
+              </a:ext>
+            </a:extLst>
+          </a:blip>
+          <a:stretch>
+            <a:fillRect/>
+          </a:stretch>
+        </p:blipFill>
+        <p:spPr>
+          <a:xfrm>
+            <a:off x="241420" y="265431"/>
+            <a:ext cx="571500" cy="518160"/>
+          </a:xfrm>
+          <a:prstGeom prst="rect">
+            <a:avLst/>
+          </a:prstGeom>
+        </p:spPr>
+      </p:pic>
     </p:spTree>
     <p:extLst>
       <p:ext uri="{BB962C8B-B14F-4D97-AF65-F5344CB8AC3E}">
@@ -10662,6 +13016,144 @@
           </a:p>
         </p:txBody>
       </p:sp>
+      <p:sp>
+        <p:nvSpPr>
+          <p:cNvPr id="6" name="Segnaposto data 3">
+            <a:extLst>
+              <a:ext uri="{FF2B5EF4-FFF2-40B4-BE49-F238E27FC236}">
+                <a16:creationId xmlns:a16="http://schemas.microsoft.com/office/drawing/2014/main" id="{4B8E3AC9-0A90-6E41-BFFB-1991A59A19B5}"/>
+              </a:ext>
+            </a:extLst>
+          </p:cNvPr>
+          <p:cNvSpPr>
+            <a:spLocks noGrp="1"/>
+          </p:cNvSpPr>
+          <p:nvPr>
+            <p:ph type="dt" sz="half" idx="10"/>
+          </p:nvPr>
+        </p:nvSpPr>
+        <p:spPr>
+          <a:xfrm>
+            <a:off x="838200" y="6356350"/>
+            <a:ext cx="2743200" cy="365125"/>
+          </a:xfrm>
+        </p:spPr>
+        <p:txBody>
+          <a:bodyPr/>
+          <a:lstStyle/>
+          <a:p>
+            <a:fld id="{4EF59023-6175-3944-979D-CFE35E3A8267}" type="datetime1">
+              <a:rPr lang="it-IT" smtClean="0"/>
+              <a:t>27/10/21</a:t>
+            </a:fld>
+            <a:endParaRPr lang="en-US" dirty="0"/>
+          </a:p>
+        </p:txBody>
+      </p:sp>
+      <p:sp>
+        <p:nvSpPr>
+          <p:cNvPr id="9" name="Segnaposto piè di pagina 4">
+            <a:extLst>
+              <a:ext uri="{FF2B5EF4-FFF2-40B4-BE49-F238E27FC236}">
+                <a16:creationId xmlns:a16="http://schemas.microsoft.com/office/drawing/2014/main" id="{456B644D-8EC7-0E4C-9CD3-53F6522C8E3E}"/>
+              </a:ext>
+            </a:extLst>
+          </p:cNvPr>
+          <p:cNvSpPr>
+            <a:spLocks noGrp="1"/>
+          </p:cNvSpPr>
+          <p:nvPr>
+            <p:ph type="ftr" sz="quarter" idx="11"/>
+          </p:nvPr>
+        </p:nvSpPr>
+        <p:spPr>
+          <a:xfrm>
+            <a:off x="4038600" y="6356350"/>
+            <a:ext cx="4114800" cy="365125"/>
+          </a:xfrm>
+        </p:spPr>
+        <p:txBody>
+          <a:bodyPr/>
+          <a:lstStyle/>
+          <a:p>
+            <a:r>
+              <a:rPr lang="en-US"/>
+              <a:t>Arianna Gasparri</a:t>
+            </a:r>
+            <a:endParaRPr lang="en-US" dirty="0"/>
+          </a:p>
+        </p:txBody>
+      </p:sp>
+      <p:sp>
+        <p:nvSpPr>
+          <p:cNvPr id="10" name="Segnaposto numero diapositiva 5">
+            <a:extLst>
+              <a:ext uri="{FF2B5EF4-FFF2-40B4-BE49-F238E27FC236}">
+                <a16:creationId xmlns:a16="http://schemas.microsoft.com/office/drawing/2014/main" id="{906F5B4A-AEF0-EA45-B4E7-6A7716E1F8CB}"/>
+              </a:ext>
+            </a:extLst>
+          </p:cNvPr>
+          <p:cNvSpPr>
+            <a:spLocks noGrp="1"/>
+          </p:cNvSpPr>
+          <p:nvPr>
+            <p:ph type="sldNum" sz="quarter" idx="12"/>
+          </p:nvPr>
+        </p:nvSpPr>
+        <p:spPr>
+          <a:xfrm>
+            <a:off x="8610600" y="6356350"/>
+            <a:ext cx="2743200" cy="365125"/>
+          </a:xfrm>
+        </p:spPr>
+        <p:txBody>
+          <a:bodyPr/>
+          <a:lstStyle/>
+          <a:p>
+            <a:fld id="{6D22F896-40B5-4ADD-8801-0D06FADFA095}" type="slidenum">
+              <a:rPr lang="en-US" smtClean="0"/>
+              <a:t>3</a:t>
+            </a:fld>
+            <a:endParaRPr lang="en-US" dirty="0"/>
+          </a:p>
+        </p:txBody>
+      </p:sp>
+      <p:pic>
+        <p:nvPicPr>
+          <p:cNvPr id="11" name="Immagine 10">
+            <a:extLst>
+              <a:ext uri="{FF2B5EF4-FFF2-40B4-BE49-F238E27FC236}">
+                <a16:creationId xmlns:a16="http://schemas.microsoft.com/office/drawing/2014/main" id="{8E317C00-55E5-EE47-B1DA-1185583F28B3}"/>
+              </a:ext>
+            </a:extLst>
+          </p:cNvPr>
+          <p:cNvPicPr>
+            <a:picLocks noChangeAspect="1"/>
+          </p:cNvPicPr>
+          <p:nvPr/>
+        </p:nvPicPr>
+        <p:blipFill>
+          <a:blip r:embed="rId4" cstate="print">
+            <a:extLst>
+              <a:ext uri="{28A0092B-C50C-407E-A947-70E740481C1C}">
+                <a14:useLocalDpi xmlns:a14="http://schemas.microsoft.com/office/drawing/2010/main" val="0"/>
+              </a:ext>
+            </a:extLst>
+          </a:blip>
+          <a:stretch>
+            <a:fillRect/>
+          </a:stretch>
+        </p:blipFill>
+        <p:spPr>
+          <a:xfrm>
+            <a:off x="241420" y="265431"/>
+            <a:ext cx="571500" cy="518160"/>
+          </a:xfrm>
+          <a:prstGeom prst="rect">
+            <a:avLst/>
+          </a:prstGeom>
+        </p:spPr>
+      </p:pic>
     </p:spTree>
     <p:extLst>
       <p:ext uri="{BB962C8B-B14F-4D97-AF65-F5344CB8AC3E}">
@@ -12565,6 +15057,144 @@
           </a:p>
         </p:txBody>
       </p:sp>
+      <p:sp>
+        <p:nvSpPr>
+          <p:cNvPr id="8" name="Segnaposto data 3">
+            <a:extLst>
+              <a:ext uri="{FF2B5EF4-FFF2-40B4-BE49-F238E27FC236}">
+                <a16:creationId xmlns:a16="http://schemas.microsoft.com/office/drawing/2014/main" id="{7FA3F3EA-7F14-6840-89D3-5E2D2490D68C}"/>
+              </a:ext>
+            </a:extLst>
+          </p:cNvPr>
+          <p:cNvSpPr>
+            <a:spLocks noGrp="1"/>
+          </p:cNvSpPr>
+          <p:nvPr>
+            <p:ph type="dt" sz="half" idx="10"/>
+          </p:nvPr>
+        </p:nvSpPr>
+        <p:spPr>
+          <a:xfrm>
+            <a:off x="838200" y="6356350"/>
+            <a:ext cx="2743200" cy="365125"/>
+          </a:xfrm>
+        </p:spPr>
+        <p:txBody>
+          <a:bodyPr/>
+          <a:lstStyle/>
+          <a:p>
+            <a:fld id="{4EF59023-6175-3944-979D-CFE35E3A8267}" type="datetime1">
+              <a:rPr lang="it-IT" smtClean="0"/>
+              <a:t>27/10/21</a:t>
+            </a:fld>
+            <a:endParaRPr lang="en-US" dirty="0"/>
+          </a:p>
+        </p:txBody>
+      </p:sp>
+      <p:sp>
+        <p:nvSpPr>
+          <p:cNvPr id="10" name="Segnaposto piè di pagina 4">
+            <a:extLst>
+              <a:ext uri="{FF2B5EF4-FFF2-40B4-BE49-F238E27FC236}">
+                <a16:creationId xmlns:a16="http://schemas.microsoft.com/office/drawing/2014/main" id="{C7223079-51AF-904D-AE4F-28A380DE959C}"/>
+              </a:ext>
+            </a:extLst>
+          </p:cNvPr>
+          <p:cNvSpPr>
+            <a:spLocks noGrp="1"/>
+          </p:cNvSpPr>
+          <p:nvPr>
+            <p:ph type="ftr" sz="quarter" idx="11"/>
+          </p:nvPr>
+        </p:nvSpPr>
+        <p:spPr>
+          <a:xfrm>
+            <a:off x="4038600" y="6356350"/>
+            <a:ext cx="4114800" cy="365125"/>
+          </a:xfrm>
+        </p:spPr>
+        <p:txBody>
+          <a:bodyPr/>
+          <a:lstStyle/>
+          <a:p>
+            <a:r>
+              <a:rPr lang="en-US"/>
+              <a:t>Arianna Gasparri</a:t>
+            </a:r>
+            <a:endParaRPr lang="en-US" dirty="0"/>
+          </a:p>
+        </p:txBody>
+      </p:sp>
+      <p:sp>
+        <p:nvSpPr>
+          <p:cNvPr id="11" name="Segnaposto numero diapositiva 5">
+            <a:extLst>
+              <a:ext uri="{FF2B5EF4-FFF2-40B4-BE49-F238E27FC236}">
+                <a16:creationId xmlns:a16="http://schemas.microsoft.com/office/drawing/2014/main" id="{EE4667CB-767F-C546-A716-BAF718BF5AB1}"/>
+              </a:ext>
+            </a:extLst>
+          </p:cNvPr>
+          <p:cNvSpPr>
+            <a:spLocks noGrp="1"/>
+          </p:cNvSpPr>
+          <p:nvPr>
+            <p:ph type="sldNum" sz="quarter" idx="12"/>
+          </p:nvPr>
+        </p:nvSpPr>
+        <p:spPr>
+          <a:xfrm>
+            <a:off x="8610600" y="6356350"/>
+            <a:ext cx="2743200" cy="365125"/>
+          </a:xfrm>
+        </p:spPr>
+        <p:txBody>
+          <a:bodyPr/>
+          <a:lstStyle/>
+          <a:p>
+            <a:fld id="{6D22F896-40B5-4ADD-8801-0D06FADFA095}" type="slidenum">
+              <a:rPr lang="en-US" smtClean="0"/>
+              <a:t>4</a:t>
+            </a:fld>
+            <a:endParaRPr lang="en-US" dirty="0"/>
+          </a:p>
+        </p:txBody>
+      </p:sp>
+      <p:pic>
+        <p:nvPicPr>
+          <p:cNvPr id="12" name="Immagine 11">
+            <a:extLst>
+              <a:ext uri="{FF2B5EF4-FFF2-40B4-BE49-F238E27FC236}">
+                <a16:creationId xmlns:a16="http://schemas.microsoft.com/office/drawing/2014/main" id="{B9467F14-0AD3-8245-8F95-2CD40916853F}"/>
+              </a:ext>
+            </a:extLst>
+          </p:cNvPr>
+          <p:cNvPicPr>
+            <a:picLocks noChangeAspect="1"/>
+          </p:cNvPicPr>
+          <p:nvPr/>
+        </p:nvPicPr>
+        <p:blipFill>
+          <a:blip r:embed="rId4" cstate="print">
+            <a:extLst>
+              <a:ext uri="{28A0092B-C50C-407E-A947-70E740481C1C}">
+                <a14:useLocalDpi xmlns:a14="http://schemas.microsoft.com/office/drawing/2010/main" val="0"/>
+              </a:ext>
+            </a:extLst>
+          </a:blip>
+          <a:stretch>
+            <a:fillRect/>
+          </a:stretch>
+        </p:blipFill>
+        <p:spPr>
+          <a:xfrm>
+            <a:off x="241420" y="265431"/>
+            <a:ext cx="571500" cy="518160"/>
+          </a:xfrm>
+          <a:prstGeom prst="rect">
+            <a:avLst/>
+          </a:prstGeom>
+        </p:spPr>
+      </p:pic>
     </p:spTree>
     <p:extLst>
       <p:ext uri="{BB962C8B-B14F-4D97-AF65-F5344CB8AC3E}">
@@ -12795,6 +15425,144 @@
           <a:xfrm>
             <a:off x="1784718" y="4412748"/>
             <a:ext cx="3657600" cy="1219200"/>
+          </a:xfrm>
+          <a:prstGeom prst="rect">
+            <a:avLst/>
+          </a:prstGeom>
+        </p:spPr>
+      </p:pic>
+      <p:sp>
+        <p:nvSpPr>
+          <p:cNvPr id="8" name="Segnaposto data 3">
+            <a:extLst>
+              <a:ext uri="{FF2B5EF4-FFF2-40B4-BE49-F238E27FC236}">
+                <a16:creationId xmlns:a16="http://schemas.microsoft.com/office/drawing/2014/main" id="{A686B70D-1A3D-2A4C-A0F9-A6A69FD70E87}"/>
+              </a:ext>
+            </a:extLst>
+          </p:cNvPr>
+          <p:cNvSpPr>
+            <a:spLocks noGrp="1"/>
+          </p:cNvSpPr>
+          <p:nvPr>
+            <p:ph type="dt" sz="half" idx="10"/>
+          </p:nvPr>
+        </p:nvSpPr>
+        <p:spPr>
+          <a:xfrm>
+            <a:off x="838200" y="6356350"/>
+            <a:ext cx="2743200" cy="365125"/>
+          </a:xfrm>
+        </p:spPr>
+        <p:txBody>
+          <a:bodyPr/>
+          <a:lstStyle/>
+          <a:p>
+            <a:fld id="{4EF59023-6175-3944-979D-CFE35E3A8267}" type="datetime1">
+              <a:rPr lang="it-IT" smtClean="0"/>
+              <a:t>27/10/21</a:t>
+            </a:fld>
+            <a:endParaRPr lang="en-US" dirty="0"/>
+          </a:p>
+        </p:txBody>
+      </p:sp>
+      <p:sp>
+        <p:nvSpPr>
+          <p:cNvPr id="9" name="Segnaposto piè di pagina 4">
+            <a:extLst>
+              <a:ext uri="{FF2B5EF4-FFF2-40B4-BE49-F238E27FC236}">
+                <a16:creationId xmlns:a16="http://schemas.microsoft.com/office/drawing/2014/main" id="{A06E9C3F-6C77-D74B-A1EF-F4BE47E7215C}"/>
+              </a:ext>
+            </a:extLst>
+          </p:cNvPr>
+          <p:cNvSpPr>
+            <a:spLocks noGrp="1"/>
+          </p:cNvSpPr>
+          <p:nvPr>
+            <p:ph type="ftr" sz="quarter" idx="11"/>
+          </p:nvPr>
+        </p:nvSpPr>
+        <p:spPr>
+          <a:xfrm>
+            <a:off x="4038600" y="6356350"/>
+            <a:ext cx="4114800" cy="365125"/>
+          </a:xfrm>
+        </p:spPr>
+        <p:txBody>
+          <a:bodyPr/>
+          <a:lstStyle/>
+          <a:p>
+            <a:r>
+              <a:rPr lang="en-US"/>
+              <a:t>Arianna Gasparri</a:t>
+            </a:r>
+            <a:endParaRPr lang="en-US" dirty="0"/>
+          </a:p>
+        </p:txBody>
+      </p:sp>
+      <p:sp>
+        <p:nvSpPr>
+          <p:cNvPr id="10" name="Segnaposto numero diapositiva 5">
+            <a:extLst>
+              <a:ext uri="{FF2B5EF4-FFF2-40B4-BE49-F238E27FC236}">
+                <a16:creationId xmlns:a16="http://schemas.microsoft.com/office/drawing/2014/main" id="{7636B61E-8FB2-8948-9E0B-70C7EFB21070}"/>
+              </a:ext>
+            </a:extLst>
+          </p:cNvPr>
+          <p:cNvSpPr>
+            <a:spLocks noGrp="1"/>
+          </p:cNvSpPr>
+          <p:nvPr>
+            <p:ph type="sldNum" sz="quarter" idx="12"/>
+          </p:nvPr>
+        </p:nvSpPr>
+        <p:spPr>
+          <a:xfrm>
+            <a:off x="8610600" y="6356350"/>
+            <a:ext cx="2743200" cy="365125"/>
+          </a:xfrm>
+        </p:spPr>
+        <p:txBody>
+          <a:bodyPr/>
+          <a:lstStyle/>
+          <a:p>
+            <a:fld id="{6D22F896-40B5-4ADD-8801-0D06FADFA095}" type="slidenum">
+              <a:rPr lang="en-US" smtClean="0"/>
+              <a:t>5</a:t>
+            </a:fld>
+            <a:endParaRPr lang="en-US" dirty="0"/>
+          </a:p>
+        </p:txBody>
+      </p:sp>
+      <p:pic>
+        <p:nvPicPr>
+          <p:cNvPr id="11" name="Immagine 10">
+            <a:extLst>
+              <a:ext uri="{FF2B5EF4-FFF2-40B4-BE49-F238E27FC236}">
+                <a16:creationId xmlns:a16="http://schemas.microsoft.com/office/drawing/2014/main" id="{824BD356-4160-F04B-8768-162A3C004CC1}"/>
+              </a:ext>
+            </a:extLst>
+          </p:cNvPr>
+          <p:cNvPicPr>
+            <a:picLocks noChangeAspect="1"/>
+          </p:cNvPicPr>
+          <p:nvPr/>
+        </p:nvPicPr>
+        <p:blipFill>
+          <a:blip r:embed="rId5" cstate="print">
+            <a:extLst>
+              <a:ext uri="{28A0092B-C50C-407E-A947-70E740481C1C}">
+                <a14:useLocalDpi xmlns:a14="http://schemas.microsoft.com/office/drawing/2010/main" val="0"/>
+              </a:ext>
+            </a:extLst>
+          </a:blip>
+          <a:stretch>
+            <a:fillRect/>
+          </a:stretch>
+        </p:blipFill>
+        <p:spPr>
+          <a:xfrm>
+            <a:off x="241420" y="265431"/>
+            <a:ext cx="571500" cy="518160"/>
           </a:xfrm>
           <a:prstGeom prst="rect">
             <a:avLst/>
@@ -12831,8 +15599,8 @@
           <a:chExt cx="0" cy="0"/>
         </a:xfrm>
       </p:grpSpPr>
-      <mc:AlternateContent xmlns:mc="http://schemas.openxmlformats.org/markup-compatibility/2006" xmlns:a14="http://schemas.microsoft.com/office/drawing/2010/main">
-        <mc:Choice Requires="a14">
+      <mc:AlternateContent xmlns:mc="http://schemas.openxmlformats.org/markup-compatibility/2006">
+        <mc:Choice xmlns:a14="http://schemas.microsoft.com/office/drawing/2010/main" Requires="a14">
           <p:sp>
             <p:nvSpPr>
               <p:cNvPr id="5" name="CasellaDiTesto 4">
@@ -13170,7 +15938,7 @@
                 </a14:m>
                 <a:r>
                   <a:rPr lang="it-IT" dirty="0"/>
-                  <a:t> che sono necessari per generare il movimento specificato dall'accelerazioni </a:t>
+                  <a:t> che sono necessarie per generare il movimento specificato dall'accelerazioni </a:t>
                 </a:r>
                 <a14:m>
                   <m:oMath xmlns:m="http://schemas.openxmlformats.org/officeDocument/2006/math">
@@ -13296,7 +16064,7 @@
             </p:txBody>
           </p:sp>
         </mc:Choice>
-        <mc:Fallback xmlns="">
+        <mc:Fallback>
           <p:sp>
             <p:nvSpPr>
               <p:cNvPr id="5" name="CasellaDiTesto 4">
@@ -13456,6 +16224,144 @@
           </a:prstGeom>
         </p:spPr>
       </p:pic>
+      <p:sp>
+        <p:nvSpPr>
+          <p:cNvPr id="6" name="Segnaposto data 3">
+            <a:extLst>
+              <a:ext uri="{FF2B5EF4-FFF2-40B4-BE49-F238E27FC236}">
+                <a16:creationId xmlns:a16="http://schemas.microsoft.com/office/drawing/2014/main" id="{38F6EE5D-77D9-F448-BC50-2E996C438BC9}"/>
+              </a:ext>
+            </a:extLst>
+          </p:cNvPr>
+          <p:cNvSpPr>
+            <a:spLocks noGrp="1"/>
+          </p:cNvSpPr>
+          <p:nvPr>
+            <p:ph type="dt" sz="half" idx="10"/>
+          </p:nvPr>
+        </p:nvSpPr>
+        <p:spPr>
+          <a:xfrm>
+            <a:off x="838200" y="6356350"/>
+            <a:ext cx="2743200" cy="365125"/>
+          </a:xfrm>
+        </p:spPr>
+        <p:txBody>
+          <a:bodyPr/>
+          <a:lstStyle/>
+          <a:p>
+            <a:fld id="{4EF59023-6175-3944-979D-CFE35E3A8267}" type="datetime1">
+              <a:rPr lang="it-IT" smtClean="0"/>
+              <a:t>27/10/21</a:t>
+            </a:fld>
+            <a:endParaRPr lang="en-US" dirty="0"/>
+          </a:p>
+        </p:txBody>
+      </p:sp>
+      <p:sp>
+        <p:nvSpPr>
+          <p:cNvPr id="10" name="Segnaposto piè di pagina 4">
+            <a:extLst>
+              <a:ext uri="{FF2B5EF4-FFF2-40B4-BE49-F238E27FC236}">
+                <a16:creationId xmlns:a16="http://schemas.microsoft.com/office/drawing/2014/main" id="{EF14EF10-BEB1-384D-A6AB-034F29521330}"/>
+              </a:ext>
+            </a:extLst>
+          </p:cNvPr>
+          <p:cNvSpPr>
+            <a:spLocks noGrp="1"/>
+          </p:cNvSpPr>
+          <p:nvPr>
+            <p:ph type="ftr" sz="quarter" idx="11"/>
+          </p:nvPr>
+        </p:nvSpPr>
+        <p:spPr>
+          <a:xfrm>
+            <a:off x="4038600" y="6356350"/>
+            <a:ext cx="4114800" cy="365125"/>
+          </a:xfrm>
+        </p:spPr>
+        <p:txBody>
+          <a:bodyPr/>
+          <a:lstStyle/>
+          <a:p>
+            <a:r>
+              <a:rPr lang="en-US"/>
+              <a:t>Arianna Gasparri</a:t>
+            </a:r>
+            <a:endParaRPr lang="en-US" dirty="0"/>
+          </a:p>
+        </p:txBody>
+      </p:sp>
+      <p:sp>
+        <p:nvSpPr>
+          <p:cNvPr id="11" name="Segnaposto numero diapositiva 5">
+            <a:extLst>
+              <a:ext uri="{FF2B5EF4-FFF2-40B4-BE49-F238E27FC236}">
+                <a16:creationId xmlns:a16="http://schemas.microsoft.com/office/drawing/2014/main" id="{187C42DF-AC11-0148-A869-BAECC1EDB5F6}"/>
+              </a:ext>
+            </a:extLst>
+          </p:cNvPr>
+          <p:cNvSpPr>
+            <a:spLocks noGrp="1"/>
+          </p:cNvSpPr>
+          <p:nvPr>
+            <p:ph type="sldNum" sz="quarter" idx="12"/>
+          </p:nvPr>
+        </p:nvSpPr>
+        <p:spPr>
+          <a:xfrm>
+            <a:off x="8610600" y="6356350"/>
+            <a:ext cx="2743200" cy="365125"/>
+          </a:xfrm>
+        </p:spPr>
+        <p:txBody>
+          <a:bodyPr/>
+          <a:lstStyle/>
+          <a:p>
+            <a:fld id="{6D22F896-40B5-4ADD-8801-0D06FADFA095}" type="slidenum">
+              <a:rPr lang="en-US" smtClean="0"/>
+              <a:t>6</a:t>
+            </a:fld>
+            <a:endParaRPr lang="en-US" dirty="0"/>
+          </a:p>
+        </p:txBody>
+      </p:sp>
+      <p:pic>
+        <p:nvPicPr>
+          <p:cNvPr id="12" name="Immagine 11">
+            <a:extLst>
+              <a:ext uri="{FF2B5EF4-FFF2-40B4-BE49-F238E27FC236}">
+                <a16:creationId xmlns:a16="http://schemas.microsoft.com/office/drawing/2014/main" id="{970A1B8C-F133-CF47-AD17-474AB28A018F}"/>
+              </a:ext>
+            </a:extLst>
+          </p:cNvPr>
+          <p:cNvPicPr>
+            <a:picLocks noChangeAspect="1"/>
+          </p:cNvPicPr>
+          <p:nvPr/>
+        </p:nvPicPr>
+        <p:blipFill>
+          <a:blip r:embed="rId5" cstate="print">
+            <a:extLst>
+              <a:ext uri="{28A0092B-C50C-407E-A947-70E740481C1C}">
+                <a14:useLocalDpi xmlns:a14="http://schemas.microsoft.com/office/drawing/2010/main" val="0"/>
+              </a:ext>
+            </a:extLst>
+          </a:blip>
+          <a:stretch>
+            <a:fillRect/>
+          </a:stretch>
+        </p:blipFill>
+        <p:spPr>
+          <a:xfrm>
+            <a:off x="241420" y="265431"/>
+            <a:ext cx="571500" cy="518160"/>
+          </a:xfrm>
+          <a:prstGeom prst="rect">
+            <a:avLst/>
+          </a:prstGeom>
+        </p:spPr>
+      </p:pic>
     </p:spTree>
     <p:extLst>
       <p:ext uri="{BB962C8B-B14F-4D97-AF65-F5344CB8AC3E}">
@@ -13905,6 +16811,144 @@
           </a:p>
         </p:txBody>
       </p:sp>
+      <p:sp>
+        <p:nvSpPr>
+          <p:cNvPr id="14" name="Segnaposto data 3">
+            <a:extLst>
+              <a:ext uri="{FF2B5EF4-FFF2-40B4-BE49-F238E27FC236}">
+                <a16:creationId xmlns:a16="http://schemas.microsoft.com/office/drawing/2014/main" id="{3E166D57-1629-0B40-8A51-1F1D5258E3CA}"/>
+              </a:ext>
+            </a:extLst>
+          </p:cNvPr>
+          <p:cNvSpPr>
+            <a:spLocks noGrp="1"/>
+          </p:cNvSpPr>
+          <p:nvPr>
+            <p:ph type="dt" sz="half" idx="10"/>
+          </p:nvPr>
+        </p:nvSpPr>
+        <p:spPr>
+          <a:xfrm>
+            <a:off x="838200" y="6356350"/>
+            <a:ext cx="2743200" cy="365125"/>
+          </a:xfrm>
+        </p:spPr>
+        <p:txBody>
+          <a:bodyPr/>
+          <a:lstStyle/>
+          <a:p>
+            <a:fld id="{4EF59023-6175-3944-979D-CFE35E3A8267}" type="datetime1">
+              <a:rPr lang="it-IT" smtClean="0"/>
+              <a:t>27/10/21</a:t>
+            </a:fld>
+            <a:endParaRPr lang="en-US" dirty="0"/>
+          </a:p>
+        </p:txBody>
+      </p:sp>
+      <p:sp>
+        <p:nvSpPr>
+          <p:cNvPr id="15" name="Segnaposto piè di pagina 4">
+            <a:extLst>
+              <a:ext uri="{FF2B5EF4-FFF2-40B4-BE49-F238E27FC236}">
+                <a16:creationId xmlns:a16="http://schemas.microsoft.com/office/drawing/2014/main" id="{0CDCD4B5-8D93-5549-8C75-6BF85D8AEF0F}"/>
+              </a:ext>
+            </a:extLst>
+          </p:cNvPr>
+          <p:cNvSpPr>
+            <a:spLocks noGrp="1"/>
+          </p:cNvSpPr>
+          <p:nvPr>
+            <p:ph type="ftr" sz="quarter" idx="11"/>
+          </p:nvPr>
+        </p:nvSpPr>
+        <p:spPr>
+          <a:xfrm>
+            <a:off x="4038600" y="6356350"/>
+            <a:ext cx="4114800" cy="365125"/>
+          </a:xfrm>
+        </p:spPr>
+        <p:txBody>
+          <a:bodyPr/>
+          <a:lstStyle/>
+          <a:p>
+            <a:r>
+              <a:rPr lang="en-US"/>
+              <a:t>Arianna Gasparri</a:t>
+            </a:r>
+            <a:endParaRPr lang="en-US" dirty="0"/>
+          </a:p>
+        </p:txBody>
+      </p:sp>
+      <p:sp>
+        <p:nvSpPr>
+          <p:cNvPr id="16" name="Segnaposto numero diapositiva 5">
+            <a:extLst>
+              <a:ext uri="{FF2B5EF4-FFF2-40B4-BE49-F238E27FC236}">
+                <a16:creationId xmlns:a16="http://schemas.microsoft.com/office/drawing/2014/main" id="{3D8CB778-5B77-A843-A62B-74D4FE62DD72}"/>
+              </a:ext>
+            </a:extLst>
+          </p:cNvPr>
+          <p:cNvSpPr>
+            <a:spLocks noGrp="1"/>
+          </p:cNvSpPr>
+          <p:nvPr>
+            <p:ph type="sldNum" sz="quarter" idx="12"/>
+          </p:nvPr>
+        </p:nvSpPr>
+        <p:spPr>
+          <a:xfrm>
+            <a:off x="8610600" y="6356350"/>
+            <a:ext cx="2743200" cy="365125"/>
+          </a:xfrm>
+        </p:spPr>
+        <p:txBody>
+          <a:bodyPr/>
+          <a:lstStyle/>
+          <a:p>
+            <a:fld id="{6D22F896-40B5-4ADD-8801-0D06FADFA095}" type="slidenum">
+              <a:rPr lang="en-US" smtClean="0"/>
+              <a:t>7</a:t>
+            </a:fld>
+            <a:endParaRPr lang="en-US" dirty="0"/>
+          </a:p>
+        </p:txBody>
+      </p:sp>
+      <p:pic>
+        <p:nvPicPr>
+          <p:cNvPr id="17" name="Immagine 16">
+            <a:extLst>
+              <a:ext uri="{FF2B5EF4-FFF2-40B4-BE49-F238E27FC236}">
+                <a16:creationId xmlns:a16="http://schemas.microsoft.com/office/drawing/2014/main" id="{64F6139B-9AA2-4944-9E7D-EEB60ABEF8B4}"/>
+              </a:ext>
+            </a:extLst>
+          </p:cNvPr>
+          <p:cNvPicPr>
+            <a:picLocks noChangeAspect="1"/>
+          </p:cNvPicPr>
+          <p:nvPr/>
+        </p:nvPicPr>
+        <p:blipFill>
+          <a:blip r:embed="rId5" cstate="print">
+            <a:extLst>
+              <a:ext uri="{28A0092B-C50C-407E-A947-70E740481C1C}">
+                <a14:useLocalDpi xmlns:a14="http://schemas.microsoft.com/office/drawing/2010/main" val="0"/>
+              </a:ext>
+            </a:extLst>
+          </a:blip>
+          <a:stretch>
+            <a:fillRect/>
+          </a:stretch>
+        </p:blipFill>
+        <p:spPr>
+          <a:xfrm>
+            <a:off x="241420" y="265431"/>
+            <a:ext cx="571500" cy="518160"/>
+          </a:xfrm>
+          <a:prstGeom prst="rect">
+            <a:avLst/>
+          </a:prstGeom>
+        </p:spPr>
+      </p:pic>
     </p:spTree>
     <p:extLst>
       <p:ext uri="{BB962C8B-B14F-4D97-AF65-F5344CB8AC3E}">
@@ -14538,6 +17582,144 @@
           </a:prstGeom>
         </p:spPr>
       </p:pic>
+      <p:sp>
+        <p:nvSpPr>
+          <p:cNvPr id="6" name="Segnaposto data 3">
+            <a:extLst>
+              <a:ext uri="{FF2B5EF4-FFF2-40B4-BE49-F238E27FC236}">
+                <a16:creationId xmlns:a16="http://schemas.microsoft.com/office/drawing/2014/main" id="{395D4D99-6CC3-B948-BA90-D637513919B0}"/>
+              </a:ext>
+            </a:extLst>
+          </p:cNvPr>
+          <p:cNvSpPr>
+            <a:spLocks noGrp="1"/>
+          </p:cNvSpPr>
+          <p:nvPr>
+            <p:ph type="dt" sz="half" idx="10"/>
+          </p:nvPr>
+        </p:nvSpPr>
+        <p:spPr>
+          <a:xfrm>
+            <a:off x="838200" y="6356350"/>
+            <a:ext cx="2743200" cy="365125"/>
+          </a:xfrm>
+        </p:spPr>
+        <p:txBody>
+          <a:bodyPr/>
+          <a:lstStyle/>
+          <a:p>
+            <a:fld id="{4EF59023-6175-3944-979D-CFE35E3A8267}" type="datetime1">
+              <a:rPr lang="it-IT" smtClean="0"/>
+              <a:t>27/10/21</a:t>
+            </a:fld>
+            <a:endParaRPr lang="en-US" dirty="0"/>
+          </a:p>
+        </p:txBody>
+      </p:sp>
+      <p:sp>
+        <p:nvSpPr>
+          <p:cNvPr id="7" name="Segnaposto piè di pagina 4">
+            <a:extLst>
+              <a:ext uri="{FF2B5EF4-FFF2-40B4-BE49-F238E27FC236}">
+                <a16:creationId xmlns:a16="http://schemas.microsoft.com/office/drawing/2014/main" id="{B1278691-0DCC-F94E-876D-F4F9488EAA19}"/>
+              </a:ext>
+            </a:extLst>
+          </p:cNvPr>
+          <p:cNvSpPr>
+            <a:spLocks noGrp="1"/>
+          </p:cNvSpPr>
+          <p:nvPr>
+            <p:ph type="ftr" sz="quarter" idx="11"/>
+          </p:nvPr>
+        </p:nvSpPr>
+        <p:spPr>
+          <a:xfrm>
+            <a:off x="4038600" y="6356350"/>
+            <a:ext cx="4114800" cy="365125"/>
+          </a:xfrm>
+        </p:spPr>
+        <p:txBody>
+          <a:bodyPr/>
+          <a:lstStyle/>
+          <a:p>
+            <a:r>
+              <a:rPr lang="en-US"/>
+              <a:t>Arianna Gasparri</a:t>
+            </a:r>
+            <a:endParaRPr lang="en-US" dirty="0"/>
+          </a:p>
+        </p:txBody>
+      </p:sp>
+      <p:sp>
+        <p:nvSpPr>
+          <p:cNvPr id="8" name="Segnaposto numero diapositiva 5">
+            <a:extLst>
+              <a:ext uri="{FF2B5EF4-FFF2-40B4-BE49-F238E27FC236}">
+                <a16:creationId xmlns:a16="http://schemas.microsoft.com/office/drawing/2014/main" id="{B960D371-878D-3644-B57D-4B28C824C92F}"/>
+              </a:ext>
+            </a:extLst>
+          </p:cNvPr>
+          <p:cNvSpPr>
+            <a:spLocks noGrp="1"/>
+          </p:cNvSpPr>
+          <p:nvPr>
+            <p:ph type="sldNum" sz="quarter" idx="12"/>
+          </p:nvPr>
+        </p:nvSpPr>
+        <p:spPr>
+          <a:xfrm>
+            <a:off x="8610600" y="6356350"/>
+            <a:ext cx="2743200" cy="365125"/>
+          </a:xfrm>
+        </p:spPr>
+        <p:txBody>
+          <a:bodyPr/>
+          <a:lstStyle/>
+          <a:p>
+            <a:fld id="{6D22F896-40B5-4ADD-8801-0D06FADFA095}" type="slidenum">
+              <a:rPr lang="en-US" smtClean="0"/>
+              <a:t>8</a:t>
+            </a:fld>
+            <a:endParaRPr lang="en-US" dirty="0"/>
+          </a:p>
+        </p:txBody>
+      </p:sp>
+      <p:pic>
+        <p:nvPicPr>
+          <p:cNvPr id="9" name="Immagine 8">
+            <a:extLst>
+              <a:ext uri="{FF2B5EF4-FFF2-40B4-BE49-F238E27FC236}">
+                <a16:creationId xmlns:a16="http://schemas.microsoft.com/office/drawing/2014/main" id="{1E8BF8B2-B066-144E-B720-811B674331B1}"/>
+              </a:ext>
+            </a:extLst>
+          </p:cNvPr>
+          <p:cNvPicPr>
+            <a:picLocks noChangeAspect="1"/>
+          </p:cNvPicPr>
+          <p:nvPr/>
+        </p:nvPicPr>
+        <p:blipFill>
+          <a:blip r:embed="rId4" cstate="print">
+            <a:extLst>
+              <a:ext uri="{28A0092B-C50C-407E-A947-70E740481C1C}">
+                <a14:useLocalDpi xmlns:a14="http://schemas.microsoft.com/office/drawing/2010/main" val="0"/>
+              </a:ext>
+            </a:extLst>
+          </a:blip>
+          <a:stretch>
+            <a:fillRect/>
+          </a:stretch>
+        </p:blipFill>
+        <p:spPr>
+          <a:xfrm>
+            <a:off x="241420" y="265431"/>
+            <a:ext cx="571500" cy="518160"/>
+          </a:xfrm>
+          <a:prstGeom prst="rect">
+            <a:avLst/>
+          </a:prstGeom>
+        </p:spPr>
+      </p:pic>
     </p:spTree>
     <p:extLst>
       <p:ext uri="{BB962C8B-B14F-4D97-AF65-F5344CB8AC3E}">
@@ -14763,6 +17945,144 @@
           <a:xfrm>
             <a:off x="6859814" y="3913253"/>
             <a:ext cx="3175000" cy="1587500"/>
+          </a:xfrm>
+          <a:prstGeom prst="rect">
+            <a:avLst/>
+          </a:prstGeom>
+        </p:spPr>
+      </p:pic>
+      <p:sp>
+        <p:nvSpPr>
+          <p:cNvPr id="8" name="Segnaposto data 3">
+            <a:extLst>
+              <a:ext uri="{FF2B5EF4-FFF2-40B4-BE49-F238E27FC236}">
+                <a16:creationId xmlns:a16="http://schemas.microsoft.com/office/drawing/2014/main" id="{3E7C4031-113F-EC4F-AE0C-F6023746B0DB}"/>
+              </a:ext>
+            </a:extLst>
+          </p:cNvPr>
+          <p:cNvSpPr>
+            <a:spLocks noGrp="1"/>
+          </p:cNvSpPr>
+          <p:nvPr>
+            <p:ph type="dt" sz="half" idx="10"/>
+          </p:nvPr>
+        </p:nvSpPr>
+        <p:spPr>
+          <a:xfrm>
+            <a:off x="838200" y="6356350"/>
+            <a:ext cx="2743200" cy="365125"/>
+          </a:xfrm>
+        </p:spPr>
+        <p:txBody>
+          <a:bodyPr/>
+          <a:lstStyle/>
+          <a:p>
+            <a:fld id="{4EF59023-6175-3944-979D-CFE35E3A8267}" type="datetime1">
+              <a:rPr lang="it-IT" smtClean="0"/>
+              <a:t>27/10/21</a:t>
+            </a:fld>
+            <a:endParaRPr lang="en-US" dirty="0"/>
+          </a:p>
+        </p:txBody>
+      </p:sp>
+      <p:sp>
+        <p:nvSpPr>
+          <p:cNvPr id="9" name="Segnaposto piè di pagina 4">
+            <a:extLst>
+              <a:ext uri="{FF2B5EF4-FFF2-40B4-BE49-F238E27FC236}">
+                <a16:creationId xmlns:a16="http://schemas.microsoft.com/office/drawing/2014/main" id="{7A03C511-D48B-EE45-9B4E-BF99CAC98449}"/>
+              </a:ext>
+            </a:extLst>
+          </p:cNvPr>
+          <p:cNvSpPr>
+            <a:spLocks noGrp="1"/>
+          </p:cNvSpPr>
+          <p:nvPr>
+            <p:ph type="ftr" sz="quarter" idx="11"/>
+          </p:nvPr>
+        </p:nvSpPr>
+        <p:spPr>
+          <a:xfrm>
+            <a:off x="4038600" y="6356350"/>
+            <a:ext cx="4114800" cy="365125"/>
+          </a:xfrm>
+        </p:spPr>
+        <p:txBody>
+          <a:bodyPr/>
+          <a:lstStyle/>
+          <a:p>
+            <a:r>
+              <a:rPr lang="en-US"/>
+              <a:t>Arianna Gasparri</a:t>
+            </a:r>
+            <a:endParaRPr lang="en-US" dirty="0"/>
+          </a:p>
+        </p:txBody>
+      </p:sp>
+      <p:sp>
+        <p:nvSpPr>
+          <p:cNvPr id="10" name="Segnaposto numero diapositiva 5">
+            <a:extLst>
+              <a:ext uri="{FF2B5EF4-FFF2-40B4-BE49-F238E27FC236}">
+                <a16:creationId xmlns:a16="http://schemas.microsoft.com/office/drawing/2014/main" id="{A9C1C722-7DE2-BA4B-A28E-07524601EB93}"/>
+              </a:ext>
+            </a:extLst>
+          </p:cNvPr>
+          <p:cNvSpPr>
+            <a:spLocks noGrp="1"/>
+          </p:cNvSpPr>
+          <p:nvPr>
+            <p:ph type="sldNum" sz="quarter" idx="12"/>
+          </p:nvPr>
+        </p:nvSpPr>
+        <p:spPr>
+          <a:xfrm>
+            <a:off x="8610600" y="6356350"/>
+            <a:ext cx="2743200" cy="365125"/>
+          </a:xfrm>
+        </p:spPr>
+        <p:txBody>
+          <a:bodyPr/>
+          <a:lstStyle/>
+          <a:p>
+            <a:fld id="{6D22F896-40B5-4ADD-8801-0D06FADFA095}" type="slidenum">
+              <a:rPr lang="en-US" smtClean="0"/>
+              <a:t>9</a:t>
+            </a:fld>
+            <a:endParaRPr lang="en-US" dirty="0"/>
+          </a:p>
+        </p:txBody>
+      </p:sp>
+      <p:pic>
+        <p:nvPicPr>
+          <p:cNvPr id="11" name="Immagine 10">
+            <a:extLst>
+              <a:ext uri="{FF2B5EF4-FFF2-40B4-BE49-F238E27FC236}">
+                <a16:creationId xmlns:a16="http://schemas.microsoft.com/office/drawing/2014/main" id="{49AD5853-91D4-B342-B8E7-425741D7C4F3}"/>
+              </a:ext>
+            </a:extLst>
+          </p:cNvPr>
+          <p:cNvPicPr>
+            <a:picLocks noChangeAspect="1"/>
+          </p:cNvPicPr>
+          <p:nvPr/>
+        </p:nvPicPr>
+        <p:blipFill>
+          <a:blip r:embed="rId5" cstate="print">
+            <a:extLst>
+              <a:ext uri="{28A0092B-C50C-407E-A947-70E740481C1C}">
+                <a14:useLocalDpi xmlns:a14="http://schemas.microsoft.com/office/drawing/2010/main" val="0"/>
+              </a:ext>
+            </a:extLst>
+          </a:blip>
+          <a:stretch>
+            <a:fillRect/>
+          </a:stretch>
+        </p:blipFill>
+        <p:spPr>
+          <a:xfrm>
+            <a:off x="241420" y="265431"/>
+            <a:ext cx="571500" cy="518160"/>
           </a:xfrm>
           <a:prstGeom prst="rect">
             <a:avLst/>

</xml_diff>

<commit_message>
Aggiunta slide sul confronto tra controllori per Tavola1 nella presentazione
</commit_message>
<xml_diff>
--- a/Relazione/Presentazione.pptx
+++ b/Relazione/Presentazione.pptx
@@ -22,15 +22,17 @@
     <p:sldId id="267" r:id="rId16"/>
     <p:sldId id="268" r:id="rId17"/>
     <p:sldId id="269" r:id="rId18"/>
-    <p:sldId id="274" r:id="rId19"/>
-    <p:sldId id="273" r:id="rId20"/>
-    <p:sldId id="275" r:id="rId21"/>
-    <p:sldId id="276" r:id="rId22"/>
-    <p:sldId id="277" r:id="rId23"/>
-    <p:sldId id="278" r:id="rId24"/>
-    <p:sldId id="279" r:id="rId25"/>
-    <p:sldId id="280" r:id="rId26"/>
-    <p:sldId id="281" r:id="rId27"/>
+    <p:sldId id="282" r:id="rId19"/>
+    <p:sldId id="283" r:id="rId20"/>
+    <p:sldId id="274" r:id="rId21"/>
+    <p:sldId id="273" r:id="rId22"/>
+    <p:sldId id="275" r:id="rId23"/>
+    <p:sldId id="276" r:id="rId24"/>
+    <p:sldId id="277" r:id="rId25"/>
+    <p:sldId id="278" r:id="rId26"/>
+    <p:sldId id="279" r:id="rId27"/>
+    <p:sldId id="280" r:id="rId28"/>
+    <p:sldId id="281" r:id="rId29"/>
   </p:sldIdLst>
   <p:sldSz cx="12192000" cy="6858000"/>
   <p:notesSz cx="6858000" cy="9144000"/>
@@ -284,7 +286,7 @@
           <a:p>
             <a:fld id="{27153579-3A4D-BB42-BD49-BB0F80A81A61}" type="datetimeFigureOut">
               <a:rPr lang="it-IT" smtClean="0"/>
-              <a:t>27/10/21</a:t>
+              <a:t>02/11/21</a:t>
             </a:fld>
             <a:endParaRPr lang="it-IT"/>
           </a:p>
@@ -457,7 +459,7 @@
           <a:p>
             <a:fld id="{27153579-3A4D-BB42-BD49-BB0F80A81A61}" type="datetimeFigureOut">
               <a:rPr lang="it-IT" smtClean="0"/>
-              <a:t>27/10/21</a:t>
+              <a:t>02/11/21</a:t>
             </a:fld>
             <a:endParaRPr lang="it-IT"/>
           </a:p>
@@ -640,7 +642,7 @@
           <a:p>
             <a:fld id="{27153579-3A4D-BB42-BD49-BB0F80A81A61}" type="datetimeFigureOut">
               <a:rPr lang="it-IT" smtClean="0"/>
-              <a:t>27/10/21</a:t>
+              <a:t>02/11/21</a:t>
             </a:fld>
             <a:endParaRPr lang="it-IT"/>
           </a:p>
@@ -813,7 +815,7 @@
           <a:p>
             <a:fld id="{27153579-3A4D-BB42-BD49-BB0F80A81A61}" type="datetimeFigureOut">
               <a:rPr lang="it-IT" smtClean="0"/>
-              <a:t>27/10/21</a:t>
+              <a:t>02/11/21</a:t>
             </a:fld>
             <a:endParaRPr lang="it-IT"/>
           </a:p>
@@ -1091,7 +1093,7 @@
           <a:p>
             <a:fld id="{27153579-3A4D-BB42-BD49-BB0F80A81A61}" type="datetimeFigureOut">
               <a:rPr lang="it-IT" smtClean="0"/>
-              <a:t>27/10/21</a:t>
+              <a:t>02/11/21</a:t>
             </a:fld>
             <a:endParaRPr lang="it-IT"/>
           </a:p>
@@ -1306,7 +1308,7 @@
           <a:p>
             <a:fld id="{27153579-3A4D-BB42-BD49-BB0F80A81A61}" type="datetimeFigureOut">
               <a:rPr lang="it-IT" smtClean="0"/>
-              <a:t>27/10/21</a:t>
+              <a:t>02/11/21</a:t>
             </a:fld>
             <a:endParaRPr lang="it-IT"/>
           </a:p>
@@ -1674,7 +1676,7 @@
           <a:p>
             <a:fld id="{27153579-3A4D-BB42-BD49-BB0F80A81A61}" type="datetimeFigureOut">
               <a:rPr lang="it-IT" smtClean="0"/>
-              <a:t>27/10/21</a:t>
+              <a:t>02/11/21</a:t>
             </a:fld>
             <a:endParaRPr lang="it-IT"/>
           </a:p>
@@ -1815,7 +1817,7 @@
           <a:p>
             <a:fld id="{27153579-3A4D-BB42-BD49-BB0F80A81A61}" type="datetimeFigureOut">
               <a:rPr lang="it-IT" smtClean="0"/>
-              <a:t>27/10/21</a:t>
+              <a:t>02/11/21</a:t>
             </a:fld>
             <a:endParaRPr lang="it-IT"/>
           </a:p>
@@ -1928,7 +1930,7 @@
           <a:p>
             <a:fld id="{27153579-3A4D-BB42-BD49-BB0F80A81A61}" type="datetimeFigureOut">
               <a:rPr lang="it-IT" smtClean="0"/>
-              <a:t>27/10/21</a:t>
+              <a:t>02/11/21</a:t>
             </a:fld>
             <a:endParaRPr lang="it-IT"/>
           </a:p>
@@ -2217,7 +2219,7 @@
           <a:p>
             <a:fld id="{27153579-3A4D-BB42-BD49-BB0F80A81A61}" type="datetimeFigureOut">
               <a:rPr lang="it-IT" smtClean="0"/>
-              <a:t>27/10/21</a:t>
+              <a:t>02/11/21</a:t>
             </a:fld>
             <a:endParaRPr lang="it-IT"/>
           </a:p>
@@ -2508,7 +2510,7 @@
           <a:p>
             <a:fld id="{27153579-3A4D-BB42-BD49-BB0F80A81A61}" type="datetimeFigureOut">
               <a:rPr lang="it-IT" smtClean="0"/>
-              <a:t>27/10/21</a:t>
+              <a:t>02/11/21</a:t>
             </a:fld>
             <a:endParaRPr lang="it-IT"/>
           </a:p>
@@ -2724,7 +2726,7 @@
           <a:p>
             <a:fld id="{27153579-3A4D-BB42-BD49-BB0F80A81A61}" type="datetimeFigureOut">
               <a:rPr lang="it-IT" smtClean="0"/>
-              <a:t>27/10/21</a:t>
+              <a:t>02/11/21</a:t>
             </a:fld>
             <a:endParaRPr lang="it-IT"/>
           </a:p>
@@ -3482,7 +3484,7 @@
           <a:p>
             <a:fld id="{4EF59023-6175-3944-979D-CFE35E3A8267}" type="datetime1">
               <a:rPr lang="it-IT" smtClean="0"/>
-              <a:t>27/10/21</a:t>
+              <a:t>02/11/21</a:t>
             </a:fld>
             <a:endParaRPr lang="en-US" dirty="0"/>
           </a:p>
@@ -4261,7 +4263,7 @@
           <a:p>
             <a:fld id="{4EF59023-6175-3944-979D-CFE35E3A8267}" type="datetime1">
               <a:rPr lang="it-IT" smtClean="0"/>
-              <a:t>27/10/21</a:t>
+              <a:t>02/11/21</a:t>
             </a:fld>
             <a:endParaRPr lang="en-US" dirty="0"/>
           </a:p>
@@ -4646,7 +4648,7 @@
           <a:p>
             <a:fld id="{4EF59023-6175-3944-979D-CFE35E3A8267}" type="datetime1">
               <a:rPr lang="it-IT" smtClean="0"/>
-              <a:t>27/10/21</a:t>
+              <a:t>02/11/21</a:t>
             </a:fld>
             <a:endParaRPr lang="en-US" dirty="0"/>
           </a:p>
@@ -4974,7 +4976,7 @@
           <a:p>
             <a:fld id="{4EF59023-6175-3944-979D-CFE35E3A8267}" type="datetime1">
               <a:rPr lang="it-IT" smtClean="0"/>
-              <a:t>27/10/21</a:t>
+              <a:t>02/11/21</a:t>
             </a:fld>
             <a:endParaRPr lang="en-US" dirty="0"/>
           </a:p>
@@ -5761,7 +5763,7 @@
           <a:p>
             <a:fld id="{4EF59023-6175-3944-979D-CFE35E3A8267}" type="datetime1">
               <a:rPr lang="it-IT" smtClean="0"/>
-              <a:t>27/10/21</a:t>
+              <a:t>02/11/21</a:t>
             </a:fld>
             <a:endParaRPr lang="en-US" dirty="0"/>
           </a:p>
@@ -6296,7 +6298,7 @@
           <a:p>
             <a:fld id="{4EF59023-6175-3944-979D-CFE35E3A8267}" type="datetime1">
               <a:rPr lang="it-IT" smtClean="0"/>
-              <a:t>27/10/21</a:t>
+              <a:t>02/11/21</a:t>
             </a:fld>
             <a:endParaRPr lang="en-US" dirty="0"/>
           </a:p>
@@ -6602,7 +6604,7 @@
           <a:p>
             <a:fld id="{4EF59023-6175-3944-979D-CFE35E3A8267}" type="datetime1">
               <a:rPr lang="it-IT" smtClean="0"/>
-              <a:t>27/10/21</a:t>
+              <a:t>02/11/21</a:t>
             </a:fld>
             <a:endParaRPr lang="en-US" dirty="0"/>
           </a:p>
@@ -7186,7 +7188,7 @@
           <a:p>
             <a:fld id="{4EF59023-6175-3944-979D-CFE35E3A8267}" type="datetime1">
               <a:rPr lang="it-IT" smtClean="0"/>
-              <a:t>27/10/21</a:t>
+              <a:t>02/11/21</a:t>
             </a:fld>
             <a:endParaRPr lang="en-US" dirty="0"/>
           </a:p>
@@ -7328,10 +7330,72 @@
       </p:grpSpPr>
       <p:sp>
         <p:nvSpPr>
-          <p:cNvPr id="2" name="Titolo 1">
-            <a:extLst>
-              <a:ext uri="{FF2B5EF4-FFF2-40B4-BE49-F238E27FC236}">
-                <a16:creationId xmlns:a16="http://schemas.microsoft.com/office/drawing/2014/main" id="{EC4DE27F-9EE0-A747-BF3B-EE0B89D62F48}"/>
+          <p:cNvPr id="5" name="Titolo 1">
+            <a:extLst>
+              <a:ext uri="{FF2B5EF4-FFF2-40B4-BE49-F238E27FC236}">
+                <a16:creationId xmlns:a16="http://schemas.microsoft.com/office/drawing/2014/main" id="{719936BE-0F9D-C74E-9E55-A7F2CE751F93}"/>
+              </a:ext>
+            </a:extLst>
+          </p:cNvPr>
+          <p:cNvSpPr txBox="1">
+            <a:spLocks/>
+          </p:cNvSpPr>
+          <p:nvPr/>
+        </p:nvSpPr>
+        <p:spPr>
+          <a:xfrm>
+            <a:off x="1524000" y="454393"/>
+            <a:ext cx="9144000" cy="1021230"/>
+          </a:xfrm>
+          <a:prstGeom prst="rect">
+            <a:avLst/>
+          </a:prstGeom>
+        </p:spPr>
+        <p:txBody>
+          <a:bodyPr vert="horz" lIns="91440" tIns="45720" rIns="91440" bIns="45720" rtlCol="0" anchor="ctr">
+            <a:normAutofit fontScale="85000" lnSpcReduction="20000"/>
+          </a:bodyPr>
+          <a:lstStyle>
+            <a:lvl1pPr algn="l" defTabSz="914400" rtl="0" eaLnBrk="1" latinLnBrk="0" hangingPunct="1">
+              <a:lnSpc>
+                <a:spcPct val="90000"/>
+              </a:lnSpc>
+              <a:spcBef>
+                <a:spcPct val="0"/>
+              </a:spcBef>
+              <a:buNone/>
+              <a:defRPr sz="4400" kern="1200">
+                <a:solidFill>
+                  <a:schemeClr val="tx1"/>
+                </a:solidFill>
+                <a:latin typeface="+mj-lt"/>
+                <a:ea typeface="+mj-ea"/>
+                <a:cs typeface="+mj-cs"/>
+              </a:defRPr>
+            </a:lvl1pPr>
+          </a:lstStyle>
+          <a:p>
+            <a:pPr algn="ctr"/>
+            <a:r>
+              <a:rPr lang="it-IT" sz="5200" dirty="0"/>
+              <a:t>Manipolatore di Stanford</a:t>
+            </a:r>
+          </a:p>
+          <a:p>
+            <a:pPr algn="ctr"/>
+            <a:r>
+              <a:rPr lang="it-IT" sz="3800" dirty="0"/>
+              <a:t>Confronto tra controllori</a:t>
+            </a:r>
+          </a:p>
+        </p:txBody>
+      </p:sp>
+      <p:sp>
+        <p:nvSpPr>
+          <p:cNvPr id="6" name="Segnaposto data 3">
+            <a:extLst>
+              <a:ext uri="{FF2B5EF4-FFF2-40B4-BE49-F238E27FC236}">
+                <a16:creationId xmlns:a16="http://schemas.microsoft.com/office/drawing/2014/main" id="{E31BE159-E7C8-C24F-9CBB-A7F601D7B4BC}"/>
               </a:ext>
             </a:extLst>
           </p:cNvPr>
@@ -7339,41 +7403,101 @@
             <a:spLocks noGrp="1"/>
           </p:cNvSpPr>
           <p:nvPr>
-            <p:ph type="ctrTitle"/>
+            <p:ph type="dt" sz="half" idx="10"/>
           </p:nvPr>
         </p:nvSpPr>
         <p:spPr>
           <a:xfrm>
-            <a:off x="1524000" y="454393"/>
-            <a:ext cx="9144000" cy="1021230"/>
+            <a:off x="838200" y="6356350"/>
+            <a:ext cx="2743200" cy="365125"/>
           </a:xfrm>
         </p:spPr>
         <p:txBody>
           <a:bodyPr/>
           <a:lstStyle/>
           <a:p>
-            <a:r>
-              <a:rPr lang="it-IT" dirty="0" err="1"/>
-              <a:t>Granty</a:t>
-            </a:r>
-            <a:r>
-              <a:rPr lang="it-IT" dirty="0"/>
-              <a:t> </a:t>
-            </a:r>
-            <a:r>
-              <a:rPr lang="it-IT" dirty="0" err="1"/>
-              <a:t>crane</a:t>
-            </a:r>
-            <a:endParaRPr lang="it-IT" dirty="0"/>
+            <a:fld id="{4EF59023-6175-3944-979D-CFE35E3A8267}" type="datetime1">
+              <a:rPr lang="it-IT" smtClean="0"/>
+              <a:t>02/11/21</a:t>
+            </a:fld>
+            <a:endParaRPr lang="en-US" dirty="0"/>
+          </a:p>
+        </p:txBody>
+      </p:sp>
+      <p:sp>
+        <p:nvSpPr>
+          <p:cNvPr id="7" name="Segnaposto piè di pagina 4">
+            <a:extLst>
+              <a:ext uri="{FF2B5EF4-FFF2-40B4-BE49-F238E27FC236}">
+                <a16:creationId xmlns:a16="http://schemas.microsoft.com/office/drawing/2014/main" id="{FB85E8B1-FEDB-9D4D-BEDC-B47C1654AEA9}"/>
+              </a:ext>
+            </a:extLst>
+          </p:cNvPr>
+          <p:cNvSpPr>
+            <a:spLocks noGrp="1"/>
+          </p:cNvSpPr>
+          <p:nvPr>
+            <p:ph type="ftr" sz="quarter" idx="11"/>
+          </p:nvPr>
+        </p:nvSpPr>
+        <p:spPr>
+          <a:xfrm>
+            <a:off x="4038600" y="6356350"/>
+            <a:ext cx="4114800" cy="365125"/>
+          </a:xfrm>
+        </p:spPr>
+        <p:txBody>
+          <a:bodyPr/>
+          <a:lstStyle/>
+          <a:p>
+            <a:r>
+              <a:rPr lang="en-US"/>
+              <a:t>Arianna Gasparri</a:t>
+            </a:r>
+            <a:endParaRPr lang="en-US" dirty="0"/>
+          </a:p>
+        </p:txBody>
+      </p:sp>
+      <p:sp>
+        <p:nvSpPr>
+          <p:cNvPr id="8" name="Segnaposto numero diapositiva 5">
+            <a:extLst>
+              <a:ext uri="{FF2B5EF4-FFF2-40B4-BE49-F238E27FC236}">
+                <a16:creationId xmlns:a16="http://schemas.microsoft.com/office/drawing/2014/main" id="{39627B88-FC50-354B-82EE-0494B9651314}"/>
+              </a:ext>
+            </a:extLst>
+          </p:cNvPr>
+          <p:cNvSpPr>
+            <a:spLocks noGrp="1"/>
+          </p:cNvSpPr>
+          <p:nvPr>
+            <p:ph type="sldNum" sz="quarter" idx="12"/>
+          </p:nvPr>
+        </p:nvSpPr>
+        <p:spPr>
+          <a:xfrm>
+            <a:off x="8610600" y="6356350"/>
+            <a:ext cx="2743200" cy="365125"/>
+          </a:xfrm>
+        </p:spPr>
+        <p:txBody>
+          <a:bodyPr/>
+          <a:lstStyle/>
+          <a:p>
+            <a:fld id="{6D22F896-40B5-4ADD-8801-0D06FADFA095}" type="slidenum">
+              <a:rPr lang="en-US" smtClean="0"/>
+              <a:t>18</a:t>
+            </a:fld>
+            <a:endParaRPr lang="en-US" dirty="0"/>
           </a:p>
         </p:txBody>
       </p:sp>
       <p:pic>
         <p:nvPicPr>
-          <p:cNvPr id="4" name="Immagine 3">
-            <a:extLst>
-              <a:ext uri="{FF2B5EF4-FFF2-40B4-BE49-F238E27FC236}">
-                <a16:creationId xmlns:a16="http://schemas.microsoft.com/office/drawing/2014/main" id="{96D82E7F-6103-A546-BCE8-2F5085DF3467}"/>
+          <p:cNvPr id="9" name="Immagine 8">
+            <a:extLst>
+              <a:ext uri="{FF2B5EF4-FFF2-40B4-BE49-F238E27FC236}">
+                <a16:creationId xmlns:a16="http://schemas.microsoft.com/office/drawing/2014/main" id="{53B4ECF9-C7E1-9548-8C2B-0D320A06911B}"/>
               </a:ext>
             </a:extLst>
           </p:cNvPr>
@@ -7383,178 +7507,33 @@
           <p:nvPr/>
         </p:nvPicPr>
         <p:blipFill>
-          <a:blip r:embed="rId2"/>
+          <a:blip r:embed="rId2" cstate="print">
+            <a:extLst>
+              <a:ext uri="{28A0092B-C50C-407E-A947-70E740481C1C}">
+                <a14:useLocalDpi xmlns:a14="http://schemas.microsoft.com/office/drawing/2010/main" val="0"/>
+              </a:ext>
+            </a:extLst>
+          </a:blip>
           <a:stretch>
             <a:fillRect/>
           </a:stretch>
         </p:blipFill>
         <p:spPr>
           <a:xfrm>
-            <a:off x="1524000" y="1475623"/>
-            <a:ext cx="3683000" cy="4089400"/>
+            <a:off x="241420" y="265431"/>
+            <a:ext cx="571500" cy="518160"/>
           </a:xfrm>
           <a:prstGeom prst="rect">
             <a:avLst/>
           </a:prstGeom>
         </p:spPr>
       </p:pic>
-      <p:sp>
-        <p:nvSpPr>
-          <p:cNvPr id="10" name="CasellaDiTesto 9">
-            <a:extLst>
-              <a:ext uri="{FF2B5EF4-FFF2-40B4-BE49-F238E27FC236}">
-                <a16:creationId xmlns:a16="http://schemas.microsoft.com/office/drawing/2014/main" id="{F46E9E04-607C-DB49-8EC7-C6CC7AC882D2}"/>
-              </a:ext>
-            </a:extLst>
-          </p:cNvPr>
-          <p:cNvSpPr txBox="1"/>
-          <p:nvPr/>
-        </p:nvSpPr>
-        <p:spPr>
-          <a:xfrm>
-            <a:off x="5410714" y="2227661"/>
-            <a:ext cx="5257286" cy="2585323"/>
-          </a:xfrm>
-          <a:prstGeom prst="rect">
-            <a:avLst/>
-          </a:prstGeom>
-          <a:noFill/>
-        </p:spPr>
-        <p:txBody>
-          <a:bodyPr wrap="square" rtlCol="0">
-            <a:spAutoFit/>
-          </a:bodyPr>
-          <a:lstStyle/>
-          <a:p>
-            <a:r>
-              <a:rPr lang="it-IT" dirty="0"/>
-              <a:t>Un modello di carro-ponte è rappresentato nella figura a fianco, assumendo che il carrello possa muoversi soltanto lungo la direzione del binario sul quale è posto, è ragionevole assumere che lo spostamento nella direzione perpendicolare al binario sia nullo e così anche l’angolo </a:t>
-            </a:r>
-            <a:r>
-              <a:rPr lang="it-IT" dirty="0" err="1"/>
-              <a:t>ɸ</a:t>
-            </a:r>
-            <a:r>
-              <a:rPr lang="it-IT" dirty="0"/>
-              <a:t>.</a:t>
-            </a:r>
-          </a:p>
-          <a:p>
-            <a:r>
-              <a:rPr lang="it-IT" dirty="0"/>
-              <a:t>Si assume che anche la forza sia diretta lungo la direzione del binario, riportando così il modello ad una sua semplificazione in 2D.</a:t>
-            </a:r>
-          </a:p>
-        </p:txBody>
-      </p:sp>
-      <p:sp>
-        <p:nvSpPr>
-          <p:cNvPr id="5" name="Segnaposto data 3">
-            <a:extLst>
-              <a:ext uri="{FF2B5EF4-FFF2-40B4-BE49-F238E27FC236}">
-                <a16:creationId xmlns:a16="http://schemas.microsoft.com/office/drawing/2014/main" id="{E482AEE9-99FE-5941-933D-546A9D875D94}"/>
-              </a:ext>
-            </a:extLst>
-          </p:cNvPr>
-          <p:cNvSpPr>
-            <a:spLocks noGrp="1"/>
-          </p:cNvSpPr>
-          <p:nvPr>
-            <p:ph type="dt" sz="half" idx="10"/>
-          </p:nvPr>
-        </p:nvSpPr>
-        <p:spPr>
-          <a:xfrm>
-            <a:off x="838200" y="6356350"/>
-            <a:ext cx="2743200" cy="365125"/>
-          </a:xfrm>
-        </p:spPr>
-        <p:txBody>
-          <a:bodyPr/>
-          <a:lstStyle/>
-          <a:p>
-            <a:fld id="{4EF59023-6175-3944-979D-CFE35E3A8267}" type="datetime1">
-              <a:rPr lang="it-IT" smtClean="0"/>
-              <a:t>27/10/21</a:t>
-            </a:fld>
-            <a:endParaRPr lang="en-US" dirty="0"/>
-          </a:p>
-        </p:txBody>
-      </p:sp>
-      <p:sp>
-        <p:nvSpPr>
-          <p:cNvPr id="6" name="Segnaposto piè di pagina 4">
-            <a:extLst>
-              <a:ext uri="{FF2B5EF4-FFF2-40B4-BE49-F238E27FC236}">
-                <a16:creationId xmlns:a16="http://schemas.microsoft.com/office/drawing/2014/main" id="{764284B5-3467-AE48-80D4-203ED67BF382}"/>
-              </a:ext>
-            </a:extLst>
-          </p:cNvPr>
-          <p:cNvSpPr>
-            <a:spLocks noGrp="1"/>
-          </p:cNvSpPr>
-          <p:nvPr>
-            <p:ph type="ftr" sz="quarter" idx="11"/>
-          </p:nvPr>
-        </p:nvSpPr>
-        <p:spPr>
-          <a:xfrm>
-            <a:off x="4038600" y="6356350"/>
-            <a:ext cx="4114800" cy="365125"/>
-          </a:xfrm>
-        </p:spPr>
-        <p:txBody>
-          <a:bodyPr/>
-          <a:lstStyle/>
-          <a:p>
-            <a:r>
-              <a:rPr lang="en-US"/>
-              <a:t>Arianna Gasparri</a:t>
-            </a:r>
-            <a:endParaRPr lang="en-US" dirty="0"/>
-          </a:p>
-        </p:txBody>
-      </p:sp>
-      <p:sp>
-        <p:nvSpPr>
-          <p:cNvPr id="7" name="Segnaposto numero diapositiva 5">
-            <a:extLst>
-              <a:ext uri="{FF2B5EF4-FFF2-40B4-BE49-F238E27FC236}">
-                <a16:creationId xmlns:a16="http://schemas.microsoft.com/office/drawing/2014/main" id="{19E6B972-3060-C34D-B468-73BD169952F1}"/>
-              </a:ext>
-            </a:extLst>
-          </p:cNvPr>
-          <p:cNvSpPr>
-            <a:spLocks noGrp="1"/>
-          </p:cNvSpPr>
-          <p:nvPr>
-            <p:ph type="sldNum" sz="quarter" idx="12"/>
-          </p:nvPr>
-        </p:nvSpPr>
-        <p:spPr>
-          <a:xfrm>
-            <a:off x="8610600" y="6356350"/>
-            <a:ext cx="2743200" cy="365125"/>
-          </a:xfrm>
-        </p:spPr>
-        <p:txBody>
-          <a:bodyPr/>
-          <a:lstStyle/>
-          <a:p>
-            <a:fld id="{6D22F896-40B5-4ADD-8801-0D06FADFA095}" type="slidenum">
-              <a:rPr lang="en-US" smtClean="0"/>
-              <a:t>18</a:t>
-            </a:fld>
-            <a:endParaRPr lang="en-US" dirty="0"/>
-          </a:p>
-        </p:txBody>
-      </p:sp>
       <p:pic>
         <p:nvPicPr>
-          <p:cNvPr id="8" name="Immagine 7">
-            <a:extLst>
-              <a:ext uri="{FF2B5EF4-FFF2-40B4-BE49-F238E27FC236}">
-                <a16:creationId xmlns:a16="http://schemas.microsoft.com/office/drawing/2014/main" id="{6C031ED0-BD61-034F-8985-0C2000CE0D92}"/>
+          <p:cNvPr id="12" name="Immagine 11">
+            <a:extLst>
+              <a:ext uri="{FF2B5EF4-FFF2-40B4-BE49-F238E27FC236}">
+                <a16:creationId xmlns:a16="http://schemas.microsoft.com/office/drawing/2014/main" id="{08E706B6-E40E-8542-886B-8D1899167A60}"/>
               </a:ext>
             </a:extLst>
           </p:cNvPr>
@@ -7564,21 +7543,15 @@
           <p:nvPr/>
         </p:nvPicPr>
         <p:blipFill>
-          <a:blip r:embed="rId3" cstate="print">
-            <a:extLst>
-              <a:ext uri="{28A0092B-C50C-407E-A947-70E740481C1C}">
-                <a14:useLocalDpi xmlns:a14="http://schemas.microsoft.com/office/drawing/2010/main" val="0"/>
-              </a:ext>
-            </a:extLst>
-          </a:blip>
+          <a:blip r:embed="rId3"/>
           <a:stretch>
             <a:fillRect/>
           </a:stretch>
         </p:blipFill>
         <p:spPr>
           <a:xfrm>
-            <a:off x="241420" y="265431"/>
-            <a:ext cx="571500" cy="518160"/>
+            <a:off x="1219200" y="1475623"/>
+            <a:ext cx="9753600" cy="4777740"/>
           </a:xfrm>
           <a:prstGeom prst="rect">
             <a:avLst/>
@@ -7588,7 +7561,7 @@
     </p:spTree>
     <p:extLst>
       <p:ext uri="{BB962C8B-B14F-4D97-AF65-F5344CB8AC3E}">
-        <p14:creationId xmlns:p14="http://schemas.microsoft.com/office/powerpoint/2010/main" val="2508728585"/>
+        <p14:creationId xmlns:p14="http://schemas.microsoft.com/office/powerpoint/2010/main" val="3419258340"/>
       </p:ext>
     </p:extLst>
   </p:cSld>
@@ -7615,143 +7588,12 @@
           <a:chExt cx="0" cy="0"/>
         </a:xfrm>
       </p:grpSpPr>
-      <p:pic>
-        <p:nvPicPr>
-          <p:cNvPr id="5" name="Immagine 4">
-            <a:extLst>
-              <a:ext uri="{FF2B5EF4-FFF2-40B4-BE49-F238E27FC236}">
-                <a16:creationId xmlns:a16="http://schemas.microsoft.com/office/drawing/2014/main" id="{6B271FC1-9853-8B46-B074-A5E6D5A515AD}"/>
-              </a:ext>
-            </a:extLst>
-          </p:cNvPr>
-          <p:cNvPicPr>
-            <a:picLocks noChangeAspect="1"/>
-          </p:cNvPicPr>
-          <p:nvPr/>
-        </p:nvPicPr>
-        <p:blipFill>
-          <a:blip r:embed="rId2"/>
-          <a:stretch>
-            <a:fillRect/>
-          </a:stretch>
-        </p:blipFill>
-        <p:spPr>
-          <a:xfrm>
-            <a:off x="1714029" y="1475623"/>
-            <a:ext cx="4191943" cy="2667600"/>
-          </a:xfrm>
-          <a:prstGeom prst="rect">
-            <a:avLst/>
-          </a:prstGeom>
-        </p:spPr>
-      </p:pic>
-      <p:sp>
-        <p:nvSpPr>
-          <p:cNvPr id="6" name="CasellaDiTesto 5">
-            <a:extLst>
-              <a:ext uri="{FF2B5EF4-FFF2-40B4-BE49-F238E27FC236}">
-                <a16:creationId xmlns:a16="http://schemas.microsoft.com/office/drawing/2014/main" id="{11F4C9D8-CB26-E74E-B18E-7614421A6E93}"/>
-              </a:ext>
-            </a:extLst>
-          </p:cNvPr>
-          <p:cNvSpPr txBox="1"/>
-          <p:nvPr/>
-        </p:nvSpPr>
-        <p:spPr>
-          <a:xfrm>
-            <a:off x="1524000" y="4143223"/>
-            <a:ext cx="5531730" cy="1938992"/>
-          </a:xfrm>
-          <a:prstGeom prst="rect">
-            <a:avLst/>
-          </a:prstGeom>
-          <a:noFill/>
-        </p:spPr>
-        <p:txBody>
-          <a:bodyPr wrap="square" rtlCol="0">
-            <a:spAutoFit/>
-          </a:bodyPr>
-          <a:lstStyle/>
-          <a:p>
-            <a:r>
-              <a:rPr lang="it-IT" sz="2000" dirty="0"/>
-              <a:t>Parametri del modello:	l = 0.2 m</a:t>
-            </a:r>
-          </a:p>
-          <a:p>
-            <a:r>
-              <a:rPr lang="it-IT" sz="2000" dirty="0"/>
-              <a:t>			g = 9.81 m/s</a:t>
-            </a:r>
-            <a:r>
-              <a:rPr lang="it-IT" sz="2000" baseline="30000" dirty="0"/>
-              <a:t>2</a:t>
-            </a:r>
-          </a:p>
-          <a:p>
-            <a:r>
-              <a:rPr lang="it-IT" sz="2000" dirty="0"/>
-              <a:t>			M = 0.548069759 kg</a:t>
-            </a:r>
-          </a:p>
-          <a:p>
-            <a:r>
-              <a:rPr lang="it-IT" sz="2000" dirty="0"/>
-              <a:t>			m</a:t>
-            </a:r>
-            <a:r>
-              <a:rPr lang="it-IT" sz="2000" baseline="-25000" dirty="0"/>
-              <a:t>1</a:t>
-            </a:r>
-            <a:r>
-              <a:rPr lang="it-IT" sz="2000" dirty="0"/>
-              <a:t> = 0.088338025 kg</a:t>
-            </a:r>
-          </a:p>
-          <a:p>
-            <a:r>
-              <a:rPr lang="it-IT" sz="2000" dirty="0"/>
-              <a:t>			m</a:t>
-            </a:r>
-            <a:r>
-              <a:rPr lang="it-IT" sz="2000" baseline="-25000" dirty="0"/>
-              <a:t>2</a:t>
-            </a:r>
-            <a:r>
-              <a:rPr lang="it-IT" sz="2000" dirty="0"/>
-              <a:t> = 0.022245336 kg</a:t>
-            </a:r>
-          </a:p>
-          <a:p>
-            <a:r>
-              <a:rPr lang="it-IT" sz="2000" dirty="0"/>
-              <a:t>			b</a:t>
-            </a:r>
-            <a:r>
-              <a:rPr lang="it-IT" sz="2000" baseline="-25000" dirty="0"/>
-              <a:t>1</a:t>
-            </a:r>
-            <a:r>
-              <a:rPr lang="it-IT" sz="2000" dirty="0"/>
-              <a:t> = 0.1	b</a:t>
-            </a:r>
-            <a:r>
-              <a:rPr lang="it-IT" sz="2000" baseline="-25000" dirty="0"/>
-              <a:t>2</a:t>
-            </a:r>
-            <a:r>
-              <a:rPr lang="it-IT" sz="2000" dirty="0"/>
-              <a:t> = 0.5</a:t>
-            </a:r>
-          </a:p>
-        </p:txBody>
-      </p:sp>
-      <p:sp>
-        <p:nvSpPr>
-          <p:cNvPr id="8" name="Titolo 1">
-            <a:extLst>
-              <a:ext uri="{FF2B5EF4-FFF2-40B4-BE49-F238E27FC236}">
-                <a16:creationId xmlns:a16="http://schemas.microsoft.com/office/drawing/2014/main" id="{E8EDF0BB-0558-644B-BB96-58C4BD179ABC}"/>
+      <p:sp>
+        <p:nvSpPr>
+          <p:cNvPr id="5" name="Titolo 1">
+            <a:extLst>
+              <a:ext uri="{FF2B5EF4-FFF2-40B4-BE49-F238E27FC236}">
+                <a16:creationId xmlns:a16="http://schemas.microsoft.com/office/drawing/2014/main" id="{719936BE-0F9D-C74E-9E55-A7F2CE751F93}"/>
               </a:ext>
             </a:extLst>
           </p:cNvPr>
@@ -7771,7 +7613,7 @@
         </p:spPr>
         <p:txBody>
           <a:bodyPr vert="horz" lIns="91440" tIns="45720" rIns="91440" bIns="45720" rtlCol="0" anchor="ctr">
-            <a:normAutofit/>
+            <a:normAutofit fontScale="85000" lnSpcReduction="20000"/>
           </a:bodyPr>
           <a:lstStyle>
             <a:lvl1pPr algn="l" defTabSz="914400" rtl="0" eaLnBrk="1" latinLnBrk="0" hangingPunct="1">
@@ -7795,62 +7637,127 @@
           <a:p>
             <a:pPr algn="ctr"/>
             <a:r>
-              <a:rPr lang="it-IT" dirty="0" err="1"/>
-              <a:t>Granty</a:t>
-            </a:r>
-            <a:r>
-              <a:rPr lang="it-IT" dirty="0"/>
-              <a:t> </a:t>
-            </a:r>
-            <a:r>
-              <a:rPr lang="it-IT" dirty="0" err="1"/>
-              <a:t>crane</a:t>
-            </a:r>
-            <a:endParaRPr lang="it-IT" dirty="0"/>
-          </a:p>
-        </p:txBody>
-      </p:sp>
-      <p:sp>
-        <p:nvSpPr>
-          <p:cNvPr id="9" name="CasellaDiTesto 8">
-            <a:extLst>
-              <a:ext uri="{FF2B5EF4-FFF2-40B4-BE49-F238E27FC236}">
-                <a16:creationId xmlns:a16="http://schemas.microsoft.com/office/drawing/2014/main" id="{86F89E2B-2067-3C4F-A4E7-D7C1F99F332E}"/>
-              </a:ext>
-            </a:extLst>
-          </p:cNvPr>
-          <p:cNvSpPr txBox="1"/>
-          <p:nvPr/>
-        </p:nvSpPr>
-        <p:spPr>
-          <a:xfrm>
-            <a:off x="6978917" y="1475623"/>
-            <a:ext cx="2959510" cy="461665"/>
-          </a:xfrm>
-          <a:prstGeom prst="rect">
-            <a:avLst/>
-          </a:prstGeom>
-          <a:noFill/>
-        </p:spPr>
-        <p:txBody>
-          <a:bodyPr wrap="square" rtlCol="0">
-            <a:spAutoFit/>
-          </a:bodyPr>
+              <a:rPr lang="it-IT" sz="5200" dirty="0"/>
+              <a:t>Manipolatore di Stanford</a:t>
+            </a:r>
+          </a:p>
+          <a:p>
+            <a:pPr algn="ctr"/>
+            <a:r>
+              <a:rPr lang="it-IT" sz="3800" dirty="0"/>
+              <a:t>Confronto tra controllori</a:t>
+            </a:r>
+          </a:p>
+        </p:txBody>
+      </p:sp>
+      <p:sp>
+        <p:nvSpPr>
+          <p:cNvPr id="6" name="Segnaposto data 3">
+            <a:extLst>
+              <a:ext uri="{FF2B5EF4-FFF2-40B4-BE49-F238E27FC236}">
+                <a16:creationId xmlns:a16="http://schemas.microsoft.com/office/drawing/2014/main" id="{E31BE159-E7C8-C24F-9CBB-A7F601D7B4BC}"/>
+              </a:ext>
+            </a:extLst>
+          </p:cNvPr>
+          <p:cNvSpPr>
+            <a:spLocks noGrp="1"/>
+          </p:cNvSpPr>
+          <p:nvPr>
+            <p:ph type="dt" sz="half" idx="10"/>
+          </p:nvPr>
+        </p:nvSpPr>
+        <p:spPr>
+          <a:xfrm>
+            <a:off x="838200" y="6356350"/>
+            <a:ext cx="2743200" cy="365125"/>
+          </a:xfrm>
+        </p:spPr>
+        <p:txBody>
+          <a:bodyPr/>
           <a:lstStyle/>
           <a:p>
-            <a:r>
-              <a:rPr lang="it-IT" sz="2400" dirty="0"/>
-              <a:t>MODELLO DINAMICO:</a:t>
-            </a:r>
+            <a:fld id="{4EF59023-6175-3944-979D-CFE35E3A8267}" type="datetime1">
+              <a:rPr lang="it-IT" smtClean="0"/>
+              <a:t>02/11/21</a:t>
+            </a:fld>
+            <a:endParaRPr lang="en-US" dirty="0"/>
+          </a:p>
+        </p:txBody>
+      </p:sp>
+      <p:sp>
+        <p:nvSpPr>
+          <p:cNvPr id="7" name="Segnaposto piè di pagina 4">
+            <a:extLst>
+              <a:ext uri="{FF2B5EF4-FFF2-40B4-BE49-F238E27FC236}">
+                <a16:creationId xmlns:a16="http://schemas.microsoft.com/office/drawing/2014/main" id="{FB85E8B1-FEDB-9D4D-BEDC-B47C1654AEA9}"/>
+              </a:ext>
+            </a:extLst>
+          </p:cNvPr>
+          <p:cNvSpPr>
+            <a:spLocks noGrp="1"/>
+          </p:cNvSpPr>
+          <p:nvPr>
+            <p:ph type="ftr" sz="quarter" idx="11"/>
+          </p:nvPr>
+        </p:nvSpPr>
+        <p:spPr>
+          <a:xfrm>
+            <a:off x="4038600" y="6356350"/>
+            <a:ext cx="4114800" cy="365125"/>
+          </a:xfrm>
+        </p:spPr>
+        <p:txBody>
+          <a:bodyPr/>
+          <a:lstStyle/>
+          <a:p>
+            <a:r>
+              <a:rPr lang="en-US"/>
+              <a:t>Arianna Gasparri</a:t>
+            </a:r>
+            <a:endParaRPr lang="en-US" dirty="0"/>
+          </a:p>
+        </p:txBody>
+      </p:sp>
+      <p:sp>
+        <p:nvSpPr>
+          <p:cNvPr id="8" name="Segnaposto numero diapositiva 5">
+            <a:extLst>
+              <a:ext uri="{FF2B5EF4-FFF2-40B4-BE49-F238E27FC236}">
+                <a16:creationId xmlns:a16="http://schemas.microsoft.com/office/drawing/2014/main" id="{39627B88-FC50-354B-82EE-0494B9651314}"/>
+              </a:ext>
+            </a:extLst>
+          </p:cNvPr>
+          <p:cNvSpPr>
+            <a:spLocks noGrp="1"/>
+          </p:cNvSpPr>
+          <p:nvPr>
+            <p:ph type="sldNum" sz="quarter" idx="12"/>
+          </p:nvPr>
+        </p:nvSpPr>
+        <p:spPr>
+          <a:xfrm>
+            <a:off x="8610600" y="6356350"/>
+            <a:ext cx="2743200" cy="365125"/>
+          </a:xfrm>
+        </p:spPr>
+        <p:txBody>
+          <a:bodyPr/>
+          <a:lstStyle/>
+          <a:p>
+            <a:fld id="{6D22F896-40B5-4ADD-8801-0D06FADFA095}" type="slidenum">
+              <a:rPr lang="en-US" smtClean="0"/>
+              <a:t>19</a:t>
+            </a:fld>
+            <a:endParaRPr lang="en-US" dirty="0"/>
           </a:p>
         </p:txBody>
       </p:sp>
       <p:pic>
         <p:nvPicPr>
-          <p:cNvPr id="11" name="Immagine 10">
-            <a:extLst>
-              <a:ext uri="{FF2B5EF4-FFF2-40B4-BE49-F238E27FC236}">
-                <a16:creationId xmlns:a16="http://schemas.microsoft.com/office/drawing/2014/main" id="{F0486A9B-6256-E942-9507-095F0D92416D}"/>
+          <p:cNvPr id="9" name="Immagine 8">
+            <a:extLst>
+              <a:ext uri="{FF2B5EF4-FFF2-40B4-BE49-F238E27FC236}">
+                <a16:creationId xmlns:a16="http://schemas.microsoft.com/office/drawing/2014/main" id="{53B4ECF9-C7E1-9548-8C2B-0D320A06911B}"/>
               </a:ext>
             </a:extLst>
           </p:cNvPr>
@@ -7860,169 +7767,7 @@
           <p:nvPr/>
         </p:nvPicPr>
         <p:blipFill>
-          <a:blip r:embed="rId3"/>
-          <a:stretch>
-            <a:fillRect/>
-          </a:stretch>
-        </p:blipFill>
-        <p:spPr>
-          <a:xfrm>
-            <a:off x="5905972" y="1937288"/>
-            <a:ext cx="5105400" cy="1085850"/>
-          </a:xfrm>
-          <a:prstGeom prst="rect">
-            <a:avLst/>
-          </a:prstGeom>
-        </p:spPr>
-      </p:pic>
-      <p:pic>
-        <p:nvPicPr>
-          <p:cNvPr id="13" name="Immagine 12">
-            <a:extLst>
-              <a:ext uri="{FF2B5EF4-FFF2-40B4-BE49-F238E27FC236}">
-                <a16:creationId xmlns:a16="http://schemas.microsoft.com/office/drawing/2014/main" id="{E4C3C8CA-AA19-7547-AFE9-5AAE043E0B99}"/>
-              </a:ext>
-            </a:extLst>
-          </p:cNvPr>
-          <p:cNvPicPr>
-            <a:picLocks noChangeAspect="1"/>
-          </p:cNvPicPr>
-          <p:nvPr/>
-        </p:nvPicPr>
-        <p:blipFill>
-          <a:blip r:embed="rId4"/>
-          <a:stretch>
-            <a:fillRect/>
-          </a:stretch>
-        </p:blipFill>
-        <p:spPr>
-          <a:xfrm>
-            <a:off x="7245759" y="3023138"/>
-            <a:ext cx="2095500" cy="1485900"/>
-          </a:xfrm>
-          <a:prstGeom prst="rect">
-            <a:avLst/>
-          </a:prstGeom>
-        </p:spPr>
-      </p:pic>
-      <p:sp>
-        <p:nvSpPr>
-          <p:cNvPr id="10" name="Segnaposto data 3">
-            <a:extLst>
-              <a:ext uri="{FF2B5EF4-FFF2-40B4-BE49-F238E27FC236}">
-                <a16:creationId xmlns:a16="http://schemas.microsoft.com/office/drawing/2014/main" id="{AE9DE227-D43C-9C44-B244-06A48DAF973E}"/>
-              </a:ext>
-            </a:extLst>
-          </p:cNvPr>
-          <p:cNvSpPr>
-            <a:spLocks noGrp="1"/>
-          </p:cNvSpPr>
-          <p:nvPr>
-            <p:ph type="dt" sz="half" idx="10"/>
-          </p:nvPr>
-        </p:nvSpPr>
-        <p:spPr>
-          <a:xfrm>
-            <a:off x="838200" y="6356350"/>
-            <a:ext cx="2743200" cy="365125"/>
-          </a:xfrm>
-        </p:spPr>
-        <p:txBody>
-          <a:bodyPr/>
-          <a:lstStyle/>
-          <a:p>
-            <a:fld id="{4EF59023-6175-3944-979D-CFE35E3A8267}" type="datetime1">
-              <a:rPr lang="it-IT" smtClean="0"/>
-              <a:t>27/10/21</a:t>
-            </a:fld>
-            <a:endParaRPr lang="en-US" dirty="0"/>
-          </a:p>
-        </p:txBody>
-      </p:sp>
-      <p:sp>
-        <p:nvSpPr>
-          <p:cNvPr id="12" name="Segnaposto piè di pagina 4">
-            <a:extLst>
-              <a:ext uri="{FF2B5EF4-FFF2-40B4-BE49-F238E27FC236}">
-                <a16:creationId xmlns:a16="http://schemas.microsoft.com/office/drawing/2014/main" id="{C8041FC7-4B67-C24D-A0EB-D22E155B7B73}"/>
-              </a:ext>
-            </a:extLst>
-          </p:cNvPr>
-          <p:cNvSpPr>
-            <a:spLocks noGrp="1"/>
-          </p:cNvSpPr>
-          <p:nvPr>
-            <p:ph type="ftr" sz="quarter" idx="11"/>
-          </p:nvPr>
-        </p:nvSpPr>
-        <p:spPr>
-          <a:xfrm>
-            <a:off x="4038600" y="6356350"/>
-            <a:ext cx="4114800" cy="365125"/>
-          </a:xfrm>
-        </p:spPr>
-        <p:txBody>
-          <a:bodyPr/>
-          <a:lstStyle/>
-          <a:p>
-            <a:r>
-              <a:rPr lang="en-US"/>
-              <a:t>Arianna Gasparri</a:t>
-            </a:r>
-            <a:endParaRPr lang="en-US" dirty="0"/>
-          </a:p>
-        </p:txBody>
-      </p:sp>
-      <p:sp>
-        <p:nvSpPr>
-          <p:cNvPr id="14" name="Segnaposto numero diapositiva 5">
-            <a:extLst>
-              <a:ext uri="{FF2B5EF4-FFF2-40B4-BE49-F238E27FC236}">
-                <a16:creationId xmlns:a16="http://schemas.microsoft.com/office/drawing/2014/main" id="{8F0BA2E5-108C-2E43-8954-A62D7E19AE52}"/>
-              </a:ext>
-            </a:extLst>
-          </p:cNvPr>
-          <p:cNvSpPr>
-            <a:spLocks noGrp="1"/>
-          </p:cNvSpPr>
-          <p:nvPr>
-            <p:ph type="sldNum" sz="quarter" idx="12"/>
-          </p:nvPr>
-        </p:nvSpPr>
-        <p:spPr>
-          <a:xfrm>
-            <a:off x="8610600" y="6356350"/>
-            <a:ext cx="2743200" cy="365125"/>
-          </a:xfrm>
-        </p:spPr>
-        <p:txBody>
-          <a:bodyPr/>
-          <a:lstStyle/>
-          <a:p>
-            <a:fld id="{6D22F896-40B5-4ADD-8801-0D06FADFA095}" type="slidenum">
-              <a:rPr lang="en-US" smtClean="0"/>
-              <a:t>19</a:t>
-            </a:fld>
-            <a:endParaRPr lang="en-US" dirty="0"/>
-          </a:p>
-        </p:txBody>
-      </p:sp>
-      <p:pic>
-        <p:nvPicPr>
-          <p:cNvPr id="15" name="Immagine 14">
-            <a:extLst>
-              <a:ext uri="{FF2B5EF4-FFF2-40B4-BE49-F238E27FC236}">
-                <a16:creationId xmlns:a16="http://schemas.microsoft.com/office/drawing/2014/main" id="{0C65000D-18E6-5B46-A632-C7057EBDDC71}"/>
-              </a:ext>
-            </a:extLst>
-          </p:cNvPr>
-          <p:cNvPicPr>
-            <a:picLocks noChangeAspect="1"/>
-          </p:cNvPicPr>
-          <p:nvPr/>
-        </p:nvPicPr>
-        <p:blipFill>
-          <a:blip r:embed="rId5" cstate="print">
+          <a:blip r:embed="rId2" cstate="print">
             <a:extLst>
               <a:ext uri="{28A0092B-C50C-407E-A947-70E740481C1C}">
                 <a14:useLocalDpi xmlns:a14="http://schemas.microsoft.com/office/drawing/2010/main" val="0"/>
@@ -8043,10 +7788,120 @@
           </a:prstGeom>
         </p:spPr>
       </p:pic>
+      <p:sp>
+        <p:nvSpPr>
+          <p:cNvPr id="2" name="CasellaDiTesto 1">
+            <a:extLst>
+              <a:ext uri="{FF2B5EF4-FFF2-40B4-BE49-F238E27FC236}">
+                <a16:creationId xmlns:a16="http://schemas.microsoft.com/office/drawing/2014/main" id="{19D6790E-DDC0-D147-AE78-97A565A623DE}"/>
+              </a:ext>
+            </a:extLst>
+          </p:cNvPr>
+          <p:cNvSpPr txBox="1"/>
+          <p:nvPr/>
+        </p:nvSpPr>
+        <p:spPr>
+          <a:xfrm>
+            <a:off x="1524000" y="1475623"/>
+            <a:ext cx="9144000" cy="4204356"/>
+          </a:xfrm>
+          <a:prstGeom prst="rect">
+            <a:avLst/>
+          </a:prstGeom>
+          <a:noFill/>
+        </p:spPr>
+        <p:txBody>
+          <a:bodyPr wrap="square" rtlCol="0">
+            <a:spAutoFit/>
+          </a:bodyPr>
+          <a:lstStyle/>
+          <a:p>
+            <a:pPr algn="ctr">
+              <a:lnSpc>
+                <a:spcPct val="150000"/>
+              </a:lnSpc>
+            </a:pPr>
+            <a:r>
+              <a:rPr lang="it-IT" dirty="0"/>
+              <a:t>Dall’immagine precedente è possibile concludere il controllore </a:t>
+            </a:r>
+            <a:r>
+              <a:rPr lang="it-IT" dirty="0" err="1"/>
+              <a:t>Adaptive</a:t>
+            </a:r>
+            <a:r>
+              <a:rPr lang="it-IT" dirty="0"/>
+              <a:t> </a:t>
+            </a:r>
+            <a:r>
+              <a:rPr lang="it-IT" dirty="0" err="1"/>
+              <a:t>Computed</a:t>
+            </a:r>
+            <a:r>
+              <a:rPr lang="it-IT" dirty="0"/>
+              <a:t> Torque è quello che genera le coppie più alte, fino a 10 volte maggiori di quelle prodotte dal controllore PD con Compensazione di Gravità e ancora maggiori delle coppie generate dal controllo a Coppia Calcolata.</a:t>
+            </a:r>
+          </a:p>
+          <a:p>
+            <a:pPr algn="ctr">
+              <a:lnSpc>
+                <a:spcPct val="150000"/>
+              </a:lnSpc>
+            </a:pPr>
+            <a:endParaRPr lang="it-IT" dirty="0"/>
+          </a:p>
+          <a:p>
+            <a:pPr algn="ctr">
+              <a:lnSpc>
+                <a:spcPct val="150000"/>
+              </a:lnSpc>
+            </a:pPr>
+            <a:r>
+              <a:rPr lang="it-IT" dirty="0"/>
+              <a:t>La coppia minore è generata, però, dal controllore </a:t>
+            </a:r>
+            <a:r>
+              <a:rPr lang="it-IT" dirty="0" err="1"/>
+              <a:t>Computed</a:t>
+            </a:r>
+            <a:r>
+              <a:rPr lang="it-IT" dirty="0"/>
+              <a:t> Torque, che è anche il più veloce, per il quale l’errore di annulla già dopo 15 s.</a:t>
+            </a:r>
+          </a:p>
+          <a:p>
+            <a:pPr algn="ctr">
+              <a:lnSpc>
+                <a:spcPct val="150000"/>
+              </a:lnSpc>
+            </a:pPr>
+            <a:endParaRPr lang="it-IT" dirty="0"/>
+          </a:p>
+          <a:p>
+            <a:pPr algn="ctr">
+              <a:lnSpc>
+                <a:spcPct val="150000"/>
+              </a:lnSpc>
+            </a:pPr>
+            <a:r>
+              <a:rPr lang="it-IT" dirty="0"/>
+              <a:t>Inoltre il controllore a coppia calcolata adattivo, non è in grado di fare convergere a 0 l’errore di posizione angolare ai giunti, pur presentando un errore massimo di 0.01 </a:t>
+            </a:r>
+            <a:r>
+              <a:rPr lang="it-IT" dirty="0" err="1"/>
+              <a:t>rad</a:t>
+            </a:r>
+            <a:r>
+              <a:rPr lang="it-IT" dirty="0"/>
+              <a:t>, cioè circa 0.5°.</a:t>
+            </a:r>
+          </a:p>
+        </p:txBody>
+      </p:sp>
     </p:spTree>
     <p:extLst>
       <p:ext uri="{BB962C8B-B14F-4D97-AF65-F5344CB8AC3E}">
-        <p14:creationId xmlns:p14="http://schemas.microsoft.com/office/powerpoint/2010/main" val="46173228"/>
+        <p14:creationId xmlns:p14="http://schemas.microsoft.com/office/powerpoint/2010/main" val="427369254"/>
       </p:ext>
     </p:extLst>
   </p:cSld>
@@ -8214,6 +8069,20 @@
             </a:r>
           </a:p>
           <a:p>
+            <a:pPr lvl="1">
+              <a:buClr>
+                <a:schemeClr val="tx2">
+                  <a:lumMod val="20000"/>
+                  <a:lumOff val="80000"/>
+                </a:schemeClr>
+              </a:buClr>
+            </a:pPr>
+            <a:r>
+              <a:rPr lang="it-IT" dirty="0"/>
+              <a:t>Confronto tra controllori</a:t>
+            </a:r>
+          </a:p>
+          <a:p>
             <a:pPr marL="0" indent="0">
               <a:buClr>
                 <a:schemeClr val="tx2">
@@ -8311,7 +8180,7 @@
           <a:p>
             <a:fld id="{4EF59023-6175-3944-979D-CFE35E3A8267}" type="datetime1">
               <a:rPr lang="it-IT" smtClean="0"/>
-              <a:t>27/10/21</a:t>
+              <a:t>02/11/21</a:t>
             </a:fld>
             <a:endParaRPr lang="en-US" dirty="0"/>
           </a:p>
@@ -8441,12 +8310,54 @@
           <a:chExt cx="0" cy="0"/>
         </a:xfrm>
       </p:grpSpPr>
+      <p:sp>
+        <p:nvSpPr>
+          <p:cNvPr id="2" name="Titolo 1">
+            <a:extLst>
+              <a:ext uri="{FF2B5EF4-FFF2-40B4-BE49-F238E27FC236}">
+                <a16:creationId xmlns:a16="http://schemas.microsoft.com/office/drawing/2014/main" id="{EC4DE27F-9EE0-A747-BF3B-EE0B89D62F48}"/>
+              </a:ext>
+            </a:extLst>
+          </p:cNvPr>
+          <p:cNvSpPr>
+            <a:spLocks noGrp="1"/>
+          </p:cNvSpPr>
+          <p:nvPr>
+            <p:ph type="ctrTitle"/>
+          </p:nvPr>
+        </p:nvSpPr>
+        <p:spPr>
+          <a:xfrm>
+            <a:off x="1524000" y="454393"/>
+            <a:ext cx="9144000" cy="1021230"/>
+          </a:xfrm>
+        </p:spPr>
+        <p:txBody>
+          <a:bodyPr/>
+          <a:lstStyle/>
+          <a:p>
+            <a:r>
+              <a:rPr lang="it-IT" dirty="0" err="1"/>
+              <a:t>Granty</a:t>
+            </a:r>
+            <a:r>
+              <a:rPr lang="it-IT" dirty="0"/>
+              <a:t> </a:t>
+            </a:r>
+            <a:r>
+              <a:rPr lang="it-IT" dirty="0" err="1"/>
+              <a:t>crane</a:t>
+            </a:r>
+            <a:endParaRPr lang="it-IT" dirty="0"/>
+          </a:p>
+        </p:txBody>
+      </p:sp>
       <p:pic>
         <p:nvPicPr>
-          <p:cNvPr id="5" name="Immagine 4">
-            <a:extLst>
-              <a:ext uri="{FF2B5EF4-FFF2-40B4-BE49-F238E27FC236}">
-                <a16:creationId xmlns:a16="http://schemas.microsoft.com/office/drawing/2014/main" id="{6B271FC1-9853-8B46-B074-A5E6D5A515AD}"/>
+          <p:cNvPr id="4" name="Immagine 3">
+            <a:extLst>
+              <a:ext uri="{FF2B5EF4-FFF2-40B4-BE49-F238E27FC236}">
+                <a16:creationId xmlns:a16="http://schemas.microsoft.com/office/drawing/2014/main" id="{96D82E7F-6103-A546-BCE8-2F5085DF3467}"/>
               </a:ext>
             </a:extLst>
           </p:cNvPr>
@@ -8463,8 +8374,8 @@
         </p:blipFill>
         <p:spPr>
           <a:xfrm>
-            <a:off x="1714030" y="1475623"/>
-            <a:ext cx="2093143" cy="1332000"/>
+            <a:off x="1524000" y="1475623"/>
+            <a:ext cx="3683000" cy="4089400"/>
           </a:xfrm>
           <a:prstGeom prst="rect">
             <a:avLst/>
@@ -8473,74 +8384,10 @@
       </p:pic>
       <p:sp>
         <p:nvSpPr>
-          <p:cNvPr id="8" name="Titolo 1">
-            <a:extLst>
-              <a:ext uri="{FF2B5EF4-FFF2-40B4-BE49-F238E27FC236}">
-                <a16:creationId xmlns:a16="http://schemas.microsoft.com/office/drawing/2014/main" id="{E8EDF0BB-0558-644B-BB96-58C4BD179ABC}"/>
-              </a:ext>
-            </a:extLst>
-          </p:cNvPr>
-          <p:cNvSpPr txBox="1">
-            <a:spLocks/>
-          </p:cNvSpPr>
-          <p:nvPr/>
-        </p:nvSpPr>
-        <p:spPr>
-          <a:xfrm>
-            <a:off x="1524000" y="454393"/>
-            <a:ext cx="9144000" cy="1021230"/>
-          </a:xfrm>
-          <a:prstGeom prst="rect">
-            <a:avLst/>
-          </a:prstGeom>
-        </p:spPr>
-        <p:txBody>
-          <a:bodyPr vert="horz" lIns="91440" tIns="45720" rIns="91440" bIns="45720" rtlCol="0" anchor="ctr">
-            <a:normAutofit/>
-          </a:bodyPr>
-          <a:lstStyle>
-            <a:lvl1pPr algn="l" defTabSz="914400" rtl="0" eaLnBrk="1" latinLnBrk="0" hangingPunct="1">
-              <a:lnSpc>
-                <a:spcPct val="90000"/>
-              </a:lnSpc>
-              <a:spcBef>
-                <a:spcPct val="0"/>
-              </a:spcBef>
-              <a:buNone/>
-              <a:defRPr sz="4400" kern="1200">
-                <a:solidFill>
-                  <a:schemeClr val="tx1"/>
-                </a:solidFill>
-                <a:latin typeface="+mj-lt"/>
-                <a:ea typeface="+mj-ea"/>
-                <a:cs typeface="+mj-cs"/>
-              </a:defRPr>
-            </a:lvl1pPr>
-          </a:lstStyle>
-          <a:p>
-            <a:pPr algn="ctr"/>
-            <a:r>
-              <a:rPr lang="it-IT" dirty="0" err="1"/>
-              <a:t>Granty</a:t>
-            </a:r>
-            <a:r>
-              <a:rPr lang="it-IT" dirty="0"/>
-              <a:t> </a:t>
-            </a:r>
-            <a:r>
-              <a:rPr lang="it-IT" dirty="0" err="1"/>
-              <a:t>crane</a:t>
-            </a:r>
-            <a:endParaRPr lang="it-IT" dirty="0"/>
-          </a:p>
-        </p:txBody>
-      </p:sp>
-      <p:sp>
-        <p:nvSpPr>
-          <p:cNvPr id="9" name="CasellaDiTesto 8">
-            <a:extLst>
-              <a:ext uri="{FF2B5EF4-FFF2-40B4-BE49-F238E27FC236}">
-                <a16:creationId xmlns:a16="http://schemas.microsoft.com/office/drawing/2014/main" id="{86F89E2B-2067-3C4F-A4E7-D7C1F99F332E}"/>
+          <p:cNvPr id="10" name="CasellaDiTesto 9">
+            <a:extLst>
+              <a:ext uri="{FF2B5EF4-FFF2-40B4-BE49-F238E27FC236}">
+                <a16:creationId xmlns:a16="http://schemas.microsoft.com/office/drawing/2014/main" id="{F46E9E04-607C-DB49-8EC7-C6CC7AC882D2}"/>
               </a:ext>
             </a:extLst>
           </p:cNvPr>
@@ -8549,8 +8396,8 @@
         </p:nvSpPr>
         <p:spPr>
           <a:xfrm>
-            <a:off x="3997202" y="1475623"/>
-            <a:ext cx="6670797" cy="1384995"/>
+            <a:off x="5410714" y="2227661"/>
+            <a:ext cx="5257286" cy="2585323"/>
           </a:xfrm>
           <a:prstGeom prst="rect">
             <a:avLst/>
@@ -8564,24 +8411,134 @@
           <a:lstStyle/>
           <a:p>
             <a:r>
-              <a:rPr lang="it-IT" sz="2400" dirty="0"/>
-              <a:t>MODELLO DINAMICO:</a:t>
-            </a:r>
-          </a:p>
-          <a:p>
-            <a:r>
-              <a:rPr lang="it-IT" sz="2000" dirty="0"/>
-              <a:t>A partire dalle equazioni della slide precedente, con semplici calcoli si ottengono le equazioni della dinamica del modello, scritte in forma standard che seguono, con vettore di stato:</a:t>
-            </a:r>
+              <a:rPr lang="it-IT" dirty="0"/>
+              <a:t>Un modello di carro-ponte è rappresentato nella figura a fianco, assumendo che il carrello possa muoversi soltanto lungo la direzione del binario sul quale è posto, è ragionevole assumere che lo spostamento nella direzione perpendicolare al binario sia nullo e così anche l’angolo </a:t>
+            </a:r>
+            <a:r>
+              <a:rPr lang="it-IT" dirty="0" err="1"/>
+              <a:t>ɸ</a:t>
+            </a:r>
+            <a:r>
+              <a:rPr lang="it-IT" dirty="0"/>
+              <a:t>.</a:t>
+            </a:r>
+          </a:p>
+          <a:p>
+            <a:r>
+              <a:rPr lang="it-IT" dirty="0"/>
+              <a:t>Si assume che anche la forza sia diretta lungo la direzione del binario, riportando così il modello ad una sua semplificazione in 2D.</a:t>
+            </a:r>
+          </a:p>
+        </p:txBody>
+      </p:sp>
+      <p:sp>
+        <p:nvSpPr>
+          <p:cNvPr id="5" name="Segnaposto data 3">
+            <a:extLst>
+              <a:ext uri="{FF2B5EF4-FFF2-40B4-BE49-F238E27FC236}">
+                <a16:creationId xmlns:a16="http://schemas.microsoft.com/office/drawing/2014/main" id="{E482AEE9-99FE-5941-933D-546A9D875D94}"/>
+              </a:ext>
+            </a:extLst>
+          </p:cNvPr>
+          <p:cNvSpPr>
+            <a:spLocks noGrp="1"/>
+          </p:cNvSpPr>
+          <p:nvPr>
+            <p:ph type="dt" sz="half" idx="10"/>
+          </p:nvPr>
+        </p:nvSpPr>
+        <p:spPr>
+          <a:xfrm>
+            <a:off x="838200" y="6356350"/>
+            <a:ext cx="2743200" cy="365125"/>
+          </a:xfrm>
+        </p:spPr>
+        <p:txBody>
+          <a:bodyPr/>
+          <a:lstStyle/>
+          <a:p>
+            <a:fld id="{4EF59023-6175-3944-979D-CFE35E3A8267}" type="datetime1">
+              <a:rPr lang="it-IT" smtClean="0"/>
+              <a:t>02/11/21</a:t>
+            </a:fld>
+            <a:endParaRPr lang="en-US" dirty="0"/>
+          </a:p>
+        </p:txBody>
+      </p:sp>
+      <p:sp>
+        <p:nvSpPr>
+          <p:cNvPr id="6" name="Segnaposto piè di pagina 4">
+            <a:extLst>
+              <a:ext uri="{FF2B5EF4-FFF2-40B4-BE49-F238E27FC236}">
+                <a16:creationId xmlns:a16="http://schemas.microsoft.com/office/drawing/2014/main" id="{764284B5-3467-AE48-80D4-203ED67BF382}"/>
+              </a:ext>
+            </a:extLst>
+          </p:cNvPr>
+          <p:cNvSpPr>
+            <a:spLocks noGrp="1"/>
+          </p:cNvSpPr>
+          <p:nvPr>
+            <p:ph type="ftr" sz="quarter" idx="11"/>
+          </p:nvPr>
+        </p:nvSpPr>
+        <p:spPr>
+          <a:xfrm>
+            <a:off x="4038600" y="6356350"/>
+            <a:ext cx="4114800" cy="365125"/>
+          </a:xfrm>
+        </p:spPr>
+        <p:txBody>
+          <a:bodyPr/>
+          <a:lstStyle/>
+          <a:p>
+            <a:r>
+              <a:rPr lang="en-US"/>
+              <a:t>Arianna Gasparri</a:t>
+            </a:r>
+            <a:endParaRPr lang="en-US" dirty="0"/>
+          </a:p>
+        </p:txBody>
+      </p:sp>
+      <p:sp>
+        <p:nvSpPr>
+          <p:cNvPr id="7" name="Segnaposto numero diapositiva 5">
+            <a:extLst>
+              <a:ext uri="{FF2B5EF4-FFF2-40B4-BE49-F238E27FC236}">
+                <a16:creationId xmlns:a16="http://schemas.microsoft.com/office/drawing/2014/main" id="{19E6B972-3060-C34D-B468-73BD169952F1}"/>
+              </a:ext>
+            </a:extLst>
+          </p:cNvPr>
+          <p:cNvSpPr>
+            <a:spLocks noGrp="1"/>
+          </p:cNvSpPr>
+          <p:nvPr>
+            <p:ph type="sldNum" sz="quarter" idx="12"/>
+          </p:nvPr>
+        </p:nvSpPr>
+        <p:spPr>
+          <a:xfrm>
+            <a:off x="8610600" y="6356350"/>
+            <a:ext cx="2743200" cy="365125"/>
+          </a:xfrm>
+        </p:spPr>
+        <p:txBody>
+          <a:bodyPr/>
+          <a:lstStyle/>
+          <a:p>
+            <a:fld id="{6D22F896-40B5-4ADD-8801-0D06FADFA095}" type="slidenum">
+              <a:rPr lang="en-US" smtClean="0"/>
+              <a:t>20</a:t>
+            </a:fld>
+            <a:endParaRPr lang="en-US" dirty="0"/>
           </a:p>
         </p:txBody>
       </p:sp>
       <p:pic>
         <p:nvPicPr>
-          <p:cNvPr id="3" name="Immagine 2">
-            <a:extLst>
-              <a:ext uri="{FF2B5EF4-FFF2-40B4-BE49-F238E27FC236}">
-                <a16:creationId xmlns:a16="http://schemas.microsoft.com/office/drawing/2014/main" id="{F55D6311-1534-8A48-A8EE-1261BFF4A2AC}"/>
+          <p:cNvPr id="8" name="Immagine 7">
+            <a:extLst>
+              <a:ext uri="{FF2B5EF4-FFF2-40B4-BE49-F238E27FC236}">
+                <a16:creationId xmlns:a16="http://schemas.microsoft.com/office/drawing/2014/main" id="{6C031ED0-BD61-034F-8985-0C2000CE0D92}"/>
               </a:ext>
             </a:extLst>
           </p:cNvPr>
@@ -8591,169 +8548,7 @@
           <p:nvPr/>
         </p:nvPicPr>
         <p:blipFill>
-          <a:blip r:embed="rId3"/>
-          <a:stretch>
-            <a:fillRect/>
-          </a:stretch>
-        </p:blipFill>
-        <p:spPr>
-          <a:xfrm>
-            <a:off x="6748400" y="2860618"/>
-            <a:ext cx="1168400" cy="1181100"/>
-          </a:xfrm>
-          <a:prstGeom prst="rect">
-            <a:avLst/>
-          </a:prstGeom>
-        </p:spPr>
-      </p:pic>
-      <p:pic>
-        <p:nvPicPr>
-          <p:cNvPr id="7" name="Immagine 6">
-            <a:extLst>
-              <a:ext uri="{FF2B5EF4-FFF2-40B4-BE49-F238E27FC236}">
-                <a16:creationId xmlns:a16="http://schemas.microsoft.com/office/drawing/2014/main" id="{A539952D-DE65-B548-BF2B-F3A0D95C318E}"/>
-              </a:ext>
-            </a:extLst>
-          </p:cNvPr>
-          <p:cNvPicPr>
-            <a:picLocks noChangeAspect="1"/>
-          </p:cNvPicPr>
-          <p:nvPr/>
-        </p:nvPicPr>
-        <p:blipFill>
-          <a:blip r:embed="rId4"/>
-          <a:stretch>
-            <a:fillRect/>
-          </a:stretch>
-        </p:blipFill>
-        <p:spPr>
-          <a:xfrm>
-            <a:off x="1362075" y="4041718"/>
-            <a:ext cx="9467850" cy="2266950"/>
-          </a:xfrm>
-          <a:prstGeom prst="rect">
-            <a:avLst/>
-          </a:prstGeom>
-        </p:spPr>
-      </p:pic>
-      <p:sp>
-        <p:nvSpPr>
-          <p:cNvPr id="10" name="Segnaposto data 3">
-            <a:extLst>
-              <a:ext uri="{FF2B5EF4-FFF2-40B4-BE49-F238E27FC236}">
-                <a16:creationId xmlns:a16="http://schemas.microsoft.com/office/drawing/2014/main" id="{3531B279-D577-5248-90AF-F64E19A5EBC5}"/>
-              </a:ext>
-            </a:extLst>
-          </p:cNvPr>
-          <p:cNvSpPr>
-            <a:spLocks noGrp="1"/>
-          </p:cNvSpPr>
-          <p:nvPr>
-            <p:ph type="dt" sz="half" idx="10"/>
-          </p:nvPr>
-        </p:nvSpPr>
-        <p:spPr>
-          <a:xfrm>
-            <a:off x="838200" y="6356350"/>
-            <a:ext cx="2743200" cy="365125"/>
-          </a:xfrm>
-        </p:spPr>
-        <p:txBody>
-          <a:bodyPr/>
-          <a:lstStyle/>
-          <a:p>
-            <a:fld id="{4EF59023-6175-3944-979D-CFE35E3A8267}" type="datetime1">
-              <a:rPr lang="it-IT" smtClean="0"/>
-              <a:t>27/10/21</a:t>
-            </a:fld>
-            <a:endParaRPr lang="en-US" dirty="0"/>
-          </a:p>
-        </p:txBody>
-      </p:sp>
-      <p:sp>
-        <p:nvSpPr>
-          <p:cNvPr id="11" name="Segnaposto piè di pagina 4">
-            <a:extLst>
-              <a:ext uri="{FF2B5EF4-FFF2-40B4-BE49-F238E27FC236}">
-                <a16:creationId xmlns:a16="http://schemas.microsoft.com/office/drawing/2014/main" id="{100EDC2C-9436-5043-BE62-64D2D4DC14C5}"/>
-              </a:ext>
-            </a:extLst>
-          </p:cNvPr>
-          <p:cNvSpPr>
-            <a:spLocks noGrp="1"/>
-          </p:cNvSpPr>
-          <p:nvPr>
-            <p:ph type="ftr" sz="quarter" idx="11"/>
-          </p:nvPr>
-        </p:nvSpPr>
-        <p:spPr>
-          <a:xfrm>
-            <a:off x="4038600" y="6356350"/>
-            <a:ext cx="4114800" cy="365125"/>
-          </a:xfrm>
-        </p:spPr>
-        <p:txBody>
-          <a:bodyPr/>
-          <a:lstStyle/>
-          <a:p>
-            <a:r>
-              <a:rPr lang="en-US"/>
-              <a:t>Arianna Gasparri</a:t>
-            </a:r>
-            <a:endParaRPr lang="en-US" dirty="0"/>
-          </a:p>
-        </p:txBody>
-      </p:sp>
-      <p:sp>
-        <p:nvSpPr>
-          <p:cNvPr id="12" name="Segnaposto numero diapositiva 5">
-            <a:extLst>
-              <a:ext uri="{FF2B5EF4-FFF2-40B4-BE49-F238E27FC236}">
-                <a16:creationId xmlns:a16="http://schemas.microsoft.com/office/drawing/2014/main" id="{6ED4B9F5-DFA8-DC4A-B941-8259C37F3D57}"/>
-              </a:ext>
-            </a:extLst>
-          </p:cNvPr>
-          <p:cNvSpPr>
-            <a:spLocks noGrp="1"/>
-          </p:cNvSpPr>
-          <p:nvPr>
-            <p:ph type="sldNum" sz="quarter" idx="12"/>
-          </p:nvPr>
-        </p:nvSpPr>
-        <p:spPr>
-          <a:xfrm>
-            <a:off x="8610600" y="6356350"/>
-            <a:ext cx="2743200" cy="365125"/>
-          </a:xfrm>
-        </p:spPr>
-        <p:txBody>
-          <a:bodyPr/>
-          <a:lstStyle/>
-          <a:p>
-            <a:fld id="{6D22F896-40B5-4ADD-8801-0D06FADFA095}" type="slidenum">
-              <a:rPr lang="en-US" smtClean="0"/>
-              <a:t>20</a:t>
-            </a:fld>
-            <a:endParaRPr lang="en-US" dirty="0"/>
-          </a:p>
-        </p:txBody>
-      </p:sp>
-      <p:pic>
-        <p:nvPicPr>
-          <p:cNvPr id="13" name="Immagine 12">
-            <a:extLst>
-              <a:ext uri="{FF2B5EF4-FFF2-40B4-BE49-F238E27FC236}">
-                <a16:creationId xmlns:a16="http://schemas.microsoft.com/office/drawing/2014/main" id="{D4502927-51E7-A144-A796-FAD147598A31}"/>
-              </a:ext>
-            </a:extLst>
-          </p:cNvPr>
-          <p:cNvPicPr>
-            <a:picLocks noChangeAspect="1"/>
-          </p:cNvPicPr>
-          <p:nvPr/>
-        </p:nvPicPr>
-        <p:blipFill>
-          <a:blip r:embed="rId5" cstate="print">
+          <a:blip r:embed="rId3" cstate="print">
             <a:extLst>
               <a:ext uri="{28A0092B-C50C-407E-A947-70E740481C1C}">
                 <a14:useLocalDpi xmlns:a14="http://schemas.microsoft.com/office/drawing/2010/main" val="0"/>
@@ -8777,7 +8572,7 @@
     </p:spTree>
     <p:extLst>
       <p:ext uri="{BB962C8B-B14F-4D97-AF65-F5344CB8AC3E}">
-        <p14:creationId xmlns:p14="http://schemas.microsoft.com/office/powerpoint/2010/main" val="445715538"/>
+        <p14:creationId xmlns:p14="http://schemas.microsoft.com/office/powerpoint/2010/main" val="2508728585"/>
       </p:ext>
     </p:extLst>
   </p:cSld>
@@ -8826,14 +8621,115 @@
         </p:blipFill>
         <p:spPr>
           <a:xfrm>
-            <a:off x="1714030" y="1475623"/>
-            <a:ext cx="2093143" cy="1332000"/>
+            <a:off x="1714029" y="1475623"/>
+            <a:ext cx="4191943" cy="2667600"/>
           </a:xfrm>
           <a:prstGeom prst="rect">
             <a:avLst/>
           </a:prstGeom>
         </p:spPr>
       </p:pic>
+      <p:sp>
+        <p:nvSpPr>
+          <p:cNvPr id="6" name="CasellaDiTesto 5">
+            <a:extLst>
+              <a:ext uri="{FF2B5EF4-FFF2-40B4-BE49-F238E27FC236}">
+                <a16:creationId xmlns:a16="http://schemas.microsoft.com/office/drawing/2014/main" id="{11F4C9D8-CB26-E74E-B18E-7614421A6E93}"/>
+              </a:ext>
+            </a:extLst>
+          </p:cNvPr>
+          <p:cNvSpPr txBox="1"/>
+          <p:nvPr/>
+        </p:nvSpPr>
+        <p:spPr>
+          <a:xfrm>
+            <a:off x="1524000" y="4143223"/>
+            <a:ext cx="5531730" cy="1938992"/>
+          </a:xfrm>
+          <a:prstGeom prst="rect">
+            <a:avLst/>
+          </a:prstGeom>
+          <a:noFill/>
+        </p:spPr>
+        <p:txBody>
+          <a:bodyPr wrap="square" rtlCol="0">
+            <a:spAutoFit/>
+          </a:bodyPr>
+          <a:lstStyle/>
+          <a:p>
+            <a:r>
+              <a:rPr lang="it-IT" sz="2000" dirty="0"/>
+              <a:t>Parametri del modello:	l = 0.2 m</a:t>
+            </a:r>
+          </a:p>
+          <a:p>
+            <a:r>
+              <a:rPr lang="it-IT" sz="2000" dirty="0"/>
+              <a:t>			g = 9.81 m/s</a:t>
+            </a:r>
+            <a:r>
+              <a:rPr lang="it-IT" sz="2000" baseline="30000" dirty="0"/>
+              <a:t>2</a:t>
+            </a:r>
+          </a:p>
+          <a:p>
+            <a:r>
+              <a:rPr lang="it-IT" sz="2000" dirty="0"/>
+              <a:t>			M = 0.548069759 kg</a:t>
+            </a:r>
+          </a:p>
+          <a:p>
+            <a:r>
+              <a:rPr lang="it-IT" sz="2000" dirty="0"/>
+              <a:t>			m</a:t>
+            </a:r>
+            <a:r>
+              <a:rPr lang="it-IT" sz="2000" baseline="-25000" dirty="0"/>
+              <a:t>1</a:t>
+            </a:r>
+            <a:r>
+              <a:rPr lang="it-IT" sz="2000" dirty="0"/>
+              <a:t> = 0.088338025 kg</a:t>
+            </a:r>
+          </a:p>
+          <a:p>
+            <a:r>
+              <a:rPr lang="it-IT" sz="2000" dirty="0"/>
+              <a:t>			m</a:t>
+            </a:r>
+            <a:r>
+              <a:rPr lang="it-IT" sz="2000" baseline="-25000" dirty="0"/>
+              <a:t>2</a:t>
+            </a:r>
+            <a:r>
+              <a:rPr lang="it-IT" sz="2000" dirty="0"/>
+              <a:t> = 0.022245336 kg</a:t>
+            </a:r>
+          </a:p>
+          <a:p>
+            <a:r>
+              <a:rPr lang="it-IT" sz="2000" dirty="0"/>
+              <a:t>			b</a:t>
+            </a:r>
+            <a:r>
+              <a:rPr lang="it-IT" sz="2000" baseline="-25000" dirty="0"/>
+              <a:t>1</a:t>
+            </a:r>
+            <a:r>
+              <a:rPr lang="it-IT" sz="2000" dirty="0"/>
+              <a:t> = 0.1	b</a:t>
+            </a:r>
+            <a:r>
+              <a:rPr lang="it-IT" sz="2000" baseline="-25000" dirty="0"/>
+              <a:t>2</a:t>
+            </a:r>
+            <a:r>
+              <a:rPr lang="it-IT" sz="2000" dirty="0"/>
+              <a:t> = 0.5</a:t>
+            </a:r>
+          </a:p>
+        </p:txBody>
+      </p:sp>
       <p:sp>
         <p:nvSpPr>
           <p:cNvPr id="8" name="Titolo 1">
@@ -8912,8 +8808,8 @@
         </p:nvSpPr>
         <p:spPr>
           <a:xfrm>
-            <a:off x="3997202" y="1475623"/>
-            <a:ext cx="6670797" cy="1384995"/>
+            <a:off x="6978917" y="1475623"/>
+            <a:ext cx="2959510" cy="461665"/>
           </a:xfrm>
           <a:prstGeom prst="rect">
             <a:avLst/>
@@ -8931,20 +8827,14 @@
               <a:t>MODELLO DINAMICO:</a:t>
             </a:r>
           </a:p>
-          <a:p>
-            <a:r>
-              <a:rPr lang="it-IT" sz="2000" dirty="0"/>
-              <a:t>È quindi possibile individuare il vettore delle funzioni di stato, delle funzioni di ingresso e delle uscite e scrivere il sistema nella forma </a:t>
-            </a:r>
-          </a:p>
         </p:txBody>
       </p:sp>
       <p:pic>
         <p:nvPicPr>
-          <p:cNvPr id="4" name="Immagine 3">
-            <a:extLst>
-              <a:ext uri="{FF2B5EF4-FFF2-40B4-BE49-F238E27FC236}">
-                <a16:creationId xmlns:a16="http://schemas.microsoft.com/office/drawing/2014/main" id="{0BEAAF86-3F48-8847-8D11-8CCFF5FC089D}"/>
+          <p:cNvPr id="11" name="Immagine 10">
+            <a:extLst>
+              <a:ext uri="{FF2B5EF4-FFF2-40B4-BE49-F238E27FC236}">
+                <a16:creationId xmlns:a16="http://schemas.microsoft.com/office/drawing/2014/main" id="{F0486A9B-6256-E942-9507-095F0D92416D}"/>
               </a:ext>
             </a:extLst>
           </p:cNvPr>
@@ -8961,8 +8851,8 @@
         </p:blipFill>
         <p:spPr>
           <a:xfrm>
-            <a:off x="6507100" y="2807623"/>
-            <a:ext cx="1651000" cy="660400"/>
+            <a:off x="5905972" y="1937288"/>
+            <a:ext cx="5105400" cy="1085850"/>
           </a:xfrm>
           <a:prstGeom prst="rect">
             <a:avLst/>
@@ -8971,10 +8861,10 @@
       </p:pic>
       <p:pic>
         <p:nvPicPr>
-          <p:cNvPr id="7" name="Immagine 6">
-            <a:extLst>
-              <a:ext uri="{FF2B5EF4-FFF2-40B4-BE49-F238E27FC236}">
-                <a16:creationId xmlns:a16="http://schemas.microsoft.com/office/drawing/2014/main" id="{F9F8DC63-EB5D-374B-9F4A-A1EF5FF89A21}"/>
+          <p:cNvPr id="13" name="Immagine 12">
+            <a:extLst>
+              <a:ext uri="{FF2B5EF4-FFF2-40B4-BE49-F238E27FC236}">
+                <a16:creationId xmlns:a16="http://schemas.microsoft.com/office/drawing/2014/main" id="{E4C3C8CA-AA19-7547-AFE9-5AAE043E0B99}"/>
               </a:ext>
             </a:extLst>
           </p:cNvPr>
@@ -8991,6 +8881,732 @@
         </p:blipFill>
         <p:spPr>
           <a:xfrm>
+            <a:off x="7245759" y="3023138"/>
+            <a:ext cx="2095500" cy="1485900"/>
+          </a:xfrm>
+          <a:prstGeom prst="rect">
+            <a:avLst/>
+          </a:prstGeom>
+        </p:spPr>
+      </p:pic>
+      <p:sp>
+        <p:nvSpPr>
+          <p:cNvPr id="10" name="Segnaposto data 3">
+            <a:extLst>
+              <a:ext uri="{FF2B5EF4-FFF2-40B4-BE49-F238E27FC236}">
+                <a16:creationId xmlns:a16="http://schemas.microsoft.com/office/drawing/2014/main" id="{AE9DE227-D43C-9C44-B244-06A48DAF973E}"/>
+              </a:ext>
+            </a:extLst>
+          </p:cNvPr>
+          <p:cNvSpPr>
+            <a:spLocks noGrp="1"/>
+          </p:cNvSpPr>
+          <p:nvPr>
+            <p:ph type="dt" sz="half" idx="10"/>
+          </p:nvPr>
+        </p:nvSpPr>
+        <p:spPr>
+          <a:xfrm>
+            <a:off x="838200" y="6356350"/>
+            <a:ext cx="2743200" cy="365125"/>
+          </a:xfrm>
+        </p:spPr>
+        <p:txBody>
+          <a:bodyPr/>
+          <a:lstStyle/>
+          <a:p>
+            <a:fld id="{4EF59023-6175-3944-979D-CFE35E3A8267}" type="datetime1">
+              <a:rPr lang="it-IT" smtClean="0"/>
+              <a:t>02/11/21</a:t>
+            </a:fld>
+            <a:endParaRPr lang="en-US" dirty="0"/>
+          </a:p>
+        </p:txBody>
+      </p:sp>
+      <p:sp>
+        <p:nvSpPr>
+          <p:cNvPr id="12" name="Segnaposto piè di pagina 4">
+            <a:extLst>
+              <a:ext uri="{FF2B5EF4-FFF2-40B4-BE49-F238E27FC236}">
+                <a16:creationId xmlns:a16="http://schemas.microsoft.com/office/drawing/2014/main" id="{C8041FC7-4B67-C24D-A0EB-D22E155B7B73}"/>
+              </a:ext>
+            </a:extLst>
+          </p:cNvPr>
+          <p:cNvSpPr>
+            <a:spLocks noGrp="1"/>
+          </p:cNvSpPr>
+          <p:nvPr>
+            <p:ph type="ftr" sz="quarter" idx="11"/>
+          </p:nvPr>
+        </p:nvSpPr>
+        <p:spPr>
+          <a:xfrm>
+            <a:off x="4038600" y="6356350"/>
+            <a:ext cx="4114800" cy="365125"/>
+          </a:xfrm>
+        </p:spPr>
+        <p:txBody>
+          <a:bodyPr/>
+          <a:lstStyle/>
+          <a:p>
+            <a:r>
+              <a:rPr lang="en-US"/>
+              <a:t>Arianna Gasparri</a:t>
+            </a:r>
+            <a:endParaRPr lang="en-US" dirty="0"/>
+          </a:p>
+        </p:txBody>
+      </p:sp>
+      <p:sp>
+        <p:nvSpPr>
+          <p:cNvPr id="14" name="Segnaposto numero diapositiva 5">
+            <a:extLst>
+              <a:ext uri="{FF2B5EF4-FFF2-40B4-BE49-F238E27FC236}">
+                <a16:creationId xmlns:a16="http://schemas.microsoft.com/office/drawing/2014/main" id="{8F0BA2E5-108C-2E43-8954-A62D7E19AE52}"/>
+              </a:ext>
+            </a:extLst>
+          </p:cNvPr>
+          <p:cNvSpPr>
+            <a:spLocks noGrp="1"/>
+          </p:cNvSpPr>
+          <p:nvPr>
+            <p:ph type="sldNum" sz="quarter" idx="12"/>
+          </p:nvPr>
+        </p:nvSpPr>
+        <p:spPr>
+          <a:xfrm>
+            <a:off x="8610600" y="6356350"/>
+            <a:ext cx="2743200" cy="365125"/>
+          </a:xfrm>
+        </p:spPr>
+        <p:txBody>
+          <a:bodyPr/>
+          <a:lstStyle/>
+          <a:p>
+            <a:fld id="{6D22F896-40B5-4ADD-8801-0D06FADFA095}" type="slidenum">
+              <a:rPr lang="en-US" smtClean="0"/>
+              <a:t>21</a:t>
+            </a:fld>
+            <a:endParaRPr lang="en-US" dirty="0"/>
+          </a:p>
+        </p:txBody>
+      </p:sp>
+      <p:pic>
+        <p:nvPicPr>
+          <p:cNvPr id="15" name="Immagine 14">
+            <a:extLst>
+              <a:ext uri="{FF2B5EF4-FFF2-40B4-BE49-F238E27FC236}">
+                <a16:creationId xmlns:a16="http://schemas.microsoft.com/office/drawing/2014/main" id="{0C65000D-18E6-5B46-A632-C7057EBDDC71}"/>
+              </a:ext>
+            </a:extLst>
+          </p:cNvPr>
+          <p:cNvPicPr>
+            <a:picLocks noChangeAspect="1"/>
+          </p:cNvPicPr>
+          <p:nvPr/>
+        </p:nvPicPr>
+        <p:blipFill>
+          <a:blip r:embed="rId5" cstate="print">
+            <a:extLst>
+              <a:ext uri="{28A0092B-C50C-407E-A947-70E740481C1C}">
+                <a14:useLocalDpi xmlns:a14="http://schemas.microsoft.com/office/drawing/2010/main" val="0"/>
+              </a:ext>
+            </a:extLst>
+          </a:blip>
+          <a:stretch>
+            <a:fillRect/>
+          </a:stretch>
+        </p:blipFill>
+        <p:spPr>
+          <a:xfrm>
+            <a:off x="241420" y="265431"/>
+            <a:ext cx="571500" cy="518160"/>
+          </a:xfrm>
+          <a:prstGeom prst="rect">
+            <a:avLst/>
+          </a:prstGeom>
+        </p:spPr>
+      </p:pic>
+    </p:spTree>
+    <p:extLst>
+      <p:ext uri="{BB962C8B-B14F-4D97-AF65-F5344CB8AC3E}">
+        <p14:creationId xmlns:p14="http://schemas.microsoft.com/office/powerpoint/2010/main" val="46173228"/>
+      </p:ext>
+    </p:extLst>
+  </p:cSld>
+  <p:clrMapOvr>
+    <a:masterClrMapping/>
+  </p:clrMapOvr>
+</p:sld>
+</file>
+
+<file path=ppt/slides/slide22.xml><?xml version="1.0" encoding="utf-8"?>
+<p:sld xmlns:a="http://schemas.openxmlformats.org/drawingml/2006/main" xmlns:r="http://schemas.openxmlformats.org/officeDocument/2006/relationships" xmlns:p="http://schemas.openxmlformats.org/presentationml/2006/main">
+  <p:cSld>
+    <p:spTree>
+      <p:nvGrpSpPr>
+        <p:cNvPr id="1" name=""/>
+        <p:cNvGrpSpPr/>
+        <p:nvPr/>
+      </p:nvGrpSpPr>
+      <p:grpSpPr>
+        <a:xfrm>
+          <a:off x="0" y="0"/>
+          <a:ext cx="0" cy="0"/>
+          <a:chOff x="0" y="0"/>
+          <a:chExt cx="0" cy="0"/>
+        </a:xfrm>
+      </p:grpSpPr>
+      <p:pic>
+        <p:nvPicPr>
+          <p:cNvPr id="5" name="Immagine 4">
+            <a:extLst>
+              <a:ext uri="{FF2B5EF4-FFF2-40B4-BE49-F238E27FC236}">
+                <a16:creationId xmlns:a16="http://schemas.microsoft.com/office/drawing/2014/main" id="{6B271FC1-9853-8B46-B074-A5E6D5A515AD}"/>
+              </a:ext>
+            </a:extLst>
+          </p:cNvPr>
+          <p:cNvPicPr>
+            <a:picLocks noChangeAspect="1"/>
+          </p:cNvPicPr>
+          <p:nvPr/>
+        </p:nvPicPr>
+        <p:blipFill>
+          <a:blip r:embed="rId2"/>
+          <a:stretch>
+            <a:fillRect/>
+          </a:stretch>
+        </p:blipFill>
+        <p:spPr>
+          <a:xfrm>
+            <a:off x="1714030" y="1475623"/>
+            <a:ext cx="2093143" cy="1332000"/>
+          </a:xfrm>
+          <a:prstGeom prst="rect">
+            <a:avLst/>
+          </a:prstGeom>
+        </p:spPr>
+      </p:pic>
+      <p:sp>
+        <p:nvSpPr>
+          <p:cNvPr id="8" name="Titolo 1">
+            <a:extLst>
+              <a:ext uri="{FF2B5EF4-FFF2-40B4-BE49-F238E27FC236}">
+                <a16:creationId xmlns:a16="http://schemas.microsoft.com/office/drawing/2014/main" id="{E8EDF0BB-0558-644B-BB96-58C4BD179ABC}"/>
+              </a:ext>
+            </a:extLst>
+          </p:cNvPr>
+          <p:cNvSpPr txBox="1">
+            <a:spLocks/>
+          </p:cNvSpPr>
+          <p:nvPr/>
+        </p:nvSpPr>
+        <p:spPr>
+          <a:xfrm>
+            <a:off x="1524000" y="454393"/>
+            <a:ext cx="9144000" cy="1021230"/>
+          </a:xfrm>
+          <a:prstGeom prst="rect">
+            <a:avLst/>
+          </a:prstGeom>
+        </p:spPr>
+        <p:txBody>
+          <a:bodyPr vert="horz" lIns="91440" tIns="45720" rIns="91440" bIns="45720" rtlCol="0" anchor="ctr">
+            <a:normAutofit/>
+          </a:bodyPr>
+          <a:lstStyle>
+            <a:lvl1pPr algn="l" defTabSz="914400" rtl="0" eaLnBrk="1" latinLnBrk="0" hangingPunct="1">
+              <a:lnSpc>
+                <a:spcPct val="90000"/>
+              </a:lnSpc>
+              <a:spcBef>
+                <a:spcPct val="0"/>
+              </a:spcBef>
+              <a:buNone/>
+              <a:defRPr sz="4400" kern="1200">
+                <a:solidFill>
+                  <a:schemeClr val="tx1"/>
+                </a:solidFill>
+                <a:latin typeface="+mj-lt"/>
+                <a:ea typeface="+mj-ea"/>
+                <a:cs typeface="+mj-cs"/>
+              </a:defRPr>
+            </a:lvl1pPr>
+          </a:lstStyle>
+          <a:p>
+            <a:pPr algn="ctr"/>
+            <a:r>
+              <a:rPr lang="it-IT" dirty="0" err="1"/>
+              <a:t>Granty</a:t>
+            </a:r>
+            <a:r>
+              <a:rPr lang="it-IT" dirty="0"/>
+              <a:t> </a:t>
+            </a:r>
+            <a:r>
+              <a:rPr lang="it-IT" dirty="0" err="1"/>
+              <a:t>crane</a:t>
+            </a:r>
+            <a:endParaRPr lang="it-IT" dirty="0"/>
+          </a:p>
+        </p:txBody>
+      </p:sp>
+      <p:sp>
+        <p:nvSpPr>
+          <p:cNvPr id="9" name="CasellaDiTesto 8">
+            <a:extLst>
+              <a:ext uri="{FF2B5EF4-FFF2-40B4-BE49-F238E27FC236}">
+                <a16:creationId xmlns:a16="http://schemas.microsoft.com/office/drawing/2014/main" id="{86F89E2B-2067-3C4F-A4E7-D7C1F99F332E}"/>
+              </a:ext>
+            </a:extLst>
+          </p:cNvPr>
+          <p:cNvSpPr txBox="1"/>
+          <p:nvPr/>
+        </p:nvSpPr>
+        <p:spPr>
+          <a:xfrm>
+            <a:off x="3997202" y="1475623"/>
+            <a:ext cx="6670797" cy="1384995"/>
+          </a:xfrm>
+          <a:prstGeom prst="rect">
+            <a:avLst/>
+          </a:prstGeom>
+          <a:noFill/>
+        </p:spPr>
+        <p:txBody>
+          <a:bodyPr wrap="square" rtlCol="0">
+            <a:spAutoFit/>
+          </a:bodyPr>
+          <a:lstStyle/>
+          <a:p>
+            <a:r>
+              <a:rPr lang="it-IT" sz="2400" dirty="0"/>
+              <a:t>MODELLO DINAMICO:</a:t>
+            </a:r>
+          </a:p>
+          <a:p>
+            <a:r>
+              <a:rPr lang="it-IT" sz="2000" dirty="0"/>
+              <a:t>A partire dalle equazioni della slide precedente, con semplici calcoli si ottengono le equazioni della dinamica del modello, scritte in forma standard che seguono, con vettore di stato:</a:t>
+            </a:r>
+          </a:p>
+        </p:txBody>
+      </p:sp>
+      <p:pic>
+        <p:nvPicPr>
+          <p:cNvPr id="3" name="Immagine 2">
+            <a:extLst>
+              <a:ext uri="{FF2B5EF4-FFF2-40B4-BE49-F238E27FC236}">
+                <a16:creationId xmlns:a16="http://schemas.microsoft.com/office/drawing/2014/main" id="{F55D6311-1534-8A48-A8EE-1261BFF4A2AC}"/>
+              </a:ext>
+            </a:extLst>
+          </p:cNvPr>
+          <p:cNvPicPr>
+            <a:picLocks noChangeAspect="1"/>
+          </p:cNvPicPr>
+          <p:nvPr/>
+        </p:nvPicPr>
+        <p:blipFill>
+          <a:blip r:embed="rId3"/>
+          <a:stretch>
+            <a:fillRect/>
+          </a:stretch>
+        </p:blipFill>
+        <p:spPr>
+          <a:xfrm>
+            <a:off x="6748400" y="2860618"/>
+            <a:ext cx="1168400" cy="1181100"/>
+          </a:xfrm>
+          <a:prstGeom prst="rect">
+            <a:avLst/>
+          </a:prstGeom>
+        </p:spPr>
+      </p:pic>
+      <p:pic>
+        <p:nvPicPr>
+          <p:cNvPr id="7" name="Immagine 6">
+            <a:extLst>
+              <a:ext uri="{FF2B5EF4-FFF2-40B4-BE49-F238E27FC236}">
+                <a16:creationId xmlns:a16="http://schemas.microsoft.com/office/drawing/2014/main" id="{A539952D-DE65-B548-BF2B-F3A0D95C318E}"/>
+              </a:ext>
+            </a:extLst>
+          </p:cNvPr>
+          <p:cNvPicPr>
+            <a:picLocks noChangeAspect="1"/>
+          </p:cNvPicPr>
+          <p:nvPr/>
+        </p:nvPicPr>
+        <p:blipFill>
+          <a:blip r:embed="rId4"/>
+          <a:stretch>
+            <a:fillRect/>
+          </a:stretch>
+        </p:blipFill>
+        <p:spPr>
+          <a:xfrm>
+            <a:off x="1362075" y="4041718"/>
+            <a:ext cx="9467850" cy="2266950"/>
+          </a:xfrm>
+          <a:prstGeom prst="rect">
+            <a:avLst/>
+          </a:prstGeom>
+        </p:spPr>
+      </p:pic>
+      <p:sp>
+        <p:nvSpPr>
+          <p:cNvPr id="10" name="Segnaposto data 3">
+            <a:extLst>
+              <a:ext uri="{FF2B5EF4-FFF2-40B4-BE49-F238E27FC236}">
+                <a16:creationId xmlns:a16="http://schemas.microsoft.com/office/drawing/2014/main" id="{3531B279-D577-5248-90AF-F64E19A5EBC5}"/>
+              </a:ext>
+            </a:extLst>
+          </p:cNvPr>
+          <p:cNvSpPr>
+            <a:spLocks noGrp="1"/>
+          </p:cNvSpPr>
+          <p:nvPr>
+            <p:ph type="dt" sz="half" idx="10"/>
+          </p:nvPr>
+        </p:nvSpPr>
+        <p:spPr>
+          <a:xfrm>
+            <a:off x="838200" y="6356350"/>
+            <a:ext cx="2743200" cy="365125"/>
+          </a:xfrm>
+        </p:spPr>
+        <p:txBody>
+          <a:bodyPr/>
+          <a:lstStyle/>
+          <a:p>
+            <a:fld id="{4EF59023-6175-3944-979D-CFE35E3A8267}" type="datetime1">
+              <a:rPr lang="it-IT" smtClean="0"/>
+              <a:t>02/11/21</a:t>
+            </a:fld>
+            <a:endParaRPr lang="en-US" dirty="0"/>
+          </a:p>
+        </p:txBody>
+      </p:sp>
+      <p:sp>
+        <p:nvSpPr>
+          <p:cNvPr id="11" name="Segnaposto piè di pagina 4">
+            <a:extLst>
+              <a:ext uri="{FF2B5EF4-FFF2-40B4-BE49-F238E27FC236}">
+                <a16:creationId xmlns:a16="http://schemas.microsoft.com/office/drawing/2014/main" id="{100EDC2C-9436-5043-BE62-64D2D4DC14C5}"/>
+              </a:ext>
+            </a:extLst>
+          </p:cNvPr>
+          <p:cNvSpPr>
+            <a:spLocks noGrp="1"/>
+          </p:cNvSpPr>
+          <p:nvPr>
+            <p:ph type="ftr" sz="quarter" idx="11"/>
+          </p:nvPr>
+        </p:nvSpPr>
+        <p:spPr>
+          <a:xfrm>
+            <a:off x="4038600" y="6356350"/>
+            <a:ext cx="4114800" cy="365125"/>
+          </a:xfrm>
+        </p:spPr>
+        <p:txBody>
+          <a:bodyPr/>
+          <a:lstStyle/>
+          <a:p>
+            <a:r>
+              <a:rPr lang="en-US"/>
+              <a:t>Arianna Gasparri</a:t>
+            </a:r>
+            <a:endParaRPr lang="en-US" dirty="0"/>
+          </a:p>
+        </p:txBody>
+      </p:sp>
+      <p:sp>
+        <p:nvSpPr>
+          <p:cNvPr id="12" name="Segnaposto numero diapositiva 5">
+            <a:extLst>
+              <a:ext uri="{FF2B5EF4-FFF2-40B4-BE49-F238E27FC236}">
+                <a16:creationId xmlns:a16="http://schemas.microsoft.com/office/drawing/2014/main" id="{6ED4B9F5-DFA8-DC4A-B941-8259C37F3D57}"/>
+              </a:ext>
+            </a:extLst>
+          </p:cNvPr>
+          <p:cNvSpPr>
+            <a:spLocks noGrp="1"/>
+          </p:cNvSpPr>
+          <p:nvPr>
+            <p:ph type="sldNum" sz="quarter" idx="12"/>
+          </p:nvPr>
+        </p:nvSpPr>
+        <p:spPr>
+          <a:xfrm>
+            <a:off x="8610600" y="6356350"/>
+            <a:ext cx="2743200" cy="365125"/>
+          </a:xfrm>
+        </p:spPr>
+        <p:txBody>
+          <a:bodyPr/>
+          <a:lstStyle/>
+          <a:p>
+            <a:fld id="{6D22F896-40B5-4ADD-8801-0D06FADFA095}" type="slidenum">
+              <a:rPr lang="en-US" smtClean="0"/>
+              <a:t>22</a:t>
+            </a:fld>
+            <a:endParaRPr lang="en-US" dirty="0"/>
+          </a:p>
+        </p:txBody>
+      </p:sp>
+      <p:pic>
+        <p:nvPicPr>
+          <p:cNvPr id="13" name="Immagine 12">
+            <a:extLst>
+              <a:ext uri="{FF2B5EF4-FFF2-40B4-BE49-F238E27FC236}">
+                <a16:creationId xmlns:a16="http://schemas.microsoft.com/office/drawing/2014/main" id="{D4502927-51E7-A144-A796-FAD147598A31}"/>
+              </a:ext>
+            </a:extLst>
+          </p:cNvPr>
+          <p:cNvPicPr>
+            <a:picLocks noChangeAspect="1"/>
+          </p:cNvPicPr>
+          <p:nvPr/>
+        </p:nvPicPr>
+        <p:blipFill>
+          <a:blip r:embed="rId5" cstate="print">
+            <a:extLst>
+              <a:ext uri="{28A0092B-C50C-407E-A947-70E740481C1C}">
+                <a14:useLocalDpi xmlns:a14="http://schemas.microsoft.com/office/drawing/2010/main" val="0"/>
+              </a:ext>
+            </a:extLst>
+          </a:blip>
+          <a:stretch>
+            <a:fillRect/>
+          </a:stretch>
+        </p:blipFill>
+        <p:spPr>
+          <a:xfrm>
+            <a:off x="241420" y="265431"/>
+            <a:ext cx="571500" cy="518160"/>
+          </a:xfrm>
+          <a:prstGeom prst="rect">
+            <a:avLst/>
+          </a:prstGeom>
+        </p:spPr>
+      </p:pic>
+    </p:spTree>
+    <p:extLst>
+      <p:ext uri="{BB962C8B-B14F-4D97-AF65-F5344CB8AC3E}">
+        <p14:creationId xmlns:p14="http://schemas.microsoft.com/office/powerpoint/2010/main" val="445715538"/>
+      </p:ext>
+    </p:extLst>
+  </p:cSld>
+  <p:clrMapOvr>
+    <a:masterClrMapping/>
+  </p:clrMapOvr>
+</p:sld>
+</file>
+
+<file path=ppt/slides/slide23.xml><?xml version="1.0" encoding="utf-8"?>
+<p:sld xmlns:a="http://schemas.openxmlformats.org/drawingml/2006/main" xmlns:r="http://schemas.openxmlformats.org/officeDocument/2006/relationships" xmlns:p="http://schemas.openxmlformats.org/presentationml/2006/main">
+  <p:cSld>
+    <p:spTree>
+      <p:nvGrpSpPr>
+        <p:cNvPr id="1" name=""/>
+        <p:cNvGrpSpPr/>
+        <p:nvPr/>
+      </p:nvGrpSpPr>
+      <p:grpSpPr>
+        <a:xfrm>
+          <a:off x="0" y="0"/>
+          <a:ext cx="0" cy="0"/>
+          <a:chOff x="0" y="0"/>
+          <a:chExt cx="0" cy="0"/>
+        </a:xfrm>
+      </p:grpSpPr>
+      <p:pic>
+        <p:nvPicPr>
+          <p:cNvPr id="5" name="Immagine 4">
+            <a:extLst>
+              <a:ext uri="{FF2B5EF4-FFF2-40B4-BE49-F238E27FC236}">
+                <a16:creationId xmlns:a16="http://schemas.microsoft.com/office/drawing/2014/main" id="{6B271FC1-9853-8B46-B074-A5E6D5A515AD}"/>
+              </a:ext>
+            </a:extLst>
+          </p:cNvPr>
+          <p:cNvPicPr>
+            <a:picLocks noChangeAspect="1"/>
+          </p:cNvPicPr>
+          <p:nvPr/>
+        </p:nvPicPr>
+        <p:blipFill>
+          <a:blip r:embed="rId2"/>
+          <a:stretch>
+            <a:fillRect/>
+          </a:stretch>
+        </p:blipFill>
+        <p:spPr>
+          <a:xfrm>
+            <a:off x="1714030" y="1475623"/>
+            <a:ext cx="2093143" cy="1332000"/>
+          </a:xfrm>
+          <a:prstGeom prst="rect">
+            <a:avLst/>
+          </a:prstGeom>
+        </p:spPr>
+      </p:pic>
+      <p:sp>
+        <p:nvSpPr>
+          <p:cNvPr id="8" name="Titolo 1">
+            <a:extLst>
+              <a:ext uri="{FF2B5EF4-FFF2-40B4-BE49-F238E27FC236}">
+                <a16:creationId xmlns:a16="http://schemas.microsoft.com/office/drawing/2014/main" id="{E8EDF0BB-0558-644B-BB96-58C4BD179ABC}"/>
+              </a:ext>
+            </a:extLst>
+          </p:cNvPr>
+          <p:cNvSpPr txBox="1">
+            <a:spLocks/>
+          </p:cNvSpPr>
+          <p:nvPr/>
+        </p:nvSpPr>
+        <p:spPr>
+          <a:xfrm>
+            <a:off x="1524000" y="454393"/>
+            <a:ext cx="9144000" cy="1021230"/>
+          </a:xfrm>
+          <a:prstGeom prst="rect">
+            <a:avLst/>
+          </a:prstGeom>
+        </p:spPr>
+        <p:txBody>
+          <a:bodyPr vert="horz" lIns="91440" tIns="45720" rIns="91440" bIns="45720" rtlCol="0" anchor="ctr">
+            <a:normAutofit/>
+          </a:bodyPr>
+          <a:lstStyle>
+            <a:lvl1pPr algn="l" defTabSz="914400" rtl="0" eaLnBrk="1" latinLnBrk="0" hangingPunct="1">
+              <a:lnSpc>
+                <a:spcPct val="90000"/>
+              </a:lnSpc>
+              <a:spcBef>
+                <a:spcPct val="0"/>
+              </a:spcBef>
+              <a:buNone/>
+              <a:defRPr sz="4400" kern="1200">
+                <a:solidFill>
+                  <a:schemeClr val="tx1"/>
+                </a:solidFill>
+                <a:latin typeface="+mj-lt"/>
+                <a:ea typeface="+mj-ea"/>
+                <a:cs typeface="+mj-cs"/>
+              </a:defRPr>
+            </a:lvl1pPr>
+          </a:lstStyle>
+          <a:p>
+            <a:pPr algn="ctr"/>
+            <a:r>
+              <a:rPr lang="it-IT" dirty="0" err="1"/>
+              <a:t>Granty</a:t>
+            </a:r>
+            <a:r>
+              <a:rPr lang="it-IT" dirty="0"/>
+              <a:t> </a:t>
+            </a:r>
+            <a:r>
+              <a:rPr lang="it-IT" dirty="0" err="1"/>
+              <a:t>crane</a:t>
+            </a:r>
+            <a:endParaRPr lang="it-IT" dirty="0"/>
+          </a:p>
+        </p:txBody>
+      </p:sp>
+      <p:sp>
+        <p:nvSpPr>
+          <p:cNvPr id="9" name="CasellaDiTesto 8">
+            <a:extLst>
+              <a:ext uri="{FF2B5EF4-FFF2-40B4-BE49-F238E27FC236}">
+                <a16:creationId xmlns:a16="http://schemas.microsoft.com/office/drawing/2014/main" id="{86F89E2B-2067-3C4F-A4E7-D7C1F99F332E}"/>
+              </a:ext>
+            </a:extLst>
+          </p:cNvPr>
+          <p:cNvSpPr txBox="1"/>
+          <p:nvPr/>
+        </p:nvSpPr>
+        <p:spPr>
+          <a:xfrm>
+            <a:off x="3997202" y="1475623"/>
+            <a:ext cx="6670797" cy="1384995"/>
+          </a:xfrm>
+          <a:prstGeom prst="rect">
+            <a:avLst/>
+          </a:prstGeom>
+          <a:noFill/>
+        </p:spPr>
+        <p:txBody>
+          <a:bodyPr wrap="square" rtlCol="0">
+            <a:spAutoFit/>
+          </a:bodyPr>
+          <a:lstStyle/>
+          <a:p>
+            <a:r>
+              <a:rPr lang="it-IT" sz="2400" dirty="0"/>
+              <a:t>MODELLO DINAMICO:</a:t>
+            </a:r>
+          </a:p>
+          <a:p>
+            <a:r>
+              <a:rPr lang="it-IT" sz="2000" dirty="0"/>
+              <a:t>È quindi possibile individuare il vettore delle funzioni di stato, delle funzioni di ingresso e delle uscite e scrivere il sistema nella forma </a:t>
+            </a:r>
+          </a:p>
+        </p:txBody>
+      </p:sp>
+      <p:pic>
+        <p:nvPicPr>
+          <p:cNvPr id="4" name="Immagine 3">
+            <a:extLst>
+              <a:ext uri="{FF2B5EF4-FFF2-40B4-BE49-F238E27FC236}">
+                <a16:creationId xmlns:a16="http://schemas.microsoft.com/office/drawing/2014/main" id="{0BEAAF86-3F48-8847-8D11-8CCFF5FC089D}"/>
+              </a:ext>
+            </a:extLst>
+          </p:cNvPr>
+          <p:cNvPicPr>
+            <a:picLocks noChangeAspect="1"/>
+          </p:cNvPicPr>
+          <p:nvPr/>
+        </p:nvPicPr>
+        <p:blipFill>
+          <a:blip r:embed="rId3"/>
+          <a:stretch>
+            <a:fillRect/>
+          </a:stretch>
+        </p:blipFill>
+        <p:spPr>
+          <a:xfrm>
+            <a:off x="6507100" y="2807623"/>
+            <a:ext cx="1651000" cy="660400"/>
+          </a:xfrm>
+          <a:prstGeom prst="rect">
+            <a:avLst/>
+          </a:prstGeom>
+        </p:spPr>
+      </p:pic>
+      <p:pic>
+        <p:nvPicPr>
+          <p:cNvPr id="7" name="Immagine 6">
+            <a:extLst>
+              <a:ext uri="{FF2B5EF4-FFF2-40B4-BE49-F238E27FC236}">
+                <a16:creationId xmlns:a16="http://schemas.microsoft.com/office/drawing/2014/main" id="{F9F8DC63-EB5D-374B-9F4A-A1EF5FF89A21}"/>
+              </a:ext>
+            </a:extLst>
+          </p:cNvPr>
+          <p:cNvPicPr>
+            <a:picLocks noChangeAspect="1"/>
+          </p:cNvPicPr>
+          <p:nvPr/>
+        </p:nvPicPr>
+        <p:blipFill>
+          <a:blip r:embed="rId4"/>
+          <a:stretch>
+            <a:fillRect/>
+          </a:stretch>
+        </p:blipFill>
+        <p:spPr>
+          <a:xfrm>
             <a:off x="1524000" y="3468023"/>
             <a:ext cx="6477000" cy="1603375"/>
           </a:xfrm>
@@ -9087,7 +9703,7 @@
           <a:p>
             <a:fld id="{4EF59023-6175-3944-979D-CFE35E3A8267}" type="datetime1">
               <a:rPr lang="it-IT" smtClean="0"/>
-              <a:t>27/10/21</a:t>
+              <a:t>02/11/21</a:t>
             </a:fld>
             <a:endParaRPr lang="en-US" dirty="0"/>
           </a:p>
@@ -9155,7 +9771,7 @@
           <a:p>
             <a:fld id="{6D22F896-40B5-4ADD-8801-0D06FADFA095}" type="slidenum">
               <a:rPr lang="en-US" smtClean="0"/>
-              <a:t>21</a:t>
+              <a:t>23</a:t>
             </a:fld>
             <a:endParaRPr lang="en-US" dirty="0"/>
           </a:p>
@@ -9210,7 +9826,7 @@
 </p:sld>
 </file>
 
-<file path=ppt/slides/slide22.xml><?xml version="1.0" encoding="utf-8"?>
+<file path=ppt/slides/slide24.xml><?xml version="1.0" encoding="utf-8"?>
 <p:sld xmlns:a="http://schemas.openxmlformats.org/drawingml/2006/main" xmlns:r="http://schemas.openxmlformats.org/officeDocument/2006/relationships" xmlns:p="http://schemas.openxmlformats.org/presentationml/2006/main">
   <p:cSld>
     <p:spTree>
@@ -10295,7 +10911,7 @@
           <a:p>
             <a:fld id="{4EF59023-6175-3944-979D-CFE35E3A8267}" type="datetime1">
               <a:rPr lang="it-IT" smtClean="0"/>
-              <a:t>27/10/21</a:t>
+              <a:t>02/11/21</a:t>
             </a:fld>
             <a:endParaRPr lang="en-US" dirty="0"/>
           </a:p>
@@ -10363,7 +10979,7 @@
           <a:p>
             <a:fld id="{6D22F896-40B5-4ADD-8801-0D06FADFA095}" type="slidenum">
               <a:rPr lang="en-US" smtClean="0"/>
-              <a:t>22</a:t>
+              <a:t>24</a:t>
             </a:fld>
             <a:endParaRPr lang="en-US" dirty="0"/>
           </a:p>
@@ -10418,7 +11034,7 @@
 </p:sld>
 </file>
 
-<file path=ppt/slides/slide23.xml><?xml version="1.0" encoding="utf-8"?>
+<file path=ppt/slides/slide25.xml><?xml version="1.0" encoding="utf-8"?>
 <p:sld xmlns:a="http://schemas.openxmlformats.org/drawingml/2006/main" xmlns:r="http://schemas.openxmlformats.org/officeDocument/2006/relationships" xmlns:p="http://schemas.openxmlformats.org/presentationml/2006/main">
   <p:cSld>
     <p:spTree>
@@ -10767,13 +11383,7 @@
                             <a:rPr lang="it-IT" sz="2000" b="0" i="1" smtClean="0">
                               <a:latin typeface="Cambria Math" panose="02040503050406030204" pitchFamily="18" charset="0"/>
                             </a:rPr>
-                            <m:t>𝑑𝐿𝑔𝐿𝑓</m:t>
-                          </m:r>
-                          <m:r>
-                            <a:rPr lang="it-IT" sz="2000" b="0" i="1" smtClean="0">
-                              <a:latin typeface="Cambria Math" panose="02040503050406030204" pitchFamily="18" charset="0"/>
-                            </a:rPr>
-                            <m:t>h</m:t>
+                            <m:t>𝑑𝐿𝑔𝐿𝑓h</m:t>
                           </m:r>
                           <m:d>
                             <m:dPr>
@@ -10802,13 +11412,7 @@
                             <a:rPr lang="it-IT" sz="2000" b="0" i="1" smtClean="0">
                               <a:latin typeface="Cambria Math" panose="02040503050406030204" pitchFamily="18" charset="0"/>
                             </a:rPr>
-                            <m:t>𝑑𝐿𝑓𝐿𝑔</m:t>
-                          </m:r>
-                          <m:r>
-                            <a:rPr lang="it-IT" sz="2000" b="0" i="1" smtClean="0">
-                              <a:latin typeface="Cambria Math" panose="02040503050406030204" pitchFamily="18" charset="0"/>
-                            </a:rPr>
-                            <m:t>h</m:t>
+                            <m:t>𝑑𝐿𝑓𝐿𝑔h</m:t>
                           </m:r>
                           <m:d>
                             <m:dPr>
@@ -10980,7 +11584,7 @@
           <a:p>
             <a:fld id="{4EF59023-6175-3944-979D-CFE35E3A8267}" type="datetime1">
               <a:rPr lang="it-IT" smtClean="0"/>
-              <a:t>27/10/21</a:t>
+              <a:t>02/11/21</a:t>
             </a:fld>
             <a:endParaRPr lang="en-US" dirty="0"/>
           </a:p>
@@ -11048,7 +11652,7 @@
           <a:p>
             <a:fld id="{6D22F896-40B5-4ADD-8801-0D06FADFA095}" type="slidenum">
               <a:rPr lang="en-US" smtClean="0"/>
-              <a:t>23</a:t>
+              <a:t>25</a:t>
             </a:fld>
             <a:endParaRPr lang="en-US" dirty="0"/>
           </a:p>
@@ -11103,7 +11707,7 @@
 </p:sld>
 </file>
 
-<file path=ppt/slides/slide24.xml><?xml version="1.0" encoding="utf-8"?>
+<file path=ppt/slides/slide26.xml><?xml version="1.0" encoding="utf-8"?>
 <p:sld xmlns:a="http://schemas.openxmlformats.org/drawingml/2006/main" xmlns:r="http://schemas.openxmlformats.org/officeDocument/2006/relationships" xmlns:p="http://schemas.openxmlformats.org/presentationml/2006/main">
   <p:cSld>
     <p:spTree>
@@ -11898,7 +12502,7 @@
           <a:p>
             <a:fld id="{4EF59023-6175-3944-979D-CFE35E3A8267}" type="datetime1">
               <a:rPr lang="it-IT" smtClean="0"/>
-              <a:t>27/10/21</a:t>
+              <a:t>02/11/21</a:t>
             </a:fld>
             <a:endParaRPr lang="en-US" dirty="0"/>
           </a:p>
@@ -11966,7 +12570,7 @@
           <a:p>
             <a:fld id="{6D22F896-40B5-4ADD-8801-0D06FADFA095}" type="slidenum">
               <a:rPr lang="en-US" smtClean="0"/>
-              <a:t>24</a:t>
+              <a:t>26</a:t>
             </a:fld>
             <a:endParaRPr lang="en-US" dirty="0"/>
           </a:p>
@@ -12021,7 +12625,7 @@
 </p:sld>
 </file>
 
-<file path=ppt/slides/slide25.xml><?xml version="1.0" encoding="utf-8"?>
+<file path=ppt/slides/slide27.xml><?xml version="1.0" encoding="utf-8"?>
 <p:sld xmlns:a="http://schemas.openxmlformats.org/drawingml/2006/main" xmlns:r="http://schemas.openxmlformats.org/officeDocument/2006/relationships" xmlns:p="http://schemas.openxmlformats.org/presentationml/2006/main">
   <p:cSld>
     <p:spTree>
@@ -12252,7 +12856,7 @@
           <a:p>
             <a:fld id="{4EF59023-6175-3944-979D-CFE35E3A8267}" type="datetime1">
               <a:rPr lang="it-IT" smtClean="0"/>
-              <a:t>27/10/21</a:t>
+              <a:t>02/11/21</a:t>
             </a:fld>
             <a:endParaRPr lang="en-US" dirty="0"/>
           </a:p>
@@ -12320,7 +12924,7 @@
           <a:p>
             <a:fld id="{6D22F896-40B5-4ADD-8801-0D06FADFA095}" type="slidenum">
               <a:rPr lang="en-US" smtClean="0"/>
-              <a:t>25</a:t>
+              <a:t>27</a:t>
             </a:fld>
             <a:endParaRPr lang="en-US" dirty="0"/>
           </a:p>
@@ -12375,7 +12979,7 @@
 </p:sld>
 </file>
 
-<file path=ppt/slides/slide26.xml><?xml version="1.0" encoding="utf-8"?>
+<file path=ppt/slides/slide28.xml><?xml version="1.0" encoding="utf-8"?>
 <p:sld xmlns:a="http://schemas.openxmlformats.org/drawingml/2006/main" xmlns:r="http://schemas.openxmlformats.org/officeDocument/2006/relationships" xmlns:p="http://schemas.openxmlformats.org/presentationml/2006/main">
   <p:cSld>
     <p:spTree>
@@ -12610,7 +13214,7 @@
           <a:p>
             <a:fld id="{4EF59023-6175-3944-979D-CFE35E3A8267}" type="datetime1">
               <a:rPr lang="it-IT" smtClean="0"/>
-              <a:t>27/10/21</a:t>
+              <a:t>02/11/21</a:t>
             </a:fld>
             <a:endParaRPr lang="en-US" dirty="0"/>
           </a:p>
@@ -12678,7 +13282,7 @@
           <a:p>
             <a:fld id="{6D22F896-40B5-4ADD-8801-0D06FADFA095}" type="slidenum">
               <a:rPr lang="en-US" smtClean="0"/>
-              <a:t>26</a:t>
+              <a:t>28</a:t>
             </a:fld>
             <a:endParaRPr lang="en-US" dirty="0"/>
           </a:p>
@@ -13044,7 +13648,7 @@
           <a:p>
             <a:fld id="{4EF59023-6175-3944-979D-CFE35E3A8267}" type="datetime1">
               <a:rPr lang="it-IT" smtClean="0"/>
-              <a:t>27/10/21</a:t>
+              <a:t>02/11/21</a:t>
             </a:fld>
             <a:endParaRPr lang="en-US" dirty="0"/>
           </a:p>
@@ -15085,7 +15689,7 @@
           <a:p>
             <a:fld id="{4EF59023-6175-3944-979D-CFE35E3A8267}" type="datetime1">
               <a:rPr lang="it-IT" smtClean="0"/>
-              <a:t>27/10/21</a:t>
+              <a:t>02/11/21</a:t>
             </a:fld>
             <a:endParaRPr lang="en-US" dirty="0"/>
           </a:p>
@@ -15459,7 +16063,7 @@
           <a:p>
             <a:fld id="{4EF59023-6175-3944-979D-CFE35E3A8267}" type="datetime1">
               <a:rPr lang="it-IT" smtClean="0"/>
-              <a:t>27/10/21</a:t>
+              <a:t>02/11/21</a:t>
             </a:fld>
             <a:endParaRPr lang="en-US" dirty="0"/>
           </a:p>
@@ -15599,8 +16203,8 @@
           <a:chExt cx="0" cy="0"/>
         </a:xfrm>
       </p:grpSpPr>
-      <mc:AlternateContent xmlns:mc="http://schemas.openxmlformats.org/markup-compatibility/2006">
-        <mc:Choice xmlns:a14="http://schemas.microsoft.com/office/drawing/2010/main" Requires="a14">
+      <mc:AlternateContent xmlns:mc="http://schemas.openxmlformats.org/markup-compatibility/2006" xmlns:a14="http://schemas.microsoft.com/office/drawing/2010/main">
+        <mc:Choice Requires="a14">
           <p:sp>
             <p:nvSpPr>
               <p:cNvPr id="5" name="CasellaDiTesto 4">
@@ -16064,7 +16668,7 @@
             </p:txBody>
           </p:sp>
         </mc:Choice>
-        <mc:Fallback>
+        <mc:Fallback xmlns="">
           <p:sp>
             <p:nvSpPr>
               <p:cNvPr id="5" name="CasellaDiTesto 4">
@@ -16252,7 +16856,7 @@
           <a:p>
             <a:fld id="{4EF59023-6175-3944-979D-CFE35E3A8267}" type="datetime1">
               <a:rPr lang="it-IT" smtClean="0"/>
-              <a:t>27/10/21</a:t>
+              <a:t>02/11/21</a:t>
             </a:fld>
             <a:endParaRPr lang="en-US" dirty="0"/>
           </a:p>
@@ -16839,7 +17443,7 @@
           <a:p>
             <a:fld id="{4EF59023-6175-3944-979D-CFE35E3A8267}" type="datetime1">
               <a:rPr lang="it-IT" smtClean="0"/>
-              <a:t>27/10/21</a:t>
+              <a:t>02/11/21</a:t>
             </a:fld>
             <a:endParaRPr lang="en-US" dirty="0"/>
           </a:p>
@@ -17610,7 +18214,7 @@
           <a:p>
             <a:fld id="{4EF59023-6175-3944-979D-CFE35E3A8267}" type="datetime1">
               <a:rPr lang="it-IT" smtClean="0"/>
-              <a:t>27/10/21</a:t>
+              <a:t>02/11/21</a:t>
             </a:fld>
             <a:endParaRPr lang="en-US" dirty="0"/>
           </a:p>
@@ -17979,7 +18583,7 @@
           <a:p>
             <a:fld id="{4EF59023-6175-3944-979D-CFE35E3A8267}" type="datetime1">
               <a:rPr lang="it-IT" smtClean="0"/>
-              <a:t>27/10/21</a:t>
+              <a:t>02/11/21</a:t>
             </a:fld>
             <a:endParaRPr lang="en-US" dirty="0"/>
           </a:p>

</xml_diff>

<commit_message>
Corretto controllore PID per FeedbackLinearization
</commit_message>
<xml_diff>
--- a/Relazione/Presentazione.pptx
+++ b/Relazione/Presentazione.pptx
@@ -286,7 +286,7 @@
           <a:p>
             <a:fld id="{27153579-3A4D-BB42-BD49-BB0F80A81A61}" type="datetimeFigureOut">
               <a:rPr lang="it-IT" smtClean="0"/>
-              <a:t>02/11/21</a:t>
+              <a:t>14/11/21</a:t>
             </a:fld>
             <a:endParaRPr lang="it-IT"/>
           </a:p>
@@ -459,7 +459,7 @@
           <a:p>
             <a:fld id="{27153579-3A4D-BB42-BD49-BB0F80A81A61}" type="datetimeFigureOut">
               <a:rPr lang="it-IT" smtClean="0"/>
-              <a:t>02/11/21</a:t>
+              <a:t>14/11/21</a:t>
             </a:fld>
             <a:endParaRPr lang="it-IT"/>
           </a:p>
@@ -642,7 +642,7 @@
           <a:p>
             <a:fld id="{27153579-3A4D-BB42-BD49-BB0F80A81A61}" type="datetimeFigureOut">
               <a:rPr lang="it-IT" smtClean="0"/>
-              <a:t>02/11/21</a:t>
+              <a:t>14/11/21</a:t>
             </a:fld>
             <a:endParaRPr lang="it-IT"/>
           </a:p>
@@ -815,7 +815,7 @@
           <a:p>
             <a:fld id="{27153579-3A4D-BB42-BD49-BB0F80A81A61}" type="datetimeFigureOut">
               <a:rPr lang="it-IT" smtClean="0"/>
-              <a:t>02/11/21</a:t>
+              <a:t>14/11/21</a:t>
             </a:fld>
             <a:endParaRPr lang="it-IT"/>
           </a:p>
@@ -1093,7 +1093,7 @@
           <a:p>
             <a:fld id="{27153579-3A4D-BB42-BD49-BB0F80A81A61}" type="datetimeFigureOut">
               <a:rPr lang="it-IT" smtClean="0"/>
-              <a:t>02/11/21</a:t>
+              <a:t>14/11/21</a:t>
             </a:fld>
             <a:endParaRPr lang="it-IT"/>
           </a:p>
@@ -1308,7 +1308,7 @@
           <a:p>
             <a:fld id="{27153579-3A4D-BB42-BD49-BB0F80A81A61}" type="datetimeFigureOut">
               <a:rPr lang="it-IT" smtClean="0"/>
-              <a:t>02/11/21</a:t>
+              <a:t>14/11/21</a:t>
             </a:fld>
             <a:endParaRPr lang="it-IT"/>
           </a:p>
@@ -1676,7 +1676,7 @@
           <a:p>
             <a:fld id="{27153579-3A4D-BB42-BD49-BB0F80A81A61}" type="datetimeFigureOut">
               <a:rPr lang="it-IT" smtClean="0"/>
-              <a:t>02/11/21</a:t>
+              <a:t>14/11/21</a:t>
             </a:fld>
             <a:endParaRPr lang="it-IT"/>
           </a:p>
@@ -1817,7 +1817,7 @@
           <a:p>
             <a:fld id="{27153579-3A4D-BB42-BD49-BB0F80A81A61}" type="datetimeFigureOut">
               <a:rPr lang="it-IT" smtClean="0"/>
-              <a:t>02/11/21</a:t>
+              <a:t>14/11/21</a:t>
             </a:fld>
             <a:endParaRPr lang="it-IT"/>
           </a:p>
@@ -1930,7 +1930,7 @@
           <a:p>
             <a:fld id="{27153579-3A4D-BB42-BD49-BB0F80A81A61}" type="datetimeFigureOut">
               <a:rPr lang="it-IT" smtClean="0"/>
-              <a:t>02/11/21</a:t>
+              <a:t>14/11/21</a:t>
             </a:fld>
             <a:endParaRPr lang="it-IT"/>
           </a:p>
@@ -2219,7 +2219,7 @@
           <a:p>
             <a:fld id="{27153579-3A4D-BB42-BD49-BB0F80A81A61}" type="datetimeFigureOut">
               <a:rPr lang="it-IT" smtClean="0"/>
-              <a:t>02/11/21</a:t>
+              <a:t>14/11/21</a:t>
             </a:fld>
             <a:endParaRPr lang="it-IT"/>
           </a:p>
@@ -2510,7 +2510,7 @@
           <a:p>
             <a:fld id="{27153579-3A4D-BB42-BD49-BB0F80A81A61}" type="datetimeFigureOut">
               <a:rPr lang="it-IT" smtClean="0"/>
-              <a:t>02/11/21</a:t>
+              <a:t>14/11/21</a:t>
             </a:fld>
             <a:endParaRPr lang="it-IT"/>
           </a:p>
@@ -2726,7 +2726,7 @@
           <a:p>
             <a:fld id="{27153579-3A4D-BB42-BD49-BB0F80A81A61}" type="datetimeFigureOut">
               <a:rPr lang="it-IT" smtClean="0"/>
-              <a:t>02/11/21</a:t>
+              <a:t>14/11/21</a:t>
             </a:fld>
             <a:endParaRPr lang="it-IT"/>
           </a:p>
@@ -3484,7 +3484,7 @@
           <a:p>
             <a:fld id="{4EF59023-6175-3944-979D-CFE35E3A8267}" type="datetime1">
               <a:rPr lang="it-IT" smtClean="0"/>
-              <a:t>02/11/21</a:t>
+              <a:t>14/11/21</a:t>
             </a:fld>
             <a:endParaRPr lang="en-US" dirty="0"/>
           </a:p>
@@ -4263,7 +4263,7 @@
           <a:p>
             <a:fld id="{4EF59023-6175-3944-979D-CFE35E3A8267}" type="datetime1">
               <a:rPr lang="it-IT" smtClean="0"/>
-              <a:t>02/11/21</a:t>
+              <a:t>14/11/21</a:t>
             </a:fld>
             <a:endParaRPr lang="en-US" dirty="0"/>
           </a:p>
@@ -4648,7 +4648,7 @@
           <a:p>
             <a:fld id="{4EF59023-6175-3944-979D-CFE35E3A8267}" type="datetime1">
               <a:rPr lang="it-IT" smtClean="0"/>
-              <a:t>02/11/21</a:t>
+              <a:t>14/11/21</a:t>
             </a:fld>
             <a:endParaRPr lang="en-US" dirty="0"/>
           </a:p>
@@ -4976,7 +4976,7 @@
           <a:p>
             <a:fld id="{4EF59023-6175-3944-979D-CFE35E3A8267}" type="datetime1">
               <a:rPr lang="it-IT" smtClean="0"/>
-              <a:t>02/11/21</a:t>
+              <a:t>14/11/21</a:t>
             </a:fld>
             <a:endParaRPr lang="en-US" dirty="0"/>
           </a:p>
@@ -5763,7 +5763,7 @@
           <a:p>
             <a:fld id="{4EF59023-6175-3944-979D-CFE35E3A8267}" type="datetime1">
               <a:rPr lang="it-IT" smtClean="0"/>
-              <a:t>02/11/21</a:t>
+              <a:t>14/11/21</a:t>
             </a:fld>
             <a:endParaRPr lang="en-US" dirty="0"/>
           </a:p>
@@ -6298,7 +6298,7 @@
           <a:p>
             <a:fld id="{4EF59023-6175-3944-979D-CFE35E3A8267}" type="datetime1">
               <a:rPr lang="it-IT" smtClean="0"/>
-              <a:t>02/11/21</a:t>
+              <a:t>14/11/21</a:t>
             </a:fld>
             <a:endParaRPr lang="en-US" dirty="0"/>
           </a:p>
@@ -6604,7 +6604,7 @@
           <a:p>
             <a:fld id="{4EF59023-6175-3944-979D-CFE35E3A8267}" type="datetime1">
               <a:rPr lang="it-IT" smtClean="0"/>
-              <a:t>02/11/21</a:t>
+              <a:t>14/11/21</a:t>
             </a:fld>
             <a:endParaRPr lang="en-US" dirty="0"/>
           </a:p>
@@ -7188,7 +7188,7 @@
           <a:p>
             <a:fld id="{4EF59023-6175-3944-979D-CFE35E3A8267}" type="datetime1">
               <a:rPr lang="it-IT" smtClean="0"/>
-              <a:t>02/11/21</a:t>
+              <a:t>14/11/21</a:t>
             </a:fld>
             <a:endParaRPr lang="en-US" dirty="0"/>
           </a:p>
@@ -7418,7 +7418,7 @@
           <a:p>
             <a:fld id="{4EF59023-6175-3944-979D-CFE35E3A8267}" type="datetime1">
               <a:rPr lang="it-IT" smtClean="0"/>
-              <a:t>02/11/21</a:t>
+              <a:t>14/11/21</a:t>
             </a:fld>
             <a:endParaRPr lang="en-US" dirty="0"/>
           </a:p>
@@ -7678,7 +7678,7 @@
           <a:p>
             <a:fld id="{4EF59023-6175-3944-979D-CFE35E3A8267}" type="datetime1">
               <a:rPr lang="it-IT" smtClean="0"/>
-              <a:t>02/11/21</a:t>
+              <a:t>14/11/21</a:t>
             </a:fld>
             <a:endParaRPr lang="en-US" dirty="0"/>
           </a:p>
@@ -8180,7 +8180,7 @@
           <a:p>
             <a:fld id="{4EF59023-6175-3944-979D-CFE35E3A8267}" type="datetime1">
               <a:rPr lang="it-IT" smtClean="0"/>
-              <a:t>02/11/21</a:t>
+              <a:t>14/11/21</a:t>
             </a:fld>
             <a:endParaRPr lang="en-US" dirty="0"/>
           </a:p>
@@ -8459,7 +8459,7 @@
           <a:p>
             <a:fld id="{4EF59023-6175-3944-979D-CFE35E3A8267}" type="datetime1">
               <a:rPr lang="it-IT" smtClean="0"/>
-              <a:t>02/11/21</a:t>
+              <a:t>14/11/21</a:t>
             </a:fld>
             <a:endParaRPr lang="en-US" dirty="0"/>
           </a:p>
@@ -8917,7 +8917,7 @@
           <a:p>
             <a:fld id="{4EF59023-6175-3944-979D-CFE35E3A8267}" type="datetime1">
               <a:rPr lang="it-IT" smtClean="0"/>
-              <a:t>02/11/21</a:t>
+              <a:t>14/11/21</a:t>
             </a:fld>
             <a:endParaRPr lang="en-US" dirty="0"/>
           </a:p>
@@ -9280,7 +9280,7 @@
           <a:p>
             <a:fld id="{4EF59023-6175-3944-979D-CFE35E3A8267}" type="datetime1">
               <a:rPr lang="it-IT" smtClean="0"/>
-              <a:t>02/11/21</a:t>
+              <a:t>14/11/21</a:t>
             </a:fld>
             <a:endParaRPr lang="en-US" dirty="0"/>
           </a:p>
@@ -9703,7 +9703,7 @@
           <a:p>
             <a:fld id="{4EF59023-6175-3944-979D-CFE35E3A8267}" type="datetime1">
               <a:rPr lang="it-IT" smtClean="0"/>
-              <a:t>02/11/21</a:t>
+              <a:t>14/11/21</a:t>
             </a:fld>
             <a:endParaRPr lang="en-US" dirty="0"/>
           </a:p>
@@ -10911,7 +10911,7 @@
           <a:p>
             <a:fld id="{4EF59023-6175-3944-979D-CFE35E3A8267}" type="datetime1">
               <a:rPr lang="it-IT" smtClean="0"/>
-              <a:t>02/11/21</a:t>
+              <a:t>14/11/21</a:t>
             </a:fld>
             <a:endParaRPr lang="en-US" dirty="0"/>
           </a:p>
@@ -11584,7 +11584,7 @@
           <a:p>
             <a:fld id="{4EF59023-6175-3944-979D-CFE35E3A8267}" type="datetime1">
               <a:rPr lang="it-IT" smtClean="0"/>
-              <a:t>02/11/21</a:t>
+              <a:t>14/11/21</a:t>
             </a:fld>
             <a:endParaRPr lang="en-US" dirty="0"/>
           </a:p>
@@ -12502,7 +12502,7 @@
           <a:p>
             <a:fld id="{4EF59023-6175-3944-979D-CFE35E3A8267}" type="datetime1">
               <a:rPr lang="it-IT" smtClean="0"/>
-              <a:t>02/11/21</a:t>
+              <a:t>14/11/21</a:t>
             </a:fld>
             <a:endParaRPr lang="en-US" dirty="0"/>
           </a:p>
@@ -12743,7 +12743,15 @@
           <a:p>
             <a:r>
               <a:rPr lang="it-IT" sz="2000" dirty="0"/>
-              <a:t>Per il sistema linearizzato è stato progettato un controllore di tipo PD, imponendo come riferimento il vettore </a:t>
+              <a:t>Per il sistema linearizzato è stato progettato un controllore di </a:t>
+            </a:r>
+            <a:r>
+              <a:rPr lang="it-IT" sz="2000"/>
+              <a:t>tipo PID</a:t>
+            </a:r>
+            <a:r>
+              <a:rPr lang="it-IT" sz="2000" dirty="0"/>
+              <a:t>, imponendo come riferimento il vettore </a:t>
             </a:r>
             <a:r>
               <a:rPr lang="it-IT" sz="2000" dirty="0" err="1"/>
@@ -12856,7 +12864,7 @@
           <a:p>
             <a:fld id="{4EF59023-6175-3944-979D-CFE35E3A8267}" type="datetime1">
               <a:rPr lang="it-IT" smtClean="0"/>
-              <a:t>02/11/21</a:t>
+              <a:t>14/11/21</a:t>
             </a:fld>
             <a:endParaRPr lang="en-US" dirty="0"/>
           </a:p>
@@ -13214,7 +13222,7 @@
           <a:p>
             <a:fld id="{4EF59023-6175-3944-979D-CFE35E3A8267}" type="datetime1">
               <a:rPr lang="it-IT" smtClean="0"/>
-              <a:t>02/11/21</a:t>
+              <a:t>14/11/21</a:t>
             </a:fld>
             <a:endParaRPr lang="en-US" dirty="0"/>
           </a:p>
@@ -13648,7 +13656,7 @@
           <a:p>
             <a:fld id="{4EF59023-6175-3944-979D-CFE35E3A8267}" type="datetime1">
               <a:rPr lang="it-IT" smtClean="0"/>
-              <a:t>02/11/21</a:t>
+              <a:t>14/11/21</a:t>
             </a:fld>
             <a:endParaRPr lang="en-US" dirty="0"/>
           </a:p>
@@ -15689,7 +15697,7 @@
           <a:p>
             <a:fld id="{4EF59023-6175-3944-979D-CFE35E3A8267}" type="datetime1">
               <a:rPr lang="it-IT" smtClean="0"/>
-              <a:t>02/11/21</a:t>
+              <a:t>14/11/21</a:t>
             </a:fld>
             <a:endParaRPr lang="en-US" dirty="0"/>
           </a:p>
@@ -16063,7 +16071,7 @@
           <a:p>
             <a:fld id="{4EF59023-6175-3944-979D-CFE35E3A8267}" type="datetime1">
               <a:rPr lang="it-IT" smtClean="0"/>
-              <a:t>02/11/21</a:t>
+              <a:t>14/11/21</a:t>
             </a:fld>
             <a:endParaRPr lang="en-US" dirty="0"/>
           </a:p>
@@ -16856,7 +16864,7 @@
           <a:p>
             <a:fld id="{4EF59023-6175-3944-979D-CFE35E3A8267}" type="datetime1">
               <a:rPr lang="it-IT" smtClean="0"/>
-              <a:t>02/11/21</a:t>
+              <a:t>14/11/21</a:t>
             </a:fld>
             <a:endParaRPr lang="en-US" dirty="0"/>
           </a:p>
@@ -17443,7 +17451,7 @@
           <a:p>
             <a:fld id="{4EF59023-6175-3944-979D-CFE35E3A8267}" type="datetime1">
               <a:rPr lang="it-IT" smtClean="0"/>
-              <a:t>02/11/21</a:t>
+              <a:t>14/11/21</a:t>
             </a:fld>
             <a:endParaRPr lang="en-US" dirty="0"/>
           </a:p>
@@ -18214,7 +18222,7 @@
           <a:p>
             <a:fld id="{4EF59023-6175-3944-979D-CFE35E3A8267}" type="datetime1">
               <a:rPr lang="it-IT" smtClean="0"/>
-              <a:t>02/11/21</a:t>
+              <a:t>14/11/21</a:t>
             </a:fld>
             <a:endParaRPr lang="en-US" dirty="0"/>
           </a:p>
@@ -18583,7 +18591,7 @@
           <a:p>
             <a:fld id="{4EF59023-6175-3944-979D-CFE35E3A8267}" type="datetime1">
               <a:rPr lang="it-IT" smtClean="0"/>
-              <a:t>02/11/21</a:t>
+              <a:t>14/11/21</a:t>
             </a:fld>
             <a:endParaRPr lang="en-US" dirty="0"/>
           </a:p>

</xml_diff>

<commit_message>
Aggiornamento relazione secondo le indicazioni di Grioli.
</commit_message>
<xml_diff>
--- a/Relazione/Presentazione.pptx
+++ b/Relazione/Presentazione.pptx
@@ -38,12 +38,13 @@
     <p:sldId id="280" r:id="rId32"/>
     <p:sldId id="281" r:id="rId33"/>
     <p:sldId id="294" r:id="rId34"/>
-    <p:sldId id="295" r:id="rId35"/>
-    <p:sldId id="296" r:id="rId36"/>
-    <p:sldId id="298" r:id="rId37"/>
-    <p:sldId id="299" r:id="rId38"/>
-    <p:sldId id="301" r:id="rId39"/>
-    <p:sldId id="302" r:id="rId40"/>
+    <p:sldId id="303" r:id="rId35"/>
+    <p:sldId id="295" r:id="rId36"/>
+    <p:sldId id="296" r:id="rId37"/>
+    <p:sldId id="298" r:id="rId38"/>
+    <p:sldId id="299" r:id="rId39"/>
+    <p:sldId id="301" r:id="rId40"/>
+    <p:sldId id="302" r:id="rId41"/>
   </p:sldIdLst>
   <p:sldSz cx="12192000" cy="6858000"/>
   <p:notesSz cx="6858000" cy="9144000"/>
@@ -297,7 +298,7 @@
           <a:p>
             <a:fld id="{27153579-3A4D-BB42-BD49-BB0F80A81A61}" type="datetimeFigureOut">
               <a:rPr lang="it-IT" smtClean="0"/>
-              <a:t>08/01/22</a:t>
+              <a:t>27/01/2022</a:t>
             </a:fld>
             <a:endParaRPr lang="it-IT"/>
           </a:p>
@@ -470,7 +471,7 @@
           <a:p>
             <a:fld id="{27153579-3A4D-BB42-BD49-BB0F80A81A61}" type="datetimeFigureOut">
               <a:rPr lang="it-IT" smtClean="0"/>
-              <a:t>08/01/22</a:t>
+              <a:t>27/01/2022</a:t>
             </a:fld>
             <a:endParaRPr lang="it-IT"/>
           </a:p>
@@ -653,7 +654,7 @@
           <a:p>
             <a:fld id="{27153579-3A4D-BB42-BD49-BB0F80A81A61}" type="datetimeFigureOut">
               <a:rPr lang="it-IT" smtClean="0"/>
-              <a:t>08/01/22</a:t>
+              <a:t>27/01/2022</a:t>
             </a:fld>
             <a:endParaRPr lang="it-IT"/>
           </a:p>
@@ -826,7 +827,7 @@
           <a:p>
             <a:fld id="{27153579-3A4D-BB42-BD49-BB0F80A81A61}" type="datetimeFigureOut">
               <a:rPr lang="it-IT" smtClean="0"/>
-              <a:t>08/01/22</a:t>
+              <a:t>27/01/2022</a:t>
             </a:fld>
             <a:endParaRPr lang="it-IT"/>
           </a:p>
@@ -1104,7 +1105,7 @@
           <a:p>
             <a:fld id="{27153579-3A4D-BB42-BD49-BB0F80A81A61}" type="datetimeFigureOut">
               <a:rPr lang="it-IT" smtClean="0"/>
-              <a:t>08/01/22</a:t>
+              <a:t>27/01/2022</a:t>
             </a:fld>
             <a:endParaRPr lang="it-IT"/>
           </a:p>
@@ -1319,7 +1320,7 @@
           <a:p>
             <a:fld id="{27153579-3A4D-BB42-BD49-BB0F80A81A61}" type="datetimeFigureOut">
               <a:rPr lang="it-IT" smtClean="0"/>
-              <a:t>08/01/22</a:t>
+              <a:t>27/01/2022</a:t>
             </a:fld>
             <a:endParaRPr lang="it-IT"/>
           </a:p>
@@ -1687,7 +1688,7 @@
           <a:p>
             <a:fld id="{27153579-3A4D-BB42-BD49-BB0F80A81A61}" type="datetimeFigureOut">
               <a:rPr lang="it-IT" smtClean="0"/>
-              <a:t>08/01/22</a:t>
+              <a:t>27/01/2022</a:t>
             </a:fld>
             <a:endParaRPr lang="it-IT"/>
           </a:p>
@@ -1828,7 +1829,7 @@
           <a:p>
             <a:fld id="{27153579-3A4D-BB42-BD49-BB0F80A81A61}" type="datetimeFigureOut">
               <a:rPr lang="it-IT" smtClean="0"/>
-              <a:t>08/01/22</a:t>
+              <a:t>27/01/2022</a:t>
             </a:fld>
             <a:endParaRPr lang="it-IT"/>
           </a:p>
@@ -1941,7 +1942,7 @@
           <a:p>
             <a:fld id="{27153579-3A4D-BB42-BD49-BB0F80A81A61}" type="datetimeFigureOut">
               <a:rPr lang="it-IT" smtClean="0"/>
-              <a:t>08/01/22</a:t>
+              <a:t>27/01/2022</a:t>
             </a:fld>
             <a:endParaRPr lang="it-IT"/>
           </a:p>
@@ -2230,7 +2231,7 @@
           <a:p>
             <a:fld id="{27153579-3A4D-BB42-BD49-BB0F80A81A61}" type="datetimeFigureOut">
               <a:rPr lang="it-IT" smtClean="0"/>
-              <a:t>08/01/22</a:t>
+              <a:t>27/01/2022</a:t>
             </a:fld>
             <a:endParaRPr lang="it-IT"/>
           </a:p>
@@ -2521,7 +2522,7 @@
           <a:p>
             <a:fld id="{27153579-3A4D-BB42-BD49-BB0F80A81A61}" type="datetimeFigureOut">
               <a:rPr lang="it-IT" smtClean="0"/>
-              <a:t>08/01/22</a:t>
+              <a:t>27/01/2022</a:t>
             </a:fld>
             <a:endParaRPr lang="it-IT"/>
           </a:p>
@@ -2737,7 +2738,7 @@
           <a:p>
             <a:fld id="{27153579-3A4D-BB42-BD49-BB0F80A81A61}" type="datetimeFigureOut">
               <a:rPr lang="it-IT" smtClean="0"/>
-              <a:t>08/01/22</a:t>
+              <a:t>27/01/2022</a:t>
             </a:fld>
             <a:endParaRPr lang="it-IT"/>
           </a:p>
@@ -3258,6 +3259,10 @@
               <a:rPr lang="it-IT" sz="2200" u="sng" dirty="0"/>
               <a:t>Tavole Applicative</a:t>
             </a:r>
+            <a:r>
+              <a:rPr lang="it-IT" dirty="0"/>
+              <a:t/>
+            </a:r>
             <a:br>
               <a:rPr lang="it-IT" dirty="0"/>
             </a:br>
@@ -3481,7 +3486,7 @@
           <a:p>
             <a:fld id="{4EF59023-6175-3944-979D-CFE35E3A8267}" type="datetime1">
               <a:rPr lang="it-IT" smtClean="0"/>
-              <a:t>10/01/22</a:t>
+              <a:t>27/01/2022</a:t>
             </a:fld>
             <a:endParaRPr lang="en-US" dirty="0"/>
           </a:p>
@@ -3795,7 +3800,7 @@
           <a:p>
             <a:fld id="{4EF59023-6175-3944-979D-CFE35E3A8267}" type="datetime1">
               <a:rPr lang="it-IT" smtClean="0"/>
-              <a:t>10/01/22</a:t>
+              <a:t>27/01/2022</a:t>
             </a:fld>
             <a:endParaRPr lang="en-US" dirty="0"/>
           </a:p>
@@ -4139,7 +4144,7 @@
           <a:p>
             <a:fld id="{4EF59023-6175-3944-979D-CFE35E3A8267}" type="datetime1">
               <a:rPr lang="it-IT" smtClean="0"/>
-              <a:t>10/01/22</a:t>
+              <a:t>27/01/2022</a:t>
             </a:fld>
             <a:endParaRPr lang="en-US" dirty="0"/>
           </a:p>
@@ -4461,7 +4466,7 @@
           <a:p>
             <a:fld id="{4EF59023-6175-3944-979D-CFE35E3A8267}" type="datetime1">
               <a:rPr lang="it-IT" smtClean="0"/>
-              <a:t>10/01/22</a:t>
+              <a:t>27/01/2022</a:t>
             </a:fld>
             <a:endParaRPr lang="en-US" dirty="0"/>
           </a:p>
@@ -4819,7 +4824,7 @@
           <a:p>
             <a:fld id="{4EF59023-6175-3944-979D-CFE35E3A8267}" type="datetime1">
               <a:rPr lang="it-IT" smtClean="0"/>
-              <a:t>11/01/22</a:t>
+              <a:t>27/01/2022</a:t>
             </a:fld>
             <a:endParaRPr lang="en-US" dirty="0"/>
           </a:p>
@@ -5132,7 +5137,7 @@
           <a:p>
             <a:fld id="{4EF59023-6175-3944-979D-CFE35E3A8267}" type="datetime1">
               <a:rPr lang="it-IT" smtClean="0"/>
-              <a:t>11/01/22</a:t>
+              <a:t>27/01/2022</a:t>
             </a:fld>
             <a:endParaRPr lang="en-US" dirty="0"/>
           </a:p>
@@ -5242,8 +5247,8 @@
           </a:prstGeom>
         </p:spPr>
       </p:pic>
-      <mc:AlternateContent xmlns:mc="http://schemas.openxmlformats.org/markup-compatibility/2006">
-        <mc:Choice xmlns:a14="http://schemas.microsoft.com/office/drawing/2010/main" Requires="a14">
+      <mc:AlternateContent xmlns:mc="http://schemas.openxmlformats.org/markup-compatibility/2006" xmlns:a14="http://schemas.microsoft.com/office/drawing/2010/main">
+        <mc:Choice Requires="a14">
           <p:sp>
             <p:nvSpPr>
               <p:cNvPr id="3" name="CasellaDiTesto 2">
@@ -5708,7 +5713,7 @@
             </p:txBody>
           </p:sp>
         </mc:Choice>
-        <mc:Fallback>
+        <mc:Fallback xmlns="">
           <p:sp>
             <p:nvSpPr>
               <p:cNvPr id="3" name="CasellaDiTesto 2">
@@ -5838,7 +5843,7 @@
         </p:spPr>
         <p:txBody>
           <a:bodyPr vert="horz" lIns="91440" tIns="45720" rIns="91440" bIns="45720" rtlCol="0" anchor="ctr">
-            <a:normAutofit fontScale="85000" lnSpcReduction="20000"/>
+            <a:normAutofit fontScale="92500" lnSpcReduction="20000"/>
           </a:bodyPr>
           <a:lstStyle>
             <a:lvl1pPr algn="l" defTabSz="914400" rtl="0" eaLnBrk="1" latinLnBrk="0" hangingPunct="1">
@@ -5963,7 +5968,7 @@
           <a:p>
             <a:fld id="{4EF59023-6175-3944-979D-CFE35E3A8267}" type="datetime1">
               <a:rPr lang="it-IT" smtClean="0"/>
-              <a:t>11/01/22</a:t>
+              <a:t>27/01/2022</a:t>
             </a:fld>
             <a:endParaRPr lang="en-US" dirty="0"/>
           </a:p>
@@ -6313,7 +6318,7 @@
         </p:spPr>
         <p:txBody>
           <a:bodyPr vert="horz" lIns="91440" tIns="45720" rIns="91440" bIns="45720" rtlCol="0" anchor="ctr">
-            <a:normAutofit fontScale="85000" lnSpcReduction="20000"/>
+            <a:normAutofit fontScale="92500" lnSpcReduction="20000"/>
           </a:bodyPr>
           <a:lstStyle>
             <a:lvl1pPr algn="l" defTabSz="914400" rtl="0" eaLnBrk="1" latinLnBrk="0" hangingPunct="1">
@@ -6386,7 +6391,7 @@
           <a:p>
             <a:fld id="{4EF59023-6175-3944-979D-CFE35E3A8267}" type="datetime1">
               <a:rPr lang="it-IT" smtClean="0"/>
-              <a:t>11/01/22</a:t>
+              <a:t>27/01/2022</a:t>
             </a:fld>
             <a:endParaRPr lang="en-US" dirty="0"/>
           </a:p>
@@ -6624,7 +6629,7 @@
         </p:spPr>
         <p:txBody>
           <a:bodyPr vert="horz" lIns="91440" tIns="45720" rIns="91440" bIns="45720" rtlCol="0" anchor="ctr">
-            <a:normAutofit fontScale="85000" lnSpcReduction="20000"/>
+            <a:normAutofit fontScale="92500" lnSpcReduction="20000"/>
           </a:bodyPr>
           <a:lstStyle>
             <a:lvl1pPr algn="l" defTabSz="914400" rtl="0" eaLnBrk="1" latinLnBrk="0" hangingPunct="1">
@@ -6920,7 +6925,7 @@
           <a:p>
             <a:fld id="{4EF59023-6175-3944-979D-CFE35E3A8267}" type="datetime1">
               <a:rPr lang="it-IT" smtClean="0"/>
-              <a:t>08/01/22</a:t>
+              <a:t>27/01/2022</a:t>
             </a:fld>
             <a:endParaRPr lang="en-US" dirty="0"/>
           </a:p>
@@ -7145,7 +7150,7 @@
         </p:spPr>
         <p:txBody>
           <a:bodyPr vert="horz" lIns="91440" tIns="45720" rIns="91440" bIns="45720" rtlCol="0" anchor="ctr">
-            <a:normAutofit fontScale="85000" lnSpcReduction="20000"/>
+            <a:normAutofit fontScale="92500" lnSpcReduction="20000"/>
           </a:bodyPr>
           <a:lstStyle>
             <a:lvl1pPr algn="l" defTabSz="914400" rtl="0" eaLnBrk="1" latinLnBrk="0" hangingPunct="1">
@@ -7226,7 +7231,7 @@
           <a:p>
             <a:fld id="{4EF59023-6175-3944-979D-CFE35E3A8267}" type="datetime1">
               <a:rPr lang="it-IT" smtClean="0"/>
-              <a:t>08/01/22</a:t>
+              <a:t>27/01/2022</a:t>
             </a:fld>
             <a:endParaRPr lang="en-US" dirty="0"/>
           </a:p>
@@ -7602,18 +7607,9 @@
               </a:buClr>
             </a:pPr>
             <a:r>
-              <a:rPr lang="it-IT" dirty="0" err="1"/>
-              <a:t>Granty</a:t>
-            </a:r>
-            <a:r>
               <a:rPr lang="it-IT" dirty="0"/>
-              <a:t> </a:t>
-            </a:r>
-            <a:r>
-              <a:rPr lang="it-IT" dirty="0" err="1"/>
-              <a:t>crane</a:t>
-            </a:r>
-            <a:endParaRPr lang="it-IT" dirty="0"/>
+              <a:t>Gantry crane</a:t>
+            </a:r>
           </a:p>
           <a:p>
             <a:pPr lvl="1">
@@ -7678,7 +7674,7 @@
           <a:p>
             <a:fld id="{4EF59023-6175-3944-979D-CFE35E3A8267}" type="datetime1">
               <a:rPr lang="it-IT" smtClean="0"/>
-              <a:t>08/01/22</a:t>
+              <a:t>27/01/2022</a:t>
             </a:fld>
             <a:endParaRPr lang="en-US" dirty="0"/>
           </a:p>
@@ -7833,7 +7829,7 @@
         </p:spPr>
         <p:txBody>
           <a:bodyPr vert="horz" lIns="91440" tIns="45720" rIns="91440" bIns="45720" rtlCol="0" anchor="ctr">
-            <a:normAutofit fontScale="85000" lnSpcReduction="20000"/>
+            <a:normAutofit fontScale="92500" lnSpcReduction="20000"/>
           </a:bodyPr>
           <a:lstStyle>
             <a:lvl1pPr algn="l" defTabSz="914400" rtl="0" eaLnBrk="1" latinLnBrk="0" hangingPunct="1">
@@ -7886,8 +7882,8 @@
           </a:p>
         </p:txBody>
       </p:sp>
-      <mc:AlternateContent xmlns:mc="http://schemas.openxmlformats.org/markup-compatibility/2006">
-        <mc:Choice xmlns:a14="http://schemas.microsoft.com/office/drawing/2010/main" Requires="a14">
+      <mc:AlternateContent xmlns:mc="http://schemas.openxmlformats.org/markup-compatibility/2006" xmlns:a14="http://schemas.microsoft.com/office/drawing/2010/main">
+        <mc:Choice Requires="a14">
           <p:sp>
             <p:nvSpPr>
               <p:cNvPr id="16" name="Segnaposto contenuto 15">
@@ -8144,7 +8140,7 @@
             </p:txBody>
           </p:sp>
         </mc:Choice>
-        <mc:Fallback>
+        <mc:Fallback xmlns="">
           <p:sp>
             <p:nvSpPr>
               <p:cNvPr id="16" name="Segnaposto contenuto 15">
@@ -8216,7 +8212,7 @@
           <a:p>
             <a:fld id="{4EF59023-6175-3944-979D-CFE35E3A8267}" type="datetime1">
               <a:rPr lang="it-IT" smtClean="0"/>
-              <a:t>08/01/22</a:t>
+              <a:t>27/01/2022</a:t>
             </a:fld>
             <a:endParaRPr lang="en-US" dirty="0"/>
           </a:p>
@@ -8411,7 +8407,7 @@
         </p:spPr>
         <p:txBody>
           <a:bodyPr vert="horz" lIns="91440" tIns="45720" rIns="91440" bIns="45720" rtlCol="0" anchor="ctr">
-            <a:normAutofit fontScale="85000" lnSpcReduction="20000"/>
+            <a:normAutofit fontScale="92500" lnSpcReduction="20000"/>
           </a:bodyPr>
           <a:lstStyle>
             <a:lvl1pPr algn="l" defTabSz="914400" rtl="0" eaLnBrk="1" latinLnBrk="0" hangingPunct="1">
@@ -8464,8 +8460,8 @@
           </a:p>
         </p:txBody>
       </p:sp>
-      <mc:AlternateContent xmlns:mc="http://schemas.openxmlformats.org/markup-compatibility/2006">
-        <mc:Choice xmlns:a14="http://schemas.microsoft.com/office/drawing/2010/main" Requires="a14">
+      <mc:AlternateContent xmlns:mc="http://schemas.openxmlformats.org/markup-compatibility/2006" xmlns:a14="http://schemas.microsoft.com/office/drawing/2010/main">
+        <mc:Choice Requires="a14">
           <p:sp>
             <p:nvSpPr>
               <p:cNvPr id="16" name="Segnaposto contenuto 15">
@@ -8722,7 +8718,7 @@
             </p:txBody>
           </p:sp>
         </mc:Choice>
-        <mc:Fallback>
+        <mc:Fallback xmlns="">
           <p:sp>
             <p:nvSpPr>
               <p:cNvPr id="16" name="Segnaposto contenuto 15">
@@ -8794,7 +8790,7 @@
           <a:p>
             <a:fld id="{4EF59023-6175-3944-979D-CFE35E3A8267}" type="datetime1">
               <a:rPr lang="it-IT" smtClean="0"/>
-              <a:t>11/01/22</a:t>
+              <a:t>27/01/2022</a:t>
             </a:fld>
             <a:endParaRPr lang="en-US" dirty="0"/>
           </a:p>
@@ -8989,7 +8985,7 @@
         </p:spPr>
         <p:txBody>
           <a:bodyPr vert="horz" lIns="91440" tIns="45720" rIns="91440" bIns="45720" rtlCol="0" anchor="ctr">
-            <a:normAutofit fontScale="85000" lnSpcReduction="20000"/>
+            <a:normAutofit fontScale="92500" lnSpcReduction="20000"/>
           </a:bodyPr>
           <a:lstStyle>
             <a:lvl1pPr algn="l" defTabSz="914400" rtl="0" eaLnBrk="1" latinLnBrk="0" hangingPunct="1">
@@ -9054,7 +9050,7 @@
           <a:p>
             <a:fld id="{4EF59023-6175-3944-979D-CFE35E3A8267}" type="datetime1">
               <a:rPr lang="it-IT" smtClean="0"/>
-              <a:t>08/01/22</a:t>
+              <a:t>27/01/2022</a:t>
             </a:fld>
             <a:endParaRPr lang="en-US" dirty="0"/>
           </a:p>
@@ -9249,7 +9245,7 @@
         </p:spPr>
         <p:txBody>
           <a:bodyPr vert="horz" lIns="91440" tIns="45720" rIns="91440" bIns="45720" rtlCol="0" anchor="ctr">
-            <a:normAutofit fontScale="85000" lnSpcReduction="20000"/>
+            <a:normAutofit fontScale="92500" lnSpcReduction="20000"/>
           </a:bodyPr>
           <a:lstStyle>
             <a:lvl1pPr algn="l" defTabSz="914400" rtl="0" eaLnBrk="1" latinLnBrk="0" hangingPunct="1">
@@ -9314,7 +9310,7 @@
           <a:p>
             <a:fld id="{4EF59023-6175-3944-979D-CFE35E3A8267}" type="datetime1">
               <a:rPr lang="it-IT" smtClean="0"/>
-              <a:t>08/01/22</a:t>
+              <a:t>27/01/2022</a:t>
             </a:fld>
             <a:endParaRPr lang="en-US" dirty="0"/>
           </a:p>
@@ -9424,8 +9420,8 @@
           </a:prstGeom>
         </p:spPr>
       </p:pic>
-      <mc:AlternateContent xmlns:mc="http://schemas.openxmlformats.org/markup-compatibility/2006">
-        <mc:Choice xmlns:a14="http://schemas.microsoft.com/office/drawing/2010/main" Requires="a14">
+      <mc:AlternateContent xmlns:mc="http://schemas.openxmlformats.org/markup-compatibility/2006" xmlns:a14="http://schemas.microsoft.com/office/drawing/2010/main">
+        <mc:Choice Requires="a14">
           <p:sp>
             <p:nvSpPr>
               <p:cNvPr id="2" name="CasellaDiTesto 1">
@@ -9542,7 +9538,7 @@
             </p:txBody>
           </p:sp>
         </mc:Choice>
-        <mc:Fallback>
+        <mc:Fallback xmlns="">
           <p:sp>
             <p:nvSpPr>
               <p:cNvPr id="2" name="CasellaDiTesto 1">
@@ -9797,18 +9793,9 @@
           <a:p>
             <a:pPr algn="ctr"/>
             <a:r>
-              <a:rPr lang="it-IT" dirty="0" err="1"/>
-              <a:t>Granty</a:t>
-            </a:r>
-            <a:r>
               <a:rPr lang="it-IT" dirty="0"/>
-              <a:t> </a:t>
-            </a:r>
-            <a:r>
-              <a:rPr lang="it-IT" dirty="0" err="1"/>
-              <a:t>crane</a:t>
-            </a:r>
-            <a:endParaRPr lang="it-IT" dirty="0"/>
+              <a:t>Gantry crane</a:t>
+            </a:r>
           </a:p>
         </p:txBody>
       </p:sp>
@@ -9935,7 +9922,7 @@
           <a:p>
             <a:fld id="{4EF59023-6175-3944-979D-CFE35E3A8267}" type="datetime1">
               <a:rPr lang="it-IT" smtClean="0"/>
-              <a:t>11/01/22</a:t>
+              <a:t>27/01/2022</a:t>
             </a:fld>
             <a:endParaRPr lang="en-US" dirty="0"/>
           </a:p>
@@ -10154,18 +10141,9 @@
           <a:p>
             <a:pPr algn="ctr"/>
             <a:r>
-              <a:rPr lang="it-IT" dirty="0" err="1"/>
-              <a:t>Granty</a:t>
-            </a:r>
-            <a:r>
               <a:rPr lang="it-IT" dirty="0"/>
-              <a:t> </a:t>
-            </a:r>
-            <a:r>
-              <a:rPr lang="it-IT" dirty="0" err="1"/>
-              <a:t>crane</a:t>
-            </a:r>
-            <a:endParaRPr lang="it-IT" dirty="0"/>
+              <a:t>Gantry crane</a:t>
+            </a:r>
           </a:p>
         </p:txBody>
       </p:sp>
@@ -10298,7 +10276,7 @@
           <a:p>
             <a:fld id="{4EF59023-6175-3944-979D-CFE35E3A8267}" type="datetime1">
               <a:rPr lang="it-IT" smtClean="0"/>
-              <a:t>08/01/22</a:t>
+              <a:t>27/01/2022</a:t>
             </a:fld>
             <a:endParaRPr lang="en-US" dirty="0"/>
           </a:p>
@@ -10517,18 +10495,9 @@
           <a:p>
             <a:pPr algn="ctr"/>
             <a:r>
-              <a:rPr lang="it-IT" dirty="0" err="1"/>
-              <a:t>Granty</a:t>
-            </a:r>
-            <a:r>
               <a:rPr lang="it-IT" dirty="0"/>
-              <a:t> </a:t>
-            </a:r>
-            <a:r>
-              <a:rPr lang="it-IT" dirty="0" err="1"/>
-              <a:t>crane</a:t>
-            </a:r>
-            <a:endParaRPr lang="it-IT" dirty="0"/>
+              <a:t>Gantry crane</a:t>
+            </a:r>
           </a:p>
         </p:txBody>
       </p:sp>
@@ -10699,7 +10668,7 @@
           <a:p>
             <a:fld id="{4EF59023-6175-3944-979D-CFE35E3A8267}" type="datetime1">
               <a:rPr lang="it-IT" smtClean="0"/>
-              <a:t>08/01/22</a:t>
+              <a:t>27/01/2022</a:t>
             </a:fld>
             <a:endParaRPr lang="en-US" dirty="0"/>
           </a:p>
@@ -10948,23 +10917,14 @@
           <a:p>
             <a:pPr algn="ctr"/>
             <a:r>
-              <a:rPr lang="it-IT" dirty="0" err="1"/>
-              <a:t>Granty</a:t>
-            </a:r>
-            <a:r>
               <a:rPr lang="it-IT" dirty="0"/>
-              <a:t> </a:t>
-            </a:r>
-            <a:r>
-              <a:rPr lang="it-IT" dirty="0" err="1"/>
-              <a:t>crane</a:t>
-            </a:r>
-            <a:endParaRPr lang="it-IT" dirty="0"/>
-          </a:p>
-        </p:txBody>
-      </p:sp>
-      <mc:AlternateContent xmlns:mc="http://schemas.openxmlformats.org/markup-compatibility/2006">
-        <mc:Choice xmlns:a14="http://schemas.microsoft.com/office/drawing/2010/main" Requires="a14">
+              <a:t>Gantry crane</a:t>
+            </a:r>
+          </a:p>
+        </p:txBody>
+      </p:sp>
+      <mc:AlternateContent xmlns:mc="http://schemas.openxmlformats.org/markup-compatibility/2006" xmlns:a14="http://schemas.microsoft.com/office/drawing/2010/main">
+        <mc:Choice Requires="a14">
           <p:sp>
             <p:nvSpPr>
               <p:cNvPr id="9" name="CasellaDiTesto 8">
@@ -11212,7 +11172,7 @@
             </p:txBody>
           </p:sp>
         </mc:Choice>
-        <mc:Fallback>
+        <mc:Fallback xmlns="">
           <p:sp>
             <p:nvSpPr>
               <p:cNvPr id="9" name="CasellaDiTesto 8">
@@ -11257,8 +11217,8 @@
           </p:sp>
         </mc:Fallback>
       </mc:AlternateContent>
-      <mc:AlternateContent xmlns:mc="http://schemas.openxmlformats.org/markup-compatibility/2006">
-        <mc:Choice xmlns:a14="http://schemas.microsoft.com/office/drawing/2010/main" Requires="a14">
+      <mc:AlternateContent xmlns:mc="http://schemas.openxmlformats.org/markup-compatibility/2006" xmlns:a14="http://schemas.microsoft.com/office/drawing/2010/main">
+        <mc:Choice Requires="a14">
           <p:sp>
             <p:nvSpPr>
               <p:cNvPr id="2" name="CasellaDiTesto 1">
@@ -11546,7 +11506,7 @@
             </p:txBody>
           </p:sp>
         </mc:Choice>
-        <mc:Fallback>
+        <mc:Fallback xmlns="">
           <p:sp>
             <p:nvSpPr>
               <p:cNvPr id="2" name="CasellaDiTesto 1">
@@ -11619,7 +11579,7 @@
           <a:p>
             <a:fld id="{4EF59023-6175-3944-979D-CFE35E3A8267}" type="datetime1">
               <a:rPr lang="it-IT" smtClean="0"/>
-              <a:t>11/01/22</a:t>
+              <a:t>27/01/2022</a:t>
             </a:fld>
             <a:endParaRPr lang="en-US" dirty="0"/>
           </a:p>
@@ -11868,18 +11828,9 @@
           <a:p>
             <a:pPr algn="ctr"/>
             <a:r>
-              <a:rPr lang="it-IT" dirty="0" err="1"/>
-              <a:t>Granty</a:t>
-            </a:r>
-            <a:r>
               <a:rPr lang="it-IT" dirty="0"/>
-              <a:t> </a:t>
-            </a:r>
-            <a:r>
-              <a:rPr lang="it-IT" dirty="0" err="1"/>
-              <a:t>crane</a:t>
-            </a:r>
-            <a:endParaRPr lang="it-IT" dirty="0"/>
+              <a:t>Gantry crane</a:t>
+            </a:r>
           </a:p>
         </p:txBody>
       </p:sp>
@@ -11911,7 +11862,7 @@
           <a:p>
             <a:fld id="{4EF59023-6175-3944-979D-CFE35E3A8267}" type="datetime1">
               <a:rPr lang="it-IT" smtClean="0"/>
-              <a:t>11/01/22</a:t>
+              <a:t>27/01/2022</a:t>
             </a:fld>
             <a:endParaRPr lang="en-US" dirty="0"/>
           </a:p>
@@ -12021,8 +11972,8 @@
           </a:prstGeom>
         </p:spPr>
       </p:pic>
-      <mc:AlternateContent xmlns:mc="http://schemas.openxmlformats.org/markup-compatibility/2006">
-        <mc:Choice xmlns:a14="http://schemas.microsoft.com/office/drawing/2010/main" Requires="a14">
+      <mc:AlternateContent xmlns:mc="http://schemas.openxmlformats.org/markup-compatibility/2006" xmlns:a14="http://schemas.microsoft.com/office/drawing/2010/main">
+        <mc:Choice Requires="a14">
           <p:sp>
             <p:nvSpPr>
               <p:cNvPr id="3" name="CasellaDiTesto 2">
@@ -12377,7 +12328,7 @@
             </p:txBody>
           </p:sp>
         </mc:Choice>
-        <mc:Fallback>
+        <mc:Fallback xmlns="">
           <p:sp>
             <p:nvSpPr>
               <p:cNvPr id="3" name="CasellaDiTesto 2">
@@ -12501,23 +12452,14 @@
           <a:p>
             <a:pPr algn="ctr"/>
             <a:r>
-              <a:rPr lang="it-IT" dirty="0" err="1"/>
-              <a:t>Granty</a:t>
-            </a:r>
-            <a:r>
               <a:rPr lang="it-IT" dirty="0"/>
-              <a:t> </a:t>
-            </a:r>
-            <a:r>
-              <a:rPr lang="it-IT" dirty="0" err="1"/>
-              <a:t>crane</a:t>
-            </a:r>
-            <a:endParaRPr lang="it-IT" dirty="0"/>
-          </a:p>
-        </p:txBody>
-      </p:sp>
-      <mc:AlternateContent xmlns:mc="http://schemas.openxmlformats.org/markup-compatibility/2006">
-        <mc:Choice xmlns:a14="http://schemas.microsoft.com/office/drawing/2010/main" Requires="a14">
+              <a:t>Gantry crane</a:t>
+            </a:r>
+          </a:p>
+        </p:txBody>
+      </p:sp>
+      <mc:AlternateContent xmlns:mc="http://schemas.openxmlformats.org/markup-compatibility/2006" xmlns:a14="http://schemas.microsoft.com/office/drawing/2010/main">
+        <mc:Choice Requires="a14">
           <p:sp>
             <p:nvSpPr>
               <p:cNvPr id="9" name="CasellaDiTesto 8">
@@ -12579,6 +12521,7 @@
                 </a:r>
               </a:p>
               <a:p>
+                <a:pPr/>
                 <a14:m>
                   <m:oMathPara xmlns:m="http://schemas.openxmlformats.org/officeDocument/2006/math">
                     <m:oMathParaPr>
@@ -12858,7 +12801,7 @@
             </p:txBody>
           </p:sp>
         </mc:Choice>
-        <mc:Fallback>
+        <mc:Fallback xmlns="">
           <p:sp>
             <p:nvSpPr>
               <p:cNvPr id="9" name="CasellaDiTesto 8">
@@ -12961,7 +12904,7 @@
           <a:p>
             <a:fld id="{4EF59023-6175-3944-979D-CFE35E3A8267}" type="datetime1">
               <a:rPr lang="it-IT" smtClean="0"/>
-              <a:t>11/01/22</a:t>
+              <a:t>27/01/2022</a:t>
             </a:fld>
             <a:endParaRPr lang="en-US" dirty="0"/>
           </a:p>
@@ -13071,8 +13014,8 @@
           </a:prstGeom>
         </p:spPr>
       </p:pic>
-      <mc:AlternateContent xmlns:mc="http://schemas.openxmlformats.org/markup-compatibility/2006">
-        <mc:Choice xmlns:a14="http://schemas.microsoft.com/office/drawing/2010/main" Requires="a14">
+      <mc:AlternateContent xmlns:mc="http://schemas.openxmlformats.org/markup-compatibility/2006" xmlns:a14="http://schemas.microsoft.com/office/drawing/2010/main">
+        <mc:Choice Requires="a14">
           <p:sp>
             <p:nvSpPr>
               <p:cNvPr id="2" name="CasellaDiTesto 1">
@@ -13148,7 +13091,7 @@
             </p:txBody>
           </p:sp>
         </mc:Choice>
-        <mc:Fallback>
+        <mc:Fallback xmlns="">
           <p:sp>
             <p:nvSpPr>
               <p:cNvPr id="2" name="CasellaDiTesto 1">
@@ -13547,7 +13490,7 @@
           <a:p>
             <a:fld id="{4EF59023-6175-3944-979D-CFE35E3A8267}" type="datetime1">
               <a:rPr lang="it-IT" smtClean="0"/>
-              <a:t>08/01/22</a:t>
+              <a:t>27/01/2022</a:t>
             </a:fld>
             <a:endParaRPr lang="en-US" dirty="0"/>
           </a:p>
@@ -13736,23 +13679,14 @@
           <a:p>
             <a:pPr algn="ctr"/>
             <a:r>
-              <a:rPr lang="it-IT" dirty="0" err="1"/>
-              <a:t>Granty</a:t>
-            </a:r>
-            <a:r>
               <a:rPr lang="it-IT" dirty="0"/>
-              <a:t> </a:t>
-            </a:r>
-            <a:r>
-              <a:rPr lang="it-IT" dirty="0" err="1"/>
-              <a:t>crane</a:t>
-            </a:r>
-            <a:endParaRPr lang="it-IT" dirty="0"/>
-          </a:p>
-        </p:txBody>
-      </p:sp>
-      <mc:AlternateContent xmlns:mc="http://schemas.openxmlformats.org/markup-compatibility/2006">
-        <mc:Choice xmlns:a14="http://schemas.microsoft.com/office/drawing/2010/main" Requires="a14">
+              <a:t>Gantry crane</a:t>
+            </a:r>
+          </a:p>
+        </p:txBody>
+      </p:sp>
+      <mc:AlternateContent xmlns:mc="http://schemas.openxmlformats.org/markup-compatibility/2006" xmlns:a14="http://schemas.microsoft.com/office/drawing/2010/main">
+        <mc:Choice Requires="a14">
           <p:sp>
             <p:nvSpPr>
               <p:cNvPr id="9" name="CasellaDiTesto 8">
@@ -14236,7 +14170,7 @@
             </p:txBody>
           </p:sp>
         </mc:Choice>
-        <mc:Fallback>
+        <mc:Fallback xmlns="">
           <p:sp>
             <p:nvSpPr>
               <p:cNvPr id="9" name="CasellaDiTesto 8">
@@ -14311,8 +14245,8 @@
           </a:prstGeom>
         </p:spPr>
       </p:pic>
-      <mc:AlternateContent xmlns:mc="http://schemas.openxmlformats.org/markup-compatibility/2006">
-        <mc:Choice xmlns:a14="http://schemas.microsoft.com/office/drawing/2010/main" Requires="a14">
+      <mc:AlternateContent xmlns:mc="http://schemas.openxmlformats.org/markup-compatibility/2006" xmlns:a14="http://schemas.microsoft.com/office/drawing/2010/main">
+        <mc:Choice Requires="a14">
           <p:sp>
             <p:nvSpPr>
               <p:cNvPr id="2" name="CasellaDiTesto 1">
@@ -14557,7 +14491,7 @@
             </p:txBody>
           </p:sp>
         </mc:Choice>
-        <mc:Fallback>
+        <mc:Fallback xmlns="">
           <p:sp>
             <p:nvSpPr>
               <p:cNvPr id="2" name="CasellaDiTesto 1">
@@ -14630,7 +14564,7 @@
           <a:p>
             <a:fld id="{4EF59023-6175-3944-979D-CFE35E3A8267}" type="datetime1">
               <a:rPr lang="it-IT" smtClean="0"/>
-              <a:t>11/01/22</a:t>
+              <a:t>27/01/2022</a:t>
             </a:fld>
             <a:endParaRPr lang="en-US" dirty="0"/>
           </a:p>
@@ -14909,23 +14843,14 @@
           <a:p>
             <a:pPr algn="ctr"/>
             <a:r>
-              <a:rPr lang="it-IT" dirty="0" err="1"/>
-              <a:t>Granty</a:t>
-            </a:r>
-            <a:r>
               <a:rPr lang="it-IT" dirty="0"/>
-              <a:t> </a:t>
-            </a:r>
-            <a:r>
-              <a:rPr lang="it-IT" dirty="0" err="1"/>
-              <a:t>crane</a:t>
-            </a:r>
-            <a:endParaRPr lang="it-IT" dirty="0"/>
-          </a:p>
-        </p:txBody>
-      </p:sp>
-      <mc:AlternateContent xmlns:mc="http://schemas.openxmlformats.org/markup-compatibility/2006">
-        <mc:Choice xmlns:a14="http://schemas.microsoft.com/office/drawing/2010/main" Requires="a14">
+              <a:t>Gantry crane</a:t>
+            </a:r>
+          </a:p>
+        </p:txBody>
+      </p:sp>
+      <mc:AlternateContent xmlns:mc="http://schemas.openxmlformats.org/markup-compatibility/2006" xmlns:a14="http://schemas.microsoft.com/office/drawing/2010/main">
+        <mc:Choice Requires="a14">
           <p:sp>
             <p:nvSpPr>
               <p:cNvPr id="9" name="CasellaDiTesto 8">
@@ -15026,7 +14951,7 @@
             </p:txBody>
           </p:sp>
         </mc:Choice>
-        <mc:Fallback>
+        <mc:Fallback xmlns="">
           <p:sp>
             <p:nvSpPr>
               <p:cNvPr id="9" name="CasellaDiTesto 8">
@@ -15129,7 +15054,7 @@
           <a:p>
             <a:fld id="{4EF59023-6175-3944-979D-CFE35E3A8267}" type="datetime1">
               <a:rPr lang="it-IT" smtClean="0"/>
-              <a:t>08/01/22</a:t>
+              <a:t>27/01/2022</a:t>
             </a:fld>
             <a:endParaRPr lang="en-US" dirty="0"/>
           </a:p>
@@ -15348,18 +15273,9 @@
           <a:p>
             <a:pPr algn="ctr"/>
             <a:r>
-              <a:rPr lang="it-IT" dirty="0" err="1"/>
-              <a:t>Granty</a:t>
-            </a:r>
-            <a:r>
               <a:rPr lang="it-IT" dirty="0"/>
-              <a:t> </a:t>
-            </a:r>
-            <a:r>
-              <a:rPr lang="it-IT" dirty="0" err="1"/>
-              <a:t>crane</a:t>
-            </a:r>
-            <a:endParaRPr lang="it-IT" dirty="0"/>
+              <a:t>Gantry crane</a:t>
+            </a:r>
           </a:p>
         </p:txBody>
       </p:sp>
@@ -15488,8 +15404,8 @@
                   <a:t>Di seguito l’andamento della variabile di uscita e dell’errore </a:t>
                 </a:r>
                 <a:r>
-                  <a:rPr lang="it-IT" dirty="0" err="1"/>
-                  <a:t>otenuto</a:t>
+                  <a:rPr lang="it-IT" dirty="0" smtClean="0"/>
+                  <a:t>ottenuto</a:t>
                 </a:r>
                 <a:r>
                   <a:rPr lang="it-IT" dirty="0"/>
@@ -15525,7 +15441,7 @@
               <a:blipFill>
                 <a:blip r:embed="rId2"/>
                 <a:stretch>
-                  <a:fillRect l="-951" t="-1399" r="-475" b="-4196"/>
+                  <a:fillRect l="-837" t="-1689" r="-609" b="-4730"/>
                 </a:stretch>
               </a:blipFill>
             </p:spPr>
@@ -15602,7 +15518,7 @@
           <a:p>
             <a:fld id="{4EF59023-6175-3944-979D-CFE35E3A8267}" type="datetime1">
               <a:rPr lang="it-IT" smtClean="0"/>
-              <a:t>11/01/22</a:t>
+              <a:t>27/01/2022</a:t>
             </a:fld>
             <a:endParaRPr lang="en-US" dirty="0"/>
           </a:p>
@@ -15941,18 +15857,9 @@
           <a:p>
             <a:pPr algn="ctr"/>
             <a:r>
-              <a:rPr lang="it-IT" dirty="0" err="1"/>
-              <a:t>Granty</a:t>
-            </a:r>
-            <a:r>
               <a:rPr lang="it-IT" dirty="0"/>
-              <a:t> </a:t>
-            </a:r>
-            <a:r>
-              <a:rPr lang="it-IT" dirty="0" err="1"/>
-              <a:t>crane</a:t>
-            </a:r>
-            <a:endParaRPr lang="it-IT" dirty="0"/>
+              <a:t>Gantry crane</a:t>
+            </a:r>
           </a:p>
         </p:txBody>
       </p:sp>
@@ -16025,7 +15932,7 @@
           <a:p>
             <a:fld id="{4EF59023-6175-3944-979D-CFE35E3A8267}" type="datetime1">
               <a:rPr lang="it-IT" smtClean="0"/>
-              <a:t>11/01/22</a:t>
+              <a:t>27/01/2022</a:t>
             </a:fld>
             <a:endParaRPr lang="en-US" dirty="0"/>
           </a:p>
@@ -16167,10 +16074,10 @@
       </p:grpSpPr>
       <p:pic>
         <p:nvPicPr>
-          <p:cNvPr id="5" name="Immagine 4">
-            <a:extLst>
-              <a:ext uri="{FF2B5EF4-FFF2-40B4-BE49-F238E27FC236}">
-                <a16:creationId xmlns:a16="http://schemas.microsoft.com/office/drawing/2014/main" id="{6B271FC1-9853-8B46-B074-A5E6D5A515AD}"/>
+          <p:cNvPr id="6" name="Immagine 5">
+            <a:extLst>
+              <a:ext uri="{FF2B5EF4-FFF2-40B4-BE49-F238E27FC236}">
+                <a16:creationId xmlns:a16="http://schemas.microsoft.com/office/drawing/2014/main" id="{E6250F99-85E5-234E-8497-D887077950D0}"/>
               </a:ext>
             </a:extLst>
           </p:cNvPr>
@@ -16187,7 +16094,7 @@
         </p:blipFill>
         <p:spPr>
           <a:xfrm>
-            <a:off x="1714030" y="1475623"/>
+            <a:off x="1714030" y="809623"/>
             <a:ext cx="2093143" cy="1332000"/>
           </a:xfrm>
           <a:prstGeom prst="rect">
@@ -16244,62 +16151,239 @@
           <a:p>
             <a:pPr algn="ctr"/>
             <a:r>
-              <a:rPr lang="it-IT" dirty="0" err="1"/>
-              <a:t>Granty</a:t>
-            </a:r>
-            <a:r>
               <a:rPr lang="it-IT" dirty="0"/>
-              <a:t> </a:t>
-            </a:r>
-            <a:r>
-              <a:rPr lang="it-IT" dirty="0" err="1"/>
-              <a:t>crane</a:t>
-            </a:r>
-            <a:endParaRPr lang="it-IT" dirty="0"/>
-          </a:p>
-        </p:txBody>
-      </p:sp>
-      <p:sp>
-        <p:nvSpPr>
-          <p:cNvPr id="9" name="CasellaDiTesto 8">
-            <a:extLst>
-              <a:ext uri="{FF2B5EF4-FFF2-40B4-BE49-F238E27FC236}">
-                <a16:creationId xmlns:a16="http://schemas.microsoft.com/office/drawing/2014/main" id="{86F89E2B-2067-3C4F-A4E7-D7C1F99F332E}"/>
-              </a:ext>
-            </a:extLst>
-          </p:cNvPr>
-          <p:cNvSpPr txBox="1"/>
-          <p:nvPr/>
-        </p:nvSpPr>
-        <p:spPr>
-          <a:xfrm>
-            <a:off x="3997202" y="1475623"/>
-            <a:ext cx="6670797" cy="1015663"/>
-          </a:xfrm>
-          <a:prstGeom prst="rect">
-            <a:avLst/>
-          </a:prstGeom>
-          <a:noFill/>
-        </p:spPr>
-        <p:txBody>
-          <a:bodyPr wrap="square" rtlCol="0">
-            <a:spAutoFit/>
-          </a:bodyPr>
+              <a:t>Gantry crane</a:t>
+            </a:r>
+          </a:p>
+        </p:txBody>
+      </p:sp>
+      <mc:AlternateContent xmlns:mc="http://schemas.openxmlformats.org/markup-compatibility/2006">
+        <mc:Choice xmlns:a14="http://schemas.microsoft.com/office/drawing/2010/main" Requires="a14">
+          <p:sp>
+            <p:nvSpPr>
+              <p:cNvPr id="9" name="CasellaDiTesto 8">
+                <a:extLst>
+                  <a:ext uri="{FF2B5EF4-FFF2-40B4-BE49-F238E27FC236}">
+                    <a16:creationId xmlns:a16="http://schemas.microsoft.com/office/drawing/2014/main" id="{86F89E2B-2067-3C4F-A4E7-D7C1F99F332E}"/>
+                  </a:ext>
+                </a:extLst>
+              </p:cNvPr>
+              <p:cNvSpPr txBox="1"/>
+              <p:nvPr/>
+            </p:nvSpPr>
+            <p:spPr>
+              <a:xfrm>
+                <a:off x="3581400" y="1475623"/>
+                <a:ext cx="8241632" cy="1508105"/>
+              </a:xfrm>
+              <a:prstGeom prst="rect">
+                <a:avLst/>
+              </a:prstGeom>
+              <a:noFill/>
+            </p:spPr>
+            <p:txBody>
+              <a:bodyPr wrap="square" rtlCol="0">
+                <a:spAutoFit/>
+              </a:bodyPr>
+              <a:lstStyle/>
+              <a:p>
+                <a:r>
+                  <a:rPr lang="it-IT" sz="2000" dirty="0" smtClean="0"/>
+                  <a:t>FEEDBACK LINEARIZATION – ZERO DYNAMIC</a:t>
+                </a:r>
+                <a:endParaRPr lang="it-IT" sz="2000" dirty="0"/>
+              </a:p>
+              <a:p>
+                <a:r>
+                  <a:rPr lang="it-IT" dirty="0" smtClean="0"/>
+                  <a:t>Analisi della dinamica delle variabili non osservabili: per la scelta effettuata di tali variabili è possibile affermare che la loro dinamica è ininfluente sull’uscita del sistema linearizzato e non dipende direttamente dagli ingressi </a:t>
+                </a:r>
+                <a14:m>
+                  <m:oMath xmlns:m="http://schemas.openxmlformats.org/officeDocument/2006/math">
+                    <m:r>
+                      <a:rPr lang="it-IT" b="0" i="1" smtClean="0">
+                        <a:latin typeface="Cambria Math" panose="02040503050406030204" pitchFamily="18" charset="0"/>
+                      </a:rPr>
+                      <m:t>𝑣</m:t>
+                    </m:r>
+                  </m:oMath>
+                </a14:m>
+                <a:r>
+                  <a:rPr lang="it-IT" dirty="0" smtClean="0"/>
+                  <a:t>, a cui resta comunque legata attraverso l’evoluzione delle variabili </a:t>
+                </a:r>
+                <a14:m>
+                  <m:oMath xmlns:m="http://schemas.openxmlformats.org/officeDocument/2006/math">
+                    <m:r>
+                      <a:rPr lang="it-IT" i="1" smtClean="0">
+                        <a:latin typeface="Cambria Math" panose="02040503050406030204" pitchFamily="18" charset="0"/>
+                        <a:ea typeface="Cambria Math" panose="02040503050406030204" pitchFamily="18" charset="0"/>
+                      </a:rPr>
+                      <m:t>𝜉</m:t>
+                    </m:r>
+                  </m:oMath>
+                </a14:m>
+                <a:r>
+                  <a:rPr lang="it-IT" dirty="0" smtClean="0"/>
+                  <a:t>.</a:t>
+                </a:r>
+              </a:p>
+            </p:txBody>
+          </p:sp>
+        </mc:Choice>
+        <mc:Fallback>
+          <p:sp>
+            <p:nvSpPr>
+              <p:cNvPr id="9" name="CasellaDiTesto 8">
+                <a:extLst>
+                  <a:ext uri="{FF2B5EF4-FFF2-40B4-BE49-F238E27FC236}">
+                    <a16:creationId xmlns:a16="http://schemas.microsoft.com/office/drawing/2014/main" id="{86F89E2B-2067-3C4F-A4E7-D7C1F99F332E}"/>
+                  </a:ext>
+                </a:extLst>
+              </p:cNvPr>
+              <p:cNvSpPr txBox="1">
+                <a:spLocks noRot="1" noChangeAspect="1" noMove="1" noResize="1" noEditPoints="1" noAdjustHandles="1" noChangeArrowheads="1" noChangeShapeType="1" noTextEdit="1"/>
+              </p:cNvSpPr>
+              <p:nvPr/>
+            </p:nvSpPr>
+            <p:spPr>
+              <a:xfrm>
+                <a:off x="3581400" y="1475623"/>
+                <a:ext cx="8241632" cy="1508105"/>
+              </a:xfrm>
+              <a:prstGeom prst="rect">
+                <a:avLst/>
+              </a:prstGeom>
+              <a:blipFill>
+                <a:blip r:embed="rId3"/>
+                <a:stretch>
+                  <a:fillRect l="-814" t="-2024" b="-5668"/>
+                </a:stretch>
+              </a:blipFill>
+            </p:spPr>
+            <p:txBody>
+              <a:bodyPr/>
+              <a:lstStyle/>
+              <a:p>
+                <a:r>
+                  <a:rPr lang="it-IT">
+                    <a:noFill/>
+                  </a:rPr>
+                  <a:t> </a:t>
+                </a:r>
+              </a:p>
+            </p:txBody>
+          </p:sp>
+        </mc:Fallback>
+      </mc:AlternateContent>
+      <p:sp>
+        <p:nvSpPr>
+          <p:cNvPr id="7" name="Segnaposto data 3">
+            <a:extLst>
+              <a:ext uri="{FF2B5EF4-FFF2-40B4-BE49-F238E27FC236}">
+                <a16:creationId xmlns:a16="http://schemas.microsoft.com/office/drawing/2014/main" id="{6B3D6E58-06BF-1341-B405-6074E5570CBE}"/>
+              </a:ext>
+            </a:extLst>
+          </p:cNvPr>
+          <p:cNvSpPr>
+            <a:spLocks noGrp="1"/>
+          </p:cNvSpPr>
+          <p:nvPr>
+            <p:ph type="dt" sz="half" idx="10"/>
+          </p:nvPr>
+        </p:nvSpPr>
+        <p:spPr>
+          <a:xfrm>
+            <a:off x="838200" y="6356350"/>
+            <a:ext cx="2743200" cy="365125"/>
+          </a:xfrm>
+        </p:spPr>
+        <p:txBody>
+          <a:bodyPr/>
           <a:lstStyle/>
           <a:p>
-            <a:r>
-              <a:rPr lang="it-IT" sz="2000" dirty="0"/>
-              <a:t>Mantenendo lo stesso modello dinamico, è stata scelta come uscita la variabile di stato x e ripetuto lo studio della controllabilità e della osservabilità del sistema ottenuto.</a:t>
-            </a:r>
+            <a:fld id="{4EF59023-6175-3944-979D-CFE35E3A8267}" type="datetime1">
+              <a:rPr lang="it-IT" smtClean="0"/>
+              <a:t>27/01/2022</a:t>
+            </a:fld>
+            <a:endParaRPr lang="en-US" dirty="0"/>
+          </a:p>
+        </p:txBody>
+      </p:sp>
+      <p:sp>
+        <p:nvSpPr>
+          <p:cNvPr id="10" name="Segnaposto piè di pagina 4">
+            <a:extLst>
+              <a:ext uri="{FF2B5EF4-FFF2-40B4-BE49-F238E27FC236}">
+                <a16:creationId xmlns:a16="http://schemas.microsoft.com/office/drawing/2014/main" id="{D5B28A30-8656-2745-A574-AC8117BE6070}"/>
+              </a:ext>
+            </a:extLst>
+          </p:cNvPr>
+          <p:cNvSpPr>
+            <a:spLocks noGrp="1"/>
+          </p:cNvSpPr>
+          <p:nvPr>
+            <p:ph type="ftr" sz="quarter" idx="11"/>
+          </p:nvPr>
+        </p:nvSpPr>
+        <p:spPr>
+          <a:xfrm>
+            <a:off x="4038600" y="6356350"/>
+            <a:ext cx="4114800" cy="365125"/>
+          </a:xfrm>
+        </p:spPr>
+        <p:txBody>
+          <a:bodyPr/>
+          <a:lstStyle/>
+          <a:p>
+            <a:r>
+              <a:rPr lang="en-US"/>
+              <a:t>Arianna Gasparri</a:t>
+            </a:r>
+            <a:endParaRPr lang="en-US" dirty="0"/>
+          </a:p>
+        </p:txBody>
+      </p:sp>
+      <p:sp>
+        <p:nvSpPr>
+          <p:cNvPr id="11" name="Segnaposto numero diapositiva 5">
+            <a:extLst>
+              <a:ext uri="{FF2B5EF4-FFF2-40B4-BE49-F238E27FC236}">
+                <a16:creationId xmlns:a16="http://schemas.microsoft.com/office/drawing/2014/main" id="{06FA9C7D-77F5-8F44-99B9-244BA8DF5120}"/>
+              </a:ext>
+            </a:extLst>
+          </p:cNvPr>
+          <p:cNvSpPr>
+            <a:spLocks noGrp="1"/>
+          </p:cNvSpPr>
+          <p:nvPr>
+            <p:ph type="sldNum" sz="quarter" idx="12"/>
+          </p:nvPr>
+        </p:nvSpPr>
+        <p:spPr>
+          <a:xfrm>
+            <a:off x="8610600" y="6356350"/>
+            <a:ext cx="2743200" cy="365125"/>
+          </a:xfrm>
+        </p:spPr>
+        <p:txBody>
+          <a:bodyPr/>
+          <a:lstStyle/>
+          <a:p>
+            <a:fld id="{6D22F896-40B5-4ADD-8801-0D06FADFA095}" type="slidenum">
+              <a:rPr lang="en-US" smtClean="0"/>
+              <a:t>34</a:t>
+            </a:fld>
+            <a:endParaRPr lang="en-US" dirty="0"/>
           </a:p>
         </p:txBody>
       </p:sp>
       <p:pic>
         <p:nvPicPr>
-          <p:cNvPr id="4" name="Immagine 3">
-            <a:extLst>
-              <a:ext uri="{FF2B5EF4-FFF2-40B4-BE49-F238E27FC236}">
-                <a16:creationId xmlns:a16="http://schemas.microsoft.com/office/drawing/2014/main" id="{0BEAAF86-3F48-8847-8D11-8CCFF5FC089D}"/>
+          <p:cNvPr id="12" name="Immagine 11">
+            <a:extLst>
+              <a:ext uri="{FF2B5EF4-FFF2-40B4-BE49-F238E27FC236}">
+                <a16:creationId xmlns:a16="http://schemas.microsoft.com/office/drawing/2014/main" id="{C69BD7AD-13DF-B64A-AA40-5E86A6150330}"/>
               </a:ext>
             </a:extLst>
           </p:cNvPr>
@@ -16309,199 +16393,7 @@
           <p:nvPr/>
         </p:nvPicPr>
         <p:blipFill>
-          <a:blip r:embed="rId3"/>
-          <a:stretch>
-            <a:fillRect/>
-          </a:stretch>
-        </p:blipFill>
-        <p:spPr>
-          <a:xfrm>
-            <a:off x="6507100" y="2649454"/>
-            <a:ext cx="1651000" cy="660400"/>
-          </a:xfrm>
-          <a:prstGeom prst="rect">
-            <a:avLst/>
-          </a:prstGeom>
-        </p:spPr>
-      </p:pic>
-      <p:pic>
-        <p:nvPicPr>
-          <p:cNvPr id="7" name="Immagine 6">
-            <a:extLst>
-              <a:ext uri="{FF2B5EF4-FFF2-40B4-BE49-F238E27FC236}">
-                <a16:creationId xmlns:a16="http://schemas.microsoft.com/office/drawing/2014/main" id="{F9F8DC63-EB5D-374B-9F4A-A1EF5FF89A21}"/>
-              </a:ext>
-            </a:extLst>
-          </p:cNvPr>
-          <p:cNvPicPr>
-            <a:picLocks noChangeAspect="1"/>
-          </p:cNvPicPr>
-          <p:nvPr/>
-        </p:nvPicPr>
-        <p:blipFill>
-          <a:blip r:embed="rId4"/>
-          <a:stretch>
-            <a:fillRect/>
-          </a:stretch>
-        </p:blipFill>
-        <p:spPr>
-          <a:xfrm>
-            <a:off x="1524000" y="3468023"/>
-            <a:ext cx="6477000" cy="1603375"/>
-          </a:xfrm>
-          <a:prstGeom prst="rect">
-            <a:avLst/>
-          </a:prstGeom>
-        </p:spPr>
-      </p:pic>
-      <p:pic>
-        <p:nvPicPr>
-          <p:cNvPr id="11" name="Immagine 10">
-            <a:extLst>
-              <a:ext uri="{FF2B5EF4-FFF2-40B4-BE49-F238E27FC236}">
-                <a16:creationId xmlns:a16="http://schemas.microsoft.com/office/drawing/2014/main" id="{1A63D091-8FD0-D943-8BE5-2D5DFF337684}"/>
-              </a:ext>
-            </a:extLst>
-          </p:cNvPr>
-          <p:cNvPicPr>
-            <a:picLocks noChangeAspect="1"/>
-          </p:cNvPicPr>
-          <p:nvPr/>
-        </p:nvPicPr>
-        <p:blipFill>
-          <a:blip r:embed="rId5"/>
-          <a:stretch>
-            <a:fillRect/>
-          </a:stretch>
-        </p:blipFill>
-        <p:spPr>
-          <a:xfrm>
-            <a:off x="8001000" y="3468023"/>
-            <a:ext cx="3302000" cy="1619250"/>
-          </a:xfrm>
-          <a:prstGeom prst="rect">
-            <a:avLst/>
-          </a:prstGeom>
-        </p:spPr>
-      </p:pic>
-      <p:sp>
-        <p:nvSpPr>
-          <p:cNvPr id="10" name="Segnaposto data 3">
-            <a:extLst>
-              <a:ext uri="{FF2B5EF4-FFF2-40B4-BE49-F238E27FC236}">
-                <a16:creationId xmlns:a16="http://schemas.microsoft.com/office/drawing/2014/main" id="{05C89D9B-6C9B-4E48-9D4F-6AFF98E923D7}"/>
-              </a:ext>
-            </a:extLst>
-          </p:cNvPr>
-          <p:cNvSpPr>
-            <a:spLocks noGrp="1"/>
-          </p:cNvSpPr>
-          <p:nvPr>
-            <p:ph type="dt" sz="half" idx="10"/>
-          </p:nvPr>
-        </p:nvSpPr>
-        <p:spPr>
-          <a:xfrm>
-            <a:off x="838200" y="6356350"/>
-            <a:ext cx="2743200" cy="365125"/>
-          </a:xfrm>
-        </p:spPr>
-        <p:txBody>
-          <a:bodyPr/>
-          <a:lstStyle/>
-          <a:p>
-            <a:fld id="{4EF59023-6175-3944-979D-CFE35E3A8267}" type="datetime1">
-              <a:rPr lang="it-IT" smtClean="0"/>
-              <a:t>11/01/22</a:t>
-            </a:fld>
-            <a:endParaRPr lang="en-US" dirty="0"/>
-          </a:p>
-        </p:txBody>
-      </p:sp>
-      <p:sp>
-        <p:nvSpPr>
-          <p:cNvPr id="12" name="Segnaposto piè di pagina 4">
-            <a:extLst>
-              <a:ext uri="{FF2B5EF4-FFF2-40B4-BE49-F238E27FC236}">
-                <a16:creationId xmlns:a16="http://schemas.microsoft.com/office/drawing/2014/main" id="{B10A4DC1-2B85-F745-82E6-0410F049FAD0}"/>
-              </a:ext>
-            </a:extLst>
-          </p:cNvPr>
-          <p:cNvSpPr>
-            <a:spLocks noGrp="1"/>
-          </p:cNvSpPr>
-          <p:nvPr>
-            <p:ph type="ftr" sz="quarter" idx="11"/>
-          </p:nvPr>
-        </p:nvSpPr>
-        <p:spPr>
-          <a:xfrm>
-            <a:off x="4038600" y="6356350"/>
-            <a:ext cx="4114800" cy="365125"/>
-          </a:xfrm>
-        </p:spPr>
-        <p:txBody>
-          <a:bodyPr/>
-          <a:lstStyle/>
-          <a:p>
-            <a:r>
-              <a:rPr lang="en-US"/>
-              <a:t>Arianna Gasparri</a:t>
-            </a:r>
-            <a:endParaRPr lang="en-US" dirty="0"/>
-          </a:p>
-        </p:txBody>
-      </p:sp>
-      <p:sp>
-        <p:nvSpPr>
-          <p:cNvPr id="14" name="Segnaposto numero diapositiva 5">
-            <a:extLst>
-              <a:ext uri="{FF2B5EF4-FFF2-40B4-BE49-F238E27FC236}">
-                <a16:creationId xmlns:a16="http://schemas.microsoft.com/office/drawing/2014/main" id="{64915A39-08C4-D34D-A369-F65F3351495A}"/>
-              </a:ext>
-            </a:extLst>
-          </p:cNvPr>
-          <p:cNvSpPr>
-            <a:spLocks noGrp="1"/>
-          </p:cNvSpPr>
-          <p:nvPr>
-            <p:ph type="sldNum" sz="quarter" idx="12"/>
-          </p:nvPr>
-        </p:nvSpPr>
-        <p:spPr>
-          <a:xfrm>
-            <a:off x="8610600" y="6356350"/>
-            <a:ext cx="2743200" cy="365125"/>
-          </a:xfrm>
-        </p:spPr>
-        <p:txBody>
-          <a:bodyPr/>
-          <a:lstStyle/>
-          <a:p>
-            <a:fld id="{6D22F896-40B5-4ADD-8801-0D06FADFA095}" type="slidenum">
-              <a:rPr lang="en-US" smtClean="0"/>
-              <a:t>34</a:t>
-            </a:fld>
-            <a:endParaRPr lang="en-US" dirty="0"/>
-          </a:p>
-        </p:txBody>
-      </p:sp>
-      <p:pic>
-        <p:nvPicPr>
-          <p:cNvPr id="15" name="Immagine 14">
-            <a:extLst>
-              <a:ext uri="{FF2B5EF4-FFF2-40B4-BE49-F238E27FC236}">
-                <a16:creationId xmlns:a16="http://schemas.microsoft.com/office/drawing/2014/main" id="{2F70A25C-5291-AE45-918C-B8931863406E}"/>
-              </a:ext>
-            </a:extLst>
-          </p:cNvPr>
-          <p:cNvPicPr>
-            <a:picLocks noChangeAspect="1"/>
-          </p:cNvPicPr>
-          <p:nvPr/>
-        </p:nvPicPr>
-        <p:blipFill>
-          <a:blip r:embed="rId6" cstate="print">
+          <a:blip r:embed="rId4" cstate="print">
             <a:extLst>
               <a:ext uri="{28A0092B-C50C-407E-A947-70E740481C1C}">
                 <a14:useLocalDpi xmlns:a14="http://schemas.microsoft.com/office/drawing/2010/main" val="0"/>
@@ -16522,40 +16414,40 @@
           </a:prstGeom>
         </p:spPr>
       </p:pic>
-      <p:pic>
-        <p:nvPicPr>
-          <p:cNvPr id="6" name="Immagine 5">
-            <a:extLst>
-              <a:ext uri="{FF2B5EF4-FFF2-40B4-BE49-F238E27FC236}">
-                <a16:creationId xmlns:a16="http://schemas.microsoft.com/office/drawing/2014/main" id="{3D0E4CCF-0EDF-F848-9324-0D50EF216714}"/>
-              </a:ext>
-            </a:extLst>
-          </p:cNvPr>
-          <p:cNvPicPr>
-            <a:picLocks noChangeAspect="1"/>
-          </p:cNvPicPr>
+      <p:sp>
+        <p:nvSpPr>
+          <p:cNvPr id="2" name="CasellaDiTesto 1"/>
+          <p:cNvSpPr txBox="1"/>
           <p:nvPr/>
-        </p:nvPicPr>
-        <p:blipFill>
-          <a:blip r:embed="rId7"/>
-          <a:stretch>
-            <a:fillRect/>
-          </a:stretch>
-        </p:blipFill>
-        <p:spPr>
-          <a:xfrm>
-            <a:off x="5324860" y="5160794"/>
-            <a:ext cx="1542279" cy="452779"/>
+        </p:nvSpPr>
+        <p:spPr>
+          <a:xfrm>
+            <a:off x="3581400" y="3048883"/>
+            <a:ext cx="7086600" cy="369332"/>
           </a:xfrm>
           <a:prstGeom prst="rect">
             <a:avLst/>
           </a:prstGeom>
-        </p:spPr>
-      </p:pic>
+          <a:noFill/>
+        </p:spPr>
+        <p:txBody>
+          <a:bodyPr wrap="square" rtlCol="0">
+            <a:spAutoFit/>
+          </a:bodyPr>
+          <a:lstStyle/>
+          <a:p>
+            <a:r>
+              <a:rPr lang="it-IT" smtClean="0"/>
+              <a:t>P</a:t>
+            </a:r>
+            <a:endParaRPr lang="it-IT" dirty="0"/>
+          </a:p>
+        </p:txBody>
+      </p:sp>
     </p:spTree>
     <p:extLst>
       <p:ext uri="{BB962C8B-B14F-4D97-AF65-F5344CB8AC3E}">
-        <p14:creationId xmlns:p14="http://schemas.microsoft.com/office/powerpoint/2010/main" val="1367849245"/>
+        <p14:creationId xmlns:p14="http://schemas.microsoft.com/office/powerpoint/2010/main" val="3792200931"/>
       </p:ext>
     </p:extLst>
   </p:cSld>
@@ -16661,23 +16553,422 @@
           <a:p>
             <a:pPr algn="ctr"/>
             <a:r>
-              <a:rPr lang="it-IT" dirty="0" err="1"/>
-              <a:t>Granty</a:t>
-            </a:r>
-            <a:r>
               <a:rPr lang="it-IT" dirty="0"/>
-              <a:t> </a:t>
-            </a:r>
-            <a:r>
-              <a:rPr lang="it-IT" dirty="0" err="1"/>
-              <a:t>crane</a:t>
-            </a:r>
-            <a:endParaRPr lang="it-IT" dirty="0"/>
-          </a:p>
-        </p:txBody>
-      </p:sp>
-      <mc:AlternateContent xmlns:mc="http://schemas.openxmlformats.org/markup-compatibility/2006">
-        <mc:Choice xmlns:a14="http://schemas.microsoft.com/office/drawing/2010/main" Requires="a14">
+              <a:t>Gantry crane</a:t>
+            </a:r>
+          </a:p>
+        </p:txBody>
+      </p:sp>
+      <p:sp>
+        <p:nvSpPr>
+          <p:cNvPr id="9" name="CasellaDiTesto 8">
+            <a:extLst>
+              <a:ext uri="{FF2B5EF4-FFF2-40B4-BE49-F238E27FC236}">
+                <a16:creationId xmlns:a16="http://schemas.microsoft.com/office/drawing/2014/main" id="{86F89E2B-2067-3C4F-A4E7-D7C1F99F332E}"/>
+              </a:ext>
+            </a:extLst>
+          </p:cNvPr>
+          <p:cNvSpPr txBox="1"/>
+          <p:nvPr/>
+        </p:nvSpPr>
+        <p:spPr>
+          <a:xfrm>
+            <a:off x="3997202" y="1475623"/>
+            <a:ext cx="6670797" cy="1015663"/>
+          </a:xfrm>
+          <a:prstGeom prst="rect">
+            <a:avLst/>
+          </a:prstGeom>
+          <a:noFill/>
+        </p:spPr>
+        <p:txBody>
+          <a:bodyPr wrap="square" rtlCol="0">
+            <a:spAutoFit/>
+          </a:bodyPr>
+          <a:lstStyle/>
+          <a:p>
+            <a:r>
+              <a:rPr lang="it-IT" sz="2000" dirty="0"/>
+              <a:t>Mantenendo lo stesso modello dinamico, è stata scelta come uscita la variabile di stato x e ripetuto lo studio della controllabilità e della osservabilità del sistema ottenuto.</a:t>
+            </a:r>
+          </a:p>
+        </p:txBody>
+      </p:sp>
+      <p:pic>
+        <p:nvPicPr>
+          <p:cNvPr id="4" name="Immagine 3">
+            <a:extLst>
+              <a:ext uri="{FF2B5EF4-FFF2-40B4-BE49-F238E27FC236}">
+                <a16:creationId xmlns:a16="http://schemas.microsoft.com/office/drawing/2014/main" id="{0BEAAF86-3F48-8847-8D11-8CCFF5FC089D}"/>
+              </a:ext>
+            </a:extLst>
+          </p:cNvPr>
+          <p:cNvPicPr>
+            <a:picLocks noChangeAspect="1"/>
+          </p:cNvPicPr>
+          <p:nvPr/>
+        </p:nvPicPr>
+        <p:blipFill>
+          <a:blip r:embed="rId3"/>
+          <a:stretch>
+            <a:fillRect/>
+          </a:stretch>
+        </p:blipFill>
+        <p:spPr>
+          <a:xfrm>
+            <a:off x="6507100" y="2649454"/>
+            <a:ext cx="1651000" cy="660400"/>
+          </a:xfrm>
+          <a:prstGeom prst="rect">
+            <a:avLst/>
+          </a:prstGeom>
+        </p:spPr>
+      </p:pic>
+      <p:pic>
+        <p:nvPicPr>
+          <p:cNvPr id="7" name="Immagine 6">
+            <a:extLst>
+              <a:ext uri="{FF2B5EF4-FFF2-40B4-BE49-F238E27FC236}">
+                <a16:creationId xmlns:a16="http://schemas.microsoft.com/office/drawing/2014/main" id="{F9F8DC63-EB5D-374B-9F4A-A1EF5FF89A21}"/>
+              </a:ext>
+            </a:extLst>
+          </p:cNvPr>
+          <p:cNvPicPr>
+            <a:picLocks noChangeAspect="1"/>
+          </p:cNvPicPr>
+          <p:nvPr/>
+        </p:nvPicPr>
+        <p:blipFill>
+          <a:blip r:embed="rId4"/>
+          <a:stretch>
+            <a:fillRect/>
+          </a:stretch>
+        </p:blipFill>
+        <p:spPr>
+          <a:xfrm>
+            <a:off x="1524000" y="3468023"/>
+            <a:ext cx="6477000" cy="1603375"/>
+          </a:xfrm>
+          <a:prstGeom prst="rect">
+            <a:avLst/>
+          </a:prstGeom>
+        </p:spPr>
+      </p:pic>
+      <p:pic>
+        <p:nvPicPr>
+          <p:cNvPr id="11" name="Immagine 10">
+            <a:extLst>
+              <a:ext uri="{FF2B5EF4-FFF2-40B4-BE49-F238E27FC236}">
+                <a16:creationId xmlns:a16="http://schemas.microsoft.com/office/drawing/2014/main" id="{1A63D091-8FD0-D943-8BE5-2D5DFF337684}"/>
+              </a:ext>
+            </a:extLst>
+          </p:cNvPr>
+          <p:cNvPicPr>
+            <a:picLocks noChangeAspect="1"/>
+          </p:cNvPicPr>
+          <p:nvPr/>
+        </p:nvPicPr>
+        <p:blipFill>
+          <a:blip r:embed="rId5"/>
+          <a:stretch>
+            <a:fillRect/>
+          </a:stretch>
+        </p:blipFill>
+        <p:spPr>
+          <a:xfrm>
+            <a:off x="8001000" y="3468023"/>
+            <a:ext cx="3302000" cy="1619250"/>
+          </a:xfrm>
+          <a:prstGeom prst="rect">
+            <a:avLst/>
+          </a:prstGeom>
+        </p:spPr>
+      </p:pic>
+      <p:sp>
+        <p:nvSpPr>
+          <p:cNvPr id="10" name="Segnaposto data 3">
+            <a:extLst>
+              <a:ext uri="{FF2B5EF4-FFF2-40B4-BE49-F238E27FC236}">
+                <a16:creationId xmlns:a16="http://schemas.microsoft.com/office/drawing/2014/main" id="{05C89D9B-6C9B-4E48-9D4F-6AFF98E923D7}"/>
+              </a:ext>
+            </a:extLst>
+          </p:cNvPr>
+          <p:cNvSpPr>
+            <a:spLocks noGrp="1"/>
+          </p:cNvSpPr>
+          <p:nvPr>
+            <p:ph type="dt" sz="half" idx="10"/>
+          </p:nvPr>
+        </p:nvSpPr>
+        <p:spPr>
+          <a:xfrm>
+            <a:off x="838200" y="6356350"/>
+            <a:ext cx="2743200" cy="365125"/>
+          </a:xfrm>
+        </p:spPr>
+        <p:txBody>
+          <a:bodyPr/>
+          <a:lstStyle/>
+          <a:p>
+            <a:fld id="{4EF59023-6175-3944-979D-CFE35E3A8267}" type="datetime1">
+              <a:rPr lang="it-IT" smtClean="0"/>
+              <a:t>27/01/2022</a:t>
+            </a:fld>
+            <a:endParaRPr lang="en-US" dirty="0"/>
+          </a:p>
+        </p:txBody>
+      </p:sp>
+      <p:sp>
+        <p:nvSpPr>
+          <p:cNvPr id="12" name="Segnaposto piè di pagina 4">
+            <a:extLst>
+              <a:ext uri="{FF2B5EF4-FFF2-40B4-BE49-F238E27FC236}">
+                <a16:creationId xmlns:a16="http://schemas.microsoft.com/office/drawing/2014/main" id="{B10A4DC1-2B85-F745-82E6-0410F049FAD0}"/>
+              </a:ext>
+            </a:extLst>
+          </p:cNvPr>
+          <p:cNvSpPr>
+            <a:spLocks noGrp="1"/>
+          </p:cNvSpPr>
+          <p:nvPr>
+            <p:ph type="ftr" sz="quarter" idx="11"/>
+          </p:nvPr>
+        </p:nvSpPr>
+        <p:spPr>
+          <a:xfrm>
+            <a:off x="4038600" y="6356350"/>
+            <a:ext cx="4114800" cy="365125"/>
+          </a:xfrm>
+        </p:spPr>
+        <p:txBody>
+          <a:bodyPr/>
+          <a:lstStyle/>
+          <a:p>
+            <a:r>
+              <a:rPr lang="en-US"/>
+              <a:t>Arianna Gasparri</a:t>
+            </a:r>
+            <a:endParaRPr lang="en-US" dirty="0"/>
+          </a:p>
+        </p:txBody>
+      </p:sp>
+      <p:sp>
+        <p:nvSpPr>
+          <p:cNvPr id="14" name="Segnaposto numero diapositiva 5">
+            <a:extLst>
+              <a:ext uri="{FF2B5EF4-FFF2-40B4-BE49-F238E27FC236}">
+                <a16:creationId xmlns:a16="http://schemas.microsoft.com/office/drawing/2014/main" id="{64915A39-08C4-D34D-A369-F65F3351495A}"/>
+              </a:ext>
+            </a:extLst>
+          </p:cNvPr>
+          <p:cNvSpPr>
+            <a:spLocks noGrp="1"/>
+          </p:cNvSpPr>
+          <p:nvPr>
+            <p:ph type="sldNum" sz="quarter" idx="12"/>
+          </p:nvPr>
+        </p:nvSpPr>
+        <p:spPr>
+          <a:xfrm>
+            <a:off x="8610600" y="6356350"/>
+            <a:ext cx="2743200" cy="365125"/>
+          </a:xfrm>
+        </p:spPr>
+        <p:txBody>
+          <a:bodyPr/>
+          <a:lstStyle/>
+          <a:p>
+            <a:fld id="{6D22F896-40B5-4ADD-8801-0D06FADFA095}" type="slidenum">
+              <a:rPr lang="en-US" smtClean="0"/>
+              <a:t>35</a:t>
+            </a:fld>
+            <a:endParaRPr lang="en-US" dirty="0"/>
+          </a:p>
+        </p:txBody>
+      </p:sp>
+      <p:pic>
+        <p:nvPicPr>
+          <p:cNvPr id="15" name="Immagine 14">
+            <a:extLst>
+              <a:ext uri="{FF2B5EF4-FFF2-40B4-BE49-F238E27FC236}">
+                <a16:creationId xmlns:a16="http://schemas.microsoft.com/office/drawing/2014/main" id="{2F70A25C-5291-AE45-918C-B8931863406E}"/>
+              </a:ext>
+            </a:extLst>
+          </p:cNvPr>
+          <p:cNvPicPr>
+            <a:picLocks noChangeAspect="1"/>
+          </p:cNvPicPr>
+          <p:nvPr/>
+        </p:nvPicPr>
+        <p:blipFill>
+          <a:blip r:embed="rId6" cstate="print">
+            <a:extLst>
+              <a:ext uri="{28A0092B-C50C-407E-A947-70E740481C1C}">
+                <a14:useLocalDpi xmlns:a14="http://schemas.microsoft.com/office/drawing/2010/main" val="0"/>
+              </a:ext>
+            </a:extLst>
+          </a:blip>
+          <a:stretch>
+            <a:fillRect/>
+          </a:stretch>
+        </p:blipFill>
+        <p:spPr>
+          <a:xfrm>
+            <a:off x="241420" y="265431"/>
+            <a:ext cx="571500" cy="518160"/>
+          </a:xfrm>
+          <a:prstGeom prst="rect">
+            <a:avLst/>
+          </a:prstGeom>
+        </p:spPr>
+      </p:pic>
+      <p:pic>
+        <p:nvPicPr>
+          <p:cNvPr id="6" name="Immagine 5">
+            <a:extLst>
+              <a:ext uri="{FF2B5EF4-FFF2-40B4-BE49-F238E27FC236}">
+                <a16:creationId xmlns:a16="http://schemas.microsoft.com/office/drawing/2014/main" id="{3D0E4CCF-0EDF-F848-9324-0D50EF216714}"/>
+              </a:ext>
+            </a:extLst>
+          </p:cNvPr>
+          <p:cNvPicPr>
+            <a:picLocks noChangeAspect="1"/>
+          </p:cNvPicPr>
+          <p:nvPr/>
+        </p:nvPicPr>
+        <p:blipFill>
+          <a:blip r:embed="rId7"/>
+          <a:stretch>
+            <a:fillRect/>
+          </a:stretch>
+        </p:blipFill>
+        <p:spPr>
+          <a:xfrm>
+            <a:off x="5324860" y="5160794"/>
+            <a:ext cx="1542279" cy="452779"/>
+          </a:xfrm>
+          <a:prstGeom prst="rect">
+            <a:avLst/>
+          </a:prstGeom>
+        </p:spPr>
+      </p:pic>
+    </p:spTree>
+    <p:extLst>
+      <p:ext uri="{BB962C8B-B14F-4D97-AF65-F5344CB8AC3E}">
+        <p14:creationId xmlns:p14="http://schemas.microsoft.com/office/powerpoint/2010/main" val="1367849245"/>
+      </p:ext>
+    </p:extLst>
+  </p:cSld>
+  <p:clrMapOvr>
+    <a:masterClrMapping/>
+  </p:clrMapOvr>
+</p:sld>
+</file>
+
+<file path=ppt/slides/slide36.xml><?xml version="1.0" encoding="utf-8"?>
+<p:sld xmlns:a="http://schemas.openxmlformats.org/drawingml/2006/main" xmlns:r="http://schemas.openxmlformats.org/officeDocument/2006/relationships" xmlns:p="http://schemas.openxmlformats.org/presentationml/2006/main">
+  <p:cSld>
+    <p:spTree>
+      <p:nvGrpSpPr>
+        <p:cNvPr id="1" name=""/>
+        <p:cNvGrpSpPr/>
+        <p:nvPr/>
+      </p:nvGrpSpPr>
+      <p:grpSpPr>
+        <a:xfrm>
+          <a:off x="0" y="0"/>
+          <a:ext cx="0" cy="0"/>
+          <a:chOff x="0" y="0"/>
+          <a:chExt cx="0" cy="0"/>
+        </a:xfrm>
+      </p:grpSpPr>
+      <p:pic>
+        <p:nvPicPr>
+          <p:cNvPr id="5" name="Immagine 4">
+            <a:extLst>
+              <a:ext uri="{FF2B5EF4-FFF2-40B4-BE49-F238E27FC236}">
+                <a16:creationId xmlns:a16="http://schemas.microsoft.com/office/drawing/2014/main" id="{6B271FC1-9853-8B46-B074-A5E6D5A515AD}"/>
+              </a:ext>
+            </a:extLst>
+          </p:cNvPr>
+          <p:cNvPicPr>
+            <a:picLocks noChangeAspect="1"/>
+          </p:cNvPicPr>
+          <p:nvPr/>
+        </p:nvPicPr>
+        <p:blipFill>
+          <a:blip r:embed="rId2"/>
+          <a:stretch>
+            <a:fillRect/>
+          </a:stretch>
+        </p:blipFill>
+        <p:spPr>
+          <a:xfrm>
+            <a:off x="1714030" y="1475623"/>
+            <a:ext cx="2093143" cy="1332000"/>
+          </a:xfrm>
+          <a:prstGeom prst="rect">
+            <a:avLst/>
+          </a:prstGeom>
+        </p:spPr>
+      </p:pic>
+      <p:sp>
+        <p:nvSpPr>
+          <p:cNvPr id="8" name="Titolo 1">
+            <a:extLst>
+              <a:ext uri="{FF2B5EF4-FFF2-40B4-BE49-F238E27FC236}">
+                <a16:creationId xmlns:a16="http://schemas.microsoft.com/office/drawing/2014/main" id="{E8EDF0BB-0558-644B-BB96-58C4BD179ABC}"/>
+              </a:ext>
+            </a:extLst>
+          </p:cNvPr>
+          <p:cNvSpPr txBox="1">
+            <a:spLocks/>
+          </p:cNvSpPr>
+          <p:nvPr/>
+        </p:nvSpPr>
+        <p:spPr>
+          <a:xfrm>
+            <a:off x="1524000" y="454393"/>
+            <a:ext cx="9144000" cy="1021230"/>
+          </a:xfrm>
+          <a:prstGeom prst="rect">
+            <a:avLst/>
+          </a:prstGeom>
+        </p:spPr>
+        <p:txBody>
+          <a:bodyPr vert="horz" lIns="91440" tIns="45720" rIns="91440" bIns="45720" rtlCol="0" anchor="ctr">
+            <a:normAutofit/>
+          </a:bodyPr>
+          <a:lstStyle>
+            <a:lvl1pPr algn="l" defTabSz="914400" rtl="0" eaLnBrk="1" latinLnBrk="0" hangingPunct="1">
+              <a:lnSpc>
+                <a:spcPct val="90000"/>
+              </a:lnSpc>
+              <a:spcBef>
+                <a:spcPct val="0"/>
+              </a:spcBef>
+              <a:buNone/>
+              <a:defRPr sz="4400" kern="1200">
+                <a:solidFill>
+                  <a:schemeClr val="tx1"/>
+                </a:solidFill>
+                <a:latin typeface="+mj-lt"/>
+                <a:ea typeface="+mj-ea"/>
+                <a:cs typeface="+mj-cs"/>
+              </a:defRPr>
+            </a:lvl1pPr>
+          </a:lstStyle>
+          <a:p>
+            <a:pPr algn="ctr"/>
+            <a:r>
+              <a:rPr lang="it-IT" dirty="0"/>
+              <a:t>Gantry crane</a:t>
+            </a:r>
+          </a:p>
+        </p:txBody>
+      </p:sp>
+      <mc:AlternateContent xmlns:mc="http://schemas.openxmlformats.org/markup-compatibility/2006" xmlns:a14="http://schemas.microsoft.com/office/drawing/2010/main">
+        <mc:Choice Requires="a14">
           <p:sp>
             <p:nvSpPr>
               <p:cNvPr id="9" name="CasellaDiTesto 8">
@@ -16770,7 +17061,7 @@
             </p:txBody>
           </p:sp>
         </mc:Choice>
-        <mc:Fallback>
+        <mc:Fallback xmlns="">
           <p:sp>
             <p:nvSpPr>
               <p:cNvPr id="9" name="CasellaDiTesto 8">
@@ -16843,7 +17134,7 @@
           <a:p>
             <a:fld id="{4EF59023-6175-3944-979D-CFE35E3A8267}" type="datetime1">
               <a:rPr lang="it-IT" smtClean="0"/>
-              <a:t>11/01/22</a:t>
+              <a:t>27/01/2022</a:t>
             </a:fld>
             <a:endParaRPr lang="en-US" dirty="0"/>
           </a:p>
@@ -16911,7 +17202,7 @@
           <a:p>
             <a:fld id="{6D22F896-40B5-4ADD-8801-0D06FADFA095}" type="slidenum">
               <a:rPr lang="en-US" smtClean="0"/>
-              <a:t>35</a:t>
+              <a:t>36</a:t>
             </a:fld>
             <a:endParaRPr lang="en-US" dirty="0"/>
           </a:p>
@@ -16953,8 +17244,8 @@
           </a:prstGeom>
         </p:spPr>
       </p:pic>
-      <mc:AlternateContent xmlns:mc="http://schemas.openxmlformats.org/markup-compatibility/2006">
-        <mc:Choice xmlns:a14="http://schemas.microsoft.com/office/drawing/2010/main" Requires="a14">
+      <mc:AlternateContent xmlns:mc="http://schemas.openxmlformats.org/markup-compatibility/2006" xmlns:a14="http://schemas.microsoft.com/office/drawing/2010/main">
+        <mc:Choice Requires="a14">
           <p:sp>
             <p:nvSpPr>
               <p:cNvPr id="13" name="CasellaDiTesto 12">
@@ -17020,6 +17311,7 @@
                 </a:r>
               </a:p>
               <a:p>
+                <a:pPr/>
                 <a14:m>
                   <m:oMathPara xmlns:m="http://schemas.openxmlformats.org/officeDocument/2006/math">
                     <m:oMathParaPr>
@@ -17299,7 +17591,7 @@
             </p:txBody>
           </p:sp>
         </mc:Choice>
-        <mc:Fallback>
+        <mc:Fallback xmlns="">
           <p:sp>
             <p:nvSpPr>
               <p:cNvPr id="13" name="CasellaDiTesto 12">
@@ -17357,7 +17649,7 @@
 </p:sld>
 </file>
 
-<file path=ppt/slides/slide36.xml><?xml version="1.0" encoding="utf-8"?>
+<file path=ppt/slides/slide37.xml><?xml version="1.0" encoding="utf-8"?>
 <p:sld xmlns:a="http://schemas.openxmlformats.org/drawingml/2006/main" xmlns:r="http://schemas.openxmlformats.org/officeDocument/2006/relationships" xmlns:p="http://schemas.openxmlformats.org/presentationml/2006/main">
   <p:cSld>
     <p:spTree>
@@ -17423,18 +17715,9 @@
           <a:p>
             <a:pPr algn="ctr"/>
             <a:r>
-              <a:rPr lang="it-IT" dirty="0" err="1"/>
-              <a:t>Granty</a:t>
-            </a:r>
-            <a:r>
               <a:rPr lang="it-IT" dirty="0"/>
-              <a:t> </a:t>
-            </a:r>
-            <a:r>
-              <a:rPr lang="it-IT" dirty="0" err="1"/>
-              <a:t>crane</a:t>
-            </a:r>
-            <a:endParaRPr lang="it-IT" dirty="0"/>
+              <a:t>Gantry crane</a:t>
+            </a:r>
           </a:p>
         </p:txBody>
       </p:sp>
@@ -17496,7 +17779,7 @@
           <a:p>
             <a:fld id="{4EF59023-6175-3944-979D-CFE35E3A8267}" type="datetime1">
               <a:rPr lang="it-IT" smtClean="0"/>
-              <a:t>11/01/22</a:t>
+              <a:t>27/01/2022</a:t>
             </a:fld>
             <a:endParaRPr lang="en-US" dirty="0"/>
           </a:p>
@@ -17564,7 +17847,7 @@
           <a:p>
             <a:fld id="{6D22F896-40B5-4ADD-8801-0D06FADFA095}" type="slidenum">
               <a:rPr lang="en-US" smtClean="0"/>
-              <a:t>36</a:t>
+              <a:t>37</a:t>
             </a:fld>
             <a:endParaRPr lang="en-US" dirty="0"/>
           </a:p>
@@ -17606,8 +17889,8 @@
           </a:prstGeom>
         </p:spPr>
       </p:pic>
-      <mc:AlternateContent xmlns:mc="http://schemas.openxmlformats.org/markup-compatibility/2006">
-        <mc:Choice xmlns:a14="http://schemas.microsoft.com/office/drawing/2010/main" Requires="a14">
+      <mc:AlternateContent xmlns:mc="http://schemas.openxmlformats.org/markup-compatibility/2006" xmlns:a14="http://schemas.microsoft.com/office/drawing/2010/main">
+        <mc:Choice Requires="a14">
           <p:sp>
             <p:nvSpPr>
               <p:cNvPr id="2" name="CasellaDiTesto 1">
@@ -17683,7 +17966,7 @@
             </p:txBody>
           </p:sp>
         </mc:Choice>
-        <mc:Fallback>
+        <mc:Fallback xmlns="">
           <p:sp>
             <p:nvSpPr>
               <p:cNvPr id="2" name="CasellaDiTesto 1">
@@ -17807,7 +18090,7 @@
 </p:sld>
 </file>
 
-<file path=ppt/slides/slide37.xml><?xml version="1.0" encoding="utf-8"?>
+<file path=ppt/slides/slide38.xml><?xml version="1.0" encoding="utf-8"?>
 <p:sld xmlns:a="http://schemas.openxmlformats.org/drawingml/2006/main" xmlns:r="http://schemas.openxmlformats.org/officeDocument/2006/relationships" xmlns:p="http://schemas.openxmlformats.org/presentationml/2006/main">
   <p:cSld>
     <p:spTree>
@@ -17903,23 +18186,14 @@
           <a:p>
             <a:pPr algn="ctr"/>
             <a:r>
-              <a:rPr lang="it-IT" dirty="0" err="1"/>
-              <a:t>Granty</a:t>
-            </a:r>
-            <a:r>
               <a:rPr lang="it-IT" dirty="0"/>
-              <a:t> </a:t>
-            </a:r>
-            <a:r>
-              <a:rPr lang="it-IT" dirty="0" err="1"/>
-              <a:t>crane</a:t>
-            </a:r>
-            <a:endParaRPr lang="it-IT" dirty="0"/>
-          </a:p>
-        </p:txBody>
-      </p:sp>
-      <mc:AlternateContent xmlns:mc="http://schemas.openxmlformats.org/markup-compatibility/2006">
-        <mc:Choice xmlns:a14="http://schemas.microsoft.com/office/drawing/2010/main" Requires="a14">
+              <a:t>Gantry crane</a:t>
+            </a:r>
+          </a:p>
+        </p:txBody>
+      </p:sp>
+      <mc:AlternateContent xmlns:mc="http://schemas.openxmlformats.org/markup-compatibility/2006" xmlns:a14="http://schemas.microsoft.com/office/drawing/2010/main">
+        <mc:Choice Requires="a14">
           <p:sp>
             <p:nvSpPr>
               <p:cNvPr id="9" name="CasellaDiTesto 8">
@@ -17971,7 +18245,7 @@
             </p:txBody>
           </p:sp>
         </mc:Choice>
-        <mc:Fallback>
+        <mc:Fallback xmlns="">
           <p:sp>
             <p:nvSpPr>
               <p:cNvPr id="9" name="CasellaDiTesto 8">
@@ -18044,7 +18318,7 @@
           <a:p>
             <a:fld id="{4EF59023-6175-3944-979D-CFE35E3A8267}" type="datetime1">
               <a:rPr lang="it-IT" smtClean="0"/>
-              <a:t>11/01/22</a:t>
+              <a:t>27/01/2022</a:t>
             </a:fld>
             <a:endParaRPr lang="en-US" dirty="0"/>
           </a:p>
@@ -18112,7 +18386,7 @@
           <a:p>
             <a:fld id="{6D22F896-40B5-4ADD-8801-0D06FADFA095}" type="slidenum">
               <a:rPr lang="en-US" smtClean="0"/>
-              <a:t>37</a:t>
+              <a:t>38</a:t>
             </a:fld>
             <a:endParaRPr lang="en-US" dirty="0"/>
           </a:p>
@@ -18184,8 +18458,8 @@
           </a:prstGeom>
         </p:spPr>
       </p:pic>
-      <mc:AlternateContent xmlns:mc="http://schemas.openxmlformats.org/markup-compatibility/2006">
-        <mc:Choice xmlns:a14="http://schemas.microsoft.com/office/drawing/2010/main" Requires="a14">
+      <mc:AlternateContent xmlns:mc="http://schemas.openxmlformats.org/markup-compatibility/2006" xmlns:a14="http://schemas.microsoft.com/office/drawing/2010/main">
+        <mc:Choice Requires="a14">
           <p:sp>
             <p:nvSpPr>
               <p:cNvPr id="18" name="CasellaDiTesto 17">
@@ -18257,7 +18531,7 @@
             </p:txBody>
           </p:sp>
         </mc:Choice>
-        <mc:Fallback>
+        <mc:Fallback xmlns="">
           <p:sp>
             <p:nvSpPr>
               <p:cNvPr id="18" name="CasellaDiTesto 17">
@@ -18345,7 +18619,7 @@
 </p:sld>
 </file>
 
-<file path=ppt/slides/slide38.xml><?xml version="1.0" encoding="utf-8"?>
+<file path=ppt/slides/slide39.xml><?xml version="1.0" encoding="utf-8"?>
 <p:sld xmlns:a="http://schemas.openxmlformats.org/drawingml/2006/main" xmlns:r="http://schemas.openxmlformats.org/officeDocument/2006/relationships" xmlns:p="http://schemas.openxmlformats.org/presentationml/2006/main">
   <p:cSld>
     <p:spTree>
@@ -18411,18 +18685,9 @@
           <a:p>
             <a:pPr algn="ctr"/>
             <a:r>
-              <a:rPr lang="it-IT" dirty="0" err="1"/>
-              <a:t>Granty</a:t>
-            </a:r>
-            <a:r>
               <a:rPr lang="it-IT" dirty="0"/>
-              <a:t> </a:t>
-            </a:r>
-            <a:r>
-              <a:rPr lang="it-IT" dirty="0" err="1"/>
-              <a:t>crane</a:t>
-            </a:r>
-            <a:endParaRPr lang="it-IT" dirty="0"/>
+              <a:t>Gantry crane</a:t>
+            </a:r>
           </a:p>
         </p:txBody>
       </p:sp>
@@ -18484,7 +18749,7 @@
           <a:p>
             <a:fld id="{4EF59023-6175-3944-979D-CFE35E3A8267}" type="datetime1">
               <a:rPr lang="it-IT" smtClean="0"/>
-              <a:t>11/01/22</a:t>
+              <a:t>27/01/2022</a:t>
             </a:fld>
             <a:endParaRPr lang="en-US" dirty="0"/>
           </a:p>
@@ -18556,7 +18821,7 @@
           <a:p>
             <a:fld id="{6D22F896-40B5-4ADD-8801-0D06FADFA095}" type="slidenum">
               <a:rPr lang="en-US" smtClean="0"/>
-              <a:t>38</a:t>
+              <a:t>39</a:t>
             </a:fld>
             <a:endParaRPr lang="en-US" dirty="0"/>
           </a:p>
@@ -18598,8 +18863,8 @@
           </a:prstGeom>
         </p:spPr>
       </p:pic>
-      <mc:AlternateContent xmlns:mc="http://schemas.openxmlformats.org/markup-compatibility/2006">
-        <mc:Choice xmlns:a14="http://schemas.microsoft.com/office/drawing/2010/main" Requires="a14">
+      <mc:AlternateContent xmlns:mc="http://schemas.openxmlformats.org/markup-compatibility/2006" xmlns:a14="http://schemas.microsoft.com/office/drawing/2010/main">
+        <mc:Choice Requires="a14">
           <p:sp>
             <p:nvSpPr>
               <p:cNvPr id="2" name="CasellaDiTesto 1">
@@ -18675,7 +18940,7 @@
             </p:txBody>
           </p:sp>
         </mc:Choice>
-        <mc:Fallback>
+        <mc:Fallback xmlns="">
           <p:sp>
             <p:nvSpPr>
               <p:cNvPr id="2" name="CasellaDiTesto 1">
@@ -18790,238 +19055,6 @@
     <p:extLst>
       <p:ext uri="{BB962C8B-B14F-4D97-AF65-F5344CB8AC3E}">
         <p14:creationId xmlns:p14="http://schemas.microsoft.com/office/powerpoint/2010/main" val="1954747474"/>
-      </p:ext>
-    </p:extLst>
-  </p:cSld>
-  <p:clrMapOvr>
-    <a:masterClrMapping/>
-  </p:clrMapOvr>
-</p:sld>
-</file>
-
-<file path=ppt/slides/slide39.xml><?xml version="1.0" encoding="utf-8"?>
-<p:sld xmlns:a="http://schemas.openxmlformats.org/drawingml/2006/main" xmlns:r="http://schemas.openxmlformats.org/officeDocument/2006/relationships" xmlns:p="http://schemas.openxmlformats.org/presentationml/2006/main">
-  <p:cSld>
-    <p:spTree>
-      <p:nvGrpSpPr>
-        <p:cNvPr id="1" name=""/>
-        <p:cNvGrpSpPr/>
-        <p:nvPr/>
-      </p:nvGrpSpPr>
-      <p:grpSpPr>
-        <a:xfrm>
-          <a:off x="0" y="0"/>
-          <a:ext cx="0" cy="0"/>
-          <a:chOff x="0" y="0"/>
-          <a:chExt cx="0" cy="0"/>
-        </a:xfrm>
-      </p:grpSpPr>
-      <p:sp>
-        <p:nvSpPr>
-          <p:cNvPr id="8" name="Titolo 1">
-            <a:extLst>
-              <a:ext uri="{FF2B5EF4-FFF2-40B4-BE49-F238E27FC236}">
-                <a16:creationId xmlns:a16="http://schemas.microsoft.com/office/drawing/2014/main" id="{E8EDF0BB-0558-644B-BB96-58C4BD179ABC}"/>
-              </a:ext>
-            </a:extLst>
-          </p:cNvPr>
-          <p:cNvSpPr txBox="1">
-            <a:spLocks/>
-          </p:cNvSpPr>
-          <p:nvPr/>
-        </p:nvSpPr>
-        <p:spPr>
-          <a:xfrm>
-            <a:off x="1524000" y="2729761"/>
-            <a:ext cx="9144000" cy="1021230"/>
-          </a:xfrm>
-          <a:prstGeom prst="rect">
-            <a:avLst/>
-          </a:prstGeom>
-        </p:spPr>
-        <p:txBody>
-          <a:bodyPr vert="horz" lIns="91440" tIns="45720" rIns="91440" bIns="45720" rtlCol="0" anchor="ctr">
-            <a:normAutofit/>
-          </a:bodyPr>
-          <a:lstStyle>
-            <a:lvl1pPr algn="l" defTabSz="914400" rtl="0" eaLnBrk="1" latinLnBrk="0" hangingPunct="1">
-              <a:lnSpc>
-                <a:spcPct val="90000"/>
-              </a:lnSpc>
-              <a:spcBef>
-                <a:spcPct val="0"/>
-              </a:spcBef>
-              <a:buNone/>
-              <a:defRPr sz="4400" kern="1200">
-                <a:solidFill>
-                  <a:schemeClr val="tx1"/>
-                </a:solidFill>
-                <a:latin typeface="+mj-lt"/>
-                <a:ea typeface="+mj-ea"/>
-                <a:cs typeface="+mj-cs"/>
-              </a:defRPr>
-            </a:lvl1pPr>
-          </a:lstStyle>
-          <a:p>
-            <a:pPr algn="ctr"/>
-            <a:r>
-              <a:rPr lang="it-IT" dirty="0"/>
-              <a:t>Grazie </a:t>
-            </a:r>
-            <a:r>
-              <a:rPr lang="it-IT"/>
-              <a:t>per l’attenzione.</a:t>
-            </a:r>
-            <a:endParaRPr lang="it-IT" dirty="0"/>
-          </a:p>
-        </p:txBody>
-      </p:sp>
-      <p:sp>
-        <p:nvSpPr>
-          <p:cNvPr id="5" name="Segnaposto data 3">
-            <a:extLst>
-              <a:ext uri="{FF2B5EF4-FFF2-40B4-BE49-F238E27FC236}">
-                <a16:creationId xmlns:a16="http://schemas.microsoft.com/office/drawing/2014/main" id="{10832284-2AF9-D442-A2BC-3A4C6C544DF0}"/>
-              </a:ext>
-            </a:extLst>
-          </p:cNvPr>
-          <p:cNvSpPr>
-            <a:spLocks noGrp="1"/>
-          </p:cNvSpPr>
-          <p:nvPr>
-            <p:ph type="dt" sz="half" idx="10"/>
-          </p:nvPr>
-        </p:nvSpPr>
-        <p:spPr>
-          <a:xfrm>
-            <a:off x="838200" y="6356350"/>
-            <a:ext cx="2743200" cy="365125"/>
-          </a:xfrm>
-        </p:spPr>
-        <p:txBody>
-          <a:bodyPr/>
-          <a:lstStyle/>
-          <a:p>
-            <a:fld id="{4EF59023-6175-3944-979D-CFE35E3A8267}" type="datetime1">
-              <a:rPr lang="it-IT" smtClean="0"/>
-              <a:t>11/01/22</a:t>
-            </a:fld>
-            <a:endParaRPr lang="en-US" dirty="0"/>
-          </a:p>
-        </p:txBody>
-      </p:sp>
-      <p:sp>
-        <p:nvSpPr>
-          <p:cNvPr id="7" name="Segnaposto piè di pagina 4">
-            <a:extLst>
-              <a:ext uri="{FF2B5EF4-FFF2-40B4-BE49-F238E27FC236}">
-                <a16:creationId xmlns:a16="http://schemas.microsoft.com/office/drawing/2014/main" id="{5C3B2BD7-91A2-CA4F-9DA6-4CE984B6F87C}"/>
-              </a:ext>
-            </a:extLst>
-          </p:cNvPr>
-          <p:cNvSpPr>
-            <a:spLocks noGrp="1"/>
-          </p:cNvSpPr>
-          <p:nvPr>
-            <p:ph type="ftr" sz="quarter" idx="11"/>
-          </p:nvPr>
-        </p:nvSpPr>
-        <p:spPr>
-          <a:xfrm>
-            <a:off x="4038600" y="6356350"/>
-            <a:ext cx="4114800" cy="365125"/>
-          </a:xfrm>
-        </p:spPr>
-        <p:txBody>
-          <a:bodyPr/>
-          <a:lstStyle/>
-          <a:p>
-            <a:r>
-              <a:rPr lang="en-US" dirty="0"/>
-              <a:t>Arianna </a:t>
-            </a:r>
-            <a:r>
-              <a:rPr lang="en-US" dirty="0" err="1"/>
-              <a:t>Gasparri</a:t>
-            </a:r>
-            <a:endParaRPr lang="en-US" dirty="0"/>
-          </a:p>
-        </p:txBody>
-      </p:sp>
-      <p:sp>
-        <p:nvSpPr>
-          <p:cNvPr id="10" name="Segnaposto numero diapositiva 5">
-            <a:extLst>
-              <a:ext uri="{FF2B5EF4-FFF2-40B4-BE49-F238E27FC236}">
-                <a16:creationId xmlns:a16="http://schemas.microsoft.com/office/drawing/2014/main" id="{5568013C-6B52-9D43-B6C2-2654FF7BD98A}"/>
-              </a:ext>
-            </a:extLst>
-          </p:cNvPr>
-          <p:cNvSpPr>
-            <a:spLocks noGrp="1"/>
-          </p:cNvSpPr>
-          <p:nvPr>
-            <p:ph type="sldNum" sz="quarter" idx="12"/>
-          </p:nvPr>
-        </p:nvSpPr>
-        <p:spPr>
-          <a:xfrm>
-            <a:off x="8610600" y="6356350"/>
-            <a:ext cx="2743200" cy="365125"/>
-          </a:xfrm>
-        </p:spPr>
-        <p:txBody>
-          <a:bodyPr/>
-          <a:lstStyle/>
-          <a:p>
-            <a:fld id="{6D22F896-40B5-4ADD-8801-0D06FADFA095}" type="slidenum">
-              <a:rPr lang="en-US" smtClean="0"/>
-              <a:t>39</a:t>
-            </a:fld>
-            <a:endParaRPr lang="en-US" dirty="0"/>
-          </a:p>
-        </p:txBody>
-      </p:sp>
-      <p:pic>
-        <p:nvPicPr>
-          <p:cNvPr id="11" name="Immagine 10">
-            <a:extLst>
-              <a:ext uri="{FF2B5EF4-FFF2-40B4-BE49-F238E27FC236}">
-                <a16:creationId xmlns:a16="http://schemas.microsoft.com/office/drawing/2014/main" id="{E9214F11-0DDC-E448-AFA0-4E2BD04563C4}"/>
-              </a:ext>
-            </a:extLst>
-          </p:cNvPr>
-          <p:cNvPicPr>
-            <a:picLocks noChangeAspect="1"/>
-          </p:cNvPicPr>
-          <p:nvPr/>
-        </p:nvPicPr>
-        <p:blipFill>
-          <a:blip r:embed="rId2" cstate="print">
-            <a:extLst>
-              <a:ext uri="{28A0092B-C50C-407E-A947-70E740481C1C}">
-                <a14:useLocalDpi xmlns:a14="http://schemas.microsoft.com/office/drawing/2010/main" val="0"/>
-              </a:ext>
-            </a:extLst>
-          </a:blip>
-          <a:stretch>
-            <a:fillRect/>
-          </a:stretch>
-        </p:blipFill>
-        <p:spPr>
-          <a:xfrm>
-            <a:off x="241420" y="265431"/>
-            <a:ext cx="571500" cy="518160"/>
-          </a:xfrm>
-          <a:prstGeom prst="rect">
-            <a:avLst/>
-          </a:prstGeom>
-        </p:spPr>
-      </p:pic>
-    </p:spTree>
-    <p:extLst>
-      <p:ext uri="{BB962C8B-B14F-4D97-AF65-F5344CB8AC3E}">
-        <p14:creationId xmlns:p14="http://schemas.microsoft.com/office/powerpoint/2010/main" val="3346227278"/>
       </p:ext>
     </p:extLst>
   </p:cSld>
@@ -20949,7 +20982,7 @@
           <a:p>
             <a:fld id="{4EF59023-6175-3944-979D-CFE35E3A8267}" type="datetime1">
               <a:rPr lang="it-IT" smtClean="0"/>
-              <a:t>08/01/22</a:t>
+              <a:t>27/01/2022</a:t>
             </a:fld>
             <a:endParaRPr lang="en-US" dirty="0"/>
           </a:p>
@@ -21063,6 +21096,238 @@
     <p:extLst>
       <p:ext uri="{BB962C8B-B14F-4D97-AF65-F5344CB8AC3E}">
         <p14:creationId xmlns:p14="http://schemas.microsoft.com/office/powerpoint/2010/main" val="2254414322"/>
+      </p:ext>
+    </p:extLst>
+  </p:cSld>
+  <p:clrMapOvr>
+    <a:masterClrMapping/>
+  </p:clrMapOvr>
+</p:sld>
+</file>
+
+<file path=ppt/slides/slide40.xml><?xml version="1.0" encoding="utf-8"?>
+<p:sld xmlns:a="http://schemas.openxmlformats.org/drawingml/2006/main" xmlns:r="http://schemas.openxmlformats.org/officeDocument/2006/relationships" xmlns:p="http://schemas.openxmlformats.org/presentationml/2006/main">
+  <p:cSld>
+    <p:spTree>
+      <p:nvGrpSpPr>
+        <p:cNvPr id="1" name=""/>
+        <p:cNvGrpSpPr/>
+        <p:nvPr/>
+      </p:nvGrpSpPr>
+      <p:grpSpPr>
+        <a:xfrm>
+          <a:off x="0" y="0"/>
+          <a:ext cx="0" cy="0"/>
+          <a:chOff x="0" y="0"/>
+          <a:chExt cx="0" cy="0"/>
+        </a:xfrm>
+      </p:grpSpPr>
+      <p:sp>
+        <p:nvSpPr>
+          <p:cNvPr id="8" name="Titolo 1">
+            <a:extLst>
+              <a:ext uri="{FF2B5EF4-FFF2-40B4-BE49-F238E27FC236}">
+                <a16:creationId xmlns:a16="http://schemas.microsoft.com/office/drawing/2014/main" id="{E8EDF0BB-0558-644B-BB96-58C4BD179ABC}"/>
+              </a:ext>
+            </a:extLst>
+          </p:cNvPr>
+          <p:cNvSpPr txBox="1">
+            <a:spLocks/>
+          </p:cNvSpPr>
+          <p:nvPr/>
+        </p:nvSpPr>
+        <p:spPr>
+          <a:xfrm>
+            <a:off x="1524000" y="2729761"/>
+            <a:ext cx="9144000" cy="1021230"/>
+          </a:xfrm>
+          <a:prstGeom prst="rect">
+            <a:avLst/>
+          </a:prstGeom>
+        </p:spPr>
+        <p:txBody>
+          <a:bodyPr vert="horz" lIns="91440" tIns="45720" rIns="91440" bIns="45720" rtlCol="0" anchor="ctr">
+            <a:normAutofit/>
+          </a:bodyPr>
+          <a:lstStyle>
+            <a:lvl1pPr algn="l" defTabSz="914400" rtl="0" eaLnBrk="1" latinLnBrk="0" hangingPunct="1">
+              <a:lnSpc>
+                <a:spcPct val="90000"/>
+              </a:lnSpc>
+              <a:spcBef>
+                <a:spcPct val="0"/>
+              </a:spcBef>
+              <a:buNone/>
+              <a:defRPr sz="4400" kern="1200">
+                <a:solidFill>
+                  <a:schemeClr val="tx1"/>
+                </a:solidFill>
+                <a:latin typeface="+mj-lt"/>
+                <a:ea typeface="+mj-ea"/>
+                <a:cs typeface="+mj-cs"/>
+              </a:defRPr>
+            </a:lvl1pPr>
+          </a:lstStyle>
+          <a:p>
+            <a:pPr algn="ctr"/>
+            <a:r>
+              <a:rPr lang="it-IT" dirty="0"/>
+              <a:t>Grazie </a:t>
+            </a:r>
+            <a:r>
+              <a:rPr lang="it-IT"/>
+              <a:t>per l’attenzione.</a:t>
+            </a:r>
+            <a:endParaRPr lang="it-IT" dirty="0"/>
+          </a:p>
+        </p:txBody>
+      </p:sp>
+      <p:sp>
+        <p:nvSpPr>
+          <p:cNvPr id="5" name="Segnaposto data 3">
+            <a:extLst>
+              <a:ext uri="{FF2B5EF4-FFF2-40B4-BE49-F238E27FC236}">
+                <a16:creationId xmlns:a16="http://schemas.microsoft.com/office/drawing/2014/main" id="{10832284-2AF9-D442-A2BC-3A4C6C544DF0}"/>
+              </a:ext>
+            </a:extLst>
+          </p:cNvPr>
+          <p:cNvSpPr>
+            <a:spLocks noGrp="1"/>
+          </p:cNvSpPr>
+          <p:nvPr>
+            <p:ph type="dt" sz="half" idx="10"/>
+          </p:nvPr>
+        </p:nvSpPr>
+        <p:spPr>
+          <a:xfrm>
+            <a:off x="838200" y="6356350"/>
+            <a:ext cx="2743200" cy="365125"/>
+          </a:xfrm>
+        </p:spPr>
+        <p:txBody>
+          <a:bodyPr/>
+          <a:lstStyle/>
+          <a:p>
+            <a:fld id="{4EF59023-6175-3944-979D-CFE35E3A8267}" type="datetime1">
+              <a:rPr lang="it-IT" smtClean="0"/>
+              <a:t>27/01/2022</a:t>
+            </a:fld>
+            <a:endParaRPr lang="en-US" dirty="0"/>
+          </a:p>
+        </p:txBody>
+      </p:sp>
+      <p:sp>
+        <p:nvSpPr>
+          <p:cNvPr id="7" name="Segnaposto piè di pagina 4">
+            <a:extLst>
+              <a:ext uri="{FF2B5EF4-FFF2-40B4-BE49-F238E27FC236}">
+                <a16:creationId xmlns:a16="http://schemas.microsoft.com/office/drawing/2014/main" id="{5C3B2BD7-91A2-CA4F-9DA6-4CE984B6F87C}"/>
+              </a:ext>
+            </a:extLst>
+          </p:cNvPr>
+          <p:cNvSpPr>
+            <a:spLocks noGrp="1"/>
+          </p:cNvSpPr>
+          <p:nvPr>
+            <p:ph type="ftr" sz="quarter" idx="11"/>
+          </p:nvPr>
+        </p:nvSpPr>
+        <p:spPr>
+          <a:xfrm>
+            <a:off x="4038600" y="6356350"/>
+            <a:ext cx="4114800" cy="365125"/>
+          </a:xfrm>
+        </p:spPr>
+        <p:txBody>
+          <a:bodyPr/>
+          <a:lstStyle/>
+          <a:p>
+            <a:r>
+              <a:rPr lang="en-US" dirty="0"/>
+              <a:t>Arianna </a:t>
+            </a:r>
+            <a:r>
+              <a:rPr lang="en-US" dirty="0" err="1"/>
+              <a:t>Gasparri</a:t>
+            </a:r>
+            <a:endParaRPr lang="en-US" dirty="0"/>
+          </a:p>
+        </p:txBody>
+      </p:sp>
+      <p:sp>
+        <p:nvSpPr>
+          <p:cNvPr id="10" name="Segnaposto numero diapositiva 5">
+            <a:extLst>
+              <a:ext uri="{FF2B5EF4-FFF2-40B4-BE49-F238E27FC236}">
+                <a16:creationId xmlns:a16="http://schemas.microsoft.com/office/drawing/2014/main" id="{5568013C-6B52-9D43-B6C2-2654FF7BD98A}"/>
+              </a:ext>
+            </a:extLst>
+          </p:cNvPr>
+          <p:cNvSpPr>
+            <a:spLocks noGrp="1"/>
+          </p:cNvSpPr>
+          <p:nvPr>
+            <p:ph type="sldNum" sz="quarter" idx="12"/>
+          </p:nvPr>
+        </p:nvSpPr>
+        <p:spPr>
+          <a:xfrm>
+            <a:off x="8610600" y="6356350"/>
+            <a:ext cx="2743200" cy="365125"/>
+          </a:xfrm>
+        </p:spPr>
+        <p:txBody>
+          <a:bodyPr/>
+          <a:lstStyle/>
+          <a:p>
+            <a:fld id="{6D22F896-40B5-4ADD-8801-0D06FADFA095}" type="slidenum">
+              <a:rPr lang="en-US" smtClean="0"/>
+              <a:t>40</a:t>
+            </a:fld>
+            <a:endParaRPr lang="en-US" dirty="0"/>
+          </a:p>
+        </p:txBody>
+      </p:sp>
+      <p:pic>
+        <p:nvPicPr>
+          <p:cNvPr id="11" name="Immagine 10">
+            <a:extLst>
+              <a:ext uri="{FF2B5EF4-FFF2-40B4-BE49-F238E27FC236}">
+                <a16:creationId xmlns:a16="http://schemas.microsoft.com/office/drawing/2014/main" id="{E9214F11-0DDC-E448-AFA0-4E2BD04563C4}"/>
+              </a:ext>
+            </a:extLst>
+          </p:cNvPr>
+          <p:cNvPicPr>
+            <a:picLocks noChangeAspect="1"/>
+          </p:cNvPicPr>
+          <p:nvPr/>
+        </p:nvPicPr>
+        <p:blipFill>
+          <a:blip r:embed="rId2" cstate="print">
+            <a:extLst>
+              <a:ext uri="{28A0092B-C50C-407E-A947-70E740481C1C}">
+                <a14:useLocalDpi xmlns:a14="http://schemas.microsoft.com/office/drawing/2010/main" val="0"/>
+              </a:ext>
+            </a:extLst>
+          </a:blip>
+          <a:stretch>
+            <a:fillRect/>
+          </a:stretch>
+        </p:blipFill>
+        <p:spPr>
+          <a:xfrm>
+            <a:off x="241420" y="265431"/>
+            <a:ext cx="571500" cy="518160"/>
+          </a:xfrm>
+          <a:prstGeom prst="rect">
+            <a:avLst/>
+          </a:prstGeom>
+        </p:spPr>
+      </p:pic>
+    </p:spTree>
+    <p:extLst>
+      <p:ext uri="{BB962C8B-B14F-4D97-AF65-F5344CB8AC3E}">
+        <p14:creationId xmlns:p14="http://schemas.microsoft.com/office/powerpoint/2010/main" val="3346227278"/>
       </p:ext>
     </p:extLst>
   </p:cSld>
@@ -21323,7 +21588,7 @@
           <a:p>
             <a:fld id="{4EF59023-6175-3944-979D-CFE35E3A8267}" type="datetime1">
               <a:rPr lang="it-IT" smtClean="0"/>
-              <a:t>08/01/22</a:t>
+              <a:t>27/01/2022</a:t>
             </a:fld>
             <a:endParaRPr lang="en-US" dirty="0"/>
           </a:p>
@@ -22116,7 +22381,7 @@
           <a:p>
             <a:fld id="{4EF59023-6175-3944-979D-CFE35E3A8267}" type="datetime1">
               <a:rPr lang="it-IT" smtClean="0"/>
-              <a:t>08/01/22</a:t>
+              <a:t>27/01/2022</a:t>
             </a:fld>
             <a:endParaRPr lang="en-US" dirty="0"/>
           </a:p>
@@ -22703,7 +22968,7 @@
           <a:p>
             <a:fld id="{4EF59023-6175-3944-979D-CFE35E3A8267}" type="datetime1">
               <a:rPr lang="it-IT" smtClean="0"/>
-              <a:t>08/01/22</a:t>
+              <a:t>27/01/2022</a:t>
             </a:fld>
             <a:endParaRPr lang="en-US" dirty="0"/>
           </a:p>
@@ -22956,7 +23221,7 @@
           <a:p>
             <a:fld id="{4EF59023-6175-3944-979D-CFE35E3A8267}" type="datetime1">
               <a:rPr lang="it-IT" smtClean="0"/>
-              <a:t>11/01/22</a:t>
+              <a:t>27/01/2022</a:t>
             </a:fld>
             <a:endParaRPr lang="en-US" dirty="0"/>
           </a:p>
@@ -23066,8 +23331,8 @@
           </a:prstGeom>
         </p:spPr>
       </p:pic>
-      <mc:AlternateContent xmlns:mc="http://schemas.openxmlformats.org/markup-compatibility/2006">
-        <mc:Choice xmlns:a14="http://schemas.microsoft.com/office/drawing/2010/main" Requires="a14">
+      <mc:AlternateContent xmlns:mc="http://schemas.openxmlformats.org/markup-compatibility/2006" xmlns:a14="http://schemas.microsoft.com/office/drawing/2010/main">
+        <mc:Choice Requires="a14">
           <p:sp>
             <p:nvSpPr>
               <p:cNvPr id="3" name="CasellaDiTesto 2">
@@ -23146,13 +23411,7 @@
                       <a:rPr lang="it-IT" i="1">
                         <a:latin typeface="Cambria Math" panose="02040503050406030204" pitchFamily="18" charset="0"/>
                       </a:rPr>
-                      <m:t>𝑞</m:t>
-                    </m:r>
-                    <m:r>
-                      <a:rPr lang="it-IT" i="1" baseline="-25000">
-                        <a:latin typeface="Cambria Math" panose="02040503050406030204" pitchFamily="18" charset="0"/>
-                      </a:rPr>
-                      <m:t>𝑓</m:t>
+                      <m:t>𝑞𝑓</m:t>
                     </m:r>
                     <m:r>
                       <a:rPr lang="it-IT" i="1">
@@ -23203,7 +23462,7 @@
             </p:txBody>
           </p:sp>
         </mc:Choice>
-        <mc:Fallback>
+        <mc:Fallback xmlns="">
           <p:sp>
             <p:nvSpPr>
               <p:cNvPr id="3" name="CasellaDiTesto 2">
@@ -23414,7 +23673,7 @@
           <a:p>
             <a:fld id="{4EF59023-6175-3944-979D-CFE35E3A8267}" type="datetime1">
               <a:rPr lang="it-IT" smtClean="0"/>
-              <a:t>10/01/22</a:t>
+              <a:t>27/01/2022</a:t>
             </a:fld>
             <a:endParaRPr lang="en-US" dirty="0"/>
           </a:p>

</xml_diff>

<commit_message>
Aggiornamento relazione con autovalori della dinamica zero.
</commit_message>
<xml_diff>
--- a/Relazione/Presentazione.pptx
+++ b/Relazione/Presentazione.pptx
@@ -45,7 +45,8 @@
     <p:sldId id="298" r:id="rId39"/>
     <p:sldId id="299" r:id="rId40"/>
     <p:sldId id="301" r:id="rId41"/>
-    <p:sldId id="302" r:id="rId42"/>
+    <p:sldId id="305" r:id="rId42"/>
+    <p:sldId id="302" r:id="rId43"/>
   </p:sldIdLst>
   <p:sldSz cx="12192000" cy="6858000"/>
   <p:notesSz cx="6858000" cy="9144000"/>
@@ -152,6 +153,18 @@
 </p:presentation>
 </file>
 
+<file path=ppt/commentAuthors.xml><?xml version="1.0" encoding="utf-8"?>
+<p:cmAuthorLst xmlns:a="http://schemas.openxmlformats.org/drawingml/2006/main" xmlns:r="http://schemas.openxmlformats.org/officeDocument/2006/relationships" xmlns:p="http://schemas.openxmlformats.org/presentationml/2006/main">
+  <p:cmAuthor id="1" name="Arianna Gasparri" initials="AG" lastIdx="1" clrIdx="0">
+    <p:extLst>
+      <p:ext uri="{19B8F6BF-5375-455C-9EA6-DF929625EA0E}">
+        <p15:presenceInfo xmlns:p15="http://schemas.microsoft.com/office/powerpoint/2012/main" userId="Arianna Gasparri" providerId="None"/>
+      </p:ext>
+    </p:extLst>
+  </p:cmAuthor>
+</p:cmAuthorLst>
+</file>
+
 <file path=ppt/slideLayouts/slideLayout1.xml><?xml version="1.0" encoding="utf-8"?>
 <p:sldLayout xmlns:a="http://schemas.openxmlformats.org/drawingml/2006/main" xmlns:r="http://schemas.openxmlformats.org/officeDocument/2006/relationships" xmlns:p="http://schemas.openxmlformats.org/presentationml/2006/main" type="title" preserve="1">
   <p:cSld name="Diapositiva titolo">
@@ -299,7 +312,7 @@
           <a:p>
             <a:fld id="{27153579-3A4D-BB42-BD49-BB0F80A81A61}" type="datetimeFigureOut">
               <a:rPr lang="it-IT" smtClean="0"/>
-              <a:t>28/01/2022</a:t>
+              <a:t>04/02/2022</a:t>
             </a:fld>
             <a:endParaRPr lang="it-IT"/>
           </a:p>
@@ -472,7 +485,7 @@
           <a:p>
             <a:fld id="{27153579-3A4D-BB42-BD49-BB0F80A81A61}" type="datetimeFigureOut">
               <a:rPr lang="it-IT" smtClean="0"/>
-              <a:t>28/01/2022</a:t>
+              <a:t>04/02/2022</a:t>
             </a:fld>
             <a:endParaRPr lang="it-IT"/>
           </a:p>
@@ -655,7 +668,7 @@
           <a:p>
             <a:fld id="{27153579-3A4D-BB42-BD49-BB0F80A81A61}" type="datetimeFigureOut">
               <a:rPr lang="it-IT" smtClean="0"/>
-              <a:t>28/01/2022</a:t>
+              <a:t>04/02/2022</a:t>
             </a:fld>
             <a:endParaRPr lang="it-IT"/>
           </a:p>
@@ -828,7 +841,7 @@
           <a:p>
             <a:fld id="{27153579-3A4D-BB42-BD49-BB0F80A81A61}" type="datetimeFigureOut">
               <a:rPr lang="it-IT" smtClean="0"/>
-              <a:t>28/01/2022</a:t>
+              <a:t>04/02/2022</a:t>
             </a:fld>
             <a:endParaRPr lang="it-IT"/>
           </a:p>
@@ -1106,7 +1119,7 @@
           <a:p>
             <a:fld id="{27153579-3A4D-BB42-BD49-BB0F80A81A61}" type="datetimeFigureOut">
               <a:rPr lang="it-IT" smtClean="0"/>
-              <a:t>28/01/2022</a:t>
+              <a:t>04/02/2022</a:t>
             </a:fld>
             <a:endParaRPr lang="it-IT"/>
           </a:p>
@@ -1321,7 +1334,7 @@
           <a:p>
             <a:fld id="{27153579-3A4D-BB42-BD49-BB0F80A81A61}" type="datetimeFigureOut">
               <a:rPr lang="it-IT" smtClean="0"/>
-              <a:t>28/01/2022</a:t>
+              <a:t>04/02/2022</a:t>
             </a:fld>
             <a:endParaRPr lang="it-IT"/>
           </a:p>
@@ -1689,7 +1702,7 @@
           <a:p>
             <a:fld id="{27153579-3A4D-BB42-BD49-BB0F80A81A61}" type="datetimeFigureOut">
               <a:rPr lang="it-IT" smtClean="0"/>
-              <a:t>28/01/2022</a:t>
+              <a:t>04/02/2022</a:t>
             </a:fld>
             <a:endParaRPr lang="it-IT"/>
           </a:p>
@@ -1830,7 +1843,7 @@
           <a:p>
             <a:fld id="{27153579-3A4D-BB42-BD49-BB0F80A81A61}" type="datetimeFigureOut">
               <a:rPr lang="it-IT" smtClean="0"/>
-              <a:t>28/01/2022</a:t>
+              <a:t>04/02/2022</a:t>
             </a:fld>
             <a:endParaRPr lang="it-IT"/>
           </a:p>
@@ -1943,7 +1956,7 @@
           <a:p>
             <a:fld id="{27153579-3A4D-BB42-BD49-BB0F80A81A61}" type="datetimeFigureOut">
               <a:rPr lang="it-IT" smtClean="0"/>
-              <a:t>28/01/2022</a:t>
+              <a:t>04/02/2022</a:t>
             </a:fld>
             <a:endParaRPr lang="it-IT"/>
           </a:p>
@@ -2232,7 +2245,7 @@
           <a:p>
             <a:fld id="{27153579-3A4D-BB42-BD49-BB0F80A81A61}" type="datetimeFigureOut">
               <a:rPr lang="it-IT" smtClean="0"/>
-              <a:t>28/01/2022</a:t>
+              <a:t>04/02/2022</a:t>
             </a:fld>
             <a:endParaRPr lang="it-IT"/>
           </a:p>
@@ -2523,7 +2536,7 @@
           <a:p>
             <a:fld id="{27153579-3A4D-BB42-BD49-BB0F80A81A61}" type="datetimeFigureOut">
               <a:rPr lang="it-IT" smtClean="0"/>
-              <a:t>28/01/2022</a:t>
+              <a:t>04/02/2022</a:t>
             </a:fld>
             <a:endParaRPr lang="it-IT"/>
           </a:p>
@@ -2739,7 +2752,7 @@
           <a:p>
             <a:fld id="{27153579-3A4D-BB42-BD49-BB0F80A81A61}" type="datetimeFigureOut">
               <a:rPr lang="it-IT" smtClean="0"/>
-              <a:t>28/01/2022</a:t>
+              <a:t>04/02/2022</a:t>
             </a:fld>
             <a:endParaRPr lang="it-IT"/>
           </a:p>
@@ -3487,7 +3500,7 @@
           <a:p>
             <a:fld id="{4EF59023-6175-3944-979D-CFE35E3A8267}" type="datetime1">
               <a:rPr lang="it-IT" smtClean="0"/>
-              <a:t>28/01/2022</a:t>
+              <a:t>04/02/2022</a:t>
             </a:fld>
             <a:endParaRPr lang="en-US" dirty="0"/>
           </a:p>
@@ -3801,7 +3814,7 @@
           <a:p>
             <a:fld id="{4EF59023-6175-3944-979D-CFE35E3A8267}" type="datetime1">
               <a:rPr lang="it-IT" smtClean="0"/>
-              <a:t>28/01/2022</a:t>
+              <a:t>04/02/2022</a:t>
             </a:fld>
             <a:endParaRPr lang="en-US" dirty="0"/>
           </a:p>
@@ -4145,7 +4158,7 @@
           <a:p>
             <a:fld id="{4EF59023-6175-3944-979D-CFE35E3A8267}" type="datetime1">
               <a:rPr lang="it-IT" smtClean="0"/>
-              <a:t>28/01/2022</a:t>
+              <a:t>04/02/2022</a:t>
             </a:fld>
             <a:endParaRPr lang="en-US" dirty="0"/>
           </a:p>
@@ -4467,7 +4480,7 @@
           <a:p>
             <a:fld id="{4EF59023-6175-3944-979D-CFE35E3A8267}" type="datetime1">
               <a:rPr lang="it-IT" smtClean="0"/>
-              <a:t>28/01/2022</a:t>
+              <a:t>04/02/2022</a:t>
             </a:fld>
             <a:endParaRPr lang="en-US" dirty="0"/>
           </a:p>
@@ -4825,7 +4838,7 @@
           <a:p>
             <a:fld id="{4EF59023-6175-3944-979D-CFE35E3A8267}" type="datetime1">
               <a:rPr lang="it-IT" smtClean="0"/>
-              <a:t>28/01/2022</a:t>
+              <a:t>04/02/2022</a:t>
             </a:fld>
             <a:endParaRPr lang="en-US" dirty="0"/>
           </a:p>
@@ -5138,7 +5151,7 @@
           <a:p>
             <a:fld id="{4EF59023-6175-3944-979D-CFE35E3A8267}" type="datetime1">
               <a:rPr lang="it-IT" smtClean="0"/>
-              <a:t>28/01/2022</a:t>
+              <a:t>04/02/2022</a:t>
             </a:fld>
             <a:endParaRPr lang="en-US" dirty="0"/>
           </a:p>
@@ -5969,7 +5982,7 @@
           <a:p>
             <a:fld id="{4EF59023-6175-3944-979D-CFE35E3A8267}" type="datetime1">
               <a:rPr lang="it-IT" smtClean="0"/>
-              <a:t>28/01/2022</a:t>
+              <a:t>04/02/2022</a:t>
             </a:fld>
             <a:endParaRPr lang="en-US" dirty="0"/>
           </a:p>
@@ -6392,7 +6405,7 @@
           <a:p>
             <a:fld id="{4EF59023-6175-3944-979D-CFE35E3A8267}" type="datetime1">
               <a:rPr lang="it-IT" smtClean="0"/>
-              <a:t>28/01/2022</a:t>
+              <a:t>04/02/2022</a:t>
             </a:fld>
             <a:endParaRPr lang="en-US" dirty="0"/>
           </a:p>
@@ -6926,7 +6939,7 @@
           <a:p>
             <a:fld id="{4EF59023-6175-3944-979D-CFE35E3A8267}" type="datetime1">
               <a:rPr lang="it-IT" smtClean="0"/>
-              <a:t>28/01/2022</a:t>
+              <a:t>04/02/2022</a:t>
             </a:fld>
             <a:endParaRPr lang="en-US" dirty="0"/>
           </a:p>
@@ -7232,7 +7245,7 @@
           <a:p>
             <a:fld id="{4EF59023-6175-3944-979D-CFE35E3A8267}" type="datetime1">
               <a:rPr lang="it-IT" smtClean="0"/>
-              <a:t>28/01/2022</a:t>
+              <a:t>04/02/2022</a:t>
             </a:fld>
             <a:endParaRPr lang="en-US" dirty="0"/>
           </a:p>
@@ -7675,7 +7688,7 @@
           <a:p>
             <a:fld id="{4EF59023-6175-3944-979D-CFE35E3A8267}" type="datetime1">
               <a:rPr lang="it-IT" smtClean="0"/>
-              <a:t>28/01/2022</a:t>
+              <a:t>04/02/2022</a:t>
             </a:fld>
             <a:endParaRPr lang="en-US" dirty="0"/>
           </a:p>
@@ -8213,7 +8226,7 @@
           <a:p>
             <a:fld id="{4EF59023-6175-3944-979D-CFE35E3A8267}" type="datetime1">
               <a:rPr lang="it-IT" smtClean="0"/>
-              <a:t>28/01/2022</a:t>
+              <a:t>04/02/2022</a:t>
             </a:fld>
             <a:endParaRPr lang="en-US" dirty="0"/>
           </a:p>
@@ -8791,7 +8804,7 @@
           <a:p>
             <a:fld id="{4EF59023-6175-3944-979D-CFE35E3A8267}" type="datetime1">
               <a:rPr lang="it-IT" smtClean="0"/>
-              <a:t>28/01/2022</a:t>
+              <a:t>04/02/2022</a:t>
             </a:fld>
             <a:endParaRPr lang="en-US" dirty="0"/>
           </a:p>
@@ -9051,7 +9064,7 @@
           <a:p>
             <a:fld id="{4EF59023-6175-3944-979D-CFE35E3A8267}" type="datetime1">
               <a:rPr lang="it-IT" smtClean="0"/>
-              <a:t>28/01/2022</a:t>
+              <a:t>04/02/2022</a:t>
             </a:fld>
             <a:endParaRPr lang="en-US" dirty="0"/>
           </a:p>
@@ -9311,7 +9324,7 @@
           <a:p>
             <a:fld id="{4EF59023-6175-3944-979D-CFE35E3A8267}" type="datetime1">
               <a:rPr lang="it-IT" smtClean="0"/>
-              <a:t>28/01/2022</a:t>
+              <a:t>04/02/2022</a:t>
             </a:fld>
             <a:endParaRPr lang="en-US" dirty="0"/>
           </a:p>
@@ -9923,7 +9936,7 @@
           <a:p>
             <a:fld id="{4EF59023-6175-3944-979D-CFE35E3A8267}" type="datetime1">
               <a:rPr lang="it-IT" smtClean="0"/>
-              <a:t>28/01/2022</a:t>
+              <a:t>04/02/2022</a:t>
             </a:fld>
             <a:endParaRPr lang="en-US" dirty="0"/>
           </a:p>
@@ -10277,7 +10290,7 @@
           <a:p>
             <a:fld id="{4EF59023-6175-3944-979D-CFE35E3A8267}" type="datetime1">
               <a:rPr lang="it-IT" smtClean="0"/>
-              <a:t>28/01/2022</a:t>
+              <a:t>04/02/2022</a:t>
             </a:fld>
             <a:endParaRPr lang="en-US" dirty="0"/>
           </a:p>
@@ -10669,7 +10682,7 @@
           <a:p>
             <a:fld id="{4EF59023-6175-3944-979D-CFE35E3A8267}" type="datetime1">
               <a:rPr lang="it-IT" smtClean="0"/>
-              <a:t>28/01/2022</a:t>
+              <a:t>04/02/2022</a:t>
             </a:fld>
             <a:endParaRPr lang="en-US" dirty="0"/>
           </a:p>
@@ -11580,7 +11593,7 @@
           <a:p>
             <a:fld id="{4EF59023-6175-3944-979D-CFE35E3A8267}" type="datetime1">
               <a:rPr lang="it-IT" smtClean="0"/>
-              <a:t>28/01/2022</a:t>
+              <a:t>04/02/2022</a:t>
             </a:fld>
             <a:endParaRPr lang="en-US" dirty="0"/>
           </a:p>
@@ -11863,7 +11876,7 @@
           <a:p>
             <a:fld id="{4EF59023-6175-3944-979D-CFE35E3A8267}" type="datetime1">
               <a:rPr lang="it-IT" smtClean="0"/>
-              <a:t>28/01/2022</a:t>
+              <a:t>04/02/2022</a:t>
             </a:fld>
             <a:endParaRPr lang="en-US" dirty="0"/>
           </a:p>
@@ -12905,7 +12918,7 @@
           <a:p>
             <a:fld id="{4EF59023-6175-3944-979D-CFE35E3A8267}" type="datetime1">
               <a:rPr lang="it-IT" smtClean="0"/>
-              <a:t>28/01/2022</a:t>
+              <a:t>04/02/2022</a:t>
             </a:fld>
             <a:endParaRPr lang="en-US" dirty="0"/>
           </a:p>
@@ -13491,7 +13504,7 @@
           <a:p>
             <a:fld id="{4EF59023-6175-3944-979D-CFE35E3A8267}" type="datetime1">
               <a:rPr lang="it-IT" smtClean="0"/>
-              <a:t>28/01/2022</a:t>
+              <a:t>04/02/2022</a:t>
             </a:fld>
             <a:endParaRPr lang="en-US" dirty="0"/>
           </a:p>
@@ -14565,7 +14578,7 @@
           <a:p>
             <a:fld id="{4EF59023-6175-3944-979D-CFE35E3A8267}" type="datetime1">
               <a:rPr lang="it-IT" smtClean="0"/>
-              <a:t>28/01/2022</a:t>
+              <a:t>04/02/2022</a:t>
             </a:fld>
             <a:endParaRPr lang="en-US" dirty="0"/>
           </a:p>
@@ -15055,7 +15068,7 @@
           <a:p>
             <a:fld id="{4EF59023-6175-3944-979D-CFE35E3A8267}" type="datetime1">
               <a:rPr lang="it-IT" smtClean="0"/>
-              <a:t>28/01/2022</a:t>
+              <a:t>04/02/2022</a:t>
             </a:fld>
             <a:endParaRPr lang="en-US" dirty="0"/>
           </a:p>
@@ -15519,7 +15532,7 @@
           <a:p>
             <a:fld id="{4EF59023-6175-3944-979D-CFE35E3A8267}" type="datetime1">
               <a:rPr lang="it-IT" smtClean="0"/>
-              <a:t>28/01/2022</a:t>
+              <a:t>04/02/2022</a:t>
             </a:fld>
             <a:endParaRPr lang="en-US" dirty="0"/>
           </a:p>
@@ -15933,7 +15946,7 @@
           <a:p>
             <a:fld id="{4EF59023-6175-3944-979D-CFE35E3A8267}" type="datetime1">
               <a:rPr lang="it-IT" smtClean="0"/>
-              <a:t>28/01/2022</a:t>
+              <a:t>04/02/2022</a:t>
             </a:fld>
             <a:endParaRPr lang="en-US" dirty="0"/>
           </a:p>
@@ -16305,7 +16318,7 @@
           <a:p>
             <a:fld id="{4EF59023-6175-3944-979D-CFE35E3A8267}" type="datetime1">
               <a:rPr lang="it-IT" smtClean="0"/>
-              <a:t>28/01/2022</a:t>
+              <a:t>04/02/2022</a:t>
             </a:fld>
             <a:endParaRPr lang="en-US" dirty="0"/>
           </a:p>
@@ -16415,8 +16428,8 @@
           </a:prstGeom>
         </p:spPr>
       </p:pic>
-      <mc:AlternateContent xmlns:mc="http://schemas.openxmlformats.org/markup-compatibility/2006">
-        <mc:Choice xmlns:a14="http://schemas.microsoft.com/office/drawing/2010/main" Requires="a14">
+      <mc:AlternateContent xmlns:mc="http://schemas.openxmlformats.org/markup-compatibility/2006" xmlns:a14="http://schemas.microsoft.com/office/drawing/2010/main">
+        <mc:Choice Requires="a14">
           <p:sp>
             <p:nvSpPr>
               <p:cNvPr id="2" name="CasellaDiTesto 1"/>
@@ -16861,7 +16874,7 @@
             </p:txBody>
           </p:sp>
         </mc:Choice>
-        <mc:Fallback>
+        <mc:Fallback xmlns="">
           <p:sp>
             <p:nvSpPr>
               <p:cNvPr id="2" name="CasellaDiTesto 1"/>
@@ -17062,7 +17075,6 @@
               <a:rPr lang="it-IT" dirty="0" smtClean="0"/>
               <a:t> della matrice Q ottenuta e riportata di seguito.</a:t>
             </a:r>
-            <a:endParaRPr lang="it-IT" dirty="0" smtClean="0"/>
           </a:p>
         </p:txBody>
       </p:sp>
@@ -17094,7 +17106,7 @@
           <a:p>
             <a:fld id="{4EF59023-6175-3944-979D-CFE35E3A8267}" type="datetime1">
               <a:rPr lang="it-IT" smtClean="0"/>
-              <a:t>28/01/2022</a:t>
+              <a:t>04/02/2022</a:t>
             </a:fld>
             <a:endParaRPr lang="en-US" dirty="0"/>
           </a:p>
@@ -17248,11 +17260,7 @@
             </a:r>
             <a:r>
               <a:rPr lang="it-IT" dirty="0" err="1" smtClean="0"/>
-              <a:t>stabile.</a:t>
-            </a:r>
-            <a:r>
-              <a:rPr lang="it-IT" dirty="0" err="1" smtClean="0"/>
-              <a:t>Ne</a:t>
+              <a:t>stabile.Ne</a:t>
             </a:r>
             <a:r>
               <a:rPr lang="it-IT" dirty="0" smtClean="0"/>
@@ -17262,6 +17270,198 @@
           </a:p>
         </p:txBody>
       </p:sp>
+      <p:pic>
+        <p:nvPicPr>
+          <p:cNvPr id="2" name="Immagine 1"/>
+          <p:cNvPicPr>
+            <a:picLocks noChangeAspect="1"/>
+          </p:cNvPicPr>
+          <p:nvPr/>
+        </p:nvPicPr>
+        <p:blipFill>
+          <a:blip r:embed="rId4">
+            <a:extLst>
+              <a:ext uri="{28A0092B-C50C-407E-A947-70E740481C1C}">
+                <a14:useLocalDpi xmlns:a14="http://schemas.microsoft.com/office/drawing/2010/main" val="0"/>
+              </a:ext>
+            </a:extLst>
+          </a:blip>
+          <a:stretch>
+            <a:fillRect/>
+          </a:stretch>
+        </p:blipFill>
+        <p:spPr>
+          <a:xfrm>
+            <a:off x="3581400" y="2891941"/>
+            <a:ext cx="2844444" cy="2133333"/>
+          </a:xfrm>
+          <a:prstGeom prst="rect">
+            <a:avLst/>
+          </a:prstGeom>
+        </p:spPr>
+      </p:pic>
+      <mc:AlternateContent xmlns:mc="http://schemas.openxmlformats.org/markup-compatibility/2006" xmlns:a14="http://schemas.microsoft.com/office/drawing/2010/main">
+        <mc:Choice Requires="a14">
+          <p:sp>
+            <p:nvSpPr>
+              <p:cNvPr id="3" name="CasellaDiTesto 2"/>
+              <p:cNvSpPr txBox="1"/>
+              <p:nvPr/>
+            </p:nvSpPr>
+            <p:spPr>
+              <a:xfrm>
+                <a:off x="6425844" y="3635441"/>
+                <a:ext cx="2063993" cy="646331"/>
+              </a:xfrm>
+              <a:prstGeom prst="rect">
+                <a:avLst/>
+              </a:prstGeom>
+              <a:noFill/>
+            </p:spPr>
+            <p:txBody>
+              <a:bodyPr wrap="square" rtlCol="0">
+                <a:spAutoFit/>
+              </a:bodyPr>
+              <a:lstStyle/>
+              <a:p>
+                <a:pPr algn="ctr"/>
+                <a14:m>
+                  <m:oMathPara xmlns:m="http://schemas.openxmlformats.org/officeDocument/2006/math">
+                    <m:oMathParaPr>
+                      <m:jc m:val="centerGroup"/>
+                    </m:oMathParaPr>
+                    <m:oMath xmlns:m="http://schemas.openxmlformats.org/officeDocument/2006/math">
+                      <m:sSub>
+                        <m:sSubPr>
+                          <m:ctrlPr>
+                            <a:rPr lang="it-IT" i="1" smtClean="0">
+                              <a:latin typeface="Cambria Math" panose="02040503050406030204" pitchFamily="18" charset="0"/>
+                            </a:rPr>
+                          </m:ctrlPr>
+                        </m:sSubPr>
+                        <m:e>
+                          <m:r>
+                            <a:rPr lang="it-IT" i="1" smtClean="0">
+                              <a:latin typeface="Cambria Math" panose="02040503050406030204" pitchFamily="18" charset="0"/>
+                              <a:ea typeface="Cambria Math" panose="02040503050406030204" pitchFamily="18" charset="0"/>
+                            </a:rPr>
+                            <m:t>𝜆</m:t>
+                          </m:r>
+                        </m:e>
+                        <m:sub>
+                          <m:r>
+                            <a:rPr lang="it-IT" b="0" i="1" smtClean="0">
+                              <a:latin typeface="Cambria Math" panose="02040503050406030204" pitchFamily="18" charset="0"/>
+                            </a:rPr>
+                            <m:t>1</m:t>
+                          </m:r>
+                        </m:sub>
+                      </m:sSub>
+                      <m:r>
+                        <a:rPr lang="it-IT" b="0" i="1" smtClean="0">
+                          <a:latin typeface="Cambria Math" panose="02040503050406030204" pitchFamily="18" charset="0"/>
+                        </a:rPr>
+                        <m:t>=−1.879</m:t>
+                      </m:r>
+                    </m:oMath>
+                  </m:oMathPara>
+                </a14:m>
+                <a:endParaRPr lang="it-IT" dirty="0" smtClean="0"/>
+              </a:p>
+              <a:p>
+                <a:pPr algn="ctr"/>
+                <a14:m>
+                  <m:oMathPara xmlns:m="http://schemas.openxmlformats.org/officeDocument/2006/math">
+                    <m:oMathParaPr>
+                      <m:jc m:val="centerGroup"/>
+                    </m:oMathParaPr>
+                    <m:oMath xmlns:m="http://schemas.openxmlformats.org/officeDocument/2006/math">
+                      <m:sSub>
+                        <m:sSubPr>
+                          <m:ctrlPr>
+                            <a:rPr lang="it-IT" i="1">
+                              <a:latin typeface="Cambria Math" panose="02040503050406030204" pitchFamily="18" charset="0"/>
+                            </a:rPr>
+                          </m:ctrlPr>
+                        </m:sSubPr>
+                        <m:e>
+                          <m:r>
+                            <a:rPr lang="it-IT" i="1">
+                              <a:latin typeface="Cambria Math" panose="02040503050406030204" pitchFamily="18" charset="0"/>
+                              <a:ea typeface="Cambria Math" panose="02040503050406030204" pitchFamily="18" charset="0"/>
+                            </a:rPr>
+                            <m:t>𝜆</m:t>
+                          </m:r>
+                        </m:e>
+                        <m:sub>
+                          <m:r>
+                            <a:rPr lang="it-IT" b="0" i="1" smtClean="0">
+                              <a:latin typeface="Cambria Math" panose="02040503050406030204" pitchFamily="18" charset="0"/>
+                              <a:ea typeface="Cambria Math" panose="02040503050406030204" pitchFamily="18" charset="0"/>
+                            </a:rPr>
+                            <m:t>2</m:t>
+                          </m:r>
+                        </m:sub>
+                      </m:sSub>
+                      <m:r>
+                        <a:rPr lang="it-IT" i="1">
+                          <a:latin typeface="Cambria Math" panose="02040503050406030204" pitchFamily="18" charset="0"/>
+                        </a:rPr>
+                        <m:t>=</m:t>
+                      </m:r>
+                      <m:r>
+                        <a:rPr lang="it-IT" b="0" i="1" smtClean="0">
+                          <a:latin typeface="Cambria Math" panose="02040503050406030204" pitchFamily="18" charset="0"/>
+                        </a:rPr>
+                        <m:t>−7301</m:t>
+                      </m:r>
+                    </m:oMath>
+                  </m:oMathPara>
+                </a14:m>
+                <a:endParaRPr lang="it-IT" dirty="0"/>
+              </a:p>
+            </p:txBody>
+          </p:sp>
+        </mc:Choice>
+        <mc:Fallback xmlns="">
+          <p:sp>
+            <p:nvSpPr>
+              <p:cNvPr id="3" name="CasellaDiTesto 2"/>
+              <p:cNvSpPr txBox="1">
+                <a:spLocks noRot="1" noChangeAspect="1" noMove="1" noResize="1" noEditPoints="1" noAdjustHandles="1" noChangeArrowheads="1" noChangeShapeType="1" noTextEdit="1"/>
+              </p:cNvSpPr>
+              <p:nvPr/>
+            </p:nvSpPr>
+            <p:spPr>
+              <a:xfrm>
+                <a:off x="6425844" y="3635441"/>
+                <a:ext cx="2063993" cy="646331"/>
+              </a:xfrm>
+              <a:prstGeom prst="rect">
+                <a:avLst/>
+              </a:prstGeom>
+              <a:blipFill>
+                <a:blip r:embed="rId5"/>
+                <a:stretch>
+                  <a:fillRect/>
+                </a:stretch>
+              </a:blipFill>
+            </p:spPr>
+            <p:txBody>
+              <a:bodyPr/>
+              <a:lstStyle/>
+              <a:p>
+                <a:r>
+                  <a:rPr lang="it-IT">
+                    <a:noFill/>
+                  </a:rPr>
+                  <a:t> </a:t>
+                </a:r>
+              </a:p>
+            </p:txBody>
+          </p:sp>
+        </mc:Fallback>
+      </mc:AlternateContent>
     </p:spTree>
     <p:extLst>
       <p:ext uri="{BB962C8B-B14F-4D97-AF65-F5344CB8AC3E}">
@@ -17530,7 +17730,7 @@
           <a:p>
             <a:fld id="{4EF59023-6175-3944-979D-CFE35E3A8267}" type="datetime1">
               <a:rPr lang="it-IT" smtClean="0"/>
-              <a:t>28/01/2022</a:t>
+              <a:t>04/02/2022</a:t>
             </a:fld>
             <a:endParaRPr lang="en-US" dirty="0"/>
           </a:p>
@@ -17952,7 +18152,7 @@
           <a:p>
             <a:fld id="{4EF59023-6175-3944-979D-CFE35E3A8267}" type="datetime1">
               <a:rPr lang="it-IT" smtClean="0"/>
-              <a:t>28/01/2022</a:t>
+              <a:t>04/02/2022</a:t>
             </a:fld>
             <a:endParaRPr lang="en-US" dirty="0"/>
           </a:p>
@@ -18597,7 +18797,7 @@
           <a:p>
             <a:fld id="{4EF59023-6175-3944-979D-CFE35E3A8267}" type="datetime1">
               <a:rPr lang="it-IT" smtClean="0"/>
-              <a:t>28/01/2022</a:t>
+              <a:t>04/02/2022</a:t>
             </a:fld>
             <a:endParaRPr lang="en-US" dirty="0"/>
           </a:p>
@@ -19136,7 +19336,7 @@
           <a:p>
             <a:fld id="{4EF59023-6175-3944-979D-CFE35E3A8267}" type="datetime1">
               <a:rPr lang="it-IT" smtClean="0"/>
-              <a:t>28/01/2022</a:t>
+              <a:t>04/02/2022</a:t>
             </a:fld>
             <a:endParaRPr lang="en-US" dirty="0"/>
           </a:p>
@@ -21355,7 +21555,7 @@
           <a:p>
             <a:fld id="{4EF59023-6175-3944-979D-CFE35E3A8267}" type="datetime1">
               <a:rPr lang="it-IT" smtClean="0"/>
-              <a:t>28/01/2022</a:t>
+              <a:t>04/02/2022</a:t>
             </a:fld>
             <a:endParaRPr lang="en-US" dirty="0"/>
           </a:p>
@@ -21608,7 +21808,7 @@
           <a:p>
             <a:fld id="{4EF59023-6175-3944-979D-CFE35E3A8267}" type="datetime1">
               <a:rPr lang="it-IT" smtClean="0"/>
-              <a:t>28/01/2022</a:t>
+              <a:t>04/02/2022</a:t>
             </a:fld>
             <a:endParaRPr lang="en-US" dirty="0"/>
           </a:p>
@@ -21956,6 +22156,280 @@
         </p:nvSpPr>
         <p:spPr>
           <a:xfrm>
+            <a:off x="1524000" y="454393"/>
+            <a:ext cx="9144000" cy="1021230"/>
+          </a:xfrm>
+          <a:prstGeom prst="rect">
+            <a:avLst/>
+          </a:prstGeom>
+        </p:spPr>
+        <p:txBody>
+          <a:bodyPr vert="horz" lIns="91440" tIns="45720" rIns="91440" bIns="45720" rtlCol="0" anchor="ctr">
+            <a:normAutofit fontScale="92500" lnSpcReduction="10000"/>
+          </a:bodyPr>
+          <a:lstStyle>
+            <a:lvl1pPr algn="l" defTabSz="914400" rtl="0" eaLnBrk="1" latinLnBrk="0" hangingPunct="1">
+              <a:lnSpc>
+                <a:spcPct val="90000"/>
+              </a:lnSpc>
+              <a:spcBef>
+                <a:spcPct val="0"/>
+              </a:spcBef>
+              <a:buNone/>
+              <a:defRPr sz="4400" kern="1200">
+                <a:solidFill>
+                  <a:schemeClr val="tx1"/>
+                </a:solidFill>
+                <a:latin typeface="+mj-lt"/>
+                <a:ea typeface="+mj-ea"/>
+                <a:cs typeface="+mj-cs"/>
+              </a:defRPr>
+            </a:lvl1pPr>
+          </a:lstStyle>
+          <a:p>
+            <a:pPr algn="ctr"/>
+            <a:r>
+              <a:rPr lang="it-IT" dirty="0" err="1"/>
+              <a:t>Gantry</a:t>
+            </a:r>
+            <a:r>
+              <a:rPr lang="it-IT" dirty="0"/>
+              <a:t> </a:t>
+            </a:r>
+            <a:r>
+              <a:rPr lang="it-IT" dirty="0" err="1" smtClean="0"/>
+              <a:t>crane</a:t>
+            </a:r>
+            <a:endParaRPr lang="it-IT" dirty="0" smtClean="0"/>
+          </a:p>
+          <a:p>
+            <a:pPr algn="ctr"/>
+            <a:r>
+              <a:rPr lang="it-IT" sz="3600" dirty="0" smtClean="0"/>
+              <a:t>Conclusioni</a:t>
+            </a:r>
+            <a:endParaRPr lang="it-IT" sz="3600" dirty="0"/>
+          </a:p>
+        </p:txBody>
+      </p:sp>
+      <p:pic>
+        <p:nvPicPr>
+          <p:cNvPr id="6" name="Immagine 5">
+            <a:extLst>
+              <a:ext uri="{FF2B5EF4-FFF2-40B4-BE49-F238E27FC236}">
+                <a16:creationId xmlns:a16="http://schemas.microsoft.com/office/drawing/2014/main" id="{E6250F99-85E5-234E-8497-D887077950D0}"/>
+              </a:ext>
+            </a:extLst>
+          </p:cNvPr>
+          <p:cNvPicPr>
+            <a:picLocks noChangeAspect="1"/>
+          </p:cNvPicPr>
+          <p:nvPr/>
+        </p:nvPicPr>
+        <p:blipFill>
+          <a:blip r:embed="rId2"/>
+          <a:stretch>
+            <a:fillRect/>
+          </a:stretch>
+        </p:blipFill>
+        <p:spPr>
+          <a:xfrm>
+            <a:off x="9260657" y="454393"/>
+            <a:ext cx="2093143" cy="1332000"/>
+          </a:xfrm>
+          <a:prstGeom prst="rect">
+            <a:avLst/>
+          </a:prstGeom>
+        </p:spPr>
+      </p:pic>
+      <p:sp>
+        <p:nvSpPr>
+          <p:cNvPr id="5" name="Segnaposto data 3">
+            <a:extLst>
+              <a:ext uri="{FF2B5EF4-FFF2-40B4-BE49-F238E27FC236}">
+                <a16:creationId xmlns:a16="http://schemas.microsoft.com/office/drawing/2014/main" id="{10832284-2AF9-D442-A2BC-3A4C6C544DF0}"/>
+              </a:ext>
+            </a:extLst>
+          </p:cNvPr>
+          <p:cNvSpPr>
+            <a:spLocks noGrp="1"/>
+          </p:cNvSpPr>
+          <p:nvPr>
+            <p:ph type="dt" sz="half" idx="10"/>
+          </p:nvPr>
+        </p:nvSpPr>
+        <p:spPr>
+          <a:xfrm>
+            <a:off x="838200" y="6356350"/>
+            <a:ext cx="2743200" cy="365125"/>
+          </a:xfrm>
+        </p:spPr>
+        <p:txBody>
+          <a:bodyPr/>
+          <a:lstStyle/>
+          <a:p>
+            <a:fld id="{4EF59023-6175-3944-979D-CFE35E3A8267}" type="datetime1">
+              <a:rPr lang="it-IT" smtClean="0"/>
+              <a:t>04/02/2022</a:t>
+            </a:fld>
+            <a:endParaRPr lang="en-US" dirty="0"/>
+          </a:p>
+        </p:txBody>
+      </p:sp>
+      <p:sp>
+        <p:nvSpPr>
+          <p:cNvPr id="7" name="Segnaposto piè di pagina 4">
+            <a:extLst>
+              <a:ext uri="{FF2B5EF4-FFF2-40B4-BE49-F238E27FC236}">
+                <a16:creationId xmlns:a16="http://schemas.microsoft.com/office/drawing/2014/main" id="{5C3B2BD7-91A2-CA4F-9DA6-4CE984B6F87C}"/>
+              </a:ext>
+            </a:extLst>
+          </p:cNvPr>
+          <p:cNvSpPr>
+            <a:spLocks noGrp="1"/>
+          </p:cNvSpPr>
+          <p:nvPr>
+            <p:ph type="ftr" sz="quarter" idx="11"/>
+          </p:nvPr>
+        </p:nvSpPr>
+        <p:spPr>
+          <a:xfrm>
+            <a:off x="4038600" y="6356350"/>
+            <a:ext cx="4114800" cy="365125"/>
+          </a:xfrm>
+        </p:spPr>
+        <p:txBody>
+          <a:bodyPr/>
+          <a:lstStyle/>
+          <a:p>
+            <a:r>
+              <a:rPr lang="en-US" dirty="0"/>
+              <a:t>Arianna </a:t>
+            </a:r>
+            <a:r>
+              <a:rPr lang="en-US" dirty="0" err="1"/>
+              <a:t>Gasparri</a:t>
+            </a:r>
+            <a:endParaRPr lang="en-US" dirty="0"/>
+          </a:p>
+        </p:txBody>
+      </p:sp>
+      <p:sp>
+        <p:nvSpPr>
+          <p:cNvPr id="10" name="Segnaposto numero diapositiva 5">
+            <a:extLst>
+              <a:ext uri="{FF2B5EF4-FFF2-40B4-BE49-F238E27FC236}">
+                <a16:creationId xmlns:a16="http://schemas.microsoft.com/office/drawing/2014/main" id="{5568013C-6B52-9D43-B6C2-2654FF7BD98A}"/>
+              </a:ext>
+            </a:extLst>
+          </p:cNvPr>
+          <p:cNvSpPr>
+            <a:spLocks noGrp="1"/>
+          </p:cNvSpPr>
+          <p:nvPr>
+            <p:ph type="sldNum" sz="quarter" idx="12"/>
+          </p:nvPr>
+        </p:nvSpPr>
+        <p:spPr>
+          <a:xfrm>
+            <a:off x="8610600" y="6356350"/>
+            <a:ext cx="2743200" cy="365125"/>
+          </a:xfrm>
+        </p:spPr>
+        <p:txBody>
+          <a:bodyPr/>
+          <a:lstStyle/>
+          <a:p>
+            <a:fld id="{6D22F896-40B5-4ADD-8801-0D06FADFA095}" type="slidenum">
+              <a:rPr lang="en-US" smtClean="0"/>
+              <a:t>41</a:t>
+            </a:fld>
+            <a:endParaRPr lang="en-US" dirty="0"/>
+          </a:p>
+        </p:txBody>
+      </p:sp>
+      <p:pic>
+        <p:nvPicPr>
+          <p:cNvPr id="11" name="Immagine 10">
+            <a:extLst>
+              <a:ext uri="{FF2B5EF4-FFF2-40B4-BE49-F238E27FC236}">
+                <a16:creationId xmlns:a16="http://schemas.microsoft.com/office/drawing/2014/main" id="{E9214F11-0DDC-E448-AFA0-4E2BD04563C4}"/>
+              </a:ext>
+            </a:extLst>
+          </p:cNvPr>
+          <p:cNvPicPr>
+            <a:picLocks noChangeAspect="1"/>
+          </p:cNvPicPr>
+          <p:nvPr/>
+        </p:nvPicPr>
+        <p:blipFill>
+          <a:blip r:embed="rId3" cstate="print">
+            <a:extLst>
+              <a:ext uri="{28A0092B-C50C-407E-A947-70E740481C1C}">
+                <a14:useLocalDpi xmlns:a14="http://schemas.microsoft.com/office/drawing/2010/main" val="0"/>
+              </a:ext>
+            </a:extLst>
+          </a:blip>
+          <a:stretch>
+            <a:fillRect/>
+          </a:stretch>
+        </p:blipFill>
+        <p:spPr>
+          <a:xfrm>
+            <a:off x="241420" y="265431"/>
+            <a:ext cx="571500" cy="518160"/>
+          </a:xfrm>
+          <a:prstGeom prst="rect">
+            <a:avLst/>
+          </a:prstGeom>
+        </p:spPr>
+      </p:pic>
+    </p:spTree>
+    <p:extLst>
+      <p:ext uri="{BB962C8B-B14F-4D97-AF65-F5344CB8AC3E}">
+        <p14:creationId xmlns:p14="http://schemas.microsoft.com/office/powerpoint/2010/main" val="3897412473"/>
+      </p:ext>
+    </p:extLst>
+  </p:cSld>
+  <p:clrMapOvr>
+    <a:masterClrMapping/>
+  </p:clrMapOvr>
+</p:sld>
+</file>
+
+<file path=ppt/slides/slide42.xml><?xml version="1.0" encoding="utf-8"?>
+<p:sld xmlns:a="http://schemas.openxmlformats.org/drawingml/2006/main" xmlns:r="http://schemas.openxmlformats.org/officeDocument/2006/relationships" xmlns:p="http://schemas.openxmlformats.org/presentationml/2006/main">
+  <p:cSld>
+    <p:spTree>
+      <p:nvGrpSpPr>
+        <p:cNvPr id="1" name=""/>
+        <p:cNvGrpSpPr/>
+        <p:nvPr/>
+      </p:nvGrpSpPr>
+      <p:grpSpPr>
+        <a:xfrm>
+          <a:off x="0" y="0"/>
+          <a:ext cx="0" cy="0"/>
+          <a:chOff x="0" y="0"/>
+          <a:chExt cx="0" cy="0"/>
+        </a:xfrm>
+      </p:grpSpPr>
+      <p:sp>
+        <p:nvSpPr>
+          <p:cNvPr id="8" name="Titolo 1">
+            <a:extLst>
+              <a:ext uri="{FF2B5EF4-FFF2-40B4-BE49-F238E27FC236}">
+                <a16:creationId xmlns:a16="http://schemas.microsoft.com/office/drawing/2014/main" id="{E8EDF0BB-0558-644B-BB96-58C4BD179ABC}"/>
+              </a:ext>
+            </a:extLst>
+          </p:cNvPr>
+          <p:cNvSpPr txBox="1">
+            <a:spLocks/>
+          </p:cNvSpPr>
+          <p:nvPr/>
+        </p:nvSpPr>
+        <p:spPr>
+          <a:xfrm>
             <a:off x="1524000" y="2729761"/>
             <a:ext cx="9144000" cy="1021230"/>
           </a:xfrm>
@@ -22028,7 +22502,7 @@
           <a:p>
             <a:fld id="{4EF59023-6175-3944-979D-CFE35E3A8267}" type="datetime1">
               <a:rPr lang="it-IT" smtClean="0"/>
-              <a:t>28/01/2022</a:t>
+              <a:t>04/02/2022</a:t>
             </a:fld>
             <a:endParaRPr lang="en-US" dirty="0"/>
           </a:p>
@@ -22100,7 +22574,7 @@
           <a:p>
             <a:fld id="{6D22F896-40B5-4ADD-8801-0D06FADFA095}" type="slidenum">
               <a:rPr lang="en-US" smtClean="0"/>
-              <a:t>41</a:t>
+              <a:t>42</a:t>
             </a:fld>
             <a:endParaRPr lang="en-US" dirty="0"/>
           </a:p>
@@ -22406,7 +22880,7 @@
           <a:p>
             <a:fld id="{4EF59023-6175-3944-979D-CFE35E3A8267}" type="datetime1">
               <a:rPr lang="it-IT" smtClean="0"/>
-              <a:t>28/01/2022</a:t>
+              <a:t>04/02/2022</a:t>
             </a:fld>
             <a:endParaRPr lang="en-US" dirty="0"/>
           </a:p>
@@ -23199,7 +23673,7 @@
           <a:p>
             <a:fld id="{4EF59023-6175-3944-979D-CFE35E3A8267}" type="datetime1">
               <a:rPr lang="it-IT" smtClean="0"/>
-              <a:t>28/01/2022</a:t>
+              <a:t>04/02/2022</a:t>
             </a:fld>
             <a:endParaRPr lang="en-US" dirty="0"/>
           </a:p>
@@ -23786,7 +24260,7 @@
           <a:p>
             <a:fld id="{4EF59023-6175-3944-979D-CFE35E3A8267}" type="datetime1">
               <a:rPr lang="it-IT" smtClean="0"/>
-              <a:t>28/01/2022</a:t>
+              <a:t>04/02/2022</a:t>
             </a:fld>
             <a:endParaRPr lang="en-US" dirty="0"/>
           </a:p>
@@ -24039,7 +24513,7 @@
           <a:p>
             <a:fld id="{4EF59023-6175-3944-979D-CFE35E3A8267}" type="datetime1">
               <a:rPr lang="it-IT" smtClean="0"/>
-              <a:t>28/01/2022</a:t>
+              <a:t>04/02/2022</a:t>
             </a:fld>
             <a:endParaRPr lang="en-US" dirty="0"/>
           </a:p>
@@ -24491,7 +24965,7 @@
           <a:p>
             <a:fld id="{4EF59023-6175-3944-979D-CFE35E3A8267}" type="datetime1">
               <a:rPr lang="it-IT" smtClean="0"/>
-              <a:t>28/01/2022</a:t>
+              <a:t>04/02/2022</a:t>
             </a:fld>
             <a:endParaRPr lang="en-US" dirty="0"/>
           </a:p>

</xml_diff>

<commit_message>
Correzione slide Presentazione, rimossa una duplicazione alla fine.
</commit_message>
<xml_diff>
--- a/Relazione/Presentazione.pptx
+++ b/Relazione/Presentazione.pptx
@@ -44,9 +44,8 @@
     <p:sldId id="296" r:id="rId38"/>
     <p:sldId id="298" r:id="rId39"/>
     <p:sldId id="299" r:id="rId40"/>
-    <p:sldId id="301" r:id="rId41"/>
-    <p:sldId id="305" r:id="rId42"/>
-    <p:sldId id="302" r:id="rId43"/>
+    <p:sldId id="305" r:id="rId41"/>
+    <p:sldId id="302" r:id="rId42"/>
   </p:sldIdLst>
   <p:sldSz cx="12192000" cy="6858000"/>
   <p:notesSz cx="6858000" cy="9144000"/>
@@ -312,7 +311,7 @@
           <a:p>
             <a:fld id="{27153579-3A4D-BB42-BD49-BB0F80A81A61}" type="datetimeFigureOut">
               <a:rPr lang="it-IT" smtClean="0"/>
-              <a:t>05/02/22</a:t>
+              <a:t>14/02/2022</a:t>
             </a:fld>
             <a:endParaRPr lang="it-IT"/>
           </a:p>
@@ -485,7 +484,7 @@
           <a:p>
             <a:fld id="{27153579-3A4D-BB42-BD49-BB0F80A81A61}" type="datetimeFigureOut">
               <a:rPr lang="it-IT" smtClean="0"/>
-              <a:t>05/02/22</a:t>
+              <a:t>14/02/2022</a:t>
             </a:fld>
             <a:endParaRPr lang="it-IT"/>
           </a:p>
@@ -668,7 +667,7 @@
           <a:p>
             <a:fld id="{27153579-3A4D-BB42-BD49-BB0F80A81A61}" type="datetimeFigureOut">
               <a:rPr lang="it-IT" smtClean="0"/>
-              <a:t>05/02/22</a:t>
+              <a:t>14/02/2022</a:t>
             </a:fld>
             <a:endParaRPr lang="it-IT"/>
           </a:p>
@@ -841,7 +840,7 @@
           <a:p>
             <a:fld id="{27153579-3A4D-BB42-BD49-BB0F80A81A61}" type="datetimeFigureOut">
               <a:rPr lang="it-IT" smtClean="0"/>
-              <a:t>05/02/22</a:t>
+              <a:t>14/02/2022</a:t>
             </a:fld>
             <a:endParaRPr lang="it-IT"/>
           </a:p>
@@ -1119,7 +1118,7 @@
           <a:p>
             <a:fld id="{27153579-3A4D-BB42-BD49-BB0F80A81A61}" type="datetimeFigureOut">
               <a:rPr lang="it-IT" smtClean="0"/>
-              <a:t>05/02/22</a:t>
+              <a:t>14/02/2022</a:t>
             </a:fld>
             <a:endParaRPr lang="it-IT"/>
           </a:p>
@@ -1334,7 +1333,7 @@
           <a:p>
             <a:fld id="{27153579-3A4D-BB42-BD49-BB0F80A81A61}" type="datetimeFigureOut">
               <a:rPr lang="it-IT" smtClean="0"/>
-              <a:t>05/02/22</a:t>
+              <a:t>14/02/2022</a:t>
             </a:fld>
             <a:endParaRPr lang="it-IT"/>
           </a:p>
@@ -1702,7 +1701,7 @@
           <a:p>
             <a:fld id="{27153579-3A4D-BB42-BD49-BB0F80A81A61}" type="datetimeFigureOut">
               <a:rPr lang="it-IT" smtClean="0"/>
-              <a:t>05/02/22</a:t>
+              <a:t>14/02/2022</a:t>
             </a:fld>
             <a:endParaRPr lang="it-IT"/>
           </a:p>
@@ -1843,7 +1842,7 @@
           <a:p>
             <a:fld id="{27153579-3A4D-BB42-BD49-BB0F80A81A61}" type="datetimeFigureOut">
               <a:rPr lang="it-IT" smtClean="0"/>
-              <a:t>05/02/22</a:t>
+              <a:t>14/02/2022</a:t>
             </a:fld>
             <a:endParaRPr lang="it-IT"/>
           </a:p>
@@ -1956,7 +1955,7 @@
           <a:p>
             <a:fld id="{27153579-3A4D-BB42-BD49-BB0F80A81A61}" type="datetimeFigureOut">
               <a:rPr lang="it-IT" smtClean="0"/>
-              <a:t>05/02/22</a:t>
+              <a:t>14/02/2022</a:t>
             </a:fld>
             <a:endParaRPr lang="it-IT"/>
           </a:p>
@@ -2245,7 +2244,7 @@
           <a:p>
             <a:fld id="{27153579-3A4D-BB42-BD49-BB0F80A81A61}" type="datetimeFigureOut">
               <a:rPr lang="it-IT" smtClean="0"/>
-              <a:t>05/02/22</a:t>
+              <a:t>14/02/2022</a:t>
             </a:fld>
             <a:endParaRPr lang="it-IT"/>
           </a:p>
@@ -2536,7 +2535,7 @@
           <a:p>
             <a:fld id="{27153579-3A4D-BB42-BD49-BB0F80A81A61}" type="datetimeFigureOut">
               <a:rPr lang="it-IT" smtClean="0"/>
-              <a:t>05/02/22</a:t>
+              <a:t>14/02/2022</a:t>
             </a:fld>
             <a:endParaRPr lang="it-IT"/>
           </a:p>
@@ -2752,7 +2751,7 @@
           <a:p>
             <a:fld id="{27153579-3A4D-BB42-BD49-BB0F80A81A61}" type="datetimeFigureOut">
               <a:rPr lang="it-IT" smtClean="0"/>
-              <a:t>05/02/22</a:t>
+              <a:t>14/02/2022</a:t>
             </a:fld>
             <a:endParaRPr lang="it-IT"/>
           </a:p>
@@ -3273,6 +3272,10 @@
               <a:rPr lang="it-IT" sz="2200" u="sng" dirty="0"/>
               <a:t>Tavole Applicative</a:t>
             </a:r>
+            <a:r>
+              <a:rPr lang="it-IT" dirty="0"/>
+              <a:t/>
+            </a:r>
             <a:br>
               <a:rPr lang="it-IT" dirty="0"/>
             </a:br>
@@ -3496,7 +3499,7 @@
           <a:p>
             <a:fld id="{4EF59023-6175-3944-979D-CFE35E3A8267}" type="datetime1">
               <a:rPr lang="it-IT" smtClean="0"/>
-              <a:t>05/02/22</a:t>
+              <a:t>14/02/2022</a:t>
             </a:fld>
             <a:endParaRPr lang="en-US" dirty="0"/>
           </a:p>
@@ -3810,7 +3813,7 @@
           <a:p>
             <a:fld id="{4EF59023-6175-3944-979D-CFE35E3A8267}" type="datetime1">
               <a:rPr lang="it-IT" smtClean="0"/>
-              <a:t>05/02/22</a:t>
+              <a:t>14/02/2022</a:t>
             </a:fld>
             <a:endParaRPr lang="en-US" dirty="0"/>
           </a:p>
@@ -4154,7 +4157,7 @@
           <a:p>
             <a:fld id="{4EF59023-6175-3944-979D-CFE35E3A8267}" type="datetime1">
               <a:rPr lang="it-IT" smtClean="0"/>
-              <a:t>05/02/22</a:t>
+              <a:t>14/02/2022</a:t>
             </a:fld>
             <a:endParaRPr lang="en-US" dirty="0"/>
           </a:p>
@@ -4476,7 +4479,7 @@
           <a:p>
             <a:fld id="{4EF59023-6175-3944-979D-CFE35E3A8267}" type="datetime1">
               <a:rPr lang="it-IT" smtClean="0"/>
-              <a:t>05/02/22</a:t>
+              <a:t>14/02/2022</a:t>
             </a:fld>
             <a:endParaRPr lang="en-US" dirty="0"/>
           </a:p>
@@ -4834,7 +4837,7 @@
           <a:p>
             <a:fld id="{4EF59023-6175-3944-979D-CFE35E3A8267}" type="datetime1">
               <a:rPr lang="it-IT" smtClean="0"/>
-              <a:t>05/02/22</a:t>
+              <a:t>14/02/2022</a:t>
             </a:fld>
             <a:endParaRPr lang="en-US" dirty="0"/>
           </a:p>
@@ -5147,7 +5150,7 @@
           <a:p>
             <a:fld id="{4EF59023-6175-3944-979D-CFE35E3A8267}" type="datetime1">
               <a:rPr lang="it-IT" smtClean="0"/>
-              <a:t>05/02/22</a:t>
+              <a:t>14/02/2022</a:t>
             </a:fld>
             <a:endParaRPr lang="en-US" dirty="0"/>
           </a:p>
@@ -5978,7 +5981,7 @@
           <a:p>
             <a:fld id="{4EF59023-6175-3944-979D-CFE35E3A8267}" type="datetime1">
               <a:rPr lang="it-IT" smtClean="0"/>
-              <a:t>05/02/22</a:t>
+              <a:t>14/02/2022</a:t>
             </a:fld>
             <a:endParaRPr lang="en-US" dirty="0"/>
           </a:p>
@@ -6401,7 +6404,7 @@
           <a:p>
             <a:fld id="{4EF59023-6175-3944-979D-CFE35E3A8267}" type="datetime1">
               <a:rPr lang="it-IT" smtClean="0"/>
-              <a:t>05/02/22</a:t>
+              <a:t>14/02/2022</a:t>
             </a:fld>
             <a:endParaRPr lang="en-US" dirty="0"/>
           </a:p>
@@ -6935,7 +6938,7 @@
           <a:p>
             <a:fld id="{4EF59023-6175-3944-979D-CFE35E3A8267}" type="datetime1">
               <a:rPr lang="it-IT" smtClean="0"/>
-              <a:t>05/02/22</a:t>
+              <a:t>14/02/2022</a:t>
             </a:fld>
             <a:endParaRPr lang="en-US" dirty="0"/>
           </a:p>
@@ -7241,7 +7244,7 @@
           <a:p>
             <a:fld id="{4EF59023-6175-3944-979D-CFE35E3A8267}" type="datetime1">
               <a:rPr lang="it-IT" smtClean="0"/>
-              <a:t>05/02/22</a:t>
+              <a:t>14/02/2022</a:t>
             </a:fld>
             <a:endParaRPr lang="en-US" dirty="0"/>
           </a:p>
@@ -7684,7 +7687,7 @@
           <a:p>
             <a:fld id="{4EF59023-6175-3944-979D-CFE35E3A8267}" type="datetime1">
               <a:rPr lang="it-IT" smtClean="0"/>
-              <a:t>05/02/22</a:t>
+              <a:t>14/02/2022</a:t>
             </a:fld>
             <a:endParaRPr lang="en-US" dirty="0"/>
           </a:p>
@@ -8222,7 +8225,7 @@
           <a:p>
             <a:fld id="{4EF59023-6175-3944-979D-CFE35E3A8267}" type="datetime1">
               <a:rPr lang="it-IT" smtClean="0"/>
-              <a:t>05/02/22</a:t>
+              <a:t>14/02/2022</a:t>
             </a:fld>
             <a:endParaRPr lang="en-US" dirty="0"/>
           </a:p>
@@ -8800,7 +8803,7 @@
           <a:p>
             <a:fld id="{4EF59023-6175-3944-979D-CFE35E3A8267}" type="datetime1">
               <a:rPr lang="it-IT" smtClean="0"/>
-              <a:t>05/02/22</a:t>
+              <a:t>14/02/2022</a:t>
             </a:fld>
             <a:endParaRPr lang="en-US" dirty="0"/>
           </a:p>
@@ -9060,7 +9063,7 @@
           <a:p>
             <a:fld id="{4EF59023-6175-3944-979D-CFE35E3A8267}" type="datetime1">
               <a:rPr lang="it-IT" smtClean="0"/>
-              <a:t>05/02/22</a:t>
+              <a:t>14/02/2022</a:t>
             </a:fld>
             <a:endParaRPr lang="en-US" dirty="0"/>
           </a:p>
@@ -9320,7 +9323,7 @@
           <a:p>
             <a:fld id="{4EF59023-6175-3944-979D-CFE35E3A8267}" type="datetime1">
               <a:rPr lang="it-IT" smtClean="0"/>
-              <a:t>05/02/22</a:t>
+              <a:t>14/02/2022</a:t>
             </a:fld>
             <a:endParaRPr lang="en-US" dirty="0"/>
           </a:p>
@@ -9430,8 +9433,8 @@
           </a:prstGeom>
         </p:spPr>
       </p:pic>
-      <mc:AlternateContent xmlns:mc="http://schemas.openxmlformats.org/markup-compatibility/2006">
-        <mc:Choice xmlns:a14="http://schemas.microsoft.com/office/drawing/2010/main" Requires="a14">
+      <mc:AlternateContent xmlns:mc="http://schemas.openxmlformats.org/markup-compatibility/2006" xmlns:a14="http://schemas.microsoft.com/office/drawing/2010/main">
+        <mc:Choice Requires="a14">
           <p:sp>
             <p:nvSpPr>
               <p:cNvPr id="2" name="CasellaDiTesto 1">
@@ -9551,7 +9554,7 @@
             </p:txBody>
           </p:sp>
         </mc:Choice>
-        <mc:Fallback>
+        <mc:Fallback xmlns="">
           <p:sp>
             <p:nvSpPr>
               <p:cNvPr id="2" name="CasellaDiTesto 1">
@@ -9935,7 +9938,7 @@
           <a:p>
             <a:fld id="{4EF59023-6175-3944-979D-CFE35E3A8267}" type="datetime1">
               <a:rPr lang="it-IT" smtClean="0"/>
-              <a:t>05/02/22</a:t>
+              <a:t>14/02/2022</a:t>
             </a:fld>
             <a:endParaRPr lang="en-US" dirty="0"/>
           </a:p>
@@ -10289,7 +10292,7 @@
           <a:p>
             <a:fld id="{4EF59023-6175-3944-979D-CFE35E3A8267}" type="datetime1">
               <a:rPr lang="it-IT" smtClean="0"/>
-              <a:t>05/02/22</a:t>
+              <a:t>14/02/2022</a:t>
             </a:fld>
             <a:endParaRPr lang="en-US" dirty="0"/>
           </a:p>
@@ -10681,7 +10684,7 @@
           <a:p>
             <a:fld id="{4EF59023-6175-3944-979D-CFE35E3A8267}" type="datetime1">
               <a:rPr lang="it-IT" smtClean="0"/>
-              <a:t>05/02/22</a:t>
+              <a:t>14/02/2022</a:t>
             </a:fld>
             <a:endParaRPr lang="en-US" dirty="0"/>
           </a:p>
@@ -11592,7 +11595,7 @@
           <a:p>
             <a:fld id="{4EF59023-6175-3944-979D-CFE35E3A8267}" type="datetime1">
               <a:rPr lang="it-IT" smtClean="0"/>
-              <a:t>05/02/22</a:t>
+              <a:t>14/02/2022</a:t>
             </a:fld>
             <a:endParaRPr lang="en-US" dirty="0"/>
           </a:p>
@@ -11875,7 +11878,7 @@
           <a:p>
             <a:fld id="{4EF59023-6175-3944-979D-CFE35E3A8267}" type="datetime1">
               <a:rPr lang="it-IT" smtClean="0"/>
-              <a:t>05/02/22</a:t>
+              <a:t>14/02/2022</a:t>
             </a:fld>
             <a:endParaRPr lang="en-US" dirty="0"/>
           </a:p>
@@ -12917,7 +12920,7 @@
           <a:p>
             <a:fld id="{4EF59023-6175-3944-979D-CFE35E3A8267}" type="datetime1">
               <a:rPr lang="it-IT" smtClean="0"/>
-              <a:t>05/02/22</a:t>
+              <a:t>14/02/2022</a:t>
             </a:fld>
             <a:endParaRPr lang="en-US" dirty="0"/>
           </a:p>
@@ -13503,7 +13506,7 @@
           <a:p>
             <a:fld id="{4EF59023-6175-3944-979D-CFE35E3A8267}" type="datetime1">
               <a:rPr lang="it-IT" smtClean="0"/>
-              <a:t>05/02/22</a:t>
+              <a:t>14/02/2022</a:t>
             </a:fld>
             <a:endParaRPr lang="en-US" dirty="0"/>
           </a:p>
@@ -14577,7 +14580,7 @@
           <a:p>
             <a:fld id="{4EF59023-6175-3944-979D-CFE35E3A8267}" type="datetime1">
               <a:rPr lang="it-IT" smtClean="0"/>
-              <a:t>05/02/22</a:t>
+              <a:t>14/02/2022</a:t>
             </a:fld>
             <a:endParaRPr lang="en-US" dirty="0"/>
           </a:p>
@@ -15067,7 +15070,7 @@
           <a:p>
             <a:fld id="{4EF59023-6175-3944-979D-CFE35E3A8267}" type="datetime1">
               <a:rPr lang="it-IT" smtClean="0"/>
-              <a:t>05/02/22</a:t>
+              <a:t>14/02/2022</a:t>
             </a:fld>
             <a:endParaRPr lang="en-US" dirty="0"/>
           </a:p>
@@ -15523,7 +15526,7 @@
           <a:p>
             <a:fld id="{4EF59023-6175-3944-979D-CFE35E3A8267}" type="datetime1">
               <a:rPr lang="it-IT" smtClean="0"/>
-              <a:t>05/02/22</a:t>
+              <a:t>14/02/2022</a:t>
             </a:fld>
             <a:endParaRPr lang="en-US" dirty="0"/>
           </a:p>
@@ -15937,7 +15940,7 @@
           <a:p>
             <a:fld id="{4EF59023-6175-3944-979D-CFE35E3A8267}" type="datetime1">
               <a:rPr lang="it-IT" smtClean="0"/>
-              <a:t>05/02/22</a:t>
+              <a:t>14/02/2022</a:t>
             </a:fld>
             <a:endParaRPr lang="en-US" dirty="0"/>
           </a:p>
@@ -16308,7 +16311,7 @@
           <a:p>
             <a:fld id="{4EF59023-6175-3944-979D-CFE35E3A8267}" type="datetime1">
               <a:rPr lang="it-IT" smtClean="0"/>
-              <a:t>05/02/22</a:t>
+              <a:t>14/02/2022</a:t>
             </a:fld>
             <a:endParaRPr lang="en-US" dirty="0"/>
           </a:p>
@@ -17154,7 +17157,7 @@
           <a:p>
             <a:fld id="{4EF59023-6175-3944-979D-CFE35E3A8267}" type="datetime1">
               <a:rPr lang="it-IT" smtClean="0"/>
-              <a:t>05/02/22</a:t>
+              <a:t>14/02/2022</a:t>
             </a:fld>
             <a:endParaRPr lang="en-US" dirty="0"/>
           </a:p>
@@ -17301,8 +17304,8 @@
           </a:p>
         </p:txBody>
       </p:sp>
-      <mc:AlternateContent xmlns:mc="http://schemas.openxmlformats.org/markup-compatibility/2006">
-        <mc:Choice xmlns:a14="http://schemas.microsoft.com/office/drawing/2010/main" Requires="a14">
+      <mc:AlternateContent xmlns:mc="http://schemas.openxmlformats.org/markup-compatibility/2006" xmlns:a14="http://schemas.microsoft.com/office/drawing/2010/main">
+        <mc:Choice Requires="a14">
           <p:sp>
             <p:nvSpPr>
               <p:cNvPr id="3" name="CasellaDiTesto 2"/>
@@ -17424,7 +17427,7 @@
             </p:txBody>
           </p:sp>
         </mc:Choice>
-        <mc:Fallback>
+        <mc:Fallback xmlns="">
           <p:sp>
             <p:nvSpPr>
               <p:cNvPr id="3" name="CasellaDiTesto 2"/>
@@ -17761,7 +17764,7 @@
           <a:p>
             <a:fld id="{4EF59023-6175-3944-979D-CFE35E3A8267}" type="datetime1">
               <a:rPr lang="it-IT" smtClean="0"/>
-              <a:t>05/02/22</a:t>
+              <a:t>14/02/2022</a:t>
             </a:fld>
             <a:endParaRPr lang="en-US" dirty="0"/>
           </a:p>
@@ -18183,7 +18186,7 @@
           <a:p>
             <a:fld id="{4EF59023-6175-3944-979D-CFE35E3A8267}" type="datetime1">
               <a:rPr lang="it-IT" smtClean="0"/>
-              <a:t>05/02/22</a:t>
+              <a:t>14/02/2022</a:t>
             </a:fld>
             <a:endParaRPr lang="en-US" dirty="0"/>
           </a:p>
@@ -18828,7 +18831,7 @@
           <a:p>
             <a:fld id="{4EF59023-6175-3944-979D-CFE35E3A8267}" type="datetime1">
               <a:rPr lang="it-IT" smtClean="0"/>
-              <a:t>05/02/22</a:t>
+              <a:t>14/02/2022</a:t>
             </a:fld>
             <a:endParaRPr lang="en-US" dirty="0"/>
           </a:p>
@@ -19367,7 +19370,7 @@
           <a:p>
             <a:fld id="{4EF59023-6175-3944-979D-CFE35E3A8267}" type="datetime1">
               <a:rPr lang="it-IT" smtClean="0"/>
-              <a:t>05/02/22</a:t>
+              <a:t>14/02/2022</a:t>
             </a:fld>
             <a:endParaRPr lang="en-US" dirty="0"/>
           </a:p>
@@ -21586,7 +21589,7 @@
           <a:p>
             <a:fld id="{4EF59023-6175-3944-979D-CFE35E3A8267}" type="datetime1">
               <a:rPr lang="it-IT" smtClean="0"/>
-              <a:t>05/02/22</a:t>
+              <a:t>14/02/2022</a:t>
             </a:fld>
             <a:endParaRPr lang="en-US" dirty="0"/>
           </a:p>
@@ -21751,451 +21754,6 @@
         </p:spPr>
         <p:txBody>
           <a:bodyPr vert="horz" lIns="91440" tIns="45720" rIns="91440" bIns="45720" rtlCol="0" anchor="ctr">
-            <a:normAutofit/>
-          </a:bodyPr>
-          <a:lstStyle>
-            <a:lvl1pPr algn="l" defTabSz="914400" rtl="0" eaLnBrk="1" latinLnBrk="0" hangingPunct="1">
-              <a:lnSpc>
-                <a:spcPct val="90000"/>
-              </a:lnSpc>
-              <a:spcBef>
-                <a:spcPct val="0"/>
-              </a:spcBef>
-              <a:buNone/>
-              <a:defRPr sz="4400" kern="1200">
-                <a:solidFill>
-                  <a:schemeClr val="tx1"/>
-                </a:solidFill>
-                <a:latin typeface="+mj-lt"/>
-                <a:ea typeface="+mj-ea"/>
-                <a:cs typeface="+mj-cs"/>
-              </a:defRPr>
-            </a:lvl1pPr>
-          </a:lstStyle>
-          <a:p>
-            <a:pPr algn="ctr"/>
-            <a:r>
-              <a:rPr lang="it-IT" dirty="0"/>
-              <a:t>Gantry crane</a:t>
-            </a:r>
-          </a:p>
-        </p:txBody>
-      </p:sp>
-      <p:pic>
-        <p:nvPicPr>
-          <p:cNvPr id="6" name="Immagine 5">
-            <a:extLst>
-              <a:ext uri="{FF2B5EF4-FFF2-40B4-BE49-F238E27FC236}">
-                <a16:creationId xmlns:a16="http://schemas.microsoft.com/office/drawing/2014/main" id="{E6250F99-85E5-234E-8497-D887077950D0}"/>
-              </a:ext>
-            </a:extLst>
-          </p:cNvPr>
-          <p:cNvPicPr>
-            <a:picLocks noChangeAspect="1"/>
-          </p:cNvPicPr>
-          <p:nvPr/>
-        </p:nvPicPr>
-        <p:blipFill>
-          <a:blip r:embed="rId2"/>
-          <a:stretch>
-            <a:fillRect/>
-          </a:stretch>
-        </p:blipFill>
-        <p:spPr>
-          <a:xfrm>
-            <a:off x="1714030" y="1475623"/>
-            <a:ext cx="2093143" cy="1332000"/>
-          </a:xfrm>
-          <a:prstGeom prst="rect">
-            <a:avLst/>
-          </a:prstGeom>
-        </p:spPr>
-      </p:pic>
-      <p:sp>
-        <p:nvSpPr>
-          <p:cNvPr id="5" name="Segnaposto data 3">
-            <a:extLst>
-              <a:ext uri="{FF2B5EF4-FFF2-40B4-BE49-F238E27FC236}">
-                <a16:creationId xmlns:a16="http://schemas.microsoft.com/office/drawing/2014/main" id="{10832284-2AF9-D442-A2BC-3A4C6C544DF0}"/>
-              </a:ext>
-            </a:extLst>
-          </p:cNvPr>
-          <p:cNvSpPr>
-            <a:spLocks noGrp="1"/>
-          </p:cNvSpPr>
-          <p:nvPr>
-            <p:ph type="dt" sz="half" idx="10"/>
-          </p:nvPr>
-        </p:nvSpPr>
-        <p:spPr>
-          <a:xfrm>
-            <a:off x="838200" y="6356350"/>
-            <a:ext cx="2743200" cy="365125"/>
-          </a:xfrm>
-        </p:spPr>
-        <p:txBody>
-          <a:bodyPr/>
-          <a:lstStyle/>
-          <a:p>
-            <a:fld id="{4EF59023-6175-3944-979D-CFE35E3A8267}" type="datetime1">
-              <a:rPr lang="it-IT" smtClean="0"/>
-              <a:t>05/02/22</a:t>
-            </a:fld>
-            <a:endParaRPr lang="en-US" dirty="0"/>
-          </a:p>
-        </p:txBody>
-      </p:sp>
-      <p:sp>
-        <p:nvSpPr>
-          <p:cNvPr id="7" name="Segnaposto piè di pagina 4">
-            <a:extLst>
-              <a:ext uri="{FF2B5EF4-FFF2-40B4-BE49-F238E27FC236}">
-                <a16:creationId xmlns:a16="http://schemas.microsoft.com/office/drawing/2014/main" id="{5C3B2BD7-91A2-CA4F-9DA6-4CE984B6F87C}"/>
-              </a:ext>
-            </a:extLst>
-          </p:cNvPr>
-          <p:cNvSpPr>
-            <a:spLocks noGrp="1"/>
-          </p:cNvSpPr>
-          <p:nvPr>
-            <p:ph type="ftr" sz="quarter" idx="11"/>
-          </p:nvPr>
-        </p:nvSpPr>
-        <p:spPr>
-          <a:xfrm>
-            <a:off x="4038600" y="6356350"/>
-            <a:ext cx="4114800" cy="365125"/>
-          </a:xfrm>
-        </p:spPr>
-        <p:txBody>
-          <a:bodyPr/>
-          <a:lstStyle/>
-          <a:p>
-            <a:r>
-              <a:rPr lang="en-US" dirty="0"/>
-              <a:t>Arianna </a:t>
-            </a:r>
-            <a:r>
-              <a:rPr lang="en-US" dirty="0" err="1"/>
-              <a:t>Gasparri</a:t>
-            </a:r>
-            <a:endParaRPr lang="en-US" dirty="0"/>
-          </a:p>
-        </p:txBody>
-      </p:sp>
-      <p:sp>
-        <p:nvSpPr>
-          <p:cNvPr id="10" name="Segnaposto numero diapositiva 5">
-            <a:extLst>
-              <a:ext uri="{FF2B5EF4-FFF2-40B4-BE49-F238E27FC236}">
-                <a16:creationId xmlns:a16="http://schemas.microsoft.com/office/drawing/2014/main" id="{5568013C-6B52-9D43-B6C2-2654FF7BD98A}"/>
-              </a:ext>
-            </a:extLst>
-          </p:cNvPr>
-          <p:cNvSpPr>
-            <a:spLocks noGrp="1"/>
-          </p:cNvSpPr>
-          <p:nvPr>
-            <p:ph type="sldNum" sz="quarter" idx="12"/>
-          </p:nvPr>
-        </p:nvSpPr>
-        <p:spPr>
-          <a:xfrm>
-            <a:off x="8610600" y="6356350"/>
-            <a:ext cx="2743200" cy="365125"/>
-          </a:xfrm>
-        </p:spPr>
-        <p:txBody>
-          <a:bodyPr/>
-          <a:lstStyle/>
-          <a:p>
-            <a:fld id="{6D22F896-40B5-4ADD-8801-0D06FADFA095}" type="slidenum">
-              <a:rPr lang="en-US" smtClean="0"/>
-              <a:t>40</a:t>
-            </a:fld>
-            <a:endParaRPr lang="en-US" dirty="0"/>
-          </a:p>
-        </p:txBody>
-      </p:sp>
-      <p:pic>
-        <p:nvPicPr>
-          <p:cNvPr id="11" name="Immagine 10">
-            <a:extLst>
-              <a:ext uri="{FF2B5EF4-FFF2-40B4-BE49-F238E27FC236}">
-                <a16:creationId xmlns:a16="http://schemas.microsoft.com/office/drawing/2014/main" id="{E9214F11-0DDC-E448-AFA0-4E2BD04563C4}"/>
-              </a:ext>
-            </a:extLst>
-          </p:cNvPr>
-          <p:cNvPicPr>
-            <a:picLocks noChangeAspect="1"/>
-          </p:cNvPicPr>
-          <p:nvPr/>
-        </p:nvPicPr>
-        <p:blipFill>
-          <a:blip r:embed="rId3" cstate="print">
-            <a:extLst>
-              <a:ext uri="{28A0092B-C50C-407E-A947-70E740481C1C}">
-                <a14:useLocalDpi xmlns:a14="http://schemas.microsoft.com/office/drawing/2010/main" val="0"/>
-              </a:ext>
-            </a:extLst>
-          </a:blip>
-          <a:stretch>
-            <a:fillRect/>
-          </a:stretch>
-        </p:blipFill>
-        <p:spPr>
-          <a:xfrm>
-            <a:off x="241420" y="265431"/>
-            <a:ext cx="571500" cy="518160"/>
-          </a:xfrm>
-          <a:prstGeom prst="rect">
-            <a:avLst/>
-          </a:prstGeom>
-        </p:spPr>
-      </p:pic>
-      <mc:AlternateContent xmlns:mc="http://schemas.openxmlformats.org/markup-compatibility/2006" xmlns:a14="http://schemas.microsoft.com/office/drawing/2010/main">
-        <mc:Choice Requires="a14">
-          <p:sp>
-            <p:nvSpPr>
-              <p:cNvPr id="2" name="CasellaDiTesto 1">
-                <a:extLst>
-                  <a:ext uri="{FF2B5EF4-FFF2-40B4-BE49-F238E27FC236}">
-                    <a16:creationId xmlns:a16="http://schemas.microsoft.com/office/drawing/2014/main" id="{E58ABBA8-CF98-7143-BB35-E847C1F98BEF}"/>
-                  </a:ext>
-                </a:extLst>
-              </p:cNvPr>
-              <p:cNvSpPr txBox="1"/>
-              <p:nvPr/>
-            </p:nvSpPr>
-            <p:spPr>
-              <a:xfrm>
-                <a:off x="3807173" y="1475623"/>
-                <a:ext cx="6860827" cy="2031325"/>
-              </a:xfrm>
-              <a:prstGeom prst="rect">
-                <a:avLst/>
-              </a:prstGeom>
-              <a:noFill/>
-            </p:spPr>
-            <p:txBody>
-              <a:bodyPr wrap="square" rtlCol="0">
-                <a:spAutoFit/>
-              </a:bodyPr>
-              <a:lstStyle/>
-              <a:p>
-                <a:pPr algn="ctr"/>
-                <a:r>
-                  <a:rPr lang="it-IT" dirty="0"/>
-                  <a:t>Per la scelta effettuata della funzione di uscita il rango della matrice </a:t>
-                </a:r>
-                <a14:m>
-                  <m:oMath xmlns:m="http://schemas.openxmlformats.org/officeDocument/2006/math">
-                    <m:r>
-                      <m:rPr>
-                        <m:sty m:val="p"/>
-                      </m:rPr>
-                      <a:rPr lang="it-IT" i="0">
-                        <a:latin typeface="Cambria Math" panose="02040503050406030204" pitchFamily="18" charset="0"/>
-                      </a:rPr>
-                      <m:t>dO</m:t>
-                    </m:r>
-                  </m:oMath>
-                </a14:m>
-                <a:r>
-                  <a:rPr lang="it-IT" dirty="0"/>
-                  <a:t> risulta essere pari a 3 ,</a:t>
-                </a:r>
-              </a:p>
-              <a:p>
-                <a:pPr algn="ctr"/>
-                <a:r>
-                  <a:rPr lang="it-IT" dirty="0"/>
-                  <a:t>è quindi possibile concludere che il sistema NON sia localmente osservabile,</a:t>
-                </a:r>
-              </a:p>
-              <a:p>
-                <a:pPr algn="ctr"/>
-                <a:r>
-                  <a:rPr lang="it-IT" dirty="0"/>
-                  <a:t>si riporta di seguito la matrice calcolata, nella quale è riportato un * in corrispondenza degli elementi non nulli</a:t>
-                </a:r>
-              </a:p>
-              <a:p>
-                <a:pPr algn="ctr"/>
-                <a:r>
-                  <a:rPr lang="it-IT" dirty="0"/>
-                  <a:t>e dalla quale sono state eliminate le righe completamente nulle:</a:t>
-                </a:r>
-              </a:p>
-            </p:txBody>
-          </p:sp>
-        </mc:Choice>
-        <mc:Fallback xmlns="">
-          <p:sp>
-            <p:nvSpPr>
-              <p:cNvPr id="2" name="CasellaDiTesto 1">
-                <a:extLst>
-                  <a:ext uri="{FF2B5EF4-FFF2-40B4-BE49-F238E27FC236}">
-                    <a16:creationId xmlns:a16="http://schemas.microsoft.com/office/drawing/2014/main" id="{E58ABBA8-CF98-7143-BB35-E847C1F98BEF}"/>
-                  </a:ext>
-                </a:extLst>
-              </p:cNvPr>
-              <p:cNvSpPr txBox="1">
-                <a:spLocks noRot="1" noChangeAspect="1" noMove="1" noResize="1" noEditPoints="1" noAdjustHandles="1" noChangeArrowheads="1" noChangeShapeType="1" noTextEdit="1"/>
-              </p:cNvSpPr>
-              <p:nvPr/>
-            </p:nvSpPr>
-            <p:spPr>
-              <a:xfrm>
-                <a:off x="3807173" y="1475623"/>
-                <a:ext cx="6860827" cy="2031325"/>
-              </a:xfrm>
-              <a:prstGeom prst="rect">
-                <a:avLst/>
-              </a:prstGeom>
-              <a:blipFill>
-                <a:blip r:embed="rId4"/>
-                <a:stretch>
-                  <a:fillRect l="-185" t="-621" b="-3727"/>
-                </a:stretch>
-              </a:blipFill>
-            </p:spPr>
-            <p:txBody>
-              <a:bodyPr/>
-              <a:lstStyle/>
-              <a:p>
-                <a:r>
-                  <a:rPr lang="it-IT">
-                    <a:noFill/>
-                  </a:rPr>
-                  <a:t> </a:t>
-                </a:r>
-              </a:p>
-            </p:txBody>
-          </p:sp>
-        </mc:Fallback>
-      </mc:AlternateContent>
-      <p:pic>
-        <p:nvPicPr>
-          <p:cNvPr id="4" name="Immagine 3">
-            <a:extLst>
-              <a:ext uri="{FF2B5EF4-FFF2-40B4-BE49-F238E27FC236}">
-                <a16:creationId xmlns:a16="http://schemas.microsoft.com/office/drawing/2014/main" id="{4C1EF7F2-EB83-F147-B4E7-DA2FA102762A}"/>
-              </a:ext>
-            </a:extLst>
-          </p:cNvPr>
-          <p:cNvPicPr>
-            <a:picLocks noChangeAspect="1"/>
-          </p:cNvPicPr>
-          <p:nvPr/>
-        </p:nvPicPr>
-        <p:blipFill>
-          <a:blip r:embed="rId5"/>
-          <a:stretch>
-            <a:fillRect/>
-          </a:stretch>
-        </p:blipFill>
-        <p:spPr>
-          <a:xfrm>
-            <a:off x="6170786" y="3506948"/>
-            <a:ext cx="2133600" cy="1130300"/>
-          </a:xfrm>
-          <a:prstGeom prst="rect">
-            <a:avLst/>
-          </a:prstGeom>
-        </p:spPr>
-      </p:pic>
-      <p:sp>
-        <p:nvSpPr>
-          <p:cNvPr id="13" name="CasellaDiTesto 12">
-            <a:extLst>
-              <a:ext uri="{FF2B5EF4-FFF2-40B4-BE49-F238E27FC236}">
-                <a16:creationId xmlns:a16="http://schemas.microsoft.com/office/drawing/2014/main" id="{75C27FB8-2EAE-5E43-BD5E-E6F38CAB48E9}"/>
-              </a:ext>
-            </a:extLst>
-          </p:cNvPr>
-          <p:cNvSpPr txBox="1"/>
-          <p:nvPr/>
-        </p:nvSpPr>
-        <p:spPr>
-          <a:xfrm>
-            <a:off x="1714031" y="4637248"/>
-            <a:ext cx="8953970" cy="646331"/>
-          </a:xfrm>
-          <a:prstGeom prst="rect">
-            <a:avLst/>
-          </a:prstGeom>
-          <a:noFill/>
-        </p:spPr>
-        <p:txBody>
-          <a:bodyPr wrap="square" rtlCol="0">
-            <a:spAutoFit/>
-          </a:bodyPr>
-          <a:lstStyle/>
-          <a:p>
-            <a:pPr algn="ctr"/>
-            <a:r>
-              <a:rPr lang="it-IT" dirty="0"/>
-              <a:t>Risulta di immediato come il rango della matrice non possa essere pieno, in quanto questa presenta una colonna interamente nulla.</a:t>
-            </a:r>
-          </a:p>
-        </p:txBody>
-      </p:sp>
-    </p:spTree>
-    <p:extLst>
-      <p:ext uri="{BB962C8B-B14F-4D97-AF65-F5344CB8AC3E}">
-        <p14:creationId xmlns:p14="http://schemas.microsoft.com/office/powerpoint/2010/main" val="1954747474"/>
-      </p:ext>
-    </p:extLst>
-  </p:cSld>
-  <p:clrMapOvr>
-    <a:masterClrMapping/>
-  </p:clrMapOvr>
-</p:sld>
-</file>
-
-<file path=ppt/slides/slide41.xml><?xml version="1.0" encoding="utf-8"?>
-<p:sld xmlns:a="http://schemas.openxmlformats.org/drawingml/2006/main" xmlns:r="http://schemas.openxmlformats.org/officeDocument/2006/relationships" xmlns:p="http://schemas.openxmlformats.org/presentationml/2006/main">
-  <p:cSld>
-    <p:spTree>
-      <p:nvGrpSpPr>
-        <p:cNvPr id="1" name=""/>
-        <p:cNvGrpSpPr/>
-        <p:nvPr/>
-      </p:nvGrpSpPr>
-      <p:grpSpPr>
-        <a:xfrm>
-          <a:off x="0" y="0"/>
-          <a:ext cx="0" cy="0"/>
-          <a:chOff x="0" y="0"/>
-          <a:chExt cx="0" cy="0"/>
-        </a:xfrm>
-      </p:grpSpPr>
-      <p:sp>
-        <p:nvSpPr>
-          <p:cNvPr id="8" name="Titolo 1">
-            <a:extLst>
-              <a:ext uri="{FF2B5EF4-FFF2-40B4-BE49-F238E27FC236}">
-                <a16:creationId xmlns:a16="http://schemas.microsoft.com/office/drawing/2014/main" id="{E8EDF0BB-0558-644B-BB96-58C4BD179ABC}"/>
-              </a:ext>
-            </a:extLst>
-          </p:cNvPr>
-          <p:cNvSpPr txBox="1">
-            <a:spLocks/>
-          </p:cNvSpPr>
-          <p:nvPr/>
-        </p:nvSpPr>
-        <p:spPr>
-          <a:xfrm>
-            <a:off x="1524000" y="454393"/>
-            <a:ext cx="9144000" cy="1021230"/>
-          </a:xfrm>
-          <a:prstGeom prst="rect">
-            <a:avLst/>
-          </a:prstGeom>
-        </p:spPr>
-        <p:txBody>
-          <a:bodyPr vert="horz" lIns="91440" tIns="45720" rIns="91440" bIns="45720" rtlCol="0" anchor="ctr">
             <a:normAutofit fontScale="92500" lnSpcReduction="10000"/>
           </a:bodyPr>
           <a:lstStyle>
@@ -22300,7 +21858,7 @@
           <a:p>
             <a:fld id="{4EF59023-6175-3944-979D-CFE35E3A8267}" type="datetime1">
               <a:rPr lang="it-IT" smtClean="0"/>
-              <a:t>06/02/22</a:t>
+              <a:t>14/02/2022</a:t>
             </a:fld>
             <a:endParaRPr lang="en-US" dirty="0"/>
           </a:p>
@@ -22372,7 +21930,7 @@
           <a:p>
             <a:fld id="{6D22F896-40B5-4ADD-8801-0D06FADFA095}" type="slidenum">
               <a:rPr lang="en-US" smtClean="0"/>
-              <a:t>41</a:t>
+              <a:t>40</a:t>
             </a:fld>
             <a:endParaRPr lang="en-US" dirty="0"/>
           </a:p>
@@ -22414,8 +21972,8 @@
           </a:prstGeom>
         </p:spPr>
       </p:pic>
-      <mc:AlternateContent xmlns:mc="http://schemas.openxmlformats.org/markup-compatibility/2006">
-        <mc:Choice xmlns:a14="http://schemas.microsoft.com/office/drawing/2010/main" Requires="a14">
+      <mc:AlternateContent xmlns:mc="http://schemas.openxmlformats.org/markup-compatibility/2006" xmlns:a14="http://schemas.microsoft.com/office/drawing/2010/main">
+        <mc:Choice Requires="a14">
           <p:sp>
             <p:nvSpPr>
               <p:cNvPr id="2" name="CasellaDiTesto 1">
@@ -22589,7 +22147,7 @@
             </p:txBody>
           </p:sp>
         </mc:Choice>
-        <mc:Fallback>
+        <mc:Fallback xmlns="">
           <p:sp>
             <p:nvSpPr>
               <p:cNvPr id="2" name="CasellaDiTesto 1">
@@ -22647,7 +22205,7 @@
 </p:sld>
 </file>
 
-<file path=ppt/slides/slide42.xml><?xml version="1.0" encoding="utf-8"?>
+<file path=ppt/slides/slide41.xml><?xml version="1.0" encoding="utf-8"?>
 <p:sld xmlns:a="http://schemas.openxmlformats.org/drawingml/2006/main" xmlns:r="http://schemas.openxmlformats.org/officeDocument/2006/relationships" xmlns:p="http://schemas.openxmlformats.org/presentationml/2006/main">
   <p:cSld>
     <p:spTree>
@@ -22752,7 +22310,7 @@
           <a:p>
             <a:fld id="{4EF59023-6175-3944-979D-CFE35E3A8267}" type="datetime1">
               <a:rPr lang="it-IT" smtClean="0"/>
-              <a:t>05/02/22</a:t>
+              <a:t>14/02/2022</a:t>
             </a:fld>
             <a:endParaRPr lang="en-US" dirty="0"/>
           </a:p>
@@ -22824,7 +22382,7 @@
           <a:p>
             <a:fld id="{6D22F896-40B5-4ADD-8801-0D06FADFA095}" type="slidenum">
               <a:rPr lang="en-US" smtClean="0"/>
-              <a:t>42</a:t>
+              <a:t>41</a:t>
             </a:fld>
             <a:endParaRPr lang="en-US" dirty="0"/>
           </a:p>
@@ -23130,7 +22688,7 @@
           <a:p>
             <a:fld id="{4EF59023-6175-3944-979D-CFE35E3A8267}" type="datetime1">
               <a:rPr lang="it-IT" smtClean="0"/>
-              <a:t>05/02/22</a:t>
+              <a:t>14/02/2022</a:t>
             </a:fld>
             <a:endParaRPr lang="en-US" dirty="0"/>
           </a:p>
@@ -23923,7 +23481,7 @@
           <a:p>
             <a:fld id="{4EF59023-6175-3944-979D-CFE35E3A8267}" type="datetime1">
               <a:rPr lang="it-IT" smtClean="0"/>
-              <a:t>05/02/22</a:t>
+              <a:t>14/02/2022</a:t>
             </a:fld>
             <a:endParaRPr lang="en-US" dirty="0"/>
           </a:p>
@@ -24510,7 +24068,7 @@
           <a:p>
             <a:fld id="{4EF59023-6175-3944-979D-CFE35E3A8267}" type="datetime1">
               <a:rPr lang="it-IT" smtClean="0"/>
-              <a:t>05/02/22</a:t>
+              <a:t>14/02/2022</a:t>
             </a:fld>
             <a:endParaRPr lang="en-US" dirty="0"/>
           </a:p>
@@ -24763,7 +24321,7 @@
           <a:p>
             <a:fld id="{4EF59023-6175-3944-979D-CFE35E3A8267}" type="datetime1">
               <a:rPr lang="it-IT" smtClean="0"/>
-              <a:t>05/02/22</a:t>
+              <a:t>14/02/2022</a:t>
             </a:fld>
             <a:endParaRPr lang="en-US" dirty="0"/>
           </a:p>
@@ -25215,7 +24773,7 @@
           <a:p>
             <a:fld id="{4EF59023-6175-3944-979D-CFE35E3A8267}" type="datetime1">
               <a:rPr lang="it-IT" smtClean="0"/>
-              <a:t>05/02/22</a:t>
+              <a:t>14/02/2022</a:t>
             </a:fld>
             <a:endParaRPr lang="en-US" dirty="0"/>
           </a:p>

</xml_diff>

<commit_message>
Aggiunte label agli assi per l'immagine delle DesiredTraj e rifatta immagine CompTorq con simboli per evidenziare andamento dell'errore ai giunti: consigli Gigi.
</commit_message>
<xml_diff>
--- a/Relazione/Presentazione.pptx
+++ b/Relazione/Presentazione.pptx
@@ -5773,28 +5773,28 @@
       </mc:AlternateContent>
       <p:pic>
         <p:nvPicPr>
-          <p:cNvPr id="10" name="Immagine 9">
-            <a:extLst>
-              <a:ext uri="{FF2B5EF4-FFF2-40B4-BE49-F238E27FC236}">
-                <a16:creationId xmlns:a16="http://schemas.microsoft.com/office/drawing/2014/main" id="{72511B5E-E7E9-ED41-B938-3D29CFDF81A5}"/>
-              </a:ext>
-            </a:extLst>
-          </p:cNvPr>
+          <p:cNvPr id="4" name="Immagine 3"/>
           <p:cNvPicPr>
             <a:picLocks noChangeAspect="1"/>
           </p:cNvPicPr>
           <p:nvPr/>
         </p:nvPicPr>
         <p:blipFill>
-          <a:blip r:embed="rId5"/>
+          <a:blip r:embed="rId5">
+            <a:extLst>
+              <a:ext uri="{28A0092B-C50C-407E-A947-70E740481C1C}">
+                <a14:useLocalDpi xmlns:a14="http://schemas.microsoft.com/office/drawing/2010/main" val="0"/>
+              </a:ext>
+            </a:extLst>
+          </a:blip>
           <a:stretch>
             <a:fillRect/>
           </a:stretch>
         </p:blipFill>
         <p:spPr>
           <a:xfrm>
-            <a:off x="5308600" y="2089150"/>
-            <a:ext cx="5689600" cy="4267200"/>
+            <a:off x="5586885" y="2356350"/>
+            <a:ext cx="5333333" cy="4000000"/>
           </a:xfrm>
           <a:prstGeom prst="rect">
             <a:avLst/>
@@ -6248,10 +6248,10 @@
       </p:grpSpPr>
       <p:pic>
         <p:nvPicPr>
-          <p:cNvPr id="6" name="Immagine 5">
-            <a:extLst>
-              <a:ext uri="{FF2B5EF4-FFF2-40B4-BE49-F238E27FC236}">
-                <a16:creationId xmlns:a16="http://schemas.microsoft.com/office/drawing/2014/main" id="{BC392C76-04EA-B74D-93E7-53223B265B1A}"/>
+          <p:cNvPr id="8" name="Immagine 7">
+            <a:extLst>
+              <a:ext uri="{FF2B5EF4-FFF2-40B4-BE49-F238E27FC236}">
+                <a16:creationId xmlns:a16="http://schemas.microsoft.com/office/drawing/2014/main" id="{18A45E0B-D139-DF46-8575-785298637F72}"/>
               </a:ext>
             </a:extLst>
           </p:cNvPr>
@@ -6262,36 +6262,6 @@
         </p:nvPicPr>
         <p:blipFill>
           <a:blip r:embed="rId2"/>
-          <a:stretch>
-            <a:fillRect/>
-          </a:stretch>
-        </p:blipFill>
-        <p:spPr>
-          <a:xfrm>
-            <a:off x="2819400" y="2828201"/>
-            <a:ext cx="4267200" cy="3200400"/>
-          </a:xfrm>
-          <a:prstGeom prst="rect">
-            <a:avLst/>
-          </a:prstGeom>
-        </p:spPr>
-      </p:pic>
-      <p:pic>
-        <p:nvPicPr>
-          <p:cNvPr id="8" name="Immagine 7">
-            <a:extLst>
-              <a:ext uri="{FF2B5EF4-FFF2-40B4-BE49-F238E27FC236}">
-                <a16:creationId xmlns:a16="http://schemas.microsoft.com/office/drawing/2014/main" id="{18A45E0B-D139-DF46-8575-785298637F72}"/>
-              </a:ext>
-            </a:extLst>
-          </p:cNvPr>
-          <p:cNvPicPr>
-            <a:picLocks noChangeAspect="1"/>
-          </p:cNvPicPr>
-          <p:nvPr/>
-        </p:nvPicPr>
-        <p:blipFill>
-          <a:blip r:embed="rId3"/>
           <a:stretch>
             <a:fillRect/>
           </a:stretch>
@@ -6462,7 +6432,7 @@
         </p:nvSpPr>
         <p:spPr>
           <a:xfrm>
-            <a:off x="8610600" y="6356350"/>
+            <a:off x="8578645" y="6418928"/>
             <a:ext cx="2743200" cy="365125"/>
           </a:xfrm>
         </p:spPr>
@@ -6493,7 +6463,7 @@
           <p:nvPr/>
         </p:nvPicPr>
         <p:blipFill>
-          <a:blip r:embed="rId4" cstate="print">
+          <a:blip r:embed="rId3" cstate="print">
             <a:extLst>
               <a:ext uri="{28A0092B-C50C-407E-A947-70E740481C1C}">
                 <a14:useLocalDpi xmlns:a14="http://schemas.microsoft.com/office/drawing/2010/main" val="0"/>
@@ -6529,7 +6499,7 @@
           <p:nvPr/>
         </p:nvPicPr>
         <p:blipFill>
-          <a:blip r:embed="rId5"/>
+          <a:blip r:embed="rId4"/>
           <a:stretch>
             <a:fillRect/>
           </a:stretch>
@@ -6587,6 +6557,36 @@
           </a:p>
         </p:txBody>
       </p:sp>
+      <p:pic>
+        <p:nvPicPr>
+          <p:cNvPr id="2" name="Immagine 1"/>
+          <p:cNvPicPr>
+            <a:picLocks noChangeAspect="1"/>
+          </p:cNvPicPr>
+          <p:nvPr/>
+        </p:nvPicPr>
+        <p:blipFill>
+          <a:blip r:embed="rId5">
+            <a:extLst>
+              <a:ext uri="{28A0092B-C50C-407E-A947-70E740481C1C}">
+                <a14:useLocalDpi xmlns:a14="http://schemas.microsoft.com/office/drawing/2010/main" val="0"/>
+              </a:ext>
+            </a:extLst>
+          </a:blip>
+          <a:stretch>
+            <a:fillRect/>
+          </a:stretch>
+        </p:blipFill>
+        <p:spPr>
+          <a:xfrm>
+            <a:off x="2816943" y="2828200"/>
+            <a:ext cx="4269658" cy="3202243"/>
+          </a:xfrm>
+          <a:prstGeom prst="rect">
+            <a:avLst/>
+          </a:prstGeom>
+        </p:spPr>
+      </p:pic>
     </p:spTree>
     <p:extLst>
       <p:ext uri="{BB962C8B-B14F-4D97-AF65-F5344CB8AC3E}">
@@ -9433,8 +9433,8 @@
           </a:prstGeom>
         </p:spPr>
       </p:pic>
-      <mc:AlternateContent xmlns:mc="http://schemas.openxmlformats.org/markup-compatibility/2006" xmlns:a14="http://schemas.microsoft.com/office/drawing/2010/main">
-        <mc:Choice Requires="a14">
+      <mc:AlternateContent xmlns:mc="http://schemas.openxmlformats.org/markup-compatibility/2006">
+        <mc:Choice xmlns:a14="http://schemas.microsoft.com/office/drawing/2010/main" Requires="a14">
           <p:sp>
             <p:nvSpPr>
               <p:cNvPr id="2" name="CasellaDiTesto 1">
@@ -9450,7 +9450,7 @@
             <p:spPr>
               <a:xfrm>
                 <a:off x="1524000" y="1475623"/>
-                <a:ext cx="9144000" cy="3416320"/>
+                <a:ext cx="9144000" cy="3139321"/>
               </a:xfrm>
               <a:prstGeom prst="rect">
                 <a:avLst/>
@@ -9466,7 +9466,23 @@
                 <a:pPr algn="ctr"/>
                 <a:r>
                   <a:rPr lang="it-IT" dirty="0"/>
-                  <a:t>Dall’immagine precedente è possibile concludere che il controllore a Coppia Calcolata Adattivo produce delle coppie generate con oscillazioni a circa 20Hz, queste possono essere accettabili se date in ingresso a dei motori con banda passante tra 30 e 50Hz, che riuscirebbero a smorzarle.</a:t>
+                  <a:t>Dall’immagine precedente è possibile concludere che il controllore a Coppia Calcolata Adattivo produce delle coppie </a:t>
+                </a:r>
+                <a:r>
+                  <a:rPr lang="it-IT" dirty="0" smtClean="0"/>
+                  <a:t>di uscita dal </a:t>
+                </a:r>
+                <a:r>
+                  <a:rPr lang="it-IT" smtClean="0"/>
+                  <a:t>controllore stesso </a:t>
+                </a:r>
+                <a:r>
+                  <a:rPr lang="it-IT" dirty="0" smtClean="0"/>
+                  <a:t>che presentano oscillazioni </a:t>
+                </a:r>
+                <a:r>
+                  <a:rPr lang="it-IT" dirty="0"/>
+                  <a:t>a circa 20Hz, </a:t>
                 </a:r>
               </a:p>
               <a:p>
@@ -9554,7 +9570,7 @@
             </p:txBody>
           </p:sp>
         </mc:Choice>
-        <mc:Fallback xmlns="">
+        <mc:Fallback>
           <p:sp>
             <p:nvSpPr>
               <p:cNvPr id="2" name="CasellaDiTesto 1">
@@ -9572,7 +9588,7 @@
             <p:spPr>
               <a:xfrm>
                 <a:off x="1524000" y="1475623"/>
-                <a:ext cx="9144000" cy="3416320"/>
+                <a:ext cx="9144000" cy="3139321"/>
               </a:xfrm>
               <a:prstGeom prst="rect">
                 <a:avLst/>
@@ -9580,7 +9596,7 @@
               <a:blipFill>
                 <a:blip r:embed="rId3"/>
                 <a:stretch>
-                  <a:fillRect l="-417" t="-370" r="-833" b="-1852"/>
+                  <a:fillRect l="-333" t="-971" r="-933" b="-2136"/>
                 </a:stretch>
               </a:blipFill>
             </p:spPr>

</xml_diff>